<commit_message>
reworked lab env slides
</commit_message>
<xml_diff>
--- a/01-Intro.pptx
+++ b/01-Intro.pptx
@@ -6,27 +6,25 @@
     <p:sldMasterId id="2147483847" r:id="rId6"/>
   </p:sldMasterIdLst>
   <p:notesMasterIdLst>
-    <p:notesMasterId r:id="rId22"/>
+    <p:notesMasterId r:id="rId20"/>
   </p:notesMasterIdLst>
   <p:handoutMasterIdLst>
-    <p:handoutMasterId r:id="rId23"/>
+    <p:handoutMasterId r:id="rId21"/>
   </p:handoutMasterIdLst>
   <p:sldIdLst>
     <p:sldId id="256" r:id="rId7"/>
     <p:sldId id="291" r:id="rId8"/>
     <p:sldId id="257" r:id="rId9"/>
     <p:sldId id="283" r:id="rId10"/>
-    <p:sldId id="284" r:id="rId11"/>
-    <p:sldId id="286" r:id="rId12"/>
-    <p:sldId id="285" r:id="rId13"/>
-    <p:sldId id="287" r:id="rId14"/>
-    <p:sldId id="292" r:id="rId15"/>
-    <p:sldId id="288" r:id="rId16"/>
-    <p:sldId id="289" r:id="rId17"/>
-    <p:sldId id="290" r:id="rId18"/>
-    <p:sldId id="273" r:id="rId19"/>
-    <p:sldId id="276" r:id="rId20"/>
-    <p:sldId id="267" r:id="rId21"/>
+    <p:sldId id="294" r:id="rId11"/>
+    <p:sldId id="284" r:id="rId12"/>
+    <p:sldId id="286" r:id="rId13"/>
+    <p:sldId id="285" r:id="rId14"/>
+    <p:sldId id="293" r:id="rId15"/>
+    <p:sldId id="292" r:id="rId16"/>
+    <p:sldId id="288" r:id="rId17"/>
+    <p:sldId id="273" r:id="rId18"/>
+    <p:sldId id="267" r:id="rId19"/>
   </p:sldIdLst>
   <p:sldSz cx="16256000" cy="9144000"/>
   <p:notesSz cx="6858000" cy="9144000"/>
@@ -288,7 +286,7 @@
               <a:pPr>
                 <a:defRPr/>
               </a:pPr>
-              <a:t>2015-12-01</a:t>
+              <a:t>2015-12-02</a:t>
             </a:fld>
             <a:endParaRPr lang="en-US" dirty="0"/>
           </a:p>
@@ -471,7 +469,7 @@
               <a:pPr>
                 <a:defRPr/>
               </a:pPr>
-              <a:t>2015-12-01</a:t>
+              <a:t>2015-12-02</a:t>
             </a:fld>
             <a:endParaRPr lang="en-US" dirty="0"/>
           </a:p>
@@ -943,19 +941,7 @@
                 <a:ea typeface="ＭＳ Ｐゴシック" charset="0"/>
                 <a:cs typeface="Arial" panose="020B0604020202020204" pitchFamily="34" charset="0"/>
               </a:rPr>
-              <a:t>Instructor </a:t>
-            </a:r>
-            <a:r>
-              <a:rPr lang="en-US" sz="1200" kern="1200" dirty="0" smtClean="0">
-                <a:solidFill>
-                  <a:schemeClr val="tx1"/>
-                </a:solidFill>
-                <a:effectLst/>
-                <a:latin typeface="Arial" panose="020B0604020202020204" pitchFamily="34" charset="0"/>
-                <a:ea typeface="ＭＳ Ｐゴシック" charset="0"/>
-                <a:cs typeface="Arial" panose="020B0604020202020204" pitchFamily="34" charset="0"/>
-              </a:rPr>
-              <a:t>Note: </a:t>
+              <a:t>Instructor Note: </a:t>
             </a:r>
             <a:r>
               <a:rPr lang="en-US" sz="1200" b="1" kern="1200" dirty="0" smtClean="0">
@@ -1062,307 +1048,6 @@
     <p:extLst>
       <p:ext uri="{BB962C8B-B14F-4D97-AF65-F5344CB8AC3E}">
         <p14:creationId xmlns:p14="http://schemas.microsoft.com/office/powerpoint/2010/main" val="1684291166"/>
-      </p:ext>
-    </p:extLst>
-  </p:cSld>
-  <p:clrMapOvr>
-    <a:masterClrMapping/>
-  </p:clrMapOvr>
-</p:notes>
-</file>
-
-<file path=ppt/notesSlides/notesSlide10.xml><?xml version="1.0" encoding="utf-8"?>
-<p:notes xmlns:a="http://schemas.openxmlformats.org/drawingml/2006/main" xmlns:r="http://schemas.openxmlformats.org/officeDocument/2006/relationships" xmlns:p="http://schemas.openxmlformats.org/presentationml/2006/main">
-  <p:cSld>
-    <p:spTree>
-      <p:nvGrpSpPr>
-        <p:cNvPr id="1" name=""/>
-        <p:cNvGrpSpPr/>
-        <p:nvPr/>
-      </p:nvGrpSpPr>
-      <p:grpSpPr>
-        <a:xfrm>
-          <a:off x="0" y="0"/>
-          <a:ext cx="0" cy="0"/>
-          <a:chOff x="0" y="0"/>
-          <a:chExt cx="0" cy="0"/>
-        </a:xfrm>
-      </p:grpSpPr>
-      <p:sp>
-        <p:nvSpPr>
-          <p:cNvPr id="2" name="Slide Image Placeholder 1"/>
-          <p:cNvSpPr>
-            <a:spLocks noGrp="1" noRot="1" noChangeAspect="1"/>
-          </p:cNvSpPr>
-          <p:nvPr>
-            <p:ph type="sldImg"/>
-          </p:nvPr>
-        </p:nvSpPr>
-        <p:spPr/>
-      </p:sp>
-      <p:sp>
-        <p:nvSpPr>
-          <p:cNvPr id="3" name="Notes Placeholder 2"/>
-          <p:cNvSpPr>
-            <a:spLocks noGrp="1"/>
-          </p:cNvSpPr>
-          <p:nvPr>
-            <p:ph type="body" idx="1"/>
-          </p:nvPr>
-        </p:nvSpPr>
-        <p:spPr>
-          <a:xfrm>
-            <a:off x="685800" y="4343400"/>
-            <a:ext cx="5486400" cy="4114800"/>
-          </a:xfrm>
-          <a:prstGeom prst="rect">
-            <a:avLst/>
-          </a:prstGeom>
-        </p:spPr>
-        <p:txBody>
-          <a:bodyPr/>
-          <a:lstStyle/>
-          <a:p>
-            <a:pPr marL="0" marR="0" lvl="2" indent="0" algn="l" defTabSz="914363" rtl="0" eaLnBrk="1" fontAlgn="auto" latinLnBrk="0" hangingPunct="1">
-              <a:lnSpc>
-                <a:spcPct val="90000"/>
-              </a:lnSpc>
-              <a:spcBef>
-                <a:spcPts val="0"/>
-              </a:spcBef>
-              <a:spcAft>
-                <a:spcPts val="333"/>
-              </a:spcAft>
-              <a:buClrTx/>
-              <a:buSzTx/>
-              <a:buFontTx/>
-              <a:buNone/>
-              <a:tabLst/>
-              <a:defRPr/>
-            </a:pPr>
-            <a:r>
-              <a:rPr lang="en-US" dirty="0" smtClean="0"/>
-              <a:t>This is the architecture</a:t>
-            </a:r>
-            <a:r>
-              <a:rPr lang="en-US" baseline="0" dirty="0" smtClean="0"/>
-              <a:t> </a:t>
-            </a:r>
-            <a:r>
-              <a:rPr lang="en-US" dirty="0" smtClean="0"/>
-              <a:t>you'll start</a:t>
-            </a:r>
-            <a:r>
-              <a:rPr lang="en-US" baseline="0" dirty="0" smtClean="0"/>
-              <a:t> using in a few minutes. </a:t>
-            </a:r>
-            <a:r>
-              <a:rPr lang="en-US" sz="900" dirty="0" smtClean="0"/>
-              <a:t>To ensure the smoothest setup experience, you'll be using a virtual workstation with all the necessary tools installed</a:t>
-            </a:r>
-            <a:r>
-              <a:rPr lang="en-US" sz="900" baseline="0" dirty="0" smtClean="0"/>
-              <a:t> </a:t>
-            </a:r>
-            <a:r>
-              <a:rPr lang="en-US" dirty="0" smtClean="0"/>
-              <a:t>so you can start using Chef right away.</a:t>
-            </a:r>
-          </a:p>
-          <a:p>
-            <a:endParaRPr lang="en-US" dirty="0"/>
-          </a:p>
-        </p:txBody>
-      </p:sp>
-    </p:spTree>
-    <p:extLst>
-      <p:ext uri="{BB962C8B-B14F-4D97-AF65-F5344CB8AC3E}">
-        <p14:creationId xmlns:p14="http://schemas.microsoft.com/office/powerpoint/2010/main" val="304422884"/>
-      </p:ext>
-    </p:extLst>
-  </p:cSld>
-  <p:clrMapOvr>
-    <a:masterClrMapping/>
-  </p:clrMapOvr>
-</p:notes>
-</file>
-
-<file path=ppt/notesSlides/notesSlide11.xml><?xml version="1.0" encoding="utf-8"?>
-<p:notes xmlns:a="http://schemas.openxmlformats.org/drawingml/2006/main" xmlns:r="http://schemas.openxmlformats.org/officeDocument/2006/relationships" xmlns:p="http://schemas.openxmlformats.org/presentationml/2006/main">
-  <p:cSld>
-    <p:spTree>
-      <p:nvGrpSpPr>
-        <p:cNvPr id="1" name=""/>
-        <p:cNvGrpSpPr/>
-        <p:nvPr/>
-      </p:nvGrpSpPr>
-      <p:grpSpPr>
-        <a:xfrm>
-          <a:off x="0" y="0"/>
-          <a:ext cx="0" cy="0"/>
-          <a:chOff x="0" y="0"/>
-          <a:chExt cx="0" cy="0"/>
-        </a:xfrm>
-      </p:grpSpPr>
-      <p:sp>
-        <p:nvSpPr>
-          <p:cNvPr id="2" name="Slide Image Placeholder 1"/>
-          <p:cNvSpPr>
-            <a:spLocks noGrp="1" noRot="1" noChangeAspect="1"/>
-          </p:cNvSpPr>
-          <p:nvPr>
-            <p:ph type="sldImg"/>
-          </p:nvPr>
-        </p:nvSpPr>
-        <p:spPr/>
-      </p:sp>
-      <p:sp>
-        <p:nvSpPr>
-          <p:cNvPr id="3" name="Notes Placeholder 2"/>
-          <p:cNvSpPr>
-            <a:spLocks noGrp="1"/>
-          </p:cNvSpPr>
-          <p:nvPr>
-            <p:ph type="body" idx="1"/>
-          </p:nvPr>
-        </p:nvSpPr>
-        <p:spPr>
-          <a:xfrm>
-            <a:off x="685800" y="4343400"/>
-            <a:ext cx="5486400" cy="4114800"/>
-          </a:xfrm>
-          <a:prstGeom prst="rect">
-            <a:avLst/>
-          </a:prstGeom>
-        </p:spPr>
-        <p:txBody>
-          <a:bodyPr/>
-          <a:lstStyle/>
-          <a:p>
-            <a:pPr marL="0" marR="0" indent="0" algn="l" defTabSz="914363" rtl="0" eaLnBrk="1" fontAlgn="auto" latinLnBrk="0" hangingPunct="1">
-              <a:lnSpc>
-                <a:spcPct val="90000"/>
-              </a:lnSpc>
-              <a:spcBef>
-                <a:spcPts val="0"/>
-              </a:spcBef>
-              <a:spcAft>
-                <a:spcPts val="333"/>
-              </a:spcAft>
-              <a:buClrTx/>
-              <a:buSzTx/>
-              <a:buFontTx/>
-              <a:buNone/>
-              <a:tabLst/>
-              <a:defRPr/>
-            </a:pPr>
-            <a:r>
-              <a:rPr lang="en-US" dirty="0" smtClean="0"/>
-              <a:t>This is the architecture you'll be using later in this course</a:t>
-            </a:r>
-            <a:r>
-              <a:rPr lang="en-US" baseline="0" dirty="0" smtClean="0"/>
-              <a:t>. </a:t>
-            </a:r>
-            <a:r>
-              <a:rPr lang="en-US" dirty="0" smtClean="0"/>
-              <a:t>When using this architecture, the Chef tools</a:t>
-            </a:r>
-            <a:r>
-              <a:rPr lang="en-US" baseline="0" dirty="0" smtClean="0"/>
-              <a:t> will be installed on your laptop and you'll perform your configurations locally before pushing them to the Chef server and ultimately to the nodes you will be managing. </a:t>
-            </a:r>
-          </a:p>
-          <a:p>
-            <a:pPr marL="0" marR="0" indent="0" algn="l" defTabSz="914363" rtl="0" eaLnBrk="1" fontAlgn="auto" latinLnBrk="0" hangingPunct="1">
-              <a:lnSpc>
-                <a:spcPct val="90000"/>
-              </a:lnSpc>
-              <a:spcBef>
-                <a:spcPts val="0"/>
-              </a:spcBef>
-              <a:spcAft>
-                <a:spcPts val="333"/>
-              </a:spcAft>
-              <a:buClrTx/>
-              <a:buSzTx/>
-              <a:buFontTx/>
-              <a:buNone/>
-              <a:tabLst/>
-              <a:defRPr/>
-            </a:pPr>
-            <a:endParaRPr lang="en-US" dirty="0"/>
-          </a:p>
-          <a:p>
-            <a:pPr marL="0" marR="0" indent="0" algn="l" defTabSz="914363" rtl="0" eaLnBrk="1" fontAlgn="auto" latinLnBrk="0" hangingPunct="1">
-              <a:lnSpc>
-                <a:spcPct val="90000"/>
-              </a:lnSpc>
-              <a:spcBef>
-                <a:spcPts val="0"/>
-              </a:spcBef>
-              <a:spcAft>
-                <a:spcPts val="333"/>
-              </a:spcAft>
-              <a:buClrTx/>
-              <a:buSzTx/>
-              <a:buFontTx/>
-              <a:buNone/>
-              <a:tabLst/>
-              <a:defRPr/>
-            </a:pPr>
-            <a:r>
-              <a:rPr lang="en-US" baseline="0" dirty="0" smtClean="0"/>
-              <a:t>In this way, when you complete this course </a:t>
-            </a:r>
-            <a:r>
-              <a:rPr lang="en-US" dirty="0" smtClean="0"/>
-              <a:t>you will have a code repository </a:t>
-            </a:r>
-            <a:r>
-              <a:rPr lang="en-US" baseline="0" dirty="0" smtClean="0"/>
-              <a:t>on your laptop </a:t>
-            </a:r>
-            <a:r>
-              <a:rPr lang="en-US" dirty="0" smtClean="0"/>
-              <a:t>that can be used and modified to solve real business problems.</a:t>
-            </a:r>
-          </a:p>
-          <a:p>
-            <a:pPr marL="0" marR="0" indent="0" algn="l" defTabSz="914363" rtl="0" eaLnBrk="1" fontAlgn="auto" latinLnBrk="0" hangingPunct="1">
-              <a:lnSpc>
-                <a:spcPct val="90000"/>
-              </a:lnSpc>
-              <a:spcBef>
-                <a:spcPts val="0"/>
-              </a:spcBef>
-              <a:spcAft>
-                <a:spcPts val="333"/>
-              </a:spcAft>
-              <a:buClrTx/>
-              <a:buSzTx/>
-              <a:buFontTx/>
-              <a:buNone/>
-              <a:tabLst/>
-              <a:defRPr/>
-            </a:pPr>
-            <a:endParaRPr lang="en-US" dirty="0" smtClean="0"/>
-          </a:p>
-          <a:p>
-            <a:r>
-              <a:rPr lang="en-US" baseline="0" dirty="0" smtClean="0"/>
-              <a:t>We'll discuss the items in this architecture in more detail later in this class.</a:t>
-            </a:r>
-          </a:p>
-          <a:p>
-            <a:endParaRPr lang="en-US" baseline="0" dirty="0" smtClean="0"/>
-          </a:p>
-        </p:txBody>
-      </p:sp>
-    </p:spTree>
-    <p:extLst>
-      <p:ext uri="{BB962C8B-B14F-4D97-AF65-F5344CB8AC3E}">
-        <p14:creationId xmlns:p14="http://schemas.microsoft.com/office/powerpoint/2010/main" val="1754358083"/>
       </p:ext>
     </p:extLst>
   </p:cSld>
@@ -1856,7 +1541,7 @@
               <a:pPr>
                 <a:defRPr/>
               </a:pPr>
-              <a:t>5</a:t>
+              <a:t>6</a:t>
             </a:fld>
             <a:endParaRPr lang="en-US" dirty="0"/>
           </a:p>
@@ -2078,7 +1763,7 @@
               <a:pPr>
                 <a:defRPr/>
               </a:pPr>
-              <a:t>6</a:t>
+              <a:t>7</a:t>
             </a:fld>
             <a:endParaRPr lang="en-US" dirty="0"/>
           </a:p>
@@ -2212,7 +1897,7 @@
               <a:pPr>
                 <a:defRPr/>
               </a:pPr>
-              <a:t>7</a:t>
+              <a:t>8</a:t>
             </a:fld>
             <a:endParaRPr lang="en-US" dirty="0"/>
           </a:p>
@@ -2314,92 +1999,68 @@
             <p:ph type="body" idx="1"/>
           </p:nvPr>
         </p:nvSpPr>
-        <p:spPr/>
+        <p:spPr>
+          <a:xfrm>
+            <a:off x="685800" y="4343400"/>
+            <a:ext cx="5486400" cy="4114800"/>
+          </a:xfrm>
+          <a:prstGeom prst="rect">
+            <a:avLst/>
+          </a:prstGeom>
+        </p:spPr>
         <p:txBody>
           <a:bodyPr/>
           <a:lstStyle/>
           <a:p>
-            <a:endParaRPr lang="en-US" dirty="0"/>
-          </a:p>
-        </p:txBody>
-      </p:sp>
-      <p:sp>
-        <p:nvSpPr>
-          <p:cNvPr id="4" name="Slide Number Placeholder 3"/>
-          <p:cNvSpPr>
-            <a:spLocks noGrp="1"/>
-          </p:cNvSpPr>
-          <p:nvPr>
-            <p:ph type="sldNum" sz="quarter" idx="10"/>
-          </p:nvPr>
-        </p:nvSpPr>
-        <p:spPr/>
-        <p:txBody>
-          <a:bodyPr/>
-          <a:lstStyle/>
-          <a:p>
-            <a:pPr>
+            <a:pPr marL="0" marR="0" lvl="2" indent="0" algn="l" defTabSz="914363" rtl="0" eaLnBrk="1" fontAlgn="auto" latinLnBrk="0" hangingPunct="1">
+              <a:lnSpc>
+                <a:spcPct val="90000"/>
+              </a:lnSpc>
+              <a:spcBef>
+                <a:spcPts val="0"/>
+              </a:spcBef>
+              <a:spcAft>
+                <a:spcPts val="333"/>
+              </a:spcAft>
+              <a:buClrTx/>
+              <a:buSzTx/>
+              <a:buFontTx/>
+              <a:buNone/>
+              <a:tabLst/>
               <a:defRPr/>
             </a:pPr>
-            <a:fld id="{DC3734AA-3150-D947-AC52-2F5DF48BFCD5}" type="slidenum">
-              <a:rPr lang="en-US" smtClean="0"/>
-              <a:pPr>
-                <a:defRPr/>
-              </a:pPr>
-              <a:t>8</a:t>
-            </a:fld>
+            <a:r>
+              <a:rPr lang="en-US" dirty="0" smtClean="0"/>
+              <a:t>These are basic AWS AMIs</a:t>
+            </a:r>
+            <a:r>
+              <a:rPr lang="en-US" baseline="0" dirty="0" smtClean="0"/>
+              <a:t> that we use for Chef training. They have </a:t>
+            </a:r>
+            <a:r>
+              <a:rPr lang="en-US" baseline="0" dirty="0" smtClean="0"/>
+              <a:t>ChefDK </a:t>
+            </a:r>
+            <a:r>
+              <a:rPr lang="en-US" baseline="0" dirty="0" smtClean="0"/>
+              <a:t>installed on them but you will not be using any of </a:t>
+            </a:r>
+            <a:r>
+              <a:rPr lang="en-US" baseline="0" smtClean="0"/>
+              <a:t>the ChefDK </a:t>
+            </a:r>
+            <a:r>
+              <a:rPr lang="en-US" baseline="0" dirty="0" smtClean="0"/>
+              <a:t>tools on those nodes until near the end of this class when you will write one remediation recipe.</a:t>
+            </a:r>
             <a:endParaRPr lang="en-US" dirty="0"/>
-          </a:p>
-        </p:txBody>
-      </p:sp>
-      <p:sp>
-        <p:nvSpPr>
-          <p:cNvPr id="5" name="Header Placeholder 4"/>
-          <p:cNvSpPr>
-            <a:spLocks noGrp="1"/>
-          </p:cNvSpPr>
-          <p:nvPr>
-            <p:ph type="hdr" sz="quarter" idx="11"/>
-          </p:nvPr>
-        </p:nvSpPr>
-        <p:spPr/>
-        <p:txBody>
-          <a:bodyPr/>
-          <a:lstStyle/>
-          <a:p>
-            <a:pPr>
-              <a:defRPr/>
-            </a:pPr>
-            <a:endParaRPr lang="en-US"/>
-          </a:p>
-        </p:txBody>
-      </p:sp>
-      <p:sp>
-        <p:nvSpPr>
-          <p:cNvPr id="6" name="Footer Placeholder 5"/>
-          <p:cNvSpPr>
-            <a:spLocks noGrp="1"/>
-          </p:cNvSpPr>
-          <p:nvPr>
-            <p:ph type="ftr" sz="quarter" idx="12"/>
-          </p:nvPr>
-        </p:nvSpPr>
-        <p:spPr/>
-        <p:txBody>
-          <a:bodyPr/>
-          <a:lstStyle/>
-          <a:p>
-            <a:pPr>
-              <a:defRPr/>
-            </a:pPr>
-            <a:endParaRPr lang="en-US"/>
           </a:p>
         </p:txBody>
       </p:sp>
     </p:spTree>
     <p:extLst>
       <p:ext uri="{BB962C8B-B14F-4D97-AF65-F5344CB8AC3E}">
-        <p14:creationId xmlns:p14="http://schemas.microsoft.com/office/powerpoint/2010/main" val="2740720288"/>
+        <p14:creationId xmlns:p14="http://schemas.microsoft.com/office/powerpoint/2010/main" val="1003907073"/>
       </p:ext>
     </p:extLst>
   </p:cSld>
@@ -2598,7 +2259,7 @@
               <a:pPr>
                 <a:defRPr/>
               </a:pPr>
-              <a:t>10</a:t>
+              <a:t>11</a:t>
             </a:fld>
             <a:endParaRPr lang="en-US" dirty="0"/>
           </a:p>
@@ -3226,14 +2887,14 @@
           </a:ln>
           <a:extLst>
             <a:ext uri="{909E8E84-426E-40dd-AFC4-6F175D3DCCD1}">
-              <a14:hiddenFill xmlns="" xmlns:a14="http://schemas.microsoft.com/office/drawing/2010/main">
+              <a14:hiddenFill xmlns:a14="http://schemas.microsoft.com/office/drawing/2010/main" xmlns="">
                 <a:solidFill>
                   <a:srgbClr val="FFFFFF"/>
                 </a:solidFill>
               </a14:hiddenFill>
             </a:ext>
             <a:ext uri="{91240B29-F687-4f45-9708-019B960494DF}">
-              <a14:hiddenLine xmlns="" xmlns:a14="http://schemas.microsoft.com/office/drawing/2010/main" w="9525">
+              <a14:hiddenLine xmlns:a14="http://schemas.microsoft.com/office/drawing/2010/main" xmlns="" w="9525">
                 <a:solidFill>
                   <a:srgbClr val="000000"/>
                 </a:solidFill>
@@ -3381,14 +3042,14 @@
           </a:ln>
           <a:extLst>
             <a:ext uri="{909E8E84-426E-40dd-AFC4-6F175D3DCCD1}">
-              <a14:hiddenFill xmlns="" xmlns:a14="http://schemas.microsoft.com/office/drawing/2010/main">
+              <a14:hiddenFill xmlns:a14="http://schemas.microsoft.com/office/drawing/2010/main" xmlns="">
                 <a:solidFill>
                   <a:srgbClr val="FFFFFF"/>
                 </a:solidFill>
               </a14:hiddenFill>
             </a:ext>
             <a:ext uri="{91240B29-F687-4f45-9708-019B960494DF}">
-              <a14:hiddenLine xmlns="" xmlns:a14="http://schemas.microsoft.com/office/drawing/2010/main" w="9525">
+              <a14:hiddenLine xmlns:a14="http://schemas.microsoft.com/office/drawing/2010/main" xmlns="" w="9525">
                 <a:solidFill>
                   <a:srgbClr val="000000"/>
                 </a:solidFill>
@@ -3879,14 +3540,14 @@
           </a:ln>
           <a:extLst>
             <a:ext uri="{909E8E84-426E-40dd-AFC4-6F175D3DCCD1}">
-              <a14:hiddenFill xmlns="" xmlns:a14="http://schemas.microsoft.com/office/drawing/2010/main">
+              <a14:hiddenFill xmlns:a14="http://schemas.microsoft.com/office/drawing/2010/main" xmlns="">
                 <a:solidFill>
                   <a:srgbClr val="FFFFFF"/>
                 </a:solidFill>
               </a14:hiddenFill>
             </a:ext>
             <a:ext uri="{91240B29-F687-4f45-9708-019B960494DF}">
-              <a14:hiddenLine xmlns="" xmlns:a14="http://schemas.microsoft.com/office/drawing/2010/main" w="9525">
+              <a14:hiddenLine xmlns:a14="http://schemas.microsoft.com/office/drawing/2010/main" xmlns="" w="9525">
                 <a:solidFill>
                   <a:srgbClr val="000000"/>
                 </a:solidFill>
@@ -4209,7 +3870,7 @@
         <a:gradFill>
           <a:gsLst>
             <a:gs pos="0">
-              <a:schemeClr val="bg1"/>
+              <a:srgbClr val="F0F0F0"/>
             </a:gs>
             <a:gs pos="100000">
               <a:schemeClr val="bg2"/>
@@ -4269,30 +3930,6 @@
           </a:fontRef>
         </p:style>
       </p:cxnSp>
-      <p:pic>
-        <p:nvPicPr>
-          <p:cNvPr id="8" name="Picture 7"/>
-          <p:cNvPicPr>
-            <a:picLocks noChangeAspect="1"/>
-          </p:cNvPicPr>
-          <p:nvPr userDrawn="1"/>
-        </p:nvPicPr>
-        <p:blipFill>
-          <a:blip r:embed="rId2"/>
-          <a:stretch>
-            <a:fillRect/>
-          </a:stretch>
-        </p:blipFill>
-        <p:spPr>
-          <a:xfrm>
-            <a:off x="15153684" y="322703"/>
-            <a:ext cx="782233" cy="793251"/>
-          </a:xfrm>
-          <a:prstGeom prst="rect">
-            <a:avLst/>
-          </a:prstGeom>
-        </p:spPr>
-      </p:pic>
       <p:sp>
         <p:nvSpPr>
           <p:cNvPr id="13" name="Title 12"/>
@@ -4802,8 +4439,9 @@
             <a:ext cx="14423693" cy="5849089"/>
           </a:xfrm>
           <a:solidFill>
-            <a:schemeClr val="accent4">
-              <a:lumMod val="50000"/>
+            <a:schemeClr val="tx2">
+              <a:lumMod val="95000"/>
+              <a:lumOff val="5000"/>
             </a:schemeClr>
           </a:solidFill>
           <a:ln w="12700">
@@ -4959,9 +4597,7 @@
             <a:ext cx="14422528" cy="729785"/>
           </a:xfrm>
           <a:solidFill>
-            <a:schemeClr val="accent4">
-              <a:lumMod val="50000"/>
-            </a:schemeClr>
+            <a:schemeClr val="tx2"/>
           </a:solidFill>
         </p:spPr>
         <p:txBody>
@@ -5067,7 +4703,7 @@
           <p:nvPr userDrawn="1"/>
         </p:nvPicPr>
         <p:blipFill>
-          <a:blip r:embed="rId3"/>
+          <a:blip r:embed="rId2"/>
           <a:stretch>
             <a:fillRect/>
           </a:stretch>
@@ -6785,14 +6421,14 @@
           </a:ln>
           <a:extLst>
             <a:ext uri="{909E8E84-426E-40dd-AFC4-6F175D3DCCD1}">
-              <a14:hiddenFill xmlns="" xmlns:a14="http://schemas.microsoft.com/office/drawing/2010/main">
+              <a14:hiddenFill xmlns:a14="http://schemas.microsoft.com/office/drawing/2010/main" xmlns="">
                 <a:solidFill>
                   <a:srgbClr val="FFFFFF"/>
                 </a:solidFill>
               </a14:hiddenFill>
             </a:ext>
             <a:ext uri="{91240B29-F687-4f45-9708-019B960494DF}">
-              <a14:hiddenLine xmlns="" xmlns:a14="http://schemas.microsoft.com/office/drawing/2010/main" w="9525">
+              <a14:hiddenLine xmlns:a14="http://schemas.microsoft.com/office/drawing/2010/main" xmlns="" w="9525">
                 <a:solidFill>
                   <a:srgbClr val="000000"/>
                 </a:solidFill>
@@ -8149,14 +7785,14 @@
           </a:ln>
           <a:extLst>
             <a:ext uri="{909E8E84-426E-40dd-AFC4-6F175D3DCCD1}">
-              <a14:hiddenFill xmlns="" xmlns:a14="http://schemas.microsoft.com/office/drawing/2010/main">
+              <a14:hiddenFill xmlns:a14="http://schemas.microsoft.com/office/drawing/2010/main" xmlns="">
                 <a:solidFill>
                   <a:srgbClr val="FFFFFF"/>
                 </a:solidFill>
               </a14:hiddenFill>
             </a:ext>
             <a:ext uri="{91240B29-F687-4f45-9708-019B960494DF}">
-              <a14:hiddenLine xmlns="" xmlns:a14="http://schemas.microsoft.com/office/drawing/2010/main" w="9525">
+              <a14:hiddenLine xmlns:a14="http://schemas.microsoft.com/office/drawing/2010/main" xmlns="" w="9525">
                 <a:solidFill>
                   <a:srgbClr val="000000"/>
                 </a:solidFill>
@@ -8714,14 +8350,14 @@
           </a:ln>
           <a:extLst>
             <a:ext uri="{909E8E84-426E-40dd-AFC4-6F175D3DCCD1}">
-              <a14:hiddenFill xmlns="" xmlns:a14="http://schemas.microsoft.com/office/drawing/2010/main">
+              <a14:hiddenFill xmlns:a14="http://schemas.microsoft.com/office/drawing/2010/main" xmlns="">
                 <a:solidFill>
                   <a:srgbClr val="FFFFFF"/>
                 </a:solidFill>
               </a14:hiddenFill>
             </a:ext>
             <a:ext uri="{91240B29-F687-4f45-9708-019B960494DF}">
-              <a14:hiddenLine xmlns="" xmlns:a14="http://schemas.microsoft.com/office/drawing/2010/main" w="9525">
+              <a14:hiddenLine xmlns:a14="http://schemas.microsoft.com/office/drawing/2010/main" xmlns="" w="9525">
                 <a:solidFill>
                   <a:srgbClr val="000000"/>
                 </a:solidFill>
@@ -9288,14 +8924,14 @@
           </a:ln>
           <a:extLst>
             <a:ext uri="{909E8E84-426E-40dd-AFC4-6F175D3DCCD1}">
-              <a14:hiddenFill xmlns="" xmlns:a14="http://schemas.microsoft.com/office/drawing/2010/main">
+              <a14:hiddenFill xmlns:a14="http://schemas.microsoft.com/office/drawing/2010/main" xmlns="">
                 <a:solidFill>
                   <a:srgbClr val="FFFFFF"/>
                 </a:solidFill>
               </a14:hiddenFill>
             </a:ext>
             <a:ext uri="{91240B29-F687-4f45-9708-019B960494DF}">
-              <a14:hiddenLine xmlns="" xmlns:a14="http://schemas.microsoft.com/office/drawing/2010/main" w="9525">
+              <a14:hiddenLine xmlns:a14="http://schemas.microsoft.com/office/drawing/2010/main" xmlns="" w="9525">
                 <a:solidFill>
                   <a:srgbClr val="000000"/>
                 </a:solidFill>
@@ -10235,14 +9871,14 @@
           </a:ln>
           <a:extLst>
             <a:ext uri="{909E8E84-426E-40dd-AFC4-6F175D3DCCD1}">
-              <a14:hiddenFill xmlns="" xmlns:a14="http://schemas.microsoft.com/office/drawing/2010/main">
+              <a14:hiddenFill xmlns:a14="http://schemas.microsoft.com/office/drawing/2010/main" xmlns="">
                 <a:solidFill>
                   <a:srgbClr val="FFFFFF"/>
                 </a:solidFill>
               </a14:hiddenFill>
             </a:ext>
             <a:ext uri="{91240B29-F687-4f45-9708-019B960494DF}">
-              <a14:hiddenLine xmlns="" xmlns:a14="http://schemas.microsoft.com/office/drawing/2010/main" w="9525">
+              <a14:hiddenLine xmlns:a14="http://schemas.microsoft.com/office/drawing/2010/main" xmlns="" w="9525">
                 <a:solidFill>
                   <a:srgbClr val="000000"/>
                 </a:solidFill>
@@ -10996,14 +10632,14 @@
           </a:ln>
           <a:extLst>
             <a:ext uri="{909E8E84-426E-40dd-AFC4-6F175D3DCCD1}">
-              <a14:hiddenFill xmlns="" xmlns:a14="http://schemas.microsoft.com/office/drawing/2010/main">
+              <a14:hiddenFill xmlns:a14="http://schemas.microsoft.com/office/drawing/2010/main" xmlns="">
                 <a:solidFill>
                   <a:srgbClr val="FFFFFF"/>
                 </a:solidFill>
               </a14:hiddenFill>
             </a:ext>
             <a:ext uri="{91240B29-F687-4f45-9708-019B960494DF}">
-              <a14:hiddenLine xmlns="" xmlns:a14="http://schemas.microsoft.com/office/drawing/2010/main" w="9525">
+              <a14:hiddenLine xmlns:a14="http://schemas.microsoft.com/office/drawing/2010/main" xmlns="" w="9525">
                 <a:solidFill>
                   <a:srgbClr val="000000"/>
                 </a:solidFill>
@@ -11860,6 +11496,125 @@
             <p:ph type="title"/>
           </p:nvPr>
         </p:nvSpPr>
+        <p:spPr/>
+        <p:txBody>
+          <a:bodyPr/>
+          <a:lstStyle/>
+          <a:p>
+            <a:r>
+              <a:rPr lang="en-US" smtClean="0"/>
+              <a:t>SSH Into the Remote Workstation</a:t>
+            </a:r>
+            <a:endParaRPr lang="en-US" dirty="0"/>
+          </a:p>
+        </p:txBody>
+      </p:sp>
+      <p:sp>
+        <p:nvSpPr>
+          <p:cNvPr id="11" name="Content Placeholder 10"/>
+          <p:cNvSpPr>
+            <a:spLocks noGrp="1"/>
+          </p:cNvSpPr>
+          <p:nvPr>
+            <p:ph sz="quarter" idx="10"/>
+          </p:nvPr>
+        </p:nvSpPr>
+        <p:spPr>
+          <a:xfrm>
+            <a:off x="1121104" y="2315962"/>
+            <a:ext cx="14423693" cy="4806733"/>
+          </a:xfrm>
+        </p:spPr>
+        <p:txBody>
+          <a:bodyPr/>
+          <a:lstStyle/>
+          <a:p>
+            <a:endParaRPr lang="en-US" dirty="0"/>
+          </a:p>
+        </p:txBody>
+      </p:sp>
+      <p:sp>
+        <p:nvSpPr>
+          <p:cNvPr id="4" name="Text Placeholder 3"/>
+          <p:cNvSpPr>
+            <a:spLocks noGrp="1"/>
+          </p:cNvSpPr>
+          <p:nvPr>
+            <p:ph type="body" sz="quarter" idx="11"/>
+          </p:nvPr>
+        </p:nvSpPr>
+        <p:spPr/>
+        <p:txBody>
+          <a:bodyPr/>
+          <a:lstStyle/>
+          <a:p>
+            <a:r>
+              <a:rPr lang="en-US" smtClean="0"/>
+              <a:t>$ ssh ADDRESS -l chef</a:t>
+            </a:r>
+            <a:endParaRPr lang="en-US" dirty="0"/>
+          </a:p>
+        </p:txBody>
+      </p:sp>
+    </p:spTree>
+    <p:extLst>
+      <p:ext uri="{BB962C8B-B14F-4D97-AF65-F5344CB8AC3E}">
+        <p14:creationId xmlns:p14="http://schemas.microsoft.com/office/powerpoint/2010/main" val="4067554310"/>
+      </p:ext>
+    </p:extLst>
+  </p:cSld>
+  <p:clrMapOvr>
+    <a:masterClrMapping/>
+  </p:clrMapOvr>
+  <mc:AlternateContent xmlns:mc="http://schemas.openxmlformats.org/markup-compatibility/2006" xmlns:p14="http://schemas.microsoft.com/office/powerpoint/2010/main">
+    <mc:Choice Requires="p14">
+      <p:transition spd="med" p14:dur="700">
+        <p:fade/>
+      </p:transition>
+    </mc:Choice>
+    <mc:Fallback xmlns="">
+      <p:transition spd="med">
+        <p:fade/>
+      </p:transition>
+    </mc:Fallback>
+  </mc:AlternateContent>
+  <p:timing>
+    <p:tnLst>
+      <p:par>
+        <p:cTn id="1" dur="indefinite" restart="never" nodeType="tmRoot"/>
+      </p:par>
+    </p:tnLst>
+  </p:timing>
+</p:sld>
+</file>
+
+<file path=ppt/slides/slide11.xml><?xml version="1.0" encoding="utf-8"?>
+<p:sld xmlns:a="http://schemas.openxmlformats.org/drawingml/2006/main" xmlns:r="http://schemas.openxmlformats.org/officeDocument/2006/relationships" xmlns:p="http://schemas.openxmlformats.org/presentationml/2006/main">
+  <p:cSld>
+    <p:spTree>
+      <p:nvGrpSpPr>
+        <p:cNvPr id="1" name=""/>
+        <p:cNvGrpSpPr/>
+        <p:nvPr/>
+      </p:nvGrpSpPr>
+      <p:grpSpPr>
+        <a:xfrm>
+          <a:off x="0" y="0"/>
+          <a:ext cx="0" cy="0"/>
+          <a:chOff x="0" y="0"/>
+          <a:chExt cx="0" cy="0"/>
+        </a:xfrm>
+      </p:grpSpPr>
+      <p:sp>
+        <p:nvSpPr>
+          <p:cNvPr id="2" name="Title 1"/>
+          <p:cNvSpPr>
+            <a:spLocks noGrp="1"/>
+          </p:cNvSpPr>
+          <p:nvPr>
+            <p:ph type="title"/>
+          </p:nvPr>
+        </p:nvSpPr>
         <p:spPr>
           <a:xfrm>
             <a:off x="609599" y="304800"/>
@@ -12089,758 +11844,6 @@
 </p:sld>
 </file>
 
-<file path=ppt/slides/slide11.xml><?xml version="1.0" encoding="utf-8"?>
-<p:sld xmlns:a="http://schemas.openxmlformats.org/drawingml/2006/main" xmlns:r="http://schemas.openxmlformats.org/officeDocument/2006/relationships" xmlns:p="http://schemas.openxmlformats.org/presentationml/2006/main">
-  <p:cSld>
-    <p:spTree>
-      <p:nvGrpSpPr>
-        <p:cNvPr id="1" name=""/>
-        <p:cNvGrpSpPr/>
-        <p:nvPr/>
-      </p:nvGrpSpPr>
-      <p:grpSpPr>
-        <a:xfrm>
-          <a:off x="0" y="0"/>
-          <a:ext cx="0" cy="0"/>
-          <a:chOff x="0" y="0"/>
-          <a:chExt cx="0" cy="0"/>
-        </a:xfrm>
-      </p:grpSpPr>
-      <p:sp>
-        <p:nvSpPr>
-          <p:cNvPr id="2" name="Title 1"/>
-          <p:cNvSpPr>
-            <a:spLocks noGrp="1"/>
-          </p:cNvSpPr>
-          <p:nvPr>
-            <p:ph type="title"/>
-          </p:nvPr>
-        </p:nvSpPr>
-        <p:spPr/>
-        <p:txBody>
-          <a:bodyPr/>
-          <a:lstStyle/>
-          <a:p>
-            <a:r>
-              <a:rPr lang="en-US" dirty="0" smtClean="0"/>
-              <a:t>Boilerplate</a:t>
-            </a:r>
-            <a:endParaRPr lang="en-US" dirty="0"/>
-          </a:p>
-        </p:txBody>
-      </p:sp>
-      <p:sp>
-        <p:nvSpPr>
-          <p:cNvPr id="4" name="Slide Number Placeholder 3"/>
-          <p:cNvSpPr>
-            <a:spLocks noGrp="1"/>
-          </p:cNvSpPr>
-          <p:nvPr>
-            <p:ph type="sldNum" sz="quarter" idx="4294967295"/>
-          </p:nvPr>
-        </p:nvSpPr>
-        <p:spPr>
-          <a:xfrm>
-            <a:off x="6299200" y="8579662"/>
-            <a:ext cx="3657600" cy="486833"/>
-          </a:xfrm>
-          <a:prstGeom prst="rect">
-            <a:avLst/>
-          </a:prstGeom>
-        </p:spPr>
-        <p:txBody>
-          <a:bodyPr/>
-          <a:lstStyle/>
-          <a:p>
-            <a:fld id="{D3C6E21F-9381-4880-84FB-1E73165A9E9D}" type="slidenum">
-              <a:rPr lang="en-US" smtClean="0"/>
-              <a:pPr/>
-              <a:t>11</a:t>
-            </a:fld>
-            <a:endParaRPr lang="en-US" dirty="0"/>
-          </a:p>
-        </p:txBody>
-      </p:sp>
-      <p:sp>
-        <p:nvSpPr>
-          <p:cNvPr id="17" name="Text Placeholder 4"/>
-          <p:cNvSpPr>
-            <a:spLocks noGrp="1"/>
-          </p:cNvSpPr>
-          <p:nvPr>
-            <p:ph type="body" sz="quarter" idx="12"/>
-          </p:nvPr>
-        </p:nvSpPr>
-        <p:spPr/>
-        <p:txBody>
-          <a:bodyPr/>
-          <a:lstStyle>
-            <a:lvl1pPr>
-              <a:defRPr baseline="0">
-                <a:solidFill>
-                  <a:schemeClr val="accent3">
-                    <a:lumMod val="50000"/>
-                  </a:schemeClr>
-                </a:solidFill>
-              </a:defRPr>
-            </a:lvl1pPr>
-            <a:lvl2pPr>
-              <a:defRPr baseline="0">
-                <a:solidFill>
-                  <a:schemeClr val="accent3">
-                    <a:lumMod val="50000"/>
-                  </a:schemeClr>
-                </a:solidFill>
-              </a:defRPr>
-            </a:lvl2pPr>
-            <a:lvl3pPr>
-              <a:defRPr baseline="0">
-                <a:solidFill>
-                  <a:schemeClr val="accent3">
-                    <a:lumMod val="50000"/>
-                  </a:schemeClr>
-                </a:solidFill>
-              </a:defRPr>
-            </a:lvl3pPr>
-            <a:lvl4pPr>
-              <a:defRPr baseline="0">
-                <a:solidFill>
-                  <a:schemeClr val="accent3">
-                    <a:lumMod val="50000"/>
-                  </a:schemeClr>
-                </a:solidFill>
-              </a:defRPr>
-            </a:lvl4pPr>
-            <a:lvl5pPr>
-              <a:defRPr baseline="0">
-                <a:solidFill>
-                  <a:schemeClr val="accent3">
-                    <a:lumMod val="50000"/>
-                  </a:schemeClr>
-                </a:solidFill>
-              </a:defRPr>
-            </a:lvl5pPr>
-          </a:lstStyle>
-          <a:p>
-            <a:pPr lvl="1">
-              <a:lnSpc>
-                <a:spcPct val="150000"/>
-              </a:lnSpc>
-            </a:pPr>
-            <a:r>
-              <a:rPr lang="en-US" dirty="0" smtClean="0"/>
-              <a:t>Architecture 1</a:t>
-            </a:r>
-          </a:p>
-          <a:p>
-            <a:pPr lvl="1">
-              <a:lnSpc>
-                <a:spcPct val="150000"/>
-              </a:lnSpc>
-            </a:pPr>
-            <a:endParaRPr lang="en-US" dirty="0"/>
-          </a:p>
-          <a:p>
-            <a:pPr lvl="1">
-              <a:lnSpc>
-                <a:spcPct val="150000"/>
-              </a:lnSpc>
-            </a:pPr>
-            <a:endParaRPr lang="en-US" dirty="0"/>
-          </a:p>
-        </p:txBody>
-      </p:sp>
-      <p:sp>
-        <p:nvSpPr>
-          <p:cNvPr id="22" name="Footer Placeholder 21"/>
-          <p:cNvSpPr>
-            <a:spLocks noGrp="1"/>
-          </p:cNvSpPr>
-          <p:nvPr>
-            <p:ph type="ftr" sz="quarter" idx="4294967295"/>
-          </p:nvPr>
-        </p:nvSpPr>
-        <p:spPr>
-          <a:xfrm>
-            <a:off x="324400" y="8579607"/>
-            <a:ext cx="5681953" cy="507556"/>
-          </a:xfrm>
-          <a:prstGeom prst="rect">
-            <a:avLst/>
-          </a:prstGeom>
-        </p:spPr>
-        <p:txBody>
-          <a:bodyPr/>
-          <a:lstStyle/>
-          <a:p>
-            <a:pPr algn="l"/>
-            <a:r>
-              <a:rPr lang="en-US" dirty="0" smtClean="0">
-                <a:solidFill>
-                  <a:srgbClr val="7D868C"/>
-                </a:solidFill>
-              </a:rPr>
-              <a:t>©2016 Chef Software Inc</a:t>
-            </a:r>
-            <a:r>
-              <a:rPr lang="en-US" dirty="0" smtClean="0"/>
-              <a:t>.</a:t>
-            </a:r>
-            <a:endParaRPr lang="en-US" dirty="0"/>
-          </a:p>
-        </p:txBody>
-      </p:sp>
-      <p:cxnSp>
-        <p:nvCxnSpPr>
-          <p:cNvPr id="9" name="Straight Arrow Connector 8"/>
-          <p:cNvCxnSpPr/>
-          <p:nvPr/>
-        </p:nvCxnSpPr>
-        <p:spPr>
-          <a:xfrm flipH="1">
-            <a:off x="7559041" y="3979727"/>
-            <a:ext cx="1486329" cy="1688484"/>
-          </a:xfrm>
-          <a:prstGeom prst="straightConnector1">
-            <a:avLst/>
-          </a:prstGeom>
-          <a:ln>
-            <a:solidFill>
-              <a:schemeClr val="accent1"/>
-            </a:solidFill>
-            <a:headEnd type="triangle"/>
-            <a:tailEnd type="triangle"/>
-          </a:ln>
-        </p:spPr>
-        <p:style>
-          <a:lnRef idx="3">
-            <a:schemeClr val="accent1"/>
-          </a:lnRef>
-          <a:fillRef idx="0">
-            <a:schemeClr val="accent1"/>
-          </a:fillRef>
-          <a:effectRef idx="2">
-            <a:schemeClr val="accent1"/>
-          </a:effectRef>
-          <a:fontRef idx="minor">
-            <a:schemeClr val="tx1"/>
-          </a:fontRef>
-        </p:style>
-      </p:cxnSp>
-      <p:sp>
-        <p:nvSpPr>
-          <p:cNvPr id="11" name="Text Placeholder 2"/>
-          <p:cNvSpPr txBox="1">
-            <a:spLocks/>
-          </p:cNvSpPr>
-          <p:nvPr/>
-        </p:nvSpPr>
-        <p:spPr bwMode="white">
-          <a:xfrm>
-            <a:off x="4962358" y="7410036"/>
-            <a:ext cx="3678991" cy="685571"/>
-          </a:xfrm>
-          <a:prstGeom prst="rect">
-            <a:avLst/>
-          </a:prstGeom>
-        </p:spPr>
-        <p:txBody>
-          <a:bodyPr vert="horz" wrap="square" lIns="0" tIns="0" rIns="0" bIns="0" rtlCol="0">
-            <a:normAutofit/>
-          </a:bodyPr>
-          <a:lstStyle>
-            <a:lvl1pPr marL="0" indent="0" algn="l" defTabSz="914363" rtl="0" eaLnBrk="1" latinLnBrk="0" hangingPunct="1">
-              <a:lnSpc>
-                <a:spcPct val="100000"/>
-              </a:lnSpc>
-              <a:spcBef>
-                <a:spcPts val="600"/>
-              </a:spcBef>
-              <a:buSzPct val="90000"/>
-              <a:buFont typeface="Arial" pitchFamily="34" charset="0"/>
-              <a:buNone/>
-              <a:defRPr sz="3200" kern="1200" baseline="0">
-                <a:solidFill>
-                  <a:schemeClr val="accent3">
-                    <a:lumMod val="50000"/>
-                  </a:schemeClr>
-                </a:solidFill>
-                <a:latin typeface="+mn-lt"/>
-                <a:ea typeface="+mn-ea"/>
-                <a:cs typeface="+mn-cs"/>
-              </a:defRPr>
-            </a:lvl1pPr>
-            <a:lvl2pPr marL="231775" indent="0" algn="l" defTabSz="914363" rtl="0" eaLnBrk="1" latinLnBrk="0" hangingPunct="1">
-              <a:lnSpc>
-                <a:spcPct val="100000"/>
-              </a:lnSpc>
-              <a:spcBef>
-                <a:spcPts val="600"/>
-              </a:spcBef>
-              <a:buSzPct val="90000"/>
-              <a:buFont typeface="Arial" pitchFamily="34" charset="0"/>
-              <a:buNone/>
-              <a:defRPr sz="2800" kern="1200" baseline="0">
-                <a:solidFill>
-                  <a:schemeClr val="accent3">
-                    <a:lumMod val="50000"/>
-                  </a:schemeClr>
-                </a:solidFill>
-                <a:latin typeface="+mn-lt"/>
-                <a:ea typeface="+mn-ea"/>
-                <a:cs typeface="+mn-cs"/>
-              </a:defRPr>
-            </a:lvl2pPr>
-            <a:lvl3pPr marL="457200" indent="0" algn="l" defTabSz="914363" rtl="0" eaLnBrk="1" latinLnBrk="0" hangingPunct="1">
-              <a:lnSpc>
-                <a:spcPct val="100000"/>
-              </a:lnSpc>
-              <a:spcBef>
-                <a:spcPts val="600"/>
-              </a:spcBef>
-              <a:buSzPct val="90000"/>
-              <a:buFont typeface="Arial" pitchFamily="34" charset="0"/>
-              <a:buNone/>
-              <a:defRPr sz="2400" kern="1200" baseline="0">
-                <a:solidFill>
-                  <a:schemeClr val="accent3">
-                    <a:lumMod val="50000"/>
-                  </a:schemeClr>
-                </a:solidFill>
-                <a:latin typeface="+mn-lt"/>
-                <a:ea typeface="+mn-ea"/>
-                <a:cs typeface="+mn-cs"/>
-              </a:defRPr>
-            </a:lvl3pPr>
-            <a:lvl4pPr marL="630238" indent="0" algn="l" defTabSz="914363" rtl="0" eaLnBrk="1" latinLnBrk="0" hangingPunct="1">
-              <a:lnSpc>
-                <a:spcPct val="100000"/>
-              </a:lnSpc>
-              <a:spcBef>
-                <a:spcPts val="600"/>
-              </a:spcBef>
-              <a:buSzPct val="90000"/>
-              <a:buFont typeface="Arial" pitchFamily="34" charset="0"/>
-              <a:buNone/>
-              <a:defRPr sz="2000" kern="1200" baseline="0">
-                <a:solidFill>
-                  <a:schemeClr val="accent3">
-                    <a:lumMod val="50000"/>
-                  </a:schemeClr>
-                </a:solidFill>
-                <a:latin typeface="+mn-lt"/>
-                <a:ea typeface="+mn-ea"/>
-                <a:cs typeface="+mn-cs"/>
-              </a:defRPr>
-            </a:lvl4pPr>
-            <a:lvl5pPr marL="801687" indent="0" algn="l" defTabSz="914363" rtl="0" eaLnBrk="1" latinLnBrk="0" hangingPunct="1">
-              <a:lnSpc>
-                <a:spcPct val="100000"/>
-              </a:lnSpc>
-              <a:spcBef>
-                <a:spcPts val="600"/>
-              </a:spcBef>
-              <a:buSzPct val="90000"/>
-              <a:buFont typeface="Arial" pitchFamily="34" charset="0"/>
-              <a:buNone/>
-              <a:defRPr sz="1800" kern="1200" baseline="0">
-                <a:solidFill>
-                  <a:schemeClr val="accent3">
-                    <a:lumMod val="50000"/>
-                  </a:schemeClr>
-                </a:solidFill>
-                <a:latin typeface="+mn-lt"/>
-                <a:ea typeface="+mn-ea"/>
-                <a:cs typeface="+mn-cs"/>
-              </a:defRPr>
-            </a:lvl5pPr>
-            <a:lvl6pPr marL="2514499" indent="-228591" algn="l" defTabSz="914363" rtl="0" eaLnBrk="1" latinLnBrk="0" hangingPunct="1">
-              <a:spcBef>
-                <a:spcPct val="20000"/>
-              </a:spcBef>
-              <a:buFont typeface="Arial" pitchFamily="34" charset="0"/>
-              <a:buChar char="•"/>
-              <a:defRPr sz="2000" kern="1200">
-                <a:solidFill>
-                  <a:schemeClr val="tx1"/>
-                </a:solidFill>
-                <a:latin typeface="+mn-lt"/>
-                <a:ea typeface="+mn-ea"/>
-                <a:cs typeface="+mn-cs"/>
-              </a:defRPr>
-            </a:lvl6pPr>
-            <a:lvl7pPr marL="2971681" indent="-228591" algn="l" defTabSz="914363" rtl="0" eaLnBrk="1" latinLnBrk="0" hangingPunct="1">
-              <a:spcBef>
-                <a:spcPct val="20000"/>
-              </a:spcBef>
-              <a:buFont typeface="Arial" pitchFamily="34" charset="0"/>
-              <a:buChar char="•"/>
-              <a:defRPr sz="2000" kern="1200">
-                <a:solidFill>
-                  <a:schemeClr val="tx1"/>
-                </a:solidFill>
-                <a:latin typeface="+mn-lt"/>
-                <a:ea typeface="+mn-ea"/>
-                <a:cs typeface="+mn-cs"/>
-              </a:defRPr>
-            </a:lvl7pPr>
-            <a:lvl8pPr marL="3428863" indent="-228591" algn="l" defTabSz="914363" rtl="0" eaLnBrk="1" latinLnBrk="0" hangingPunct="1">
-              <a:spcBef>
-                <a:spcPct val="20000"/>
-              </a:spcBef>
-              <a:buFont typeface="Arial" pitchFamily="34" charset="0"/>
-              <a:buChar char="•"/>
-              <a:defRPr sz="2000" kern="1200">
-                <a:solidFill>
-                  <a:schemeClr val="tx1"/>
-                </a:solidFill>
-                <a:latin typeface="+mn-lt"/>
-                <a:ea typeface="+mn-ea"/>
-                <a:cs typeface="+mn-cs"/>
-              </a:defRPr>
-            </a:lvl8pPr>
-            <a:lvl9pPr marL="3886045" indent="-228591" algn="l" defTabSz="914363" rtl="0" eaLnBrk="1" latinLnBrk="0" hangingPunct="1">
-              <a:spcBef>
-                <a:spcPct val="20000"/>
-              </a:spcBef>
-              <a:buFont typeface="Arial" pitchFamily="34" charset="0"/>
-              <a:buChar char="•"/>
-              <a:defRPr sz="2000" kern="1200">
-                <a:solidFill>
-                  <a:schemeClr val="tx1"/>
-                </a:solidFill>
-                <a:latin typeface="+mn-lt"/>
-                <a:ea typeface="+mn-ea"/>
-                <a:cs typeface="+mn-cs"/>
-              </a:defRPr>
-            </a:lvl9pPr>
-          </a:lstStyle>
-          <a:p>
-            <a:pPr algn="ctr"/>
-            <a:r>
-              <a:rPr lang="en-US" sz="2667" dirty="0"/>
-              <a:t>Your Laptop</a:t>
-            </a:r>
-          </a:p>
-          <a:p>
-            <a:endParaRPr lang="en-US" sz="2667" dirty="0"/>
-          </a:p>
-          <a:p>
-            <a:endParaRPr lang="en-US" sz="4267" dirty="0"/>
-          </a:p>
-          <a:p>
-            <a:endParaRPr lang="en-US" sz="4267" dirty="0"/>
-          </a:p>
-        </p:txBody>
-      </p:sp>
-      <p:sp>
-        <p:nvSpPr>
-          <p:cNvPr id="12" name="Text Placeholder 2"/>
-          <p:cNvSpPr txBox="1">
-            <a:spLocks/>
-          </p:cNvSpPr>
-          <p:nvPr/>
-        </p:nvSpPr>
-        <p:spPr bwMode="white">
-          <a:xfrm>
-            <a:off x="9137832" y="4144980"/>
-            <a:ext cx="3593473" cy="1842629"/>
-          </a:xfrm>
-          <a:prstGeom prst="rect">
-            <a:avLst/>
-          </a:prstGeom>
-        </p:spPr>
-        <p:txBody>
-          <a:bodyPr vert="horz" wrap="square" lIns="0" tIns="0" rIns="0" bIns="0" rtlCol="0">
-            <a:normAutofit/>
-          </a:bodyPr>
-          <a:lstStyle>
-            <a:lvl1pPr marL="0" indent="0" algn="l" defTabSz="914363" rtl="0" eaLnBrk="1" latinLnBrk="0" hangingPunct="1">
-              <a:lnSpc>
-                <a:spcPct val="100000"/>
-              </a:lnSpc>
-              <a:spcBef>
-                <a:spcPts val="600"/>
-              </a:spcBef>
-              <a:buSzPct val="90000"/>
-              <a:buFont typeface="Arial" pitchFamily="34" charset="0"/>
-              <a:buNone/>
-              <a:defRPr sz="3200" kern="1200" baseline="0">
-                <a:solidFill>
-                  <a:schemeClr val="accent3">
-                    <a:lumMod val="50000"/>
-                  </a:schemeClr>
-                </a:solidFill>
-                <a:latin typeface="+mn-lt"/>
-                <a:ea typeface="+mn-ea"/>
-                <a:cs typeface="+mn-cs"/>
-              </a:defRPr>
-            </a:lvl1pPr>
-            <a:lvl2pPr marL="231775" indent="0" algn="l" defTabSz="914363" rtl="0" eaLnBrk="1" latinLnBrk="0" hangingPunct="1">
-              <a:lnSpc>
-                <a:spcPct val="100000"/>
-              </a:lnSpc>
-              <a:spcBef>
-                <a:spcPts val="600"/>
-              </a:spcBef>
-              <a:buSzPct val="90000"/>
-              <a:buFont typeface="Arial" pitchFamily="34" charset="0"/>
-              <a:buNone/>
-              <a:defRPr sz="2800" kern="1200" baseline="0">
-                <a:solidFill>
-                  <a:schemeClr val="accent3">
-                    <a:lumMod val="50000"/>
-                  </a:schemeClr>
-                </a:solidFill>
-                <a:latin typeface="+mn-lt"/>
-                <a:ea typeface="+mn-ea"/>
-                <a:cs typeface="+mn-cs"/>
-              </a:defRPr>
-            </a:lvl2pPr>
-            <a:lvl3pPr marL="457200" indent="0" algn="l" defTabSz="914363" rtl="0" eaLnBrk="1" latinLnBrk="0" hangingPunct="1">
-              <a:lnSpc>
-                <a:spcPct val="100000"/>
-              </a:lnSpc>
-              <a:spcBef>
-                <a:spcPts val="600"/>
-              </a:spcBef>
-              <a:buSzPct val="90000"/>
-              <a:buFont typeface="Arial" pitchFamily="34" charset="0"/>
-              <a:buNone/>
-              <a:defRPr sz="2400" kern="1200" baseline="0">
-                <a:solidFill>
-                  <a:schemeClr val="accent3">
-                    <a:lumMod val="50000"/>
-                  </a:schemeClr>
-                </a:solidFill>
-                <a:latin typeface="+mn-lt"/>
-                <a:ea typeface="+mn-ea"/>
-                <a:cs typeface="+mn-cs"/>
-              </a:defRPr>
-            </a:lvl3pPr>
-            <a:lvl4pPr marL="630238" indent="0" algn="l" defTabSz="914363" rtl="0" eaLnBrk="1" latinLnBrk="0" hangingPunct="1">
-              <a:lnSpc>
-                <a:spcPct val="100000"/>
-              </a:lnSpc>
-              <a:spcBef>
-                <a:spcPts val="600"/>
-              </a:spcBef>
-              <a:buSzPct val="90000"/>
-              <a:buFont typeface="Arial" pitchFamily="34" charset="0"/>
-              <a:buNone/>
-              <a:defRPr sz="2000" kern="1200" baseline="0">
-                <a:solidFill>
-                  <a:schemeClr val="accent3">
-                    <a:lumMod val="50000"/>
-                  </a:schemeClr>
-                </a:solidFill>
-                <a:latin typeface="+mn-lt"/>
-                <a:ea typeface="+mn-ea"/>
-                <a:cs typeface="+mn-cs"/>
-              </a:defRPr>
-            </a:lvl4pPr>
-            <a:lvl5pPr marL="801687" indent="0" algn="l" defTabSz="914363" rtl="0" eaLnBrk="1" latinLnBrk="0" hangingPunct="1">
-              <a:lnSpc>
-                <a:spcPct val="100000"/>
-              </a:lnSpc>
-              <a:spcBef>
-                <a:spcPts val="600"/>
-              </a:spcBef>
-              <a:buSzPct val="90000"/>
-              <a:buFont typeface="Arial" pitchFamily="34" charset="0"/>
-              <a:buNone/>
-              <a:defRPr sz="1800" kern="1200" baseline="0">
-                <a:solidFill>
-                  <a:schemeClr val="accent3">
-                    <a:lumMod val="50000"/>
-                  </a:schemeClr>
-                </a:solidFill>
-                <a:latin typeface="+mn-lt"/>
-                <a:ea typeface="+mn-ea"/>
-                <a:cs typeface="+mn-cs"/>
-              </a:defRPr>
-            </a:lvl5pPr>
-            <a:lvl6pPr marL="2514499" indent="-228591" algn="l" defTabSz="914363" rtl="0" eaLnBrk="1" latinLnBrk="0" hangingPunct="1">
-              <a:spcBef>
-                <a:spcPct val="20000"/>
-              </a:spcBef>
-              <a:buFont typeface="Arial" pitchFamily="34" charset="0"/>
-              <a:buChar char="•"/>
-              <a:defRPr sz="2000" kern="1200">
-                <a:solidFill>
-                  <a:schemeClr val="tx1"/>
-                </a:solidFill>
-                <a:latin typeface="+mn-lt"/>
-                <a:ea typeface="+mn-ea"/>
-                <a:cs typeface="+mn-cs"/>
-              </a:defRPr>
-            </a:lvl6pPr>
-            <a:lvl7pPr marL="2971681" indent="-228591" algn="l" defTabSz="914363" rtl="0" eaLnBrk="1" latinLnBrk="0" hangingPunct="1">
-              <a:spcBef>
-                <a:spcPct val="20000"/>
-              </a:spcBef>
-              <a:buFont typeface="Arial" pitchFamily="34" charset="0"/>
-              <a:buChar char="•"/>
-              <a:defRPr sz="2000" kern="1200">
-                <a:solidFill>
-                  <a:schemeClr val="tx1"/>
-                </a:solidFill>
-                <a:latin typeface="+mn-lt"/>
-                <a:ea typeface="+mn-ea"/>
-                <a:cs typeface="+mn-cs"/>
-              </a:defRPr>
-            </a:lvl7pPr>
-            <a:lvl8pPr marL="3428863" indent="-228591" algn="l" defTabSz="914363" rtl="0" eaLnBrk="1" latinLnBrk="0" hangingPunct="1">
-              <a:spcBef>
-                <a:spcPct val="20000"/>
-              </a:spcBef>
-              <a:buFont typeface="Arial" pitchFamily="34" charset="0"/>
-              <a:buChar char="•"/>
-              <a:defRPr sz="2000" kern="1200">
-                <a:solidFill>
-                  <a:schemeClr val="tx1"/>
-                </a:solidFill>
-                <a:latin typeface="+mn-lt"/>
-                <a:ea typeface="+mn-ea"/>
-                <a:cs typeface="+mn-cs"/>
-              </a:defRPr>
-            </a:lvl8pPr>
-            <a:lvl9pPr marL="3886045" indent="-228591" algn="l" defTabSz="914363" rtl="0" eaLnBrk="1" latinLnBrk="0" hangingPunct="1">
-              <a:spcBef>
-                <a:spcPct val="20000"/>
-              </a:spcBef>
-              <a:buFont typeface="Arial" pitchFamily="34" charset="0"/>
-              <a:buChar char="•"/>
-              <a:defRPr sz="2000" kern="1200">
-                <a:solidFill>
-                  <a:schemeClr val="tx1"/>
-                </a:solidFill>
-                <a:latin typeface="+mn-lt"/>
-                <a:ea typeface="+mn-ea"/>
-                <a:cs typeface="+mn-cs"/>
-              </a:defRPr>
-            </a:lvl9pPr>
-          </a:lstStyle>
-          <a:p>
-            <a:pPr algn="ctr"/>
-            <a:r>
-              <a:rPr lang="en-US" sz="2667" dirty="0"/>
-              <a:t>Virtual Workstation</a:t>
-            </a:r>
-          </a:p>
-          <a:p>
-            <a:pPr algn="ctr"/>
-            <a:r>
-              <a:rPr lang="en-US" sz="2667" dirty="0"/>
-              <a:t>Preconfigured with Chef tools</a:t>
-            </a:r>
-          </a:p>
-          <a:p>
-            <a:endParaRPr lang="en-US" sz="2667" dirty="0"/>
-          </a:p>
-          <a:p>
-            <a:endParaRPr lang="en-US" sz="2667" dirty="0"/>
-          </a:p>
-          <a:p>
-            <a:endParaRPr lang="en-US" sz="4267" dirty="0"/>
-          </a:p>
-          <a:p>
-            <a:endParaRPr lang="en-US" sz="4267" dirty="0"/>
-          </a:p>
-        </p:txBody>
-      </p:sp>
-      <p:pic>
-        <p:nvPicPr>
-          <p:cNvPr id="5" name="Picture 4"/>
-          <p:cNvPicPr>
-            <a:picLocks noChangeAspect="1"/>
-          </p:cNvPicPr>
-          <p:nvPr/>
-        </p:nvPicPr>
-        <p:blipFill>
-          <a:blip r:embed="rId3">
-            <a:extLst>
-              <a:ext uri="{28A0092B-C50C-407E-A947-70E740481C1C}">
-                <a14:useLocalDpi xmlns:a14="http://schemas.microsoft.com/office/drawing/2010/main" val="0"/>
-              </a:ext>
-            </a:extLst>
-          </a:blip>
-          <a:stretch>
-            <a:fillRect/>
-          </a:stretch>
-        </p:blipFill>
-        <p:spPr>
-          <a:xfrm>
-            <a:off x="9047831" y="2073655"/>
-            <a:ext cx="2151627" cy="2294080"/>
-          </a:xfrm>
-          <a:prstGeom prst="rect">
-            <a:avLst/>
-          </a:prstGeom>
-        </p:spPr>
-      </p:pic>
-      <p:pic>
-        <p:nvPicPr>
-          <p:cNvPr id="3" name="Picture 2"/>
-          <p:cNvPicPr>
-            <a:picLocks noChangeAspect="1"/>
-          </p:cNvPicPr>
-          <p:nvPr/>
-        </p:nvPicPr>
-        <p:blipFill>
-          <a:blip r:embed="rId4">
-            <a:extLst>
-              <a:ext uri="{28A0092B-C50C-407E-A947-70E740481C1C}">
-                <a14:useLocalDpi xmlns:a14="http://schemas.microsoft.com/office/drawing/2010/main" val="0"/>
-              </a:ext>
-            </a:extLst>
-          </a:blip>
-          <a:stretch>
-            <a:fillRect/>
-          </a:stretch>
-        </p:blipFill>
-        <p:spPr>
-          <a:xfrm>
-            <a:off x="5927990" y="5916279"/>
-            <a:ext cx="1701573" cy="1283742"/>
-          </a:xfrm>
-          <a:prstGeom prst="rect">
-            <a:avLst/>
-          </a:prstGeom>
-        </p:spPr>
-      </p:pic>
-    </p:spTree>
-    <p:extLst>
-      <p:ext uri="{BB962C8B-B14F-4D97-AF65-F5344CB8AC3E}">
-        <p14:creationId xmlns:p14="http://schemas.microsoft.com/office/powerpoint/2010/main" val="919957672"/>
-      </p:ext>
-    </p:extLst>
-  </p:cSld>
-  <p:clrMapOvr>
-    <a:masterClrMapping/>
-  </p:clrMapOvr>
-  <mc:AlternateContent xmlns:mc="http://schemas.openxmlformats.org/markup-compatibility/2006" xmlns:p14="http://schemas.microsoft.com/office/powerpoint/2010/main">
-    <mc:Choice Requires="p14">
-      <p:transition spd="med" p14:dur="700">
-        <p:fade/>
-      </p:transition>
-    </mc:Choice>
-    <mc:Fallback xmlns="">
-      <p:transition spd="med">
-        <p:fade/>
-      </p:transition>
-    </mc:Fallback>
-  </mc:AlternateContent>
-  <p:timing>
-    <p:tnLst>
-      <p:par>
-        <p:cTn id="1" dur="indefinite" restart="never" nodeType="tmRoot"/>
-      </p:par>
-    </p:tnLst>
-  </p:timing>
-</p:sld>
-</file>
-
 <file path=ppt/slides/slide12.xml><?xml version="1.0" encoding="utf-8"?>
 <p:sld xmlns:a="http://schemas.openxmlformats.org/drawingml/2006/main" xmlns:r="http://schemas.openxmlformats.org/officeDocument/2006/relationships" xmlns:p="http://schemas.openxmlformats.org/presentationml/2006/main">
   <p:cSld>
@@ -12865,1157 +11868,6 @@
             <a:spLocks noGrp="1"/>
           </p:cNvSpPr>
           <p:nvPr>
-            <p:ph type="title"/>
-          </p:nvPr>
-        </p:nvSpPr>
-        <p:spPr/>
-        <p:txBody>
-          <a:bodyPr/>
-          <a:lstStyle/>
-          <a:p>
-            <a:r>
-              <a:rPr lang="en-US" dirty="0" smtClean="0"/>
-              <a:t>Boilerplate</a:t>
-            </a:r>
-            <a:endParaRPr lang="en-US" dirty="0"/>
-          </a:p>
-        </p:txBody>
-      </p:sp>
-      <p:sp>
-        <p:nvSpPr>
-          <p:cNvPr id="4" name="Slide Number Placeholder 3"/>
-          <p:cNvSpPr>
-            <a:spLocks noGrp="1"/>
-          </p:cNvSpPr>
-          <p:nvPr>
-            <p:ph type="sldNum" sz="quarter" idx="4294967295"/>
-          </p:nvPr>
-        </p:nvSpPr>
-        <p:spPr>
-          <a:xfrm>
-            <a:off x="6299200" y="8579662"/>
-            <a:ext cx="3657600" cy="486833"/>
-          </a:xfrm>
-          <a:prstGeom prst="rect">
-            <a:avLst/>
-          </a:prstGeom>
-        </p:spPr>
-        <p:txBody>
-          <a:bodyPr/>
-          <a:lstStyle/>
-          <a:p>
-            <a:fld id="{D3C6E21F-9381-4880-84FB-1E73165A9E9D}" type="slidenum">
-              <a:rPr lang="en-US" smtClean="0"/>
-              <a:pPr/>
-              <a:t>12</a:t>
-            </a:fld>
-            <a:endParaRPr lang="en-US" dirty="0"/>
-          </a:p>
-        </p:txBody>
-      </p:sp>
-      <p:sp>
-        <p:nvSpPr>
-          <p:cNvPr id="17" name="Text Placeholder 4"/>
-          <p:cNvSpPr>
-            <a:spLocks noGrp="1"/>
-          </p:cNvSpPr>
-          <p:nvPr>
-            <p:ph type="body" sz="quarter" idx="12"/>
-          </p:nvPr>
-        </p:nvSpPr>
-        <p:spPr/>
-        <p:txBody>
-          <a:bodyPr/>
-          <a:lstStyle>
-            <a:lvl1pPr>
-              <a:defRPr baseline="0">
-                <a:solidFill>
-                  <a:schemeClr val="accent3">
-                    <a:lumMod val="50000"/>
-                  </a:schemeClr>
-                </a:solidFill>
-              </a:defRPr>
-            </a:lvl1pPr>
-            <a:lvl2pPr>
-              <a:defRPr baseline="0">
-                <a:solidFill>
-                  <a:schemeClr val="accent3">
-                    <a:lumMod val="50000"/>
-                  </a:schemeClr>
-                </a:solidFill>
-              </a:defRPr>
-            </a:lvl2pPr>
-            <a:lvl3pPr>
-              <a:defRPr baseline="0">
-                <a:solidFill>
-                  <a:schemeClr val="accent3">
-                    <a:lumMod val="50000"/>
-                  </a:schemeClr>
-                </a:solidFill>
-              </a:defRPr>
-            </a:lvl3pPr>
-            <a:lvl4pPr>
-              <a:defRPr baseline="0">
-                <a:solidFill>
-                  <a:schemeClr val="accent3">
-                    <a:lumMod val="50000"/>
-                  </a:schemeClr>
-                </a:solidFill>
-              </a:defRPr>
-            </a:lvl4pPr>
-            <a:lvl5pPr>
-              <a:defRPr baseline="0">
-                <a:solidFill>
-                  <a:schemeClr val="accent3">
-                    <a:lumMod val="50000"/>
-                  </a:schemeClr>
-                </a:solidFill>
-              </a:defRPr>
-            </a:lvl5pPr>
-          </a:lstStyle>
-          <a:p>
-            <a:pPr lvl="1">
-              <a:lnSpc>
-                <a:spcPct val="150000"/>
-              </a:lnSpc>
-            </a:pPr>
-            <a:r>
-              <a:rPr lang="en-US" dirty="0" smtClean="0"/>
-              <a:t>Architecture 2</a:t>
-            </a:r>
-          </a:p>
-          <a:p>
-            <a:pPr lvl="1">
-              <a:lnSpc>
-                <a:spcPct val="150000"/>
-              </a:lnSpc>
-            </a:pPr>
-            <a:endParaRPr lang="en-US" dirty="0"/>
-          </a:p>
-          <a:p>
-            <a:pPr lvl="1">
-              <a:lnSpc>
-                <a:spcPct val="150000"/>
-              </a:lnSpc>
-            </a:pPr>
-            <a:endParaRPr lang="en-US" dirty="0"/>
-          </a:p>
-        </p:txBody>
-      </p:sp>
-      <p:sp>
-        <p:nvSpPr>
-          <p:cNvPr id="22" name="Footer Placeholder 21"/>
-          <p:cNvSpPr>
-            <a:spLocks noGrp="1"/>
-          </p:cNvSpPr>
-          <p:nvPr>
-            <p:ph type="ftr" sz="quarter" idx="4294967295"/>
-          </p:nvPr>
-        </p:nvSpPr>
-        <p:spPr>
-          <a:xfrm>
-            <a:off x="324400" y="8579607"/>
-            <a:ext cx="5681953" cy="507556"/>
-          </a:xfrm>
-          <a:prstGeom prst="rect">
-            <a:avLst/>
-          </a:prstGeom>
-        </p:spPr>
-        <p:txBody>
-          <a:bodyPr/>
-          <a:lstStyle/>
-          <a:p>
-            <a:pPr algn="l"/>
-            <a:r>
-              <a:rPr lang="en-US" dirty="0" smtClean="0">
-                <a:solidFill>
-                  <a:srgbClr val="7D868C"/>
-                </a:solidFill>
-              </a:rPr>
-              <a:t>©2016 Chef Software Inc</a:t>
-            </a:r>
-            <a:r>
-              <a:rPr lang="en-US" dirty="0" smtClean="0"/>
-              <a:t>.</a:t>
-            </a:r>
-            <a:endParaRPr lang="en-US" dirty="0"/>
-          </a:p>
-        </p:txBody>
-      </p:sp>
-      <p:sp>
-        <p:nvSpPr>
-          <p:cNvPr id="14" name="Text Placeholder 2"/>
-          <p:cNvSpPr txBox="1">
-            <a:spLocks/>
-          </p:cNvSpPr>
-          <p:nvPr/>
-        </p:nvSpPr>
-        <p:spPr bwMode="white">
-          <a:xfrm>
-            <a:off x="9137831" y="4144981"/>
-            <a:ext cx="2198204" cy="520772"/>
-          </a:xfrm>
-          <a:prstGeom prst="rect">
-            <a:avLst/>
-          </a:prstGeom>
-        </p:spPr>
-        <p:txBody>
-          <a:bodyPr vert="horz" wrap="square" lIns="0" tIns="0" rIns="0" bIns="0" rtlCol="0">
-            <a:normAutofit/>
-          </a:bodyPr>
-          <a:lstStyle>
-            <a:lvl1pPr marL="0" indent="0" algn="l" defTabSz="914363" rtl="0" eaLnBrk="1" latinLnBrk="0" hangingPunct="1">
-              <a:lnSpc>
-                <a:spcPct val="100000"/>
-              </a:lnSpc>
-              <a:spcBef>
-                <a:spcPts val="600"/>
-              </a:spcBef>
-              <a:buSzPct val="90000"/>
-              <a:buFont typeface="Arial" pitchFamily="34" charset="0"/>
-              <a:buNone/>
-              <a:defRPr sz="3200" kern="1200" baseline="0">
-                <a:solidFill>
-                  <a:schemeClr val="accent3">
-                    <a:lumMod val="50000"/>
-                  </a:schemeClr>
-                </a:solidFill>
-                <a:latin typeface="+mn-lt"/>
-                <a:ea typeface="+mn-ea"/>
-                <a:cs typeface="+mn-cs"/>
-              </a:defRPr>
-            </a:lvl1pPr>
-            <a:lvl2pPr marL="231775" indent="0" algn="l" defTabSz="914363" rtl="0" eaLnBrk="1" latinLnBrk="0" hangingPunct="1">
-              <a:lnSpc>
-                <a:spcPct val="100000"/>
-              </a:lnSpc>
-              <a:spcBef>
-                <a:spcPts val="600"/>
-              </a:spcBef>
-              <a:buSzPct val="90000"/>
-              <a:buFont typeface="Arial" pitchFamily="34" charset="0"/>
-              <a:buNone/>
-              <a:defRPr sz="2800" kern="1200" baseline="0">
-                <a:solidFill>
-                  <a:schemeClr val="accent3">
-                    <a:lumMod val="50000"/>
-                  </a:schemeClr>
-                </a:solidFill>
-                <a:latin typeface="+mn-lt"/>
-                <a:ea typeface="+mn-ea"/>
-                <a:cs typeface="+mn-cs"/>
-              </a:defRPr>
-            </a:lvl2pPr>
-            <a:lvl3pPr marL="457200" indent="0" algn="l" defTabSz="914363" rtl="0" eaLnBrk="1" latinLnBrk="0" hangingPunct="1">
-              <a:lnSpc>
-                <a:spcPct val="100000"/>
-              </a:lnSpc>
-              <a:spcBef>
-                <a:spcPts val="600"/>
-              </a:spcBef>
-              <a:buSzPct val="90000"/>
-              <a:buFont typeface="Arial" pitchFamily="34" charset="0"/>
-              <a:buNone/>
-              <a:defRPr sz="2400" kern="1200" baseline="0">
-                <a:solidFill>
-                  <a:schemeClr val="accent3">
-                    <a:lumMod val="50000"/>
-                  </a:schemeClr>
-                </a:solidFill>
-                <a:latin typeface="+mn-lt"/>
-                <a:ea typeface="+mn-ea"/>
-                <a:cs typeface="+mn-cs"/>
-              </a:defRPr>
-            </a:lvl3pPr>
-            <a:lvl4pPr marL="630238" indent="0" algn="l" defTabSz="914363" rtl="0" eaLnBrk="1" latinLnBrk="0" hangingPunct="1">
-              <a:lnSpc>
-                <a:spcPct val="100000"/>
-              </a:lnSpc>
-              <a:spcBef>
-                <a:spcPts val="600"/>
-              </a:spcBef>
-              <a:buSzPct val="90000"/>
-              <a:buFont typeface="Arial" pitchFamily="34" charset="0"/>
-              <a:buNone/>
-              <a:defRPr sz="2000" kern="1200" baseline="0">
-                <a:solidFill>
-                  <a:schemeClr val="accent3">
-                    <a:lumMod val="50000"/>
-                  </a:schemeClr>
-                </a:solidFill>
-                <a:latin typeface="+mn-lt"/>
-                <a:ea typeface="+mn-ea"/>
-                <a:cs typeface="+mn-cs"/>
-              </a:defRPr>
-            </a:lvl4pPr>
-            <a:lvl5pPr marL="801687" indent="0" algn="l" defTabSz="914363" rtl="0" eaLnBrk="1" latinLnBrk="0" hangingPunct="1">
-              <a:lnSpc>
-                <a:spcPct val="100000"/>
-              </a:lnSpc>
-              <a:spcBef>
-                <a:spcPts val="600"/>
-              </a:spcBef>
-              <a:buSzPct val="90000"/>
-              <a:buFont typeface="Arial" pitchFamily="34" charset="0"/>
-              <a:buNone/>
-              <a:defRPr sz="1800" kern="1200" baseline="0">
-                <a:solidFill>
-                  <a:schemeClr val="accent3">
-                    <a:lumMod val="50000"/>
-                  </a:schemeClr>
-                </a:solidFill>
-                <a:latin typeface="+mn-lt"/>
-                <a:ea typeface="+mn-ea"/>
-                <a:cs typeface="+mn-cs"/>
-              </a:defRPr>
-            </a:lvl5pPr>
-            <a:lvl6pPr marL="2514499" indent="-228591" algn="l" defTabSz="914363" rtl="0" eaLnBrk="1" latinLnBrk="0" hangingPunct="1">
-              <a:spcBef>
-                <a:spcPct val="20000"/>
-              </a:spcBef>
-              <a:buFont typeface="Arial" pitchFamily="34" charset="0"/>
-              <a:buChar char="•"/>
-              <a:defRPr sz="2000" kern="1200">
-                <a:solidFill>
-                  <a:schemeClr val="tx1"/>
-                </a:solidFill>
-                <a:latin typeface="+mn-lt"/>
-                <a:ea typeface="+mn-ea"/>
-                <a:cs typeface="+mn-cs"/>
-              </a:defRPr>
-            </a:lvl6pPr>
-            <a:lvl7pPr marL="2971681" indent="-228591" algn="l" defTabSz="914363" rtl="0" eaLnBrk="1" latinLnBrk="0" hangingPunct="1">
-              <a:spcBef>
-                <a:spcPct val="20000"/>
-              </a:spcBef>
-              <a:buFont typeface="Arial" pitchFamily="34" charset="0"/>
-              <a:buChar char="•"/>
-              <a:defRPr sz="2000" kern="1200">
-                <a:solidFill>
-                  <a:schemeClr val="tx1"/>
-                </a:solidFill>
-                <a:latin typeface="+mn-lt"/>
-                <a:ea typeface="+mn-ea"/>
-                <a:cs typeface="+mn-cs"/>
-              </a:defRPr>
-            </a:lvl7pPr>
-            <a:lvl8pPr marL="3428863" indent="-228591" algn="l" defTabSz="914363" rtl="0" eaLnBrk="1" latinLnBrk="0" hangingPunct="1">
-              <a:spcBef>
-                <a:spcPct val="20000"/>
-              </a:spcBef>
-              <a:buFont typeface="Arial" pitchFamily="34" charset="0"/>
-              <a:buChar char="•"/>
-              <a:defRPr sz="2000" kern="1200">
-                <a:solidFill>
-                  <a:schemeClr val="tx1"/>
-                </a:solidFill>
-                <a:latin typeface="+mn-lt"/>
-                <a:ea typeface="+mn-ea"/>
-                <a:cs typeface="+mn-cs"/>
-              </a:defRPr>
-            </a:lvl8pPr>
-            <a:lvl9pPr marL="3886045" indent="-228591" algn="l" defTabSz="914363" rtl="0" eaLnBrk="1" latinLnBrk="0" hangingPunct="1">
-              <a:spcBef>
-                <a:spcPct val="20000"/>
-              </a:spcBef>
-              <a:buFont typeface="Arial" pitchFamily="34" charset="0"/>
-              <a:buChar char="•"/>
-              <a:defRPr sz="2000" kern="1200">
-                <a:solidFill>
-                  <a:schemeClr val="tx1"/>
-                </a:solidFill>
-                <a:latin typeface="+mn-lt"/>
-                <a:ea typeface="+mn-ea"/>
-                <a:cs typeface="+mn-cs"/>
-              </a:defRPr>
-            </a:lvl9pPr>
-          </a:lstStyle>
-          <a:p>
-            <a:pPr algn="ctr"/>
-            <a:r>
-              <a:rPr lang="en-US" sz="2667" dirty="0"/>
-              <a:t>Chef Server</a:t>
-            </a:r>
-          </a:p>
-          <a:p>
-            <a:endParaRPr lang="en-US" sz="2667" dirty="0"/>
-          </a:p>
-          <a:p>
-            <a:endParaRPr lang="en-US" sz="2667" dirty="0"/>
-          </a:p>
-          <a:p>
-            <a:endParaRPr lang="en-US" sz="4267" dirty="0"/>
-          </a:p>
-          <a:p>
-            <a:endParaRPr lang="en-US" sz="4267" dirty="0"/>
-          </a:p>
-        </p:txBody>
-      </p:sp>
-      <p:sp>
-        <p:nvSpPr>
-          <p:cNvPr id="15" name="Text Placeholder 2"/>
-          <p:cNvSpPr txBox="1">
-            <a:spLocks/>
-          </p:cNvSpPr>
-          <p:nvPr/>
-        </p:nvSpPr>
-        <p:spPr bwMode="white">
-          <a:xfrm>
-            <a:off x="5605217" y="7398210"/>
-            <a:ext cx="2198204" cy="654303"/>
-          </a:xfrm>
-          <a:prstGeom prst="rect">
-            <a:avLst/>
-          </a:prstGeom>
-        </p:spPr>
-        <p:txBody>
-          <a:bodyPr vert="horz" wrap="square" lIns="0" tIns="0" rIns="0" bIns="0" rtlCol="0">
-            <a:normAutofit fontScale="92500" lnSpcReduction="20000"/>
-          </a:bodyPr>
-          <a:lstStyle>
-            <a:lvl1pPr marL="0" indent="0" algn="l" defTabSz="914363" rtl="0" eaLnBrk="1" latinLnBrk="0" hangingPunct="1">
-              <a:lnSpc>
-                <a:spcPct val="100000"/>
-              </a:lnSpc>
-              <a:spcBef>
-                <a:spcPts val="600"/>
-              </a:spcBef>
-              <a:buSzPct val="90000"/>
-              <a:buFont typeface="Arial" pitchFamily="34" charset="0"/>
-              <a:buNone/>
-              <a:defRPr sz="3200" kern="1200" baseline="0">
-                <a:solidFill>
-                  <a:schemeClr val="accent3">
-                    <a:lumMod val="50000"/>
-                  </a:schemeClr>
-                </a:solidFill>
-                <a:latin typeface="+mn-lt"/>
-                <a:ea typeface="+mn-ea"/>
-                <a:cs typeface="+mn-cs"/>
-              </a:defRPr>
-            </a:lvl1pPr>
-            <a:lvl2pPr marL="231775" indent="0" algn="l" defTabSz="914363" rtl="0" eaLnBrk="1" latinLnBrk="0" hangingPunct="1">
-              <a:lnSpc>
-                <a:spcPct val="100000"/>
-              </a:lnSpc>
-              <a:spcBef>
-                <a:spcPts val="600"/>
-              </a:spcBef>
-              <a:buSzPct val="90000"/>
-              <a:buFont typeface="Arial" pitchFamily="34" charset="0"/>
-              <a:buNone/>
-              <a:defRPr sz="2800" kern="1200" baseline="0">
-                <a:solidFill>
-                  <a:schemeClr val="accent3">
-                    <a:lumMod val="50000"/>
-                  </a:schemeClr>
-                </a:solidFill>
-                <a:latin typeface="+mn-lt"/>
-                <a:ea typeface="+mn-ea"/>
-                <a:cs typeface="+mn-cs"/>
-              </a:defRPr>
-            </a:lvl2pPr>
-            <a:lvl3pPr marL="457200" indent="0" algn="l" defTabSz="914363" rtl="0" eaLnBrk="1" latinLnBrk="0" hangingPunct="1">
-              <a:lnSpc>
-                <a:spcPct val="100000"/>
-              </a:lnSpc>
-              <a:spcBef>
-                <a:spcPts val="600"/>
-              </a:spcBef>
-              <a:buSzPct val="90000"/>
-              <a:buFont typeface="Arial" pitchFamily="34" charset="0"/>
-              <a:buNone/>
-              <a:defRPr sz="2400" kern="1200" baseline="0">
-                <a:solidFill>
-                  <a:schemeClr val="accent3">
-                    <a:lumMod val="50000"/>
-                  </a:schemeClr>
-                </a:solidFill>
-                <a:latin typeface="+mn-lt"/>
-                <a:ea typeface="+mn-ea"/>
-                <a:cs typeface="+mn-cs"/>
-              </a:defRPr>
-            </a:lvl3pPr>
-            <a:lvl4pPr marL="630238" indent="0" algn="l" defTabSz="914363" rtl="0" eaLnBrk="1" latinLnBrk="0" hangingPunct="1">
-              <a:lnSpc>
-                <a:spcPct val="100000"/>
-              </a:lnSpc>
-              <a:spcBef>
-                <a:spcPts val="600"/>
-              </a:spcBef>
-              <a:buSzPct val="90000"/>
-              <a:buFont typeface="Arial" pitchFamily="34" charset="0"/>
-              <a:buNone/>
-              <a:defRPr sz="2000" kern="1200" baseline="0">
-                <a:solidFill>
-                  <a:schemeClr val="accent3">
-                    <a:lumMod val="50000"/>
-                  </a:schemeClr>
-                </a:solidFill>
-                <a:latin typeface="+mn-lt"/>
-                <a:ea typeface="+mn-ea"/>
-                <a:cs typeface="+mn-cs"/>
-              </a:defRPr>
-            </a:lvl4pPr>
-            <a:lvl5pPr marL="801687" indent="0" algn="l" defTabSz="914363" rtl="0" eaLnBrk="1" latinLnBrk="0" hangingPunct="1">
-              <a:lnSpc>
-                <a:spcPct val="100000"/>
-              </a:lnSpc>
-              <a:spcBef>
-                <a:spcPts val="600"/>
-              </a:spcBef>
-              <a:buSzPct val="90000"/>
-              <a:buFont typeface="Arial" pitchFamily="34" charset="0"/>
-              <a:buNone/>
-              <a:defRPr sz="1800" kern="1200" baseline="0">
-                <a:solidFill>
-                  <a:schemeClr val="accent3">
-                    <a:lumMod val="50000"/>
-                  </a:schemeClr>
-                </a:solidFill>
-                <a:latin typeface="+mn-lt"/>
-                <a:ea typeface="+mn-ea"/>
-                <a:cs typeface="+mn-cs"/>
-              </a:defRPr>
-            </a:lvl5pPr>
-            <a:lvl6pPr marL="2514499" indent="-228591" algn="l" defTabSz="914363" rtl="0" eaLnBrk="1" latinLnBrk="0" hangingPunct="1">
-              <a:spcBef>
-                <a:spcPct val="20000"/>
-              </a:spcBef>
-              <a:buFont typeface="Arial" pitchFamily="34" charset="0"/>
-              <a:buChar char="•"/>
-              <a:defRPr sz="2000" kern="1200">
-                <a:solidFill>
-                  <a:schemeClr val="tx1"/>
-                </a:solidFill>
-                <a:latin typeface="+mn-lt"/>
-                <a:ea typeface="+mn-ea"/>
-                <a:cs typeface="+mn-cs"/>
-              </a:defRPr>
-            </a:lvl6pPr>
-            <a:lvl7pPr marL="2971681" indent="-228591" algn="l" defTabSz="914363" rtl="0" eaLnBrk="1" latinLnBrk="0" hangingPunct="1">
-              <a:spcBef>
-                <a:spcPct val="20000"/>
-              </a:spcBef>
-              <a:buFont typeface="Arial" pitchFamily="34" charset="0"/>
-              <a:buChar char="•"/>
-              <a:defRPr sz="2000" kern="1200">
-                <a:solidFill>
-                  <a:schemeClr val="tx1"/>
-                </a:solidFill>
-                <a:latin typeface="+mn-lt"/>
-                <a:ea typeface="+mn-ea"/>
-                <a:cs typeface="+mn-cs"/>
-              </a:defRPr>
-            </a:lvl7pPr>
-            <a:lvl8pPr marL="3428863" indent="-228591" algn="l" defTabSz="914363" rtl="0" eaLnBrk="1" latinLnBrk="0" hangingPunct="1">
-              <a:spcBef>
-                <a:spcPct val="20000"/>
-              </a:spcBef>
-              <a:buFont typeface="Arial" pitchFamily="34" charset="0"/>
-              <a:buChar char="•"/>
-              <a:defRPr sz="2000" kern="1200">
-                <a:solidFill>
-                  <a:schemeClr val="tx1"/>
-                </a:solidFill>
-                <a:latin typeface="+mn-lt"/>
-                <a:ea typeface="+mn-ea"/>
-                <a:cs typeface="+mn-cs"/>
-              </a:defRPr>
-            </a:lvl8pPr>
-            <a:lvl9pPr marL="3886045" indent="-228591" algn="l" defTabSz="914363" rtl="0" eaLnBrk="1" latinLnBrk="0" hangingPunct="1">
-              <a:spcBef>
-                <a:spcPct val="20000"/>
-              </a:spcBef>
-              <a:buFont typeface="Arial" pitchFamily="34" charset="0"/>
-              <a:buChar char="•"/>
-              <a:defRPr sz="2000" kern="1200">
-                <a:solidFill>
-                  <a:schemeClr val="tx1"/>
-                </a:solidFill>
-                <a:latin typeface="+mn-lt"/>
-                <a:ea typeface="+mn-ea"/>
-                <a:cs typeface="+mn-cs"/>
-              </a:defRPr>
-            </a:lvl9pPr>
-          </a:lstStyle>
-          <a:p>
-            <a:pPr algn="ctr"/>
-            <a:r>
-              <a:rPr lang="en-US" sz="2667" dirty="0"/>
-              <a:t>Your Local Workstation</a:t>
-            </a:r>
-          </a:p>
-          <a:p>
-            <a:endParaRPr lang="en-US" sz="2667" dirty="0"/>
-          </a:p>
-          <a:p>
-            <a:endParaRPr lang="en-US" sz="2667" dirty="0"/>
-          </a:p>
-          <a:p>
-            <a:endParaRPr lang="en-US" sz="4267" dirty="0"/>
-          </a:p>
-          <a:p>
-            <a:endParaRPr lang="en-US" sz="4267" dirty="0"/>
-          </a:p>
-        </p:txBody>
-      </p:sp>
-      <p:sp>
-        <p:nvSpPr>
-          <p:cNvPr id="18" name="Text Placeholder 2"/>
-          <p:cNvSpPr txBox="1">
-            <a:spLocks/>
-          </p:cNvSpPr>
-          <p:nvPr/>
-        </p:nvSpPr>
-        <p:spPr bwMode="white">
-          <a:xfrm>
-            <a:off x="13045961" y="7531741"/>
-            <a:ext cx="2198204" cy="520772"/>
-          </a:xfrm>
-          <a:prstGeom prst="rect">
-            <a:avLst/>
-          </a:prstGeom>
-        </p:spPr>
-        <p:txBody>
-          <a:bodyPr vert="horz" wrap="square" lIns="0" tIns="0" rIns="0" bIns="0" rtlCol="0">
-            <a:normAutofit/>
-          </a:bodyPr>
-          <a:lstStyle>
-            <a:lvl1pPr marL="0" indent="0" algn="l" defTabSz="914363" rtl="0" eaLnBrk="1" latinLnBrk="0" hangingPunct="1">
-              <a:lnSpc>
-                <a:spcPct val="100000"/>
-              </a:lnSpc>
-              <a:spcBef>
-                <a:spcPts val="600"/>
-              </a:spcBef>
-              <a:buSzPct val="90000"/>
-              <a:buFont typeface="Arial" pitchFamily="34" charset="0"/>
-              <a:buNone/>
-              <a:defRPr sz="3200" kern="1200" baseline="0">
-                <a:solidFill>
-                  <a:schemeClr val="accent3">
-                    <a:lumMod val="50000"/>
-                  </a:schemeClr>
-                </a:solidFill>
-                <a:latin typeface="+mn-lt"/>
-                <a:ea typeface="+mn-ea"/>
-                <a:cs typeface="+mn-cs"/>
-              </a:defRPr>
-            </a:lvl1pPr>
-            <a:lvl2pPr marL="231775" indent="0" algn="l" defTabSz="914363" rtl="0" eaLnBrk="1" latinLnBrk="0" hangingPunct="1">
-              <a:lnSpc>
-                <a:spcPct val="100000"/>
-              </a:lnSpc>
-              <a:spcBef>
-                <a:spcPts val="600"/>
-              </a:spcBef>
-              <a:buSzPct val="90000"/>
-              <a:buFont typeface="Arial" pitchFamily="34" charset="0"/>
-              <a:buNone/>
-              <a:defRPr sz="2800" kern="1200" baseline="0">
-                <a:solidFill>
-                  <a:schemeClr val="accent3">
-                    <a:lumMod val="50000"/>
-                  </a:schemeClr>
-                </a:solidFill>
-                <a:latin typeface="+mn-lt"/>
-                <a:ea typeface="+mn-ea"/>
-                <a:cs typeface="+mn-cs"/>
-              </a:defRPr>
-            </a:lvl2pPr>
-            <a:lvl3pPr marL="457200" indent="0" algn="l" defTabSz="914363" rtl="0" eaLnBrk="1" latinLnBrk="0" hangingPunct="1">
-              <a:lnSpc>
-                <a:spcPct val="100000"/>
-              </a:lnSpc>
-              <a:spcBef>
-                <a:spcPts val="600"/>
-              </a:spcBef>
-              <a:buSzPct val="90000"/>
-              <a:buFont typeface="Arial" pitchFamily="34" charset="0"/>
-              <a:buNone/>
-              <a:defRPr sz="2400" kern="1200" baseline="0">
-                <a:solidFill>
-                  <a:schemeClr val="accent3">
-                    <a:lumMod val="50000"/>
-                  </a:schemeClr>
-                </a:solidFill>
-                <a:latin typeface="+mn-lt"/>
-                <a:ea typeface="+mn-ea"/>
-                <a:cs typeface="+mn-cs"/>
-              </a:defRPr>
-            </a:lvl3pPr>
-            <a:lvl4pPr marL="630238" indent="0" algn="l" defTabSz="914363" rtl="0" eaLnBrk="1" latinLnBrk="0" hangingPunct="1">
-              <a:lnSpc>
-                <a:spcPct val="100000"/>
-              </a:lnSpc>
-              <a:spcBef>
-                <a:spcPts val="600"/>
-              </a:spcBef>
-              <a:buSzPct val="90000"/>
-              <a:buFont typeface="Arial" pitchFamily="34" charset="0"/>
-              <a:buNone/>
-              <a:defRPr sz="2000" kern="1200" baseline="0">
-                <a:solidFill>
-                  <a:schemeClr val="accent3">
-                    <a:lumMod val="50000"/>
-                  </a:schemeClr>
-                </a:solidFill>
-                <a:latin typeface="+mn-lt"/>
-                <a:ea typeface="+mn-ea"/>
-                <a:cs typeface="+mn-cs"/>
-              </a:defRPr>
-            </a:lvl4pPr>
-            <a:lvl5pPr marL="801687" indent="0" algn="l" defTabSz="914363" rtl="0" eaLnBrk="1" latinLnBrk="0" hangingPunct="1">
-              <a:lnSpc>
-                <a:spcPct val="100000"/>
-              </a:lnSpc>
-              <a:spcBef>
-                <a:spcPts val="600"/>
-              </a:spcBef>
-              <a:buSzPct val="90000"/>
-              <a:buFont typeface="Arial" pitchFamily="34" charset="0"/>
-              <a:buNone/>
-              <a:defRPr sz="1800" kern="1200" baseline="0">
-                <a:solidFill>
-                  <a:schemeClr val="accent3">
-                    <a:lumMod val="50000"/>
-                  </a:schemeClr>
-                </a:solidFill>
-                <a:latin typeface="+mn-lt"/>
-                <a:ea typeface="+mn-ea"/>
-                <a:cs typeface="+mn-cs"/>
-              </a:defRPr>
-            </a:lvl5pPr>
-            <a:lvl6pPr marL="2514499" indent="-228591" algn="l" defTabSz="914363" rtl="0" eaLnBrk="1" latinLnBrk="0" hangingPunct="1">
-              <a:spcBef>
-                <a:spcPct val="20000"/>
-              </a:spcBef>
-              <a:buFont typeface="Arial" pitchFamily="34" charset="0"/>
-              <a:buChar char="•"/>
-              <a:defRPr sz="2000" kern="1200">
-                <a:solidFill>
-                  <a:schemeClr val="tx1"/>
-                </a:solidFill>
-                <a:latin typeface="+mn-lt"/>
-                <a:ea typeface="+mn-ea"/>
-                <a:cs typeface="+mn-cs"/>
-              </a:defRPr>
-            </a:lvl6pPr>
-            <a:lvl7pPr marL="2971681" indent="-228591" algn="l" defTabSz="914363" rtl="0" eaLnBrk="1" latinLnBrk="0" hangingPunct="1">
-              <a:spcBef>
-                <a:spcPct val="20000"/>
-              </a:spcBef>
-              <a:buFont typeface="Arial" pitchFamily="34" charset="0"/>
-              <a:buChar char="•"/>
-              <a:defRPr sz="2000" kern="1200">
-                <a:solidFill>
-                  <a:schemeClr val="tx1"/>
-                </a:solidFill>
-                <a:latin typeface="+mn-lt"/>
-                <a:ea typeface="+mn-ea"/>
-                <a:cs typeface="+mn-cs"/>
-              </a:defRPr>
-            </a:lvl7pPr>
-            <a:lvl8pPr marL="3428863" indent="-228591" algn="l" defTabSz="914363" rtl="0" eaLnBrk="1" latinLnBrk="0" hangingPunct="1">
-              <a:spcBef>
-                <a:spcPct val="20000"/>
-              </a:spcBef>
-              <a:buFont typeface="Arial" pitchFamily="34" charset="0"/>
-              <a:buChar char="•"/>
-              <a:defRPr sz="2000" kern="1200">
-                <a:solidFill>
-                  <a:schemeClr val="tx1"/>
-                </a:solidFill>
-                <a:latin typeface="+mn-lt"/>
-                <a:ea typeface="+mn-ea"/>
-                <a:cs typeface="+mn-cs"/>
-              </a:defRPr>
-            </a:lvl8pPr>
-            <a:lvl9pPr marL="3886045" indent="-228591" algn="l" defTabSz="914363" rtl="0" eaLnBrk="1" latinLnBrk="0" hangingPunct="1">
-              <a:spcBef>
-                <a:spcPct val="20000"/>
-              </a:spcBef>
-              <a:buFont typeface="Arial" pitchFamily="34" charset="0"/>
-              <a:buChar char="•"/>
-              <a:defRPr sz="2000" kern="1200">
-                <a:solidFill>
-                  <a:schemeClr val="tx1"/>
-                </a:solidFill>
-                <a:latin typeface="+mn-lt"/>
-                <a:ea typeface="+mn-ea"/>
-                <a:cs typeface="+mn-cs"/>
-              </a:defRPr>
-            </a:lvl9pPr>
-          </a:lstStyle>
-          <a:p>
-            <a:pPr algn="ctr"/>
-            <a:r>
-              <a:rPr lang="en-US" sz="2667" dirty="0"/>
-              <a:t>Nodes</a:t>
-            </a:r>
-          </a:p>
-          <a:p>
-            <a:endParaRPr lang="en-US" sz="2667" dirty="0"/>
-          </a:p>
-          <a:p>
-            <a:endParaRPr lang="en-US" sz="2667" dirty="0"/>
-          </a:p>
-          <a:p>
-            <a:endParaRPr lang="en-US" sz="4267" dirty="0"/>
-          </a:p>
-          <a:p>
-            <a:endParaRPr lang="en-US" sz="4267" dirty="0"/>
-          </a:p>
-        </p:txBody>
-      </p:sp>
-      <p:grpSp>
-        <p:nvGrpSpPr>
-          <p:cNvPr id="19" name="Group 18"/>
-          <p:cNvGrpSpPr/>
-          <p:nvPr/>
-        </p:nvGrpSpPr>
-        <p:grpSpPr>
-          <a:xfrm>
-            <a:off x="13258380" y="5429028"/>
-            <a:ext cx="1366969" cy="1899513"/>
-            <a:chOff x="9289520" y="4376570"/>
-            <a:chExt cx="1025227" cy="1424635"/>
-          </a:xfrm>
-        </p:grpSpPr>
-        <p:pic>
-          <p:nvPicPr>
-            <p:cNvPr id="20" name="Picture 6" descr="http://images.clipartpanda.com/server-clipart-1313181674_Clipart_Free.png"/>
-            <p:cNvPicPr>
-              <a:picLocks noChangeAspect="1" noChangeArrowheads="1"/>
-            </p:cNvPicPr>
-            <p:nvPr/>
-          </p:nvPicPr>
-          <p:blipFill>
-            <a:blip r:embed="rId3">
-              <a:extLst>
-                <a:ext uri="{28A0092B-C50C-407E-A947-70E740481C1C}">
-                  <a14:useLocalDpi xmlns:a14="http://schemas.microsoft.com/office/drawing/2010/main" val="0"/>
-                </a:ext>
-              </a:extLst>
-            </a:blip>
-            <a:srcRect/>
-            <a:stretch>
-              <a:fillRect/>
-            </a:stretch>
-          </p:blipFill>
-          <p:spPr bwMode="auto">
-            <a:xfrm>
-              <a:off x="9289520" y="4376570"/>
-              <a:ext cx="720427" cy="1119835"/>
-            </a:xfrm>
-            <a:prstGeom prst="rect">
-              <a:avLst/>
-            </a:prstGeom>
-            <a:noFill/>
-            <a:extLst>
-              <a:ext uri="{909E8E84-426E-40dd-AFC4-6F175D3DCCD1}">
-                <a14:hiddenFill xmlns:a14="http://schemas.microsoft.com/office/drawing/2010/main" xmlns="">
-                  <a:solidFill>
-                    <a:srgbClr val="FFFFFF"/>
-                  </a:solidFill>
-                </a14:hiddenFill>
-              </a:ext>
-            </a:extLst>
-          </p:spPr>
-        </p:pic>
-        <p:pic>
-          <p:nvPicPr>
-            <p:cNvPr id="21" name="Picture 6" descr="http://images.clipartpanda.com/server-clipart-1313181674_Clipart_Free.png"/>
-            <p:cNvPicPr>
-              <a:picLocks noChangeAspect="1" noChangeArrowheads="1"/>
-            </p:cNvPicPr>
-            <p:nvPr/>
-          </p:nvPicPr>
-          <p:blipFill>
-            <a:blip r:embed="rId3">
-              <a:extLst>
-                <a:ext uri="{28A0092B-C50C-407E-A947-70E740481C1C}">
-                  <a14:useLocalDpi xmlns:a14="http://schemas.microsoft.com/office/drawing/2010/main" val="0"/>
-                </a:ext>
-              </a:extLst>
-            </a:blip>
-            <a:srcRect/>
-            <a:stretch>
-              <a:fillRect/>
-            </a:stretch>
-          </p:blipFill>
-          <p:spPr bwMode="auto">
-            <a:xfrm>
-              <a:off x="9441920" y="4528970"/>
-              <a:ext cx="720427" cy="1119835"/>
-            </a:xfrm>
-            <a:prstGeom prst="rect">
-              <a:avLst/>
-            </a:prstGeom>
-            <a:noFill/>
-            <a:extLst>
-              <a:ext uri="{909E8E84-426E-40dd-AFC4-6F175D3DCCD1}">
-                <a14:hiddenFill xmlns:a14="http://schemas.microsoft.com/office/drawing/2010/main" xmlns="">
-                  <a:solidFill>
-                    <a:srgbClr val="FFFFFF"/>
-                  </a:solidFill>
-                </a14:hiddenFill>
-              </a:ext>
-            </a:extLst>
-          </p:spPr>
-        </p:pic>
-        <p:pic>
-          <p:nvPicPr>
-            <p:cNvPr id="23" name="Picture 6" descr="http://images.clipartpanda.com/server-clipart-1313181674_Clipart_Free.png"/>
-            <p:cNvPicPr>
-              <a:picLocks noChangeAspect="1" noChangeArrowheads="1"/>
-            </p:cNvPicPr>
-            <p:nvPr/>
-          </p:nvPicPr>
-          <p:blipFill>
-            <a:blip r:embed="rId3">
-              <a:extLst>
-                <a:ext uri="{28A0092B-C50C-407E-A947-70E740481C1C}">
-                  <a14:useLocalDpi xmlns:a14="http://schemas.microsoft.com/office/drawing/2010/main" val="0"/>
-                </a:ext>
-              </a:extLst>
-            </a:blip>
-            <a:srcRect/>
-            <a:stretch>
-              <a:fillRect/>
-            </a:stretch>
-          </p:blipFill>
-          <p:spPr bwMode="auto">
-            <a:xfrm>
-              <a:off x="9594320" y="4681370"/>
-              <a:ext cx="720427" cy="1119835"/>
-            </a:xfrm>
-            <a:prstGeom prst="rect">
-              <a:avLst/>
-            </a:prstGeom>
-            <a:noFill/>
-            <a:extLst>
-              <a:ext uri="{909E8E84-426E-40dd-AFC4-6F175D3DCCD1}">
-                <a14:hiddenFill xmlns:a14="http://schemas.microsoft.com/office/drawing/2010/main" xmlns="">
-                  <a:solidFill>
-                    <a:srgbClr val="FFFFFF"/>
-                  </a:solidFill>
-                </a14:hiddenFill>
-              </a:ext>
-            </a:extLst>
-          </p:spPr>
-        </p:pic>
-      </p:grpSp>
-      <p:cxnSp>
-        <p:nvCxnSpPr>
-          <p:cNvPr id="24" name="Straight Arrow Connector 23"/>
-          <p:cNvCxnSpPr/>
-          <p:nvPr/>
-        </p:nvCxnSpPr>
-        <p:spPr>
-          <a:xfrm flipV="1">
-            <a:off x="7462157" y="3789591"/>
-            <a:ext cx="1650730" cy="2045837"/>
-          </a:xfrm>
-          <a:prstGeom prst="straightConnector1">
-            <a:avLst/>
-          </a:prstGeom>
-          <a:ln>
-            <a:solidFill>
-              <a:schemeClr val="accent1"/>
-            </a:solidFill>
-            <a:tailEnd type="triangle"/>
-          </a:ln>
-        </p:spPr>
-        <p:style>
-          <a:lnRef idx="3">
-            <a:schemeClr val="accent1"/>
-          </a:lnRef>
-          <a:fillRef idx="0">
-            <a:schemeClr val="accent1"/>
-          </a:fillRef>
-          <a:effectRef idx="2">
-            <a:schemeClr val="accent1"/>
-          </a:effectRef>
-          <a:fontRef idx="minor">
-            <a:schemeClr val="tx1"/>
-          </a:fontRef>
-        </p:style>
-      </p:cxnSp>
-      <p:cxnSp>
-        <p:nvCxnSpPr>
-          <p:cNvPr id="25" name="Straight Arrow Connector 24"/>
-          <p:cNvCxnSpPr/>
-          <p:nvPr/>
-        </p:nvCxnSpPr>
-        <p:spPr>
-          <a:xfrm>
-            <a:off x="11125749" y="3675018"/>
-            <a:ext cx="2132631" cy="1754009"/>
-          </a:xfrm>
-          <a:prstGeom prst="straightConnector1">
-            <a:avLst/>
-          </a:prstGeom>
-          <a:ln>
-            <a:solidFill>
-              <a:schemeClr val="accent1"/>
-            </a:solidFill>
-            <a:headEnd type="triangle"/>
-            <a:tailEnd type="triangle"/>
-          </a:ln>
-        </p:spPr>
-        <p:style>
-          <a:lnRef idx="3">
-            <a:schemeClr val="accent1"/>
-          </a:lnRef>
-          <a:fillRef idx="0">
-            <a:schemeClr val="accent1"/>
-          </a:fillRef>
-          <a:effectRef idx="2">
-            <a:schemeClr val="accent1"/>
-          </a:effectRef>
-          <a:fontRef idx="minor">
-            <a:schemeClr val="tx1"/>
-          </a:fontRef>
-        </p:style>
-      </p:cxnSp>
-      <p:pic>
-        <p:nvPicPr>
-          <p:cNvPr id="26" name="Picture 25" descr="http://www.clipartpal.com/_thumbs/pd/computer/hardware/server_1234.png"/>
-          <p:cNvPicPr>
-            <a:picLocks noChangeAspect="1" noChangeArrowheads="1"/>
-          </p:cNvPicPr>
-          <p:nvPr/>
-        </p:nvPicPr>
-        <p:blipFill>
-          <a:blip r:embed="rId4">
-            <a:extLst>
-              <a:ext uri="{BEBA8EAE-BF5A-486C-A8C5-ECC9F3942E4B}">
-                <a14:imgProps xmlns:a14="http://schemas.microsoft.com/office/drawing/2010/main">
-                  <a14:imgLayer r:embed="rId5">
-                    <a14:imgEffect>
-                      <a14:backgroundRemoval t="375" b="100000" l="0" r="100000"/>
-                    </a14:imgEffect>
-                  </a14:imgLayer>
-                </a14:imgProps>
-              </a:ext>
-              <a:ext uri="{28A0092B-C50C-407E-A947-70E740481C1C}">
-                <a14:useLocalDpi xmlns:a14="http://schemas.microsoft.com/office/drawing/2010/main" val="0"/>
-              </a:ext>
-            </a:extLst>
-          </a:blip>
-          <a:srcRect/>
-          <a:stretch>
-            <a:fillRect/>
-          </a:stretch>
-        </p:blipFill>
-        <p:spPr bwMode="auto">
-          <a:xfrm>
-            <a:off x="9189825" y="2330445"/>
-            <a:ext cx="1691126" cy="1708211"/>
-          </a:xfrm>
-          <a:prstGeom prst="rect">
-            <a:avLst/>
-          </a:prstGeom>
-          <a:noFill/>
-          <a:extLst>
-            <a:ext uri="{909E8E84-426E-40dd-AFC4-6F175D3DCCD1}">
-              <a14:hiddenFill xmlns:a14="http://schemas.microsoft.com/office/drawing/2010/main" xmlns="">
-                <a:solidFill>
-                  <a:srgbClr val="FFFFFF"/>
-                </a:solidFill>
-              </a14:hiddenFill>
-            </a:ext>
-          </a:extLst>
-        </p:spPr>
-      </p:pic>
-      <p:pic>
-        <p:nvPicPr>
-          <p:cNvPr id="27" name="Picture 26"/>
-          <p:cNvPicPr>
-            <a:picLocks noChangeAspect="1"/>
-          </p:cNvPicPr>
-          <p:nvPr/>
-        </p:nvPicPr>
-        <p:blipFill>
-          <a:blip r:embed="rId6">
-            <a:extLst>
-              <a:ext uri="{28A0092B-C50C-407E-A947-70E740481C1C}">
-                <a14:useLocalDpi xmlns:a14="http://schemas.microsoft.com/office/drawing/2010/main" val="0"/>
-              </a:ext>
-            </a:extLst>
-          </a:blip>
-          <a:stretch>
-            <a:fillRect/>
-          </a:stretch>
-        </p:blipFill>
-        <p:spPr>
-          <a:xfrm>
-            <a:off x="5927990" y="5916279"/>
-            <a:ext cx="1701573" cy="1283742"/>
-          </a:xfrm>
-          <a:prstGeom prst="rect">
-            <a:avLst/>
-          </a:prstGeom>
-        </p:spPr>
-      </p:pic>
-    </p:spTree>
-    <p:extLst>
-      <p:ext uri="{BB962C8B-B14F-4D97-AF65-F5344CB8AC3E}">
-        <p14:creationId xmlns:p14="http://schemas.microsoft.com/office/powerpoint/2010/main" val="2149071782"/>
-      </p:ext>
-    </p:extLst>
-  </p:cSld>
-  <p:clrMapOvr>
-    <a:masterClrMapping/>
-  </p:clrMapOvr>
-  <mc:AlternateContent xmlns:mc="http://schemas.openxmlformats.org/markup-compatibility/2006" xmlns:p14="http://schemas.microsoft.com/office/powerpoint/2010/main">
-    <mc:Choice Requires="p14">
-      <p:transition spd="med" p14:dur="700">
-        <p:fade/>
-      </p:transition>
-    </mc:Choice>
-    <mc:Fallback xmlns="">
-      <p:transition spd="med">
-        <p:fade/>
-      </p:transition>
-    </mc:Fallback>
-  </mc:AlternateContent>
-  <p:timing>
-    <p:tnLst>
-      <p:par>
-        <p:cTn id="1" dur="indefinite" restart="never" nodeType="tmRoot"/>
-      </p:par>
-    </p:tnLst>
-  </p:timing>
-</p:sld>
-</file>
-
-<file path=ppt/slides/slide13.xml><?xml version="1.0" encoding="utf-8"?>
-<p:sld xmlns:a="http://schemas.openxmlformats.org/drawingml/2006/main" xmlns:r="http://schemas.openxmlformats.org/officeDocument/2006/relationships" xmlns:p="http://schemas.openxmlformats.org/presentationml/2006/main">
-  <p:cSld>
-    <p:spTree>
-      <p:nvGrpSpPr>
-        <p:cNvPr id="1" name=""/>
-        <p:cNvGrpSpPr/>
-        <p:nvPr/>
-      </p:nvGrpSpPr>
-      <p:grpSpPr>
-        <a:xfrm>
-          <a:off x="0" y="0"/>
-          <a:ext cx="0" cy="0"/>
-          <a:chOff x="0" y="0"/>
-          <a:chExt cx="0" cy="0"/>
-        </a:xfrm>
-      </p:grpSpPr>
-      <p:sp>
-        <p:nvSpPr>
-          <p:cNvPr id="2" name="Title 1"/>
-          <p:cNvSpPr>
-            <a:spLocks noGrp="1"/>
-          </p:cNvSpPr>
-          <p:nvPr>
             <p:ph type="ctrTitle"/>
           </p:nvPr>
         </p:nvSpPr>
@@ -14065,187 +11917,7 @@
 </p:sld>
 </file>
 
-<file path=ppt/slides/slide14.xml><?xml version="1.0" encoding="utf-8"?>
-<p:sld xmlns:a="http://schemas.openxmlformats.org/drawingml/2006/main" xmlns:r="http://schemas.openxmlformats.org/officeDocument/2006/relationships" xmlns:p="http://schemas.openxmlformats.org/presentationml/2006/main">
-  <p:cSld>
-    <p:bg>
-      <p:bgPr>
-        <a:gradFill rotWithShape="0">
-          <a:gsLst>
-            <a:gs pos="0">
-              <a:srgbClr val="F0F0F0"/>
-            </a:gs>
-            <a:gs pos="100000">
-              <a:schemeClr val="bg2"/>
-            </a:gs>
-          </a:gsLst>
-          <a:lin ang="5400000" scaled="1"/>
-        </a:gradFill>
-        <a:effectLst/>
-      </p:bgPr>
-    </p:bg>
-    <p:spTree>
-      <p:nvGrpSpPr>
-        <p:cNvPr id="1" name=""/>
-        <p:cNvGrpSpPr/>
-        <p:nvPr/>
-      </p:nvGrpSpPr>
-      <p:grpSpPr>
-        <a:xfrm>
-          <a:off x="0" y="0"/>
-          <a:ext cx="0" cy="0"/>
-          <a:chOff x="0" y="0"/>
-          <a:chExt cx="0" cy="0"/>
-        </a:xfrm>
-      </p:grpSpPr>
-      <p:sp>
-        <p:nvSpPr>
-          <p:cNvPr id="2" name="Title 1"/>
-          <p:cNvSpPr>
-            <a:spLocks noGrp="1"/>
-          </p:cNvSpPr>
-          <p:nvPr>
-            <p:ph type="title"/>
-          </p:nvPr>
-        </p:nvSpPr>
-        <p:spPr/>
-        <p:txBody>
-          <a:bodyPr/>
-          <a:lstStyle/>
-          <a:p>
-            <a:r>
-              <a:rPr lang="en-US" dirty="0" smtClean="0"/>
-              <a:t>Review Questions</a:t>
-            </a:r>
-            <a:endParaRPr lang="en-US" dirty="0"/>
-          </a:p>
-        </p:txBody>
-      </p:sp>
-      <p:sp>
-        <p:nvSpPr>
-          <p:cNvPr id="3" name="Text Placeholder 2"/>
-          <p:cNvSpPr>
-            <a:spLocks noGrp="1"/>
-          </p:cNvSpPr>
-          <p:nvPr>
-            <p:ph type="body" sz="quarter" idx="12"/>
-          </p:nvPr>
-        </p:nvSpPr>
-        <p:spPr/>
-        <p:txBody>
-          <a:bodyPr/>
-          <a:lstStyle/>
-          <a:p>
-            <a:pPr marL="514350" indent="-514350">
-              <a:buFont typeface="+mj-lt"/>
-              <a:buAutoNum type="arabicPeriod"/>
-            </a:pPr>
-            <a:r>
-              <a:rPr lang="en-US" dirty="0" smtClean="0"/>
-              <a:t>What is ...?</a:t>
-            </a:r>
-            <a:br>
-              <a:rPr lang="en-US" dirty="0" smtClean="0"/>
-            </a:br>
-            <a:r>
-              <a:rPr lang="en-US" dirty="0" smtClean="0"/>
-              <a:t>______________________________</a:t>
-            </a:r>
-          </a:p>
-          <a:p>
-            <a:pPr marL="514350" indent="-514350">
-              <a:buFont typeface="+mj-lt"/>
-              <a:buAutoNum type="arabicPeriod"/>
-            </a:pPr>
-            <a:r>
-              <a:rPr lang="en-US" dirty="0" smtClean="0"/>
-              <a:t>Which is the correct answer?  </a:t>
-            </a:r>
-          </a:p>
-          <a:p>
-            <a:pPr marL="822325" lvl="1" indent="-514350">
-              <a:buFont typeface="+mj-lt"/>
-              <a:buAutoNum type="alphaLcPeriod"/>
-            </a:pPr>
-            <a:r>
-              <a:rPr lang="en-US" dirty="0" smtClean="0"/>
-              <a:t>answer</a:t>
-            </a:r>
-          </a:p>
-          <a:p>
-            <a:pPr marL="822325" lvl="1" indent="-514350">
-              <a:buFont typeface="+mj-lt"/>
-              <a:buAutoNum type="alphaLcPeriod"/>
-            </a:pPr>
-            <a:r>
-              <a:rPr lang="en-US" dirty="0" smtClean="0"/>
-              <a:t>answer</a:t>
-            </a:r>
-          </a:p>
-          <a:p>
-            <a:pPr marL="822325" lvl="1" indent="-514350">
-              <a:buFont typeface="+mj-lt"/>
-              <a:buAutoNum type="alphaLcPeriod"/>
-            </a:pPr>
-            <a:r>
-              <a:rPr lang="en-US" dirty="0" smtClean="0"/>
-              <a:t>answer</a:t>
-            </a:r>
-          </a:p>
-          <a:p>
-            <a:pPr marL="822325" lvl="1" indent="-514350">
-              <a:buFont typeface="+mj-lt"/>
-              <a:buAutoNum type="alphaLcPeriod"/>
-            </a:pPr>
-            <a:r>
-              <a:rPr lang="en-US" dirty="0" smtClean="0"/>
-              <a:t>answer</a:t>
-            </a:r>
-            <a:br>
-              <a:rPr lang="en-US" dirty="0" smtClean="0"/>
-            </a:br>
-            <a:endParaRPr lang="en-US" dirty="0" smtClean="0"/>
-          </a:p>
-          <a:p>
-            <a:pPr marL="514350" indent="-514350">
-              <a:buFont typeface="+mj-lt"/>
-              <a:buAutoNum type="arabicPeriod"/>
-            </a:pPr>
-            <a:r>
-              <a:rPr lang="en-US" dirty="0" smtClean="0"/>
-              <a:t>Capable of carrying on a conversation</a:t>
-            </a:r>
-          </a:p>
-          <a:p>
-            <a:pPr marL="514350" indent="-514350">
-              <a:buFont typeface="+mj-lt"/>
-              <a:buAutoNum type="arabicPeriod"/>
-            </a:pPr>
-            <a:r>
-              <a:rPr lang="en-US" dirty="0" smtClean="0"/>
-              <a:t>Explain</a:t>
-            </a:r>
-            <a:endParaRPr lang="en-US" dirty="0"/>
-          </a:p>
-        </p:txBody>
-      </p:sp>
-    </p:spTree>
-    <p:extLst>
-      <p:ext uri="{BB962C8B-B14F-4D97-AF65-F5344CB8AC3E}">
-        <p14:creationId xmlns:p14="http://schemas.microsoft.com/office/powerpoint/2010/main" val="321457963"/>
-      </p:ext>
-    </p:extLst>
-  </p:cSld>
-  <p:clrMapOvr>
-    <a:masterClrMapping/>
-  </p:clrMapOvr>
-  <p:transition spd="med">
-    <p:fade/>
-  </p:transition>
-</p:sld>
-</file>
-
-<file path=ppt/slides/slide15.xml><?xml version="1.0" encoding="utf-8"?>
+<file path=ppt/slides/slide13.xml><?xml version="1.0" encoding="utf-8"?>
 <p:sld xmlns:a="http://schemas.openxmlformats.org/drawingml/2006/main" xmlns:r="http://schemas.openxmlformats.org/officeDocument/2006/relationships" xmlns:p="http://schemas.openxmlformats.org/presentationml/2006/main">
   <p:cSld>
     <p:spTree>
@@ -14940,6 +12612,133 @@
 <file path=ppt/slides/slide5.xml><?xml version="1.0" encoding="utf-8"?>
 <p:sld xmlns:a="http://schemas.openxmlformats.org/drawingml/2006/main" xmlns:r="http://schemas.openxmlformats.org/officeDocument/2006/relationships" xmlns:p="http://schemas.openxmlformats.org/presentationml/2006/main">
   <p:cSld>
+    <p:spTree>
+      <p:nvGrpSpPr>
+        <p:cNvPr id="1" name=""/>
+        <p:cNvGrpSpPr/>
+        <p:nvPr/>
+      </p:nvGrpSpPr>
+      <p:grpSpPr>
+        <a:xfrm>
+          <a:off x="0" y="0"/>
+          <a:ext cx="0" cy="0"/>
+          <a:chOff x="0" y="0"/>
+          <a:chExt cx="0" cy="0"/>
+        </a:xfrm>
+      </p:grpSpPr>
+      <p:sp>
+        <p:nvSpPr>
+          <p:cNvPr id="6" name="Title 5"/>
+          <p:cNvSpPr>
+            <a:spLocks noGrp="1"/>
+          </p:cNvSpPr>
+          <p:nvPr>
+            <p:ph type="ctrTitle"/>
+          </p:nvPr>
+        </p:nvSpPr>
+        <p:spPr/>
+        <p:txBody>
+          <a:bodyPr>
+            <a:normAutofit fontScale="90000"/>
+          </a:bodyPr>
+          <a:lstStyle/>
+          <a:p>
+            <a:r>
+              <a:rPr lang="en-US" dirty="0" smtClean="0"/>
+              <a:t>Chef Compliance</a:t>
+            </a:r>
+            <a:endParaRPr lang="en-US" dirty="0"/>
+          </a:p>
+        </p:txBody>
+      </p:sp>
+      <p:sp>
+        <p:nvSpPr>
+          <p:cNvPr id="7" name="Subtitle 6"/>
+          <p:cNvSpPr>
+            <a:spLocks noGrp="1"/>
+          </p:cNvSpPr>
+          <p:nvPr>
+            <p:ph type="subTitle" idx="1"/>
+          </p:nvPr>
+        </p:nvSpPr>
+        <p:spPr>
+          <a:xfrm>
+            <a:off x="1671638" y="3271838"/>
+            <a:ext cx="12319000" cy="4402591"/>
+          </a:xfrm>
+        </p:spPr>
+        <p:txBody>
+          <a:bodyPr/>
+          <a:lstStyle/>
+          <a:p>
+            <a:r>
+              <a:rPr lang="en-US" dirty="0" smtClean="0"/>
+              <a:t>Chef Compliance can run without any other Chef software installed on the Chef Compliance server machine.</a:t>
+            </a:r>
+          </a:p>
+          <a:p>
+            <a:endParaRPr lang="en-US" dirty="0"/>
+          </a:p>
+          <a:p>
+            <a:r>
+              <a:rPr lang="en-US" dirty="0" smtClean="0"/>
+              <a:t>However, you would need Chef software to create and implement remediation recipes if you choose to use recipes </a:t>
+            </a:r>
+            <a:r>
+              <a:rPr lang="en-US" dirty="0"/>
+              <a:t>to </a:t>
+            </a:r>
+            <a:r>
+              <a:rPr lang="en-US" dirty="0" smtClean="0"/>
+              <a:t>remediate compliance issues</a:t>
+            </a:r>
+            <a:r>
+              <a:rPr lang="en-US" dirty="0" smtClean="0"/>
+              <a:t>.</a:t>
+            </a:r>
+          </a:p>
+          <a:p>
+            <a:endParaRPr lang="en-US" dirty="0"/>
+          </a:p>
+          <a:p>
+            <a:r>
+              <a:rPr lang="en-US" b="1" dirty="0" smtClean="0"/>
+              <a:t>Note</a:t>
+            </a:r>
+            <a:r>
+              <a:rPr lang="en-US" dirty="0" smtClean="0"/>
+              <a:t>: You should have attended at least Chef Essentials, Chef Fundamentals or have equivalent Chef experience prior to attending this course.</a:t>
+            </a:r>
+            <a:endParaRPr lang="en-US" dirty="0"/>
+          </a:p>
+        </p:txBody>
+      </p:sp>
+    </p:spTree>
+    <p:extLst>
+      <p:ext uri="{BB962C8B-B14F-4D97-AF65-F5344CB8AC3E}">
+        <p14:creationId xmlns:p14="http://schemas.microsoft.com/office/powerpoint/2010/main" val="1431891172"/>
+      </p:ext>
+    </p:extLst>
+  </p:cSld>
+  <p:clrMapOvr>
+    <a:masterClrMapping/>
+  </p:clrMapOvr>
+  <p:transition spd="med">
+    <p:fade/>
+  </p:transition>
+  <p:timing>
+    <p:tnLst>
+      <p:par>
+        <p:cTn id="1" dur="indefinite" restart="never" nodeType="tmRoot"/>
+      </p:par>
+    </p:tnLst>
+  </p:timing>
+</p:sld>
+</file>
+
+<file path=ppt/slides/slide6.xml><?xml version="1.0" encoding="utf-8"?>
+<p:sld xmlns:a="http://schemas.openxmlformats.org/drawingml/2006/main" xmlns:r="http://schemas.openxmlformats.org/officeDocument/2006/relationships" xmlns:p="http://schemas.openxmlformats.org/presentationml/2006/main">
+  <p:cSld>
     <p:bg>
       <p:bgPr>
         <a:gradFill rotWithShape="0">
@@ -15103,7 +12902,7 @@
 </p:sld>
 </file>
 
-<file path=ppt/slides/slide6.xml><?xml version="1.0" encoding="utf-8"?>
+<file path=ppt/slides/slide7.xml><?xml version="1.0" encoding="utf-8"?>
 <p:sld xmlns:a="http://schemas.openxmlformats.org/drawingml/2006/main" xmlns:r="http://schemas.openxmlformats.org/officeDocument/2006/relationships" xmlns:p="http://schemas.openxmlformats.org/presentationml/2006/main">
   <p:cSld>
     <p:bg>
@@ -15304,7 +13103,7 @@
 </p:sld>
 </file>
 
-<file path=ppt/slides/slide7.xml><?xml version="1.0" encoding="utf-8"?>
+<file path=ppt/slides/slide8.xml><?xml version="1.0" encoding="utf-8"?>
 <p:sld xmlns:a="http://schemas.openxmlformats.org/drawingml/2006/main" xmlns:r="http://schemas.openxmlformats.org/officeDocument/2006/relationships" xmlns:p="http://schemas.openxmlformats.org/presentationml/2006/main">
   <p:cSld>
     <p:bg>
@@ -15446,140 +13245,6 @@
 </p:sld>
 </file>
 
-<file path=ppt/slides/slide8.xml><?xml version="1.0" encoding="utf-8"?>
-<p:sld xmlns:a="http://schemas.openxmlformats.org/drawingml/2006/main" xmlns:r="http://schemas.openxmlformats.org/officeDocument/2006/relationships" xmlns:p="http://schemas.openxmlformats.org/presentationml/2006/main">
-  <p:cSld>
-    <p:spTree>
-      <p:nvGrpSpPr>
-        <p:cNvPr id="1" name=""/>
-        <p:cNvGrpSpPr/>
-        <p:nvPr/>
-      </p:nvGrpSpPr>
-      <p:grpSpPr>
-        <a:xfrm>
-          <a:off x="0" y="0"/>
-          <a:ext cx="0" cy="0"/>
-          <a:chOff x="0" y="0"/>
-          <a:chExt cx="0" cy="0"/>
-        </a:xfrm>
-      </p:grpSpPr>
-      <p:sp>
-        <p:nvSpPr>
-          <p:cNvPr id="3" name="Text Placeholder 2"/>
-          <p:cNvSpPr>
-            <a:spLocks noGrp="1"/>
-          </p:cNvSpPr>
-          <p:nvPr>
-            <p:ph type="body" sz="quarter" idx="12"/>
-          </p:nvPr>
-        </p:nvSpPr>
-        <p:spPr>
-          <a:xfrm>
-            <a:off x="650039" y="2039078"/>
-            <a:ext cx="15207581" cy="5345953"/>
-          </a:xfrm>
-        </p:spPr>
-        <p:txBody>
-          <a:bodyPr/>
-          <a:lstStyle/>
-          <a:p>
-            <a:r>
-              <a:rPr lang="en-US" sz="3733" dirty="0" smtClean="0"/>
-              <a:t>We have provided two servers for you to use while performing lab exercises in this course:</a:t>
-            </a:r>
-          </a:p>
-          <a:p>
-            <a:endParaRPr lang="en-US" sz="3733" dirty="0"/>
-          </a:p>
-          <a:p>
-            <a:pPr marL="457200" indent="-457200">
-              <a:buFont typeface="Arial" panose="020B0604020202020204" pitchFamily="34" charset="0"/>
-              <a:buChar char="•"/>
-            </a:pPr>
-            <a:r>
-              <a:rPr lang="en-US" sz="3733" dirty="0" smtClean="0"/>
-              <a:t>One node to install and run Chef Compliance on.</a:t>
-            </a:r>
-          </a:p>
-          <a:p>
-            <a:pPr marL="457200" indent="-457200">
-              <a:buFont typeface="Arial" panose="020B0604020202020204" pitchFamily="34" charset="0"/>
-              <a:buChar char="•"/>
-            </a:pPr>
-            <a:endParaRPr lang="en-US" sz="3733" dirty="0"/>
-          </a:p>
-          <a:p>
-            <a:pPr marL="457200" indent="-457200">
-              <a:buFont typeface="Arial" panose="020B0604020202020204" pitchFamily="34" charset="0"/>
-              <a:buChar char="•"/>
-            </a:pPr>
-            <a:r>
-              <a:rPr lang="en-US" sz="3733" dirty="0" smtClean="0"/>
-              <a:t>One node to perform Chef Compliance tests against.</a:t>
-            </a:r>
-          </a:p>
-          <a:p>
-            <a:pPr marL="457200" indent="-457200">
-              <a:buFont typeface="Arial" panose="020B0604020202020204" pitchFamily="34" charset="0"/>
-              <a:buChar char="•"/>
-            </a:pPr>
-            <a:endParaRPr lang="de-DE" sz="3200" dirty="0"/>
-          </a:p>
-        </p:txBody>
-      </p:sp>
-      <p:sp>
-        <p:nvSpPr>
-          <p:cNvPr id="2" name="Title 1"/>
-          <p:cNvSpPr>
-            <a:spLocks noGrp="1"/>
-          </p:cNvSpPr>
-          <p:nvPr>
-            <p:ph type="title"/>
-          </p:nvPr>
-        </p:nvSpPr>
-        <p:spPr>
-          <a:xfrm>
-            <a:off x="609599" y="304800"/>
-            <a:ext cx="13178589" cy="1551398"/>
-          </a:xfrm>
-        </p:spPr>
-        <p:txBody>
-          <a:bodyPr>
-            <a:normAutofit/>
-          </a:bodyPr>
-          <a:lstStyle/>
-          <a:p>
-            <a:r>
-              <a:rPr lang="en-US" dirty="0" smtClean="0"/>
-              <a:t>Your Lab Environment</a:t>
-            </a:r>
-            <a:endParaRPr lang="en-US" dirty="0"/>
-          </a:p>
-        </p:txBody>
-      </p:sp>
-    </p:spTree>
-    <p:extLst>
-      <p:ext uri="{BB962C8B-B14F-4D97-AF65-F5344CB8AC3E}">
-        <p14:creationId xmlns:p14="http://schemas.microsoft.com/office/powerpoint/2010/main" val="828816777"/>
-      </p:ext>
-    </p:extLst>
-  </p:cSld>
-  <p:clrMapOvr>
-    <a:masterClrMapping/>
-  </p:clrMapOvr>
-  <p:transition spd="med">
-    <p:fade/>
-  </p:transition>
-  <p:timing>
-    <p:tnLst>
-      <p:par>
-        <p:cTn id="1" dur="indefinite" restart="never" nodeType="tmRoot"/>
-      </p:par>
-    </p:tnLst>
-  </p:timing>
-</p:sld>
-</file>
-
 <file path=ppt/slides/slide9.xml><?xml version="1.0" encoding="utf-8"?>
 <p:sld xmlns:a="http://schemas.openxmlformats.org/drawingml/2006/main" xmlns:r="http://schemas.openxmlformats.org/officeDocument/2006/relationships" xmlns:p="http://schemas.openxmlformats.org/presentationml/2006/main">
   <p:cSld>
@@ -15613,59 +13278,1131 @@
           <a:lstStyle/>
           <a:p>
             <a:r>
-              <a:rPr lang="en-US" smtClean="0"/>
-              <a:t>SSH Into the Remote Workstation</a:t>
-            </a:r>
-            <a:endParaRPr lang="en-US" dirty="0"/>
+              <a:rPr lang="en-US" dirty="0"/>
+              <a:t>Your Lab Environment</a:t>
+            </a:r>
           </a:p>
         </p:txBody>
       </p:sp>
-      <p:sp>
-        <p:nvSpPr>
-          <p:cNvPr id="11" name="Content Placeholder 10"/>
+      <p:cxnSp>
+        <p:nvCxnSpPr>
+          <p:cNvPr id="9" name="Straight Arrow Connector 8"/>
+          <p:cNvCxnSpPr/>
+          <p:nvPr/>
+        </p:nvCxnSpPr>
+        <p:spPr>
+          <a:xfrm flipH="1">
+            <a:off x="7559041" y="3787223"/>
+            <a:ext cx="1486329" cy="1688484"/>
+          </a:xfrm>
+          <a:prstGeom prst="straightConnector1">
+            <a:avLst/>
+          </a:prstGeom>
+          <a:ln>
+            <a:solidFill>
+              <a:schemeClr val="accent1"/>
+            </a:solidFill>
+            <a:headEnd type="triangle"/>
+            <a:tailEnd type="triangle"/>
+          </a:ln>
+        </p:spPr>
+        <p:style>
+          <a:lnRef idx="3">
+            <a:schemeClr val="accent1"/>
+          </a:lnRef>
+          <a:fillRef idx="0">
+            <a:schemeClr val="accent1"/>
+          </a:fillRef>
+          <a:effectRef idx="2">
+            <a:schemeClr val="accent1"/>
+          </a:effectRef>
+          <a:fontRef idx="minor">
+            <a:schemeClr val="tx1"/>
+          </a:fontRef>
+        </p:style>
+      </p:cxnSp>
+      <p:sp>
+        <p:nvSpPr>
+          <p:cNvPr id="11" name="Text Placeholder 2"/>
+          <p:cNvSpPr txBox="1">
+            <a:spLocks/>
+          </p:cNvSpPr>
+          <p:nvPr/>
+        </p:nvSpPr>
+        <p:spPr bwMode="white">
+          <a:xfrm>
+            <a:off x="4866106" y="7265658"/>
+            <a:ext cx="3678991" cy="685571"/>
+          </a:xfrm>
+          <a:prstGeom prst="rect">
+            <a:avLst/>
+          </a:prstGeom>
+        </p:spPr>
+        <p:txBody>
+          <a:bodyPr vert="horz" wrap="square" lIns="0" tIns="0" rIns="0" bIns="0" rtlCol="0">
+            <a:normAutofit/>
+          </a:bodyPr>
+          <a:lstStyle>
+            <a:lvl1pPr marL="0" indent="0" algn="l" defTabSz="914363" rtl="0" eaLnBrk="1" latinLnBrk="0" hangingPunct="1">
+              <a:lnSpc>
+                <a:spcPct val="100000"/>
+              </a:lnSpc>
+              <a:spcBef>
+                <a:spcPts val="600"/>
+              </a:spcBef>
+              <a:buSzPct val="90000"/>
+              <a:buFont typeface="Arial" pitchFamily="34" charset="0"/>
+              <a:buNone/>
+              <a:defRPr sz="3200" kern="1200" baseline="0">
+                <a:solidFill>
+                  <a:schemeClr val="accent3">
+                    <a:lumMod val="50000"/>
+                  </a:schemeClr>
+                </a:solidFill>
+                <a:latin typeface="+mn-lt"/>
+                <a:ea typeface="+mn-ea"/>
+                <a:cs typeface="+mn-cs"/>
+              </a:defRPr>
+            </a:lvl1pPr>
+            <a:lvl2pPr marL="231775" indent="0" algn="l" defTabSz="914363" rtl="0" eaLnBrk="1" latinLnBrk="0" hangingPunct="1">
+              <a:lnSpc>
+                <a:spcPct val="100000"/>
+              </a:lnSpc>
+              <a:spcBef>
+                <a:spcPts val="600"/>
+              </a:spcBef>
+              <a:buSzPct val="90000"/>
+              <a:buFont typeface="Arial" pitchFamily="34" charset="0"/>
+              <a:buNone/>
+              <a:defRPr sz="2800" kern="1200" baseline="0">
+                <a:solidFill>
+                  <a:schemeClr val="accent3">
+                    <a:lumMod val="50000"/>
+                  </a:schemeClr>
+                </a:solidFill>
+                <a:latin typeface="+mn-lt"/>
+                <a:ea typeface="+mn-ea"/>
+                <a:cs typeface="+mn-cs"/>
+              </a:defRPr>
+            </a:lvl2pPr>
+            <a:lvl3pPr marL="457200" indent="0" algn="l" defTabSz="914363" rtl="0" eaLnBrk="1" latinLnBrk="0" hangingPunct="1">
+              <a:lnSpc>
+                <a:spcPct val="100000"/>
+              </a:lnSpc>
+              <a:spcBef>
+                <a:spcPts val="600"/>
+              </a:spcBef>
+              <a:buSzPct val="90000"/>
+              <a:buFont typeface="Arial" pitchFamily="34" charset="0"/>
+              <a:buNone/>
+              <a:defRPr sz="2400" kern="1200" baseline="0">
+                <a:solidFill>
+                  <a:schemeClr val="accent3">
+                    <a:lumMod val="50000"/>
+                  </a:schemeClr>
+                </a:solidFill>
+                <a:latin typeface="+mn-lt"/>
+                <a:ea typeface="+mn-ea"/>
+                <a:cs typeface="+mn-cs"/>
+              </a:defRPr>
+            </a:lvl3pPr>
+            <a:lvl4pPr marL="630238" indent="0" algn="l" defTabSz="914363" rtl="0" eaLnBrk="1" latinLnBrk="0" hangingPunct="1">
+              <a:lnSpc>
+                <a:spcPct val="100000"/>
+              </a:lnSpc>
+              <a:spcBef>
+                <a:spcPts val="600"/>
+              </a:spcBef>
+              <a:buSzPct val="90000"/>
+              <a:buFont typeface="Arial" pitchFamily="34" charset="0"/>
+              <a:buNone/>
+              <a:defRPr sz="2000" kern="1200" baseline="0">
+                <a:solidFill>
+                  <a:schemeClr val="accent3">
+                    <a:lumMod val="50000"/>
+                  </a:schemeClr>
+                </a:solidFill>
+                <a:latin typeface="+mn-lt"/>
+                <a:ea typeface="+mn-ea"/>
+                <a:cs typeface="+mn-cs"/>
+              </a:defRPr>
+            </a:lvl4pPr>
+            <a:lvl5pPr marL="801687" indent="0" algn="l" defTabSz="914363" rtl="0" eaLnBrk="1" latinLnBrk="0" hangingPunct="1">
+              <a:lnSpc>
+                <a:spcPct val="100000"/>
+              </a:lnSpc>
+              <a:spcBef>
+                <a:spcPts val="600"/>
+              </a:spcBef>
+              <a:buSzPct val="90000"/>
+              <a:buFont typeface="Arial" pitchFamily="34" charset="0"/>
+              <a:buNone/>
+              <a:defRPr sz="1800" kern="1200" baseline="0">
+                <a:solidFill>
+                  <a:schemeClr val="accent3">
+                    <a:lumMod val="50000"/>
+                  </a:schemeClr>
+                </a:solidFill>
+                <a:latin typeface="+mn-lt"/>
+                <a:ea typeface="+mn-ea"/>
+                <a:cs typeface="+mn-cs"/>
+              </a:defRPr>
+            </a:lvl5pPr>
+            <a:lvl6pPr marL="2514499" indent="-228591" algn="l" defTabSz="914363" rtl="0" eaLnBrk="1" latinLnBrk="0" hangingPunct="1">
+              <a:spcBef>
+                <a:spcPct val="20000"/>
+              </a:spcBef>
+              <a:buFont typeface="Arial" pitchFamily="34" charset="0"/>
+              <a:buChar char="•"/>
+              <a:defRPr sz="2000" kern="1200">
+                <a:solidFill>
+                  <a:schemeClr val="tx1"/>
+                </a:solidFill>
+                <a:latin typeface="+mn-lt"/>
+                <a:ea typeface="+mn-ea"/>
+                <a:cs typeface="+mn-cs"/>
+              </a:defRPr>
+            </a:lvl6pPr>
+            <a:lvl7pPr marL="2971681" indent="-228591" algn="l" defTabSz="914363" rtl="0" eaLnBrk="1" latinLnBrk="0" hangingPunct="1">
+              <a:spcBef>
+                <a:spcPct val="20000"/>
+              </a:spcBef>
+              <a:buFont typeface="Arial" pitchFamily="34" charset="0"/>
+              <a:buChar char="•"/>
+              <a:defRPr sz="2000" kern="1200">
+                <a:solidFill>
+                  <a:schemeClr val="tx1"/>
+                </a:solidFill>
+                <a:latin typeface="+mn-lt"/>
+                <a:ea typeface="+mn-ea"/>
+                <a:cs typeface="+mn-cs"/>
+              </a:defRPr>
+            </a:lvl7pPr>
+            <a:lvl8pPr marL="3428863" indent="-228591" algn="l" defTabSz="914363" rtl="0" eaLnBrk="1" latinLnBrk="0" hangingPunct="1">
+              <a:spcBef>
+                <a:spcPct val="20000"/>
+              </a:spcBef>
+              <a:buFont typeface="Arial" pitchFamily="34" charset="0"/>
+              <a:buChar char="•"/>
+              <a:defRPr sz="2000" kern="1200">
+                <a:solidFill>
+                  <a:schemeClr val="tx1"/>
+                </a:solidFill>
+                <a:latin typeface="+mn-lt"/>
+                <a:ea typeface="+mn-ea"/>
+                <a:cs typeface="+mn-cs"/>
+              </a:defRPr>
+            </a:lvl8pPr>
+            <a:lvl9pPr marL="3886045" indent="-228591" algn="l" defTabSz="914363" rtl="0" eaLnBrk="1" latinLnBrk="0" hangingPunct="1">
+              <a:spcBef>
+                <a:spcPct val="20000"/>
+              </a:spcBef>
+              <a:buFont typeface="Arial" pitchFamily="34" charset="0"/>
+              <a:buChar char="•"/>
+              <a:defRPr sz="2000" kern="1200">
+                <a:solidFill>
+                  <a:schemeClr val="tx1"/>
+                </a:solidFill>
+                <a:latin typeface="+mn-lt"/>
+                <a:ea typeface="+mn-ea"/>
+                <a:cs typeface="+mn-cs"/>
+              </a:defRPr>
+            </a:lvl9pPr>
+          </a:lstStyle>
+          <a:p>
+            <a:pPr algn="ctr"/>
+            <a:r>
+              <a:rPr lang="en-US" sz="2667" dirty="0"/>
+              <a:t>Your Laptop</a:t>
+            </a:r>
+          </a:p>
+          <a:p>
+            <a:endParaRPr lang="en-US" sz="2667" dirty="0"/>
+          </a:p>
+          <a:p>
+            <a:endParaRPr lang="en-US" sz="4267" dirty="0"/>
+          </a:p>
+          <a:p>
+            <a:endParaRPr lang="en-US" sz="4267" dirty="0"/>
+          </a:p>
+        </p:txBody>
+      </p:sp>
+      <p:sp>
+        <p:nvSpPr>
+          <p:cNvPr id="12" name="Text Placeholder 2"/>
+          <p:cNvSpPr txBox="1">
+            <a:spLocks/>
+          </p:cNvSpPr>
+          <p:nvPr/>
+        </p:nvSpPr>
+        <p:spPr bwMode="white">
+          <a:xfrm>
+            <a:off x="8800950" y="4144980"/>
+            <a:ext cx="3230631" cy="1842629"/>
+          </a:xfrm>
+          <a:prstGeom prst="rect">
+            <a:avLst/>
+          </a:prstGeom>
+        </p:spPr>
+        <p:txBody>
+          <a:bodyPr vert="horz" wrap="square" lIns="0" tIns="0" rIns="0" bIns="0" rtlCol="0">
+            <a:normAutofit/>
+          </a:bodyPr>
+          <a:lstStyle>
+            <a:lvl1pPr marL="0" indent="0" algn="l" defTabSz="914363" rtl="0" eaLnBrk="1" latinLnBrk="0" hangingPunct="1">
+              <a:lnSpc>
+                <a:spcPct val="100000"/>
+              </a:lnSpc>
+              <a:spcBef>
+                <a:spcPts val="600"/>
+              </a:spcBef>
+              <a:buSzPct val="90000"/>
+              <a:buFont typeface="Arial" pitchFamily="34" charset="0"/>
+              <a:buNone/>
+              <a:defRPr sz="3200" kern="1200" baseline="0">
+                <a:solidFill>
+                  <a:schemeClr val="accent3">
+                    <a:lumMod val="50000"/>
+                  </a:schemeClr>
+                </a:solidFill>
+                <a:latin typeface="+mn-lt"/>
+                <a:ea typeface="+mn-ea"/>
+                <a:cs typeface="+mn-cs"/>
+              </a:defRPr>
+            </a:lvl1pPr>
+            <a:lvl2pPr marL="231775" indent="0" algn="l" defTabSz="914363" rtl="0" eaLnBrk="1" latinLnBrk="0" hangingPunct="1">
+              <a:lnSpc>
+                <a:spcPct val="100000"/>
+              </a:lnSpc>
+              <a:spcBef>
+                <a:spcPts val="600"/>
+              </a:spcBef>
+              <a:buSzPct val="90000"/>
+              <a:buFont typeface="Arial" pitchFamily="34" charset="0"/>
+              <a:buNone/>
+              <a:defRPr sz="2800" kern="1200" baseline="0">
+                <a:solidFill>
+                  <a:schemeClr val="accent3">
+                    <a:lumMod val="50000"/>
+                  </a:schemeClr>
+                </a:solidFill>
+                <a:latin typeface="+mn-lt"/>
+                <a:ea typeface="+mn-ea"/>
+                <a:cs typeface="+mn-cs"/>
+              </a:defRPr>
+            </a:lvl2pPr>
+            <a:lvl3pPr marL="457200" indent="0" algn="l" defTabSz="914363" rtl="0" eaLnBrk="1" latinLnBrk="0" hangingPunct="1">
+              <a:lnSpc>
+                <a:spcPct val="100000"/>
+              </a:lnSpc>
+              <a:spcBef>
+                <a:spcPts val="600"/>
+              </a:spcBef>
+              <a:buSzPct val="90000"/>
+              <a:buFont typeface="Arial" pitchFamily="34" charset="0"/>
+              <a:buNone/>
+              <a:defRPr sz="2400" kern="1200" baseline="0">
+                <a:solidFill>
+                  <a:schemeClr val="accent3">
+                    <a:lumMod val="50000"/>
+                  </a:schemeClr>
+                </a:solidFill>
+                <a:latin typeface="+mn-lt"/>
+                <a:ea typeface="+mn-ea"/>
+                <a:cs typeface="+mn-cs"/>
+              </a:defRPr>
+            </a:lvl3pPr>
+            <a:lvl4pPr marL="630238" indent="0" algn="l" defTabSz="914363" rtl="0" eaLnBrk="1" latinLnBrk="0" hangingPunct="1">
+              <a:lnSpc>
+                <a:spcPct val="100000"/>
+              </a:lnSpc>
+              <a:spcBef>
+                <a:spcPts val="600"/>
+              </a:spcBef>
+              <a:buSzPct val="90000"/>
+              <a:buFont typeface="Arial" pitchFamily="34" charset="0"/>
+              <a:buNone/>
+              <a:defRPr sz="2000" kern="1200" baseline="0">
+                <a:solidFill>
+                  <a:schemeClr val="accent3">
+                    <a:lumMod val="50000"/>
+                  </a:schemeClr>
+                </a:solidFill>
+                <a:latin typeface="+mn-lt"/>
+                <a:ea typeface="+mn-ea"/>
+                <a:cs typeface="+mn-cs"/>
+              </a:defRPr>
+            </a:lvl4pPr>
+            <a:lvl5pPr marL="801687" indent="0" algn="l" defTabSz="914363" rtl="0" eaLnBrk="1" latinLnBrk="0" hangingPunct="1">
+              <a:lnSpc>
+                <a:spcPct val="100000"/>
+              </a:lnSpc>
+              <a:spcBef>
+                <a:spcPts val="600"/>
+              </a:spcBef>
+              <a:buSzPct val="90000"/>
+              <a:buFont typeface="Arial" pitchFamily="34" charset="0"/>
+              <a:buNone/>
+              <a:defRPr sz="1800" kern="1200" baseline="0">
+                <a:solidFill>
+                  <a:schemeClr val="accent3">
+                    <a:lumMod val="50000"/>
+                  </a:schemeClr>
+                </a:solidFill>
+                <a:latin typeface="+mn-lt"/>
+                <a:ea typeface="+mn-ea"/>
+                <a:cs typeface="+mn-cs"/>
+              </a:defRPr>
+            </a:lvl5pPr>
+            <a:lvl6pPr marL="2514499" indent="-228591" algn="l" defTabSz="914363" rtl="0" eaLnBrk="1" latinLnBrk="0" hangingPunct="1">
+              <a:spcBef>
+                <a:spcPct val="20000"/>
+              </a:spcBef>
+              <a:buFont typeface="Arial" pitchFamily="34" charset="0"/>
+              <a:buChar char="•"/>
+              <a:defRPr sz="2000" kern="1200">
+                <a:solidFill>
+                  <a:schemeClr val="tx1"/>
+                </a:solidFill>
+                <a:latin typeface="+mn-lt"/>
+                <a:ea typeface="+mn-ea"/>
+                <a:cs typeface="+mn-cs"/>
+              </a:defRPr>
+            </a:lvl6pPr>
+            <a:lvl7pPr marL="2971681" indent="-228591" algn="l" defTabSz="914363" rtl="0" eaLnBrk="1" latinLnBrk="0" hangingPunct="1">
+              <a:spcBef>
+                <a:spcPct val="20000"/>
+              </a:spcBef>
+              <a:buFont typeface="Arial" pitchFamily="34" charset="0"/>
+              <a:buChar char="•"/>
+              <a:defRPr sz="2000" kern="1200">
+                <a:solidFill>
+                  <a:schemeClr val="tx1"/>
+                </a:solidFill>
+                <a:latin typeface="+mn-lt"/>
+                <a:ea typeface="+mn-ea"/>
+                <a:cs typeface="+mn-cs"/>
+              </a:defRPr>
+            </a:lvl7pPr>
+            <a:lvl8pPr marL="3428863" indent="-228591" algn="l" defTabSz="914363" rtl="0" eaLnBrk="1" latinLnBrk="0" hangingPunct="1">
+              <a:spcBef>
+                <a:spcPct val="20000"/>
+              </a:spcBef>
+              <a:buFont typeface="Arial" pitchFamily="34" charset="0"/>
+              <a:buChar char="•"/>
+              <a:defRPr sz="2000" kern="1200">
+                <a:solidFill>
+                  <a:schemeClr val="tx1"/>
+                </a:solidFill>
+                <a:latin typeface="+mn-lt"/>
+                <a:ea typeface="+mn-ea"/>
+                <a:cs typeface="+mn-cs"/>
+              </a:defRPr>
+            </a:lvl8pPr>
+            <a:lvl9pPr marL="3886045" indent="-228591" algn="l" defTabSz="914363" rtl="0" eaLnBrk="1" latinLnBrk="0" hangingPunct="1">
+              <a:spcBef>
+                <a:spcPct val="20000"/>
+              </a:spcBef>
+              <a:buFont typeface="Arial" pitchFamily="34" charset="0"/>
+              <a:buChar char="•"/>
+              <a:defRPr sz="2000" kern="1200">
+                <a:solidFill>
+                  <a:schemeClr val="tx1"/>
+                </a:solidFill>
+                <a:latin typeface="+mn-lt"/>
+                <a:ea typeface="+mn-ea"/>
+                <a:cs typeface="+mn-cs"/>
+              </a:defRPr>
+            </a:lvl9pPr>
+          </a:lstStyle>
+          <a:p>
+            <a:pPr algn="ctr"/>
+            <a:r>
+              <a:rPr lang="en-US" sz="2667" dirty="0" smtClean="0"/>
+              <a:t>Server on which to install Chef Compliance</a:t>
+            </a:r>
+            <a:endParaRPr lang="en-US" sz="2667" dirty="0"/>
+          </a:p>
+          <a:p>
+            <a:endParaRPr lang="en-US" sz="2667" dirty="0"/>
+          </a:p>
+          <a:p>
+            <a:endParaRPr lang="en-US" sz="2667" dirty="0"/>
+          </a:p>
+          <a:p>
+            <a:endParaRPr lang="en-US" sz="4267" dirty="0"/>
+          </a:p>
+          <a:p>
+            <a:endParaRPr lang="en-US" sz="4267" dirty="0"/>
+          </a:p>
+        </p:txBody>
+      </p:sp>
+      <p:pic>
+        <p:nvPicPr>
+          <p:cNvPr id="5" name="Picture 4"/>
+          <p:cNvPicPr>
+            <a:picLocks noChangeAspect="1"/>
+          </p:cNvPicPr>
+          <p:nvPr/>
+        </p:nvPicPr>
+        <p:blipFill>
+          <a:blip r:embed="rId3">
+            <a:extLst>
+              <a:ext uri="{28A0092B-C50C-407E-A947-70E740481C1C}">
+                <a14:useLocalDpi xmlns:a14="http://schemas.microsoft.com/office/drawing/2010/main" val="0"/>
+              </a:ext>
+            </a:extLst>
+          </a:blip>
+          <a:stretch>
+            <a:fillRect/>
+          </a:stretch>
+        </p:blipFill>
+        <p:spPr>
+          <a:xfrm>
+            <a:off x="9047831" y="2073655"/>
+            <a:ext cx="2151627" cy="2294080"/>
+          </a:xfrm>
+          <a:prstGeom prst="rect">
+            <a:avLst/>
+          </a:prstGeom>
+        </p:spPr>
+      </p:pic>
+      <p:pic>
+        <p:nvPicPr>
+          <p:cNvPr id="3" name="Picture 2"/>
+          <p:cNvPicPr>
+            <a:picLocks noChangeAspect="1"/>
+          </p:cNvPicPr>
+          <p:nvPr/>
+        </p:nvPicPr>
+        <p:blipFill>
+          <a:blip r:embed="rId4">
+            <a:extLst>
+              <a:ext uri="{28A0092B-C50C-407E-A947-70E740481C1C}">
+                <a14:useLocalDpi xmlns:a14="http://schemas.microsoft.com/office/drawing/2010/main" val="0"/>
+              </a:ext>
+            </a:extLst>
+          </a:blip>
+          <a:stretch>
+            <a:fillRect/>
+          </a:stretch>
+        </p:blipFill>
+        <p:spPr>
+          <a:xfrm>
+            <a:off x="5831738" y="5771901"/>
+            <a:ext cx="1701573" cy="1283742"/>
+          </a:xfrm>
+          <a:prstGeom prst="rect">
+            <a:avLst/>
+          </a:prstGeom>
+        </p:spPr>
+      </p:pic>
+      <p:pic>
+        <p:nvPicPr>
+          <p:cNvPr id="13" name="Picture 12"/>
+          <p:cNvPicPr>
+            <a:picLocks noChangeAspect="1"/>
+          </p:cNvPicPr>
+          <p:nvPr/>
+        </p:nvPicPr>
+        <p:blipFill>
+          <a:blip r:embed="rId3">
+            <a:extLst>
+              <a:ext uri="{28A0092B-C50C-407E-A947-70E740481C1C}">
+                <a14:useLocalDpi xmlns:a14="http://schemas.microsoft.com/office/drawing/2010/main" val="0"/>
+              </a:ext>
+            </a:extLst>
+          </a:blip>
+          <a:stretch>
+            <a:fillRect/>
+          </a:stretch>
+        </p:blipFill>
+        <p:spPr>
+          <a:xfrm>
+            <a:off x="13796296" y="1985425"/>
+            <a:ext cx="2151627" cy="2294080"/>
+          </a:xfrm>
+          <a:prstGeom prst="rect">
+            <a:avLst/>
+          </a:prstGeom>
+        </p:spPr>
+      </p:pic>
+      <p:sp>
+        <p:nvSpPr>
+          <p:cNvPr id="14" name="Text Placeholder 2"/>
+          <p:cNvSpPr txBox="1">
+            <a:spLocks/>
+          </p:cNvSpPr>
+          <p:nvPr/>
+        </p:nvSpPr>
+        <p:spPr bwMode="white">
+          <a:xfrm>
+            <a:off x="13236590" y="4153002"/>
+            <a:ext cx="3230631" cy="1842629"/>
+          </a:xfrm>
+          <a:prstGeom prst="rect">
+            <a:avLst/>
+          </a:prstGeom>
+        </p:spPr>
+        <p:txBody>
+          <a:bodyPr vert="horz" wrap="square" lIns="0" tIns="0" rIns="0" bIns="0" rtlCol="0">
+            <a:normAutofit/>
+          </a:bodyPr>
+          <a:lstStyle>
+            <a:lvl1pPr marL="0" indent="0" algn="l" defTabSz="914363" rtl="0" eaLnBrk="1" latinLnBrk="0" hangingPunct="1">
+              <a:lnSpc>
+                <a:spcPct val="100000"/>
+              </a:lnSpc>
+              <a:spcBef>
+                <a:spcPts val="600"/>
+              </a:spcBef>
+              <a:buSzPct val="90000"/>
+              <a:buFont typeface="Arial" pitchFamily="34" charset="0"/>
+              <a:buNone/>
+              <a:defRPr sz="3200" kern="1200" baseline="0">
+                <a:solidFill>
+                  <a:schemeClr val="accent3">
+                    <a:lumMod val="50000"/>
+                  </a:schemeClr>
+                </a:solidFill>
+                <a:latin typeface="+mn-lt"/>
+                <a:ea typeface="+mn-ea"/>
+                <a:cs typeface="+mn-cs"/>
+              </a:defRPr>
+            </a:lvl1pPr>
+            <a:lvl2pPr marL="231775" indent="0" algn="l" defTabSz="914363" rtl="0" eaLnBrk="1" latinLnBrk="0" hangingPunct="1">
+              <a:lnSpc>
+                <a:spcPct val="100000"/>
+              </a:lnSpc>
+              <a:spcBef>
+                <a:spcPts val="600"/>
+              </a:spcBef>
+              <a:buSzPct val="90000"/>
+              <a:buFont typeface="Arial" pitchFamily="34" charset="0"/>
+              <a:buNone/>
+              <a:defRPr sz="2800" kern="1200" baseline="0">
+                <a:solidFill>
+                  <a:schemeClr val="accent3">
+                    <a:lumMod val="50000"/>
+                  </a:schemeClr>
+                </a:solidFill>
+                <a:latin typeface="+mn-lt"/>
+                <a:ea typeface="+mn-ea"/>
+                <a:cs typeface="+mn-cs"/>
+              </a:defRPr>
+            </a:lvl2pPr>
+            <a:lvl3pPr marL="457200" indent="0" algn="l" defTabSz="914363" rtl="0" eaLnBrk="1" latinLnBrk="0" hangingPunct="1">
+              <a:lnSpc>
+                <a:spcPct val="100000"/>
+              </a:lnSpc>
+              <a:spcBef>
+                <a:spcPts val="600"/>
+              </a:spcBef>
+              <a:buSzPct val="90000"/>
+              <a:buFont typeface="Arial" pitchFamily="34" charset="0"/>
+              <a:buNone/>
+              <a:defRPr sz="2400" kern="1200" baseline="0">
+                <a:solidFill>
+                  <a:schemeClr val="accent3">
+                    <a:lumMod val="50000"/>
+                  </a:schemeClr>
+                </a:solidFill>
+                <a:latin typeface="+mn-lt"/>
+                <a:ea typeface="+mn-ea"/>
+                <a:cs typeface="+mn-cs"/>
+              </a:defRPr>
+            </a:lvl3pPr>
+            <a:lvl4pPr marL="630238" indent="0" algn="l" defTabSz="914363" rtl="0" eaLnBrk="1" latinLnBrk="0" hangingPunct="1">
+              <a:lnSpc>
+                <a:spcPct val="100000"/>
+              </a:lnSpc>
+              <a:spcBef>
+                <a:spcPts val="600"/>
+              </a:spcBef>
+              <a:buSzPct val="90000"/>
+              <a:buFont typeface="Arial" pitchFamily="34" charset="0"/>
+              <a:buNone/>
+              <a:defRPr sz="2000" kern="1200" baseline="0">
+                <a:solidFill>
+                  <a:schemeClr val="accent3">
+                    <a:lumMod val="50000"/>
+                  </a:schemeClr>
+                </a:solidFill>
+                <a:latin typeface="+mn-lt"/>
+                <a:ea typeface="+mn-ea"/>
+                <a:cs typeface="+mn-cs"/>
+              </a:defRPr>
+            </a:lvl4pPr>
+            <a:lvl5pPr marL="801687" indent="0" algn="l" defTabSz="914363" rtl="0" eaLnBrk="1" latinLnBrk="0" hangingPunct="1">
+              <a:lnSpc>
+                <a:spcPct val="100000"/>
+              </a:lnSpc>
+              <a:spcBef>
+                <a:spcPts val="600"/>
+              </a:spcBef>
+              <a:buSzPct val="90000"/>
+              <a:buFont typeface="Arial" pitchFamily="34" charset="0"/>
+              <a:buNone/>
+              <a:defRPr sz="1800" kern="1200" baseline="0">
+                <a:solidFill>
+                  <a:schemeClr val="accent3">
+                    <a:lumMod val="50000"/>
+                  </a:schemeClr>
+                </a:solidFill>
+                <a:latin typeface="+mn-lt"/>
+                <a:ea typeface="+mn-ea"/>
+                <a:cs typeface="+mn-cs"/>
+              </a:defRPr>
+            </a:lvl5pPr>
+            <a:lvl6pPr marL="2514499" indent="-228591" algn="l" defTabSz="914363" rtl="0" eaLnBrk="1" latinLnBrk="0" hangingPunct="1">
+              <a:spcBef>
+                <a:spcPct val="20000"/>
+              </a:spcBef>
+              <a:buFont typeface="Arial" pitchFamily="34" charset="0"/>
+              <a:buChar char="•"/>
+              <a:defRPr sz="2000" kern="1200">
+                <a:solidFill>
+                  <a:schemeClr val="tx1"/>
+                </a:solidFill>
+                <a:latin typeface="+mn-lt"/>
+                <a:ea typeface="+mn-ea"/>
+                <a:cs typeface="+mn-cs"/>
+              </a:defRPr>
+            </a:lvl6pPr>
+            <a:lvl7pPr marL="2971681" indent="-228591" algn="l" defTabSz="914363" rtl="0" eaLnBrk="1" latinLnBrk="0" hangingPunct="1">
+              <a:spcBef>
+                <a:spcPct val="20000"/>
+              </a:spcBef>
+              <a:buFont typeface="Arial" pitchFamily="34" charset="0"/>
+              <a:buChar char="•"/>
+              <a:defRPr sz="2000" kern="1200">
+                <a:solidFill>
+                  <a:schemeClr val="tx1"/>
+                </a:solidFill>
+                <a:latin typeface="+mn-lt"/>
+                <a:ea typeface="+mn-ea"/>
+                <a:cs typeface="+mn-cs"/>
+              </a:defRPr>
+            </a:lvl7pPr>
+            <a:lvl8pPr marL="3428863" indent="-228591" algn="l" defTabSz="914363" rtl="0" eaLnBrk="1" latinLnBrk="0" hangingPunct="1">
+              <a:spcBef>
+                <a:spcPct val="20000"/>
+              </a:spcBef>
+              <a:buFont typeface="Arial" pitchFamily="34" charset="0"/>
+              <a:buChar char="•"/>
+              <a:defRPr sz="2000" kern="1200">
+                <a:solidFill>
+                  <a:schemeClr val="tx1"/>
+                </a:solidFill>
+                <a:latin typeface="+mn-lt"/>
+                <a:ea typeface="+mn-ea"/>
+                <a:cs typeface="+mn-cs"/>
+              </a:defRPr>
+            </a:lvl8pPr>
+            <a:lvl9pPr marL="3886045" indent="-228591" algn="l" defTabSz="914363" rtl="0" eaLnBrk="1" latinLnBrk="0" hangingPunct="1">
+              <a:spcBef>
+                <a:spcPct val="20000"/>
+              </a:spcBef>
+              <a:buFont typeface="Arial" pitchFamily="34" charset="0"/>
+              <a:buChar char="•"/>
+              <a:defRPr sz="2000" kern="1200">
+                <a:solidFill>
+                  <a:schemeClr val="tx1"/>
+                </a:solidFill>
+                <a:latin typeface="+mn-lt"/>
+                <a:ea typeface="+mn-ea"/>
+                <a:cs typeface="+mn-cs"/>
+              </a:defRPr>
+            </a:lvl9pPr>
+          </a:lstStyle>
+          <a:p>
+            <a:pPr algn="ctr"/>
+            <a:r>
+              <a:rPr lang="en-US" sz="2667" dirty="0" smtClean="0"/>
+              <a:t>Node to run Compliance tests against</a:t>
+            </a:r>
+            <a:endParaRPr lang="en-US" sz="2667" dirty="0"/>
+          </a:p>
+          <a:p>
+            <a:endParaRPr lang="en-US" sz="2667" dirty="0"/>
+          </a:p>
+          <a:p>
+            <a:endParaRPr lang="en-US" sz="2667" dirty="0"/>
+          </a:p>
+          <a:p>
+            <a:endParaRPr lang="en-US" sz="4267" dirty="0"/>
+          </a:p>
+          <a:p>
+            <a:endParaRPr lang="en-US" sz="4267" dirty="0"/>
+          </a:p>
+        </p:txBody>
+      </p:sp>
+      <p:cxnSp>
+        <p:nvCxnSpPr>
+          <p:cNvPr id="16" name="Straight Arrow Connector 15"/>
+          <p:cNvCxnSpPr/>
+          <p:nvPr/>
+        </p:nvCxnSpPr>
+        <p:spPr>
+          <a:xfrm flipH="1" flipV="1">
+            <a:off x="10924674" y="2959768"/>
+            <a:ext cx="3194537" cy="25966"/>
+          </a:xfrm>
+          <a:prstGeom prst="straightConnector1">
+            <a:avLst/>
+          </a:prstGeom>
+          <a:ln>
+            <a:solidFill>
+              <a:schemeClr val="accent1"/>
+            </a:solidFill>
+            <a:headEnd type="triangle"/>
+            <a:tailEnd type="triangle"/>
+          </a:ln>
+        </p:spPr>
+        <p:style>
+          <a:lnRef idx="3">
+            <a:schemeClr val="accent1"/>
+          </a:lnRef>
+          <a:fillRef idx="0">
+            <a:schemeClr val="accent1"/>
+          </a:fillRef>
+          <a:effectRef idx="2">
+            <a:schemeClr val="accent1"/>
+          </a:effectRef>
+          <a:fontRef idx="minor">
+            <a:schemeClr val="tx1"/>
+          </a:fontRef>
+        </p:style>
+      </p:cxnSp>
+      <p:sp>
+        <p:nvSpPr>
+          <p:cNvPr id="15" name="Cloud 14"/>
+          <p:cNvSpPr/>
+          <p:nvPr/>
+        </p:nvSpPr>
+        <p:spPr bwMode="auto">
+          <a:xfrm>
+            <a:off x="11678784" y="2367977"/>
+            <a:ext cx="1638185" cy="1121554"/>
+          </a:xfrm>
+          <a:prstGeom prst="cloud">
+            <a:avLst/>
+          </a:prstGeom>
+          <a:solidFill>
+            <a:schemeClr val="bg1"/>
+          </a:solidFill>
+          <a:ln>
+            <a:solidFill>
+              <a:schemeClr val="accent1"/>
+            </a:solidFill>
+            <a:headEnd type="none" w="med" len="med"/>
+            <a:tailEnd type="none" w="med" len="med"/>
+          </a:ln>
+          <a:effectLst/>
+        </p:spPr>
+        <p:style>
+          <a:lnRef idx="1">
+            <a:schemeClr val="accent4"/>
+          </a:lnRef>
+          <a:fillRef idx="3">
+            <a:schemeClr val="accent4"/>
+          </a:fillRef>
+          <a:effectRef idx="2">
+            <a:schemeClr val="accent4"/>
+          </a:effectRef>
+          <a:fontRef idx="minor">
+            <a:schemeClr val="lt1"/>
+          </a:fontRef>
+        </p:style>
+        <p:txBody>
+          <a:bodyPr vert="horz" wrap="square" lIns="91436" tIns="45718" rIns="91436" bIns="45718" numCol="1" rtlCol="0" anchor="ctr" anchorCtr="0" compatLnSpc="1">
+            <a:prstTxWarp prst="textNoShape">
+              <a:avLst/>
+            </a:prstTxWarp>
+          </a:bodyPr>
+          <a:lstStyle/>
+          <a:p>
+            <a:pPr algn="r" defTabSz="914099"/>
+            <a:endParaRPr lang="en-US" sz="2400" dirty="0" smtClean="0">
+              <a:solidFill>
+                <a:schemeClr val="tx1"/>
+              </a:solidFill>
+            </a:endParaRPr>
+          </a:p>
+        </p:txBody>
+      </p:sp>
+      <p:sp>
+        <p:nvSpPr>
+          <p:cNvPr id="23" name="Text Placeholder 2"/>
           <p:cNvSpPr>
             <a:spLocks noGrp="1"/>
           </p:cNvSpPr>
           <p:nvPr>
-            <p:ph sz="quarter" idx="10"/>
+            <p:ph type="body" sz="quarter" idx="12"/>
           </p:nvPr>
         </p:nvSpPr>
-        <p:spPr/>
+        <p:spPr>
+          <a:xfrm>
+            <a:off x="337220" y="1317184"/>
+            <a:ext cx="6017521" cy="5345953"/>
+          </a:xfrm>
+        </p:spPr>
         <p:txBody>
           <a:bodyPr/>
           <a:lstStyle/>
           <a:p>
-            <a:endParaRPr lang="en-US"/>
+            <a:r>
+              <a:rPr lang="en-US" dirty="0" smtClean="0"/>
+              <a:t>We will provide two servers for you to use while performing lab exercises in this course:</a:t>
+            </a:r>
+          </a:p>
+          <a:p>
+            <a:endParaRPr lang="en-US" dirty="0"/>
+          </a:p>
+          <a:p>
+            <a:pPr marL="457200" indent="-457200">
+              <a:buFont typeface="Arial" panose="020B0604020202020204" pitchFamily="34" charset="0"/>
+              <a:buChar char="•"/>
+            </a:pPr>
+            <a:r>
+              <a:rPr lang="en-US" dirty="0" smtClean="0"/>
+              <a:t>One to install and run Chef Compliance on.</a:t>
+            </a:r>
+            <a:endParaRPr lang="en-US" dirty="0"/>
+          </a:p>
+          <a:p>
+            <a:pPr marL="457200" indent="-457200">
+              <a:buFont typeface="Arial" panose="020B0604020202020204" pitchFamily="34" charset="0"/>
+              <a:buChar char="•"/>
+            </a:pPr>
+            <a:r>
+              <a:rPr lang="en-US" dirty="0" smtClean="0"/>
+              <a:t>One node to perform Chef Compliance tests against.</a:t>
+            </a:r>
+          </a:p>
+          <a:p>
+            <a:pPr marL="457200" indent="-457200">
+              <a:buFont typeface="Arial" panose="020B0604020202020204" pitchFamily="34" charset="0"/>
+              <a:buChar char="•"/>
+            </a:pPr>
+            <a:endParaRPr lang="de-DE" sz="3200" dirty="0"/>
           </a:p>
         </p:txBody>
       </p:sp>
       <p:sp>
         <p:nvSpPr>
-          <p:cNvPr id="4" name="Text Placeholder 3"/>
-          <p:cNvSpPr>
-            <a:spLocks noGrp="1"/>
+          <p:cNvPr id="24" name="Text Placeholder 2"/>
+          <p:cNvSpPr txBox="1">
+            <a:spLocks/>
           </p:cNvSpPr>
-          <p:nvPr>
-            <p:ph type="body" sz="quarter" idx="11"/>
-          </p:nvPr>
-        </p:nvSpPr>
-        <p:spPr/>
+          <p:nvPr/>
+        </p:nvSpPr>
+        <p:spPr bwMode="white">
+          <a:xfrm rot="18840107">
+            <a:off x="7315020" y="4231308"/>
+            <a:ext cx="1524361" cy="594737"/>
+          </a:xfrm>
+          <a:prstGeom prst="rect">
+            <a:avLst/>
+          </a:prstGeom>
+        </p:spPr>
         <p:txBody>
-          <a:bodyPr/>
-          <a:lstStyle/>
-          <a:p>
-            <a:r>
-              <a:rPr lang="en-US" smtClean="0"/>
-              <a:t>$ ssh ADDRESS -l chef</a:t>
-            </a:r>
-            <a:endParaRPr lang="en-US" dirty="0"/>
+          <a:bodyPr vert="horz" wrap="square" lIns="0" tIns="0" rIns="0" bIns="0" rtlCol="0">
+            <a:normAutofit/>
+          </a:bodyPr>
+          <a:lstStyle>
+            <a:lvl1pPr marL="0" indent="0" algn="l" defTabSz="914363" rtl="0" eaLnBrk="1" latinLnBrk="0" hangingPunct="1">
+              <a:lnSpc>
+                <a:spcPct val="100000"/>
+              </a:lnSpc>
+              <a:spcBef>
+                <a:spcPts val="600"/>
+              </a:spcBef>
+              <a:buSzPct val="90000"/>
+              <a:buFont typeface="Arial" pitchFamily="34" charset="0"/>
+              <a:buNone/>
+              <a:defRPr sz="3200" kern="1200" baseline="0">
+                <a:solidFill>
+                  <a:schemeClr val="accent3">
+                    <a:lumMod val="50000"/>
+                  </a:schemeClr>
+                </a:solidFill>
+                <a:latin typeface="+mn-lt"/>
+                <a:ea typeface="+mn-ea"/>
+                <a:cs typeface="+mn-cs"/>
+              </a:defRPr>
+            </a:lvl1pPr>
+            <a:lvl2pPr marL="231775" indent="0" algn="l" defTabSz="914363" rtl="0" eaLnBrk="1" latinLnBrk="0" hangingPunct="1">
+              <a:lnSpc>
+                <a:spcPct val="100000"/>
+              </a:lnSpc>
+              <a:spcBef>
+                <a:spcPts val="600"/>
+              </a:spcBef>
+              <a:buSzPct val="90000"/>
+              <a:buFont typeface="Arial" pitchFamily="34" charset="0"/>
+              <a:buNone/>
+              <a:defRPr sz="2800" kern="1200" baseline="0">
+                <a:solidFill>
+                  <a:schemeClr val="accent3">
+                    <a:lumMod val="50000"/>
+                  </a:schemeClr>
+                </a:solidFill>
+                <a:latin typeface="+mn-lt"/>
+                <a:ea typeface="+mn-ea"/>
+                <a:cs typeface="+mn-cs"/>
+              </a:defRPr>
+            </a:lvl2pPr>
+            <a:lvl3pPr marL="457200" indent="0" algn="l" defTabSz="914363" rtl="0" eaLnBrk="1" latinLnBrk="0" hangingPunct="1">
+              <a:lnSpc>
+                <a:spcPct val="100000"/>
+              </a:lnSpc>
+              <a:spcBef>
+                <a:spcPts val="600"/>
+              </a:spcBef>
+              <a:buSzPct val="90000"/>
+              <a:buFont typeface="Arial" pitchFamily="34" charset="0"/>
+              <a:buNone/>
+              <a:defRPr sz="2400" kern="1200" baseline="0">
+                <a:solidFill>
+                  <a:schemeClr val="accent3">
+                    <a:lumMod val="50000"/>
+                  </a:schemeClr>
+                </a:solidFill>
+                <a:latin typeface="+mn-lt"/>
+                <a:ea typeface="+mn-ea"/>
+                <a:cs typeface="+mn-cs"/>
+              </a:defRPr>
+            </a:lvl3pPr>
+            <a:lvl4pPr marL="630238" indent="0" algn="l" defTabSz="914363" rtl="0" eaLnBrk="1" latinLnBrk="0" hangingPunct="1">
+              <a:lnSpc>
+                <a:spcPct val="100000"/>
+              </a:lnSpc>
+              <a:spcBef>
+                <a:spcPts val="600"/>
+              </a:spcBef>
+              <a:buSzPct val="90000"/>
+              <a:buFont typeface="Arial" pitchFamily="34" charset="0"/>
+              <a:buNone/>
+              <a:defRPr sz="2000" kern="1200" baseline="0">
+                <a:solidFill>
+                  <a:schemeClr val="accent3">
+                    <a:lumMod val="50000"/>
+                  </a:schemeClr>
+                </a:solidFill>
+                <a:latin typeface="+mn-lt"/>
+                <a:ea typeface="+mn-ea"/>
+                <a:cs typeface="+mn-cs"/>
+              </a:defRPr>
+            </a:lvl4pPr>
+            <a:lvl5pPr marL="801687" indent="0" algn="l" defTabSz="914363" rtl="0" eaLnBrk="1" latinLnBrk="0" hangingPunct="1">
+              <a:lnSpc>
+                <a:spcPct val="100000"/>
+              </a:lnSpc>
+              <a:spcBef>
+                <a:spcPts val="600"/>
+              </a:spcBef>
+              <a:buSzPct val="90000"/>
+              <a:buFont typeface="Arial" pitchFamily="34" charset="0"/>
+              <a:buNone/>
+              <a:defRPr sz="1800" kern="1200" baseline="0">
+                <a:solidFill>
+                  <a:schemeClr val="accent3">
+                    <a:lumMod val="50000"/>
+                  </a:schemeClr>
+                </a:solidFill>
+                <a:latin typeface="+mn-lt"/>
+                <a:ea typeface="+mn-ea"/>
+                <a:cs typeface="+mn-cs"/>
+              </a:defRPr>
+            </a:lvl5pPr>
+            <a:lvl6pPr marL="2514499" indent="-228591" algn="l" defTabSz="914363" rtl="0" eaLnBrk="1" latinLnBrk="0" hangingPunct="1">
+              <a:spcBef>
+                <a:spcPct val="20000"/>
+              </a:spcBef>
+              <a:buFont typeface="Arial" pitchFamily="34" charset="0"/>
+              <a:buChar char="•"/>
+              <a:defRPr sz="2000" kern="1200">
+                <a:solidFill>
+                  <a:schemeClr val="tx1"/>
+                </a:solidFill>
+                <a:latin typeface="+mn-lt"/>
+                <a:ea typeface="+mn-ea"/>
+                <a:cs typeface="+mn-cs"/>
+              </a:defRPr>
+            </a:lvl6pPr>
+            <a:lvl7pPr marL="2971681" indent="-228591" algn="l" defTabSz="914363" rtl="0" eaLnBrk="1" latinLnBrk="0" hangingPunct="1">
+              <a:spcBef>
+                <a:spcPct val="20000"/>
+              </a:spcBef>
+              <a:buFont typeface="Arial" pitchFamily="34" charset="0"/>
+              <a:buChar char="•"/>
+              <a:defRPr sz="2000" kern="1200">
+                <a:solidFill>
+                  <a:schemeClr val="tx1"/>
+                </a:solidFill>
+                <a:latin typeface="+mn-lt"/>
+                <a:ea typeface="+mn-ea"/>
+                <a:cs typeface="+mn-cs"/>
+              </a:defRPr>
+            </a:lvl7pPr>
+            <a:lvl8pPr marL="3428863" indent="-228591" algn="l" defTabSz="914363" rtl="0" eaLnBrk="1" latinLnBrk="0" hangingPunct="1">
+              <a:spcBef>
+                <a:spcPct val="20000"/>
+              </a:spcBef>
+              <a:buFont typeface="Arial" pitchFamily="34" charset="0"/>
+              <a:buChar char="•"/>
+              <a:defRPr sz="2000" kern="1200">
+                <a:solidFill>
+                  <a:schemeClr val="tx1"/>
+                </a:solidFill>
+                <a:latin typeface="+mn-lt"/>
+                <a:ea typeface="+mn-ea"/>
+                <a:cs typeface="+mn-cs"/>
+              </a:defRPr>
+            </a:lvl8pPr>
+            <a:lvl9pPr marL="3886045" indent="-228591" algn="l" defTabSz="914363" rtl="0" eaLnBrk="1" latinLnBrk="0" hangingPunct="1">
+              <a:spcBef>
+                <a:spcPct val="20000"/>
+              </a:spcBef>
+              <a:buFont typeface="Arial" pitchFamily="34" charset="0"/>
+              <a:buChar char="•"/>
+              <a:defRPr sz="2000" kern="1200">
+                <a:solidFill>
+                  <a:schemeClr val="tx1"/>
+                </a:solidFill>
+                <a:latin typeface="+mn-lt"/>
+                <a:ea typeface="+mn-ea"/>
+                <a:cs typeface="+mn-cs"/>
+              </a:defRPr>
+            </a:lvl9pPr>
+          </a:lstStyle>
+          <a:p>
+            <a:pPr algn="ctr"/>
+            <a:r>
+              <a:rPr lang="en-US" sz="2667" dirty="0" smtClean="0"/>
+              <a:t>ssh</a:t>
+            </a:r>
+            <a:endParaRPr lang="en-US" sz="2667" dirty="0"/>
+          </a:p>
+          <a:p>
+            <a:endParaRPr lang="en-US" sz="2667" dirty="0"/>
+          </a:p>
+          <a:p>
+            <a:endParaRPr lang="en-US" sz="2667" dirty="0"/>
+          </a:p>
+          <a:p>
+            <a:endParaRPr lang="en-US" sz="4267" dirty="0"/>
+          </a:p>
+          <a:p>
+            <a:endParaRPr lang="en-US" sz="4267" dirty="0"/>
           </a:p>
         </p:txBody>
       </p:sp>
     </p:spTree>
     <p:extLst>
       <p:ext uri="{BB962C8B-B14F-4D97-AF65-F5344CB8AC3E}">
-        <p14:creationId xmlns:p14="http://schemas.microsoft.com/office/powerpoint/2010/main" val="4067554310"/>
+        <p14:creationId xmlns:p14="http://schemas.microsoft.com/office/powerpoint/2010/main" val="3465502239"/>
       </p:ext>
     </p:extLst>
   </p:cSld>
@@ -15697,7 +14434,7 @@
 <file path=ppt/theme/theme1.xml><?xml version="1.0" encoding="utf-8"?>
 <a:theme xmlns:a="http://schemas.openxmlformats.org/drawingml/2006/main" name="Base">
   <a:themeElements>
-    <a:clrScheme name="Custom 9">
+    <a:clrScheme name="Custom 1">
       <a:dk1>
         <a:srgbClr val="3E4346"/>
       </a:dk1>
@@ -17024,62 +15761,7 @@
 </a:theme>
 </file>
 
-<file path=ppt/theme/themeOverride1.xml><?xml version="1.0" encoding="utf-8"?>
-<a:themeOverride xmlns:a="http://schemas.openxmlformats.org/drawingml/2006/main">
-  <a:clrScheme name="Custom 9">
-    <a:dk1>
-      <a:srgbClr val="3E4346"/>
-    </a:dk1>
-    <a:lt1>
-      <a:srgbClr val="FFFFFF"/>
-    </a:lt1>
-    <a:dk2>
-      <a:srgbClr val="000000"/>
-    </a:dk2>
-    <a:lt2>
-      <a:srgbClr val="FFFFFF"/>
-    </a:lt2>
-    <a:accent1>
-      <a:srgbClr val="F18B21"/>
-    </a:accent1>
-    <a:accent2>
-      <a:srgbClr val="435464"/>
-    </a:accent2>
-    <a:accent3>
-      <a:srgbClr val="7D868C"/>
-    </a:accent3>
-    <a:accent4>
-      <a:srgbClr val="6BB2E2"/>
-    </a:accent4>
-    <a:accent5>
-      <a:srgbClr val="5AB7B2"/>
-    </a:accent5>
-    <a:accent6>
-      <a:srgbClr val="FDB714"/>
-    </a:accent6>
-    <a:hlink>
-      <a:srgbClr val="6BB2E2"/>
-    </a:hlink>
-    <a:folHlink>
-      <a:srgbClr val="FDB714"/>
-    </a:folHlink>
-  </a:clrScheme>
-</a:themeOverride>
-</file>
-
 <file path=customXml/item1.xml><?xml version="1.0" encoding="utf-8"?>
-<p:properties xmlns:p="http://schemas.microsoft.com/office/2006/metadata/properties" xmlns:xsi="http://www.w3.org/2001/XMLSchema-instance" xmlns:pc="http://schemas.microsoft.com/office/infopath/2007/PartnerControls">
-  <documentManagement>
-    <_dlc_DocId xmlns="7bb5d761-a2ea-4873-95f7-7a6658fb3ef0">M4CWTKMW727E-592-73</_dlc_DocId>
-    <_dlc_DocIdUrl xmlns="7bb5d761-a2ea-4873-95f7-7a6658fb3ef0">
-      <Url>https://kms.vci.local/marketing/team/_layouts/DocIdRedir.aspx?ID=M4CWTKMW727E-592-73</Url>
-      <Description>M4CWTKMW727E-592-73</Description>
-    </_dlc_DocIdUrl>
-  </documentManagement>
-</p:properties>
-</file>
-
-<file path=customXml/item2.xml><?xml version="1.0" encoding="utf-8"?>
 <ct:contentTypeSchema xmlns:ct="http://schemas.microsoft.com/office/2006/metadata/contentType" xmlns:ma="http://schemas.microsoft.com/office/2006/metadata/properties/metaAttributes" ct:_="" ma:_="" ma:contentTypeName="Document" ma:contentTypeID="0x0101000812F700BE7F874999720E88173FE491" ma:contentTypeVersion="0" ma:contentTypeDescription="Create a new document." ma:contentTypeScope="" ma:versionID="3f79f408e2ca720b7aba6e0e32464d0c">
   <xsd:schema xmlns:xsd="http://www.w3.org/2001/XMLSchema" xmlns:xs="http://www.w3.org/2001/XMLSchema" xmlns:p="http://schemas.microsoft.com/office/2006/metadata/properties" xmlns:ns2="7bb5d761-a2ea-4873-95f7-7a6658fb3ef0" targetNamespace="http://schemas.microsoft.com/office/2006/metadata/properties" ma:root="true" ma:fieldsID="1e062cd38ba31e406bfc4340fbc7f87a" ns2:_="">
     <xsd:import namespace="7bb5d761-a2ea-4873-95f7-7a6658fb3ef0"/>
@@ -17224,7 +15906,28 @@
 </ct:contentTypeSchema>
 </file>
 
+<file path=customXml/item2.xml><?xml version="1.0" encoding="utf-8"?>
+<p:properties xmlns:p="http://schemas.microsoft.com/office/2006/metadata/properties" xmlns:xsi="http://www.w3.org/2001/XMLSchema-instance" xmlns:pc="http://schemas.microsoft.com/office/infopath/2007/PartnerControls">
+  <documentManagement>
+    <_dlc_DocId xmlns="7bb5d761-a2ea-4873-95f7-7a6658fb3ef0">M4CWTKMW727E-592-73</_dlc_DocId>
+    <_dlc_DocIdUrl xmlns="7bb5d761-a2ea-4873-95f7-7a6658fb3ef0">
+      <Url>https://kms.vci.local/marketing/team/_layouts/DocIdRedir.aspx?ID=M4CWTKMW727E-592-73</Url>
+      <Description>M4CWTKMW727E-592-73</Description>
+    </_dlc_DocIdUrl>
+  </documentManagement>
+</p:properties>
+</file>
+
 <file path=customXml/item3.xml><?xml version="1.0" encoding="utf-8"?>
+<?mso-contentType ?>
+<FormTemplates xmlns="http://schemas.microsoft.com/sharepoint/v3/contenttype/forms">
+  <Display>DocumentLibraryForm</Display>
+  <Edit>DocumentLibraryForm</Edit>
+  <New>DocumentLibraryForm</New>
+</FormTemplates>
+</file>
+
+<file path=customXml/item4.xml><?xml version="1.0" encoding="utf-8"?>
 <?mso-contentType ?>
 <spe:Receivers xmlns:spe="http://schemas.microsoft.com/sharepoint/events">
   <Receiver>
@@ -17270,32 +15973,7 @@
 </spe:Receivers>
 </file>
 
-<file path=customXml/item4.xml><?xml version="1.0" encoding="utf-8"?>
-<?mso-contentType ?>
-<FormTemplates xmlns="http://schemas.microsoft.com/sharepoint/v3/contenttype/forms">
-  <Display>DocumentLibraryForm</Display>
-  <Edit>DocumentLibraryForm</Edit>
-  <New>DocumentLibraryForm</New>
-</FormTemplates>
-</file>
-
 <file path=customXml/itemProps1.xml><?xml version="1.0" encoding="utf-8"?>
-<ds:datastoreItem xmlns:ds="http://schemas.openxmlformats.org/officeDocument/2006/customXml" ds:itemID="{6921749B-AEB7-461B-845F-603CABD25259}">
-  <ds:schemaRefs>
-    <ds:schemaRef ds:uri="http://purl.org/dc/elements/1.1/"/>
-    <ds:schemaRef ds:uri="http://schemas.microsoft.com/office/2006/metadata/properties"/>
-    <ds:schemaRef ds:uri="7bb5d761-a2ea-4873-95f7-7a6658fb3ef0"/>
-    <ds:schemaRef ds:uri="http://purl.org/dc/terms/"/>
-    <ds:schemaRef ds:uri="http://schemas.openxmlformats.org/package/2006/metadata/core-properties"/>
-    <ds:schemaRef ds:uri="http://schemas.microsoft.com/office/2006/documentManagement/types"/>
-    <ds:schemaRef ds:uri="http://schemas.microsoft.com/office/infopath/2007/PartnerControls"/>
-    <ds:schemaRef ds:uri="http://www.w3.org/XML/1998/namespace"/>
-    <ds:schemaRef ds:uri="http://purl.org/dc/dcmitype/"/>
-  </ds:schemaRefs>
-</ds:datastoreItem>
-</file>
-
-<file path=customXml/itemProps2.xml><?xml version="1.0" encoding="utf-8"?>
 <ds:datastoreItem xmlns:ds="http://schemas.openxmlformats.org/officeDocument/2006/customXml" ds:itemID="{164479E5-0B02-49AC-B79E-EC1D6164DDD3}">
   <ds:schemaRefs>
     <ds:schemaRef ds:uri="http://schemas.microsoft.com/office/2006/metadata/contentType"/>
@@ -17313,18 +15991,34 @@
 </ds:datastoreItem>
 </file>
 
+<file path=customXml/itemProps2.xml><?xml version="1.0" encoding="utf-8"?>
+<ds:datastoreItem xmlns:ds="http://schemas.openxmlformats.org/officeDocument/2006/customXml" ds:itemID="{6921749B-AEB7-461B-845F-603CABD25259}">
+  <ds:schemaRefs>
+    <ds:schemaRef ds:uri="http://purl.org/dc/elements/1.1/"/>
+    <ds:schemaRef ds:uri="http://schemas.microsoft.com/office/2006/metadata/properties"/>
+    <ds:schemaRef ds:uri="7bb5d761-a2ea-4873-95f7-7a6658fb3ef0"/>
+    <ds:schemaRef ds:uri="http://purl.org/dc/terms/"/>
+    <ds:schemaRef ds:uri="http://schemas.openxmlformats.org/package/2006/metadata/core-properties"/>
+    <ds:schemaRef ds:uri="http://schemas.microsoft.com/office/2006/documentManagement/types"/>
+    <ds:schemaRef ds:uri="http://schemas.microsoft.com/office/infopath/2007/PartnerControls"/>
+    <ds:schemaRef ds:uri="http://www.w3.org/XML/1998/namespace"/>
+    <ds:schemaRef ds:uri="http://purl.org/dc/dcmitype/"/>
+  </ds:schemaRefs>
+</ds:datastoreItem>
+</file>
+
 <file path=customXml/itemProps3.xml><?xml version="1.0" encoding="utf-8"?>
+<ds:datastoreItem xmlns:ds="http://schemas.openxmlformats.org/officeDocument/2006/customXml" ds:itemID="{5CDEB364-43EC-4510-9881-539C2A3FCE9E}">
+  <ds:schemaRefs>
+    <ds:schemaRef ds:uri="http://schemas.microsoft.com/sharepoint/v3/contenttype/forms"/>
+  </ds:schemaRefs>
+</ds:datastoreItem>
+</file>
+
+<file path=customXml/itemProps4.xml><?xml version="1.0" encoding="utf-8"?>
 <ds:datastoreItem xmlns:ds="http://schemas.openxmlformats.org/officeDocument/2006/customXml" ds:itemID="{B13EBC30-FE27-4C6A-B723-23FC2188F7DC}">
   <ds:schemaRefs>
     <ds:schemaRef ds:uri="http://schemas.microsoft.com/sharepoint/events"/>
   </ds:schemaRefs>
 </ds:datastoreItem>
-</file>
-
-<file path=customXml/itemProps4.xml><?xml version="1.0" encoding="utf-8"?>
-<ds:datastoreItem xmlns:ds="http://schemas.openxmlformats.org/officeDocument/2006/customXml" ds:itemID="{5CDEB364-43EC-4510-9881-539C2A3FCE9E}">
-  <ds:schemaRefs>
-    <ds:schemaRef ds:uri="http://schemas.microsoft.com/sharepoint/v3/contenttype/forms"/>
-  </ds:schemaRefs>
-</ds:datastoreItem>
 </file>
</xml_diff>

<commit_message>
saving temp notes on slide 1
</commit_message>
<xml_diff>
--- a/01-Intro.pptx
+++ b/01-Intro.pptx
@@ -6,10 +6,10 @@
     <p:sldMasterId id="2147483847" r:id="rId6"/>
   </p:sldMasterIdLst>
   <p:notesMasterIdLst>
-    <p:notesMasterId r:id="rId21"/>
+    <p:notesMasterId r:id="rId20"/>
   </p:notesMasterIdLst>
   <p:handoutMasterIdLst>
-    <p:handoutMasterId r:id="rId22"/>
+    <p:handoutMasterId r:id="rId21"/>
   </p:handoutMasterIdLst>
   <p:sldIdLst>
     <p:sldId id="256" r:id="rId7"/>
@@ -24,8 +24,7 @@
     <p:sldId id="293" r:id="rId16"/>
     <p:sldId id="292" r:id="rId17"/>
     <p:sldId id="288" r:id="rId18"/>
-    <p:sldId id="273" r:id="rId19"/>
-    <p:sldId id="267" r:id="rId20"/>
+    <p:sldId id="267" r:id="rId19"/>
   </p:sldIdLst>
   <p:sldSz cx="16256000" cy="9144000"/>
   <p:notesSz cx="6858000" cy="9144000"/>
@@ -287,7 +286,7 @@
               <a:pPr>
                 <a:defRPr/>
               </a:pPr>
-              <a:t>2015-12-07</a:t>
+              <a:t>2015-12-09</a:t>
             </a:fld>
             <a:endParaRPr lang="en-US" dirty="0"/>
           </a:p>
@@ -470,7 +469,7 @@
               <a:pPr>
                 <a:defRPr/>
               </a:pPr>
-              <a:t>2015-12-07</a:t>
+              <a:t>2015-12-09</a:t>
             </a:fld>
             <a:endParaRPr lang="en-US" dirty="0"/>
           </a:p>
@@ -912,7 +911,9 @@
         </p:nvSpPr>
         <p:spPr/>
         <p:txBody>
-          <a:bodyPr/>
+          <a:bodyPr>
+            <a:normAutofit lnSpcReduction="10000"/>
+          </a:bodyPr>
           <a:lstStyle/>
           <a:p>
             <a:pPr marL="0" marR="0" indent="0" algn="l" defTabSz="1217613" rtl="0" eaLnBrk="1" fontAlgn="base" latinLnBrk="0" hangingPunct="1">
@@ -966,8 +967,511 @@
                 <a:ea typeface="ＭＳ Ｐゴシック" charset="0"/>
                 <a:cs typeface="Arial" panose="020B0604020202020204" pitchFamily="34" charset="0"/>
               </a:rPr>
-              <a:t> for training lab set up notes and additional instructor notes. </a:t>
-            </a:r>
+              <a:t> for training lab set up notes and additional instructor notes. This course requires</a:t>
+            </a:r>
+            <a:r>
+              <a:rPr lang="en-US" sz="1200" kern="1200" baseline="0" dirty="0" smtClean="0">
+                <a:solidFill>
+                  <a:schemeClr val="tx1"/>
+                </a:solidFill>
+                <a:effectLst/>
+                <a:latin typeface="Arial" panose="020B0604020202020204" pitchFamily="34" charset="0"/>
+                <a:ea typeface="ＭＳ Ｐゴシック" charset="0"/>
+                <a:cs typeface="Arial" panose="020B0604020202020204" pitchFamily="34" charset="0"/>
+              </a:rPr>
+              <a:t> ChefDK 0.10.0 on or higher on the AMIs. </a:t>
+            </a:r>
+          </a:p>
+          <a:p>
+            <a:pPr marL="0" marR="0" indent="0" algn="l" defTabSz="1217613" rtl="0" eaLnBrk="1" fontAlgn="base" latinLnBrk="0" hangingPunct="1">
+              <a:lnSpc>
+                <a:spcPct val="90000"/>
+              </a:lnSpc>
+              <a:spcBef>
+                <a:spcPct val="30000"/>
+              </a:spcBef>
+              <a:spcAft>
+                <a:spcPts val="450"/>
+              </a:spcAft>
+              <a:buClrTx/>
+              <a:buSzTx/>
+              <a:buFontTx/>
+              <a:buNone/>
+              <a:tabLst/>
+              <a:defRPr/>
+            </a:pPr>
+            <a:endParaRPr lang="en-US" sz="1200" kern="1200" baseline="0" dirty="0" smtClean="0">
+              <a:solidFill>
+                <a:schemeClr val="tx1"/>
+              </a:solidFill>
+              <a:effectLst/>
+              <a:latin typeface="Arial" panose="020B0604020202020204" pitchFamily="34" charset="0"/>
+              <a:ea typeface="ＭＳ Ｐゴシック" charset="0"/>
+              <a:cs typeface="Arial" panose="020B0604020202020204" pitchFamily="34" charset="0"/>
+            </a:endParaRPr>
+          </a:p>
+          <a:p>
+            <a:r>
+              <a:rPr lang="en-US" dirty="0" smtClean="0"/>
+              <a:t>TBD IMPORTANT: We need to build </a:t>
+            </a:r>
+            <a:r>
+              <a:rPr lang="en-US" sz="1200" b="0" i="0" kern="1200" dirty="0" smtClean="0">
+                <a:solidFill>
+                  <a:schemeClr val="tx1"/>
+                </a:solidFill>
+                <a:effectLst/>
+                <a:latin typeface="Arial" panose="020B0604020202020204" pitchFamily="34" charset="0"/>
+                <a:ea typeface="ＭＳ Ｐゴシック" charset="0"/>
+                <a:cs typeface="Arial" panose="020B0604020202020204" pitchFamily="34" charset="0"/>
+              </a:rPr>
+              <a:t>the shell </a:t>
+            </a:r>
+            <a:r>
+              <a:rPr lang="en-US" sz="1200" b="0" i="0" kern="1200" dirty="0" err="1" smtClean="0">
+                <a:solidFill>
+                  <a:schemeClr val="tx1"/>
+                </a:solidFill>
+                <a:effectLst/>
+                <a:latin typeface="Arial" panose="020B0604020202020204" pitchFamily="34" charset="0"/>
+                <a:ea typeface="ＭＳ Ｐゴシック" charset="0"/>
+                <a:cs typeface="Arial" panose="020B0604020202020204" pitchFamily="34" charset="0"/>
+              </a:rPr>
+              <a:t>init</a:t>
+            </a:r>
+            <a:r>
+              <a:rPr lang="en-US" sz="1200" b="0" i="0" kern="1200" dirty="0" smtClean="0">
+                <a:solidFill>
+                  <a:schemeClr val="tx1"/>
+                </a:solidFill>
+                <a:effectLst/>
+                <a:latin typeface="Arial" panose="020B0604020202020204" pitchFamily="34" charset="0"/>
+                <a:ea typeface="ＭＳ Ｐゴシック" charset="0"/>
+                <a:cs typeface="Arial" panose="020B0604020202020204" pitchFamily="34" charset="0"/>
+              </a:rPr>
+              <a:t> stuff for chef </a:t>
+            </a:r>
+            <a:r>
+              <a:rPr lang="en-US" sz="1200" b="0" i="0" kern="1200" dirty="0" err="1" smtClean="0">
+                <a:solidFill>
+                  <a:schemeClr val="tx1"/>
+                </a:solidFill>
+                <a:effectLst/>
+                <a:latin typeface="Arial" panose="020B0604020202020204" pitchFamily="34" charset="0"/>
+                <a:ea typeface="ＭＳ Ｐゴシック" charset="0"/>
+                <a:cs typeface="Arial" panose="020B0604020202020204" pitchFamily="34" charset="0"/>
+              </a:rPr>
+              <a:t>dk</a:t>
+            </a:r>
+            <a:r>
+              <a:rPr lang="en-US" sz="1200" b="0" i="0" kern="1200" dirty="0" smtClean="0">
+                <a:solidFill>
+                  <a:schemeClr val="tx1"/>
+                </a:solidFill>
+                <a:effectLst/>
+                <a:latin typeface="Arial" panose="020B0604020202020204" pitchFamily="34" charset="0"/>
+                <a:ea typeface="ＭＳ Ｐゴシック" charset="0"/>
+                <a:cs typeface="Arial" panose="020B0604020202020204" pitchFamily="34" charset="0"/>
+              </a:rPr>
+              <a:t> into the AMI images.</a:t>
+            </a:r>
+          </a:p>
+          <a:p>
+            <a:endParaRPr lang="en-US" sz="1200" b="0" i="0" kern="1200" dirty="0" smtClean="0">
+              <a:solidFill>
+                <a:schemeClr val="tx1"/>
+              </a:solidFill>
+              <a:effectLst/>
+              <a:latin typeface="Arial" panose="020B0604020202020204" pitchFamily="34" charset="0"/>
+              <a:ea typeface="ＭＳ Ｐゴシック" charset="0"/>
+              <a:cs typeface="Arial" panose="020B0604020202020204" pitchFamily="34" charset="0"/>
+            </a:endParaRPr>
+          </a:p>
+          <a:p>
+            <a:r>
+              <a:rPr lang="en-US" sz="1200" kern="1200" dirty="0" smtClean="0">
+                <a:solidFill>
+                  <a:schemeClr val="tx1"/>
+                </a:solidFill>
+                <a:effectLst/>
+                <a:latin typeface="Arial" panose="020B0604020202020204" pitchFamily="34" charset="0"/>
+                <a:ea typeface="ＭＳ Ｐゴシック" charset="0"/>
+                <a:cs typeface="Arial" panose="020B0604020202020204" pitchFamily="34" charset="0"/>
+              </a:rPr>
+              <a:t>echo</a:t>
+            </a:r>
+            <a:r>
+              <a:rPr lang="en-US" dirty="0" smtClean="0"/>
+              <a:t> </a:t>
+            </a:r>
+            <a:r>
+              <a:rPr lang="en-US" sz="1200" kern="1200" dirty="0" smtClean="0">
+                <a:solidFill>
+                  <a:schemeClr val="tx1"/>
+                </a:solidFill>
+                <a:effectLst/>
+                <a:latin typeface="Arial" panose="020B0604020202020204" pitchFamily="34" charset="0"/>
+                <a:ea typeface="ＭＳ Ｐゴシック" charset="0"/>
+                <a:cs typeface="Arial" panose="020B0604020202020204" pitchFamily="34" charset="0"/>
+              </a:rPr>
+              <a:t>'</a:t>
+            </a:r>
+            <a:r>
+              <a:rPr lang="en-US" sz="1200" kern="1200" dirty="0" err="1" smtClean="0">
+                <a:solidFill>
+                  <a:schemeClr val="tx1"/>
+                </a:solidFill>
+                <a:effectLst/>
+                <a:latin typeface="Arial" panose="020B0604020202020204" pitchFamily="34" charset="0"/>
+                <a:ea typeface="ＭＳ Ｐゴシック" charset="0"/>
+                <a:cs typeface="Arial" panose="020B0604020202020204" pitchFamily="34" charset="0"/>
+              </a:rPr>
+              <a:t>eval</a:t>
+            </a:r>
+            <a:r>
+              <a:rPr lang="en-US" sz="1200" kern="1200" dirty="0" smtClean="0">
+                <a:solidFill>
+                  <a:schemeClr val="tx1"/>
+                </a:solidFill>
+                <a:effectLst/>
+                <a:latin typeface="Arial" panose="020B0604020202020204" pitchFamily="34" charset="0"/>
+                <a:ea typeface="ＭＳ Ｐゴシック" charset="0"/>
+                <a:cs typeface="Arial" panose="020B0604020202020204" pitchFamily="34" charset="0"/>
+              </a:rPr>
+              <a:t> "$(chef shell-</a:t>
+            </a:r>
+            <a:r>
+              <a:rPr lang="en-US" sz="1200" kern="1200" dirty="0" err="1" smtClean="0">
+                <a:solidFill>
+                  <a:schemeClr val="tx1"/>
+                </a:solidFill>
+                <a:effectLst/>
+                <a:latin typeface="Arial" panose="020B0604020202020204" pitchFamily="34" charset="0"/>
+                <a:ea typeface="ＭＳ Ｐゴシック" charset="0"/>
+                <a:cs typeface="Arial" panose="020B0604020202020204" pitchFamily="34" charset="0"/>
+              </a:rPr>
+              <a:t>init</a:t>
+            </a:r>
+            <a:r>
+              <a:rPr lang="en-US" sz="1200" kern="1200" dirty="0" smtClean="0">
+                <a:solidFill>
+                  <a:schemeClr val="tx1"/>
+                </a:solidFill>
+                <a:effectLst/>
+                <a:latin typeface="Arial" panose="020B0604020202020204" pitchFamily="34" charset="0"/>
+                <a:ea typeface="ＭＳ Ｐゴシック" charset="0"/>
+                <a:cs typeface="Arial" panose="020B0604020202020204" pitchFamily="34" charset="0"/>
+              </a:rPr>
+              <a:t> bash)"'</a:t>
+            </a:r>
+            <a:r>
+              <a:rPr lang="en-US" dirty="0" smtClean="0"/>
+              <a:t> &gt;&gt; ~/.</a:t>
+            </a:r>
+            <a:r>
+              <a:rPr lang="en-US" dirty="0" err="1" smtClean="0"/>
+              <a:t>bash_profile</a:t>
+            </a:r>
+            <a:r>
+              <a:rPr lang="en-US" dirty="0" smtClean="0"/>
+              <a:t>    then log out and in.</a:t>
+            </a:r>
+            <a:endParaRPr lang="en-US" sz="1200" b="0" i="0" kern="1200" dirty="0" smtClean="0">
+              <a:solidFill>
+                <a:schemeClr val="tx1"/>
+              </a:solidFill>
+              <a:effectLst/>
+              <a:latin typeface="Arial" panose="020B0604020202020204" pitchFamily="34" charset="0"/>
+              <a:ea typeface="ＭＳ Ｐゴシック" charset="0"/>
+              <a:cs typeface="Arial" panose="020B0604020202020204" pitchFamily="34" charset="0"/>
+            </a:endParaRPr>
+          </a:p>
+          <a:p>
+            <a:endParaRPr lang="en-US" sz="1200" b="0" i="0" kern="1200" dirty="0" smtClean="0">
+              <a:solidFill>
+                <a:schemeClr val="tx1"/>
+              </a:solidFill>
+              <a:effectLst/>
+              <a:latin typeface="Arial" panose="020B0604020202020204" pitchFamily="34" charset="0"/>
+              <a:ea typeface="ＭＳ Ｐゴシック" charset="0"/>
+              <a:cs typeface="Arial" panose="020B0604020202020204" pitchFamily="34" charset="0"/>
+            </a:endParaRPr>
+          </a:p>
+          <a:p>
+            <a:r>
+              <a:rPr lang="en-US" dirty="0" smtClean="0"/>
+              <a:t>https://</a:t>
+            </a:r>
+            <a:r>
+              <a:rPr lang="en-US" dirty="0" smtClean="0"/>
+              <a:t>docs.chef.io/install_dk.html</a:t>
+            </a:r>
+          </a:p>
+          <a:p>
+            <a:endParaRPr lang="en-US" dirty="0" smtClean="0"/>
+          </a:p>
+          <a:p>
+            <a:r>
+              <a:rPr lang="en-US" sz="1200" b="0" i="0" kern="1200" dirty="0" smtClean="0">
+                <a:solidFill>
+                  <a:schemeClr val="tx1"/>
+                </a:solidFill>
+                <a:effectLst/>
+                <a:latin typeface="Arial" panose="020B0604020202020204" pitchFamily="34" charset="0"/>
+                <a:ea typeface="ＭＳ Ｐゴシック" charset="0"/>
+                <a:cs typeface="Arial" panose="020B0604020202020204" pitchFamily="34" charset="0"/>
+              </a:rPr>
+              <a:t>Kennon thinks we need to put the chef user in the </a:t>
+            </a:r>
+            <a:r>
+              <a:rPr lang="en-US" sz="1200" b="0" i="0" kern="1200" dirty="0" err="1" smtClean="0">
+                <a:solidFill>
+                  <a:schemeClr val="tx1"/>
+                </a:solidFill>
+                <a:effectLst/>
+                <a:latin typeface="Arial" panose="020B0604020202020204" pitchFamily="34" charset="0"/>
+                <a:ea typeface="ＭＳ Ｐゴシック" charset="0"/>
+                <a:cs typeface="Arial" panose="020B0604020202020204" pitchFamily="34" charset="0"/>
+              </a:rPr>
+              <a:t>dockerroot</a:t>
+            </a:r>
+            <a:r>
+              <a:rPr lang="en-US" sz="1200" b="0" i="0" kern="1200" dirty="0" smtClean="0">
+                <a:solidFill>
+                  <a:schemeClr val="tx1"/>
+                </a:solidFill>
+                <a:effectLst/>
+                <a:latin typeface="Arial" panose="020B0604020202020204" pitchFamily="34" charset="0"/>
+                <a:ea typeface="ＭＳ Ｐゴシック" charset="0"/>
+                <a:cs typeface="Arial" panose="020B0604020202020204" pitchFamily="34" charset="0"/>
+              </a:rPr>
+              <a:t> group and make /var/run/</a:t>
+            </a:r>
+            <a:r>
+              <a:rPr lang="en-US" sz="1200" b="0" i="0" kern="1200" dirty="0" err="1" smtClean="0">
+                <a:solidFill>
+                  <a:schemeClr val="tx1"/>
+                </a:solidFill>
+                <a:effectLst/>
+                <a:latin typeface="Arial" panose="020B0604020202020204" pitchFamily="34" charset="0"/>
+                <a:ea typeface="ＭＳ Ｐゴシック" charset="0"/>
+                <a:cs typeface="Arial" panose="020B0604020202020204" pitchFamily="34" charset="0"/>
+              </a:rPr>
+              <a:t>docker.sock's</a:t>
+            </a:r>
+            <a:r>
+              <a:rPr lang="en-US" sz="1200" b="0" i="0" kern="1200" dirty="0" smtClean="0">
+                <a:solidFill>
+                  <a:schemeClr val="tx1"/>
+                </a:solidFill>
+                <a:effectLst/>
+                <a:latin typeface="Arial" panose="020B0604020202020204" pitchFamily="34" charset="0"/>
+                <a:ea typeface="ＭＳ Ｐゴシック" charset="0"/>
+                <a:cs typeface="Arial" panose="020B0604020202020204" pitchFamily="34" charset="0"/>
+              </a:rPr>
+              <a:t> group </a:t>
+            </a:r>
+            <a:r>
+              <a:rPr lang="en-US" sz="1200" b="0" i="0" kern="1200" dirty="0" err="1" smtClean="0">
+                <a:solidFill>
+                  <a:schemeClr val="tx1"/>
+                </a:solidFill>
+                <a:effectLst/>
+                <a:latin typeface="Arial" panose="020B0604020202020204" pitchFamily="34" charset="0"/>
+                <a:ea typeface="ＭＳ Ｐゴシック" charset="0"/>
+                <a:cs typeface="Arial" panose="020B0604020202020204" pitchFamily="34" charset="0"/>
+              </a:rPr>
+              <a:t>dockerroot</a:t>
+            </a:r>
+            <a:r>
+              <a:rPr lang="en-US" sz="1200" b="0" i="0" kern="1200" dirty="0" smtClean="0">
+                <a:solidFill>
+                  <a:schemeClr val="tx1"/>
+                </a:solidFill>
+                <a:effectLst/>
+                <a:latin typeface="Arial" panose="020B0604020202020204" pitchFamily="34" charset="0"/>
+                <a:ea typeface="ＭＳ Ｐゴシック" charset="0"/>
+                <a:cs typeface="Arial" panose="020B0604020202020204" pitchFamily="34" charset="0"/>
+              </a:rPr>
+              <a:t> in the future training images.</a:t>
+            </a:r>
+          </a:p>
+          <a:p>
+            <a:endParaRPr lang="en-US" sz="1200" b="0" i="0" kern="1200" dirty="0" smtClean="0">
+              <a:solidFill>
+                <a:schemeClr val="tx1"/>
+              </a:solidFill>
+              <a:effectLst/>
+              <a:latin typeface="Arial" panose="020B0604020202020204" pitchFamily="34" charset="0"/>
+              <a:ea typeface="ＭＳ Ｐゴシック" charset="0"/>
+              <a:cs typeface="Arial" panose="020B0604020202020204" pitchFamily="34" charset="0"/>
+            </a:endParaRPr>
+          </a:p>
+          <a:p>
+            <a:r>
+              <a:rPr lang="en-US" dirty="0" smtClean="0"/>
+              <a:t>my</a:t>
+            </a:r>
+            <a:r>
+              <a:rPr lang="en-US" baseline="0" dirty="0" smtClean="0"/>
+              <a:t> TEMP fix: chef@ip-172-31-7-193 run]$ sudo </a:t>
+            </a:r>
+            <a:r>
+              <a:rPr lang="en-US" baseline="0" dirty="0" err="1" smtClean="0"/>
+              <a:t>chmod</a:t>
+            </a:r>
+            <a:r>
+              <a:rPr lang="en-US" baseline="0" dirty="0" smtClean="0"/>
+              <a:t> 777 </a:t>
+            </a:r>
+            <a:r>
+              <a:rPr lang="en-US" baseline="0" dirty="0" err="1" smtClean="0"/>
+              <a:t>docker.sock</a:t>
+            </a:r>
+            <a:endParaRPr lang="en-US" baseline="0" dirty="0" smtClean="0"/>
+          </a:p>
+          <a:p>
+            <a:endParaRPr lang="en-US" baseline="0" dirty="0" smtClean="0"/>
+          </a:p>
+          <a:p>
+            <a:r>
+              <a:rPr lang="en-US" baseline="0" dirty="0" smtClean="0"/>
+              <a:t>Nathan: </a:t>
+            </a:r>
+            <a:r>
+              <a:rPr lang="en-US" sz="1200" b="0" i="0" kern="1200" dirty="0" smtClean="0">
+                <a:solidFill>
+                  <a:schemeClr val="tx1"/>
+                </a:solidFill>
+                <a:effectLst/>
+                <a:latin typeface="Arial" panose="020B0604020202020204" pitchFamily="34" charset="0"/>
+                <a:ea typeface="ＭＳ Ｐゴシック" charset="0"/>
+                <a:cs typeface="Arial" panose="020B0604020202020204" pitchFamily="34" charset="0"/>
+              </a:rPr>
+              <a:t> The images I’ve used were built with a chef provisioning script</a:t>
+            </a:r>
+          </a:p>
+          <a:p>
+            <a:endParaRPr lang="en-US" sz="1200" b="0" i="0" kern="1200" baseline="0" dirty="0" smtClean="0">
+              <a:solidFill>
+                <a:schemeClr val="tx1"/>
+              </a:solidFill>
+              <a:effectLst/>
+              <a:latin typeface="Arial" panose="020B0604020202020204" pitchFamily="34" charset="0"/>
+              <a:ea typeface="ＭＳ Ｐゴシック" charset="0"/>
+              <a:cs typeface="Arial" panose="020B0604020202020204" pitchFamily="34" charset="0"/>
+            </a:endParaRPr>
+          </a:p>
+          <a:p>
+            <a:r>
+              <a:rPr lang="en-US" sz="1200" b="0" i="0" kern="1200" baseline="0" dirty="0" smtClean="0">
+                <a:solidFill>
+                  <a:schemeClr val="tx1"/>
+                </a:solidFill>
+                <a:effectLst/>
+                <a:latin typeface="Arial" panose="020B0604020202020204" pitchFamily="34" charset="0"/>
+                <a:ea typeface="ＭＳ Ｐゴシック" charset="0"/>
+                <a:cs typeface="Arial" panose="020B0604020202020204" pitchFamily="34" charset="0"/>
+              </a:rPr>
+              <a:t>The issue is this:  </a:t>
+            </a:r>
+            <a:r>
+              <a:rPr lang="en-US" dirty="0" err="1" smtClean="0"/>
+              <a:t>inspec</a:t>
+            </a:r>
+            <a:r>
+              <a:rPr lang="en-US" dirty="0" smtClean="0"/>
+              <a:t> exec ~/cookbooks/ssh/test/integration/client/</a:t>
+            </a:r>
+            <a:r>
+              <a:rPr lang="en-US" dirty="0" err="1" smtClean="0"/>
+              <a:t>inspec</a:t>
+            </a:r>
+            <a:r>
+              <a:rPr lang="en-US" dirty="0" smtClean="0"/>
+              <a:t>/</a:t>
+            </a:r>
+            <a:r>
+              <a:rPr lang="en-US" dirty="0" err="1" smtClean="0"/>
+              <a:t>client_spec.rb</a:t>
+            </a:r>
+            <a:r>
+              <a:rPr lang="en-US" dirty="0" smtClean="0"/>
+              <a:t> -t docker://CONTAINER_ID wont run </a:t>
+            </a:r>
+            <a:r>
+              <a:rPr lang="en-US" dirty="0" err="1" smtClean="0"/>
+              <a:t>witrhout</a:t>
+            </a:r>
+            <a:r>
+              <a:rPr lang="en-US" dirty="0" smtClean="0"/>
+              <a:t> permissions error nor </a:t>
+            </a:r>
+            <a:r>
+              <a:rPr lang="en-US" dirty="0" err="1" smtClean="0"/>
+              <a:t>ps</a:t>
+            </a:r>
+            <a:r>
+              <a:rPr lang="en-US" dirty="0" smtClean="0"/>
+              <a:t> </a:t>
+            </a:r>
+            <a:r>
+              <a:rPr lang="en-US" dirty="0" err="1" smtClean="0"/>
+              <a:t>docker</a:t>
+            </a:r>
+            <a:r>
+              <a:rPr lang="en-US" dirty="0" smtClean="0"/>
+              <a:t> without sudo.</a:t>
+            </a:r>
+            <a:endParaRPr lang="en-US" baseline="0" dirty="0" smtClean="0"/>
+          </a:p>
+          <a:p>
+            <a:endParaRPr lang="en-US" baseline="0" dirty="0" smtClean="0"/>
+          </a:p>
+          <a:p>
+            <a:r>
+              <a:rPr lang="en-US" baseline="0" dirty="0" smtClean="0"/>
+              <a:t>See module 3 "</a:t>
+            </a:r>
+            <a:r>
+              <a:rPr lang="en-US" dirty="0" smtClean="0"/>
+              <a:t>GE: Running </a:t>
+            </a:r>
+            <a:r>
+              <a:rPr lang="en-US" dirty="0" err="1" smtClean="0"/>
+              <a:t>InSpec</a:t>
+            </a:r>
+            <a:r>
+              <a:rPr lang="en-US" dirty="0" smtClean="0"/>
+              <a:t> from the CLI</a:t>
+            </a:r>
+            <a:r>
+              <a:rPr lang="en-US" smtClean="0"/>
+              <a:t>" slide and notes.</a:t>
+            </a:r>
+            <a:endParaRPr lang="en-US" baseline="0" dirty="0" smtClean="0"/>
+          </a:p>
+          <a:p>
+            <a:endParaRPr lang="en-US" dirty="0" smtClean="0"/>
+          </a:p>
+          <a:p>
+            <a:pPr marL="0" marR="0" indent="0" algn="l" defTabSz="1217613" rtl="0" eaLnBrk="1" fontAlgn="base" latinLnBrk="0" hangingPunct="1">
+              <a:lnSpc>
+                <a:spcPct val="90000"/>
+              </a:lnSpc>
+              <a:spcBef>
+                <a:spcPct val="30000"/>
+              </a:spcBef>
+              <a:spcAft>
+                <a:spcPts val="450"/>
+              </a:spcAft>
+              <a:buClrTx/>
+              <a:buSzTx/>
+              <a:buFontTx/>
+              <a:buNone/>
+              <a:tabLst/>
+              <a:defRPr/>
+            </a:pPr>
             <a:endParaRPr lang="en-US" dirty="0"/>
           </a:p>
         </p:txBody>
@@ -2319,17 +2823,211 @@
             </a:r>
             <a:r>
               <a:rPr lang="en-US" baseline="0" dirty="0" smtClean="0"/>
-              <a:t> that we use for Chef training. They have ChefDK installed on them but you will not be using any of </a:t>
-            </a:r>
+              <a:t> that we use for Chef training. They have ChefDK installed on them but you will not be using any of the ChefDK tools on those nodes until near the end of this class when you will write one remediation recipe.</a:t>
+            </a:r>
+          </a:p>
+          <a:p>
+            <a:pPr marL="0" marR="0" lvl="2" indent="0" algn="l" defTabSz="914363" rtl="0" eaLnBrk="1" fontAlgn="auto" latinLnBrk="0" hangingPunct="1">
+              <a:lnSpc>
+                <a:spcPct val="90000"/>
+              </a:lnSpc>
+              <a:spcBef>
+                <a:spcPts val="0"/>
+              </a:spcBef>
+              <a:spcAft>
+                <a:spcPts val="333"/>
+              </a:spcAft>
+              <a:buClrTx/>
+              <a:buSzTx/>
+              <a:buFontTx/>
+              <a:buNone/>
+              <a:tabLst/>
+              <a:defRPr/>
+            </a:pPr>
+            <a:endParaRPr lang="en-US" baseline="0" dirty="0" smtClean="0"/>
+          </a:p>
+          <a:p>
+            <a:pPr marL="0" marR="0" lvl="2" indent="0" algn="l" defTabSz="914363" rtl="0" eaLnBrk="1" fontAlgn="auto" latinLnBrk="0" hangingPunct="1">
+              <a:lnSpc>
+                <a:spcPct val="90000"/>
+              </a:lnSpc>
+              <a:spcBef>
+                <a:spcPts val="0"/>
+              </a:spcBef>
+              <a:spcAft>
+                <a:spcPts val="333"/>
+              </a:spcAft>
+              <a:buClrTx/>
+              <a:buSzTx/>
+              <a:buFontTx/>
+              <a:buNone/>
+              <a:tabLst/>
+              <a:defRPr/>
+            </a:pPr>
+            <a:r>
+              <a:rPr lang="en-US" baseline="0" dirty="0" smtClean="0"/>
+              <a:t>Instructor Note: Now would be a good time to distribute the hostnames of the two nodes you will assign to each student.</a:t>
+            </a:r>
+            <a:r>
+              <a:rPr lang="en-US" baseline="0" dirty="0"/>
+              <a:t> </a:t>
+            </a:r>
+            <a:r>
+              <a:rPr lang="en-US" baseline="0" dirty="0" smtClean="0"/>
+              <a:t>You should ask the students to note which one they will use as their Compliance Server and which one they will use as the target node for scans.</a:t>
+            </a:r>
+          </a:p>
+          <a:p>
+            <a:pPr marL="0" marR="0" lvl="2" indent="0" algn="l" defTabSz="914363" rtl="0" eaLnBrk="1" fontAlgn="auto" latinLnBrk="0" hangingPunct="1">
+              <a:lnSpc>
+                <a:spcPct val="90000"/>
+              </a:lnSpc>
+              <a:spcBef>
+                <a:spcPts val="0"/>
+              </a:spcBef>
+              <a:spcAft>
+                <a:spcPts val="333"/>
+              </a:spcAft>
+              <a:buClrTx/>
+              <a:buSzTx/>
+              <a:buFontTx/>
+              <a:buNone/>
+              <a:tabLst/>
+              <a:defRPr/>
+            </a:pPr>
+            <a:r>
+              <a:rPr lang="en-US" baseline="0" dirty="0" smtClean="0"/>
+              <a:t>For example: </a:t>
+            </a:r>
+            <a:br>
+              <a:rPr lang="en-US" baseline="0" dirty="0" smtClean="0"/>
+            </a:br>
+            <a:r>
+              <a:rPr lang="en-US" sz="1200" kern="1200" dirty="0" smtClean="0">
+                <a:solidFill>
+                  <a:schemeClr val="tx1"/>
+                </a:solidFill>
+                <a:effectLst/>
+                <a:latin typeface="Arial" panose="020B0604020202020204" pitchFamily="34" charset="0"/>
+                <a:ea typeface="ＭＳ Ｐゴシック" charset="0"/>
+                <a:cs typeface="+mn-cs"/>
+              </a:rPr>
+              <a:t>ec2-52-91-31-125.compute-1.amazonaws.com = Compliance server.</a:t>
+            </a:r>
+          </a:p>
+          <a:p>
+            <a:pPr marL="0" marR="0" lvl="2" indent="0" algn="l" defTabSz="914363" rtl="0" eaLnBrk="1" fontAlgn="auto" latinLnBrk="0" hangingPunct="1">
+              <a:lnSpc>
+                <a:spcPct val="90000"/>
+              </a:lnSpc>
+              <a:spcBef>
+                <a:spcPts val="0"/>
+              </a:spcBef>
+              <a:spcAft>
+                <a:spcPts val="333"/>
+              </a:spcAft>
+              <a:buClrTx/>
+              <a:buSzTx/>
+              <a:buFontTx/>
+              <a:buNone/>
+              <a:tabLst/>
+              <a:defRPr/>
+            </a:pPr>
+            <a:r>
+              <a:rPr lang="en-US" sz="1200" kern="1200" dirty="0" smtClean="0">
+                <a:solidFill>
+                  <a:schemeClr val="tx1"/>
+                </a:solidFill>
+                <a:effectLst/>
+                <a:latin typeface="Arial" panose="020B0604020202020204" pitchFamily="34" charset="0"/>
+                <a:ea typeface="ＭＳ Ｐゴシック" charset="0"/>
+                <a:cs typeface="+mn-cs"/>
+              </a:rPr>
+              <a:t>ec2-54-164-54-218.compute-1.amazonaws.com = Target node.</a:t>
+            </a:r>
+          </a:p>
+          <a:p>
+            <a:pPr marL="0" marR="0" lvl="2" indent="0" algn="l" defTabSz="914363" rtl="0" eaLnBrk="1" fontAlgn="auto" latinLnBrk="0" hangingPunct="1">
+              <a:lnSpc>
+                <a:spcPct val="90000"/>
+              </a:lnSpc>
+              <a:spcBef>
+                <a:spcPts val="0"/>
+              </a:spcBef>
+              <a:spcAft>
+                <a:spcPts val="333"/>
+              </a:spcAft>
+              <a:buClrTx/>
+              <a:buSzTx/>
+              <a:buFontTx/>
+              <a:buNone/>
+              <a:tabLst/>
+              <a:defRPr/>
+            </a:pPr>
             <a:r>
               <a:rPr lang="en-US" baseline="0" smtClean="0"/>
-              <a:t>the ChefDK </a:t>
-            </a:r>
-            <a:r>
-              <a:rPr lang="en-US" baseline="0" dirty="0" smtClean="0"/>
-              <a:t>tools on those nodes until near the end of this class when you will write one remediation recipe.</a:t>
-            </a:r>
-            <a:endParaRPr lang="en-US" dirty="0"/>
+              <a:t>The login credentials for them is chef/chef.</a:t>
+            </a:r>
+          </a:p>
+          <a:p>
+            <a:pPr marL="0" marR="0" lvl="2" indent="0" algn="l" defTabSz="914363" rtl="0" eaLnBrk="1" fontAlgn="auto" latinLnBrk="0" hangingPunct="1">
+              <a:lnSpc>
+                <a:spcPct val="90000"/>
+              </a:lnSpc>
+              <a:spcBef>
+                <a:spcPts val="0"/>
+              </a:spcBef>
+              <a:spcAft>
+                <a:spcPts val="333"/>
+              </a:spcAft>
+              <a:buClrTx/>
+              <a:buSzTx/>
+              <a:buFontTx/>
+              <a:buNone/>
+              <a:tabLst/>
+              <a:defRPr/>
+            </a:pPr>
+            <a:endParaRPr lang="en-US" baseline="0" dirty="0" smtClean="0"/>
+          </a:p>
+          <a:p>
+            <a:pPr marL="0" marR="0" lvl="2" indent="0" algn="l" defTabSz="914363" rtl="0" eaLnBrk="1" fontAlgn="auto" latinLnBrk="0" hangingPunct="1">
+              <a:lnSpc>
+                <a:spcPct val="90000"/>
+              </a:lnSpc>
+              <a:spcBef>
+                <a:spcPts val="0"/>
+              </a:spcBef>
+              <a:spcAft>
+                <a:spcPts val="333"/>
+              </a:spcAft>
+              <a:buClrTx/>
+              <a:buSzTx/>
+              <a:buFontTx/>
+              <a:buNone/>
+              <a:tabLst/>
+              <a:defRPr/>
+            </a:pPr>
+            <a:endParaRPr lang="en-US" baseline="0" dirty="0" smtClean="0"/>
+          </a:p>
+          <a:p>
+            <a:pPr marL="0" marR="0" lvl="2" indent="0" algn="l" defTabSz="914363" rtl="0" eaLnBrk="1" fontAlgn="auto" latinLnBrk="0" hangingPunct="1">
+              <a:lnSpc>
+                <a:spcPct val="90000"/>
+              </a:lnSpc>
+              <a:spcBef>
+                <a:spcPts val="0"/>
+              </a:spcBef>
+              <a:spcAft>
+                <a:spcPts val="333"/>
+              </a:spcAft>
+              <a:buClrTx/>
+              <a:buSzTx/>
+              <a:buFontTx/>
+              <a:buNone/>
+              <a:tabLst/>
+              <a:defRPr/>
+            </a:pPr>
+            <a:endParaRPr lang="en-US" baseline="0" dirty="0" smtClean="0"/>
           </a:p>
         </p:txBody>
       </p:sp>
@@ -2417,20 +3115,6 @@
           </a:p>
           <a:p>
             <a:endParaRPr lang="en-US" baseline="0" dirty="0" smtClean="0"/>
-          </a:p>
-          <a:p>
-            <a:r>
-              <a:rPr lang="en-US" baseline="0" dirty="0" smtClean="0"/>
-              <a:t>Instructor Note: You should assign the participants their </a:t>
-            </a:r>
-            <a:r>
-              <a:rPr lang="en-US" baseline="0" dirty="0" smtClean="0"/>
-              <a:t>2 nodes each at </a:t>
-            </a:r>
-            <a:r>
-              <a:rPr lang="en-US" baseline="0" dirty="0" smtClean="0"/>
-              <a:t>this time. The login credentials for them is chef/chef.</a:t>
-            </a:r>
           </a:p>
           <a:p>
             <a:endParaRPr lang="en-US" baseline="0" dirty="0" smtClean="0"/>
@@ -3021,14 +3705,14 @@
           </a:ln>
           <a:extLst>
             <a:ext uri="{909E8E84-426E-40dd-AFC4-6F175D3DCCD1}">
-              <a14:hiddenFill xmlns:a14="http://schemas.microsoft.com/office/drawing/2010/main" xmlns="">
+              <a14:hiddenFill xmlns="" xmlns:a14="http://schemas.microsoft.com/office/drawing/2010/main">
                 <a:solidFill>
                   <a:srgbClr val="FFFFFF"/>
                 </a:solidFill>
               </a14:hiddenFill>
             </a:ext>
             <a:ext uri="{91240B29-F687-4f45-9708-019B960494DF}">
-              <a14:hiddenLine xmlns:a14="http://schemas.microsoft.com/office/drawing/2010/main" xmlns="" w="9525">
+              <a14:hiddenLine xmlns="" xmlns:a14="http://schemas.microsoft.com/office/drawing/2010/main" w="9525">
                 <a:solidFill>
                   <a:srgbClr val="000000"/>
                 </a:solidFill>
@@ -3176,14 +3860,14 @@
           </a:ln>
           <a:extLst>
             <a:ext uri="{909E8E84-426E-40dd-AFC4-6F175D3DCCD1}">
-              <a14:hiddenFill xmlns:a14="http://schemas.microsoft.com/office/drawing/2010/main" xmlns="">
+              <a14:hiddenFill xmlns="" xmlns:a14="http://schemas.microsoft.com/office/drawing/2010/main">
                 <a:solidFill>
                   <a:srgbClr val="FFFFFF"/>
                 </a:solidFill>
               </a14:hiddenFill>
             </a:ext>
             <a:ext uri="{91240B29-F687-4f45-9708-019B960494DF}">
-              <a14:hiddenLine xmlns:a14="http://schemas.microsoft.com/office/drawing/2010/main" xmlns="" w="9525">
+              <a14:hiddenLine xmlns="" xmlns:a14="http://schemas.microsoft.com/office/drawing/2010/main" w="9525">
                 <a:solidFill>
                   <a:srgbClr val="000000"/>
                 </a:solidFill>
@@ -3674,14 +4358,14 @@
           </a:ln>
           <a:extLst>
             <a:ext uri="{909E8E84-426E-40dd-AFC4-6F175D3DCCD1}">
-              <a14:hiddenFill xmlns:a14="http://schemas.microsoft.com/office/drawing/2010/main" xmlns="">
+              <a14:hiddenFill xmlns="" xmlns:a14="http://schemas.microsoft.com/office/drawing/2010/main">
                 <a:solidFill>
                   <a:srgbClr val="FFFFFF"/>
                 </a:solidFill>
               </a14:hiddenFill>
             </a:ext>
             <a:ext uri="{91240B29-F687-4f45-9708-019B960494DF}">
-              <a14:hiddenLine xmlns:a14="http://schemas.microsoft.com/office/drawing/2010/main" xmlns="" w="9525">
+              <a14:hiddenLine xmlns="" xmlns:a14="http://schemas.microsoft.com/office/drawing/2010/main" w="9525">
                 <a:solidFill>
                   <a:srgbClr val="000000"/>
                 </a:solidFill>
@@ -6555,14 +7239,14 @@
           </a:ln>
           <a:extLst>
             <a:ext uri="{909E8E84-426E-40dd-AFC4-6F175D3DCCD1}">
-              <a14:hiddenFill xmlns:a14="http://schemas.microsoft.com/office/drawing/2010/main" xmlns="">
+              <a14:hiddenFill xmlns="" xmlns:a14="http://schemas.microsoft.com/office/drawing/2010/main">
                 <a:solidFill>
                   <a:srgbClr val="FFFFFF"/>
                 </a:solidFill>
               </a14:hiddenFill>
             </a:ext>
             <a:ext uri="{91240B29-F687-4f45-9708-019B960494DF}">
-              <a14:hiddenLine xmlns:a14="http://schemas.microsoft.com/office/drawing/2010/main" xmlns="" w="9525">
+              <a14:hiddenLine xmlns="" xmlns:a14="http://schemas.microsoft.com/office/drawing/2010/main" w="9525">
                 <a:solidFill>
                   <a:srgbClr val="000000"/>
                 </a:solidFill>
@@ -7919,14 +8603,14 @@
           </a:ln>
           <a:extLst>
             <a:ext uri="{909E8E84-426E-40dd-AFC4-6F175D3DCCD1}">
-              <a14:hiddenFill xmlns:a14="http://schemas.microsoft.com/office/drawing/2010/main" xmlns="">
+              <a14:hiddenFill xmlns="" xmlns:a14="http://schemas.microsoft.com/office/drawing/2010/main">
                 <a:solidFill>
                   <a:srgbClr val="FFFFFF"/>
                 </a:solidFill>
               </a14:hiddenFill>
             </a:ext>
             <a:ext uri="{91240B29-F687-4f45-9708-019B960494DF}">
-              <a14:hiddenLine xmlns:a14="http://schemas.microsoft.com/office/drawing/2010/main" xmlns="" w="9525">
+              <a14:hiddenLine xmlns="" xmlns:a14="http://schemas.microsoft.com/office/drawing/2010/main" w="9525">
                 <a:solidFill>
                   <a:srgbClr val="000000"/>
                 </a:solidFill>
@@ -8484,14 +9168,14 @@
           </a:ln>
           <a:extLst>
             <a:ext uri="{909E8E84-426E-40dd-AFC4-6F175D3DCCD1}">
-              <a14:hiddenFill xmlns:a14="http://schemas.microsoft.com/office/drawing/2010/main" xmlns="">
+              <a14:hiddenFill xmlns="" xmlns:a14="http://schemas.microsoft.com/office/drawing/2010/main">
                 <a:solidFill>
                   <a:srgbClr val="FFFFFF"/>
                 </a:solidFill>
               </a14:hiddenFill>
             </a:ext>
             <a:ext uri="{91240B29-F687-4f45-9708-019B960494DF}">
-              <a14:hiddenLine xmlns:a14="http://schemas.microsoft.com/office/drawing/2010/main" xmlns="" w="9525">
+              <a14:hiddenLine xmlns="" xmlns:a14="http://schemas.microsoft.com/office/drawing/2010/main" w="9525">
                 <a:solidFill>
                   <a:srgbClr val="000000"/>
                 </a:solidFill>
@@ -9058,14 +9742,14 @@
           </a:ln>
           <a:extLst>
             <a:ext uri="{909E8E84-426E-40dd-AFC4-6F175D3DCCD1}">
-              <a14:hiddenFill xmlns:a14="http://schemas.microsoft.com/office/drawing/2010/main" xmlns="">
+              <a14:hiddenFill xmlns="" xmlns:a14="http://schemas.microsoft.com/office/drawing/2010/main">
                 <a:solidFill>
                   <a:srgbClr val="FFFFFF"/>
                 </a:solidFill>
               </a14:hiddenFill>
             </a:ext>
             <a:ext uri="{91240B29-F687-4f45-9708-019B960494DF}">
-              <a14:hiddenLine xmlns:a14="http://schemas.microsoft.com/office/drawing/2010/main" xmlns="" w="9525">
+              <a14:hiddenLine xmlns="" xmlns:a14="http://schemas.microsoft.com/office/drawing/2010/main" w="9525">
                 <a:solidFill>
                   <a:srgbClr val="000000"/>
                 </a:solidFill>
@@ -10005,14 +10689,14 @@
           </a:ln>
           <a:extLst>
             <a:ext uri="{909E8E84-426E-40dd-AFC4-6F175D3DCCD1}">
-              <a14:hiddenFill xmlns:a14="http://schemas.microsoft.com/office/drawing/2010/main" xmlns="">
+              <a14:hiddenFill xmlns="" xmlns:a14="http://schemas.microsoft.com/office/drawing/2010/main">
                 <a:solidFill>
                   <a:srgbClr val="FFFFFF"/>
                 </a:solidFill>
               </a14:hiddenFill>
             </a:ext>
             <a:ext uri="{91240B29-F687-4f45-9708-019B960494DF}">
-              <a14:hiddenLine xmlns:a14="http://schemas.microsoft.com/office/drawing/2010/main" xmlns="" w="9525">
+              <a14:hiddenLine xmlns="" xmlns:a14="http://schemas.microsoft.com/office/drawing/2010/main" w="9525">
                 <a:solidFill>
                   <a:srgbClr val="000000"/>
                 </a:solidFill>
@@ -10766,14 +11450,14 @@
           </a:ln>
           <a:extLst>
             <a:ext uri="{909E8E84-426E-40dd-AFC4-6F175D3DCCD1}">
-              <a14:hiddenFill xmlns:a14="http://schemas.microsoft.com/office/drawing/2010/main" xmlns="">
+              <a14:hiddenFill xmlns="" xmlns:a14="http://schemas.microsoft.com/office/drawing/2010/main">
                 <a:solidFill>
                   <a:srgbClr val="FFFFFF"/>
                 </a:solidFill>
               </a14:hiddenFill>
             </a:ext>
             <a:ext uri="{91240B29-F687-4f45-9708-019B960494DF}">
-              <a14:hiddenLine xmlns:a14="http://schemas.microsoft.com/office/drawing/2010/main" xmlns="" w="9525">
+              <a14:hiddenLine xmlns="" xmlns:a14="http://schemas.microsoft.com/office/drawing/2010/main" w="9525">
                 <a:solidFill>
                   <a:srgbClr val="000000"/>
                 </a:solidFill>
@@ -13165,79 +13849,6 @@
 </file>
 
 <file path=ppt/slides/slide13.xml><?xml version="1.0" encoding="utf-8"?>
-<p:sld xmlns:a="http://schemas.openxmlformats.org/drawingml/2006/main" xmlns:r="http://schemas.openxmlformats.org/officeDocument/2006/relationships" xmlns:p="http://schemas.openxmlformats.org/presentationml/2006/main">
-  <p:cSld>
-    <p:spTree>
-      <p:nvGrpSpPr>
-        <p:cNvPr id="1" name=""/>
-        <p:cNvGrpSpPr/>
-        <p:nvPr/>
-      </p:nvGrpSpPr>
-      <p:grpSpPr>
-        <a:xfrm>
-          <a:off x="0" y="0"/>
-          <a:ext cx="0" cy="0"/>
-          <a:chOff x="0" y="0"/>
-          <a:chExt cx="0" cy="0"/>
-        </a:xfrm>
-      </p:grpSpPr>
-      <p:sp>
-        <p:nvSpPr>
-          <p:cNvPr id="2" name="Title 1"/>
-          <p:cNvSpPr>
-            <a:spLocks noGrp="1"/>
-          </p:cNvSpPr>
-          <p:nvPr>
-            <p:ph type="ctrTitle"/>
-          </p:nvPr>
-        </p:nvSpPr>
-        <p:spPr/>
-        <p:txBody>
-          <a:bodyPr>
-            <a:normAutofit fontScale="90000"/>
-          </a:bodyPr>
-          <a:lstStyle/>
-          <a:p>
-            <a:endParaRPr lang="en-US"/>
-          </a:p>
-        </p:txBody>
-      </p:sp>
-      <p:sp>
-        <p:nvSpPr>
-          <p:cNvPr id="3" name="Subtitle 2"/>
-          <p:cNvSpPr>
-            <a:spLocks noGrp="1"/>
-          </p:cNvSpPr>
-          <p:nvPr>
-            <p:ph type="subTitle" idx="1"/>
-          </p:nvPr>
-        </p:nvSpPr>
-        <p:spPr/>
-        <p:txBody>
-          <a:bodyPr/>
-          <a:lstStyle/>
-          <a:p>
-            <a:endParaRPr lang="en-US"/>
-          </a:p>
-        </p:txBody>
-      </p:sp>
-    </p:spTree>
-    <p:extLst>
-      <p:ext uri="{BB962C8B-B14F-4D97-AF65-F5344CB8AC3E}">
-        <p14:creationId xmlns:p14="http://schemas.microsoft.com/office/powerpoint/2010/main" val="3842220861"/>
-      </p:ext>
-    </p:extLst>
-  </p:cSld>
-  <p:clrMapOvr>
-    <a:masterClrMapping/>
-  </p:clrMapOvr>
-  <p:transition spd="med">
-    <p:fade/>
-  </p:transition>
-</p:sld>
-</file>
-
-<file path=ppt/slides/slide14.xml><?xml version="1.0" encoding="utf-8"?>
 <p:sld xmlns:a="http://schemas.openxmlformats.org/drawingml/2006/main" xmlns:r="http://schemas.openxmlformats.org/officeDocument/2006/relationships" xmlns:p="http://schemas.openxmlformats.org/presentationml/2006/main">
   <p:cSld>
     <p:spTree>
@@ -16051,27 +16662,6 @@
 </file>
 
 <file path=customXml/item1.xml><?xml version="1.0" encoding="utf-8"?>
-<p:properties xmlns:p="http://schemas.microsoft.com/office/2006/metadata/properties" xmlns:xsi="http://www.w3.org/2001/XMLSchema-instance" xmlns:pc="http://schemas.microsoft.com/office/infopath/2007/PartnerControls">
-  <documentManagement>
-    <_dlc_DocId xmlns="7bb5d761-a2ea-4873-95f7-7a6658fb3ef0">M4CWTKMW727E-592-73</_dlc_DocId>
-    <_dlc_DocIdUrl xmlns="7bb5d761-a2ea-4873-95f7-7a6658fb3ef0">
-      <Url>https://kms.vci.local/marketing/team/_layouts/DocIdRedir.aspx?ID=M4CWTKMW727E-592-73</Url>
-      <Description>M4CWTKMW727E-592-73</Description>
-    </_dlc_DocIdUrl>
-  </documentManagement>
-</p:properties>
-</file>
-
-<file path=customXml/item2.xml><?xml version="1.0" encoding="utf-8"?>
-<?mso-contentType ?>
-<FormTemplates xmlns="http://schemas.microsoft.com/sharepoint/v3/contenttype/forms">
-  <Display>DocumentLibraryForm</Display>
-  <Edit>DocumentLibraryForm</Edit>
-  <New>DocumentLibraryForm</New>
-</FormTemplates>
-</file>
-
-<file path=customXml/item3.xml><?xml version="1.0" encoding="utf-8"?>
 <?mso-contentType ?>
 <spe:Receivers xmlns:spe="http://schemas.microsoft.com/sharepoint/events">
   <Receiver>
@@ -16115,6 +16705,27 @@
     <Filter/>
   </Receiver>
 </spe:Receivers>
+</file>
+
+<file path=customXml/item2.xml><?xml version="1.0" encoding="utf-8"?>
+<?mso-contentType ?>
+<FormTemplates xmlns="http://schemas.microsoft.com/sharepoint/v3/contenttype/forms">
+  <Display>DocumentLibraryForm</Display>
+  <Edit>DocumentLibraryForm</Edit>
+  <New>DocumentLibraryForm</New>
+</FormTemplates>
+</file>
+
+<file path=customXml/item3.xml><?xml version="1.0" encoding="utf-8"?>
+<p:properties xmlns:p="http://schemas.microsoft.com/office/2006/metadata/properties" xmlns:xsi="http://www.w3.org/2001/XMLSchema-instance" xmlns:pc="http://schemas.microsoft.com/office/infopath/2007/PartnerControls">
+  <documentManagement>
+    <_dlc_DocId xmlns="7bb5d761-a2ea-4873-95f7-7a6658fb3ef0">M4CWTKMW727E-592-73</_dlc_DocId>
+    <_dlc_DocIdUrl xmlns="7bb5d761-a2ea-4873-95f7-7a6658fb3ef0">
+      <Url>https://kms.vci.local/marketing/team/_layouts/DocIdRedir.aspx?ID=M4CWTKMW727E-592-73</Url>
+      <Description>M4CWTKMW727E-592-73</Description>
+    </_dlc_DocIdUrl>
+  </documentManagement>
+</p:properties>
 </file>
 
 <file path=customXml/item4.xml><?xml version="1.0" encoding="utf-8"?>
@@ -16263,17 +16874,9 @@
 </file>
 
 <file path=customXml/itemProps1.xml><?xml version="1.0" encoding="utf-8"?>
-<ds:datastoreItem xmlns:ds="http://schemas.openxmlformats.org/officeDocument/2006/customXml" ds:itemID="{6921749B-AEB7-461B-845F-603CABD25259}">
+<ds:datastoreItem xmlns:ds="http://schemas.openxmlformats.org/officeDocument/2006/customXml" ds:itemID="{B13EBC30-FE27-4C6A-B723-23FC2188F7DC}">
   <ds:schemaRefs>
-    <ds:schemaRef ds:uri="http://purl.org/dc/elements/1.1/"/>
-    <ds:schemaRef ds:uri="http://schemas.microsoft.com/office/2006/metadata/properties"/>
-    <ds:schemaRef ds:uri="7bb5d761-a2ea-4873-95f7-7a6658fb3ef0"/>
-    <ds:schemaRef ds:uri="http://purl.org/dc/terms/"/>
-    <ds:schemaRef ds:uri="http://schemas.openxmlformats.org/package/2006/metadata/core-properties"/>
-    <ds:schemaRef ds:uri="http://schemas.microsoft.com/office/2006/documentManagement/types"/>
-    <ds:schemaRef ds:uri="http://schemas.microsoft.com/office/infopath/2007/PartnerControls"/>
-    <ds:schemaRef ds:uri="http://www.w3.org/XML/1998/namespace"/>
-    <ds:schemaRef ds:uri="http://purl.org/dc/dcmitype/"/>
+    <ds:schemaRef ds:uri="http://schemas.microsoft.com/sharepoint/events"/>
   </ds:schemaRefs>
 </ds:datastoreItem>
 </file>
@@ -16287,9 +16890,17 @@
 </file>
 
 <file path=customXml/itemProps3.xml><?xml version="1.0" encoding="utf-8"?>
-<ds:datastoreItem xmlns:ds="http://schemas.openxmlformats.org/officeDocument/2006/customXml" ds:itemID="{B13EBC30-FE27-4C6A-B723-23FC2188F7DC}">
+<ds:datastoreItem xmlns:ds="http://schemas.openxmlformats.org/officeDocument/2006/customXml" ds:itemID="{6921749B-AEB7-461B-845F-603CABD25259}">
   <ds:schemaRefs>
-    <ds:schemaRef ds:uri="http://schemas.microsoft.com/sharepoint/events"/>
+    <ds:schemaRef ds:uri="http://purl.org/dc/elements/1.1/"/>
+    <ds:schemaRef ds:uri="http://schemas.microsoft.com/office/2006/metadata/properties"/>
+    <ds:schemaRef ds:uri="7bb5d761-a2ea-4873-95f7-7a6658fb3ef0"/>
+    <ds:schemaRef ds:uri="http://purl.org/dc/terms/"/>
+    <ds:schemaRef ds:uri="http://schemas.openxmlformats.org/package/2006/metadata/core-properties"/>
+    <ds:schemaRef ds:uri="http://schemas.microsoft.com/office/2006/documentManagement/types"/>
+    <ds:schemaRef ds:uri="http://schemas.microsoft.com/office/infopath/2007/PartnerControls"/>
+    <ds:schemaRef ds:uri="http://www.w3.org/XML/1998/namespace"/>
+    <ds:schemaRef ds:uri="http://purl.org/dc/dcmitype/"/>
   </ds:schemaRefs>
 </ds:datastoreItem>
 </file>

</xml_diff>

<commit_message>
added concept slides 4 and 5 clarified lab environment slide
</commit_message>
<xml_diff>
--- a/01-Intro.pptx
+++ b/01-Intro.pptx
@@ -15,7 +15,7 @@
     <p:sldId id="256" r:id="rId7"/>
     <p:sldId id="291" r:id="rId8"/>
     <p:sldId id="257" r:id="rId9"/>
-    <p:sldId id="296" r:id="rId10"/>
+    <p:sldId id="299" r:id="rId10"/>
     <p:sldId id="283" r:id="rId11"/>
     <p:sldId id="294" r:id="rId12"/>
     <p:sldId id="295" r:id="rId13"/>
@@ -289,7 +289,7 @@
               <a:pPr>
                 <a:defRPr/>
               </a:pPr>
-              <a:t>2015-12-30</a:t>
+              <a:t>2016-01-11</a:t>
             </a:fld>
             <a:endParaRPr lang="en-US" dirty="0"/>
           </a:p>
@@ -472,7 +472,7 @@
               <a:pPr>
                 <a:defRPr/>
               </a:pPr>
-              <a:t>2015-12-30</a:t>
+              <a:t>2016-01-11</a:t>
             </a:fld>
             <a:endParaRPr lang="en-US" dirty="0"/>
           </a:p>
@@ -1601,6 +1601,92 @@
           <a:bodyPr/>
           <a:lstStyle/>
           <a:p>
+            <a:r>
+              <a:rPr lang="en-US" sz="1200" b="0" i="0" kern="1200" dirty="0" smtClean="0">
+                <a:solidFill>
+                  <a:schemeClr val="tx1"/>
+                </a:solidFill>
+                <a:effectLst/>
+                <a:latin typeface="Arial" panose="020B0604020202020204" pitchFamily="34" charset="0"/>
+                <a:ea typeface="ＭＳ Ｐゴシック" charset="0"/>
+                <a:cs typeface="Arial" panose="020B0604020202020204" pitchFamily="34" charset="0"/>
+              </a:rPr>
+              <a:t>Compliance profiles exist for many scenarios, such as those created by the Center for Internet Security (CIS), a non-profit organization that is focused on enhancing the cyber security readiness and response of public and private sector entities.</a:t>
+            </a:r>
+          </a:p>
+          <a:p>
+            <a:endParaRPr lang="en-US" sz="1200" b="0" i="0" kern="1200" dirty="0" smtClean="0">
+              <a:solidFill>
+                <a:schemeClr val="tx1"/>
+              </a:solidFill>
+              <a:effectLst/>
+              <a:latin typeface="Arial" panose="020B0604020202020204" pitchFamily="34" charset="0"/>
+              <a:ea typeface="ＭＳ Ｐゴシック" charset="0"/>
+              <a:cs typeface="Arial" panose="020B0604020202020204" pitchFamily="34" charset="0"/>
+            </a:endParaRPr>
+          </a:p>
+          <a:p>
+            <a:r>
+              <a:rPr lang="en-US" sz="1200" b="0" i="0" kern="1200" dirty="0" smtClean="0">
+                <a:solidFill>
+                  <a:schemeClr val="tx1"/>
+                </a:solidFill>
+                <a:effectLst/>
+                <a:latin typeface="Arial" panose="020B0604020202020204" pitchFamily="34" charset="0"/>
+                <a:ea typeface="ＭＳ Ｐゴシック" charset="0"/>
+                <a:cs typeface="Arial" panose="020B0604020202020204" pitchFamily="34" charset="0"/>
+              </a:rPr>
+              <a:t>Chef Compliance maintains profiles as a collection of individual controls that comprise a complete audit. For example, CIS benchmark 8.1.1.1 recommends testing for the maximum size of the audit log. </a:t>
+            </a:r>
+          </a:p>
+          <a:p>
+            <a:endParaRPr lang="en-US" sz="1200" b="0" i="0" kern="1200" dirty="0" smtClean="0">
+              <a:solidFill>
+                <a:schemeClr val="tx1"/>
+              </a:solidFill>
+              <a:effectLst/>
+              <a:latin typeface="Arial" panose="020B0604020202020204" pitchFamily="34" charset="0"/>
+              <a:ea typeface="ＭＳ Ｐゴシック" charset="0"/>
+              <a:cs typeface="Arial" panose="020B0604020202020204" pitchFamily="34" charset="0"/>
+            </a:endParaRPr>
+          </a:p>
+          <a:p>
+            <a:pPr marL="0" marR="0" indent="0" algn="l" defTabSz="1217613" rtl="0" eaLnBrk="1" fontAlgn="base" latinLnBrk="0" hangingPunct="1">
+              <a:lnSpc>
+                <a:spcPct val="90000"/>
+              </a:lnSpc>
+              <a:spcBef>
+                <a:spcPct val="30000"/>
+              </a:spcBef>
+              <a:spcAft>
+                <a:spcPts val="450"/>
+              </a:spcAft>
+              <a:buClrTx/>
+              <a:buSzTx/>
+              <a:buFontTx/>
+              <a:buNone/>
+              <a:tabLst/>
+              <a:defRPr/>
+            </a:pPr>
+            <a:r>
+              <a:rPr lang="en-US" sz="1200" dirty="0" smtClean="0"/>
+              <a:t>You can also create your own custom Compliance profiles</a:t>
+            </a:r>
+            <a:r>
+              <a:rPr lang="en-US" dirty="0" smtClean="0"/>
+              <a:t>.</a:t>
+            </a:r>
+            <a:endParaRPr lang="en-US" sz="1200" b="0" i="0" kern="1200" dirty="0" smtClean="0">
+              <a:solidFill>
+                <a:schemeClr val="tx1"/>
+              </a:solidFill>
+              <a:effectLst/>
+              <a:latin typeface="Arial" panose="020B0604020202020204" pitchFamily="34" charset="0"/>
+              <a:ea typeface="ＭＳ Ｐゴシック" charset="0"/>
+              <a:cs typeface="Arial" panose="020B0604020202020204" pitchFamily="34" charset="0"/>
+            </a:endParaRPr>
+          </a:p>
+          <a:p>
             <a:endParaRPr lang="en-US" dirty="0"/>
           </a:p>
         </p:txBody>
@@ -1628,7 +1714,7 @@
               <a:pPr>
                 <a:defRPr/>
               </a:pPr>
-              <a:t>12</a:t>
+              <a:t>11</a:t>
             </a:fld>
             <a:endParaRPr lang="en-US" dirty="0"/>
           </a:p>
@@ -1681,7 +1767,7 @@
     </p:spTree>
     <p:extLst>
       <p:ext uri="{BB962C8B-B14F-4D97-AF65-F5344CB8AC3E}">
-        <p14:creationId xmlns:p14="http://schemas.microsoft.com/office/powerpoint/2010/main" val="3803967664"/>
+        <p14:creationId xmlns:p14="http://schemas.microsoft.com/office/powerpoint/2010/main" val="1327194117"/>
       </p:ext>
     </p:extLst>
   </p:cSld>
@@ -1730,254 +1816,92 @@
             <p:ph type="body" idx="1"/>
           </p:nvPr>
         </p:nvSpPr>
-        <p:spPr>
-          <a:xfrm>
-            <a:off x="685800" y="4343400"/>
-            <a:ext cx="5486400" cy="4114800"/>
-          </a:xfrm>
-          <a:prstGeom prst="rect">
-            <a:avLst/>
-          </a:prstGeom>
-        </p:spPr>
+        <p:spPr/>
         <p:txBody>
           <a:bodyPr/>
           <a:lstStyle/>
           <a:p>
-            <a:pPr marL="0" marR="0" lvl="2" indent="0" algn="l" defTabSz="914363" rtl="0" eaLnBrk="1" fontAlgn="auto" latinLnBrk="0" hangingPunct="1">
-              <a:lnSpc>
-                <a:spcPct val="90000"/>
-              </a:lnSpc>
-              <a:spcBef>
-                <a:spcPts val="0"/>
-              </a:spcBef>
-              <a:spcAft>
-                <a:spcPts val="333"/>
-              </a:spcAft>
-              <a:buClrTx/>
-              <a:buSzTx/>
-              <a:buFontTx/>
-              <a:buNone/>
-              <a:tabLst/>
+            <a:endParaRPr lang="en-US" dirty="0"/>
+          </a:p>
+        </p:txBody>
+      </p:sp>
+      <p:sp>
+        <p:nvSpPr>
+          <p:cNvPr id="4" name="Slide Number Placeholder 3"/>
+          <p:cNvSpPr>
+            <a:spLocks noGrp="1"/>
+          </p:cNvSpPr>
+          <p:nvPr>
+            <p:ph type="sldNum" sz="quarter" idx="10"/>
+          </p:nvPr>
+        </p:nvSpPr>
+        <p:spPr/>
+        <p:txBody>
+          <a:bodyPr/>
+          <a:lstStyle/>
+          <a:p>
+            <a:pPr>
               <a:defRPr/>
             </a:pPr>
-            <a:r>
-              <a:rPr lang="en-US" dirty="0" smtClean="0"/>
-              <a:t>These are basic AWS AMIs</a:t>
-            </a:r>
-            <a:r>
-              <a:rPr lang="en-US" baseline="0" dirty="0" smtClean="0"/>
-              <a:t> that we use for Chef training. They have ChefDK installed on them but you will not be using any of the ChefDK tools on those nodes until near the end of this class when you will write one remediation recipe.</a:t>
-            </a:r>
-          </a:p>
-          <a:p>
-            <a:pPr marL="0" marR="0" lvl="2" indent="0" algn="l" defTabSz="914363" rtl="0" eaLnBrk="1" fontAlgn="auto" latinLnBrk="0" hangingPunct="1">
-              <a:lnSpc>
-                <a:spcPct val="90000"/>
-              </a:lnSpc>
-              <a:spcBef>
-                <a:spcPts val="0"/>
-              </a:spcBef>
-              <a:spcAft>
-                <a:spcPts val="333"/>
-              </a:spcAft>
-              <a:buClrTx/>
-              <a:buSzTx/>
-              <a:buFontTx/>
-              <a:buNone/>
-              <a:tabLst/>
+            <a:fld id="{DC3734AA-3150-D947-AC52-2F5DF48BFCD5}" type="slidenum">
+              <a:rPr lang="en-US" smtClean="0"/>
+              <a:pPr>
+                <a:defRPr/>
+              </a:pPr>
+              <a:t>12</a:t>
+            </a:fld>
+            <a:endParaRPr lang="en-US" dirty="0"/>
+          </a:p>
+        </p:txBody>
+      </p:sp>
+      <p:sp>
+        <p:nvSpPr>
+          <p:cNvPr id="5" name="Header Placeholder 4"/>
+          <p:cNvSpPr>
+            <a:spLocks noGrp="1"/>
+          </p:cNvSpPr>
+          <p:nvPr>
+            <p:ph type="hdr" sz="quarter" idx="11"/>
+          </p:nvPr>
+        </p:nvSpPr>
+        <p:spPr/>
+        <p:txBody>
+          <a:bodyPr/>
+          <a:lstStyle/>
+          <a:p>
+            <a:pPr>
               <a:defRPr/>
             </a:pPr>
-            <a:endParaRPr lang="en-US" baseline="0" dirty="0" smtClean="0"/>
-          </a:p>
-          <a:p>
-            <a:pPr marL="0" marR="0" lvl="2" indent="0" algn="l" defTabSz="914363" rtl="0" eaLnBrk="1" fontAlgn="auto" latinLnBrk="0" hangingPunct="1">
-              <a:lnSpc>
-                <a:spcPct val="90000"/>
-              </a:lnSpc>
-              <a:spcBef>
-                <a:spcPts val="0"/>
-              </a:spcBef>
-              <a:spcAft>
-                <a:spcPts val="333"/>
-              </a:spcAft>
-              <a:buClrTx/>
-              <a:buSzTx/>
-              <a:buFontTx/>
-              <a:buNone/>
-              <a:tabLst/>
+            <a:endParaRPr lang="en-US"/>
+          </a:p>
+        </p:txBody>
+      </p:sp>
+      <p:sp>
+        <p:nvSpPr>
+          <p:cNvPr id="6" name="Footer Placeholder 5"/>
+          <p:cNvSpPr>
+            <a:spLocks noGrp="1"/>
+          </p:cNvSpPr>
+          <p:nvPr>
+            <p:ph type="ftr" sz="quarter" idx="12"/>
+          </p:nvPr>
+        </p:nvSpPr>
+        <p:spPr/>
+        <p:txBody>
+          <a:bodyPr/>
+          <a:lstStyle/>
+          <a:p>
+            <a:pPr>
               <a:defRPr/>
             </a:pPr>
-            <a:r>
-              <a:rPr lang="en-US" baseline="0" dirty="0" smtClean="0"/>
-              <a:t>Instructor Note: Now would be a good time to distribute the hostnames of the two nodes you will assign to each student.</a:t>
-            </a:r>
-            <a:r>
-              <a:rPr lang="en-US" baseline="0" dirty="0"/>
-              <a:t> </a:t>
-            </a:r>
-            <a:r>
-              <a:rPr lang="en-US" baseline="0" dirty="0" smtClean="0"/>
-              <a:t>You should ask the students to note which one they will use as their Compliance Server and which one they will use as the target node for scans.</a:t>
-            </a:r>
-          </a:p>
-          <a:p>
-            <a:pPr marL="0" marR="0" lvl="2" indent="0" algn="l" defTabSz="914363" rtl="0" eaLnBrk="1" fontAlgn="auto" latinLnBrk="0" hangingPunct="1">
-              <a:lnSpc>
-                <a:spcPct val="90000"/>
-              </a:lnSpc>
-              <a:spcBef>
-                <a:spcPts val="0"/>
-              </a:spcBef>
-              <a:spcAft>
-                <a:spcPts val="333"/>
-              </a:spcAft>
-              <a:buClrTx/>
-              <a:buSzTx/>
-              <a:buFontTx/>
-              <a:buNone/>
-              <a:tabLst/>
-              <a:defRPr/>
-            </a:pPr>
-            <a:r>
-              <a:rPr lang="en-US" baseline="0" dirty="0" smtClean="0"/>
-              <a:t>For example: </a:t>
-            </a:r>
-            <a:br>
-              <a:rPr lang="en-US" baseline="0" dirty="0" smtClean="0"/>
-            </a:br>
-            <a:r>
-              <a:rPr lang="en-US" sz="1200" kern="1200" dirty="0" smtClean="0">
-                <a:solidFill>
-                  <a:schemeClr val="tx1"/>
-                </a:solidFill>
-                <a:effectLst/>
-                <a:latin typeface="Arial" panose="020B0604020202020204" pitchFamily="34" charset="0"/>
-                <a:ea typeface="ＭＳ Ｐゴシック" charset="0"/>
-                <a:cs typeface="+mn-cs"/>
-              </a:rPr>
-              <a:t>ec2-52-91-31-125.compute-1.amazonaws.com = Compliance server.</a:t>
-            </a:r>
-          </a:p>
-          <a:p>
-            <a:pPr marL="0" marR="0" lvl="2" indent="0" algn="l" defTabSz="914363" rtl="0" eaLnBrk="1" fontAlgn="auto" latinLnBrk="0" hangingPunct="1">
-              <a:lnSpc>
-                <a:spcPct val="90000"/>
-              </a:lnSpc>
-              <a:spcBef>
-                <a:spcPts val="0"/>
-              </a:spcBef>
-              <a:spcAft>
-                <a:spcPts val="333"/>
-              </a:spcAft>
-              <a:buClrTx/>
-              <a:buSzTx/>
-              <a:buFontTx/>
-              <a:buNone/>
-              <a:tabLst/>
-              <a:defRPr/>
-            </a:pPr>
-            <a:r>
-              <a:rPr lang="en-US" sz="1200" kern="1200" dirty="0" smtClean="0">
-                <a:solidFill>
-                  <a:schemeClr val="tx1"/>
-                </a:solidFill>
-                <a:effectLst/>
-                <a:latin typeface="Arial" panose="020B0604020202020204" pitchFamily="34" charset="0"/>
-                <a:ea typeface="ＭＳ Ｐゴシック" charset="0"/>
-                <a:cs typeface="+mn-cs"/>
-              </a:rPr>
-              <a:t>ec2-54-164-54-218.compute-1.amazonaws.com = Target node.</a:t>
-            </a:r>
-          </a:p>
-          <a:p>
-            <a:pPr marL="0" marR="0" lvl="2" indent="0" algn="l" defTabSz="914363" rtl="0" eaLnBrk="1" fontAlgn="auto" latinLnBrk="0" hangingPunct="1">
-              <a:lnSpc>
-                <a:spcPct val="90000"/>
-              </a:lnSpc>
-              <a:spcBef>
-                <a:spcPts val="0"/>
-              </a:spcBef>
-              <a:spcAft>
-                <a:spcPts val="333"/>
-              </a:spcAft>
-              <a:buClrTx/>
-              <a:buSzTx/>
-              <a:buFontTx/>
-              <a:buNone/>
-              <a:tabLst/>
-              <a:defRPr/>
-            </a:pPr>
-            <a:r>
-              <a:rPr lang="en-US" baseline="0" smtClean="0"/>
-              <a:t>The login credentials for them is chef/chef.</a:t>
-            </a:r>
-          </a:p>
-          <a:p>
-            <a:pPr marL="0" marR="0" lvl="2" indent="0" algn="l" defTabSz="914363" rtl="0" eaLnBrk="1" fontAlgn="auto" latinLnBrk="0" hangingPunct="1">
-              <a:lnSpc>
-                <a:spcPct val="90000"/>
-              </a:lnSpc>
-              <a:spcBef>
-                <a:spcPts val="0"/>
-              </a:spcBef>
-              <a:spcAft>
-                <a:spcPts val="333"/>
-              </a:spcAft>
-              <a:buClrTx/>
-              <a:buSzTx/>
-              <a:buFontTx/>
-              <a:buNone/>
-              <a:tabLst/>
-              <a:defRPr/>
-            </a:pPr>
-            <a:endParaRPr lang="en-US" baseline="0" dirty="0" smtClean="0"/>
-          </a:p>
-          <a:p>
-            <a:pPr marL="0" marR="0" lvl="2" indent="0" algn="l" defTabSz="914363" rtl="0" eaLnBrk="1" fontAlgn="auto" latinLnBrk="0" hangingPunct="1">
-              <a:lnSpc>
-                <a:spcPct val="90000"/>
-              </a:lnSpc>
-              <a:spcBef>
-                <a:spcPts val="0"/>
-              </a:spcBef>
-              <a:spcAft>
-                <a:spcPts val="333"/>
-              </a:spcAft>
-              <a:buClrTx/>
-              <a:buSzTx/>
-              <a:buFontTx/>
-              <a:buNone/>
-              <a:tabLst/>
-              <a:defRPr/>
-            </a:pPr>
-            <a:endParaRPr lang="en-US" baseline="0" dirty="0" smtClean="0"/>
-          </a:p>
-          <a:p>
-            <a:pPr marL="0" marR="0" lvl="2" indent="0" algn="l" defTabSz="914363" rtl="0" eaLnBrk="1" fontAlgn="auto" latinLnBrk="0" hangingPunct="1">
-              <a:lnSpc>
-                <a:spcPct val="90000"/>
-              </a:lnSpc>
-              <a:spcBef>
-                <a:spcPts val="0"/>
-              </a:spcBef>
-              <a:spcAft>
-                <a:spcPts val="333"/>
-              </a:spcAft>
-              <a:buClrTx/>
-              <a:buSzTx/>
-              <a:buFontTx/>
-              <a:buNone/>
-              <a:tabLst/>
-              <a:defRPr/>
-            </a:pPr>
-            <a:endParaRPr lang="en-US" baseline="0" dirty="0" smtClean="0"/>
+            <a:endParaRPr lang="en-US"/>
           </a:p>
         </p:txBody>
       </p:sp>
     </p:spTree>
     <p:extLst>
       <p:ext uri="{BB962C8B-B14F-4D97-AF65-F5344CB8AC3E}">
-        <p14:creationId xmlns:p14="http://schemas.microsoft.com/office/powerpoint/2010/main" val="1003907073"/>
+        <p14:creationId xmlns:p14="http://schemas.microsoft.com/office/powerpoint/2010/main" val="3803967664"/>
       </p:ext>
     </p:extLst>
   </p:cSld>
@@ -2039,6 +1963,302 @@
           <a:bodyPr/>
           <a:lstStyle/>
           <a:p>
+            <a:pPr marL="0" marR="0" lvl="2" indent="0" algn="l" defTabSz="914363" rtl="0" eaLnBrk="1" fontAlgn="auto" latinLnBrk="0" hangingPunct="1">
+              <a:lnSpc>
+                <a:spcPct val="90000"/>
+              </a:lnSpc>
+              <a:spcBef>
+                <a:spcPts val="0"/>
+              </a:spcBef>
+              <a:spcAft>
+                <a:spcPts val="333"/>
+              </a:spcAft>
+              <a:buClrTx/>
+              <a:buSzTx/>
+              <a:buFontTx/>
+              <a:buNone/>
+              <a:tabLst/>
+              <a:defRPr/>
+            </a:pPr>
+            <a:r>
+              <a:rPr lang="en-US" dirty="0" smtClean="0"/>
+              <a:t>These are basic AWS AMIs</a:t>
+            </a:r>
+            <a:r>
+              <a:rPr lang="en-US" baseline="0" dirty="0" smtClean="0"/>
+              <a:t> that we use for Chef training. They have ChefDK installed on them but you will not be using any of the ChefDK tools on those nodes until near the end of this class when you will write one remediation recipe.</a:t>
+            </a:r>
+          </a:p>
+          <a:p>
+            <a:pPr marL="0" marR="0" lvl="2" indent="0" algn="l" defTabSz="914363" rtl="0" eaLnBrk="1" fontAlgn="auto" latinLnBrk="0" hangingPunct="1">
+              <a:lnSpc>
+                <a:spcPct val="90000"/>
+              </a:lnSpc>
+              <a:spcBef>
+                <a:spcPts val="0"/>
+              </a:spcBef>
+              <a:spcAft>
+                <a:spcPts val="333"/>
+              </a:spcAft>
+              <a:buClrTx/>
+              <a:buSzTx/>
+              <a:buFontTx/>
+              <a:buNone/>
+              <a:tabLst/>
+              <a:defRPr/>
+            </a:pPr>
+            <a:endParaRPr lang="en-US" baseline="0" dirty="0" smtClean="0"/>
+          </a:p>
+          <a:p>
+            <a:pPr marL="0" marR="0" lvl="2" indent="0" algn="l" defTabSz="914363" rtl="0" eaLnBrk="1" fontAlgn="auto" latinLnBrk="0" hangingPunct="1">
+              <a:lnSpc>
+                <a:spcPct val="90000"/>
+              </a:lnSpc>
+              <a:spcBef>
+                <a:spcPts val="0"/>
+              </a:spcBef>
+              <a:spcAft>
+                <a:spcPts val="333"/>
+              </a:spcAft>
+              <a:buClrTx/>
+              <a:buSzTx/>
+              <a:buFontTx/>
+              <a:buNone/>
+              <a:tabLst/>
+              <a:defRPr/>
+            </a:pPr>
+            <a:r>
+              <a:rPr lang="en-US" baseline="0" dirty="0" smtClean="0"/>
+              <a:t>Instructor Note: Now would be a good time to distribute the hostnames of the two nodes you will assign to each student.</a:t>
+            </a:r>
+            <a:r>
+              <a:rPr lang="en-US" baseline="0" dirty="0"/>
+              <a:t> </a:t>
+            </a:r>
+            <a:r>
+              <a:rPr lang="en-US" baseline="0" dirty="0" smtClean="0"/>
+              <a:t>You should ask the students to note which one they will use as their Compliance Server and which one they will use as the target node for scans.</a:t>
+            </a:r>
+          </a:p>
+          <a:p>
+            <a:pPr marL="0" marR="0" lvl="2" indent="0" algn="l" defTabSz="914363" rtl="0" eaLnBrk="1" fontAlgn="auto" latinLnBrk="0" hangingPunct="1">
+              <a:lnSpc>
+                <a:spcPct val="90000"/>
+              </a:lnSpc>
+              <a:spcBef>
+                <a:spcPts val="0"/>
+              </a:spcBef>
+              <a:spcAft>
+                <a:spcPts val="333"/>
+              </a:spcAft>
+              <a:buClrTx/>
+              <a:buSzTx/>
+              <a:buFontTx/>
+              <a:buNone/>
+              <a:tabLst/>
+              <a:defRPr/>
+            </a:pPr>
+            <a:r>
+              <a:rPr lang="en-US" baseline="0" dirty="0" smtClean="0"/>
+              <a:t>For example: </a:t>
+            </a:r>
+            <a:br>
+              <a:rPr lang="en-US" baseline="0" dirty="0" smtClean="0"/>
+            </a:br>
+            <a:r>
+              <a:rPr lang="en-US" sz="1200" kern="1200" dirty="0" smtClean="0">
+                <a:solidFill>
+                  <a:schemeClr val="tx1"/>
+                </a:solidFill>
+                <a:effectLst/>
+                <a:latin typeface="Arial" panose="020B0604020202020204" pitchFamily="34" charset="0"/>
+                <a:ea typeface="ＭＳ Ｐゴシック" charset="0"/>
+                <a:cs typeface="+mn-cs"/>
+              </a:rPr>
+              <a:t>ec2-52-91-31-125.compute-1.amazonaws.com = Compliance server.</a:t>
+            </a:r>
+          </a:p>
+          <a:p>
+            <a:pPr marL="0" marR="0" lvl="2" indent="0" algn="l" defTabSz="914363" rtl="0" eaLnBrk="1" fontAlgn="auto" latinLnBrk="0" hangingPunct="1">
+              <a:lnSpc>
+                <a:spcPct val="90000"/>
+              </a:lnSpc>
+              <a:spcBef>
+                <a:spcPts val="0"/>
+              </a:spcBef>
+              <a:spcAft>
+                <a:spcPts val="333"/>
+              </a:spcAft>
+              <a:buClrTx/>
+              <a:buSzTx/>
+              <a:buFontTx/>
+              <a:buNone/>
+              <a:tabLst/>
+              <a:defRPr/>
+            </a:pPr>
+            <a:r>
+              <a:rPr lang="en-US" sz="1200" kern="1200" dirty="0" smtClean="0">
+                <a:solidFill>
+                  <a:schemeClr val="tx1"/>
+                </a:solidFill>
+                <a:effectLst/>
+                <a:latin typeface="Arial" panose="020B0604020202020204" pitchFamily="34" charset="0"/>
+                <a:ea typeface="ＭＳ Ｐゴシック" charset="0"/>
+                <a:cs typeface="+mn-cs"/>
+              </a:rPr>
+              <a:t>ec2-54-164-54-218.compute-1.amazonaws.com = Target node.</a:t>
+            </a:r>
+          </a:p>
+          <a:p>
+            <a:pPr marL="0" marR="0" lvl="2" indent="0" algn="l" defTabSz="914363" rtl="0" eaLnBrk="1" fontAlgn="auto" latinLnBrk="0" hangingPunct="1">
+              <a:lnSpc>
+                <a:spcPct val="90000"/>
+              </a:lnSpc>
+              <a:spcBef>
+                <a:spcPts val="0"/>
+              </a:spcBef>
+              <a:spcAft>
+                <a:spcPts val="333"/>
+              </a:spcAft>
+              <a:buClrTx/>
+              <a:buSzTx/>
+              <a:buFontTx/>
+              <a:buNone/>
+              <a:tabLst/>
+              <a:defRPr/>
+            </a:pPr>
+            <a:r>
+              <a:rPr lang="en-US" baseline="0" dirty="0" smtClean="0"/>
+              <a:t>The login credentials for them is chef/chef.</a:t>
+            </a:r>
+          </a:p>
+          <a:p>
+            <a:pPr marL="0" marR="0" lvl="2" indent="0" algn="l" defTabSz="914363" rtl="0" eaLnBrk="1" fontAlgn="auto" latinLnBrk="0" hangingPunct="1">
+              <a:lnSpc>
+                <a:spcPct val="90000"/>
+              </a:lnSpc>
+              <a:spcBef>
+                <a:spcPts val="0"/>
+              </a:spcBef>
+              <a:spcAft>
+                <a:spcPts val="333"/>
+              </a:spcAft>
+              <a:buClrTx/>
+              <a:buSzTx/>
+              <a:buFontTx/>
+              <a:buNone/>
+              <a:tabLst/>
+              <a:defRPr/>
+            </a:pPr>
+            <a:endParaRPr lang="en-US" baseline="0" dirty="0" smtClean="0"/>
+          </a:p>
+          <a:p>
+            <a:pPr marL="0" marR="0" lvl="2" indent="0" algn="l" defTabSz="914363" rtl="0" eaLnBrk="1" fontAlgn="auto" latinLnBrk="0" hangingPunct="1">
+              <a:lnSpc>
+                <a:spcPct val="90000"/>
+              </a:lnSpc>
+              <a:spcBef>
+                <a:spcPts val="0"/>
+              </a:spcBef>
+              <a:spcAft>
+                <a:spcPts val="333"/>
+              </a:spcAft>
+              <a:buClrTx/>
+              <a:buSzTx/>
+              <a:buFontTx/>
+              <a:buNone/>
+              <a:tabLst/>
+              <a:defRPr/>
+            </a:pPr>
+            <a:endParaRPr lang="en-US" baseline="0" dirty="0" smtClean="0"/>
+          </a:p>
+          <a:p>
+            <a:pPr marL="0" marR="0" lvl="2" indent="0" algn="l" defTabSz="914363" rtl="0" eaLnBrk="1" fontAlgn="auto" latinLnBrk="0" hangingPunct="1">
+              <a:lnSpc>
+                <a:spcPct val="90000"/>
+              </a:lnSpc>
+              <a:spcBef>
+                <a:spcPts val="0"/>
+              </a:spcBef>
+              <a:spcAft>
+                <a:spcPts val="333"/>
+              </a:spcAft>
+              <a:buClrTx/>
+              <a:buSzTx/>
+              <a:buFontTx/>
+              <a:buNone/>
+              <a:tabLst/>
+              <a:defRPr/>
+            </a:pPr>
+            <a:endParaRPr lang="en-US" baseline="0" dirty="0" smtClean="0"/>
+          </a:p>
+        </p:txBody>
+      </p:sp>
+    </p:spTree>
+    <p:extLst>
+      <p:ext uri="{BB962C8B-B14F-4D97-AF65-F5344CB8AC3E}">
+        <p14:creationId xmlns:p14="http://schemas.microsoft.com/office/powerpoint/2010/main" val="1003907073"/>
+      </p:ext>
+    </p:extLst>
+  </p:cSld>
+  <p:clrMapOvr>
+    <a:masterClrMapping/>
+  </p:clrMapOvr>
+</p:notes>
+</file>
+
+<file path=ppt/notesSlides/notesSlide13.xml><?xml version="1.0" encoding="utf-8"?>
+<p:notes xmlns:a="http://schemas.openxmlformats.org/drawingml/2006/main" xmlns:r="http://schemas.openxmlformats.org/officeDocument/2006/relationships" xmlns:p="http://schemas.openxmlformats.org/presentationml/2006/main">
+  <p:cSld>
+    <p:spTree>
+      <p:nvGrpSpPr>
+        <p:cNvPr id="1" name=""/>
+        <p:cNvGrpSpPr/>
+        <p:nvPr/>
+      </p:nvGrpSpPr>
+      <p:grpSpPr>
+        <a:xfrm>
+          <a:off x="0" y="0"/>
+          <a:ext cx="0" cy="0"/>
+          <a:chOff x="0" y="0"/>
+          <a:chExt cx="0" cy="0"/>
+        </a:xfrm>
+      </p:grpSpPr>
+      <p:sp>
+        <p:nvSpPr>
+          <p:cNvPr id="2" name="Slide Image Placeholder 1"/>
+          <p:cNvSpPr>
+            <a:spLocks noGrp="1" noRot="1" noChangeAspect="1"/>
+          </p:cNvSpPr>
+          <p:nvPr>
+            <p:ph type="sldImg"/>
+          </p:nvPr>
+        </p:nvSpPr>
+        <p:spPr/>
+      </p:sp>
+      <p:sp>
+        <p:nvSpPr>
+          <p:cNvPr id="3" name="Notes Placeholder 2"/>
+          <p:cNvSpPr>
+            <a:spLocks noGrp="1"/>
+          </p:cNvSpPr>
+          <p:nvPr>
+            <p:ph type="body" idx="1"/>
+          </p:nvPr>
+        </p:nvSpPr>
+        <p:spPr>
+          <a:xfrm>
+            <a:off x="685800" y="4343400"/>
+            <a:ext cx="5486400" cy="4114800"/>
+          </a:xfrm>
+          <a:prstGeom prst="rect">
+            <a:avLst/>
+          </a:prstGeom>
+        </p:spPr>
+        <p:txBody>
+          <a:bodyPr/>
+          <a:lstStyle/>
+          <a:p>
             <a:r>
               <a:rPr lang="en-US" dirty="0" smtClean="0"/>
               <a:t>You should use an ssh client like </a:t>
@@ -2055,6 +2275,92 @@
               <a:rPr lang="en-US" baseline="0" dirty="0" smtClean="0"/>
               <a:t> assign to you. </a:t>
             </a:r>
+          </a:p>
+          <a:p>
+            <a:endParaRPr lang="en-US" baseline="0" dirty="0" smtClean="0"/>
+          </a:p>
+          <a:p>
+            <a:r>
+              <a:rPr lang="en-US" baseline="0" dirty="0" smtClean="0"/>
+              <a:t>Instead of the command shown in this slide, you could also use this command: </a:t>
+            </a:r>
+          </a:p>
+          <a:p>
+            <a:endParaRPr lang="en-US" baseline="0" dirty="0" smtClean="0"/>
+          </a:p>
+          <a:p>
+            <a:pPr marL="0" marR="0" indent="0" algn="l" defTabSz="1217613" rtl="0" eaLnBrk="1" fontAlgn="base" latinLnBrk="0" hangingPunct="1">
+              <a:lnSpc>
+                <a:spcPct val="90000"/>
+              </a:lnSpc>
+              <a:spcBef>
+                <a:spcPct val="30000"/>
+              </a:spcBef>
+              <a:spcAft>
+                <a:spcPts val="450"/>
+              </a:spcAft>
+              <a:buClrTx/>
+              <a:buSzTx/>
+              <a:buFontTx/>
+              <a:buNone/>
+              <a:tabLst/>
+              <a:defRPr/>
+            </a:pPr>
+            <a:r>
+              <a:rPr lang="en-US" baseline="0" dirty="0" smtClean="0"/>
+              <a:t>ssh </a:t>
+            </a:r>
+            <a:r>
+              <a:rPr lang="en-US" baseline="0" dirty="0" err="1" smtClean="0"/>
+              <a:t>chef@IPADDRESS</a:t>
+            </a:r>
+            <a:endParaRPr lang="en-US" baseline="0" dirty="0" smtClean="0"/>
+          </a:p>
+          <a:p>
+            <a:pPr marL="0" marR="0" indent="0" algn="l" defTabSz="1217613" rtl="0" eaLnBrk="1" fontAlgn="base" latinLnBrk="0" hangingPunct="1">
+              <a:lnSpc>
+                <a:spcPct val="90000"/>
+              </a:lnSpc>
+              <a:spcBef>
+                <a:spcPct val="30000"/>
+              </a:spcBef>
+              <a:spcAft>
+                <a:spcPts val="450"/>
+              </a:spcAft>
+              <a:buClrTx/>
+              <a:buSzTx/>
+              <a:buFontTx/>
+              <a:buNone/>
+              <a:tabLst/>
+              <a:defRPr/>
+            </a:pPr>
+            <a:endParaRPr lang="en-US" baseline="0" dirty="0" smtClean="0"/>
+          </a:p>
+          <a:p>
+            <a:pPr marL="0" marR="0" indent="0" algn="l" defTabSz="1217613" rtl="0" eaLnBrk="1" fontAlgn="base" latinLnBrk="0" hangingPunct="1">
+              <a:lnSpc>
+                <a:spcPct val="90000"/>
+              </a:lnSpc>
+              <a:spcBef>
+                <a:spcPct val="30000"/>
+              </a:spcBef>
+              <a:spcAft>
+                <a:spcPts val="450"/>
+              </a:spcAft>
+              <a:buClrTx/>
+              <a:buSzTx/>
+              <a:buFontTx/>
+              <a:buNone/>
+              <a:tabLst/>
+              <a:defRPr/>
+            </a:pPr>
+            <a:r>
+              <a:rPr lang="en-US" baseline="0" dirty="0" smtClean="0"/>
+              <a:t>For example: ssh chef@52.90.140.22</a:t>
+            </a:r>
+          </a:p>
+          <a:p>
+            <a:endParaRPr lang="en-US" baseline="0" dirty="0" smtClean="0"/>
           </a:p>
           <a:p>
             <a:endParaRPr lang="en-US" baseline="0" dirty="0" smtClean="0"/>
@@ -2083,7 +2389,7 @@
 </p:notes>
 </file>
 
-<file path=ppt/notesSlides/notesSlide13.xml><?xml version="1.0" encoding="utf-8"?>
+<file path=ppt/notesSlides/notesSlide14.xml><?xml version="1.0" encoding="utf-8"?>
 <p:notes xmlns:a="http://schemas.openxmlformats.org/drawingml/2006/main" xmlns:r="http://schemas.openxmlformats.org/officeDocument/2006/relationships" xmlns:p="http://schemas.openxmlformats.org/presentationml/2006/main">
   <p:cSld>
     <p:spTree>
@@ -2464,6 +2770,30 @@
           <a:bodyPr/>
           <a:lstStyle/>
           <a:p>
+            <a:r>
+              <a:rPr lang="en-US" dirty="0" smtClean="0"/>
+              <a:t>By now you are probably aware of how Chef automates the configuration and management of your infrastructure. But what about risks and compliance issues of your infrastructure? </a:t>
+            </a:r>
+          </a:p>
+          <a:p>
+            <a:endParaRPr lang="en-US" dirty="0" smtClean="0"/>
+          </a:p>
+          <a:p>
+            <a:r>
+              <a:rPr lang="en-US" dirty="0" smtClean="0"/>
+              <a:t>Regulatory compliance is a fact of life for every enterprise. With Chef Compliance you can scan for risks and compliance issues with easy-to-understand, customizable reports and visualization.</a:t>
+            </a:r>
+          </a:p>
+          <a:p>
+            <a:endParaRPr lang="en-US" dirty="0" smtClean="0"/>
+          </a:p>
+          <a:p>
+            <a:r>
+              <a:rPr lang="en-US" dirty="0" smtClean="0"/>
+              <a:t>You can then use Chef to automate the remediation of issues and use Chef Compliance to implement a continuous audit of applications and infrastructure.</a:t>
+            </a:r>
+          </a:p>
+          <a:p>
             <a:endParaRPr lang="en-US" dirty="0"/>
           </a:p>
         </p:txBody>
@@ -2544,7 +2874,7 @@
     </p:spTree>
     <p:extLst>
       <p:ext uri="{BB962C8B-B14F-4D97-AF65-F5344CB8AC3E}">
-        <p14:creationId xmlns:p14="http://schemas.microsoft.com/office/powerpoint/2010/main" val="4211368481"/>
+        <p14:creationId xmlns:p14="http://schemas.microsoft.com/office/powerpoint/2010/main" val="2986499770"/>
       </p:ext>
     </p:extLst>
   </p:cSld>
@@ -2598,6 +2928,30 @@
           <a:bodyPr/>
           <a:lstStyle/>
           <a:p>
+            <a:r>
+              <a:rPr lang="en-US" dirty="0" smtClean="0"/>
+              <a:t>The Chef Compliance server is a centralized location from which all aspects of the state or your infrastructure’s compliance can be managed.</a:t>
+            </a:r>
+          </a:p>
+          <a:p>
+            <a:endParaRPr lang="en-US" dirty="0" smtClean="0"/>
+          </a:p>
+          <a:p>
+            <a:r>
+              <a:rPr lang="en-US" dirty="0" smtClean="0"/>
+              <a:t>With Chef Compliance you can test any node in your infrastructure, including all of the common UNIX and Linux platforms and most versions of Microsoft Windows.</a:t>
+            </a:r>
+          </a:p>
+          <a:p>
+            <a:endParaRPr lang="en-US" dirty="0" smtClean="0"/>
+          </a:p>
+          <a:p>
+            <a:r>
+              <a:rPr lang="en-US" dirty="0" smtClean="0"/>
+              <a:t>Chef Compliance can continuously test any node against the goals of your organization’s security management lifecycle for risks and compliance issues.</a:t>
+            </a:r>
+          </a:p>
+          <a:p>
             <a:endParaRPr lang="en-US" dirty="0"/>
           </a:p>
         </p:txBody>
@@ -2625,7 +2979,7 @@
               <a:pPr>
                 <a:defRPr/>
               </a:pPr>
-              <a:t>6</a:t>
+              <a:t>5</a:t>
             </a:fld>
             <a:endParaRPr lang="en-US" dirty="0"/>
           </a:p>
@@ -2678,7 +3032,7 @@
     </p:spTree>
     <p:extLst>
       <p:ext uri="{BB962C8B-B14F-4D97-AF65-F5344CB8AC3E}">
-        <p14:creationId xmlns:p14="http://schemas.microsoft.com/office/powerpoint/2010/main" val="1966623329"/>
+        <p14:creationId xmlns:p14="http://schemas.microsoft.com/office/powerpoint/2010/main" val="162952126"/>
       </p:ext>
     </p:extLst>
   </p:cSld>
@@ -2732,238 +3086,6 @@
           <a:bodyPr/>
           <a:lstStyle/>
           <a:p>
-            <a:r>
-              <a:rPr lang="en-US" sz="1200" b="0" i="0" kern="1200" dirty="0" err="1" smtClean="0">
-                <a:solidFill>
-                  <a:schemeClr val="tx1"/>
-                </a:solidFill>
-                <a:effectLst/>
-                <a:latin typeface="Arial" panose="020B0604020202020204" pitchFamily="34" charset="0"/>
-                <a:ea typeface="ＭＳ Ｐゴシック" charset="0"/>
-                <a:cs typeface="Arial" panose="020B0604020202020204" pitchFamily="34" charset="0"/>
-              </a:rPr>
-              <a:t>InSpec</a:t>
-            </a:r>
-            <a:r>
-              <a:rPr lang="en-US" sz="1200" b="0" i="0" kern="1200" dirty="0" smtClean="0">
-                <a:solidFill>
-                  <a:schemeClr val="tx1"/>
-                </a:solidFill>
-                <a:effectLst/>
-                <a:latin typeface="Arial" panose="020B0604020202020204" pitchFamily="34" charset="0"/>
-                <a:ea typeface="ＭＳ Ｐゴシック" charset="0"/>
-                <a:cs typeface="Arial" panose="020B0604020202020204" pitchFamily="34" charset="0"/>
-              </a:rPr>
-              <a:t> is an open-source run-time framework and rule language used to specify compliance, security, and policy requirements for testing any node in your infrastructure. The </a:t>
-            </a:r>
-            <a:r>
-              <a:rPr lang="en-US" sz="1200" b="0" i="0" kern="1200" dirty="0" err="1" smtClean="0">
-                <a:solidFill>
-                  <a:schemeClr val="tx1"/>
-                </a:solidFill>
-                <a:effectLst/>
-                <a:latin typeface="Arial" panose="020B0604020202020204" pitchFamily="34" charset="0"/>
-                <a:ea typeface="ＭＳ Ｐゴシック" charset="0"/>
-                <a:cs typeface="Arial" panose="020B0604020202020204" pitchFamily="34" charset="0"/>
-              </a:rPr>
-              <a:t>InSpec</a:t>
-            </a:r>
-            <a:r>
-              <a:rPr lang="en-US" sz="1200" b="0" i="0" kern="1200" dirty="0" smtClean="0">
-                <a:solidFill>
-                  <a:schemeClr val="tx1"/>
-                </a:solidFill>
-                <a:effectLst/>
-                <a:latin typeface="Arial" panose="020B0604020202020204" pitchFamily="34" charset="0"/>
-                <a:ea typeface="ＭＳ Ｐゴシック" charset="0"/>
-                <a:cs typeface="Arial" panose="020B0604020202020204" pitchFamily="34" charset="0"/>
-              </a:rPr>
-              <a:t> name refers to “infrastructure specification</a:t>
-            </a:r>
-          </a:p>
-          <a:p>
-            <a:endParaRPr lang="en-US" sz="1200" b="0" i="0" kern="1200" dirty="0" smtClean="0">
-              <a:solidFill>
-                <a:schemeClr val="tx1"/>
-              </a:solidFill>
-              <a:effectLst/>
-              <a:latin typeface="Arial" panose="020B0604020202020204" pitchFamily="34" charset="0"/>
-              <a:ea typeface="ＭＳ Ｐゴシック" charset="0"/>
-              <a:cs typeface="Arial" panose="020B0604020202020204" pitchFamily="34" charset="0"/>
-            </a:endParaRPr>
-          </a:p>
-          <a:p>
-            <a:r>
-              <a:rPr lang="en-US" sz="1200" b="0" i="0" kern="1200" dirty="0" err="1" smtClean="0">
-                <a:solidFill>
-                  <a:schemeClr val="tx1"/>
-                </a:solidFill>
-                <a:effectLst/>
-                <a:latin typeface="Arial" panose="020B0604020202020204" pitchFamily="34" charset="0"/>
-                <a:ea typeface="ＭＳ Ｐゴシック" charset="0"/>
-                <a:cs typeface="Arial" panose="020B0604020202020204" pitchFamily="34" charset="0"/>
-              </a:rPr>
-              <a:t>InSpec</a:t>
-            </a:r>
-            <a:r>
-              <a:rPr lang="en-US" sz="1200" b="0" i="0" kern="1200" dirty="0" smtClean="0">
-                <a:solidFill>
-                  <a:schemeClr val="tx1"/>
-                </a:solidFill>
-                <a:effectLst/>
-                <a:latin typeface="Arial" panose="020B0604020202020204" pitchFamily="34" charset="0"/>
-                <a:ea typeface="ＭＳ Ｐゴシック" charset="0"/>
-                <a:cs typeface="Arial" panose="020B0604020202020204" pitchFamily="34" charset="0"/>
-              </a:rPr>
-              <a:t> includes a collection of resources to help you write auditing rules quickly and easily using the Compliance DSL.</a:t>
-            </a:r>
-          </a:p>
-          <a:p>
-            <a:endParaRPr lang="en-US" sz="1200" b="0" i="0" kern="1200" dirty="0" smtClean="0">
-              <a:solidFill>
-                <a:schemeClr val="tx1"/>
-              </a:solidFill>
-              <a:effectLst/>
-              <a:latin typeface="Arial" panose="020B0604020202020204" pitchFamily="34" charset="0"/>
-              <a:ea typeface="ＭＳ Ｐゴシック" charset="0"/>
-              <a:cs typeface="Arial" panose="020B0604020202020204" pitchFamily="34" charset="0"/>
-            </a:endParaRPr>
-          </a:p>
-          <a:p>
-            <a:r>
-              <a:rPr lang="en-US" sz="1200" b="0" i="0" kern="1200" dirty="0" smtClean="0">
-                <a:solidFill>
-                  <a:schemeClr val="tx1"/>
-                </a:solidFill>
-                <a:effectLst/>
-                <a:latin typeface="Arial" panose="020B0604020202020204" pitchFamily="34" charset="0"/>
-                <a:ea typeface="ＭＳ Ｐゴシック" charset="0"/>
-                <a:cs typeface="Arial" panose="020B0604020202020204" pitchFamily="34" charset="0"/>
-              </a:rPr>
-              <a:t>Use </a:t>
-            </a:r>
-            <a:r>
-              <a:rPr lang="en-US" sz="1200" b="0" i="0" kern="1200" dirty="0" err="1" smtClean="0">
-                <a:solidFill>
-                  <a:schemeClr val="tx1"/>
-                </a:solidFill>
-                <a:effectLst/>
-                <a:latin typeface="Arial" panose="020B0604020202020204" pitchFamily="34" charset="0"/>
-                <a:ea typeface="ＭＳ Ｐゴシック" charset="0"/>
-                <a:cs typeface="Arial" panose="020B0604020202020204" pitchFamily="34" charset="0"/>
-              </a:rPr>
-              <a:t>InSpec</a:t>
-            </a:r>
-            <a:r>
-              <a:rPr lang="en-US" sz="1200" b="0" i="0" kern="1200" dirty="0" smtClean="0">
-                <a:solidFill>
-                  <a:schemeClr val="tx1"/>
-                </a:solidFill>
-                <a:effectLst/>
-                <a:latin typeface="Arial" panose="020B0604020202020204" pitchFamily="34" charset="0"/>
-                <a:ea typeface="ＭＳ Ｐゴシック" charset="0"/>
-                <a:cs typeface="Arial" panose="020B0604020202020204" pitchFamily="34" charset="0"/>
-              </a:rPr>
-              <a:t> to examine any node in your infrastructure; run the tests locally or remotely.</a:t>
-            </a:r>
-          </a:p>
-          <a:p>
-            <a:endParaRPr lang="en-US" sz="1200" b="0" i="0" kern="1200" dirty="0" smtClean="0">
-              <a:solidFill>
-                <a:schemeClr val="tx1"/>
-              </a:solidFill>
-              <a:effectLst/>
-              <a:latin typeface="Arial" panose="020B0604020202020204" pitchFamily="34" charset="0"/>
-              <a:ea typeface="ＭＳ Ｐゴシック" charset="0"/>
-              <a:cs typeface="Arial" panose="020B0604020202020204" pitchFamily="34" charset="0"/>
-            </a:endParaRPr>
-          </a:p>
-          <a:p>
-            <a:r>
-              <a:rPr lang="en-US" sz="1200" b="0" i="0" kern="1200" dirty="0" smtClean="0">
-                <a:solidFill>
-                  <a:schemeClr val="tx1"/>
-                </a:solidFill>
-                <a:effectLst/>
-                <a:latin typeface="Arial" panose="020B0604020202020204" pitchFamily="34" charset="0"/>
-                <a:ea typeface="ＭＳ Ｐゴシック" charset="0"/>
-                <a:cs typeface="Arial" panose="020B0604020202020204" pitchFamily="34" charset="0"/>
-              </a:rPr>
-              <a:t>Any detected security, compliance, or policy issues are flagged in a log.</a:t>
-            </a:r>
-          </a:p>
-          <a:p>
-            <a:endParaRPr lang="en-US" sz="1200" b="0" i="0" kern="1200" dirty="0" smtClean="0">
-              <a:solidFill>
-                <a:schemeClr val="tx1"/>
-              </a:solidFill>
-              <a:effectLst/>
-              <a:latin typeface="Arial" panose="020B0604020202020204" pitchFamily="34" charset="0"/>
-              <a:ea typeface="ＭＳ Ｐゴシック" charset="0"/>
-              <a:cs typeface="Arial" panose="020B0604020202020204" pitchFamily="34" charset="0"/>
-            </a:endParaRPr>
-          </a:p>
-          <a:p>
-            <a:r>
-              <a:rPr lang="en-US" sz="1200" b="0" i="0" kern="1200" dirty="0" smtClean="0">
-                <a:solidFill>
-                  <a:schemeClr val="tx1"/>
-                </a:solidFill>
-                <a:effectLst/>
-                <a:latin typeface="Arial" panose="020B0604020202020204" pitchFamily="34" charset="0"/>
-                <a:ea typeface="ＭＳ Ｐゴシック" charset="0"/>
-                <a:cs typeface="Arial" panose="020B0604020202020204" pitchFamily="34" charset="0"/>
-              </a:rPr>
-              <a:t>The </a:t>
-            </a:r>
-            <a:r>
-              <a:rPr lang="en-US" sz="1200" b="0" i="0" kern="1200" dirty="0" err="1" smtClean="0">
-                <a:solidFill>
-                  <a:schemeClr val="tx1"/>
-                </a:solidFill>
-                <a:effectLst/>
-                <a:latin typeface="Arial" panose="020B0604020202020204" pitchFamily="34" charset="0"/>
-                <a:ea typeface="ＭＳ Ｐゴシック" charset="0"/>
-                <a:cs typeface="Arial" panose="020B0604020202020204" pitchFamily="34" charset="0"/>
-              </a:rPr>
-              <a:t>InSpec</a:t>
-            </a:r>
-            <a:r>
-              <a:rPr lang="en-US" sz="1200" b="0" i="0" kern="1200" dirty="0" smtClean="0">
-                <a:solidFill>
-                  <a:schemeClr val="tx1"/>
-                </a:solidFill>
-                <a:effectLst/>
-                <a:latin typeface="Arial" panose="020B0604020202020204" pitchFamily="34" charset="0"/>
-                <a:ea typeface="ＭＳ Ｐゴシック" charset="0"/>
-                <a:cs typeface="Arial" panose="020B0604020202020204" pitchFamily="34" charset="0"/>
-              </a:rPr>
-              <a:t> audit resource framework is fully compatible with Chef Compliance.</a:t>
-            </a:r>
-          </a:p>
-          <a:p>
-            <a:endParaRPr lang="en-US" sz="1200" b="0" i="0" kern="1200" dirty="0" smtClean="0">
-              <a:solidFill>
-                <a:schemeClr val="tx1"/>
-              </a:solidFill>
-              <a:effectLst/>
-              <a:latin typeface="Arial" panose="020B0604020202020204" pitchFamily="34" charset="0"/>
-              <a:ea typeface="ＭＳ Ｐゴシック" charset="0"/>
-              <a:cs typeface="Arial" panose="020B0604020202020204" pitchFamily="34" charset="0"/>
-            </a:endParaRPr>
-          </a:p>
-          <a:p>
-            <a:endParaRPr lang="en-US" sz="1200" b="0" i="0" kern="1200" dirty="0" smtClean="0">
-              <a:solidFill>
-                <a:schemeClr val="tx1"/>
-              </a:solidFill>
-              <a:effectLst/>
-              <a:latin typeface="Arial" panose="020B0604020202020204" pitchFamily="34" charset="0"/>
-              <a:ea typeface="ＭＳ Ｐゴシック" charset="0"/>
-              <a:cs typeface="Arial" panose="020B0604020202020204" pitchFamily="34" charset="0"/>
-            </a:endParaRPr>
-          </a:p>
-          <a:p>
             <a:endParaRPr lang="en-US" dirty="0"/>
           </a:p>
         </p:txBody>
@@ -2991,7 +3113,7 @@
               <a:pPr>
                 <a:defRPr/>
               </a:pPr>
-              <a:t>8</a:t>
+              <a:t>6</a:t>
             </a:fld>
             <a:endParaRPr lang="en-US" dirty="0"/>
           </a:p>
@@ -3044,7 +3166,7 @@
     </p:spTree>
     <p:extLst>
       <p:ext uri="{BB962C8B-B14F-4D97-AF65-F5344CB8AC3E}">
-        <p14:creationId xmlns:p14="http://schemas.microsoft.com/office/powerpoint/2010/main" val="1916487699"/>
+        <p14:creationId xmlns:p14="http://schemas.microsoft.com/office/powerpoint/2010/main" val="1966623329"/>
       </p:ext>
     </p:extLst>
   </p:cSld>
@@ -3098,6 +3220,238 @@
           <a:bodyPr/>
           <a:lstStyle/>
           <a:p>
+            <a:r>
+              <a:rPr lang="en-US" sz="1200" b="0" i="0" kern="1200" dirty="0" err="1" smtClean="0">
+                <a:solidFill>
+                  <a:schemeClr val="tx1"/>
+                </a:solidFill>
+                <a:effectLst/>
+                <a:latin typeface="Arial" panose="020B0604020202020204" pitchFamily="34" charset="0"/>
+                <a:ea typeface="ＭＳ Ｐゴシック" charset="0"/>
+                <a:cs typeface="Arial" panose="020B0604020202020204" pitchFamily="34" charset="0"/>
+              </a:rPr>
+              <a:t>InSpec</a:t>
+            </a:r>
+            <a:r>
+              <a:rPr lang="en-US" sz="1200" b="0" i="0" kern="1200" dirty="0" smtClean="0">
+                <a:solidFill>
+                  <a:schemeClr val="tx1"/>
+                </a:solidFill>
+                <a:effectLst/>
+                <a:latin typeface="Arial" panose="020B0604020202020204" pitchFamily="34" charset="0"/>
+                <a:ea typeface="ＭＳ Ｐゴシック" charset="0"/>
+                <a:cs typeface="Arial" panose="020B0604020202020204" pitchFamily="34" charset="0"/>
+              </a:rPr>
+              <a:t> is an open-source run-time framework and rule language used to specify compliance, security, and policy requirements for testing any node in your infrastructure. The </a:t>
+            </a:r>
+            <a:r>
+              <a:rPr lang="en-US" sz="1200" b="0" i="0" kern="1200" dirty="0" err="1" smtClean="0">
+                <a:solidFill>
+                  <a:schemeClr val="tx1"/>
+                </a:solidFill>
+                <a:effectLst/>
+                <a:latin typeface="Arial" panose="020B0604020202020204" pitchFamily="34" charset="0"/>
+                <a:ea typeface="ＭＳ Ｐゴシック" charset="0"/>
+                <a:cs typeface="Arial" panose="020B0604020202020204" pitchFamily="34" charset="0"/>
+              </a:rPr>
+              <a:t>InSpec</a:t>
+            </a:r>
+            <a:r>
+              <a:rPr lang="en-US" sz="1200" b="0" i="0" kern="1200" dirty="0" smtClean="0">
+                <a:solidFill>
+                  <a:schemeClr val="tx1"/>
+                </a:solidFill>
+                <a:effectLst/>
+                <a:latin typeface="Arial" panose="020B0604020202020204" pitchFamily="34" charset="0"/>
+                <a:ea typeface="ＭＳ Ｐゴシック" charset="0"/>
+                <a:cs typeface="Arial" panose="020B0604020202020204" pitchFamily="34" charset="0"/>
+              </a:rPr>
+              <a:t> name refers to “infrastructure specification</a:t>
+            </a:r>
+          </a:p>
+          <a:p>
+            <a:endParaRPr lang="en-US" sz="1200" b="0" i="0" kern="1200" dirty="0" smtClean="0">
+              <a:solidFill>
+                <a:schemeClr val="tx1"/>
+              </a:solidFill>
+              <a:effectLst/>
+              <a:latin typeface="Arial" panose="020B0604020202020204" pitchFamily="34" charset="0"/>
+              <a:ea typeface="ＭＳ Ｐゴシック" charset="0"/>
+              <a:cs typeface="Arial" panose="020B0604020202020204" pitchFamily="34" charset="0"/>
+            </a:endParaRPr>
+          </a:p>
+          <a:p>
+            <a:r>
+              <a:rPr lang="en-US" sz="1200" b="0" i="0" kern="1200" dirty="0" err="1" smtClean="0">
+                <a:solidFill>
+                  <a:schemeClr val="tx1"/>
+                </a:solidFill>
+                <a:effectLst/>
+                <a:latin typeface="Arial" panose="020B0604020202020204" pitchFamily="34" charset="0"/>
+                <a:ea typeface="ＭＳ Ｐゴシック" charset="0"/>
+                <a:cs typeface="Arial" panose="020B0604020202020204" pitchFamily="34" charset="0"/>
+              </a:rPr>
+              <a:t>InSpec</a:t>
+            </a:r>
+            <a:r>
+              <a:rPr lang="en-US" sz="1200" b="0" i="0" kern="1200" dirty="0" smtClean="0">
+                <a:solidFill>
+                  <a:schemeClr val="tx1"/>
+                </a:solidFill>
+                <a:effectLst/>
+                <a:latin typeface="Arial" panose="020B0604020202020204" pitchFamily="34" charset="0"/>
+                <a:ea typeface="ＭＳ Ｐゴシック" charset="0"/>
+                <a:cs typeface="Arial" panose="020B0604020202020204" pitchFamily="34" charset="0"/>
+              </a:rPr>
+              <a:t> includes a collection of resources to help you write auditing rules quickly and easily using the Compliance DSL.</a:t>
+            </a:r>
+          </a:p>
+          <a:p>
+            <a:endParaRPr lang="en-US" sz="1200" b="0" i="0" kern="1200" dirty="0" smtClean="0">
+              <a:solidFill>
+                <a:schemeClr val="tx1"/>
+              </a:solidFill>
+              <a:effectLst/>
+              <a:latin typeface="Arial" panose="020B0604020202020204" pitchFamily="34" charset="0"/>
+              <a:ea typeface="ＭＳ Ｐゴシック" charset="0"/>
+              <a:cs typeface="Arial" panose="020B0604020202020204" pitchFamily="34" charset="0"/>
+            </a:endParaRPr>
+          </a:p>
+          <a:p>
+            <a:r>
+              <a:rPr lang="en-US" sz="1200" b="0" i="0" kern="1200" dirty="0" smtClean="0">
+                <a:solidFill>
+                  <a:schemeClr val="tx1"/>
+                </a:solidFill>
+                <a:effectLst/>
+                <a:latin typeface="Arial" panose="020B0604020202020204" pitchFamily="34" charset="0"/>
+                <a:ea typeface="ＭＳ Ｐゴシック" charset="0"/>
+                <a:cs typeface="Arial" panose="020B0604020202020204" pitchFamily="34" charset="0"/>
+              </a:rPr>
+              <a:t>Use </a:t>
+            </a:r>
+            <a:r>
+              <a:rPr lang="en-US" sz="1200" b="0" i="0" kern="1200" dirty="0" err="1" smtClean="0">
+                <a:solidFill>
+                  <a:schemeClr val="tx1"/>
+                </a:solidFill>
+                <a:effectLst/>
+                <a:latin typeface="Arial" panose="020B0604020202020204" pitchFamily="34" charset="0"/>
+                <a:ea typeface="ＭＳ Ｐゴシック" charset="0"/>
+                <a:cs typeface="Arial" panose="020B0604020202020204" pitchFamily="34" charset="0"/>
+              </a:rPr>
+              <a:t>InSpec</a:t>
+            </a:r>
+            <a:r>
+              <a:rPr lang="en-US" sz="1200" b="0" i="0" kern="1200" dirty="0" smtClean="0">
+                <a:solidFill>
+                  <a:schemeClr val="tx1"/>
+                </a:solidFill>
+                <a:effectLst/>
+                <a:latin typeface="Arial" panose="020B0604020202020204" pitchFamily="34" charset="0"/>
+                <a:ea typeface="ＭＳ Ｐゴシック" charset="0"/>
+                <a:cs typeface="Arial" panose="020B0604020202020204" pitchFamily="34" charset="0"/>
+              </a:rPr>
+              <a:t> to examine any node in your infrastructure; run the tests locally or remotely.</a:t>
+            </a:r>
+          </a:p>
+          <a:p>
+            <a:endParaRPr lang="en-US" sz="1200" b="0" i="0" kern="1200" dirty="0" smtClean="0">
+              <a:solidFill>
+                <a:schemeClr val="tx1"/>
+              </a:solidFill>
+              <a:effectLst/>
+              <a:latin typeface="Arial" panose="020B0604020202020204" pitchFamily="34" charset="0"/>
+              <a:ea typeface="ＭＳ Ｐゴシック" charset="0"/>
+              <a:cs typeface="Arial" panose="020B0604020202020204" pitchFamily="34" charset="0"/>
+            </a:endParaRPr>
+          </a:p>
+          <a:p>
+            <a:r>
+              <a:rPr lang="en-US" sz="1200" b="0" i="0" kern="1200" dirty="0" smtClean="0">
+                <a:solidFill>
+                  <a:schemeClr val="tx1"/>
+                </a:solidFill>
+                <a:effectLst/>
+                <a:latin typeface="Arial" panose="020B0604020202020204" pitchFamily="34" charset="0"/>
+                <a:ea typeface="ＭＳ Ｐゴシック" charset="0"/>
+                <a:cs typeface="Arial" panose="020B0604020202020204" pitchFamily="34" charset="0"/>
+              </a:rPr>
+              <a:t>Any detected security, compliance, or policy issues are flagged in a log.</a:t>
+            </a:r>
+          </a:p>
+          <a:p>
+            <a:endParaRPr lang="en-US" sz="1200" b="0" i="0" kern="1200" dirty="0" smtClean="0">
+              <a:solidFill>
+                <a:schemeClr val="tx1"/>
+              </a:solidFill>
+              <a:effectLst/>
+              <a:latin typeface="Arial" panose="020B0604020202020204" pitchFamily="34" charset="0"/>
+              <a:ea typeface="ＭＳ Ｐゴシック" charset="0"/>
+              <a:cs typeface="Arial" panose="020B0604020202020204" pitchFamily="34" charset="0"/>
+            </a:endParaRPr>
+          </a:p>
+          <a:p>
+            <a:r>
+              <a:rPr lang="en-US" sz="1200" b="0" i="0" kern="1200" dirty="0" smtClean="0">
+                <a:solidFill>
+                  <a:schemeClr val="tx1"/>
+                </a:solidFill>
+                <a:effectLst/>
+                <a:latin typeface="Arial" panose="020B0604020202020204" pitchFamily="34" charset="0"/>
+                <a:ea typeface="ＭＳ Ｐゴシック" charset="0"/>
+                <a:cs typeface="Arial" panose="020B0604020202020204" pitchFamily="34" charset="0"/>
+              </a:rPr>
+              <a:t>The </a:t>
+            </a:r>
+            <a:r>
+              <a:rPr lang="en-US" sz="1200" b="0" i="0" kern="1200" dirty="0" err="1" smtClean="0">
+                <a:solidFill>
+                  <a:schemeClr val="tx1"/>
+                </a:solidFill>
+                <a:effectLst/>
+                <a:latin typeface="Arial" panose="020B0604020202020204" pitchFamily="34" charset="0"/>
+                <a:ea typeface="ＭＳ Ｐゴシック" charset="0"/>
+                <a:cs typeface="Arial" panose="020B0604020202020204" pitchFamily="34" charset="0"/>
+              </a:rPr>
+              <a:t>InSpec</a:t>
+            </a:r>
+            <a:r>
+              <a:rPr lang="en-US" sz="1200" b="0" i="0" kern="1200" dirty="0" smtClean="0">
+                <a:solidFill>
+                  <a:schemeClr val="tx1"/>
+                </a:solidFill>
+                <a:effectLst/>
+                <a:latin typeface="Arial" panose="020B0604020202020204" pitchFamily="34" charset="0"/>
+                <a:ea typeface="ＭＳ Ｐゴシック" charset="0"/>
+                <a:cs typeface="Arial" panose="020B0604020202020204" pitchFamily="34" charset="0"/>
+              </a:rPr>
+              <a:t> audit resource framework is fully compatible with Chef Compliance.</a:t>
+            </a:r>
+          </a:p>
+          <a:p>
+            <a:endParaRPr lang="en-US" sz="1200" b="0" i="0" kern="1200" dirty="0" smtClean="0">
+              <a:solidFill>
+                <a:schemeClr val="tx1"/>
+              </a:solidFill>
+              <a:effectLst/>
+              <a:latin typeface="Arial" panose="020B0604020202020204" pitchFamily="34" charset="0"/>
+              <a:ea typeface="ＭＳ Ｐゴシック" charset="0"/>
+              <a:cs typeface="Arial" panose="020B0604020202020204" pitchFamily="34" charset="0"/>
+            </a:endParaRPr>
+          </a:p>
+          <a:p>
+            <a:endParaRPr lang="en-US" sz="1200" b="0" i="0" kern="1200" dirty="0" smtClean="0">
+              <a:solidFill>
+                <a:schemeClr val="tx1"/>
+              </a:solidFill>
+              <a:effectLst/>
+              <a:latin typeface="Arial" panose="020B0604020202020204" pitchFamily="34" charset="0"/>
+              <a:ea typeface="ＭＳ Ｐゴシック" charset="0"/>
+              <a:cs typeface="Arial" panose="020B0604020202020204" pitchFamily="34" charset="0"/>
+            </a:endParaRPr>
+          </a:p>
+          <a:p>
             <a:endParaRPr lang="en-US" dirty="0"/>
           </a:p>
         </p:txBody>
@@ -3125,7 +3479,7 @@
               <a:pPr>
                 <a:defRPr/>
               </a:pPr>
-              <a:t>9</a:t>
+              <a:t>8</a:t>
             </a:fld>
             <a:endParaRPr lang="en-US" dirty="0"/>
           </a:p>
@@ -3178,7 +3532,7 @@
     </p:spTree>
     <p:extLst>
       <p:ext uri="{BB962C8B-B14F-4D97-AF65-F5344CB8AC3E}">
-        <p14:creationId xmlns:p14="http://schemas.microsoft.com/office/powerpoint/2010/main" val="1952605689"/>
+        <p14:creationId xmlns:p14="http://schemas.microsoft.com/office/powerpoint/2010/main" val="1916487699"/>
       </p:ext>
     </p:extLst>
   </p:cSld>
@@ -3259,7 +3613,7 @@
               <a:pPr>
                 <a:defRPr/>
               </a:pPr>
-              <a:t>10</a:t>
+              <a:t>9</a:t>
             </a:fld>
             <a:endParaRPr lang="en-US" dirty="0"/>
           </a:p>
@@ -3312,7 +3666,7 @@
     </p:spTree>
     <p:extLst>
       <p:ext uri="{BB962C8B-B14F-4D97-AF65-F5344CB8AC3E}">
-        <p14:creationId xmlns:p14="http://schemas.microsoft.com/office/powerpoint/2010/main" val="2304267537"/>
+        <p14:creationId xmlns:p14="http://schemas.microsoft.com/office/powerpoint/2010/main" val="1952605689"/>
       </p:ext>
     </p:extLst>
   </p:cSld>
@@ -3366,94 +3720,6 @@
           <a:bodyPr/>
           <a:lstStyle/>
           <a:p>
-            <a:r>
-              <a:rPr lang="en-US" sz="1200" b="0" i="0" kern="1200" dirty="0" smtClean="0">
-                <a:solidFill>
-                  <a:schemeClr val="tx1"/>
-                </a:solidFill>
-                <a:effectLst/>
-                <a:latin typeface="Arial" panose="020B0604020202020204" pitchFamily="34" charset="0"/>
-                <a:ea typeface="ＭＳ Ｐゴシック" charset="0"/>
-                <a:cs typeface="Arial" panose="020B0604020202020204" pitchFamily="34" charset="0"/>
-              </a:rPr>
-              <a:t>Compliance profiles exist for many scenarios, such as those created by the Center for Internet Security (CIS), a non-profit organization that is focused on enhancing the cyber security readiness and response of public and private sector entities.</a:t>
-            </a:r>
-          </a:p>
-          <a:p>
-            <a:endParaRPr lang="en-US" sz="1200" b="0" i="0" kern="1200" dirty="0" smtClean="0">
-              <a:solidFill>
-                <a:schemeClr val="tx1"/>
-              </a:solidFill>
-              <a:effectLst/>
-              <a:latin typeface="Arial" panose="020B0604020202020204" pitchFamily="34" charset="0"/>
-              <a:ea typeface="ＭＳ Ｐゴシック" charset="0"/>
-              <a:cs typeface="Arial" panose="020B0604020202020204" pitchFamily="34" charset="0"/>
-            </a:endParaRPr>
-          </a:p>
-          <a:p>
-            <a:r>
-              <a:rPr lang="en-US" sz="1200" b="0" i="0" kern="1200" dirty="0" smtClean="0">
-                <a:solidFill>
-                  <a:schemeClr val="tx1"/>
-                </a:solidFill>
-                <a:effectLst/>
-                <a:latin typeface="Arial" panose="020B0604020202020204" pitchFamily="34" charset="0"/>
-                <a:ea typeface="ＭＳ Ｐゴシック" charset="0"/>
-                <a:cs typeface="Arial" panose="020B0604020202020204" pitchFamily="34" charset="0"/>
-              </a:rPr>
-              <a:t>Chef Compliance maintains profiles as a collection of individual controls that comprise a complete audit. For example, CIS benchmark 8.1.1.1 recommends testing for the maximum size of the audit log. </a:t>
-            </a:r>
-          </a:p>
-          <a:p>
-            <a:endParaRPr lang="en-US" sz="1200" b="0" i="0" kern="1200" dirty="0" smtClean="0">
-              <a:solidFill>
-                <a:schemeClr val="tx1"/>
-              </a:solidFill>
-              <a:effectLst/>
-              <a:latin typeface="Arial" panose="020B0604020202020204" pitchFamily="34" charset="0"/>
-              <a:ea typeface="ＭＳ Ｐゴシック" charset="0"/>
-              <a:cs typeface="Arial" panose="020B0604020202020204" pitchFamily="34" charset="0"/>
-            </a:endParaRPr>
-          </a:p>
-          <a:p>
-            <a:pPr marL="0" marR="0" indent="0" algn="l" defTabSz="1217613" rtl="0" eaLnBrk="1" fontAlgn="base" latinLnBrk="0" hangingPunct="1">
-              <a:lnSpc>
-                <a:spcPct val="90000"/>
-              </a:lnSpc>
-              <a:spcBef>
-                <a:spcPct val="30000"/>
-              </a:spcBef>
-              <a:spcAft>
-                <a:spcPts val="450"/>
-              </a:spcAft>
-              <a:buClrTx/>
-              <a:buSzTx/>
-              <a:buFontTx/>
-              <a:buNone/>
-              <a:tabLst/>
-              <a:defRPr/>
-            </a:pPr>
-            <a:r>
-              <a:rPr lang="en-US" sz="1200" dirty="0" smtClean="0"/>
-              <a:t>You can also create your own custom Compliance profiles</a:t>
-            </a:r>
-            <a:r>
-              <a:rPr lang="en-US" dirty="0" smtClean="0"/>
-              <a:t>.</a:t>
-            </a:r>
-          </a:p>
-          <a:p>
-            <a:endParaRPr lang="en-US" sz="1200" b="0" i="0" kern="1200" dirty="0" smtClean="0">
-              <a:solidFill>
-                <a:schemeClr val="tx1"/>
-              </a:solidFill>
-              <a:effectLst/>
-              <a:latin typeface="Arial" panose="020B0604020202020204" pitchFamily="34" charset="0"/>
-              <a:ea typeface="ＭＳ Ｐゴシック" charset="0"/>
-              <a:cs typeface="Arial" panose="020B0604020202020204" pitchFamily="34" charset="0"/>
-            </a:endParaRPr>
-          </a:p>
-          <a:p>
             <a:endParaRPr lang="en-US" dirty="0"/>
           </a:p>
         </p:txBody>
@@ -3481,7 +3747,7 @@
               <a:pPr>
                 <a:defRPr/>
               </a:pPr>
-              <a:t>11</a:t>
+              <a:t>10</a:t>
             </a:fld>
             <a:endParaRPr lang="en-US" dirty="0"/>
           </a:p>
@@ -3534,7 +3800,7 @@
     </p:spTree>
     <p:extLst>
       <p:ext uri="{BB962C8B-B14F-4D97-AF65-F5344CB8AC3E}">
-        <p14:creationId xmlns:p14="http://schemas.microsoft.com/office/powerpoint/2010/main" val="1327194117"/>
+        <p14:creationId xmlns:p14="http://schemas.microsoft.com/office/powerpoint/2010/main" val="2304267537"/>
       </p:ext>
     </p:extLst>
   </p:cSld>
@@ -4109,14 +4375,14 @@
           </a:ln>
           <a:extLst>
             <a:ext uri="{909E8E84-426E-40dd-AFC4-6F175D3DCCD1}">
-              <a14:hiddenFill xmlns:a14="http://schemas.microsoft.com/office/drawing/2010/main" xmlns="">
+              <a14:hiddenFill xmlns="" xmlns:a14="http://schemas.microsoft.com/office/drawing/2010/main">
                 <a:solidFill>
                   <a:srgbClr val="FFFFFF"/>
                 </a:solidFill>
               </a14:hiddenFill>
             </a:ext>
             <a:ext uri="{91240B29-F687-4f45-9708-019B960494DF}">
-              <a14:hiddenLine xmlns:a14="http://schemas.microsoft.com/office/drawing/2010/main" xmlns="" w="9525">
+              <a14:hiddenLine xmlns="" xmlns:a14="http://schemas.microsoft.com/office/drawing/2010/main" w="9525">
                 <a:solidFill>
                   <a:srgbClr val="000000"/>
                 </a:solidFill>
@@ -4264,14 +4530,14 @@
           </a:ln>
           <a:extLst>
             <a:ext uri="{909E8E84-426E-40dd-AFC4-6F175D3DCCD1}">
-              <a14:hiddenFill xmlns:a14="http://schemas.microsoft.com/office/drawing/2010/main" xmlns="">
+              <a14:hiddenFill xmlns="" xmlns:a14="http://schemas.microsoft.com/office/drawing/2010/main">
                 <a:solidFill>
                   <a:srgbClr val="FFFFFF"/>
                 </a:solidFill>
               </a14:hiddenFill>
             </a:ext>
             <a:ext uri="{91240B29-F687-4f45-9708-019B960494DF}">
-              <a14:hiddenLine xmlns:a14="http://schemas.microsoft.com/office/drawing/2010/main" xmlns="" w="9525">
+              <a14:hiddenLine xmlns="" xmlns:a14="http://schemas.microsoft.com/office/drawing/2010/main" w="9525">
                 <a:solidFill>
                   <a:srgbClr val="000000"/>
                 </a:solidFill>
@@ -4762,14 +5028,14 @@
           </a:ln>
           <a:extLst>
             <a:ext uri="{909E8E84-426E-40dd-AFC4-6F175D3DCCD1}">
-              <a14:hiddenFill xmlns:a14="http://schemas.microsoft.com/office/drawing/2010/main" xmlns="">
+              <a14:hiddenFill xmlns="" xmlns:a14="http://schemas.microsoft.com/office/drawing/2010/main">
                 <a:solidFill>
                   <a:srgbClr val="FFFFFF"/>
                 </a:solidFill>
               </a14:hiddenFill>
             </a:ext>
             <a:ext uri="{91240B29-F687-4f45-9708-019B960494DF}">
-              <a14:hiddenLine xmlns:a14="http://schemas.microsoft.com/office/drawing/2010/main" xmlns="" w="9525">
+              <a14:hiddenLine xmlns="" xmlns:a14="http://schemas.microsoft.com/office/drawing/2010/main" w="9525">
                 <a:solidFill>
                   <a:srgbClr val="000000"/>
                 </a:solidFill>
@@ -7643,14 +7909,14 @@
           </a:ln>
           <a:extLst>
             <a:ext uri="{909E8E84-426E-40dd-AFC4-6F175D3DCCD1}">
-              <a14:hiddenFill xmlns:a14="http://schemas.microsoft.com/office/drawing/2010/main" xmlns="">
+              <a14:hiddenFill xmlns="" xmlns:a14="http://schemas.microsoft.com/office/drawing/2010/main">
                 <a:solidFill>
                   <a:srgbClr val="FFFFFF"/>
                 </a:solidFill>
               </a14:hiddenFill>
             </a:ext>
             <a:ext uri="{91240B29-F687-4f45-9708-019B960494DF}">
-              <a14:hiddenLine xmlns:a14="http://schemas.microsoft.com/office/drawing/2010/main" xmlns="" w="9525">
+              <a14:hiddenLine xmlns="" xmlns:a14="http://schemas.microsoft.com/office/drawing/2010/main" w="9525">
                 <a:solidFill>
                   <a:srgbClr val="000000"/>
                 </a:solidFill>
@@ -9007,14 +9273,14 @@
           </a:ln>
           <a:extLst>
             <a:ext uri="{909E8E84-426E-40dd-AFC4-6F175D3DCCD1}">
-              <a14:hiddenFill xmlns:a14="http://schemas.microsoft.com/office/drawing/2010/main" xmlns="">
+              <a14:hiddenFill xmlns="" xmlns:a14="http://schemas.microsoft.com/office/drawing/2010/main">
                 <a:solidFill>
                   <a:srgbClr val="FFFFFF"/>
                 </a:solidFill>
               </a14:hiddenFill>
             </a:ext>
             <a:ext uri="{91240B29-F687-4f45-9708-019B960494DF}">
-              <a14:hiddenLine xmlns:a14="http://schemas.microsoft.com/office/drawing/2010/main" xmlns="" w="9525">
+              <a14:hiddenLine xmlns="" xmlns:a14="http://schemas.microsoft.com/office/drawing/2010/main" w="9525">
                 <a:solidFill>
                   <a:srgbClr val="000000"/>
                 </a:solidFill>
@@ -9572,14 +9838,14 @@
           </a:ln>
           <a:extLst>
             <a:ext uri="{909E8E84-426E-40dd-AFC4-6F175D3DCCD1}">
-              <a14:hiddenFill xmlns:a14="http://schemas.microsoft.com/office/drawing/2010/main" xmlns="">
+              <a14:hiddenFill xmlns="" xmlns:a14="http://schemas.microsoft.com/office/drawing/2010/main">
                 <a:solidFill>
                   <a:srgbClr val="FFFFFF"/>
                 </a:solidFill>
               </a14:hiddenFill>
             </a:ext>
             <a:ext uri="{91240B29-F687-4f45-9708-019B960494DF}">
-              <a14:hiddenLine xmlns:a14="http://schemas.microsoft.com/office/drawing/2010/main" xmlns="" w="9525">
+              <a14:hiddenLine xmlns="" xmlns:a14="http://schemas.microsoft.com/office/drawing/2010/main" w="9525">
                 <a:solidFill>
                   <a:srgbClr val="000000"/>
                 </a:solidFill>
@@ -10146,14 +10412,14 @@
           </a:ln>
           <a:extLst>
             <a:ext uri="{909E8E84-426E-40dd-AFC4-6F175D3DCCD1}">
-              <a14:hiddenFill xmlns:a14="http://schemas.microsoft.com/office/drawing/2010/main" xmlns="">
+              <a14:hiddenFill xmlns="" xmlns:a14="http://schemas.microsoft.com/office/drawing/2010/main">
                 <a:solidFill>
                   <a:srgbClr val="FFFFFF"/>
                 </a:solidFill>
               </a14:hiddenFill>
             </a:ext>
             <a:ext uri="{91240B29-F687-4f45-9708-019B960494DF}">
-              <a14:hiddenLine xmlns:a14="http://schemas.microsoft.com/office/drawing/2010/main" xmlns="" w="9525">
+              <a14:hiddenLine xmlns="" xmlns:a14="http://schemas.microsoft.com/office/drawing/2010/main" w="9525">
                 <a:solidFill>
                   <a:srgbClr val="000000"/>
                 </a:solidFill>
@@ -11093,14 +11359,14 @@
           </a:ln>
           <a:extLst>
             <a:ext uri="{909E8E84-426E-40dd-AFC4-6F175D3DCCD1}">
-              <a14:hiddenFill xmlns:a14="http://schemas.microsoft.com/office/drawing/2010/main" xmlns="">
+              <a14:hiddenFill xmlns="" xmlns:a14="http://schemas.microsoft.com/office/drawing/2010/main">
                 <a:solidFill>
                   <a:srgbClr val="FFFFFF"/>
                 </a:solidFill>
               </a14:hiddenFill>
             </a:ext>
             <a:ext uri="{91240B29-F687-4f45-9708-019B960494DF}">
-              <a14:hiddenLine xmlns:a14="http://schemas.microsoft.com/office/drawing/2010/main" xmlns="" w="9525">
+              <a14:hiddenLine xmlns="" xmlns:a14="http://schemas.microsoft.com/office/drawing/2010/main" w="9525">
                 <a:solidFill>
                   <a:srgbClr val="000000"/>
                 </a:solidFill>
@@ -11854,14 +12120,14 @@
           </a:ln>
           <a:extLst>
             <a:ext uri="{909E8E84-426E-40dd-AFC4-6F175D3DCCD1}">
-              <a14:hiddenFill xmlns:a14="http://schemas.microsoft.com/office/drawing/2010/main" xmlns="">
+              <a14:hiddenFill xmlns="" xmlns:a14="http://schemas.microsoft.com/office/drawing/2010/main">
                 <a:solidFill>
                   <a:srgbClr val="FFFFFF"/>
                 </a:solidFill>
               </a14:hiddenFill>
             </a:ext>
             <a:ext uri="{91240B29-F687-4f45-9708-019B960494DF}">
-              <a14:hiddenLine xmlns:a14="http://schemas.microsoft.com/office/drawing/2010/main" xmlns="" w="9525">
+              <a14:hiddenLine xmlns="" xmlns:a14="http://schemas.microsoft.com/office/drawing/2010/main" w="9525">
                 <a:solidFill>
                   <a:srgbClr val="000000"/>
                 </a:solidFill>
@@ -13092,8 +13358,8 @@
         </p:nvSpPr>
         <p:spPr>
           <a:xfrm>
-            <a:off x="650040" y="2039078"/>
-            <a:ext cx="5133540" cy="5345953"/>
+            <a:off x="243840" y="2039078"/>
+            <a:ext cx="3630328" cy="5345953"/>
           </a:xfrm>
         </p:spPr>
         <p:txBody>
@@ -13102,11 +13368,29 @@
           <a:p>
             <a:r>
               <a:rPr lang="en-US" dirty="0" smtClean="0"/>
-              <a:t>TBD  </a:t>
-            </a:r>
-            <a:r>
-              <a:rPr lang="en-US" smtClean="0"/>
-              <a:t>- expand</a:t>
+              <a:t>The Chef Compliance web UI provides views into compliance scan results as well as views of Chef Compliance profiles. </a:t>
+            </a:r>
+          </a:p>
+          <a:p>
+            <a:r>
+              <a:rPr lang="en-US" dirty="0" smtClean="0"/>
+              <a:t>You also execute scans </a:t>
+            </a:r>
+            <a:r>
+              <a:rPr lang="en-US" dirty="0"/>
+              <a:t>via the </a:t>
+            </a:r>
+            <a:r>
+              <a:rPr lang="en-US" dirty="0" smtClean="0"/>
+              <a:t>Compliance </a:t>
+            </a:r>
+            <a:r>
+              <a:rPr lang="en-US" dirty="0"/>
+              <a:t>web </a:t>
+            </a:r>
+            <a:r>
+              <a:rPr lang="en-US" dirty="0" smtClean="0"/>
+              <a:t>UI. </a:t>
             </a:r>
             <a:endParaRPr lang="en-US" dirty="0" smtClean="0"/>
           </a:p>
@@ -13756,7 +14040,7 @@
         </p:nvSpPr>
         <p:spPr bwMode="white">
           <a:xfrm>
-            <a:off x="13236590" y="4153002"/>
+            <a:off x="13284716" y="4923024"/>
             <a:ext cx="3230631" cy="1842629"/>
           </a:xfrm>
           <a:prstGeom prst="rect">
@@ -13938,7 +14222,11 @@
             <a:pPr algn="ctr"/>
             <a:r>
               <a:rPr lang="en-US" sz="2667" dirty="0" smtClean="0"/>
-              <a:t>Node to run Compliance tests against</a:t>
+              <a:t>Nodes </a:t>
+            </a:r>
+            <a:r>
+              <a:rPr lang="en-US" sz="2667" dirty="0" smtClean="0"/>
+              <a:t>to run Compliance tests against</a:t>
             </a:r>
             <a:endParaRPr lang="en-US" sz="2667" dirty="0"/>
           </a:p>
@@ -14072,7 +14360,15 @@
           <a:p>
             <a:r>
               <a:rPr lang="en-US" dirty="0" smtClean="0"/>
-              <a:t>We will provide two servers for you to use while performing lab exercises in this course:</a:t>
+              <a:t>We will provide </a:t>
+            </a:r>
+            <a:r>
+              <a:rPr lang="en-US" dirty="0" smtClean="0"/>
+              <a:t>three machines for </a:t>
+            </a:r>
+            <a:r>
+              <a:rPr lang="en-US" dirty="0" smtClean="0"/>
+              <a:t>you to use while performing lab exercises in this course:</a:t>
             </a:r>
           </a:p>
           <a:p>
@@ -14085,7 +14381,15 @@
             </a:pPr>
             <a:r>
               <a:rPr lang="en-US" dirty="0" smtClean="0"/>
-              <a:t>One to install and run Chef Compliance on.</a:t>
+              <a:t>One </a:t>
+            </a:r>
+            <a:r>
+              <a:rPr lang="en-US" dirty="0" smtClean="0"/>
+              <a:t>Linux server to </a:t>
+            </a:r>
+            <a:r>
+              <a:rPr lang="en-US" dirty="0" smtClean="0"/>
+              <a:t>install and run Chef Compliance on.</a:t>
             </a:r>
             <a:endParaRPr lang="en-US" dirty="0"/>
           </a:p>
@@ -14096,7 +14400,15 @@
             </a:pPr>
             <a:r>
               <a:rPr lang="en-US" dirty="0" smtClean="0"/>
-              <a:t>One node to perform Chef Compliance tests against.</a:t>
+              <a:t>One </a:t>
+            </a:r>
+            <a:r>
+              <a:rPr lang="en-US" dirty="0" smtClean="0"/>
+              <a:t>Windows node and one Linux node to </a:t>
+            </a:r>
+            <a:r>
+              <a:rPr lang="en-US" dirty="0" smtClean="0"/>
+              <a:t>perform Chef Compliance tests against.</a:t>
             </a:r>
           </a:p>
           <a:p>
@@ -14318,6 +14630,36 @@
           </a:p>
         </p:txBody>
       </p:sp>
+      <p:pic>
+        <p:nvPicPr>
+          <p:cNvPr id="17" name="Picture 16"/>
+          <p:cNvPicPr>
+            <a:picLocks noChangeAspect="1"/>
+          </p:cNvPicPr>
+          <p:nvPr/>
+        </p:nvPicPr>
+        <p:blipFill>
+          <a:blip r:embed="rId3">
+            <a:extLst>
+              <a:ext uri="{28A0092B-C50C-407E-A947-70E740481C1C}">
+                <a14:useLocalDpi xmlns:a14="http://schemas.microsoft.com/office/drawing/2010/main" val="0"/>
+              </a:ext>
+            </a:extLst>
+          </a:blip>
+          <a:stretch>
+            <a:fillRect/>
+          </a:stretch>
+        </p:blipFill>
+        <p:spPr>
+          <a:xfrm>
+            <a:off x="14093074" y="2715337"/>
+            <a:ext cx="2151627" cy="2294080"/>
+          </a:xfrm>
+          <a:prstGeom prst="rect">
+            <a:avLst/>
+          </a:prstGeom>
+        </p:spPr>
+      </p:pic>
     </p:spTree>
     <p:extLst>
       <p:ext uri="{BB962C8B-B14F-4D97-AF65-F5344CB8AC3E}">
@@ -15219,9 +15561,10 @@
               <a:t>Remediate </a:t>
             </a:r>
             <a:r>
-              <a:rPr lang="en-US" dirty="0"/>
-              <a:t>a compliance issue </a:t>
-            </a:r>
+              <a:rPr lang="en-US" dirty="0" smtClean="0"/>
+              <a:t>compliance issues</a:t>
+            </a:r>
+            <a:endParaRPr lang="en-US" dirty="0"/>
           </a:p>
           <a:p>
             <a:pPr marL="457200" indent="-457200">
@@ -15333,22 +15676,33 @@
       </p:grpSpPr>
       <p:sp>
         <p:nvSpPr>
-          <p:cNvPr id="2" name="Title 1"/>
+          <p:cNvPr id="6" name="Title 5"/>
           <p:cNvSpPr>
             <a:spLocks noGrp="1"/>
           </p:cNvSpPr>
           <p:nvPr>
-            <p:ph type="title"/>
+            <p:ph type="ctrTitle"/>
           </p:nvPr>
         </p:nvSpPr>
-        <p:spPr/>
+        <p:spPr>
+          <a:xfrm>
+            <a:off x="836579" y="2294619"/>
+            <a:ext cx="13154059" cy="852712"/>
+          </a:xfrm>
+        </p:spPr>
         <p:txBody>
-          <a:bodyPr/>
+          <a:bodyPr>
+            <a:normAutofit fontScale="90000"/>
+          </a:bodyPr>
           <a:lstStyle/>
           <a:p>
             <a:r>
               <a:rPr lang="en-US" dirty="0" smtClean="0"/>
-              <a:t>Value Proposition</a:t>
+              <a:t>Chef </a:t>
+            </a:r>
+            <a:r>
+              <a:rPr lang="en-US" dirty="0" smtClean="0"/>
+              <a:t>Compliance Value Proposition</a:t>
             </a:r>
             <a:endParaRPr lang="en-US" dirty="0"/>
           </a:p>
@@ -15356,18 +15710,18 @@
       </p:sp>
       <p:sp>
         <p:nvSpPr>
-          <p:cNvPr id="3" name="Text Placeholder 2"/>
+          <p:cNvPr id="7" name="Subtitle 6"/>
           <p:cNvSpPr>
             <a:spLocks noGrp="1"/>
           </p:cNvSpPr>
           <p:nvPr>
-            <p:ph type="body" sz="quarter" idx="12"/>
+            <p:ph type="subTitle" idx="1"/>
           </p:nvPr>
         </p:nvSpPr>
         <p:spPr>
           <a:xfrm>
-            <a:off x="650040" y="1141174"/>
-            <a:ext cx="14898624" cy="7023109"/>
+            <a:off x="1671638" y="3469550"/>
+            <a:ext cx="12319000" cy="4290497"/>
           </a:xfrm>
         </p:spPr>
         <p:txBody>
@@ -15376,31 +15730,44 @@
           <a:p>
             <a:r>
               <a:rPr lang="en-US" dirty="0" smtClean="0"/>
-              <a:t>TBD</a:t>
-            </a:r>
-          </a:p>
-          <a:p>
-            <a:endParaRPr lang="en-US" sz="2400" dirty="0"/>
-          </a:p>
-          <a:p>
-            <a:r>
-              <a:rPr lang="en-US" sz="2400" dirty="0"/>
-              <a:t>file:///C:/Users/sdelfante/Desktop/compliance-at-velocity2015.pdf</a:t>
-            </a:r>
-          </a:p>
-          <a:p>
-            <a:pPr marL="457200" indent="-457200">
-              <a:buFont typeface="Wingdings" charset="2"/>
-              <a:buChar char="Ø"/>
-            </a:pPr>
+              <a:t>You are probably aware of how Chef automates the </a:t>
+            </a:r>
+            <a:r>
+              <a:rPr lang="en-US" dirty="0" smtClean="0"/>
+              <a:t>configuration and management of your infrastructure. But what about risks and compliance?</a:t>
+            </a:r>
+          </a:p>
+          <a:p>
+            <a:endParaRPr lang="en-US" dirty="0" smtClean="0"/>
+          </a:p>
+          <a:p>
+            <a:r>
+              <a:rPr lang="en-US" dirty="0"/>
+              <a:t>Regulatory compliance is a fact of life for every enterprise</a:t>
+            </a:r>
+            <a:r>
+              <a:rPr lang="en-US" dirty="0" smtClean="0"/>
+              <a:t>. </a:t>
+            </a:r>
+          </a:p>
+          <a:p>
             <a:endParaRPr lang="en-US" dirty="0"/>
+          </a:p>
+          <a:p>
+            <a:r>
+              <a:rPr lang="en-US" dirty="0" smtClean="0"/>
+              <a:t>With Chef Compliance you can scan for risks and compliance issues with easy-to-understand, customizable reports and visualization.</a:t>
+            </a:r>
+          </a:p>
+          <a:p>
+            <a:endParaRPr lang="en-US" dirty="0" smtClean="0"/>
           </a:p>
         </p:txBody>
       </p:sp>
     </p:spTree>
     <p:extLst>
       <p:ext uri="{BB962C8B-B14F-4D97-AF65-F5344CB8AC3E}">
-        <p14:creationId xmlns:p14="http://schemas.microsoft.com/office/powerpoint/2010/main" val="1242625716"/>
+        <p14:creationId xmlns:p14="http://schemas.microsoft.com/office/powerpoint/2010/main" val="1397798187"/>
       </p:ext>
     </p:extLst>
   </p:cSld>
@@ -15462,71 +15829,1361 @@
           </a:p>
         </p:txBody>
       </p:sp>
-      <p:sp>
-        <p:nvSpPr>
-          <p:cNvPr id="7" name="Subtitle 6"/>
-          <p:cNvSpPr>
-            <a:spLocks noGrp="1"/>
+      <p:cxnSp>
+        <p:nvCxnSpPr>
+          <p:cNvPr id="9" name="Straight Arrow Connector 8"/>
+          <p:cNvCxnSpPr>
+            <a:stCxn id="11" idx="3"/>
+          </p:cNvCxnSpPr>
+          <p:nvPr/>
+        </p:nvCxnSpPr>
+        <p:spPr>
+          <a:xfrm>
+            <a:off x="4418443" y="5479880"/>
+            <a:ext cx="2278919" cy="1250"/>
+          </a:xfrm>
+          <a:prstGeom prst="straightConnector1">
+            <a:avLst/>
+          </a:prstGeom>
+          <a:ln>
+            <a:solidFill>
+              <a:schemeClr val="accent1"/>
+            </a:solidFill>
+            <a:headEnd type="triangle"/>
+            <a:tailEnd type="triangle"/>
+          </a:ln>
+        </p:spPr>
+        <p:style>
+          <a:lnRef idx="3">
+            <a:schemeClr val="accent1"/>
+          </a:lnRef>
+          <a:fillRef idx="0">
+            <a:schemeClr val="accent1"/>
+          </a:fillRef>
+          <a:effectRef idx="2">
+            <a:schemeClr val="accent1"/>
+          </a:effectRef>
+          <a:fontRef idx="minor">
+            <a:schemeClr val="tx1"/>
+          </a:fontRef>
+        </p:style>
+      </p:cxnSp>
+      <p:sp>
+        <p:nvSpPr>
+          <p:cNvPr id="10" name="Text Placeholder 2"/>
+          <p:cNvSpPr txBox="1">
+            <a:spLocks/>
           </p:cNvSpPr>
-          <p:nvPr>
-            <p:ph type="subTitle" idx="1"/>
-          </p:nvPr>
-        </p:nvSpPr>
-        <p:spPr/>
+          <p:nvPr/>
+        </p:nvSpPr>
+        <p:spPr bwMode="white">
+          <a:xfrm>
+            <a:off x="1970624" y="6480804"/>
+            <a:ext cx="3155381" cy="1021942"/>
+          </a:xfrm>
+          <a:prstGeom prst="rect">
+            <a:avLst/>
+          </a:prstGeom>
+        </p:spPr>
         <p:txBody>
-          <a:bodyPr/>
+          <a:bodyPr vert="horz" wrap="square" lIns="0" tIns="0" rIns="0" bIns="0" rtlCol="0">
+            <a:normAutofit/>
+          </a:bodyPr>
+          <a:lstStyle>
+            <a:lvl1pPr marL="0" indent="0" algn="l" defTabSz="914363" rtl="0" eaLnBrk="1" latinLnBrk="0" hangingPunct="1">
+              <a:lnSpc>
+                <a:spcPct val="100000"/>
+              </a:lnSpc>
+              <a:spcBef>
+                <a:spcPts val="600"/>
+              </a:spcBef>
+              <a:buSzPct val="90000"/>
+              <a:buFont typeface="Arial" pitchFamily="34" charset="0"/>
+              <a:buNone/>
+              <a:defRPr sz="3200" kern="1200" baseline="0">
+                <a:solidFill>
+                  <a:schemeClr val="accent3">
+                    <a:lumMod val="50000"/>
+                  </a:schemeClr>
+                </a:solidFill>
+                <a:latin typeface="+mn-lt"/>
+                <a:ea typeface="+mn-ea"/>
+                <a:cs typeface="+mn-cs"/>
+              </a:defRPr>
+            </a:lvl1pPr>
+            <a:lvl2pPr marL="231775" indent="0" algn="l" defTabSz="914363" rtl="0" eaLnBrk="1" latinLnBrk="0" hangingPunct="1">
+              <a:lnSpc>
+                <a:spcPct val="100000"/>
+              </a:lnSpc>
+              <a:spcBef>
+                <a:spcPts val="600"/>
+              </a:spcBef>
+              <a:buSzPct val="90000"/>
+              <a:buFont typeface="Arial" pitchFamily="34" charset="0"/>
+              <a:buNone/>
+              <a:defRPr sz="2800" kern="1200" baseline="0">
+                <a:solidFill>
+                  <a:schemeClr val="accent3">
+                    <a:lumMod val="50000"/>
+                  </a:schemeClr>
+                </a:solidFill>
+                <a:latin typeface="+mn-lt"/>
+                <a:ea typeface="+mn-ea"/>
+                <a:cs typeface="+mn-cs"/>
+              </a:defRPr>
+            </a:lvl2pPr>
+            <a:lvl3pPr marL="457200" indent="0" algn="l" defTabSz="914363" rtl="0" eaLnBrk="1" latinLnBrk="0" hangingPunct="1">
+              <a:lnSpc>
+                <a:spcPct val="100000"/>
+              </a:lnSpc>
+              <a:spcBef>
+                <a:spcPts val="600"/>
+              </a:spcBef>
+              <a:buSzPct val="90000"/>
+              <a:buFont typeface="Arial" pitchFamily="34" charset="0"/>
+              <a:buNone/>
+              <a:defRPr sz="2400" kern="1200" baseline="0">
+                <a:solidFill>
+                  <a:schemeClr val="accent3">
+                    <a:lumMod val="50000"/>
+                  </a:schemeClr>
+                </a:solidFill>
+                <a:latin typeface="+mn-lt"/>
+                <a:ea typeface="+mn-ea"/>
+                <a:cs typeface="+mn-cs"/>
+              </a:defRPr>
+            </a:lvl3pPr>
+            <a:lvl4pPr marL="630238" indent="0" algn="l" defTabSz="914363" rtl="0" eaLnBrk="1" latinLnBrk="0" hangingPunct="1">
+              <a:lnSpc>
+                <a:spcPct val="100000"/>
+              </a:lnSpc>
+              <a:spcBef>
+                <a:spcPts val="600"/>
+              </a:spcBef>
+              <a:buSzPct val="90000"/>
+              <a:buFont typeface="Arial" pitchFamily="34" charset="0"/>
+              <a:buNone/>
+              <a:defRPr sz="2000" kern="1200" baseline="0">
+                <a:solidFill>
+                  <a:schemeClr val="accent3">
+                    <a:lumMod val="50000"/>
+                  </a:schemeClr>
+                </a:solidFill>
+                <a:latin typeface="+mn-lt"/>
+                <a:ea typeface="+mn-ea"/>
+                <a:cs typeface="+mn-cs"/>
+              </a:defRPr>
+            </a:lvl4pPr>
+            <a:lvl5pPr marL="801687" indent="0" algn="l" defTabSz="914363" rtl="0" eaLnBrk="1" latinLnBrk="0" hangingPunct="1">
+              <a:lnSpc>
+                <a:spcPct val="100000"/>
+              </a:lnSpc>
+              <a:spcBef>
+                <a:spcPts val="600"/>
+              </a:spcBef>
+              <a:buSzPct val="90000"/>
+              <a:buFont typeface="Arial" pitchFamily="34" charset="0"/>
+              <a:buNone/>
+              <a:defRPr sz="1800" kern="1200" baseline="0">
+                <a:solidFill>
+                  <a:schemeClr val="accent3">
+                    <a:lumMod val="50000"/>
+                  </a:schemeClr>
+                </a:solidFill>
+                <a:latin typeface="+mn-lt"/>
+                <a:ea typeface="+mn-ea"/>
+                <a:cs typeface="+mn-cs"/>
+              </a:defRPr>
+            </a:lvl5pPr>
+            <a:lvl6pPr marL="2514499" indent="-228591" algn="l" defTabSz="914363" rtl="0" eaLnBrk="1" latinLnBrk="0" hangingPunct="1">
+              <a:spcBef>
+                <a:spcPct val="20000"/>
+              </a:spcBef>
+              <a:buFont typeface="Arial" pitchFamily="34" charset="0"/>
+              <a:buChar char="•"/>
+              <a:defRPr sz="2000" kern="1200">
+                <a:solidFill>
+                  <a:schemeClr val="tx1"/>
+                </a:solidFill>
+                <a:latin typeface="+mn-lt"/>
+                <a:ea typeface="+mn-ea"/>
+                <a:cs typeface="+mn-cs"/>
+              </a:defRPr>
+            </a:lvl6pPr>
+            <a:lvl7pPr marL="2971681" indent="-228591" algn="l" defTabSz="914363" rtl="0" eaLnBrk="1" latinLnBrk="0" hangingPunct="1">
+              <a:spcBef>
+                <a:spcPct val="20000"/>
+              </a:spcBef>
+              <a:buFont typeface="Arial" pitchFamily="34" charset="0"/>
+              <a:buChar char="•"/>
+              <a:defRPr sz="2000" kern="1200">
+                <a:solidFill>
+                  <a:schemeClr val="tx1"/>
+                </a:solidFill>
+                <a:latin typeface="+mn-lt"/>
+                <a:ea typeface="+mn-ea"/>
+                <a:cs typeface="+mn-cs"/>
+              </a:defRPr>
+            </a:lvl7pPr>
+            <a:lvl8pPr marL="3428863" indent="-228591" algn="l" defTabSz="914363" rtl="0" eaLnBrk="1" latinLnBrk="0" hangingPunct="1">
+              <a:spcBef>
+                <a:spcPct val="20000"/>
+              </a:spcBef>
+              <a:buFont typeface="Arial" pitchFamily="34" charset="0"/>
+              <a:buChar char="•"/>
+              <a:defRPr sz="2000" kern="1200">
+                <a:solidFill>
+                  <a:schemeClr val="tx1"/>
+                </a:solidFill>
+                <a:latin typeface="+mn-lt"/>
+                <a:ea typeface="+mn-ea"/>
+                <a:cs typeface="+mn-cs"/>
+              </a:defRPr>
+            </a:lvl8pPr>
+            <a:lvl9pPr marL="3886045" indent="-228591" algn="l" defTabSz="914363" rtl="0" eaLnBrk="1" latinLnBrk="0" hangingPunct="1">
+              <a:spcBef>
+                <a:spcPct val="20000"/>
+              </a:spcBef>
+              <a:buFont typeface="Arial" pitchFamily="34" charset="0"/>
+              <a:buChar char="•"/>
+              <a:defRPr sz="2000" kern="1200">
+                <a:solidFill>
+                  <a:schemeClr val="tx1"/>
+                </a:solidFill>
+                <a:latin typeface="+mn-lt"/>
+                <a:ea typeface="+mn-ea"/>
+                <a:cs typeface="+mn-cs"/>
+              </a:defRPr>
+            </a:lvl9pPr>
+          </a:lstStyle>
+          <a:p>
+            <a:pPr algn="ctr"/>
+            <a:r>
+              <a:rPr lang="en-US" sz="2800" b="1" dirty="0" smtClean="0"/>
+              <a:t>Chef Compliance Server</a:t>
+            </a:r>
+            <a:endParaRPr lang="en-US" sz="2800" b="1" dirty="0"/>
+          </a:p>
+          <a:p>
+            <a:endParaRPr lang="en-US" sz="2667" dirty="0"/>
+          </a:p>
+          <a:p>
+            <a:endParaRPr lang="en-US" sz="2667" dirty="0"/>
+          </a:p>
+          <a:p>
+            <a:endParaRPr lang="en-US" sz="4267" dirty="0"/>
+          </a:p>
+          <a:p>
+            <a:endParaRPr lang="en-US" sz="4267" dirty="0"/>
+          </a:p>
+        </p:txBody>
+      </p:sp>
+      <p:pic>
+        <p:nvPicPr>
+          <p:cNvPr id="11" name="Picture 10"/>
+          <p:cNvPicPr>
+            <a:picLocks noChangeAspect="1"/>
+          </p:cNvPicPr>
+          <p:nvPr/>
+        </p:nvPicPr>
+        <p:blipFill>
+          <a:blip r:embed="rId3">
+            <a:extLst>
+              <a:ext uri="{28A0092B-C50C-407E-A947-70E740481C1C}">
+                <a14:useLocalDpi xmlns:a14="http://schemas.microsoft.com/office/drawing/2010/main" val="0"/>
+              </a:ext>
+            </a:extLst>
+          </a:blip>
+          <a:stretch>
+            <a:fillRect/>
+          </a:stretch>
+        </p:blipFill>
+        <p:spPr>
+          <a:xfrm>
+            <a:off x="2781632" y="4607290"/>
+            <a:ext cx="1636811" cy="1745180"/>
+          </a:xfrm>
+          <a:prstGeom prst="rect">
+            <a:avLst/>
+          </a:prstGeom>
+        </p:spPr>
+      </p:pic>
+      <p:sp>
+        <p:nvSpPr>
+          <p:cNvPr id="12" name="Text Placeholder 2"/>
+          <p:cNvSpPr txBox="1">
+            <a:spLocks/>
+          </p:cNvSpPr>
+          <p:nvPr/>
+        </p:nvSpPr>
+        <p:spPr bwMode="white">
+          <a:xfrm>
+            <a:off x="12628579" y="7147546"/>
+            <a:ext cx="2198204" cy="760777"/>
+          </a:xfrm>
+          <a:prstGeom prst="rect">
+            <a:avLst/>
+          </a:prstGeom>
+        </p:spPr>
+        <p:txBody>
+          <a:bodyPr vert="horz" wrap="square" lIns="0" tIns="0" rIns="0" bIns="0" rtlCol="0">
+            <a:normAutofit fontScale="85000" lnSpcReduction="10000"/>
+          </a:bodyPr>
+          <a:lstStyle>
+            <a:lvl1pPr marL="0" indent="0" algn="l" defTabSz="914363" rtl="0" eaLnBrk="1" latinLnBrk="0" hangingPunct="1">
+              <a:lnSpc>
+                <a:spcPct val="100000"/>
+              </a:lnSpc>
+              <a:spcBef>
+                <a:spcPts val="600"/>
+              </a:spcBef>
+              <a:buSzPct val="90000"/>
+              <a:buFont typeface="Arial" pitchFamily="34" charset="0"/>
+              <a:buNone/>
+              <a:defRPr sz="3200" kern="1200" baseline="0">
+                <a:solidFill>
+                  <a:schemeClr val="accent3">
+                    <a:lumMod val="50000"/>
+                  </a:schemeClr>
+                </a:solidFill>
+                <a:latin typeface="+mn-lt"/>
+                <a:ea typeface="+mn-ea"/>
+                <a:cs typeface="+mn-cs"/>
+              </a:defRPr>
+            </a:lvl1pPr>
+            <a:lvl2pPr marL="231775" indent="0" algn="l" defTabSz="914363" rtl="0" eaLnBrk="1" latinLnBrk="0" hangingPunct="1">
+              <a:lnSpc>
+                <a:spcPct val="100000"/>
+              </a:lnSpc>
+              <a:spcBef>
+                <a:spcPts val="600"/>
+              </a:spcBef>
+              <a:buSzPct val="90000"/>
+              <a:buFont typeface="Arial" pitchFamily="34" charset="0"/>
+              <a:buNone/>
+              <a:defRPr sz="2800" kern="1200" baseline="0">
+                <a:solidFill>
+                  <a:schemeClr val="accent3">
+                    <a:lumMod val="50000"/>
+                  </a:schemeClr>
+                </a:solidFill>
+                <a:latin typeface="+mn-lt"/>
+                <a:ea typeface="+mn-ea"/>
+                <a:cs typeface="+mn-cs"/>
+              </a:defRPr>
+            </a:lvl2pPr>
+            <a:lvl3pPr marL="457200" indent="0" algn="l" defTabSz="914363" rtl="0" eaLnBrk="1" latinLnBrk="0" hangingPunct="1">
+              <a:lnSpc>
+                <a:spcPct val="100000"/>
+              </a:lnSpc>
+              <a:spcBef>
+                <a:spcPts val="600"/>
+              </a:spcBef>
+              <a:buSzPct val="90000"/>
+              <a:buFont typeface="Arial" pitchFamily="34" charset="0"/>
+              <a:buNone/>
+              <a:defRPr sz="2400" kern="1200" baseline="0">
+                <a:solidFill>
+                  <a:schemeClr val="accent3">
+                    <a:lumMod val="50000"/>
+                  </a:schemeClr>
+                </a:solidFill>
+                <a:latin typeface="+mn-lt"/>
+                <a:ea typeface="+mn-ea"/>
+                <a:cs typeface="+mn-cs"/>
+              </a:defRPr>
+            </a:lvl3pPr>
+            <a:lvl4pPr marL="630238" indent="0" algn="l" defTabSz="914363" rtl="0" eaLnBrk="1" latinLnBrk="0" hangingPunct="1">
+              <a:lnSpc>
+                <a:spcPct val="100000"/>
+              </a:lnSpc>
+              <a:spcBef>
+                <a:spcPts val="600"/>
+              </a:spcBef>
+              <a:buSzPct val="90000"/>
+              <a:buFont typeface="Arial" pitchFamily="34" charset="0"/>
+              <a:buNone/>
+              <a:defRPr sz="2000" kern="1200" baseline="0">
+                <a:solidFill>
+                  <a:schemeClr val="accent3">
+                    <a:lumMod val="50000"/>
+                  </a:schemeClr>
+                </a:solidFill>
+                <a:latin typeface="+mn-lt"/>
+                <a:ea typeface="+mn-ea"/>
+                <a:cs typeface="+mn-cs"/>
+              </a:defRPr>
+            </a:lvl4pPr>
+            <a:lvl5pPr marL="801687" indent="0" algn="l" defTabSz="914363" rtl="0" eaLnBrk="1" latinLnBrk="0" hangingPunct="1">
+              <a:lnSpc>
+                <a:spcPct val="100000"/>
+              </a:lnSpc>
+              <a:spcBef>
+                <a:spcPts val="600"/>
+              </a:spcBef>
+              <a:buSzPct val="90000"/>
+              <a:buFont typeface="Arial" pitchFamily="34" charset="0"/>
+              <a:buNone/>
+              <a:defRPr sz="1800" kern="1200" baseline="0">
+                <a:solidFill>
+                  <a:schemeClr val="accent3">
+                    <a:lumMod val="50000"/>
+                  </a:schemeClr>
+                </a:solidFill>
+                <a:latin typeface="+mn-lt"/>
+                <a:ea typeface="+mn-ea"/>
+                <a:cs typeface="+mn-cs"/>
+              </a:defRPr>
+            </a:lvl5pPr>
+            <a:lvl6pPr marL="2514499" indent="-228591" algn="l" defTabSz="914363" rtl="0" eaLnBrk="1" latinLnBrk="0" hangingPunct="1">
+              <a:spcBef>
+                <a:spcPct val="20000"/>
+              </a:spcBef>
+              <a:buFont typeface="Arial" pitchFamily="34" charset="0"/>
+              <a:buChar char="•"/>
+              <a:defRPr sz="2000" kern="1200">
+                <a:solidFill>
+                  <a:schemeClr val="tx1"/>
+                </a:solidFill>
+                <a:latin typeface="+mn-lt"/>
+                <a:ea typeface="+mn-ea"/>
+                <a:cs typeface="+mn-cs"/>
+              </a:defRPr>
+            </a:lvl6pPr>
+            <a:lvl7pPr marL="2971681" indent="-228591" algn="l" defTabSz="914363" rtl="0" eaLnBrk="1" latinLnBrk="0" hangingPunct="1">
+              <a:spcBef>
+                <a:spcPct val="20000"/>
+              </a:spcBef>
+              <a:buFont typeface="Arial" pitchFamily="34" charset="0"/>
+              <a:buChar char="•"/>
+              <a:defRPr sz="2000" kern="1200">
+                <a:solidFill>
+                  <a:schemeClr val="tx1"/>
+                </a:solidFill>
+                <a:latin typeface="+mn-lt"/>
+                <a:ea typeface="+mn-ea"/>
+                <a:cs typeface="+mn-cs"/>
+              </a:defRPr>
+            </a:lvl7pPr>
+            <a:lvl8pPr marL="3428863" indent="-228591" algn="l" defTabSz="914363" rtl="0" eaLnBrk="1" latinLnBrk="0" hangingPunct="1">
+              <a:spcBef>
+                <a:spcPct val="20000"/>
+              </a:spcBef>
+              <a:buFont typeface="Arial" pitchFamily="34" charset="0"/>
+              <a:buChar char="•"/>
+              <a:defRPr sz="2000" kern="1200">
+                <a:solidFill>
+                  <a:schemeClr val="tx1"/>
+                </a:solidFill>
+                <a:latin typeface="+mn-lt"/>
+                <a:ea typeface="+mn-ea"/>
+                <a:cs typeface="+mn-cs"/>
+              </a:defRPr>
+            </a:lvl8pPr>
+            <a:lvl9pPr marL="3886045" indent="-228591" algn="l" defTabSz="914363" rtl="0" eaLnBrk="1" latinLnBrk="0" hangingPunct="1">
+              <a:spcBef>
+                <a:spcPct val="20000"/>
+              </a:spcBef>
+              <a:buFont typeface="Arial" pitchFamily="34" charset="0"/>
+              <a:buChar char="•"/>
+              <a:defRPr sz="2000" kern="1200">
+                <a:solidFill>
+                  <a:schemeClr val="tx1"/>
+                </a:solidFill>
+                <a:latin typeface="+mn-lt"/>
+                <a:ea typeface="+mn-ea"/>
+                <a:cs typeface="+mn-cs"/>
+              </a:defRPr>
+            </a:lvl9pPr>
+          </a:lstStyle>
+          <a:p>
+            <a:pPr algn="ctr"/>
+            <a:r>
+              <a:rPr lang="en-US" sz="3100" b="1" dirty="0" smtClean="0"/>
+              <a:t>Your Infrastructure</a:t>
+            </a:r>
+            <a:endParaRPr lang="en-US" sz="3100" b="1" dirty="0"/>
+          </a:p>
+          <a:p>
+            <a:endParaRPr lang="en-US" sz="2667" dirty="0"/>
+          </a:p>
+          <a:p>
+            <a:endParaRPr lang="en-US" sz="2667" dirty="0"/>
+          </a:p>
+          <a:p>
+            <a:endParaRPr lang="en-US" sz="4267" dirty="0"/>
+          </a:p>
+          <a:p>
+            <a:endParaRPr lang="en-US" sz="4267" dirty="0"/>
+          </a:p>
+        </p:txBody>
+      </p:sp>
+      <p:grpSp>
+        <p:nvGrpSpPr>
+          <p:cNvPr id="13" name="Group 12"/>
+          <p:cNvGrpSpPr/>
+          <p:nvPr/>
+        </p:nvGrpSpPr>
+        <p:grpSpPr>
+          <a:xfrm>
+            <a:off x="12803495" y="3300402"/>
+            <a:ext cx="937906" cy="1474239"/>
+            <a:chOff x="9289520" y="4376570"/>
+            <a:chExt cx="1025227" cy="1424635"/>
+          </a:xfrm>
+        </p:grpSpPr>
+        <p:pic>
+          <p:nvPicPr>
+            <p:cNvPr id="14" name="Picture 6" descr="http://images.clipartpanda.com/server-clipart-1313181674_Clipart_Free.png"/>
+            <p:cNvPicPr>
+              <a:picLocks noChangeAspect="1" noChangeArrowheads="1"/>
+            </p:cNvPicPr>
+            <p:nvPr/>
+          </p:nvPicPr>
+          <p:blipFill>
+            <a:blip r:embed="rId4">
+              <a:extLst>
+                <a:ext uri="{28A0092B-C50C-407E-A947-70E740481C1C}">
+                  <a14:useLocalDpi xmlns:a14="http://schemas.microsoft.com/office/drawing/2010/main" val="0"/>
+                </a:ext>
+              </a:extLst>
+            </a:blip>
+            <a:srcRect/>
+            <a:stretch>
+              <a:fillRect/>
+            </a:stretch>
+          </p:blipFill>
+          <p:spPr bwMode="auto">
+            <a:xfrm>
+              <a:off x="9289520" y="4376570"/>
+              <a:ext cx="720427" cy="1119835"/>
+            </a:xfrm>
+            <a:prstGeom prst="rect">
+              <a:avLst/>
+            </a:prstGeom>
+            <a:noFill/>
+            <a:extLst>
+              <a:ext uri="{909E8E84-426E-40dd-AFC4-6F175D3DCCD1}">
+                <a14:hiddenFill xmlns="" xmlns:a14="http://schemas.microsoft.com/office/drawing/2010/main">
+                  <a:solidFill>
+                    <a:srgbClr val="FFFFFF"/>
+                  </a:solidFill>
+                </a14:hiddenFill>
+              </a:ext>
+            </a:extLst>
+          </p:spPr>
+        </p:pic>
+        <p:pic>
+          <p:nvPicPr>
+            <p:cNvPr id="15" name="Picture 6" descr="http://images.clipartpanda.com/server-clipart-1313181674_Clipart_Free.png"/>
+            <p:cNvPicPr>
+              <a:picLocks noChangeAspect="1" noChangeArrowheads="1"/>
+            </p:cNvPicPr>
+            <p:nvPr/>
+          </p:nvPicPr>
+          <p:blipFill>
+            <a:blip r:embed="rId4">
+              <a:extLst>
+                <a:ext uri="{28A0092B-C50C-407E-A947-70E740481C1C}">
+                  <a14:useLocalDpi xmlns:a14="http://schemas.microsoft.com/office/drawing/2010/main" val="0"/>
+                </a:ext>
+              </a:extLst>
+            </a:blip>
+            <a:srcRect/>
+            <a:stretch>
+              <a:fillRect/>
+            </a:stretch>
+          </p:blipFill>
+          <p:spPr bwMode="auto">
+            <a:xfrm>
+              <a:off x="9441920" y="4528970"/>
+              <a:ext cx="720427" cy="1119835"/>
+            </a:xfrm>
+            <a:prstGeom prst="rect">
+              <a:avLst/>
+            </a:prstGeom>
+            <a:noFill/>
+            <a:extLst>
+              <a:ext uri="{909E8E84-426E-40dd-AFC4-6F175D3DCCD1}">
+                <a14:hiddenFill xmlns="" xmlns:a14="http://schemas.microsoft.com/office/drawing/2010/main">
+                  <a:solidFill>
+                    <a:srgbClr val="FFFFFF"/>
+                  </a:solidFill>
+                </a14:hiddenFill>
+              </a:ext>
+            </a:extLst>
+          </p:spPr>
+        </p:pic>
+        <p:pic>
+          <p:nvPicPr>
+            <p:cNvPr id="16" name="Picture 6" descr="http://images.clipartpanda.com/server-clipart-1313181674_Clipart_Free.png"/>
+            <p:cNvPicPr>
+              <a:picLocks noChangeAspect="1" noChangeArrowheads="1"/>
+            </p:cNvPicPr>
+            <p:nvPr/>
+          </p:nvPicPr>
+          <p:blipFill>
+            <a:blip r:embed="rId4">
+              <a:extLst>
+                <a:ext uri="{28A0092B-C50C-407E-A947-70E740481C1C}">
+                  <a14:useLocalDpi xmlns:a14="http://schemas.microsoft.com/office/drawing/2010/main" val="0"/>
+                </a:ext>
+              </a:extLst>
+            </a:blip>
+            <a:srcRect/>
+            <a:stretch>
+              <a:fillRect/>
+            </a:stretch>
+          </p:blipFill>
+          <p:spPr bwMode="auto">
+            <a:xfrm>
+              <a:off x="9594320" y="4681370"/>
+              <a:ext cx="720427" cy="1119835"/>
+            </a:xfrm>
+            <a:prstGeom prst="rect">
+              <a:avLst/>
+            </a:prstGeom>
+            <a:noFill/>
+            <a:extLst>
+              <a:ext uri="{909E8E84-426E-40dd-AFC4-6F175D3DCCD1}">
+                <a14:hiddenFill xmlns="" xmlns:a14="http://schemas.microsoft.com/office/drawing/2010/main">
+                  <a:solidFill>
+                    <a:srgbClr val="FFFFFF"/>
+                  </a:solidFill>
+                </a14:hiddenFill>
+              </a:ext>
+            </a:extLst>
+          </p:spPr>
+        </p:pic>
+      </p:grpSp>
+      <p:grpSp>
+        <p:nvGrpSpPr>
+          <p:cNvPr id="17" name="Group 16"/>
+          <p:cNvGrpSpPr/>
+          <p:nvPr/>
+        </p:nvGrpSpPr>
+        <p:grpSpPr>
+          <a:xfrm>
+            <a:off x="13743295" y="3874332"/>
+            <a:ext cx="937906" cy="1474239"/>
+            <a:chOff x="9289520" y="4376570"/>
+            <a:chExt cx="1025227" cy="1424635"/>
+          </a:xfrm>
+        </p:grpSpPr>
+        <p:pic>
+          <p:nvPicPr>
+            <p:cNvPr id="18" name="Picture 6" descr="http://images.clipartpanda.com/server-clipart-1313181674_Clipart_Free.png"/>
+            <p:cNvPicPr>
+              <a:picLocks noChangeAspect="1" noChangeArrowheads="1"/>
+            </p:cNvPicPr>
+            <p:nvPr/>
+          </p:nvPicPr>
+          <p:blipFill>
+            <a:blip r:embed="rId4">
+              <a:extLst>
+                <a:ext uri="{28A0092B-C50C-407E-A947-70E740481C1C}">
+                  <a14:useLocalDpi xmlns:a14="http://schemas.microsoft.com/office/drawing/2010/main" val="0"/>
+                </a:ext>
+              </a:extLst>
+            </a:blip>
+            <a:srcRect/>
+            <a:stretch>
+              <a:fillRect/>
+            </a:stretch>
+          </p:blipFill>
+          <p:spPr bwMode="auto">
+            <a:xfrm>
+              <a:off x="9289520" y="4376570"/>
+              <a:ext cx="720427" cy="1119835"/>
+            </a:xfrm>
+            <a:prstGeom prst="rect">
+              <a:avLst/>
+            </a:prstGeom>
+            <a:noFill/>
+            <a:extLst>
+              <a:ext uri="{909E8E84-426E-40dd-AFC4-6F175D3DCCD1}">
+                <a14:hiddenFill xmlns="" xmlns:a14="http://schemas.microsoft.com/office/drawing/2010/main">
+                  <a:solidFill>
+                    <a:srgbClr val="FFFFFF"/>
+                  </a:solidFill>
+                </a14:hiddenFill>
+              </a:ext>
+            </a:extLst>
+          </p:spPr>
+        </p:pic>
+        <p:pic>
+          <p:nvPicPr>
+            <p:cNvPr id="19" name="Picture 6" descr="http://images.clipartpanda.com/server-clipart-1313181674_Clipart_Free.png"/>
+            <p:cNvPicPr>
+              <a:picLocks noChangeAspect="1" noChangeArrowheads="1"/>
+            </p:cNvPicPr>
+            <p:nvPr/>
+          </p:nvPicPr>
+          <p:blipFill>
+            <a:blip r:embed="rId4">
+              <a:extLst>
+                <a:ext uri="{28A0092B-C50C-407E-A947-70E740481C1C}">
+                  <a14:useLocalDpi xmlns:a14="http://schemas.microsoft.com/office/drawing/2010/main" val="0"/>
+                </a:ext>
+              </a:extLst>
+            </a:blip>
+            <a:srcRect/>
+            <a:stretch>
+              <a:fillRect/>
+            </a:stretch>
+          </p:blipFill>
+          <p:spPr bwMode="auto">
+            <a:xfrm>
+              <a:off x="9441920" y="4528970"/>
+              <a:ext cx="720427" cy="1119835"/>
+            </a:xfrm>
+            <a:prstGeom prst="rect">
+              <a:avLst/>
+            </a:prstGeom>
+            <a:noFill/>
+            <a:extLst>
+              <a:ext uri="{909E8E84-426E-40dd-AFC4-6F175D3DCCD1}">
+                <a14:hiddenFill xmlns="" xmlns:a14="http://schemas.microsoft.com/office/drawing/2010/main">
+                  <a:solidFill>
+                    <a:srgbClr val="FFFFFF"/>
+                  </a:solidFill>
+                </a14:hiddenFill>
+              </a:ext>
+            </a:extLst>
+          </p:spPr>
+        </p:pic>
+        <p:pic>
+          <p:nvPicPr>
+            <p:cNvPr id="20" name="Picture 6" descr="http://images.clipartpanda.com/server-clipart-1313181674_Clipart_Free.png"/>
+            <p:cNvPicPr>
+              <a:picLocks noChangeAspect="1" noChangeArrowheads="1"/>
+            </p:cNvPicPr>
+            <p:nvPr/>
+          </p:nvPicPr>
+          <p:blipFill>
+            <a:blip r:embed="rId4">
+              <a:extLst>
+                <a:ext uri="{28A0092B-C50C-407E-A947-70E740481C1C}">
+                  <a14:useLocalDpi xmlns:a14="http://schemas.microsoft.com/office/drawing/2010/main" val="0"/>
+                </a:ext>
+              </a:extLst>
+            </a:blip>
+            <a:srcRect/>
+            <a:stretch>
+              <a:fillRect/>
+            </a:stretch>
+          </p:blipFill>
+          <p:spPr bwMode="auto">
+            <a:xfrm>
+              <a:off x="9594320" y="4681370"/>
+              <a:ext cx="720427" cy="1119835"/>
+            </a:xfrm>
+            <a:prstGeom prst="rect">
+              <a:avLst/>
+            </a:prstGeom>
+            <a:noFill/>
+            <a:extLst>
+              <a:ext uri="{909E8E84-426E-40dd-AFC4-6F175D3DCCD1}">
+                <a14:hiddenFill xmlns="" xmlns:a14="http://schemas.microsoft.com/office/drawing/2010/main">
+                  <a:solidFill>
+                    <a:srgbClr val="FFFFFF"/>
+                  </a:solidFill>
+                </a14:hiddenFill>
+              </a:ext>
+            </a:extLst>
+          </p:spPr>
+        </p:pic>
+      </p:grpSp>
+      <p:grpSp>
+        <p:nvGrpSpPr>
+          <p:cNvPr id="23" name="Group 22"/>
+          <p:cNvGrpSpPr/>
+          <p:nvPr/>
+        </p:nvGrpSpPr>
+        <p:grpSpPr>
+          <a:xfrm>
+            <a:off x="13068614" y="5165717"/>
+            <a:ext cx="937906" cy="1474239"/>
+            <a:chOff x="9289520" y="4376570"/>
+            <a:chExt cx="1025227" cy="1424635"/>
+          </a:xfrm>
+        </p:grpSpPr>
+        <p:pic>
+          <p:nvPicPr>
+            <p:cNvPr id="24" name="Picture 6" descr="http://images.clipartpanda.com/server-clipart-1313181674_Clipart_Free.png"/>
+            <p:cNvPicPr>
+              <a:picLocks noChangeAspect="1" noChangeArrowheads="1"/>
+            </p:cNvPicPr>
+            <p:nvPr/>
+          </p:nvPicPr>
+          <p:blipFill>
+            <a:blip r:embed="rId4">
+              <a:extLst>
+                <a:ext uri="{28A0092B-C50C-407E-A947-70E740481C1C}">
+                  <a14:useLocalDpi xmlns:a14="http://schemas.microsoft.com/office/drawing/2010/main" val="0"/>
+                </a:ext>
+              </a:extLst>
+            </a:blip>
+            <a:srcRect/>
+            <a:stretch>
+              <a:fillRect/>
+            </a:stretch>
+          </p:blipFill>
+          <p:spPr bwMode="auto">
+            <a:xfrm>
+              <a:off x="9289520" y="4376570"/>
+              <a:ext cx="720427" cy="1119835"/>
+            </a:xfrm>
+            <a:prstGeom prst="rect">
+              <a:avLst/>
+            </a:prstGeom>
+            <a:noFill/>
+            <a:extLst>
+              <a:ext uri="{909E8E84-426E-40dd-AFC4-6F175D3DCCD1}">
+                <a14:hiddenFill xmlns="" xmlns:a14="http://schemas.microsoft.com/office/drawing/2010/main">
+                  <a:solidFill>
+                    <a:srgbClr val="FFFFFF"/>
+                  </a:solidFill>
+                </a14:hiddenFill>
+              </a:ext>
+            </a:extLst>
+          </p:spPr>
+        </p:pic>
+        <p:pic>
+          <p:nvPicPr>
+            <p:cNvPr id="25" name="Picture 6" descr="http://images.clipartpanda.com/server-clipart-1313181674_Clipart_Free.png"/>
+            <p:cNvPicPr>
+              <a:picLocks noChangeAspect="1" noChangeArrowheads="1"/>
+            </p:cNvPicPr>
+            <p:nvPr/>
+          </p:nvPicPr>
+          <p:blipFill>
+            <a:blip r:embed="rId4">
+              <a:extLst>
+                <a:ext uri="{28A0092B-C50C-407E-A947-70E740481C1C}">
+                  <a14:useLocalDpi xmlns:a14="http://schemas.microsoft.com/office/drawing/2010/main" val="0"/>
+                </a:ext>
+              </a:extLst>
+            </a:blip>
+            <a:srcRect/>
+            <a:stretch>
+              <a:fillRect/>
+            </a:stretch>
+          </p:blipFill>
+          <p:spPr bwMode="auto">
+            <a:xfrm>
+              <a:off x="9441920" y="4528970"/>
+              <a:ext cx="720427" cy="1119835"/>
+            </a:xfrm>
+            <a:prstGeom prst="rect">
+              <a:avLst/>
+            </a:prstGeom>
+            <a:noFill/>
+            <a:extLst>
+              <a:ext uri="{909E8E84-426E-40dd-AFC4-6F175D3DCCD1}">
+                <a14:hiddenFill xmlns="" xmlns:a14="http://schemas.microsoft.com/office/drawing/2010/main">
+                  <a:solidFill>
+                    <a:srgbClr val="FFFFFF"/>
+                  </a:solidFill>
+                </a14:hiddenFill>
+              </a:ext>
+            </a:extLst>
+          </p:spPr>
+        </p:pic>
+        <p:pic>
+          <p:nvPicPr>
+            <p:cNvPr id="26" name="Picture 6" descr="http://images.clipartpanda.com/server-clipart-1313181674_Clipart_Free.png"/>
+            <p:cNvPicPr>
+              <a:picLocks noChangeAspect="1" noChangeArrowheads="1"/>
+            </p:cNvPicPr>
+            <p:nvPr/>
+          </p:nvPicPr>
+          <p:blipFill>
+            <a:blip r:embed="rId4">
+              <a:extLst>
+                <a:ext uri="{28A0092B-C50C-407E-A947-70E740481C1C}">
+                  <a14:useLocalDpi xmlns:a14="http://schemas.microsoft.com/office/drawing/2010/main" val="0"/>
+                </a:ext>
+              </a:extLst>
+            </a:blip>
+            <a:srcRect/>
+            <a:stretch>
+              <a:fillRect/>
+            </a:stretch>
+          </p:blipFill>
+          <p:spPr bwMode="auto">
+            <a:xfrm>
+              <a:off x="9594320" y="4681370"/>
+              <a:ext cx="720427" cy="1119835"/>
+            </a:xfrm>
+            <a:prstGeom prst="rect">
+              <a:avLst/>
+            </a:prstGeom>
+            <a:noFill/>
+            <a:extLst>
+              <a:ext uri="{909E8E84-426E-40dd-AFC4-6F175D3DCCD1}">
+                <a14:hiddenFill xmlns="" xmlns:a14="http://schemas.microsoft.com/office/drawing/2010/main">
+                  <a:solidFill>
+                    <a:srgbClr val="FFFFFF"/>
+                  </a:solidFill>
+                </a14:hiddenFill>
+              </a:ext>
+            </a:extLst>
+          </p:spPr>
+        </p:pic>
+      </p:grpSp>
+      <p:cxnSp>
+        <p:nvCxnSpPr>
+          <p:cNvPr id="27" name="Straight Arrow Connector 26"/>
+          <p:cNvCxnSpPr/>
+          <p:nvPr/>
+        </p:nvCxnSpPr>
+        <p:spPr>
+          <a:xfrm flipV="1">
+            <a:off x="9516438" y="4477749"/>
+            <a:ext cx="3333237" cy="551149"/>
+          </a:xfrm>
+          <a:prstGeom prst="straightConnector1">
+            <a:avLst/>
+          </a:prstGeom>
+          <a:ln>
+            <a:solidFill>
+              <a:schemeClr val="accent1"/>
+            </a:solidFill>
+            <a:headEnd type="triangle"/>
+            <a:tailEnd type="triangle"/>
+          </a:ln>
+        </p:spPr>
+        <p:style>
+          <a:lnRef idx="3">
+            <a:schemeClr val="accent1"/>
+          </a:lnRef>
+          <a:fillRef idx="0">
+            <a:schemeClr val="accent1"/>
+          </a:fillRef>
+          <a:effectRef idx="2">
+            <a:schemeClr val="accent1"/>
+          </a:effectRef>
+          <a:fontRef idx="minor">
+            <a:schemeClr val="tx1"/>
+          </a:fontRef>
+        </p:style>
+      </p:cxnSp>
+      <p:cxnSp>
+        <p:nvCxnSpPr>
+          <p:cNvPr id="28" name="Straight Arrow Connector 27"/>
+          <p:cNvCxnSpPr/>
+          <p:nvPr/>
+        </p:nvCxnSpPr>
+        <p:spPr>
+          <a:xfrm flipV="1">
+            <a:off x="9607260" y="4891523"/>
+            <a:ext cx="3930307" cy="431900"/>
+          </a:xfrm>
+          <a:prstGeom prst="straightConnector1">
+            <a:avLst/>
+          </a:prstGeom>
+          <a:ln>
+            <a:solidFill>
+              <a:schemeClr val="accent1"/>
+            </a:solidFill>
+            <a:headEnd type="triangle"/>
+            <a:tailEnd type="triangle"/>
+          </a:ln>
+        </p:spPr>
+        <p:style>
+          <a:lnRef idx="3">
+            <a:schemeClr val="accent1"/>
+          </a:lnRef>
+          <a:fillRef idx="0">
+            <a:schemeClr val="accent1"/>
+          </a:fillRef>
+          <a:effectRef idx="2">
+            <a:schemeClr val="accent1"/>
+          </a:effectRef>
+          <a:fontRef idx="minor">
+            <a:schemeClr val="tx1"/>
+          </a:fontRef>
+        </p:style>
+      </p:cxnSp>
+      <p:cxnSp>
+        <p:nvCxnSpPr>
+          <p:cNvPr id="29" name="Straight Arrow Connector 28"/>
+          <p:cNvCxnSpPr/>
+          <p:nvPr/>
+        </p:nvCxnSpPr>
+        <p:spPr>
+          <a:xfrm>
+            <a:off x="9607260" y="5536489"/>
+            <a:ext cx="3447707" cy="156485"/>
+          </a:xfrm>
+          <a:prstGeom prst="straightConnector1">
+            <a:avLst/>
+          </a:prstGeom>
+          <a:ln>
+            <a:solidFill>
+              <a:schemeClr val="accent1"/>
+            </a:solidFill>
+            <a:headEnd type="triangle"/>
+            <a:tailEnd type="triangle"/>
+          </a:ln>
+        </p:spPr>
+        <p:style>
+          <a:lnRef idx="3">
+            <a:schemeClr val="accent1"/>
+          </a:lnRef>
+          <a:fillRef idx="0">
+            <a:schemeClr val="accent1"/>
+          </a:fillRef>
+          <a:effectRef idx="2">
+            <a:schemeClr val="accent1"/>
+          </a:effectRef>
+          <a:fontRef idx="minor">
+            <a:schemeClr val="tx1"/>
+          </a:fontRef>
+        </p:style>
+      </p:cxnSp>
+      <p:sp>
+        <p:nvSpPr>
+          <p:cNvPr id="31" name="Cloud 30"/>
+          <p:cNvSpPr/>
+          <p:nvPr/>
+        </p:nvSpPr>
+        <p:spPr bwMode="auto">
+          <a:xfrm>
+            <a:off x="7033241" y="4615742"/>
+            <a:ext cx="2343778" cy="1708801"/>
+          </a:xfrm>
+          <a:prstGeom prst="cloud">
+            <a:avLst/>
+          </a:prstGeom>
+          <a:solidFill>
+            <a:schemeClr val="bg1"/>
+          </a:solidFill>
+          <a:ln>
+            <a:solidFill>
+              <a:schemeClr val="accent1"/>
+            </a:solidFill>
+            <a:headEnd type="none" w="med" len="med"/>
+            <a:tailEnd type="none" w="med" len="med"/>
+          </a:ln>
+          <a:effectLst/>
+        </p:spPr>
+        <p:style>
+          <a:lnRef idx="1">
+            <a:schemeClr val="accent4"/>
+          </a:lnRef>
+          <a:fillRef idx="3">
+            <a:schemeClr val="accent4"/>
+          </a:fillRef>
+          <a:effectRef idx="2">
+            <a:schemeClr val="accent4"/>
+          </a:effectRef>
+          <a:fontRef idx="minor">
+            <a:schemeClr val="lt1"/>
+          </a:fontRef>
+        </p:style>
+        <p:txBody>
+          <a:bodyPr vert="horz" wrap="square" lIns="91436" tIns="45718" rIns="91436" bIns="45718" numCol="1" rtlCol="0" anchor="ctr" anchorCtr="0" compatLnSpc="1">
+            <a:prstTxWarp prst="textNoShape">
+              <a:avLst/>
+            </a:prstTxWarp>
+          </a:bodyPr>
           <a:lstStyle/>
           <a:p>
-            <a:r>
-              <a:rPr lang="en-US" dirty="0"/>
-              <a:t>The Chef Compliance server is a centralized location from which all aspects of the state or your infrastructure’s compliance can be managed</a:t>
-            </a:r>
-            <a:r>
-              <a:rPr lang="en-US" dirty="0" smtClean="0"/>
-              <a:t>.</a:t>
-            </a:r>
-          </a:p>
-          <a:p>
-            <a:endParaRPr lang="en-US" dirty="0"/>
-          </a:p>
-          <a:p>
-            <a:r>
-              <a:rPr lang="en-US" dirty="0" smtClean="0"/>
-              <a:t>With Chef Compliance you can test </a:t>
-            </a:r>
-            <a:r>
-              <a:rPr lang="en-US" dirty="0"/>
-              <a:t>any node in your infrastructure, including all of the common UNIX and Linux platforms and most versions of Microsoft </a:t>
-            </a:r>
-            <a:r>
-              <a:rPr lang="en-US" dirty="0" smtClean="0"/>
-              <a:t>Windows.</a:t>
-            </a:r>
-            <a:endParaRPr lang="en-US" dirty="0"/>
-          </a:p>
-          <a:p>
-            <a:endParaRPr lang="en-US" dirty="0"/>
-          </a:p>
-          <a:p>
-            <a:r>
-              <a:rPr lang="en-US" dirty="0" smtClean="0"/>
-              <a:t>Chef Compliance can continuously </a:t>
-            </a:r>
-            <a:r>
-              <a:rPr lang="en-US" dirty="0"/>
-              <a:t>test any node against the goals of your organization’s security management </a:t>
-            </a:r>
-            <a:r>
-              <a:rPr lang="en-US" dirty="0" smtClean="0"/>
-              <a:t>lifecycle for risks and compliance issues.</a:t>
-            </a:r>
-            <a:endParaRPr lang="en-US" dirty="0"/>
-          </a:p>
-          <a:p>
-            <a:endParaRPr lang="en-US" dirty="0"/>
+            <a:pPr algn="r" defTabSz="914099"/>
+            <a:r>
+              <a:rPr lang="en-US" sz="2000" dirty="0" smtClean="0">
+                <a:solidFill>
+                  <a:schemeClr val="tx1"/>
+                </a:solidFill>
+              </a:rPr>
+              <a:t>LAN/WAN</a:t>
+            </a:r>
+            <a:endParaRPr lang="en-US" sz="2000" dirty="0" smtClean="0">
+              <a:solidFill>
+                <a:schemeClr val="tx1"/>
+              </a:solidFill>
+            </a:endParaRPr>
           </a:p>
         </p:txBody>
       </p:sp>
+      <p:grpSp>
+        <p:nvGrpSpPr>
+          <p:cNvPr id="38" name="Group 37"/>
+          <p:cNvGrpSpPr/>
+          <p:nvPr/>
+        </p:nvGrpSpPr>
+        <p:grpSpPr>
+          <a:xfrm>
+            <a:off x="13798526" y="5703125"/>
+            <a:ext cx="937906" cy="1474239"/>
+            <a:chOff x="9289520" y="4376570"/>
+            <a:chExt cx="1025227" cy="1424635"/>
+          </a:xfrm>
+        </p:grpSpPr>
+        <p:pic>
+          <p:nvPicPr>
+            <p:cNvPr id="39" name="Picture 6" descr="http://images.clipartpanda.com/server-clipart-1313181674_Clipart_Free.png"/>
+            <p:cNvPicPr>
+              <a:picLocks noChangeAspect="1" noChangeArrowheads="1"/>
+            </p:cNvPicPr>
+            <p:nvPr/>
+          </p:nvPicPr>
+          <p:blipFill>
+            <a:blip r:embed="rId4">
+              <a:extLst>
+                <a:ext uri="{28A0092B-C50C-407E-A947-70E740481C1C}">
+                  <a14:useLocalDpi xmlns:a14="http://schemas.microsoft.com/office/drawing/2010/main" val="0"/>
+                </a:ext>
+              </a:extLst>
+            </a:blip>
+            <a:srcRect/>
+            <a:stretch>
+              <a:fillRect/>
+            </a:stretch>
+          </p:blipFill>
+          <p:spPr bwMode="auto">
+            <a:xfrm>
+              <a:off x="9289520" y="4376570"/>
+              <a:ext cx="720427" cy="1119835"/>
+            </a:xfrm>
+            <a:prstGeom prst="rect">
+              <a:avLst/>
+            </a:prstGeom>
+            <a:noFill/>
+            <a:extLst>
+              <a:ext uri="{909E8E84-426E-40dd-AFC4-6F175D3DCCD1}">
+                <a14:hiddenFill xmlns="" xmlns:a14="http://schemas.microsoft.com/office/drawing/2010/main">
+                  <a:solidFill>
+                    <a:srgbClr val="FFFFFF"/>
+                  </a:solidFill>
+                </a14:hiddenFill>
+              </a:ext>
+            </a:extLst>
+          </p:spPr>
+        </p:pic>
+        <p:pic>
+          <p:nvPicPr>
+            <p:cNvPr id="40" name="Picture 6" descr="http://images.clipartpanda.com/server-clipart-1313181674_Clipart_Free.png"/>
+            <p:cNvPicPr>
+              <a:picLocks noChangeAspect="1" noChangeArrowheads="1"/>
+            </p:cNvPicPr>
+            <p:nvPr/>
+          </p:nvPicPr>
+          <p:blipFill>
+            <a:blip r:embed="rId4">
+              <a:extLst>
+                <a:ext uri="{28A0092B-C50C-407E-A947-70E740481C1C}">
+                  <a14:useLocalDpi xmlns:a14="http://schemas.microsoft.com/office/drawing/2010/main" val="0"/>
+                </a:ext>
+              </a:extLst>
+            </a:blip>
+            <a:srcRect/>
+            <a:stretch>
+              <a:fillRect/>
+            </a:stretch>
+          </p:blipFill>
+          <p:spPr bwMode="auto">
+            <a:xfrm>
+              <a:off x="9441920" y="4528970"/>
+              <a:ext cx="720427" cy="1119835"/>
+            </a:xfrm>
+            <a:prstGeom prst="rect">
+              <a:avLst/>
+            </a:prstGeom>
+            <a:noFill/>
+            <a:extLst>
+              <a:ext uri="{909E8E84-426E-40dd-AFC4-6F175D3DCCD1}">
+                <a14:hiddenFill xmlns="" xmlns:a14="http://schemas.microsoft.com/office/drawing/2010/main">
+                  <a:solidFill>
+                    <a:srgbClr val="FFFFFF"/>
+                  </a:solidFill>
+                </a14:hiddenFill>
+              </a:ext>
+            </a:extLst>
+          </p:spPr>
+        </p:pic>
+        <p:pic>
+          <p:nvPicPr>
+            <p:cNvPr id="41" name="Picture 6" descr="http://images.clipartpanda.com/server-clipart-1313181674_Clipart_Free.png"/>
+            <p:cNvPicPr>
+              <a:picLocks noChangeAspect="1" noChangeArrowheads="1"/>
+            </p:cNvPicPr>
+            <p:nvPr/>
+          </p:nvPicPr>
+          <p:blipFill>
+            <a:blip r:embed="rId4">
+              <a:extLst>
+                <a:ext uri="{28A0092B-C50C-407E-A947-70E740481C1C}">
+                  <a14:useLocalDpi xmlns:a14="http://schemas.microsoft.com/office/drawing/2010/main" val="0"/>
+                </a:ext>
+              </a:extLst>
+            </a:blip>
+            <a:srcRect/>
+            <a:stretch>
+              <a:fillRect/>
+            </a:stretch>
+          </p:blipFill>
+          <p:spPr bwMode="auto">
+            <a:xfrm>
+              <a:off x="9594320" y="4681370"/>
+              <a:ext cx="720427" cy="1119835"/>
+            </a:xfrm>
+            <a:prstGeom prst="rect">
+              <a:avLst/>
+            </a:prstGeom>
+            <a:noFill/>
+            <a:extLst>
+              <a:ext uri="{909E8E84-426E-40dd-AFC4-6F175D3DCCD1}">
+                <a14:hiddenFill xmlns="" xmlns:a14="http://schemas.microsoft.com/office/drawing/2010/main">
+                  <a:solidFill>
+                    <a:srgbClr val="FFFFFF"/>
+                  </a:solidFill>
+                </a14:hiddenFill>
+              </a:ext>
+            </a:extLst>
+          </p:spPr>
+        </p:pic>
+      </p:grpSp>
+      <p:grpSp>
+        <p:nvGrpSpPr>
+          <p:cNvPr id="42" name="Group 41"/>
+          <p:cNvGrpSpPr/>
+          <p:nvPr/>
+        </p:nvGrpSpPr>
+        <p:grpSpPr>
+          <a:xfrm>
+            <a:off x="14648756" y="4796752"/>
+            <a:ext cx="937906" cy="1474239"/>
+            <a:chOff x="9289520" y="4376570"/>
+            <a:chExt cx="1025227" cy="1424635"/>
+          </a:xfrm>
+        </p:grpSpPr>
+        <p:pic>
+          <p:nvPicPr>
+            <p:cNvPr id="43" name="Picture 6" descr="http://images.clipartpanda.com/server-clipart-1313181674_Clipart_Free.png"/>
+            <p:cNvPicPr>
+              <a:picLocks noChangeAspect="1" noChangeArrowheads="1"/>
+            </p:cNvPicPr>
+            <p:nvPr/>
+          </p:nvPicPr>
+          <p:blipFill>
+            <a:blip r:embed="rId4">
+              <a:extLst>
+                <a:ext uri="{28A0092B-C50C-407E-A947-70E740481C1C}">
+                  <a14:useLocalDpi xmlns:a14="http://schemas.microsoft.com/office/drawing/2010/main" val="0"/>
+                </a:ext>
+              </a:extLst>
+            </a:blip>
+            <a:srcRect/>
+            <a:stretch>
+              <a:fillRect/>
+            </a:stretch>
+          </p:blipFill>
+          <p:spPr bwMode="auto">
+            <a:xfrm>
+              <a:off x="9289520" y="4376570"/>
+              <a:ext cx="720427" cy="1119835"/>
+            </a:xfrm>
+            <a:prstGeom prst="rect">
+              <a:avLst/>
+            </a:prstGeom>
+            <a:noFill/>
+            <a:extLst>
+              <a:ext uri="{909E8E84-426E-40dd-AFC4-6F175D3DCCD1}">
+                <a14:hiddenFill xmlns="" xmlns:a14="http://schemas.microsoft.com/office/drawing/2010/main">
+                  <a:solidFill>
+                    <a:srgbClr val="FFFFFF"/>
+                  </a:solidFill>
+                </a14:hiddenFill>
+              </a:ext>
+            </a:extLst>
+          </p:spPr>
+        </p:pic>
+        <p:pic>
+          <p:nvPicPr>
+            <p:cNvPr id="44" name="Picture 6" descr="http://images.clipartpanda.com/server-clipart-1313181674_Clipart_Free.png"/>
+            <p:cNvPicPr>
+              <a:picLocks noChangeAspect="1" noChangeArrowheads="1"/>
+            </p:cNvPicPr>
+            <p:nvPr/>
+          </p:nvPicPr>
+          <p:blipFill>
+            <a:blip r:embed="rId4">
+              <a:extLst>
+                <a:ext uri="{28A0092B-C50C-407E-A947-70E740481C1C}">
+                  <a14:useLocalDpi xmlns:a14="http://schemas.microsoft.com/office/drawing/2010/main" val="0"/>
+                </a:ext>
+              </a:extLst>
+            </a:blip>
+            <a:srcRect/>
+            <a:stretch>
+              <a:fillRect/>
+            </a:stretch>
+          </p:blipFill>
+          <p:spPr bwMode="auto">
+            <a:xfrm>
+              <a:off x="9441920" y="4528970"/>
+              <a:ext cx="720427" cy="1119835"/>
+            </a:xfrm>
+            <a:prstGeom prst="rect">
+              <a:avLst/>
+            </a:prstGeom>
+            <a:noFill/>
+            <a:extLst>
+              <a:ext uri="{909E8E84-426E-40dd-AFC4-6F175D3DCCD1}">
+                <a14:hiddenFill xmlns="" xmlns:a14="http://schemas.microsoft.com/office/drawing/2010/main">
+                  <a:solidFill>
+                    <a:srgbClr val="FFFFFF"/>
+                  </a:solidFill>
+                </a14:hiddenFill>
+              </a:ext>
+            </a:extLst>
+          </p:spPr>
+        </p:pic>
+        <p:pic>
+          <p:nvPicPr>
+            <p:cNvPr id="45" name="Picture 6" descr="http://images.clipartpanda.com/server-clipart-1313181674_Clipart_Free.png"/>
+            <p:cNvPicPr>
+              <a:picLocks noChangeAspect="1" noChangeArrowheads="1"/>
+            </p:cNvPicPr>
+            <p:nvPr/>
+          </p:nvPicPr>
+          <p:blipFill>
+            <a:blip r:embed="rId4">
+              <a:extLst>
+                <a:ext uri="{28A0092B-C50C-407E-A947-70E740481C1C}">
+                  <a14:useLocalDpi xmlns:a14="http://schemas.microsoft.com/office/drawing/2010/main" val="0"/>
+                </a:ext>
+              </a:extLst>
+            </a:blip>
+            <a:srcRect/>
+            <a:stretch>
+              <a:fillRect/>
+            </a:stretch>
+          </p:blipFill>
+          <p:spPr bwMode="auto">
+            <a:xfrm>
+              <a:off x="9594320" y="4681370"/>
+              <a:ext cx="720427" cy="1119835"/>
+            </a:xfrm>
+            <a:prstGeom prst="rect">
+              <a:avLst/>
+            </a:prstGeom>
+            <a:noFill/>
+            <a:extLst>
+              <a:ext uri="{909E8E84-426E-40dd-AFC4-6F175D3DCCD1}">
+                <a14:hiddenFill xmlns="" xmlns:a14="http://schemas.microsoft.com/office/drawing/2010/main">
+                  <a:solidFill>
+                    <a:srgbClr val="FFFFFF"/>
+                  </a:solidFill>
+                </a14:hiddenFill>
+              </a:ext>
+            </a:extLst>
+          </p:spPr>
+        </p:pic>
+      </p:grpSp>
     </p:spTree>
     <p:extLst>
       <p:ext uri="{BB962C8B-B14F-4D97-AF65-F5344CB8AC3E}">
@@ -15852,7 +17509,7 @@
           <a:p>
             <a:r>
               <a:rPr lang="en-US" dirty="0" smtClean="0"/>
-              <a:t>Chef Compliance is built over </a:t>
+              <a:t>Chef Compliance leverages </a:t>
             </a:r>
             <a:r>
               <a:rPr lang="en-US" dirty="0" err="1" smtClean="0"/>
@@ -15864,16 +17521,36 @@
             </a:r>
           </a:p>
           <a:p>
-            <a:endParaRPr lang="en-US" dirty="0"/>
-          </a:p>
-          <a:p>
-            <a:r>
-              <a:rPr lang="en-US" dirty="0" err="1"/>
+            <a:r>
+              <a:rPr lang="en-US" dirty="0" err="1" smtClean="0"/>
+              <a:t>InsSpec</a:t>
+            </a:r>
+            <a:r>
+              <a:rPr lang="en-US" dirty="0" smtClean="0"/>
+              <a:t> is similar to </a:t>
+            </a:r>
+            <a:r>
+              <a:rPr lang="en-US" dirty="0" err="1" smtClean="0"/>
+              <a:t>ServerSpec</a:t>
+            </a:r>
+            <a:r>
+              <a:rPr lang="en-US" dirty="0"/>
+              <a:t>.</a:t>
+            </a:r>
+            <a:endParaRPr lang="en-US" dirty="0" smtClean="0"/>
+          </a:p>
+          <a:p>
+            <a:r>
+              <a:rPr lang="en-US" dirty="0" err="1" smtClean="0"/>
               <a:t>InSpec</a:t>
             </a:r>
             <a:r>
+              <a:rPr lang="en-US" dirty="0" smtClean="0"/>
+              <a:t> </a:t>
+            </a:r>
+            <a:r>
               <a:rPr lang="en-US" dirty="0"/>
-              <a:t> is an open-source run-time framework and rule language used to specify compliance, security, and policy requirements for testing any node in your infrastructure.</a:t>
+              <a:t>is an open-source run-time framework and rule language used to specify compliance, security, and policy requirements for testing any node in your infrastructure.</a:t>
             </a:r>
             <a:endParaRPr lang="en-US" dirty="0" smtClean="0"/>
           </a:p>
@@ -16042,11 +17719,7 @@
             </a:r>
             <a:r>
               <a:rPr lang="en-US" dirty="0" smtClean="0"/>
-              <a:t>log and in Chef Compliance, displayed in a GUI</a:t>
-            </a:r>
-            <a:r>
-              <a:rPr lang="en-US" dirty="0" smtClean="0"/>
-              <a:t>.</a:t>
+              <a:t>log and in Chef Compliance, displayed in a GUI.</a:t>
             </a:r>
             <a:endParaRPr lang="en-US" dirty="0"/>
           </a:p>
@@ -16065,7 +17738,7 @@
         <p:spPr>
           <a:xfrm>
             <a:off x="609599" y="304800"/>
-            <a:ext cx="13178589" cy="1551398"/>
+            <a:ext cx="13178589" cy="2312894"/>
           </a:xfrm>
         </p:spPr>
         <p:txBody>
@@ -17440,6 +19113,18 @@
 </file>
 
 <file path=customXml/item1.xml><?xml version="1.0" encoding="utf-8"?>
+<p:properties xmlns:p="http://schemas.microsoft.com/office/2006/metadata/properties" xmlns:xsi="http://www.w3.org/2001/XMLSchema-instance" xmlns:pc="http://schemas.microsoft.com/office/infopath/2007/PartnerControls">
+  <documentManagement>
+    <_dlc_DocId xmlns="7bb5d761-a2ea-4873-95f7-7a6658fb3ef0">M4CWTKMW727E-592-73</_dlc_DocId>
+    <_dlc_DocIdUrl xmlns="7bb5d761-a2ea-4873-95f7-7a6658fb3ef0">
+      <Url>https://kms.vci.local/marketing/team/_layouts/DocIdRedir.aspx?ID=M4CWTKMW727E-592-73</Url>
+      <Description>M4CWTKMW727E-592-73</Description>
+    </_dlc_DocIdUrl>
+  </documentManagement>
+</p:properties>
+</file>
+
+<file path=customXml/item2.xml><?xml version="1.0" encoding="utf-8"?>
 <ct:contentTypeSchema xmlns:ct="http://schemas.microsoft.com/office/2006/metadata/contentType" xmlns:ma="http://schemas.microsoft.com/office/2006/metadata/properties/metaAttributes" ct:_="" ma:_="" ma:contentTypeName="Document" ma:contentTypeID="0x0101000812F700BE7F874999720E88173FE491" ma:contentTypeVersion="0" ma:contentTypeDescription="Create a new document." ma:contentTypeScope="" ma:versionID="3f79f408e2ca720b7aba6e0e32464d0c">
   <xsd:schema xmlns:xsd="http://www.w3.org/2001/XMLSchema" xmlns:xs="http://www.w3.org/2001/XMLSchema" xmlns:p="http://schemas.microsoft.com/office/2006/metadata/properties" xmlns:ns2="7bb5d761-a2ea-4873-95f7-7a6658fb3ef0" targetNamespace="http://schemas.microsoft.com/office/2006/metadata/properties" ma:root="true" ma:fieldsID="1e062cd38ba31e406bfc4340fbc7f87a" ns2:_="">
     <xsd:import namespace="7bb5d761-a2ea-4873-95f7-7a6658fb3ef0"/>
@@ -17584,28 +19269,7 @@
 </ct:contentTypeSchema>
 </file>
 
-<file path=customXml/item2.xml><?xml version="1.0" encoding="utf-8"?>
-<p:properties xmlns:p="http://schemas.microsoft.com/office/2006/metadata/properties" xmlns:xsi="http://www.w3.org/2001/XMLSchema-instance" xmlns:pc="http://schemas.microsoft.com/office/infopath/2007/PartnerControls">
-  <documentManagement>
-    <_dlc_DocId xmlns="7bb5d761-a2ea-4873-95f7-7a6658fb3ef0">M4CWTKMW727E-592-73</_dlc_DocId>
-    <_dlc_DocIdUrl xmlns="7bb5d761-a2ea-4873-95f7-7a6658fb3ef0">
-      <Url>https://kms.vci.local/marketing/team/_layouts/DocIdRedir.aspx?ID=M4CWTKMW727E-592-73</Url>
-      <Description>M4CWTKMW727E-592-73</Description>
-    </_dlc_DocIdUrl>
-  </documentManagement>
-</p:properties>
-</file>
-
 <file path=customXml/item3.xml><?xml version="1.0" encoding="utf-8"?>
-<?mso-contentType ?>
-<FormTemplates xmlns="http://schemas.microsoft.com/sharepoint/v3/contenttype/forms">
-  <Display>DocumentLibraryForm</Display>
-  <Edit>DocumentLibraryForm</Edit>
-  <New>DocumentLibraryForm</New>
-</FormTemplates>
-</file>
-
-<file path=customXml/item4.xml><?xml version="1.0" encoding="utf-8"?>
 <?mso-contentType ?>
 <spe:Receivers xmlns:spe="http://schemas.microsoft.com/sharepoint/events">
   <Receiver>
@@ -17651,7 +19315,32 @@
 </spe:Receivers>
 </file>
 
+<file path=customXml/item4.xml><?xml version="1.0" encoding="utf-8"?>
+<?mso-contentType ?>
+<FormTemplates xmlns="http://schemas.microsoft.com/sharepoint/v3/contenttype/forms">
+  <Display>DocumentLibraryForm</Display>
+  <Edit>DocumentLibraryForm</Edit>
+  <New>DocumentLibraryForm</New>
+</FormTemplates>
+</file>
+
 <file path=customXml/itemProps1.xml><?xml version="1.0" encoding="utf-8"?>
+<ds:datastoreItem xmlns:ds="http://schemas.openxmlformats.org/officeDocument/2006/customXml" ds:itemID="{6921749B-AEB7-461B-845F-603CABD25259}">
+  <ds:schemaRefs>
+    <ds:schemaRef ds:uri="http://purl.org/dc/elements/1.1/"/>
+    <ds:schemaRef ds:uri="http://schemas.microsoft.com/office/2006/metadata/properties"/>
+    <ds:schemaRef ds:uri="7bb5d761-a2ea-4873-95f7-7a6658fb3ef0"/>
+    <ds:schemaRef ds:uri="http://purl.org/dc/terms/"/>
+    <ds:schemaRef ds:uri="http://schemas.openxmlformats.org/package/2006/metadata/core-properties"/>
+    <ds:schemaRef ds:uri="http://schemas.microsoft.com/office/2006/documentManagement/types"/>
+    <ds:schemaRef ds:uri="http://schemas.microsoft.com/office/infopath/2007/PartnerControls"/>
+    <ds:schemaRef ds:uri="http://www.w3.org/XML/1998/namespace"/>
+    <ds:schemaRef ds:uri="http://purl.org/dc/dcmitype/"/>
+  </ds:schemaRefs>
+</ds:datastoreItem>
+</file>
+
+<file path=customXml/itemProps2.xml><?xml version="1.0" encoding="utf-8"?>
 <ds:datastoreItem xmlns:ds="http://schemas.openxmlformats.org/officeDocument/2006/customXml" ds:itemID="{164479E5-0B02-49AC-B79E-EC1D6164DDD3}">
   <ds:schemaRefs>
     <ds:schemaRef ds:uri="http://schemas.microsoft.com/office/2006/metadata/contentType"/>
@@ -17669,34 +19358,18 @@
 </ds:datastoreItem>
 </file>
 
-<file path=customXml/itemProps2.xml><?xml version="1.0" encoding="utf-8"?>
-<ds:datastoreItem xmlns:ds="http://schemas.openxmlformats.org/officeDocument/2006/customXml" ds:itemID="{6921749B-AEB7-461B-845F-603CABD25259}">
+<file path=customXml/itemProps3.xml><?xml version="1.0" encoding="utf-8"?>
+<ds:datastoreItem xmlns:ds="http://schemas.openxmlformats.org/officeDocument/2006/customXml" ds:itemID="{B13EBC30-FE27-4C6A-B723-23FC2188F7DC}">
   <ds:schemaRefs>
-    <ds:schemaRef ds:uri="http://purl.org/dc/elements/1.1/"/>
-    <ds:schemaRef ds:uri="http://schemas.microsoft.com/office/2006/metadata/properties"/>
-    <ds:schemaRef ds:uri="7bb5d761-a2ea-4873-95f7-7a6658fb3ef0"/>
-    <ds:schemaRef ds:uri="http://purl.org/dc/terms/"/>
-    <ds:schemaRef ds:uri="http://schemas.openxmlformats.org/package/2006/metadata/core-properties"/>
-    <ds:schemaRef ds:uri="http://schemas.microsoft.com/office/2006/documentManagement/types"/>
-    <ds:schemaRef ds:uri="http://schemas.microsoft.com/office/infopath/2007/PartnerControls"/>
-    <ds:schemaRef ds:uri="http://www.w3.org/XML/1998/namespace"/>
-    <ds:schemaRef ds:uri="http://purl.org/dc/dcmitype/"/>
+    <ds:schemaRef ds:uri="http://schemas.microsoft.com/sharepoint/events"/>
   </ds:schemaRefs>
 </ds:datastoreItem>
 </file>
 
-<file path=customXml/itemProps3.xml><?xml version="1.0" encoding="utf-8"?>
+<file path=customXml/itemProps4.xml><?xml version="1.0" encoding="utf-8"?>
 <ds:datastoreItem xmlns:ds="http://schemas.openxmlformats.org/officeDocument/2006/customXml" ds:itemID="{5CDEB364-43EC-4510-9881-539C2A3FCE9E}">
   <ds:schemaRefs>
     <ds:schemaRef ds:uri="http://schemas.microsoft.com/sharepoint/v3/contenttype/forms"/>
   </ds:schemaRefs>
 </ds:datastoreItem>
-</file>
-
-<file path=customXml/itemProps4.xml><?xml version="1.0" encoding="utf-8"?>
-<ds:datastoreItem xmlns:ds="http://schemas.openxmlformats.org/officeDocument/2006/customXml" ds:itemID="{B13EBC30-FE27-4C6A-B723-23FC2188F7DC}">
-  <ds:schemaRefs>
-    <ds:schemaRef ds:uri="http://schemas.microsoft.com/sharepoint/events"/>
-  </ds:schemaRefs>
-</ds:datastoreItem>
 </file>
</xml_diff>

<commit_message>
Clairified lab architechture Reduced slide text and sent to speaker notes
</commit_message>
<xml_diff>
--- a/01-Intro.pptx
+++ b/01-Intro.pptx
@@ -6,10 +6,10 @@
     <p:sldMasterId id="2147483847" r:id="rId6"/>
   </p:sldMasterIdLst>
   <p:notesMasterIdLst>
-    <p:notesMasterId r:id="rId23"/>
+    <p:notesMasterId r:id="rId25"/>
   </p:notesMasterIdLst>
   <p:handoutMasterIdLst>
-    <p:handoutMasterId r:id="rId24"/>
+    <p:handoutMasterId r:id="rId26"/>
   </p:handoutMasterIdLst>
   <p:sldIdLst>
     <p:sldId id="256" r:id="rId7"/>
@@ -25,9 +25,11 @@
     <p:sldId id="286" r:id="rId17"/>
     <p:sldId id="285" r:id="rId18"/>
     <p:sldId id="293" r:id="rId19"/>
-    <p:sldId id="292" r:id="rId20"/>
-    <p:sldId id="288" r:id="rId21"/>
-    <p:sldId id="267" r:id="rId22"/>
+    <p:sldId id="300" r:id="rId20"/>
+    <p:sldId id="292" r:id="rId21"/>
+    <p:sldId id="301" r:id="rId22"/>
+    <p:sldId id="288" r:id="rId23"/>
+    <p:sldId id="267" r:id="rId24"/>
   </p:sldIdLst>
   <p:sldSz cx="16256000" cy="9144000"/>
   <p:notesSz cx="6858000" cy="9144000"/>
@@ -289,7 +291,7 @@
               <a:pPr>
                 <a:defRPr/>
               </a:pPr>
-              <a:t>2016-01-11</a:t>
+              <a:t>2016-01-14</a:t>
             </a:fld>
             <a:endParaRPr lang="en-US" dirty="0"/>
           </a:p>
@@ -472,7 +474,7 @@
               <a:pPr>
                 <a:defRPr/>
               </a:pPr>
-              <a:t>2016-01-11</a:t>
+              <a:t>2016-01-14</a:t>
             </a:fld>
             <a:endParaRPr lang="en-US" dirty="0"/>
           </a:p>
@@ -1986,7 +1988,11 @@
             </a:r>
             <a:r>
               <a:rPr lang="en-US" baseline="0" dirty="0" smtClean="0"/>
-              <a:t> that we use for Chef training. They have ChefDK installed on them but you will not be using any of the ChefDK tools on those nodes until near the end of this class when you will write one remediation recipe.</a:t>
+              <a:t> that we use for Chef training. They have ChefDK installed on </a:t>
+            </a:r>
+            <a:r>
+              <a:rPr lang="en-US" baseline="0" dirty="0" smtClean="0"/>
+              <a:t>them although Chef does not actually need to be installed on these instances in order to run scans.</a:t>
             </a:r>
           </a:p>
           <a:p>
@@ -2029,7 +2035,15 @@
             </a:pPr>
             <a:r>
               <a:rPr lang="en-US" baseline="0" dirty="0" smtClean="0"/>
-              <a:t>Instructor Note: Now would be a good time to distribute the hostnames of the two nodes you will assign to each student.</a:t>
+              <a:t>Instructor Note: Now would be a good time to distribute the hostnames of the </a:t>
+            </a:r>
+            <a:r>
+              <a:rPr lang="en-US" baseline="0" dirty="0" smtClean="0"/>
+              <a:t>three nodes </a:t>
+            </a:r>
+            <a:r>
+              <a:rPr lang="en-US" baseline="0" dirty="0" smtClean="0"/>
+              <a:t>you will assign to each student.</a:t>
             </a:r>
             <a:r>
               <a:rPr lang="en-US" baseline="0" dirty="0"/>
@@ -2037,7 +2051,23 @@
             </a:r>
             <a:r>
               <a:rPr lang="en-US" baseline="0" dirty="0" smtClean="0"/>
-              <a:t>You should ask the students to note which one they will use as their Compliance Server and which one they will use as the target node for scans.</a:t>
+              <a:t>You should ask the students to note which one they will use as their Compliance Server and which </a:t>
+            </a:r>
+            <a:r>
+              <a:rPr lang="en-US" baseline="0" dirty="0" smtClean="0"/>
+              <a:t>ones </a:t>
+            </a:r>
+            <a:r>
+              <a:rPr lang="en-US" baseline="0" dirty="0" smtClean="0"/>
+              <a:t>they will use as the target </a:t>
+            </a:r>
+            <a:r>
+              <a:rPr lang="en-US" baseline="0" dirty="0" smtClean="0"/>
+              <a:t>nodes </a:t>
+            </a:r>
+            <a:r>
+              <a:rPr lang="en-US" baseline="0" dirty="0" smtClean="0"/>
+              <a:t>for scans.</a:t>
             </a:r>
           </a:p>
           <a:p>
@@ -2106,7 +2136,43 @@
                 <a:ea typeface="ＭＳ Ｐゴシック" charset="0"/>
                 <a:cs typeface="+mn-cs"/>
               </a:rPr>
-              <a:t>ec2-54-164-54-218.compute-1.amazonaws.com = Target node.</a:t>
+              <a:t>ec2-54-164-54-218.compute-1.amazonaws.com = </a:t>
+            </a:r>
+            <a:r>
+              <a:rPr lang="en-US" sz="1200" kern="1200" dirty="0" smtClean="0">
+                <a:solidFill>
+                  <a:schemeClr val="tx1"/>
+                </a:solidFill>
+                <a:effectLst/>
+                <a:latin typeface="Arial" panose="020B0604020202020204" pitchFamily="34" charset="0"/>
+                <a:ea typeface="ＭＳ Ｐゴシック" charset="0"/>
+                <a:cs typeface="+mn-cs"/>
+              </a:rPr>
+              <a:t>Linux Target </a:t>
+            </a:r>
+            <a:r>
+              <a:rPr lang="en-US" sz="1200" kern="1200" dirty="0" smtClean="0">
+                <a:solidFill>
+                  <a:schemeClr val="tx1"/>
+                </a:solidFill>
+                <a:effectLst/>
+                <a:latin typeface="Arial" panose="020B0604020202020204" pitchFamily="34" charset="0"/>
+                <a:ea typeface="ＭＳ Ｐゴシック" charset="0"/>
+                <a:cs typeface="+mn-cs"/>
+              </a:rPr>
+              <a:t>node</a:t>
+            </a:r>
+            <a:r>
+              <a:rPr lang="en-US" sz="1200" kern="1200" dirty="0" smtClean="0">
+                <a:solidFill>
+                  <a:schemeClr val="tx1"/>
+                </a:solidFill>
+                <a:effectLst/>
+                <a:latin typeface="Arial" panose="020B0604020202020204" pitchFamily="34" charset="0"/>
+                <a:ea typeface="ＭＳ Ｐゴシック" charset="0"/>
+                <a:cs typeface="+mn-cs"/>
+              </a:rPr>
+              <a:t>.</a:t>
             </a:r>
           </a:p>
           <a:p>
@@ -2128,9 +2194,123 @@
               <a:defRPr/>
             </a:pPr>
             <a:r>
+              <a:rPr lang="en-US" sz="1200" kern="1200" dirty="0" smtClean="0">
+                <a:solidFill>
+                  <a:schemeClr val="tx1"/>
+                </a:solidFill>
+                <a:effectLst/>
+                <a:latin typeface="Arial" panose="020B0604020202020204" pitchFamily="34" charset="0"/>
+                <a:ea typeface="ＭＳ Ｐゴシック" charset="0"/>
+                <a:cs typeface="+mn-cs"/>
+              </a:rPr>
+              <a:t>ec2-54-164-54-210.compute-1.amazonaws.com = Windows Target node.</a:t>
+            </a:r>
+          </a:p>
+          <a:p>
+            <a:pPr marL="0" marR="0" lvl="2" indent="0" algn="l" defTabSz="914363" rtl="0" eaLnBrk="1" fontAlgn="auto" latinLnBrk="0" hangingPunct="1">
+              <a:lnSpc>
+                <a:spcPct val="90000"/>
+              </a:lnSpc>
+              <a:spcBef>
+                <a:spcPts val="0"/>
+              </a:spcBef>
+              <a:spcAft>
+                <a:spcPts val="333"/>
+              </a:spcAft>
+              <a:buClrTx/>
+              <a:buSzTx/>
+              <a:buFontTx/>
+              <a:buNone/>
+              <a:tabLst/>
+              <a:defRPr/>
+            </a:pPr>
+            <a:endParaRPr lang="en-US" sz="1200" kern="1200" dirty="0" smtClean="0">
+              <a:solidFill>
+                <a:schemeClr val="tx1"/>
+              </a:solidFill>
+              <a:effectLst/>
+              <a:latin typeface="Arial" panose="020B0604020202020204" pitchFamily="34" charset="0"/>
+              <a:ea typeface="ＭＳ Ｐゴシック" charset="0"/>
+              <a:cs typeface="+mn-cs"/>
+            </a:endParaRPr>
+          </a:p>
+          <a:p>
+            <a:pPr marL="0" marR="0" lvl="2" indent="0" algn="l" defTabSz="914363" rtl="0" eaLnBrk="1" fontAlgn="auto" latinLnBrk="0" hangingPunct="1">
+              <a:lnSpc>
+                <a:spcPct val="90000"/>
+              </a:lnSpc>
+              <a:spcBef>
+                <a:spcPts val="0"/>
+              </a:spcBef>
+              <a:spcAft>
+                <a:spcPts val="333"/>
+              </a:spcAft>
+              <a:buClrTx/>
+              <a:buSzTx/>
+              <a:buFontTx/>
+              <a:buNone/>
+              <a:tabLst/>
+              <a:defRPr/>
+            </a:pPr>
+            <a:r>
               <a:rPr lang="en-US" baseline="0" dirty="0" smtClean="0"/>
-              <a:t>The login credentials for them is chef/chef.</a:t>
-            </a:r>
+              <a:t>The login credentials for </a:t>
+            </a:r>
+            <a:r>
+              <a:rPr lang="en-US" baseline="0" dirty="0" smtClean="0"/>
+              <a:t>the Linux nodes </a:t>
+            </a:r>
+            <a:r>
+              <a:rPr lang="en-US" baseline="0" dirty="0" smtClean="0"/>
+              <a:t>is </a:t>
+            </a:r>
+            <a:r>
+              <a:rPr lang="en-US" baseline="0" dirty="0" smtClean="0"/>
+              <a:t>chef/TBD. </a:t>
+            </a:r>
+          </a:p>
+          <a:p>
+            <a:pPr marL="0" marR="0" lvl="2" indent="0" algn="l" defTabSz="914363" rtl="0" eaLnBrk="1" fontAlgn="auto" latinLnBrk="0" hangingPunct="1">
+              <a:lnSpc>
+                <a:spcPct val="90000"/>
+              </a:lnSpc>
+              <a:spcBef>
+                <a:spcPts val="0"/>
+              </a:spcBef>
+              <a:spcAft>
+                <a:spcPts val="333"/>
+              </a:spcAft>
+              <a:buClrTx/>
+              <a:buSzTx/>
+              <a:buFontTx/>
+              <a:buNone/>
+              <a:tabLst/>
+              <a:defRPr/>
+            </a:pPr>
+            <a:r>
+              <a:rPr lang="en-US" baseline="0" dirty="0" smtClean="0"/>
+              <a:t>The login credentials for the Windows nodes is Administrator/TBD. </a:t>
+            </a:r>
+          </a:p>
+          <a:p>
+            <a:pPr marL="0" marR="0" lvl="2" indent="0" algn="l" defTabSz="914363" rtl="0" eaLnBrk="1" fontAlgn="auto" latinLnBrk="0" hangingPunct="1">
+              <a:lnSpc>
+                <a:spcPct val="90000"/>
+              </a:lnSpc>
+              <a:spcBef>
+                <a:spcPts val="0"/>
+              </a:spcBef>
+              <a:spcAft>
+                <a:spcPts val="333"/>
+              </a:spcAft>
+              <a:buClrTx/>
+              <a:buSzTx/>
+              <a:buFontTx/>
+              <a:buNone/>
+              <a:tabLst/>
+              <a:defRPr/>
+            </a:pPr>
+            <a:endParaRPr lang="en-US" baseline="0" dirty="0" smtClean="0"/>
           </a:p>
           <a:p>
             <a:pPr marL="0" marR="0" lvl="2" indent="0" algn="l" defTabSz="914363" rtl="0" eaLnBrk="1" fontAlgn="auto" latinLnBrk="0" hangingPunct="1">
@@ -2259,45 +2439,15 @@
           <a:bodyPr/>
           <a:lstStyle/>
           <a:p>
-            <a:r>
-              <a:rPr lang="en-US" dirty="0" smtClean="0"/>
-              <a:t>You should use an ssh client like </a:t>
-            </a:r>
-            <a:r>
-              <a:rPr lang="en-US" dirty="0" err="1" smtClean="0"/>
-              <a:t>PuTTY</a:t>
-            </a:r>
-            <a:r>
-              <a:rPr lang="en-US" dirty="0" smtClean="0"/>
-              <a:t> or a local command prompt to connect to the remote workstation that we</a:t>
-            </a:r>
-            <a:r>
-              <a:rPr lang="en-US" baseline="0" dirty="0" smtClean="0"/>
-              <a:t> assign to you. </a:t>
-            </a:r>
-          </a:p>
-          <a:p>
-            <a:endParaRPr lang="en-US" baseline="0" dirty="0" smtClean="0"/>
-          </a:p>
-          <a:p>
-            <a:r>
-              <a:rPr lang="en-US" baseline="0" dirty="0" smtClean="0"/>
-              <a:t>Instead of the command shown in this slide, you could also use this command: </a:t>
-            </a:r>
-          </a:p>
-          <a:p>
-            <a:endParaRPr lang="en-US" baseline="0" dirty="0" smtClean="0"/>
-          </a:p>
-          <a:p>
-            <a:pPr marL="0" marR="0" indent="0" algn="l" defTabSz="1217613" rtl="0" eaLnBrk="1" fontAlgn="base" latinLnBrk="0" hangingPunct="1">
+            <a:pPr marL="0" marR="0" lvl="2" indent="0" algn="l" defTabSz="914363" rtl="0" eaLnBrk="1" fontAlgn="auto" latinLnBrk="0" hangingPunct="1">
               <a:lnSpc>
                 <a:spcPct val="90000"/>
               </a:lnSpc>
               <a:spcBef>
-                <a:spcPct val="30000"/>
+                <a:spcPts val="0"/>
               </a:spcBef>
               <a:spcAft>
-                <a:spcPts val="450"/>
+                <a:spcPts val="333"/>
               </a:spcAft>
               <a:buClrTx/>
               <a:buSzTx/>
@@ -2308,24 +2458,19 @@
             </a:pPr>
             <a:r>
               <a:rPr lang="en-US" baseline="0" dirty="0" smtClean="0"/>
-              <a:t>ssh </a:t>
-            </a:r>
-            <a:r>
-              <a:rPr lang="en-US" baseline="0" dirty="0" err="1" smtClean="0"/>
-              <a:t>chef@IPADDRESS</a:t>
-            </a:r>
-            <a:endParaRPr lang="en-US" baseline="0" dirty="0" smtClean="0"/>
-          </a:p>
-          <a:p>
-            <a:pPr marL="0" marR="0" indent="0" algn="l" defTabSz="1217613" rtl="0" eaLnBrk="1" fontAlgn="base" latinLnBrk="0" hangingPunct="1">
+              <a:t>The dotted lines indicate that those sessions will only be used to write and test remediation. In this scenario, your target nodes will act as virtual workstations.</a:t>
+            </a:r>
+          </a:p>
+          <a:p>
+            <a:pPr marL="0" marR="0" lvl="2" indent="0" algn="l" defTabSz="914363" rtl="0" eaLnBrk="1" fontAlgn="auto" latinLnBrk="0" hangingPunct="1">
               <a:lnSpc>
                 <a:spcPct val="90000"/>
               </a:lnSpc>
               <a:spcBef>
-                <a:spcPct val="30000"/>
+                <a:spcPts val="0"/>
               </a:spcBef>
               <a:spcAft>
-                <a:spcPts val="450"/>
+                <a:spcPts val="333"/>
               </a:spcAft>
               <a:buClrTx/>
               <a:buSzTx/>
@@ -2337,15 +2482,15 @@
             <a:endParaRPr lang="en-US" baseline="0" dirty="0" smtClean="0"/>
           </a:p>
           <a:p>
-            <a:pPr marL="0" marR="0" indent="0" algn="l" defTabSz="1217613" rtl="0" eaLnBrk="1" fontAlgn="base" latinLnBrk="0" hangingPunct="1">
+            <a:pPr marL="0" marR="0" lvl="2" indent="0" algn="l" defTabSz="914363" rtl="0" eaLnBrk="1" fontAlgn="auto" latinLnBrk="0" hangingPunct="1">
               <a:lnSpc>
                 <a:spcPct val="90000"/>
               </a:lnSpc>
               <a:spcBef>
-                <a:spcPct val="30000"/>
+                <a:spcPts val="0"/>
               </a:spcBef>
               <a:spcAft>
-                <a:spcPts val="450"/>
+                <a:spcPts val="333"/>
               </a:spcAft>
               <a:buClrTx/>
               <a:buSzTx/>
@@ -2356,30 +2501,16 @@
             </a:pPr>
             <a:r>
               <a:rPr lang="en-US" baseline="0" dirty="0" smtClean="0"/>
-              <a:t>For example: ssh chef@52.90.140.22</a:t>
-            </a:r>
-          </a:p>
-          <a:p>
+              <a:t>But all scans will only be run via the Compliance server as indicated in the previous slide.</a:t>
+            </a:r>
             <a:endParaRPr lang="en-US" baseline="0" dirty="0" smtClean="0"/>
-          </a:p>
-          <a:p>
-            <a:endParaRPr lang="en-US" baseline="0" dirty="0" smtClean="0"/>
-          </a:p>
-          <a:p>
-            <a:endParaRPr lang="en-US" baseline="0" dirty="0" smtClean="0"/>
-          </a:p>
-          <a:p>
-            <a:endParaRPr lang="en-US" baseline="0" dirty="0" smtClean="0"/>
-          </a:p>
-          <a:p>
-            <a:endParaRPr lang="en-US" dirty="0"/>
           </a:p>
         </p:txBody>
       </p:sp>
     </p:spTree>
     <p:extLst>
       <p:ext uri="{BB962C8B-B14F-4D97-AF65-F5344CB8AC3E}">
-        <p14:creationId xmlns:p14="http://schemas.microsoft.com/office/powerpoint/2010/main" val="593523791"/>
+        <p14:creationId xmlns:p14="http://schemas.microsoft.com/office/powerpoint/2010/main" val="2354227569"/>
       </p:ext>
     </p:extLst>
   </p:cSld>
@@ -2428,6 +2559,308 @@
             <p:ph type="body" idx="1"/>
           </p:nvPr>
         </p:nvSpPr>
+        <p:spPr>
+          <a:xfrm>
+            <a:off x="685800" y="4343400"/>
+            <a:ext cx="5486400" cy="4114800"/>
+          </a:xfrm>
+          <a:prstGeom prst="rect">
+            <a:avLst/>
+          </a:prstGeom>
+        </p:spPr>
+        <p:txBody>
+          <a:bodyPr/>
+          <a:lstStyle/>
+          <a:p>
+            <a:r>
+              <a:rPr lang="en-US" dirty="0" smtClean="0"/>
+              <a:t>This is just an</a:t>
+            </a:r>
+            <a:r>
+              <a:rPr lang="en-US" baseline="0" dirty="0" smtClean="0"/>
+              <a:t> explanation. You don't need to log into these machines at this time.</a:t>
+            </a:r>
+            <a:endParaRPr lang="en-US" dirty="0" smtClean="0"/>
+          </a:p>
+          <a:p>
+            <a:endParaRPr lang="en-US" dirty="0" smtClean="0"/>
+          </a:p>
+          <a:p>
+            <a:r>
+              <a:rPr lang="en-US" dirty="0" smtClean="0"/>
+              <a:t>You </a:t>
+            </a:r>
+            <a:r>
+              <a:rPr lang="en-US" dirty="0" smtClean="0"/>
+              <a:t>should use an ssh client like </a:t>
+            </a:r>
+            <a:r>
+              <a:rPr lang="en-US" dirty="0" err="1" smtClean="0"/>
+              <a:t>PuTTY</a:t>
+            </a:r>
+            <a:r>
+              <a:rPr lang="en-US" dirty="0" smtClean="0"/>
+              <a:t> or a local command prompt to connect to the remote workstation that we</a:t>
+            </a:r>
+            <a:r>
+              <a:rPr lang="en-US" baseline="0" dirty="0" smtClean="0"/>
+              <a:t> assign to you. </a:t>
+            </a:r>
+          </a:p>
+          <a:p>
+            <a:endParaRPr lang="en-US" baseline="0" dirty="0" smtClean="0"/>
+          </a:p>
+          <a:p>
+            <a:r>
+              <a:rPr lang="en-US" baseline="0" dirty="0" smtClean="0"/>
+              <a:t>Instead of the command shown in this slide, you could also use this command: </a:t>
+            </a:r>
+          </a:p>
+          <a:p>
+            <a:endParaRPr lang="en-US" baseline="0" dirty="0" smtClean="0"/>
+          </a:p>
+          <a:p>
+            <a:pPr marL="0" marR="0" indent="0" algn="l" defTabSz="1217613" rtl="0" eaLnBrk="1" fontAlgn="base" latinLnBrk="0" hangingPunct="1">
+              <a:lnSpc>
+                <a:spcPct val="90000"/>
+              </a:lnSpc>
+              <a:spcBef>
+                <a:spcPct val="30000"/>
+              </a:spcBef>
+              <a:spcAft>
+                <a:spcPts val="450"/>
+              </a:spcAft>
+              <a:buClrTx/>
+              <a:buSzTx/>
+              <a:buFontTx/>
+              <a:buNone/>
+              <a:tabLst/>
+              <a:defRPr/>
+            </a:pPr>
+            <a:r>
+              <a:rPr lang="en-US" baseline="0" dirty="0" smtClean="0"/>
+              <a:t>ssh </a:t>
+            </a:r>
+            <a:r>
+              <a:rPr lang="en-US" baseline="0" dirty="0" err="1" smtClean="0"/>
+              <a:t>chef@IPADDRESS</a:t>
+            </a:r>
+            <a:endParaRPr lang="en-US" baseline="0" dirty="0" smtClean="0"/>
+          </a:p>
+          <a:p>
+            <a:pPr marL="0" marR="0" indent="0" algn="l" defTabSz="1217613" rtl="0" eaLnBrk="1" fontAlgn="base" latinLnBrk="0" hangingPunct="1">
+              <a:lnSpc>
+                <a:spcPct val="90000"/>
+              </a:lnSpc>
+              <a:spcBef>
+                <a:spcPct val="30000"/>
+              </a:spcBef>
+              <a:spcAft>
+                <a:spcPts val="450"/>
+              </a:spcAft>
+              <a:buClrTx/>
+              <a:buSzTx/>
+              <a:buFontTx/>
+              <a:buNone/>
+              <a:tabLst/>
+              <a:defRPr/>
+            </a:pPr>
+            <a:endParaRPr lang="en-US" baseline="0" dirty="0" smtClean="0"/>
+          </a:p>
+          <a:p>
+            <a:pPr marL="0" marR="0" indent="0" algn="l" defTabSz="1217613" rtl="0" eaLnBrk="1" fontAlgn="base" latinLnBrk="0" hangingPunct="1">
+              <a:lnSpc>
+                <a:spcPct val="90000"/>
+              </a:lnSpc>
+              <a:spcBef>
+                <a:spcPct val="30000"/>
+              </a:spcBef>
+              <a:spcAft>
+                <a:spcPts val="450"/>
+              </a:spcAft>
+              <a:buClrTx/>
+              <a:buSzTx/>
+              <a:buFontTx/>
+              <a:buNone/>
+              <a:tabLst/>
+              <a:defRPr/>
+            </a:pPr>
+            <a:r>
+              <a:rPr lang="en-US" baseline="0" dirty="0" smtClean="0"/>
+              <a:t>For example: ssh chef@52.90.140.22</a:t>
+            </a:r>
+          </a:p>
+          <a:p>
+            <a:endParaRPr lang="en-US" baseline="0" dirty="0" smtClean="0"/>
+          </a:p>
+          <a:p>
+            <a:endParaRPr lang="en-US" baseline="0" dirty="0" smtClean="0"/>
+          </a:p>
+          <a:p>
+            <a:endParaRPr lang="en-US" baseline="0" dirty="0" smtClean="0"/>
+          </a:p>
+          <a:p>
+            <a:endParaRPr lang="en-US" baseline="0" dirty="0" smtClean="0"/>
+          </a:p>
+          <a:p>
+            <a:endParaRPr lang="en-US" dirty="0"/>
+          </a:p>
+        </p:txBody>
+      </p:sp>
+    </p:spTree>
+    <p:extLst>
+      <p:ext uri="{BB962C8B-B14F-4D97-AF65-F5344CB8AC3E}">
+        <p14:creationId xmlns:p14="http://schemas.microsoft.com/office/powerpoint/2010/main" val="593523791"/>
+      </p:ext>
+    </p:extLst>
+  </p:cSld>
+  <p:clrMapOvr>
+    <a:masterClrMapping/>
+  </p:clrMapOvr>
+</p:notes>
+</file>
+
+<file path=ppt/notesSlides/notesSlide15.xml><?xml version="1.0" encoding="utf-8"?>
+<p:notes xmlns:a="http://schemas.openxmlformats.org/drawingml/2006/main" xmlns:r="http://schemas.openxmlformats.org/officeDocument/2006/relationships" xmlns:p="http://schemas.openxmlformats.org/presentationml/2006/main">
+  <p:cSld>
+    <p:spTree>
+      <p:nvGrpSpPr>
+        <p:cNvPr id="1" name=""/>
+        <p:cNvGrpSpPr/>
+        <p:nvPr/>
+      </p:nvGrpSpPr>
+      <p:grpSpPr>
+        <a:xfrm>
+          <a:off x="0" y="0"/>
+          <a:ext cx="0" cy="0"/>
+          <a:chOff x="0" y="0"/>
+          <a:chExt cx="0" cy="0"/>
+        </a:xfrm>
+      </p:grpSpPr>
+      <p:sp>
+        <p:nvSpPr>
+          <p:cNvPr id="2" name="Slide Image Placeholder 1"/>
+          <p:cNvSpPr>
+            <a:spLocks noGrp="1" noRot="1" noChangeAspect="1"/>
+          </p:cNvSpPr>
+          <p:nvPr>
+            <p:ph type="sldImg"/>
+          </p:nvPr>
+        </p:nvSpPr>
+        <p:spPr/>
+      </p:sp>
+      <p:sp>
+        <p:nvSpPr>
+          <p:cNvPr id="3" name="Notes Placeholder 2"/>
+          <p:cNvSpPr>
+            <a:spLocks noGrp="1"/>
+          </p:cNvSpPr>
+          <p:nvPr>
+            <p:ph type="body" idx="1"/>
+          </p:nvPr>
+        </p:nvSpPr>
+        <p:spPr>
+          <a:xfrm>
+            <a:off x="685800" y="4343400"/>
+            <a:ext cx="5486400" cy="4114800"/>
+          </a:xfrm>
+          <a:prstGeom prst="rect">
+            <a:avLst/>
+          </a:prstGeom>
+        </p:spPr>
+        <p:txBody>
+          <a:bodyPr/>
+          <a:lstStyle/>
+          <a:p>
+            <a:r>
+              <a:rPr lang="en-US" dirty="0" smtClean="0"/>
+              <a:t>This is just an</a:t>
+            </a:r>
+            <a:r>
+              <a:rPr lang="en-US" baseline="0" dirty="0" smtClean="0"/>
+              <a:t> explanation. You don't need to log into these machines at this time.</a:t>
+            </a:r>
+            <a:endParaRPr lang="en-US" dirty="0" smtClean="0"/>
+          </a:p>
+          <a:p>
+            <a:endParaRPr lang="en-US" baseline="0" dirty="0" smtClean="0"/>
+          </a:p>
+          <a:p>
+            <a:r>
+              <a:rPr lang="en-US" baseline="0" dirty="0" smtClean="0"/>
+              <a:t>You should have installed on your laptop a Windows Remote Desktop Connection which you'll only use to write remediation later in this course.</a:t>
+            </a:r>
+            <a:endParaRPr lang="en-US" baseline="0" dirty="0" smtClean="0"/>
+          </a:p>
+          <a:p>
+            <a:endParaRPr lang="en-US" baseline="0" dirty="0" smtClean="0"/>
+          </a:p>
+          <a:p>
+            <a:endParaRPr lang="en-US" baseline="0" dirty="0" smtClean="0"/>
+          </a:p>
+          <a:p>
+            <a:endParaRPr lang="en-US" baseline="0" dirty="0" smtClean="0"/>
+          </a:p>
+          <a:p>
+            <a:endParaRPr lang="en-US" baseline="0" dirty="0" smtClean="0"/>
+          </a:p>
+          <a:p>
+            <a:endParaRPr lang="en-US" dirty="0"/>
+          </a:p>
+        </p:txBody>
+      </p:sp>
+    </p:spTree>
+    <p:extLst>
+      <p:ext uri="{BB962C8B-B14F-4D97-AF65-F5344CB8AC3E}">
+        <p14:creationId xmlns:p14="http://schemas.microsoft.com/office/powerpoint/2010/main" val="445481966"/>
+      </p:ext>
+    </p:extLst>
+  </p:cSld>
+  <p:clrMapOvr>
+    <a:masterClrMapping/>
+  </p:clrMapOvr>
+</p:notes>
+</file>
+
+<file path=ppt/notesSlides/notesSlide16.xml><?xml version="1.0" encoding="utf-8"?>
+<p:notes xmlns:a="http://schemas.openxmlformats.org/drawingml/2006/main" xmlns:r="http://schemas.openxmlformats.org/officeDocument/2006/relationships" xmlns:p="http://schemas.openxmlformats.org/presentationml/2006/main">
+  <p:cSld>
+    <p:spTree>
+      <p:nvGrpSpPr>
+        <p:cNvPr id="1" name=""/>
+        <p:cNvGrpSpPr/>
+        <p:nvPr/>
+      </p:nvGrpSpPr>
+      <p:grpSpPr>
+        <a:xfrm>
+          <a:off x="0" y="0"/>
+          <a:ext cx="0" cy="0"/>
+          <a:chOff x="0" y="0"/>
+          <a:chExt cx="0" cy="0"/>
+        </a:xfrm>
+      </p:grpSpPr>
+      <p:sp>
+        <p:nvSpPr>
+          <p:cNvPr id="2" name="Slide Image Placeholder 1"/>
+          <p:cNvSpPr>
+            <a:spLocks noGrp="1" noRot="1" noChangeAspect="1"/>
+          </p:cNvSpPr>
+          <p:nvPr>
+            <p:ph type="sldImg"/>
+          </p:nvPr>
+        </p:nvSpPr>
+        <p:spPr/>
+      </p:sp>
+      <p:sp>
+        <p:nvSpPr>
+          <p:cNvPr id="3" name="Notes Placeholder 2"/>
+          <p:cNvSpPr>
+            <a:spLocks noGrp="1"/>
+          </p:cNvSpPr>
+          <p:nvPr>
+            <p:ph type="body" idx="1"/>
+          </p:nvPr>
+        </p:nvSpPr>
         <p:spPr/>
         <p:txBody>
           <a:bodyPr/>
@@ -2460,7 +2893,7 @@
               <a:pPr>
                 <a:defRPr/>
               </a:pPr>
-              <a:t>15</a:t>
+              <a:t>17</a:t>
             </a:fld>
             <a:endParaRPr lang="en-US" dirty="0"/>
           </a:p>
@@ -2636,6 +3069,14 @@
           <a:bodyPr/>
           <a:lstStyle/>
           <a:p>
+            <a:r>
+              <a:rPr lang="en-US" dirty="0" smtClean="0"/>
+              <a:t>Instructor Note: You can tell the students that this course covers scanning and remediating both Linux and Windows nodes.</a:t>
+            </a:r>
+            <a:r>
+              <a:rPr lang="en-US" baseline="0" dirty="0" smtClean="0"/>
+              <a:t> For example, module 03 covers scanning and remediating Linux nodes and module 04 covers scanning and remediating Windows nodes. However, the Compliance server runs only on Linux.</a:t>
+            </a:r>
             <a:endParaRPr lang="en-US" dirty="0"/>
           </a:p>
         </p:txBody>
@@ -3086,6 +3527,30 @@
           <a:bodyPr/>
           <a:lstStyle/>
           <a:p>
+            <a:r>
+              <a:rPr lang="en-US" dirty="0" smtClean="0"/>
+              <a:t>Chef Compliance can run without any other Chef software installed on the Chef Compliance server machine.</a:t>
+            </a:r>
+          </a:p>
+          <a:p>
+            <a:endParaRPr lang="en-US" dirty="0" smtClean="0"/>
+          </a:p>
+          <a:p>
+            <a:r>
+              <a:rPr lang="en-US" dirty="0" smtClean="0"/>
+              <a:t>The nodes you scan don't even need Chef software on them if you are merely scanning them for compliance.</a:t>
+            </a:r>
+          </a:p>
+          <a:p>
+            <a:endParaRPr lang="en-US" dirty="0" smtClean="0"/>
+          </a:p>
+          <a:p>
+            <a:r>
+              <a:rPr lang="en-US" dirty="0" smtClean="0"/>
+              <a:t>However, you would need Chef software to create and implement remediation recipes if you choose to use recipes to remediate compliance issues.</a:t>
+            </a:r>
+          </a:p>
+          <a:p>
             <a:endParaRPr lang="en-US" dirty="0"/>
           </a:p>
         </p:txBody>
@@ -3217,56 +3682,47 @@
         </p:nvSpPr>
         <p:spPr/>
         <p:txBody>
-          <a:bodyPr/>
+          <a:bodyPr>
+            <a:normAutofit fontScale="92500"/>
+          </a:bodyPr>
           <a:lstStyle/>
           <a:p>
             <a:r>
-              <a:rPr lang="en-US" sz="1200" b="0" i="0" kern="1200" dirty="0" err="1" smtClean="0">
-                <a:solidFill>
-                  <a:schemeClr val="tx1"/>
-                </a:solidFill>
-                <a:effectLst/>
-                <a:latin typeface="Arial" panose="020B0604020202020204" pitchFamily="34" charset="0"/>
-                <a:ea typeface="ＭＳ Ｐゴシック" charset="0"/>
-                <a:cs typeface="Arial" panose="020B0604020202020204" pitchFamily="34" charset="0"/>
-              </a:rPr>
+              <a:rPr lang="en-US" dirty="0" smtClean="0"/>
+              <a:t>Chef Compliance leverages </a:t>
+            </a:r>
+            <a:r>
+              <a:rPr lang="en-US" dirty="0" err="1" smtClean="0"/>
               <a:t>InSpec</a:t>
             </a:r>
             <a:r>
-              <a:rPr lang="en-US" sz="1200" b="0" i="0" kern="1200" dirty="0" smtClean="0">
-                <a:solidFill>
-                  <a:schemeClr val="tx1"/>
-                </a:solidFill>
-                <a:effectLst/>
-                <a:latin typeface="Arial" panose="020B0604020202020204" pitchFamily="34" charset="0"/>
-                <a:ea typeface="ＭＳ Ｐゴシック" charset="0"/>
-                <a:cs typeface="Arial" panose="020B0604020202020204" pitchFamily="34" charset="0"/>
-              </a:rPr>
-              <a:t> is an open-source run-time framework and rule language used to specify compliance, security, and policy requirements for testing any node in your infrastructure. The </a:t>
-            </a:r>
-            <a:r>
-              <a:rPr lang="en-US" sz="1200" b="0" i="0" kern="1200" dirty="0" err="1" smtClean="0">
-                <a:solidFill>
-                  <a:schemeClr val="tx1"/>
-                </a:solidFill>
-                <a:effectLst/>
-                <a:latin typeface="Arial" panose="020B0604020202020204" pitchFamily="34" charset="0"/>
-                <a:ea typeface="ＭＳ Ｐゴシック" charset="0"/>
-                <a:cs typeface="Arial" panose="020B0604020202020204" pitchFamily="34" charset="0"/>
-              </a:rPr>
+              <a:rPr lang="en-US" dirty="0" smtClean="0"/>
+              <a:t>.</a:t>
+            </a:r>
+            <a:r>
+              <a:rPr lang="en-US" baseline="0" dirty="0" smtClean="0"/>
+              <a:t> </a:t>
+            </a:r>
+          </a:p>
+          <a:p>
+            <a:endParaRPr lang="en-US" baseline="0" dirty="0" smtClean="0"/>
+          </a:p>
+          <a:p>
+            <a:r>
+              <a:rPr lang="en-US" dirty="0" err="1" smtClean="0"/>
               <a:t>InSpec</a:t>
             </a:r>
             <a:r>
-              <a:rPr lang="en-US" sz="1200" b="0" i="0" kern="1200" dirty="0" smtClean="0">
-                <a:solidFill>
-                  <a:schemeClr val="tx1"/>
-                </a:solidFill>
-                <a:effectLst/>
-                <a:latin typeface="Arial" panose="020B0604020202020204" pitchFamily="34" charset="0"/>
-                <a:ea typeface="ＭＳ Ｐゴシック" charset="0"/>
-                <a:cs typeface="Arial" panose="020B0604020202020204" pitchFamily="34" charset="0"/>
-              </a:rPr>
-              <a:t> name refers to “infrastructure specification</a:t>
+              <a:rPr lang="en-US" dirty="0" smtClean="0"/>
+              <a:t> is similar to </a:t>
+            </a:r>
+            <a:r>
+              <a:rPr lang="en-US" dirty="0" err="1" smtClean="0"/>
+              <a:t>ServerSpec</a:t>
+            </a:r>
+            <a:r>
+              <a:rPr lang="en-US" dirty="0" smtClean="0"/>
+              <a:t>.</a:t>
             </a:r>
           </a:p>
           <a:p>
@@ -3303,7 +3759,43 @@
                 <a:ea typeface="ＭＳ Ｐゴシック" charset="0"/>
                 <a:cs typeface="Arial" panose="020B0604020202020204" pitchFamily="34" charset="0"/>
               </a:rPr>
-              <a:t> includes a collection of resources to help you write auditing rules quickly and easily using the Compliance DSL.</a:t>
+              <a:t> </a:t>
+            </a:r>
+            <a:r>
+              <a:rPr lang="en-US" sz="1200" b="0" i="0" kern="1200" dirty="0" smtClean="0">
+                <a:solidFill>
+                  <a:schemeClr val="tx1"/>
+                </a:solidFill>
+                <a:effectLst/>
+                <a:latin typeface="Arial" panose="020B0604020202020204" pitchFamily="34" charset="0"/>
+                <a:ea typeface="ＭＳ Ｐゴシック" charset="0"/>
+                <a:cs typeface="Arial" panose="020B0604020202020204" pitchFamily="34" charset="0"/>
+              </a:rPr>
+              <a:t>is an open-source run-time framework and rule language used to specify compliance, security, and policy requirements for testing any node in your infrastructure. The </a:t>
+            </a:r>
+            <a:r>
+              <a:rPr lang="en-US" sz="1200" b="0" i="0" kern="1200" dirty="0" err="1" smtClean="0">
+                <a:solidFill>
+                  <a:schemeClr val="tx1"/>
+                </a:solidFill>
+                <a:effectLst/>
+                <a:latin typeface="Arial" panose="020B0604020202020204" pitchFamily="34" charset="0"/>
+                <a:ea typeface="ＭＳ Ｐゴシック" charset="0"/>
+                <a:cs typeface="Arial" panose="020B0604020202020204" pitchFamily="34" charset="0"/>
+              </a:rPr>
+              <a:t>InSpec</a:t>
+            </a:r>
+            <a:r>
+              <a:rPr lang="en-US" sz="1200" b="0" i="0" kern="1200" dirty="0" smtClean="0">
+                <a:solidFill>
+                  <a:schemeClr val="tx1"/>
+                </a:solidFill>
+                <a:effectLst/>
+                <a:latin typeface="Arial" panose="020B0604020202020204" pitchFamily="34" charset="0"/>
+                <a:ea typeface="ＭＳ Ｐゴシック" charset="0"/>
+                <a:cs typeface="Arial" panose="020B0604020202020204" pitchFamily="34" charset="0"/>
+              </a:rPr>
+              <a:t> name refers to “infrastructure specification</a:t>
             </a:r>
           </a:p>
           <a:p>
@@ -3319,18 +3811,6 @@
           </a:p>
           <a:p>
             <a:r>
-              <a:rPr lang="en-US" sz="1200" b="0" i="0" kern="1200" dirty="0" smtClean="0">
-                <a:solidFill>
-                  <a:schemeClr val="tx1"/>
-                </a:solidFill>
-                <a:effectLst/>
-                <a:latin typeface="Arial" panose="020B0604020202020204" pitchFamily="34" charset="0"/>
-                <a:ea typeface="ＭＳ Ｐゴシック" charset="0"/>
-                <a:cs typeface="Arial" panose="020B0604020202020204" pitchFamily="34" charset="0"/>
-              </a:rPr>
-              <a:t>Use </a:t>
-            </a:r>
-            <a:r>
               <a:rPr lang="en-US" sz="1200" b="0" i="0" kern="1200" dirty="0" err="1" smtClean="0">
                 <a:solidFill>
                   <a:schemeClr val="tx1"/>
@@ -3352,7 +3832,7 @@
                 <a:ea typeface="ＭＳ Ｐゴシック" charset="0"/>
                 <a:cs typeface="Arial" panose="020B0604020202020204" pitchFamily="34" charset="0"/>
               </a:rPr>
-              <a:t> to examine any node in your infrastructure; run the tests locally or remotely.</a:t>
+              <a:t> includes a collection of resources to help you write auditing rules quickly and easily using the Compliance DSL.</a:t>
             </a:r>
           </a:p>
           <a:p>
@@ -3377,8 +3857,90 @@
                 <a:ea typeface="ＭＳ Ｐゴシック" charset="0"/>
                 <a:cs typeface="Arial" panose="020B0604020202020204" pitchFamily="34" charset="0"/>
               </a:rPr>
-              <a:t>Any detected security, compliance, or policy issues are flagged in a log.</a:t>
-            </a:r>
+              <a:t>Use </a:t>
+            </a:r>
+            <a:r>
+              <a:rPr lang="en-US" sz="1200" b="0" i="0" kern="1200" dirty="0" err="1" smtClean="0">
+                <a:solidFill>
+                  <a:schemeClr val="tx1"/>
+                </a:solidFill>
+                <a:effectLst/>
+                <a:latin typeface="Arial" panose="020B0604020202020204" pitchFamily="34" charset="0"/>
+                <a:ea typeface="ＭＳ Ｐゴシック" charset="0"/>
+                <a:cs typeface="Arial" panose="020B0604020202020204" pitchFamily="34" charset="0"/>
+              </a:rPr>
+              <a:t>InSpec</a:t>
+            </a:r>
+            <a:r>
+              <a:rPr lang="en-US" sz="1200" b="0" i="0" kern="1200" dirty="0" smtClean="0">
+                <a:solidFill>
+                  <a:schemeClr val="tx1"/>
+                </a:solidFill>
+                <a:effectLst/>
+                <a:latin typeface="Arial" panose="020B0604020202020204" pitchFamily="34" charset="0"/>
+                <a:ea typeface="ＭＳ Ｐゴシック" charset="0"/>
+                <a:cs typeface="Arial" panose="020B0604020202020204" pitchFamily="34" charset="0"/>
+              </a:rPr>
+              <a:t> to examine any node in your infrastructure; run the tests locally or remotely.</a:t>
+            </a:r>
+          </a:p>
+          <a:p>
+            <a:endParaRPr lang="en-US" sz="1200" b="0" i="0" kern="1200" dirty="0" smtClean="0">
+              <a:solidFill>
+                <a:schemeClr val="tx1"/>
+              </a:solidFill>
+              <a:effectLst/>
+              <a:latin typeface="Arial" panose="020B0604020202020204" pitchFamily="34" charset="0"/>
+              <a:ea typeface="ＭＳ Ｐゴシック" charset="0"/>
+              <a:cs typeface="Arial" panose="020B0604020202020204" pitchFamily="34" charset="0"/>
+            </a:endParaRPr>
+          </a:p>
+          <a:p>
+            <a:r>
+              <a:rPr lang="en-US" sz="1200" b="0" i="0" kern="1200" dirty="0" smtClean="0">
+                <a:solidFill>
+                  <a:schemeClr val="tx1"/>
+                </a:solidFill>
+                <a:effectLst/>
+                <a:latin typeface="Arial" panose="020B0604020202020204" pitchFamily="34" charset="0"/>
+                <a:ea typeface="ＭＳ Ｐゴシック" charset="0"/>
+                <a:cs typeface="Arial" panose="020B0604020202020204" pitchFamily="34" charset="0"/>
+              </a:rPr>
+              <a:t>Any detected security, compliance, or policy issues are </a:t>
+            </a:r>
+            <a:r>
+              <a:rPr lang="en-US" sz="1200" b="0" i="0" kern="1200" dirty="0" smtClean="0">
+                <a:solidFill>
+                  <a:schemeClr val="tx1"/>
+                </a:solidFill>
+                <a:effectLst/>
+                <a:latin typeface="Arial" panose="020B0604020202020204" pitchFamily="34" charset="0"/>
+                <a:ea typeface="ＭＳ Ｐゴシック" charset="0"/>
+                <a:cs typeface="Arial" panose="020B0604020202020204" pitchFamily="34" charset="0"/>
+              </a:rPr>
+              <a:t>flagged in a log</a:t>
+            </a:r>
+            <a:r>
+              <a:rPr lang="en-US" sz="1200" b="0" i="0" kern="1200" baseline="0" dirty="0" smtClean="0">
+                <a:solidFill>
+                  <a:schemeClr val="tx1"/>
+                </a:solidFill>
+                <a:effectLst/>
+                <a:latin typeface="Arial" panose="020B0604020202020204" pitchFamily="34" charset="0"/>
+                <a:ea typeface="ＭＳ Ｐゴシック" charset="0"/>
+                <a:cs typeface="Arial" panose="020B0604020202020204" pitchFamily="34" charset="0"/>
+              </a:rPr>
+              <a:t> and displayed in reports.</a:t>
+            </a:r>
+            <a:endParaRPr lang="en-US" sz="1200" b="0" i="0" kern="1200" dirty="0" smtClean="0">
+              <a:solidFill>
+                <a:schemeClr val="tx1"/>
+              </a:solidFill>
+              <a:effectLst/>
+              <a:latin typeface="Arial" panose="020B0604020202020204" pitchFamily="34" charset="0"/>
+              <a:ea typeface="ＭＳ Ｐゴシック" charset="0"/>
+              <a:cs typeface="Arial" panose="020B0604020202020204" pitchFamily="34" charset="0"/>
+            </a:endParaRPr>
           </a:p>
           <a:p>
             <a:endParaRPr lang="en-US" sz="1200" b="0" i="0" kern="1200" dirty="0" smtClean="0">
@@ -6114,71 +6676,6 @@
               <a:t>Enter Command</a:t>
             </a:r>
             <a:endParaRPr lang="en-US" dirty="0"/>
-          </a:p>
-        </p:txBody>
-      </p:sp>
-      <p:sp>
-        <p:nvSpPr>
-          <p:cNvPr id="7" name="Rectangle 6"/>
-          <p:cNvSpPr/>
-          <p:nvPr userDrawn="1"/>
-        </p:nvSpPr>
-        <p:spPr bwMode="auto">
-          <a:xfrm>
-            <a:off x="1120567" y="3237375"/>
-            <a:ext cx="14417959" cy="572765"/>
-          </a:xfrm>
-          <a:prstGeom prst="rect">
-            <a:avLst/>
-          </a:prstGeom>
-          <a:solidFill>
-            <a:schemeClr val="accent1">
-              <a:alpha val="50000"/>
-            </a:schemeClr>
-          </a:solidFill>
-          <a:ln>
-            <a:noFill/>
-            <a:headEnd type="none" w="med" len="med"/>
-            <a:tailEnd type="none" w="med" len="med"/>
-          </a:ln>
-          <a:effectLst/>
-        </p:spPr>
-        <p:style>
-          <a:lnRef idx="1">
-            <a:schemeClr val="accent4"/>
-          </a:lnRef>
-          <a:fillRef idx="3">
-            <a:schemeClr val="accent4"/>
-          </a:fillRef>
-          <a:effectRef idx="2">
-            <a:schemeClr val="accent4"/>
-          </a:effectRef>
-          <a:fontRef idx="minor">
-            <a:schemeClr val="lt1"/>
-          </a:fontRef>
-        </p:style>
-        <p:txBody>
-          <a:bodyPr vert="horz" wrap="square" lIns="121915" tIns="60957" rIns="121915" bIns="60957" numCol="1" rtlCol="0" anchor="ctr" anchorCtr="0" compatLnSpc="1">
-            <a:prstTxWarp prst="textNoShape">
-              <a:avLst/>
-            </a:prstTxWarp>
-          </a:bodyPr>
-          <a:lstStyle/>
-          <a:p>
-            <a:pPr algn="ctr" defTabSz="1218768"/>
-            <a:endParaRPr lang="en-US" sz="3200" dirty="0" err="1" smtClean="0">
-              <a:gradFill>
-                <a:gsLst>
-                  <a:gs pos="0">
-                    <a:srgbClr val="FFFFFF"/>
-                  </a:gs>
-                  <a:gs pos="100000">
-                    <a:srgbClr val="FFFFFF"/>
-                  </a:gs>
-                </a:gsLst>
-                <a:lin ang="5400000" scaled="0"/>
-              </a:gradFill>
-            </a:endParaRPr>
           </a:p>
         </p:txBody>
       </p:sp>
@@ -13374,7 +13871,15 @@
           <a:p>
             <a:r>
               <a:rPr lang="en-US" dirty="0" smtClean="0"/>
-              <a:t>You also execute scans </a:t>
+              <a:t>You </a:t>
+            </a:r>
+            <a:r>
+              <a:rPr lang="en-US" dirty="0" smtClean="0"/>
+              <a:t>execute </a:t>
+            </a:r>
+            <a:r>
+              <a:rPr lang="en-US" dirty="0" smtClean="0"/>
+              <a:t>scans </a:t>
             </a:r>
             <a:r>
               <a:rPr lang="en-US" dirty="0"/>
@@ -13392,7 +13897,6 @@
               <a:rPr lang="en-US" dirty="0" smtClean="0"/>
               <a:t>UI. </a:t>
             </a:r>
-            <a:endParaRPr lang="en-US" dirty="0" smtClean="0"/>
           </a:p>
         </p:txBody>
       </p:sp>
@@ -13482,8 +13986,13 @@
           <a:p>
             <a:r>
               <a:rPr lang="en-US" dirty="0"/>
-              <a:t>Your Lab Environment</a:t>
-            </a:r>
+              <a:t>Your Lab </a:t>
+            </a:r>
+            <a:r>
+              <a:rPr lang="en-US" dirty="0" smtClean="0"/>
+              <a:t>Environment for Scanning</a:t>
+            </a:r>
+            <a:endParaRPr lang="en-US" dirty="0"/>
           </a:p>
         </p:txBody>
       </p:sp>
@@ -13495,8 +14004,8 @@
         </p:nvCxnSpPr>
         <p:spPr>
           <a:xfrm flipH="1">
-            <a:off x="7559041" y="3787223"/>
-            <a:ext cx="1486329" cy="1688484"/>
+            <a:off x="7478003" y="3609474"/>
+            <a:ext cx="1783652" cy="2157515"/>
           </a:xfrm>
           <a:prstGeom prst="straightConnector1">
             <a:avLst/>
@@ -13740,7 +14249,7 @@
         </p:nvSpPr>
         <p:spPr bwMode="white">
           <a:xfrm>
-            <a:off x="8800950" y="4144980"/>
+            <a:off x="8656572" y="4481863"/>
             <a:ext cx="3230631" cy="1842629"/>
           </a:xfrm>
           <a:prstGeom prst="rect">
@@ -14222,11 +14731,7 @@
             <a:pPr algn="ctr"/>
             <a:r>
               <a:rPr lang="en-US" sz="2667" dirty="0" smtClean="0"/>
-              <a:t>Nodes </a:t>
-            </a:r>
-            <a:r>
-              <a:rPr lang="en-US" sz="2667" dirty="0" smtClean="0"/>
-              <a:t>to run Compliance tests against</a:t>
+              <a:t>Nodes to run Compliance tests against</a:t>
             </a:r>
             <a:endParaRPr lang="en-US" sz="2667" dirty="0"/>
           </a:p>
@@ -14252,8 +14757,8 @@
         </p:nvCxnSpPr>
         <p:spPr>
           <a:xfrm flipH="1" flipV="1">
-            <a:off x="10924674" y="2959768"/>
-            <a:ext cx="3194537" cy="25966"/>
+            <a:off x="10924676" y="2959769"/>
+            <a:ext cx="2871620" cy="336884"/>
           </a:xfrm>
           <a:prstGeom prst="straightConnector1">
             <a:avLst/>
@@ -14283,63 +14788,6 @@
       </p:cxnSp>
       <p:sp>
         <p:nvSpPr>
-          <p:cNvPr id="15" name="Cloud 14"/>
-          <p:cNvSpPr/>
-          <p:nvPr/>
-        </p:nvSpPr>
-        <p:spPr bwMode="auto">
-          <a:xfrm>
-            <a:off x="11678784" y="2367977"/>
-            <a:ext cx="1638185" cy="1121554"/>
-          </a:xfrm>
-          <a:prstGeom prst="cloud">
-            <a:avLst/>
-          </a:prstGeom>
-          <a:solidFill>
-            <a:schemeClr val="bg1"/>
-          </a:solidFill>
-          <a:ln>
-            <a:solidFill>
-              <a:schemeClr val="accent1"/>
-            </a:solidFill>
-            <a:headEnd type="none" w="med" len="med"/>
-            <a:tailEnd type="none" w="med" len="med"/>
-          </a:ln>
-          <a:effectLst/>
-        </p:spPr>
-        <p:style>
-          <a:lnRef idx="1">
-            <a:schemeClr val="accent4"/>
-          </a:lnRef>
-          <a:fillRef idx="3">
-            <a:schemeClr val="accent4"/>
-          </a:fillRef>
-          <a:effectRef idx="2">
-            <a:schemeClr val="accent4"/>
-          </a:effectRef>
-          <a:fontRef idx="minor">
-            <a:schemeClr val="lt1"/>
-          </a:fontRef>
-        </p:style>
-        <p:txBody>
-          <a:bodyPr vert="horz" wrap="square" lIns="91436" tIns="45718" rIns="91436" bIns="45718" numCol="1" rtlCol="0" anchor="ctr" anchorCtr="0" compatLnSpc="1">
-            <a:prstTxWarp prst="textNoShape">
-              <a:avLst/>
-            </a:prstTxWarp>
-          </a:bodyPr>
-          <a:lstStyle/>
-          <a:p>
-            <a:pPr algn="r" defTabSz="914099"/>
-            <a:endParaRPr lang="en-US" sz="2400" dirty="0" smtClean="0">
-              <a:solidFill>
-                <a:schemeClr val="tx1"/>
-              </a:solidFill>
-            </a:endParaRPr>
-          </a:p>
-        </p:txBody>
-      </p:sp>
-      <p:sp>
-        <p:nvSpPr>
           <p:cNvPr id="23" name="Text Placeholder 2"/>
           <p:cNvSpPr>
             <a:spLocks noGrp="1"/>
@@ -14360,15 +14808,7 @@
           <a:p>
             <a:r>
               <a:rPr lang="en-US" dirty="0" smtClean="0"/>
-              <a:t>We will provide </a:t>
-            </a:r>
-            <a:r>
-              <a:rPr lang="en-US" dirty="0" smtClean="0"/>
-              <a:t>three machines for </a:t>
-            </a:r>
-            <a:r>
-              <a:rPr lang="en-US" dirty="0" smtClean="0"/>
-              <a:t>you to use while performing lab exercises in this course:</a:t>
+              <a:t>We will provide three machines for you to use while performing lab exercises in this course:</a:t>
             </a:r>
           </a:p>
           <a:p>
@@ -14381,15 +14821,7 @@
             </a:pPr>
             <a:r>
               <a:rPr lang="en-US" dirty="0" smtClean="0"/>
-              <a:t>One </a:t>
-            </a:r>
-            <a:r>
-              <a:rPr lang="en-US" dirty="0" smtClean="0"/>
-              <a:t>Linux server to </a:t>
-            </a:r>
-            <a:r>
-              <a:rPr lang="en-US" dirty="0" smtClean="0"/>
-              <a:t>install and run Chef Compliance on.</a:t>
+              <a:t>One Linux server to install and run Chef Compliance on.</a:t>
             </a:r>
             <a:endParaRPr lang="en-US" dirty="0"/>
           </a:p>
@@ -14400,15 +14832,15 @@
             </a:pPr>
             <a:r>
               <a:rPr lang="en-US" dirty="0" smtClean="0"/>
-              <a:t>One </a:t>
+              <a:t>One Windows node and one Linux node to perform Chef Compliance </a:t>
             </a:r>
             <a:r>
               <a:rPr lang="en-US" dirty="0" smtClean="0"/>
-              <a:t>Windows node and one Linux node to </a:t>
+              <a:t>scans against</a:t>
             </a:r>
             <a:r>
               <a:rPr lang="en-US" dirty="0" smtClean="0"/>
-              <a:t>perform Chef Compliance tests against.</a:t>
+              <a:t>.</a:t>
             </a:r>
           </a:p>
           <a:p>
@@ -14429,9 +14861,9 @@
           <p:nvPr/>
         </p:nvSpPr>
         <p:spPr bwMode="white">
-          <a:xfrm rot="18840107">
-            <a:off x="7315020" y="4231308"/>
-            <a:ext cx="1524361" cy="594737"/>
+          <a:xfrm rot="18612045">
+            <a:off x="7006383" y="4304554"/>
+            <a:ext cx="2251346" cy="476089"/>
           </a:xfrm>
           <a:prstGeom prst="rect">
             <a:avLst/>
@@ -14612,7 +15044,7 @@
             <a:pPr algn="ctr"/>
             <a:r>
               <a:rPr lang="en-US" sz="2667" dirty="0" smtClean="0"/>
-              <a:t>ssh</a:t>
+              <a:t>ssh and HTTP</a:t>
             </a:r>
             <a:endParaRPr lang="en-US" sz="2667" dirty="0"/>
           </a:p>
@@ -14660,6 +15092,216 @@
           </a:prstGeom>
         </p:spPr>
       </p:pic>
+      <p:sp>
+        <p:nvSpPr>
+          <p:cNvPr id="18" name="Text Placeholder 2"/>
+          <p:cNvSpPr txBox="1">
+            <a:spLocks/>
+          </p:cNvSpPr>
+          <p:nvPr/>
+        </p:nvSpPr>
+        <p:spPr bwMode="white">
+          <a:xfrm rot="417780">
+            <a:off x="11525148" y="2293382"/>
+            <a:ext cx="1920459" cy="1450709"/>
+          </a:xfrm>
+          <a:prstGeom prst="rect">
+            <a:avLst/>
+          </a:prstGeom>
+        </p:spPr>
+        <p:txBody>
+          <a:bodyPr vert="horz" wrap="square" lIns="0" tIns="0" rIns="0" bIns="0" rtlCol="0">
+            <a:normAutofit/>
+          </a:bodyPr>
+          <a:lstStyle>
+            <a:lvl1pPr marL="0" indent="0" algn="l" defTabSz="914363" rtl="0" eaLnBrk="1" latinLnBrk="0" hangingPunct="1">
+              <a:lnSpc>
+                <a:spcPct val="100000"/>
+              </a:lnSpc>
+              <a:spcBef>
+                <a:spcPts val="600"/>
+              </a:spcBef>
+              <a:buSzPct val="90000"/>
+              <a:buFont typeface="Arial" pitchFamily="34" charset="0"/>
+              <a:buNone/>
+              <a:defRPr sz="3200" kern="1200" baseline="0">
+                <a:solidFill>
+                  <a:schemeClr val="accent3">
+                    <a:lumMod val="50000"/>
+                  </a:schemeClr>
+                </a:solidFill>
+                <a:latin typeface="+mn-lt"/>
+                <a:ea typeface="+mn-ea"/>
+                <a:cs typeface="+mn-cs"/>
+              </a:defRPr>
+            </a:lvl1pPr>
+            <a:lvl2pPr marL="231775" indent="0" algn="l" defTabSz="914363" rtl="0" eaLnBrk="1" latinLnBrk="0" hangingPunct="1">
+              <a:lnSpc>
+                <a:spcPct val="100000"/>
+              </a:lnSpc>
+              <a:spcBef>
+                <a:spcPts val="600"/>
+              </a:spcBef>
+              <a:buSzPct val="90000"/>
+              <a:buFont typeface="Arial" pitchFamily="34" charset="0"/>
+              <a:buNone/>
+              <a:defRPr sz="2800" kern="1200" baseline="0">
+                <a:solidFill>
+                  <a:schemeClr val="accent3">
+                    <a:lumMod val="50000"/>
+                  </a:schemeClr>
+                </a:solidFill>
+                <a:latin typeface="+mn-lt"/>
+                <a:ea typeface="+mn-ea"/>
+                <a:cs typeface="+mn-cs"/>
+              </a:defRPr>
+            </a:lvl2pPr>
+            <a:lvl3pPr marL="457200" indent="0" algn="l" defTabSz="914363" rtl="0" eaLnBrk="1" latinLnBrk="0" hangingPunct="1">
+              <a:lnSpc>
+                <a:spcPct val="100000"/>
+              </a:lnSpc>
+              <a:spcBef>
+                <a:spcPts val="600"/>
+              </a:spcBef>
+              <a:buSzPct val="90000"/>
+              <a:buFont typeface="Arial" pitchFamily="34" charset="0"/>
+              <a:buNone/>
+              <a:defRPr sz="2400" kern="1200" baseline="0">
+                <a:solidFill>
+                  <a:schemeClr val="accent3">
+                    <a:lumMod val="50000"/>
+                  </a:schemeClr>
+                </a:solidFill>
+                <a:latin typeface="+mn-lt"/>
+                <a:ea typeface="+mn-ea"/>
+                <a:cs typeface="+mn-cs"/>
+              </a:defRPr>
+            </a:lvl3pPr>
+            <a:lvl4pPr marL="630238" indent="0" algn="l" defTabSz="914363" rtl="0" eaLnBrk="1" latinLnBrk="0" hangingPunct="1">
+              <a:lnSpc>
+                <a:spcPct val="100000"/>
+              </a:lnSpc>
+              <a:spcBef>
+                <a:spcPts val="600"/>
+              </a:spcBef>
+              <a:buSzPct val="90000"/>
+              <a:buFont typeface="Arial" pitchFamily="34" charset="0"/>
+              <a:buNone/>
+              <a:defRPr sz="2000" kern="1200" baseline="0">
+                <a:solidFill>
+                  <a:schemeClr val="accent3">
+                    <a:lumMod val="50000"/>
+                  </a:schemeClr>
+                </a:solidFill>
+                <a:latin typeface="+mn-lt"/>
+                <a:ea typeface="+mn-ea"/>
+                <a:cs typeface="+mn-cs"/>
+              </a:defRPr>
+            </a:lvl4pPr>
+            <a:lvl5pPr marL="801687" indent="0" algn="l" defTabSz="914363" rtl="0" eaLnBrk="1" latinLnBrk="0" hangingPunct="1">
+              <a:lnSpc>
+                <a:spcPct val="100000"/>
+              </a:lnSpc>
+              <a:spcBef>
+                <a:spcPts val="600"/>
+              </a:spcBef>
+              <a:buSzPct val="90000"/>
+              <a:buFont typeface="Arial" pitchFamily="34" charset="0"/>
+              <a:buNone/>
+              <a:defRPr sz="1800" kern="1200" baseline="0">
+                <a:solidFill>
+                  <a:schemeClr val="accent3">
+                    <a:lumMod val="50000"/>
+                  </a:schemeClr>
+                </a:solidFill>
+                <a:latin typeface="+mn-lt"/>
+                <a:ea typeface="+mn-ea"/>
+                <a:cs typeface="+mn-cs"/>
+              </a:defRPr>
+            </a:lvl5pPr>
+            <a:lvl6pPr marL="2514499" indent="-228591" algn="l" defTabSz="914363" rtl="0" eaLnBrk="1" latinLnBrk="0" hangingPunct="1">
+              <a:spcBef>
+                <a:spcPct val="20000"/>
+              </a:spcBef>
+              <a:buFont typeface="Arial" pitchFamily="34" charset="0"/>
+              <a:buChar char="•"/>
+              <a:defRPr sz="2000" kern="1200">
+                <a:solidFill>
+                  <a:schemeClr val="tx1"/>
+                </a:solidFill>
+                <a:latin typeface="+mn-lt"/>
+                <a:ea typeface="+mn-ea"/>
+                <a:cs typeface="+mn-cs"/>
+              </a:defRPr>
+            </a:lvl6pPr>
+            <a:lvl7pPr marL="2971681" indent="-228591" algn="l" defTabSz="914363" rtl="0" eaLnBrk="1" latinLnBrk="0" hangingPunct="1">
+              <a:spcBef>
+                <a:spcPct val="20000"/>
+              </a:spcBef>
+              <a:buFont typeface="Arial" pitchFamily="34" charset="0"/>
+              <a:buChar char="•"/>
+              <a:defRPr sz="2000" kern="1200">
+                <a:solidFill>
+                  <a:schemeClr val="tx1"/>
+                </a:solidFill>
+                <a:latin typeface="+mn-lt"/>
+                <a:ea typeface="+mn-ea"/>
+                <a:cs typeface="+mn-cs"/>
+              </a:defRPr>
+            </a:lvl7pPr>
+            <a:lvl8pPr marL="3428863" indent="-228591" algn="l" defTabSz="914363" rtl="0" eaLnBrk="1" latinLnBrk="0" hangingPunct="1">
+              <a:spcBef>
+                <a:spcPct val="20000"/>
+              </a:spcBef>
+              <a:buFont typeface="Arial" pitchFamily="34" charset="0"/>
+              <a:buChar char="•"/>
+              <a:defRPr sz="2000" kern="1200">
+                <a:solidFill>
+                  <a:schemeClr val="tx1"/>
+                </a:solidFill>
+                <a:latin typeface="+mn-lt"/>
+                <a:ea typeface="+mn-ea"/>
+                <a:cs typeface="+mn-cs"/>
+              </a:defRPr>
+            </a:lvl8pPr>
+            <a:lvl9pPr marL="3886045" indent="-228591" algn="l" defTabSz="914363" rtl="0" eaLnBrk="1" latinLnBrk="0" hangingPunct="1">
+              <a:spcBef>
+                <a:spcPct val="20000"/>
+              </a:spcBef>
+              <a:buFont typeface="Arial" pitchFamily="34" charset="0"/>
+              <a:buChar char="•"/>
+              <a:defRPr sz="2000" kern="1200">
+                <a:solidFill>
+                  <a:schemeClr val="tx1"/>
+                </a:solidFill>
+                <a:latin typeface="+mn-lt"/>
+                <a:ea typeface="+mn-ea"/>
+                <a:cs typeface="+mn-cs"/>
+              </a:defRPr>
+            </a:lvl9pPr>
+          </a:lstStyle>
+          <a:p>
+            <a:pPr algn="ctr"/>
+            <a:r>
+              <a:rPr lang="en-US" sz="2667" dirty="0" smtClean="0"/>
+              <a:t>Compliance Scans</a:t>
+            </a:r>
+            <a:endParaRPr lang="en-US" sz="2667" dirty="0"/>
+          </a:p>
+          <a:p>
+            <a:endParaRPr lang="en-US" sz="2667" dirty="0"/>
+          </a:p>
+          <a:p>
+            <a:endParaRPr lang="en-US" sz="2667" dirty="0"/>
+          </a:p>
+          <a:p>
+            <a:endParaRPr lang="en-US" sz="4267" dirty="0"/>
+          </a:p>
+          <a:p>
+            <a:endParaRPr lang="en-US" sz="4267" dirty="0"/>
+          </a:p>
+        </p:txBody>
+      </p:sp>
     </p:spTree>
     <p:extLst>
       <p:ext uri="{BB962C8B-B14F-4D97-AF65-F5344CB8AC3E}">
@@ -14725,8 +15367,12 @@
           <a:lstStyle/>
           <a:p>
             <a:r>
-              <a:rPr lang="en-US" smtClean="0"/>
-              <a:t>SSH Into the Remote Workstation</a:t>
+              <a:rPr lang="en-US" dirty="0"/>
+              <a:t>Your Lab </a:t>
+            </a:r>
+            <a:r>
+              <a:rPr lang="en-US" dirty="0" smtClean="0"/>
+              <a:t>Environment for Remediation</a:t>
             </a:r>
             <a:endParaRPr lang="en-US" dirty="0"/>
           </a:p>
@@ -14734,55 +15380,1725 @@
       </p:sp>
       <p:sp>
         <p:nvSpPr>
-          <p:cNvPr id="11" name="Content Placeholder 10"/>
+          <p:cNvPr id="11" name="Text Placeholder 2"/>
+          <p:cNvSpPr txBox="1">
+            <a:spLocks/>
+          </p:cNvSpPr>
+          <p:nvPr/>
+        </p:nvSpPr>
+        <p:spPr bwMode="white">
+          <a:xfrm>
+            <a:off x="4866106" y="7265658"/>
+            <a:ext cx="3678991" cy="685571"/>
+          </a:xfrm>
+          <a:prstGeom prst="rect">
+            <a:avLst/>
+          </a:prstGeom>
+        </p:spPr>
+        <p:txBody>
+          <a:bodyPr vert="horz" wrap="square" lIns="0" tIns="0" rIns="0" bIns="0" rtlCol="0">
+            <a:normAutofit/>
+          </a:bodyPr>
+          <a:lstStyle>
+            <a:lvl1pPr marL="0" indent="0" algn="l" defTabSz="914363" rtl="0" eaLnBrk="1" latinLnBrk="0" hangingPunct="1">
+              <a:lnSpc>
+                <a:spcPct val="100000"/>
+              </a:lnSpc>
+              <a:spcBef>
+                <a:spcPts val="600"/>
+              </a:spcBef>
+              <a:buSzPct val="90000"/>
+              <a:buFont typeface="Arial" pitchFamily="34" charset="0"/>
+              <a:buNone/>
+              <a:defRPr sz="3200" kern="1200" baseline="0">
+                <a:solidFill>
+                  <a:schemeClr val="accent3">
+                    <a:lumMod val="50000"/>
+                  </a:schemeClr>
+                </a:solidFill>
+                <a:latin typeface="+mn-lt"/>
+                <a:ea typeface="+mn-ea"/>
+                <a:cs typeface="+mn-cs"/>
+              </a:defRPr>
+            </a:lvl1pPr>
+            <a:lvl2pPr marL="231775" indent="0" algn="l" defTabSz="914363" rtl="0" eaLnBrk="1" latinLnBrk="0" hangingPunct="1">
+              <a:lnSpc>
+                <a:spcPct val="100000"/>
+              </a:lnSpc>
+              <a:spcBef>
+                <a:spcPts val="600"/>
+              </a:spcBef>
+              <a:buSzPct val="90000"/>
+              <a:buFont typeface="Arial" pitchFamily="34" charset="0"/>
+              <a:buNone/>
+              <a:defRPr sz="2800" kern="1200" baseline="0">
+                <a:solidFill>
+                  <a:schemeClr val="accent3">
+                    <a:lumMod val="50000"/>
+                  </a:schemeClr>
+                </a:solidFill>
+                <a:latin typeface="+mn-lt"/>
+                <a:ea typeface="+mn-ea"/>
+                <a:cs typeface="+mn-cs"/>
+              </a:defRPr>
+            </a:lvl2pPr>
+            <a:lvl3pPr marL="457200" indent="0" algn="l" defTabSz="914363" rtl="0" eaLnBrk="1" latinLnBrk="0" hangingPunct="1">
+              <a:lnSpc>
+                <a:spcPct val="100000"/>
+              </a:lnSpc>
+              <a:spcBef>
+                <a:spcPts val="600"/>
+              </a:spcBef>
+              <a:buSzPct val="90000"/>
+              <a:buFont typeface="Arial" pitchFamily="34" charset="0"/>
+              <a:buNone/>
+              <a:defRPr sz="2400" kern="1200" baseline="0">
+                <a:solidFill>
+                  <a:schemeClr val="accent3">
+                    <a:lumMod val="50000"/>
+                  </a:schemeClr>
+                </a:solidFill>
+                <a:latin typeface="+mn-lt"/>
+                <a:ea typeface="+mn-ea"/>
+                <a:cs typeface="+mn-cs"/>
+              </a:defRPr>
+            </a:lvl3pPr>
+            <a:lvl4pPr marL="630238" indent="0" algn="l" defTabSz="914363" rtl="0" eaLnBrk="1" latinLnBrk="0" hangingPunct="1">
+              <a:lnSpc>
+                <a:spcPct val="100000"/>
+              </a:lnSpc>
+              <a:spcBef>
+                <a:spcPts val="600"/>
+              </a:spcBef>
+              <a:buSzPct val="90000"/>
+              <a:buFont typeface="Arial" pitchFamily="34" charset="0"/>
+              <a:buNone/>
+              <a:defRPr sz="2000" kern="1200" baseline="0">
+                <a:solidFill>
+                  <a:schemeClr val="accent3">
+                    <a:lumMod val="50000"/>
+                  </a:schemeClr>
+                </a:solidFill>
+                <a:latin typeface="+mn-lt"/>
+                <a:ea typeface="+mn-ea"/>
+                <a:cs typeface="+mn-cs"/>
+              </a:defRPr>
+            </a:lvl4pPr>
+            <a:lvl5pPr marL="801687" indent="0" algn="l" defTabSz="914363" rtl="0" eaLnBrk="1" latinLnBrk="0" hangingPunct="1">
+              <a:lnSpc>
+                <a:spcPct val="100000"/>
+              </a:lnSpc>
+              <a:spcBef>
+                <a:spcPts val="600"/>
+              </a:spcBef>
+              <a:buSzPct val="90000"/>
+              <a:buFont typeface="Arial" pitchFamily="34" charset="0"/>
+              <a:buNone/>
+              <a:defRPr sz="1800" kern="1200" baseline="0">
+                <a:solidFill>
+                  <a:schemeClr val="accent3">
+                    <a:lumMod val="50000"/>
+                  </a:schemeClr>
+                </a:solidFill>
+                <a:latin typeface="+mn-lt"/>
+                <a:ea typeface="+mn-ea"/>
+                <a:cs typeface="+mn-cs"/>
+              </a:defRPr>
+            </a:lvl5pPr>
+            <a:lvl6pPr marL="2514499" indent="-228591" algn="l" defTabSz="914363" rtl="0" eaLnBrk="1" latinLnBrk="0" hangingPunct="1">
+              <a:spcBef>
+                <a:spcPct val="20000"/>
+              </a:spcBef>
+              <a:buFont typeface="Arial" pitchFamily="34" charset="0"/>
+              <a:buChar char="•"/>
+              <a:defRPr sz="2000" kern="1200">
+                <a:solidFill>
+                  <a:schemeClr val="tx1"/>
+                </a:solidFill>
+                <a:latin typeface="+mn-lt"/>
+                <a:ea typeface="+mn-ea"/>
+                <a:cs typeface="+mn-cs"/>
+              </a:defRPr>
+            </a:lvl6pPr>
+            <a:lvl7pPr marL="2971681" indent="-228591" algn="l" defTabSz="914363" rtl="0" eaLnBrk="1" latinLnBrk="0" hangingPunct="1">
+              <a:spcBef>
+                <a:spcPct val="20000"/>
+              </a:spcBef>
+              <a:buFont typeface="Arial" pitchFamily="34" charset="0"/>
+              <a:buChar char="•"/>
+              <a:defRPr sz="2000" kern="1200">
+                <a:solidFill>
+                  <a:schemeClr val="tx1"/>
+                </a:solidFill>
+                <a:latin typeface="+mn-lt"/>
+                <a:ea typeface="+mn-ea"/>
+                <a:cs typeface="+mn-cs"/>
+              </a:defRPr>
+            </a:lvl7pPr>
+            <a:lvl8pPr marL="3428863" indent="-228591" algn="l" defTabSz="914363" rtl="0" eaLnBrk="1" latinLnBrk="0" hangingPunct="1">
+              <a:spcBef>
+                <a:spcPct val="20000"/>
+              </a:spcBef>
+              <a:buFont typeface="Arial" pitchFamily="34" charset="0"/>
+              <a:buChar char="•"/>
+              <a:defRPr sz="2000" kern="1200">
+                <a:solidFill>
+                  <a:schemeClr val="tx1"/>
+                </a:solidFill>
+                <a:latin typeface="+mn-lt"/>
+                <a:ea typeface="+mn-ea"/>
+                <a:cs typeface="+mn-cs"/>
+              </a:defRPr>
+            </a:lvl8pPr>
+            <a:lvl9pPr marL="3886045" indent="-228591" algn="l" defTabSz="914363" rtl="0" eaLnBrk="1" latinLnBrk="0" hangingPunct="1">
+              <a:spcBef>
+                <a:spcPct val="20000"/>
+              </a:spcBef>
+              <a:buFont typeface="Arial" pitchFamily="34" charset="0"/>
+              <a:buChar char="•"/>
+              <a:defRPr sz="2000" kern="1200">
+                <a:solidFill>
+                  <a:schemeClr val="tx1"/>
+                </a:solidFill>
+                <a:latin typeface="+mn-lt"/>
+                <a:ea typeface="+mn-ea"/>
+                <a:cs typeface="+mn-cs"/>
+              </a:defRPr>
+            </a:lvl9pPr>
+          </a:lstStyle>
+          <a:p>
+            <a:pPr algn="ctr"/>
+            <a:r>
+              <a:rPr lang="en-US" sz="2667" dirty="0"/>
+              <a:t>Your Laptop</a:t>
+            </a:r>
+          </a:p>
+          <a:p>
+            <a:endParaRPr lang="en-US" sz="2667" dirty="0"/>
+          </a:p>
+          <a:p>
+            <a:endParaRPr lang="en-US" sz="4267" dirty="0"/>
+          </a:p>
+          <a:p>
+            <a:endParaRPr lang="en-US" sz="4267" dirty="0"/>
+          </a:p>
+        </p:txBody>
+      </p:sp>
+      <p:sp>
+        <p:nvSpPr>
+          <p:cNvPr id="12" name="Text Placeholder 2"/>
+          <p:cNvSpPr txBox="1">
+            <a:spLocks/>
+          </p:cNvSpPr>
+          <p:nvPr/>
+        </p:nvSpPr>
+        <p:spPr bwMode="white">
+          <a:xfrm>
+            <a:off x="8508328" y="1016593"/>
+            <a:ext cx="3230631" cy="1842629"/>
+          </a:xfrm>
+          <a:prstGeom prst="rect">
+            <a:avLst/>
+          </a:prstGeom>
+        </p:spPr>
+        <p:txBody>
+          <a:bodyPr vert="horz" wrap="square" lIns="0" tIns="0" rIns="0" bIns="0" rtlCol="0">
+            <a:normAutofit/>
+          </a:bodyPr>
+          <a:lstStyle>
+            <a:lvl1pPr marL="0" indent="0" algn="l" defTabSz="914363" rtl="0" eaLnBrk="1" latinLnBrk="0" hangingPunct="1">
+              <a:lnSpc>
+                <a:spcPct val="100000"/>
+              </a:lnSpc>
+              <a:spcBef>
+                <a:spcPts val="600"/>
+              </a:spcBef>
+              <a:buSzPct val="90000"/>
+              <a:buFont typeface="Arial" pitchFamily="34" charset="0"/>
+              <a:buNone/>
+              <a:defRPr sz="3200" kern="1200" baseline="0">
+                <a:solidFill>
+                  <a:schemeClr val="accent3">
+                    <a:lumMod val="50000"/>
+                  </a:schemeClr>
+                </a:solidFill>
+                <a:latin typeface="+mn-lt"/>
+                <a:ea typeface="+mn-ea"/>
+                <a:cs typeface="+mn-cs"/>
+              </a:defRPr>
+            </a:lvl1pPr>
+            <a:lvl2pPr marL="231775" indent="0" algn="l" defTabSz="914363" rtl="0" eaLnBrk="1" latinLnBrk="0" hangingPunct="1">
+              <a:lnSpc>
+                <a:spcPct val="100000"/>
+              </a:lnSpc>
+              <a:spcBef>
+                <a:spcPts val="600"/>
+              </a:spcBef>
+              <a:buSzPct val="90000"/>
+              <a:buFont typeface="Arial" pitchFamily="34" charset="0"/>
+              <a:buNone/>
+              <a:defRPr sz="2800" kern="1200" baseline="0">
+                <a:solidFill>
+                  <a:schemeClr val="accent3">
+                    <a:lumMod val="50000"/>
+                  </a:schemeClr>
+                </a:solidFill>
+                <a:latin typeface="+mn-lt"/>
+                <a:ea typeface="+mn-ea"/>
+                <a:cs typeface="+mn-cs"/>
+              </a:defRPr>
+            </a:lvl2pPr>
+            <a:lvl3pPr marL="457200" indent="0" algn="l" defTabSz="914363" rtl="0" eaLnBrk="1" latinLnBrk="0" hangingPunct="1">
+              <a:lnSpc>
+                <a:spcPct val="100000"/>
+              </a:lnSpc>
+              <a:spcBef>
+                <a:spcPts val="600"/>
+              </a:spcBef>
+              <a:buSzPct val="90000"/>
+              <a:buFont typeface="Arial" pitchFamily="34" charset="0"/>
+              <a:buNone/>
+              <a:defRPr sz="2400" kern="1200" baseline="0">
+                <a:solidFill>
+                  <a:schemeClr val="accent3">
+                    <a:lumMod val="50000"/>
+                  </a:schemeClr>
+                </a:solidFill>
+                <a:latin typeface="+mn-lt"/>
+                <a:ea typeface="+mn-ea"/>
+                <a:cs typeface="+mn-cs"/>
+              </a:defRPr>
+            </a:lvl3pPr>
+            <a:lvl4pPr marL="630238" indent="0" algn="l" defTabSz="914363" rtl="0" eaLnBrk="1" latinLnBrk="0" hangingPunct="1">
+              <a:lnSpc>
+                <a:spcPct val="100000"/>
+              </a:lnSpc>
+              <a:spcBef>
+                <a:spcPts val="600"/>
+              </a:spcBef>
+              <a:buSzPct val="90000"/>
+              <a:buFont typeface="Arial" pitchFamily="34" charset="0"/>
+              <a:buNone/>
+              <a:defRPr sz="2000" kern="1200" baseline="0">
+                <a:solidFill>
+                  <a:schemeClr val="accent3">
+                    <a:lumMod val="50000"/>
+                  </a:schemeClr>
+                </a:solidFill>
+                <a:latin typeface="+mn-lt"/>
+                <a:ea typeface="+mn-ea"/>
+                <a:cs typeface="+mn-cs"/>
+              </a:defRPr>
+            </a:lvl4pPr>
+            <a:lvl5pPr marL="801687" indent="0" algn="l" defTabSz="914363" rtl="0" eaLnBrk="1" latinLnBrk="0" hangingPunct="1">
+              <a:lnSpc>
+                <a:spcPct val="100000"/>
+              </a:lnSpc>
+              <a:spcBef>
+                <a:spcPts val="600"/>
+              </a:spcBef>
+              <a:buSzPct val="90000"/>
+              <a:buFont typeface="Arial" pitchFamily="34" charset="0"/>
+              <a:buNone/>
+              <a:defRPr sz="1800" kern="1200" baseline="0">
+                <a:solidFill>
+                  <a:schemeClr val="accent3">
+                    <a:lumMod val="50000"/>
+                  </a:schemeClr>
+                </a:solidFill>
+                <a:latin typeface="+mn-lt"/>
+                <a:ea typeface="+mn-ea"/>
+                <a:cs typeface="+mn-cs"/>
+              </a:defRPr>
+            </a:lvl5pPr>
+            <a:lvl6pPr marL="2514499" indent="-228591" algn="l" defTabSz="914363" rtl="0" eaLnBrk="1" latinLnBrk="0" hangingPunct="1">
+              <a:spcBef>
+                <a:spcPct val="20000"/>
+              </a:spcBef>
+              <a:buFont typeface="Arial" pitchFamily="34" charset="0"/>
+              <a:buChar char="•"/>
+              <a:defRPr sz="2000" kern="1200">
+                <a:solidFill>
+                  <a:schemeClr val="tx1"/>
+                </a:solidFill>
+                <a:latin typeface="+mn-lt"/>
+                <a:ea typeface="+mn-ea"/>
+                <a:cs typeface="+mn-cs"/>
+              </a:defRPr>
+            </a:lvl6pPr>
+            <a:lvl7pPr marL="2971681" indent="-228591" algn="l" defTabSz="914363" rtl="0" eaLnBrk="1" latinLnBrk="0" hangingPunct="1">
+              <a:spcBef>
+                <a:spcPct val="20000"/>
+              </a:spcBef>
+              <a:buFont typeface="Arial" pitchFamily="34" charset="0"/>
+              <a:buChar char="•"/>
+              <a:defRPr sz="2000" kern="1200">
+                <a:solidFill>
+                  <a:schemeClr val="tx1"/>
+                </a:solidFill>
+                <a:latin typeface="+mn-lt"/>
+                <a:ea typeface="+mn-ea"/>
+                <a:cs typeface="+mn-cs"/>
+              </a:defRPr>
+            </a:lvl7pPr>
+            <a:lvl8pPr marL="3428863" indent="-228591" algn="l" defTabSz="914363" rtl="0" eaLnBrk="1" latinLnBrk="0" hangingPunct="1">
+              <a:spcBef>
+                <a:spcPct val="20000"/>
+              </a:spcBef>
+              <a:buFont typeface="Arial" pitchFamily="34" charset="0"/>
+              <a:buChar char="•"/>
+              <a:defRPr sz="2000" kern="1200">
+                <a:solidFill>
+                  <a:schemeClr val="tx1"/>
+                </a:solidFill>
+                <a:latin typeface="+mn-lt"/>
+                <a:ea typeface="+mn-ea"/>
+                <a:cs typeface="+mn-cs"/>
+              </a:defRPr>
+            </a:lvl8pPr>
+            <a:lvl9pPr marL="3886045" indent="-228591" algn="l" defTabSz="914363" rtl="0" eaLnBrk="1" latinLnBrk="0" hangingPunct="1">
+              <a:spcBef>
+                <a:spcPct val="20000"/>
+              </a:spcBef>
+              <a:buFont typeface="Arial" pitchFamily="34" charset="0"/>
+              <a:buChar char="•"/>
+              <a:defRPr sz="2000" kern="1200">
+                <a:solidFill>
+                  <a:schemeClr val="tx1"/>
+                </a:solidFill>
+                <a:latin typeface="+mn-lt"/>
+                <a:ea typeface="+mn-ea"/>
+                <a:cs typeface="+mn-cs"/>
+              </a:defRPr>
+            </a:lvl9pPr>
+          </a:lstStyle>
+          <a:p>
+            <a:pPr algn="ctr"/>
+            <a:r>
+              <a:rPr lang="en-US" sz="2667" dirty="0" smtClean="0"/>
+              <a:t>Compliance</a:t>
+            </a:r>
+          </a:p>
+          <a:p>
+            <a:pPr algn="ctr"/>
+            <a:r>
+              <a:rPr lang="en-US" sz="2667" dirty="0" smtClean="0"/>
+              <a:t>Server</a:t>
+            </a:r>
+            <a:endParaRPr lang="en-US" sz="2667" dirty="0"/>
+          </a:p>
+          <a:p>
+            <a:endParaRPr lang="en-US" sz="2667" dirty="0"/>
+          </a:p>
+          <a:p>
+            <a:endParaRPr lang="en-US" sz="2667" dirty="0"/>
+          </a:p>
+          <a:p>
+            <a:endParaRPr lang="en-US" sz="4267" dirty="0"/>
+          </a:p>
+          <a:p>
+            <a:endParaRPr lang="en-US" sz="4267" dirty="0"/>
+          </a:p>
+        </p:txBody>
+      </p:sp>
+      <p:pic>
+        <p:nvPicPr>
+          <p:cNvPr id="5" name="Picture 4"/>
+          <p:cNvPicPr>
+            <a:picLocks noChangeAspect="1"/>
+          </p:cNvPicPr>
+          <p:nvPr/>
+        </p:nvPicPr>
+        <p:blipFill>
+          <a:blip r:embed="rId3">
+            <a:extLst>
+              <a:ext uri="{28A0092B-C50C-407E-A947-70E740481C1C}">
+                <a14:useLocalDpi xmlns:a14="http://schemas.microsoft.com/office/drawing/2010/main" val="0"/>
+              </a:ext>
+            </a:extLst>
+          </a:blip>
+          <a:stretch>
+            <a:fillRect/>
+          </a:stretch>
+        </p:blipFill>
+        <p:spPr>
+          <a:xfrm>
+            <a:off x="9047831" y="2073655"/>
+            <a:ext cx="2151627" cy="2294080"/>
+          </a:xfrm>
+          <a:prstGeom prst="rect">
+            <a:avLst/>
+          </a:prstGeom>
+        </p:spPr>
+      </p:pic>
+      <p:pic>
+        <p:nvPicPr>
+          <p:cNvPr id="3" name="Picture 2"/>
+          <p:cNvPicPr>
+            <a:picLocks noChangeAspect="1"/>
+          </p:cNvPicPr>
+          <p:nvPr/>
+        </p:nvPicPr>
+        <p:blipFill>
+          <a:blip r:embed="rId4">
+            <a:extLst>
+              <a:ext uri="{28A0092B-C50C-407E-A947-70E740481C1C}">
+                <a14:useLocalDpi xmlns:a14="http://schemas.microsoft.com/office/drawing/2010/main" val="0"/>
+              </a:ext>
+            </a:extLst>
+          </a:blip>
+          <a:stretch>
+            <a:fillRect/>
+          </a:stretch>
+        </p:blipFill>
+        <p:spPr>
+          <a:xfrm>
+            <a:off x="5831738" y="5771901"/>
+            <a:ext cx="1701573" cy="1283742"/>
+          </a:xfrm>
+          <a:prstGeom prst="rect">
+            <a:avLst/>
+          </a:prstGeom>
+        </p:spPr>
+      </p:pic>
+      <p:pic>
+        <p:nvPicPr>
+          <p:cNvPr id="13" name="Picture 12"/>
+          <p:cNvPicPr>
+            <a:picLocks noChangeAspect="1"/>
+          </p:cNvPicPr>
+          <p:nvPr/>
+        </p:nvPicPr>
+        <p:blipFill>
+          <a:blip r:embed="rId3">
+            <a:extLst>
+              <a:ext uri="{28A0092B-C50C-407E-A947-70E740481C1C}">
+                <a14:useLocalDpi xmlns:a14="http://schemas.microsoft.com/office/drawing/2010/main" val="0"/>
+              </a:ext>
+            </a:extLst>
+          </a:blip>
+          <a:stretch>
+            <a:fillRect/>
+          </a:stretch>
+        </p:blipFill>
+        <p:spPr>
+          <a:xfrm>
+            <a:off x="13796296" y="1985425"/>
+            <a:ext cx="2151627" cy="2294080"/>
+          </a:xfrm>
+          <a:prstGeom prst="rect">
+            <a:avLst/>
+          </a:prstGeom>
+        </p:spPr>
+      </p:pic>
+      <p:sp>
+        <p:nvSpPr>
+          <p:cNvPr id="14" name="Text Placeholder 2"/>
+          <p:cNvSpPr txBox="1">
+            <a:spLocks/>
+          </p:cNvSpPr>
+          <p:nvPr/>
+        </p:nvSpPr>
+        <p:spPr bwMode="white">
+          <a:xfrm>
+            <a:off x="13116275" y="5115528"/>
+            <a:ext cx="3230631" cy="1842629"/>
+          </a:xfrm>
+          <a:prstGeom prst="rect">
+            <a:avLst/>
+          </a:prstGeom>
+        </p:spPr>
+        <p:txBody>
+          <a:bodyPr vert="horz" wrap="square" lIns="0" tIns="0" rIns="0" bIns="0" rtlCol="0">
+            <a:normAutofit lnSpcReduction="10000"/>
+          </a:bodyPr>
+          <a:lstStyle>
+            <a:lvl1pPr marL="0" indent="0" algn="l" defTabSz="914363" rtl="0" eaLnBrk="1" latinLnBrk="0" hangingPunct="1">
+              <a:lnSpc>
+                <a:spcPct val="100000"/>
+              </a:lnSpc>
+              <a:spcBef>
+                <a:spcPts val="600"/>
+              </a:spcBef>
+              <a:buSzPct val="90000"/>
+              <a:buFont typeface="Arial" pitchFamily="34" charset="0"/>
+              <a:buNone/>
+              <a:defRPr sz="3200" kern="1200" baseline="0">
+                <a:solidFill>
+                  <a:schemeClr val="accent3">
+                    <a:lumMod val="50000"/>
+                  </a:schemeClr>
+                </a:solidFill>
+                <a:latin typeface="+mn-lt"/>
+                <a:ea typeface="+mn-ea"/>
+                <a:cs typeface="+mn-cs"/>
+              </a:defRPr>
+            </a:lvl1pPr>
+            <a:lvl2pPr marL="231775" indent="0" algn="l" defTabSz="914363" rtl="0" eaLnBrk="1" latinLnBrk="0" hangingPunct="1">
+              <a:lnSpc>
+                <a:spcPct val="100000"/>
+              </a:lnSpc>
+              <a:spcBef>
+                <a:spcPts val="600"/>
+              </a:spcBef>
+              <a:buSzPct val="90000"/>
+              <a:buFont typeface="Arial" pitchFamily="34" charset="0"/>
+              <a:buNone/>
+              <a:defRPr sz="2800" kern="1200" baseline="0">
+                <a:solidFill>
+                  <a:schemeClr val="accent3">
+                    <a:lumMod val="50000"/>
+                  </a:schemeClr>
+                </a:solidFill>
+                <a:latin typeface="+mn-lt"/>
+                <a:ea typeface="+mn-ea"/>
+                <a:cs typeface="+mn-cs"/>
+              </a:defRPr>
+            </a:lvl2pPr>
+            <a:lvl3pPr marL="457200" indent="0" algn="l" defTabSz="914363" rtl="0" eaLnBrk="1" latinLnBrk="0" hangingPunct="1">
+              <a:lnSpc>
+                <a:spcPct val="100000"/>
+              </a:lnSpc>
+              <a:spcBef>
+                <a:spcPts val="600"/>
+              </a:spcBef>
+              <a:buSzPct val="90000"/>
+              <a:buFont typeface="Arial" pitchFamily="34" charset="0"/>
+              <a:buNone/>
+              <a:defRPr sz="2400" kern="1200" baseline="0">
+                <a:solidFill>
+                  <a:schemeClr val="accent3">
+                    <a:lumMod val="50000"/>
+                  </a:schemeClr>
+                </a:solidFill>
+                <a:latin typeface="+mn-lt"/>
+                <a:ea typeface="+mn-ea"/>
+                <a:cs typeface="+mn-cs"/>
+              </a:defRPr>
+            </a:lvl3pPr>
+            <a:lvl4pPr marL="630238" indent="0" algn="l" defTabSz="914363" rtl="0" eaLnBrk="1" latinLnBrk="0" hangingPunct="1">
+              <a:lnSpc>
+                <a:spcPct val="100000"/>
+              </a:lnSpc>
+              <a:spcBef>
+                <a:spcPts val="600"/>
+              </a:spcBef>
+              <a:buSzPct val="90000"/>
+              <a:buFont typeface="Arial" pitchFamily="34" charset="0"/>
+              <a:buNone/>
+              <a:defRPr sz="2000" kern="1200" baseline="0">
+                <a:solidFill>
+                  <a:schemeClr val="accent3">
+                    <a:lumMod val="50000"/>
+                  </a:schemeClr>
+                </a:solidFill>
+                <a:latin typeface="+mn-lt"/>
+                <a:ea typeface="+mn-ea"/>
+                <a:cs typeface="+mn-cs"/>
+              </a:defRPr>
+            </a:lvl4pPr>
+            <a:lvl5pPr marL="801687" indent="0" algn="l" defTabSz="914363" rtl="0" eaLnBrk="1" latinLnBrk="0" hangingPunct="1">
+              <a:lnSpc>
+                <a:spcPct val="100000"/>
+              </a:lnSpc>
+              <a:spcBef>
+                <a:spcPts val="600"/>
+              </a:spcBef>
+              <a:buSzPct val="90000"/>
+              <a:buFont typeface="Arial" pitchFamily="34" charset="0"/>
+              <a:buNone/>
+              <a:defRPr sz="1800" kern="1200" baseline="0">
+                <a:solidFill>
+                  <a:schemeClr val="accent3">
+                    <a:lumMod val="50000"/>
+                  </a:schemeClr>
+                </a:solidFill>
+                <a:latin typeface="+mn-lt"/>
+                <a:ea typeface="+mn-ea"/>
+                <a:cs typeface="+mn-cs"/>
+              </a:defRPr>
+            </a:lvl5pPr>
+            <a:lvl6pPr marL="2514499" indent="-228591" algn="l" defTabSz="914363" rtl="0" eaLnBrk="1" latinLnBrk="0" hangingPunct="1">
+              <a:spcBef>
+                <a:spcPct val="20000"/>
+              </a:spcBef>
+              <a:buFont typeface="Arial" pitchFamily="34" charset="0"/>
+              <a:buChar char="•"/>
+              <a:defRPr sz="2000" kern="1200">
+                <a:solidFill>
+                  <a:schemeClr val="tx1"/>
+                </a:solidFill>
+                <a:latin typeface="+mn-lt"/>
+                <a:ea typeface="+mn-ea"/>
+                <a:cs typeface="+mn-cs"/>
+              </a:defRPr>
+            </a:lvl6pPr>
+            <a:lvl7pPr marL="2971681" indent="-228591" algn="l" defTabSz="914363" rtl="0" eaLnBrk="1" latinLnBrk="0" hangingPunct="1">
+              <a:spcBef>
+                <a:spcPct val="20000"/>
+              </a:spcBef>
+              <a:buFont typeface="Arial" pitchFamily="34" charset="0"/>
+              <a:buChar char="•"/>
+              <a:defRPr sz="2000" kern="1200">
+                <a:solidFill>
+                  <a:schemeClr val="tx1"/>
+                </a:solidFill>
+                <a:latin typeface="+mn-lt"/>
+                <a:ea typeface="+mn-ea"/>
+                <a:cs typeface="+mn-cs"/>
+              </a:defRPr>
+            </a:lvl7pPr>
+            <a:lvl8pPr marL="3428863" indent="-228591" algn="l" defTabSz="914363" rtl="0" eaLnBrk="1" latinLnBrk="0" hangingPunct="1">
+              <a:spcBef>
+                <a:spcPct val="20000"/>
+              </a:spcBef>
+              <a:buFont typeface="Arial" pitchFamily="34" charset="0"/>
+              <a:buChar char="•"/>
+              <a:defRPr sz="2000" kern="1200">
+                <a:solidFill>
+                  <a:schemeClr val="tx1"/>
+                </a:solidFill>
+                <a:latin typeface="+mn-lt"/>
+                <a:ea typeface="+mn-ea"/>
+                <a:cs typeface="+mn-cs"/>
+              </a:defRPr>
+            </a:lvl8pPr>
+            <a:lvl9pPr marL="3886045" indent="-228591" algn="l" defTabSz="914363" rtl="0" eaLnBrk="1" latinLnBrk="0" hangingPunct="1">
+              <a:spcBef>
+                <a:spcPct val="20000"/>
+              </a:spcBef>
+              <a:buFont typeface="Arial" pitchFamily="34" charset="0"/>
+              <a:buChar char="•"/>
+              <a:defRPr sz="2000" kern="1200">
+                <a:solidFill>
+                  <a:schemeClr val="tx1"/>
+                </a:solidFill>
+                <a:latin typeface="+mn-lt"/>
+                <a:ea typeface="+mn-ea"/>
+                <a:cs typeface="+mn-cs"/>
+              </a:defRPr>
+            </a:lvl9pPr>
+          </a:lstStyle>
+          <a:p>
+            <a:pPr algn="ctr"/>
+            <a:r>
+              <a:rPr lang="en-US" sz="2667" dirty="0" smtClean="0"/>
+              <a:t>Nodes to run Compliance tests </a:t>
+            </a:r>
+            <a:r>
+              <a:rPr lang="en-US" sz="2667" dirty="0" smtClean="0"/>
+              <a:t>against AND use as workstations for writing remediation</a:t>
+            </a:r>
+            <a:endParaRPr lang="en-US" sz="2667" dirty="0"/>
+          </a:p>
+          <a:p>
+            <a:endParaRPr lang="en-US" sz="2667" dirty="0"/>
+          </a:p>
+          <a:p>
+            <a:endParaRPr lang="en-US" sz="2667" dirty="0"/>
+          </a:p>
+          <a:p>
+            <a:endParaRPr lang="en-US" sz="4267" dirty="0"/>
+          </a:p>
+          <a:p>
+            <a:endParaRPr lang="en-US" sz="4267" dirty="0"/>
+          </a:p>
+        </p:txBody>
+      </p:sp>
+      <p:sp>
+        <p:nvSpPr>
+          <p:cNvPr id="23" name="Text Placeholder 2"/>
           <p:cNvSpPr>
             <a:spLocks noGrp="1"/>
           </p:cNvSpPr>
           <p:nvPr>
-            <p:ph sz="quarter" idx="10"/>
+            <p:ph type="body" sz="quarter" idx="12"/>
           </p:nvPr>
         </p:nvSpPr>
         <p:spPr>
           <a:xfrm>
-            <a:off x="1121104" y="2315962"/>
-            <a:ext cx="14423693" cy="4806733"/>
+            <a:off x="337220" y="1317184"/>
+            <a:ext cx="6017521" cy="5345953"/>
           </a:xfrm>
         </p:spPr>
         <p:txBody>
           <a:bodyPr/>
           <a:lstStyle/>
           <a:p>
+            <a:r>
+              <a:rPr lang="en-US" dirty="0"/>
+              <a:t>Y</a:t>
+            </a:r>
+            <a:r>
+              <a:rPr lang="en-US" dirty="0" smtClean="0"/>
+              <a:t>ou will also log into your Windows and Linux nodes in order to write remediation and run chef-client in local mode.</a:t>
+            </a:r>
+          </a:p>
+          <a:p>
             <a:endParaRPr lang="en-US" dirty="0"/>
+          </a:p>
+          <a:p>
+            <a:r>
+              <a:rPr lang="en-US" dirty="0" smtClean="0"/>
+              <a:t>This is so you can use those nodes as virtual workstations while writing remediation.</a:t>
+            </a:r>
+            <a:endParaRPr lang="en-US" dirty="0" smtClean="0"/>
+          </a:p>
+          <a:p>
+            <a:endParaRPr lang="en-US" dirty="0"/>
+          </a:p>
+        </p:txBody>
+      </p:sp>
+      <p:pic>
+        <p:nvPicPr>
+          <p:cNvPr id="17" name="Picture 16"/>
+          <p:cNvPicPr>
+            <a:picLocks noChangeAspect="1"/>
+          </p:cNvPicPr>
+          <p:nvPr/>
+        </p:nvPicPr>
+        <p:blipFill>
+          <a:blip r:embed="rId3">
+            <a:extLst>
+              <a:ext uri="{28A0092B-C50C-407E-A947-70E740481C1C}">
+                <a14:useLocalDpi xmlns:a14="http://schemas.microsoft.com/office/drawing/2010/main" val="0"/>
+              </a:ext>
+            </a:extLst>
+          </a:blip>
+          <a:stretch>
+            <a:fillRect/>
+          </a:stretch>
+        </p:blipFill>
+        <p:spPr>
+          <a:xfrm>
+            <a:off x="14093074" y="2715337"/>
+            <a:ext cx="2151627" cy="2294080"/>
+          </a:xfrm>
+          <a:prstGeom prst="rect">
+            <a:avLst/>
+          </a:prstGeom>
+        </p:spPr>
+      </p:pic>
+      <p:cxnSp>
+        <p:nvCxnSpPr>
+          <p:cNvPr id="18" name="Straight Arrow Connector 17"/>
+          <p:cNvCxnSpPr/>
+          <p:nvPr/>
+        </p:nvCxnSpPr>
+        <p:spPr>
+          <a:xfrm flipH="1">
+            <a:off x="7631026" y="4333430"/>
+            <a:ext cx="6846764" cy="2282713"/>
+          </a:xfrm>
+          <a:prstGeom prst="straightConnector1">
+            <a:avLst/>
+          </a:prstGeom>
+          <a:ln>
+            <a:solidFill>
+              <a:schemeClr val="accent1"/>
+            </a:solidFill>
+            <a:prstDash val="sysDash"/>
+            <a:headEnd type="triangle"/>
+            <a:tailEnd type="triangle"/>
+          </a:ln>
+        </p:spPr>
+        <p:style>
+          <a:lnRef idx="3">
+            <a:schemeClr val="accent1"/>
+          </a:lnRef>
+          <a:fillRef idx="0">
+            <a:schemeClr val="accent1"/>
+          </a:fillRef>
+          <a:effectRef idx="2">
+            <a:schemeClr val="accent1"/>
+          </a:effectRef>
+          <a:fontRef idx="minor">
+            <a:schemeClr val="tx1"/>
+          </a:fontRef>
+        </p:style>
+      </p:cxnSp>
+      <p:cxnSp>
+        <p:nvCxnSpPr>
+          <p:cNvPr id="19" name="Straight Arrow Connector 18"/>
+          <p:cNvCxnSpPr/>
+          <p:nvPr/>
+        </p:nvCxnSpPr>
+        <p:spPr>
+          <a:xfrm flipH="1">
+            <a:off x="7783426" y="3489531"/>
+            <a:ext cx="6335785" cy="2653373"/>
+          </a:xfrm>
+          <a:prstGeom prst="straightConnector1">
+            <a:avLst/>
+          </a:prstGeom>
+          <a:ln>
+            <a:solidFill>
+              <a:schemeClr val="accent1"/>
+            </a:solidFill>
+            <a:prstDash val="sysDash"/>
+            <a:headEnd type="triangle"/>
+            <a:tailEnd type="triangle"/>
+          </a:ln>
+        </p:spPr>
+        <p:style>
+          <a:lnRef idx="3">
+            <a:schemeClr val="accent1"/>
+          </a:lnRef>
+          <a:fillRef idx="0">
+            <a:schemeClr val="accent1"/>
+          </a:fillRef>
+          <a:effectRef idx="2">
+            <a:schemeClr val="accent1"/>
+          </a:effectRef>
+          <a:fontRef idx="minor">
+            <a:schemeClr val="tx1"/>
+          </a:fontRef>
+        </p:style>
+      </p:cxnSp>
+      <p:sp>
+        <p:nvSpPr>
+          <p:cNvPr id="20" name="Text Placeholder 2"/>
+          <p:cNvSpPr txBox="1">
+            <a:spLocks/>
+          </p:cNvSpPr>
+          <p:nvPr/>
+        </p:nvSpPr>
+        <p:spPr bwMode="white">
+          <a:xfrm rot="20423244">
+            <a:off x="10173178" y="4287908"/>
+            <a:ext cx="1524361" cy="594737"/>
+          </a:xfrm>
+          <a:prstGeom prst="rect">
+            <a:avLst/>
+          </a:prstGeom>
+        </p:spPr>
+        <p:txBody>
+          <a:bodyPr vert="horz" wrap="square" lIns="0" tIns="0" rIns="0" bIns="0" rtlCol="0">
+            <a:normAutofit/>
+          </a:bodyPr>
+          <a:lstStyle>
+            <a:lvl1pPr marL="0" indent="0" algn="l" defTabSz="914363" rtl="0" eaLnBrk="1" latinLnBrk="0" hangingPunct="1">
+              <a:lnSpc>
+                <a:spcPct val="100000"/>
+              </a:lnSpc>
+              <a:spcBef>
+                <a:spcPts val="600"/>
+              </a:spcBef>
+              <a:buSzPct val="90000"/>
+              <a:buFont typeface="Arial" pitchFamily="34" charset="0"/>
+              <a:buNone/>
+              <a:defRPr sz="3200" kern="1200" baseline="0">
+                <a:solidFill>
+                  <a:schemeClr val="accent3">
+                    <a:lumMod val="50000"/>
+                  </a:schemeClr>
+                </a:solidFill>
+                <a:latin typeface="+mn-lt"/>
+                <a:ea typeface="+mn-ea"/>
+                <a:cs typeface="+mn-cs"/>
+              </a:defRPr>
+            </a:lvl1pPr>
+            <a:lvl2pPr marL="231775" indent="0" algn="l" defTabSz="914363" rtl="0" eaLnBrk="1" latinLnBrk="0" hangingPunct="1">
+              <a:lnSpc>
+                <a:spcPct val="100000"/>
+              </a:lnSpc>
+              <a:spcBef>
+                <a:spcPts val="600"/>
+              </a:spcBef>
+              <a:buSzPct val="90000"/>
+              <a:buFont typeface="Arial" pitchFamily="34" charset="0"/>
+              <a:buNone/>
+              <a:defRPr sz="2800" kern="1200" baseline="0">
+                <a:solidFill>
+                  <a:schemeClr val="accent3">
+                    <a:lumMod val="50000"/>
+                  </a:schemeClr>
+                </a:solidFill>
+                <a:latin typeface="+mn-lt"/>
+                <a:ea typeface="+mn-ea"/>
+                <a:cs typeface="+mn-cs"/>
+              </a:defRPr>
+            </a:lvl2pPr>
+            <a:lvl3pPr marL="457200" indent="0" algn="l" defTabSz="914363" rtl="0" eaLnBrk="1" latinLnBrk="0" hangingPunct="1">
+              <a:lnSpc>
+                <a:spcPct val="100000"/>
+              </a:lnSpc>
+              <a:spcBef>
+                <a:spcPts val="600"/>
+              </a:spcBef>
+              <a:buSzPct val="90000"/>
+              <a:buFont typeface="Arial" pitchFamily="34" charset="0"/>
+              <a:buNone/>
+              <a:defRPr sz="2400" kern="1200" baseline="0">
+                <a:solidFill>
+                  <a:schemeClr val="accent3">
+                    <a:lumMod val="50000"/>
+                  </a:schemeClr>
+                </a:solidFill>
+                <a:latin typeface="+mn-lt"/>
+                <a:ea typeface="+mn-ea"/>
+                <a:cs typeface="+mn-cs"/>
+              </a:defRPr>
+            </a:lvl3pPr>
+            <a:lvl4pPr marL="630238" indent="0" algn="l" defTabSz="914363" rtl="0" eaLnBrk="1" latinLnBrk="0" hangingPunct="1">
+              <a:lnSpc>
+                <a:spcPct val="100000"/>
+              </a:lnSpc>
+              <a:spcBef>
+                <a:spcPts val="600"/>
+              </a:spcBef>
+              <a:buSzPct val="90000"/>
+              <a:buFont typeface="Arial" pitchFamily="34" charset="0"/>
+              <a:buNone/>
+              <a:defRPr sz="2000" kern="1200" baseline="0">
+                <a:solidFill>
+                  <a:schemeClr val="accent3">
+                    <a:lumMod val="50000"/>
+                  </a:schemeClr>
+                </a:solidFill>
+                <a:latin typeface="+mn-lt"/>
+                <a:ea typeface="+mn-ea"/>
+                <a:cs typeface="+mn-cs"/>
+              </a:defRPr>
+            </a:lvl4pPr>
+            <a:lvl5pPr marL="801687" indent="0" algn="l" defTabSz="914363" rtl="0" eaLnBrk="1" latinLnBrk="0" hangingPunct="1">
+              <a:lnSpc>
+                <a:spcPct val="100000"/>
+              </a:lnSpc>
+              <a:spcBef>
+                <a:spcPts val="600"/>
+              </a:spcBef>
+              <a:buSzPct val="90000"/>
+              <a:buFont typeface="Arial" pitchFamily="34" charset="0"/>
+              <a:buNone/>
+              <a:defRPr sz="1800" kern="1200" baseline="0">
+                <a:solidFill>
+                  <a:schemeClr val="accent3">
+                    <a:lumMod val="50000"/>
+                  </a:schemeClr>
+                </a:solidFill>
+                <a:latin typeface="+mn-lt"/>
+                <a:ea typeface="+mn-ea"/>
+                <a:cs typeface="+mn-cs"/>
+              </a:defRPr>
+            </a:lvl5pPr>
+            <a:lvl6pPr marL="2514499" indent="-228591" algn="l" defTabSz="914363" rtl="0" eaLnBrk="1" latinLnBrk="0" hangingPunct="1">
+              <a:spcBef>
+                <a:spcPct val="20000"/>
+              </a:spcBef>
+              <a:buFont typeface="Arial" pitchFamily="34" charset="0"/>
+              <a:buChar char="•"/>
+              <a:defRPr sz="2000" kern="1200">
+                <a:solidFill>
+                  <a:schemeClr val="tx1"/>
+                </a:solidFill>
+                <a:latin typeface="+mn-lt"/>
+                <a:ea typeface="+mn-ea"/>
+                <a:cs typeface="+mn-cs"/>
+              </a:defRPr>
+            </a:lvl6pPr>
+            <a:lvl7pPr marL="2971681" indent="-228591" algn="l" defTabSz="914363" rtl="0" eaLnBrk="1" latinLnBrk="0" hangingPunct="1">
+              <a:spcBef>
+                <a:spcPct val="20000"/>
+              </a:spcBef>
+              <a:buFont typeface="Arial" pitchFamily="34" charset="0"/>
+              <a:buChar char="•"/>
+              <a:defRPr sz="2000" kern="1200">
+                <a:solidFill>
+                  <a:schemeClr val="tx1"/>
+                </a:solidFill>
+                <a:latin typeface="+mn-lt"/>
+                <a:ea typeface="+mn-ea"/>
+                <a:cs typeface="+mn-cs"/>
+              </a:defRPr>
+            </a:lvl7pPr>
+            <a:lvl8pPr marL="3428863" indent="-228591" algn="l" defTabSz="914363" rtl="0" eaLnBrk="1" latinLnBrk="0" hangingPunct="1">
+              <a:spcBef>
+                <a:spcPct val="20000"/>
+              </a:spcBef>
+              <a:buFont typeface="Arial" pitchFamily="34" charset="0"/>
+              <a:buChar char="•"/>
+              <a:defRPr sz="2000" kern="1200">
+                <a:solidFill>
+                  <a:schemeClr val="tx1"/>
+                </a:solidFill>
+                <a:latin typeface="+mn-lt"/>
+                <a:ea typeface="+mn-ea"/>
+                <a:cs typeface="+mn-cs"/>
+              </a:defRPr>
+            </a:lvl8pPr>
+            <a:lvl9pPr marL="3886045" indent="-228591" algn="l" defTabSz="914363" rtl="0" eaLnBrk="1" latinLnBrk="0" hangingPunct="1">
+              <a:spcBef>
+                <a:spcPct val="20000"/>
+              </a:spcBef>
+              <a:buFont typeface="Arial" pitchFamily="34" charset="0"/>
+              <a:buChar char="•"/>
+              <a:defRPr sz="2000" kern="1200">
+                <a:solidFill>
+                  <a:schemeClr val="tx1"/>
+                </a:solidFill>
+                <a:latin typeface="+mn-lt"/>
+                <a:ea typeface="+mn-ea"/>
+                <a:cs typeface="+mn-cs"/>
+              </a:defRPr>
+            </a:lvl9pPr>
+          </a:lstStyle>
+          <a:p>
+            <a:pPr algn="ctr"/>
+            <a:r>
+              <a:rPr lang="en-US" sz="2667" b="1" dirty="0" smtClean="0"/>
+              <a:t>ssh</a:t>
+            </a:r>
+            <a:endParaRPr lang="en-US" sz="2667" b="1" dirty="0"/>
+          </a:p>
+          <a:p>
+            <a:endParaRPr lang="en-US" sz="2667" dirty="0"/>
+          </a:p>
+          <a:p>
+            <a:endParaRPr lang="en-US" sz="2667" dirty="0"/>
+          </a:p>
+          <a:p>
+            <a:endParaRPr lang="en-US" sz="4267" dirty="0"/>
+          </a:p>
+          <a:p>
+            <a:endParaRPr lang="en-US" sz="4267" dirty="0"/>
           </a:p>
         </p:txBody>
       </p:sp>
       <p:sp>
         <p:nvSpPr>
-          <p:cNvPr id="4" name="Text Placeholder 3"/>
-          <p:cNvSpPr>
-            <a:spLocks noGrp="1"/>
+          <p:cNvPr id="21" name="Text Placeholder 2"/>
+          <p:cNvSpPr txBox="1">
+            <a:spLocks/>
           </p:cNvSpPr>
-          <p:nvPr>
-            <p:ph type="body" sz="quarter" idx="11"/>
-          </p:nvPr>
+          <p:nvPr/>
         </p:nvSpPr>
-        <p:spPr/>
+        <p:spPr bwMode="white">
+          <a:xfrm rot="20470176">
+            <a:off x="10346241" y="5539624"/>
+            <a:ext cx="2342449" cy="642840"/>
+          </a:xfrm>
+          <a:prstGeom prst="rect">
+            <a:avLst/>
+          </a:prstGeom>
+        </p:spPr>
         <p:txBody>
-          <a:bodyPr/>
-          <a:lstStyle/>
-          <a:p>
-            <a:r>
-              <a:rPr lang="en-US" smtClean="0"/>
-              <a:t>$ ssh ADDRESS -l chef</a:t>
-            </a:r>
-            <a:endParaRPr lang="en-US" dirty="0"/>
+          <a:bodyPr vert="horz" wrap="square" lIns="0" tIns="0" rIns="0" bIns="0" rtlCol="0">
+            <a:normAutofit fontScale="85000" lnSpcReduction="10000"/>
+          </a:bodyPr>
+          <a:lstStyle>
+            <a:lvl1pPr marL="0" indent="0" algn="l" defTabSz="914363" rtl="0" eaLnBrk="1" latinLnBrk="0" hangingPunct="1">
+              <a:lnSpc>
+                <a:spcPct val="100000"/>
+              </a:lnSpc>
+              <a:spcBef>
+                <a:spcPts val="600"/>
+              </a:spcBef>
+              <a:buSzPct val="90000"/>
+              <a:buFont typeface="Arial" pitchFamily="34" charset="0"/>
+              <a:buNone/>
+              <a:defRPr sz="3200" kern="1200" baseline="0">
+                <a:solidFill>
+                  <a:schemeClr val="accent3">
+                    <a:lumMod val="50000"/>
+                  </a:schemeClr>
+                </a:solidFill>
+                <a:latin typeface="+mn-lt"/>
+                <a:ea typeface="+mn-ea"/>
+                <a:cs typeface="+mn-cs"/>
+              </a:defRPr>
+            </a:lvl1pPr>
+            <a:lvl2pPr marL="231775" indent="0" algn="l" defTabSz="914363" rtl="0" eaLnBrk="1" latinLnBrk="0" hangingPunct="1">
+              <a:lnSpc>
+                <a:spcPct val="100000"/>
+              </a:lnSpc>
+              <a:spcBef>
+                <a:spcPts val="600"/>
+              </a:spcBef>
+              <a:buSzPct val="90000"/>
+              <a:buFont typeface="Arial" pitchFamily="34" charset="0"/>
+              <a:buNone/>
+              <a:defRPr sz="2800" kern="1200" baseline="0">
+                <a:solidFill>
+                  <a:schemeClr val="accent3">
+                    <a:lumMod val="50000"/>
+                  </a:schemeClr>
+                </a:solidFill>
+                <a:latin typeface="+mn-lt"/>
+                <a:ea typeface="+mn-ea"/>
+                <a:cs typeface="+mn-cs"/>
+              </a:defRPr>
+            </a:lvl2pPr>
+            <a:lvl3pPr marL="457200" indent="0" algn="l" defTabSz="914363" rtl="0" eaLnBrk="1" latinLnBrk="0" hangingPunct="1">
+              <a:lnSpc>
+                <a:spcPct val="100000"/>
+              </a:lnSpc>
+              <a:spcBef>
+                <a:spcPts val="600"/>
+              </a:spcBef>
+              <a:buSzPct val="90000"/>
+              <a:buFont typeface="Arial" pitchFamily="34" charset="0"/>
+              <a:buNone/>
+              <a:defRPr sz="2400" kern="1200" baseline="0">
+                <a:solidFill>
+                  <a:schemeClr val="accent3">
+                    <a:lumMod val="50000"/>
+                  </a:schemeClr>
+                </a:solidFill>
+                <a:latin typeface="+mn-lt"/>
+                <a:ea typeface="+mn-ea"/>
+                <a:cs typeface="+mn-cs"/>
+              </a:defRPr>
+            </a:lvl3pPr>
+            <a:lvl4pPr marL="630238" indent="0" algn="l" defTabSz="914363" rtl="0" eaLnBrk="1" latinLnBrk="0" hangingPunct="1">
+              <a:lnSpc>
+                <a:spcPct val="100000"/>
+              </a:lnSpc>
+              <a:spcBef>
+                <a:spcPts val="600"/>
+              </a:spcBef>
+              <a:buSzPct val="90000"/>
+              <a:buFont typeface="Arial" pitchFamily="34" charset="0"/>
+              <a:buNone/>
+              <a:defRPr sz="2000" kern="1200" baseline="0">
+                <a:solidFill>
+                  <a:schemeClr val="accent3">
+                    <a:lumMod val="50000"/>
+                  </a:schemeClr>
+                </a:solidFill>
+                <a:latin typeface="+mn-lt"/>
+                <a:ea typeface="+mn-ea"/>
+                <a:cs typeface="+mn-cs"/>
+              </a:defRPr>
+            </a:lvl4pPr>
+            <a:lvl5pPr marL="801687" indent="0" algn="l" defTabSz="914363" rtl="0" eaLnBrk="1" latinLnBrk="0" hangingPunct="1">
+              <a:lnSpc>
+                <a:spcPct val="100000"/>
+              </a:lnSpc>
+              <a:spcBef>
+                <a:spcPts val="600"/>
+              </a:spcBef>
+              <a:buSzPct val="90000"/>
+              <a:buFont typeface="Arial" pitchFamily="34" charset="0"/>
+              <a:buNone/>
+              <a:defRPr sz="1800" kern="1200" baseline="0">
+                <a:solidFill>
+                  <a:schemeClr val="accent3">
+                    <a:lumMod val="50000"/>
+                  </a:schemeClr>
+                </a:solidFill>
+                <a:latin typeface="+mn-lt"/>
+                <a:ea typeface="+mn-ea"/>
+                <a:cs typeface="+mn-cs"/>
+              </a:defRPr>
+            </a:lvl5pPr>
+            <a:lvl6pPr marL="2514499" indent="-228591" algn="l" defTabSz="914363" rtl="0" eaLnBrk="1" latinLnBrk="0" hangingPunct="1">
+              <a:spcBef>
+                <a:spcPct val="20000"/>
+              </a:spcBef>
+              <a:buFont typeface="Arial" pitchFamily="34" charset="0"/>
+              <a:buChar char="•"/>
+              <a:defRPr sz="2000" kern="1200">
+                <a:solidFill>
+                  <a:schemeClr val="tx1"/>
+                </a:solidFill>
+                <a:latin typeface="+mn-lt"/>
+                <a:ea typeface="+mn-ea"/>
+                <a:cs typeface="+mn-cs"/>
+              </a:defRPr>
+            </a:lvl6pPr>
+            <a:lvl7pPr marL="2971681" indent="-228591" algn="l" defTabSz="914363" rtl="0" eaLnBrk="1" latinLnBrk="0" hangingPunct="1">
+              <a:spcBef>
+                <a:spcPct val="20000"/>
+              </a:spcBef>
+              <a:buFont typeface="Arial" pitchFamily="34" charset="0"/>
+              <a:buChar char="•"/>
+              <a:defRPr sz="2000" kern="1200">
+                <a:solidFill>
+                  <a:schemeClr val="tx1"/>
+                </a:solidFill>
+                <a:latin typeface="+mn-lt"/>
+                <a:ea typeface="+mn-ea"/>
+                <a:cs typeface="+mn-cs"/>
+              </a:defRPr>
+            </a:lvl7pPr>
+            <a:lvl8pPr marL="3428863" indent="-228591" algn="l" defTabSz="914363" rtl="0" eaLnBrk="1" latinLnBrk="0" hangingPunct="1">
+              <a:spcBef>
+                <a:spcPct val="20000"/>
+              </a:spcBef>
+              <a:buFont typeface="Arial" pitchFamily="34" charset="0"/>
+              <a:buChar char="•"/>
+              <a:defRPr sz="2000" kern="1200">
+                <a:solidFill>
+                  <a:schemeClr val="tx1"/>
+                </a:solidFill>
+                <a:latin typeface="+mn-lt"/>
+                <a:ea typeface="+mn-ea"/>
+                <a:cs typeface="+mn-cs"/>
+              </a:defRPr>
+            </a:lvl8pPr>
+            <a:lvl9pPr marL="3886045" indent="-228591" algn="l" defTabSz="914363" rtl="0" eaLnBrk="1" latinLnBrk="0" hangingPunct="1">
+              <a:spcBef>
+                <a:spcPct val="20000"/>
+              </a:spcBef>
+              <a:buFont typeface="Arial" pitchFamily="34" charset="0"/>
+              <a:buChar char="•"/>
+              <a:defRPr sz="2000" kern="1200">
+                <a:solidFill>
+                  <a:schemeClr val="tx1"/>
+                </a:solidFill>
+                <a:latin typeface="+mn-lt"/>
+                <a:ea typeface="+mn-ea"/>
+                <a:cs typeface="+mn-cs"/>
+              </a:defRPr>
+            </a:lvl9pPr>
+          </a:lstStyle>
+          <a:p>
+            <a:pPr algn="ctr"/>
+            <a:r>
+              <a:rPr lang="en-US" sz="2667" b="1" dirty="0" smtClean="0"/>
+              <a:t>Windows Remote Desktop</a:t>
+            </a:r>
+            <a:endParaRPr lang="en-US" sz="2667" b="1" dirty="0"/>
+          </a:p>
+          <a:p>
+            <a:endParaRPr lang="en-US" sz="2667" dirty="0"/>
+          </a:p>
+          <a:p>
+            <a:endParaRPr lang="en-US" sz="2667" dirty="0"/>
+          </a:p>
+          <a:p>
+            <a:endParaRPr lang="en-US" sz="4267" dirty="0"/>
+          </a:p>
+          <a:p>
+            <a:endParaRPr lang="en-US" sz="4267" dirty="0"/>
+          </a:p>
+        </p:txBody>
+      </p:sp>
+      <p:sp>
+        <p:nvSpPr>
+          <p:cNvPr id="22" name="Text Placeholder 2"/>
+          <p:cNvSpPr txBox="1">
+            <a:spLocks/>
+          </p:cNvSpPr>
+          <p:nvPr/>
+        </p:nvSpPr>
+        <p:spPr bwMode="white">
+          <a:xfrm>
+            <a:off x="13579727" y="1835596"/>
+            <a:ext cx="2580487" cy="445662"/>
+          </a:xfrm>
+          <a:prstGeom prst="rect">
+            <a:avLst/>
+          </a:prstGeom>
+        </p:spPr>
+        <p:txBody>
+          <a:bodyPr vert="horz" wrap="square" lIns="0" tIns="0" rIns="0" bIns="0" rtlCol="0">
+            <a:normAutofit/>
+          </a:bodyPr>
+          <a:lstStyle>
+            <a:lvl1pPr marL="0" indent="0" algn="l" defTabSz="914363" rtl="0" eaLnBrk="1" latinLnBrk="0" hangingPunct="1">
+              <a:lnSpc>
+                <a:spcPct val="100000"/>
+              </a:lnSpc>
+              <a:spcBef>
+                <a:spcPts val="600"/>
+              </a:spcBef>
+              <a:buSzPct val="90000"/>
+              <a:buFont typeface="Arial" pitchFamily="34" charset="0"/>
+              <a:buNone/>
+              <a:defRPr sz="3200" kern="1200" baseline="0">
+                <a:solidFill>
+                  <a:schemeClr val="accent3">
+                    <a:lumMod val="50000"/>
+                  </a:schemeClr>
+                </a:solidFill>
+                <a:latin typeface="+mn-lt"/>
+                <a:ea typeface="+mn-ea"/>
+                <a:cs typeface="+mn-cs"/>
+              </a:defRPr>
+            </a:lvl1pPr>
+            <a:lvl2pPr marL="231775" indent="0" algn="l" defTabSz="914363" rtl="0" eaLnBrk="1" latinLnBrk="0" hangingPunct="1">
+              <a:lnSpc>
+                <a:spcPct val="100000"/>
+              </a:lnSpc>
+              <a:spcBef>
+                <a:spcPts val="600"/>
+              </a:spcBef>
+              <a:buSzPct val="90000"/>
+              <a:buFont typeface="Arial" pitchFamily="34" charset="0"/>
+              <a:buNone/>
+              <a:defRPr sz="2800" kern="1200" baseline="0">
+                <a:solidFill>
+                  <a:schemeClr val="accent3">
+                    <a:lumMod val="50000"/>
+                  </a:schemeClr>
+                </a:solidFill>
+                <a:latin typeface="+mn-lt"/>
+                <a:ea typeface="+mn-ea"/>
+                <a:cs typeface="+mn-cs"/>
+              </a:defRPr>
+            </a:lvl2pPr>
+            <a:lvl3pPr marL="457200" indent="0" algn="l" defTabSz="914363" rtl="0" eaLnBrk="1" latinLnBrk="0" hangingPunct="1">
+              <a:lnSpc>
+                <a:spcPct val="100000"/>
+              </a:lnSpc>
+              <a:spcBef>
+                <a:spcPts val="600"/>
+              </a:spcBef>
+              <a:buSzPct val="90000"/>
+              <a:buFont typeface="Arial" pitchFamily="34" charset="0"/>
+              <a:buNone/>
+              <a:defRPr sz="2400" kern="1200" baseline="0">
+                <a:solidFill>
+                  <a:schemeClr val="accent3">
+                    <a:lumMod val="50000"/>
+                  </a:schemeClr>
+                </a:solidFill>
+                <a:latin typeface="+mn-lt"/>
+                <a:ea typeface="+mn-ea"/>
+                <a:cs typeface="+mn-cs"/>
+              </a:defRPr>
+            </a:lvl3pPr>
+            <a:lvl4pPr marL="630238" indent="0" algn="l" defTabSz="914363" rtl="0" eaLnBrk="1" latinLnBrk="0" hangingPunct="1">
+              <a:lnSpc>
+                <a:spcPct val="100000"/>
+              </a:lnSpc>
+              <a:spcBef>
+                <a:spcPts val="600"/>
+              </a:spcBef>
+              <a:buSzPct val="90000"/>
+              <a:buFont typeface="Arial" pitchFamily="34" charset="0"/>
+              <a:buNone/>
+              <a:defRPr sz="2000" kern="1200" baseline="0">
+                <a:solidFill>
+                  <a:schemeClr val="accent3">
+                    <a:lumMod val="50000"/>
+                  </a:schemeClr>
+                </a:solidFill>
+                <a:latin typeface="+mn-lt"/>
+                <a:ea typeface="+mn-ea"/>
+                <a:cs typeface="+mn-cs"/>
+              </a:defRPr>
+            </a:lvl4pPr>
+            <a:lvl5pPr marL="801687" indent="0" algn="l" defTabSz="914363" rtl="0" eaLnBrk="1" latinLnBrk="0" hangingPunct="1">
+              <a:lnSpc>
+                <a:spcPct val="100000"/>
+              </a:lnSpc>
+              <a:spcBef>
+                <a:spcPts val="600"/>
+              </a:spcBef>
+              <a:buSzPct val="90000"/>
+              <a:buFont typeface="Arial" pitchFamily="34" charset="0"/>
+              <a:buNone/>
+              <a:defRPr sz="1800" kern="1200" baseline="0">
+                <a:solidFill>
+                  <a:schemeClr val="accent3">
+                    <a:lumMod val="50000"/>
+                  </a:schemeClr>
+                </a:solidFill>
+                <a:latin typeface="+mn-lt"/>
+                <a:ea typeface="+mn-ea"/>
+                <a:cs typeface="+mn-cs"/>
+              </a:defRPr>
+            </a:lvl5pPr>
+            <a:lvl6pPr marL="2514499" indent="-228591" algn="l" defTabSz="914363" rtl="0" eaLnBrk="1" latinLnBrk="0" hangingPunct="1">
+              <a:spcBef>
+                <a:spcPct val="20000"/>
+              </a:spcBef>
+              <a:buFont typeface="Arial" pitchFamily="34" charset="0"/>
+              <a:buChar char="•"/>
+              <a:defRPr sz="2000" kern="1200">
+                <a:solidFill>
+                  <a:schemeClr val="tx1"/>
+                </a:solidFill>
+                <a:latin typeface="+mn-lt"/>
+                <a:ea typeface="+mn-ea"/>
+                <a:cs typeface="+mn-cs"/>
+              </a:defRPr>
+            </a:lvl6pPr>
+            <a:lvl7pPr marL="2971681" indent="-228591" algn="l" defTabSz="914363" rtl="0" eaLnBrk="1" latinLnBrk="0" hangingPunct="1">
+              <a:spcBef>
+                <a:spcPct val="20000"/>
+              </a:spcBef>
+              <a:buFont typeface="Arial" pitchFamily="34" charset="0"/>
+              <a:buChar char="•"/>
+              <a:defRPr sz="2000" kern="1200">
+                <a:solidFill>
+                  <a:schemeClr val="tx1"/>
+                </a:solidFill>
+                <a:latin typeface="+mn-lt"/>
+                <a:ea typeface="+mn-ea"/>
+                <a:cs typeface="+mn-cs"/>
+              </a:defRPr>
+            </a:lvl7pPr>
+            <a:lvl8pPr marL="3428863" indent="-228591" algn="l" defTabSz="914363" rtl="0" eaLnBrk="1" latinLnBrk="0" hangingPunct="1">
+              <a:spcBef>
+                <a:spcPct val="20000"/>
+              </a:spcBef>
+              <a:buFont typeface="Arial" pitchFamily="34" charset="0"/>
+              <a:buChar char="•"/>
+              <a:defRPr sz="2000" kern="1200">
+                <a:solidFill>
+                  <a:schemeClr val="tx1"/>
+                </a:solidFill>
+                <a:latin typeface="+mn-lt"/>
+                <a:ea typeface="+mn-ea"/>
+                <a:cs typeface="+mn-cs"/>
+              </a:defRPr>
+            </a:lvl8pPr>
+            <a:lvl9pPr marL="3886045" indent="-228591" algn="l" defTabSz="914363" rtl="0" eaLnBrk="1" latinLnBrk="0" hangingPunct="1">
+              <a:spcBef>
+                <a:spcPct val="20000"/>
+              </a:spcBef>
+              <a:buFont typeface="Arial" pitchFamily="34" charset="0"/>
+              <a:buChar char="•"/>
+              <a:defRPr sz="2000" kern="1200">
+                <a:solidFill>
+                  <a:schemeClr val="tx1"/>
+                </a:solidFill>
+                <a:latin typeface="+mn-lt"/>
+                <a:ea typeface="+mn-ea"/>
+                <a:cs typeface="+mn-cs"/>
+              </a:defRPr>
+            </a:lvl9pPr>
+          </a:lstStyle>
+          <a:p>
+            <a:pPr algn="ctr"/>
+            <a:r>
+              <a:rPr lang="en-US" sz="2667" dirty="0" smtClean="0"/>
+              <a:t>Linux</a:t>
+            </a:r>
+            <a:endParaRPr lang="en-US" sz="2667" dirty="0"/>
+          </a:p>
+          <a:p>
+            <a:endParaRPr lang="en-US" sz="2667" dirty="0"/>
+          </a:p>
+          <a:p>
+            <a:endParaRPr lang="en-US" sz="2667" dirty="0"/>
+          </a:p>
+          <a:p>
+            <a:endParaRPr lang="en-US" sz="4267" dirty="0"/>
+          </a:p>
+          <a:p>
+            <a:endParaRPr lang="en-US" sz="4267" dirty="0"/>
+          </a:p>
+        </p:txBody>
+      </p:sp>
+      <p:sp>
+        <p:nvSpPr>
+          <p:cNvPr id="25" name="Text Placeholder 2"/>
+          <p:cNvSpPr txBox="1">
+            <a:spLocks/>
+          </p:cNvSpPr>
+          <p:nvPr/>
+        </p:nvSpPr>
+        <p:spPr bwMode="white">
+          <a:xfrm>
+            <a:off x="13804316" y="2950526"/>
+            <a:ext cx="2580487" cy="445662"/>
+          </a:xfrm>
+          <a:prstGeom prst="rect">
+            <a:avLst/>
+          </a:prstGeom>
+        </p:spPr>
+        <p:txBody>
+          <a:bodyPr vert="horz" wrap="square" lIns="0" tIns="0" rIns="0" bIns="0" rtlCol="0">
+            <a:normAutofit/>
+          </a:bodyPr>
+          <a:lstStyle>
+            <a:lvl1pPr marL="0" indent="0" algn="l" defTabSz="914363" rtl="0" eaLnBrk="1" latinLnBrk="0" hangingPunct="1">
+              <a:lnSpc>
+                <a:spcPct val="100000"/>
+              </a:lnSpc>
+              <a:spcBef>
+                <a:spcPts val="600"/>
+              </a:spcBef>
+              <a:buSzPct val="90000"/>
+              <a:buFont typeface="Arial" pitchFamily="34" charset="0"/>
+              <a:buNone/>
+              <a:defRPr sz="3200" kern="1200" baseline="0">
+                <a:solidFill>
+                  <a:schemeClr val="accent3">
+                    <a:lumMod val="50000"/>
+                  </a:schemeClr>
+                </a:solidFill>
+                <a:latin typeface="+mn-lt"/>
+                <a:ea typeface="+mn-ea"/>
+                <a:cs typeface="+mn-cs"/>
+              </a:defRPr>
+            </a:lvl1pPr>
+            <a:lvl2pPr marL="231775" indent="0" algn="l" defTabSz="914363" rtl="0" eaLnBrk="1" latinLnBrk="0" hangingPunct="1">
+              <a:lnSpc>
+                <a:spcPct val="100000"/>
+              </a:lnSpc>
+              <a:spcBef>
+                <a:spcPts val="600"/>
+              </a:spcBef>
+              <a:buSzPct val="90000"/>
+              <a:buFont typeface="Arial" pitchFamily="34" charset="0"/>
+              <a:buNone/>
+              <a:defRPr sz="2800" kern="1200" baseline="0">
+                <a:solidFill>
+                  <a:schemeClr val="accent3">
+                    <a:lumMod val="50000"/>
+                  </a:schemeClr>
+                </a:solidFill>
+                <a:latin typeface="+mn-lt"/>
+                <a:ea typeface="+mn-ea"/>
+                <a:cs typeface="+mn-cs"/>
+              </a:defRPr>
+            </a:lvl2pPr>
+            <a:lvl3pPr marL="457200" indent="0" algn="l" defTabSz="914363" rtl="0" eaLnBrk="1" latinLnBrk="0" hangingPunct="1">
+              <a:lnSpc>
+                <a:spcPct val="100000"/>
+              </a:lnSpc>
+              <a:spcBef>
+                <a:spcPts val="600"/>
+              </a:spcBef>
+              <a:buSzPct val="90000"/>
+              <a:buFont typeface="Arial" pitchFamily="34" charset="0"/>
+              <a:buNone/>
+              <a:defRPr sz="2400" kern="1200" baseline="0">
+                <a:solidFill>
+                  <a:schemeClr val="accent3">
+                    <a:lumMod val="50000"/>
+                  </a:schemeClr>
+                </a:solidFill>
+                <a:latin typeface="+mn-lt"/>
+                <a:ea typeface="+mn-ea"/>
+                <a:cs typeface="+mn-cs"/>
+              </a:defRPr>
+            </a:lvl3pPr>
+            <a:lvl4pPr marL="630238" indent="0" algn="l" defTabSz="914363" rtl="0" eaLnBrk="1" latinLnBrk="0" hangingPunct="1">
+              <a:lnSpc>
+                <a:spcPct val="100000"/>
+              </a:lnSpc>
+              <a:spcBef>
+                <a:spcPts val="600"/>
+              </a:spcBef>
+              <a:buSzPct val="90000"/>
+              <a:buFont typeface="Arial" pitchFamily="34" charset="0"/>
+              <a:buNone/>
+              <a:defRPr sz="2000" kern="1200" baseline="0">
+                <a:solidFill>
+                  <a:schemeClr val="accent3">
+                    <a:lumMod val="50000"/>
+                  </a:schemeClr>
+                </a:solidFill>
+                <a:latin typeface="+mn-lt"/>
+                <a:ea typeface="+mn-ea"/>
+                <a:cs typeface="+mn-cs"/>
+              </a:defRPr>
+            </a:lvl4pPr>
+            <a:lvl5pPr marL="801687" indent="0" algn="l" defTabSz="914363" rtl="0" eaLnBrk="1" latinLnBrk="0" hangingPunct="1">
+              <a:lnSpc>
+                <a:spcPct val="100000"/>
+              </a:lnSpc>
+              <a:spcBef>
+                <a:spcPts val="600"/>
+              </a:spcBef>
+              <a:buSzPct val="90000"/>
+              <a:buFont typeface="Arial" pitchFamily="34" charset="0"/>
+              <a:buNone/>
+              <a:defRPr sz="1800" kern="1200" baseline="0">
+                <a:solidFill>
+                  <a:schemeClr val="accent3">
+                    <a:lumMod val="50000"/>
+                  </a:schemeClr>
+                </a:solidFill>
+                <a:latin typeface="+mn-lt"/>
+                <a:ea typeface="+mn-ea"/>
+                <a:cs typeface="+mn-cs"/>
+              </a:defRPr>
+            </a:lvl5pPr>
+            <a:lvl6pPr marL="2514499" indent="-228591" algn="l" defTabSz="914363" rtl="0" eaLnBrk="1" latinLnBrk="0" hangingPunct="1">
+              <a:spcBef>
+                <a:spcPct val="20000"/>
+              </a:spcBef>
+              <a:buFont typeface="Arial" pitchFamily="34" charset="0"/>
+              <a:buChar char="•"/>
+              <a:defRPr sz="2000" kern="1200">
+                <a:solidFill>
+                  <a:schemeClr val="tx1"/>
+                </a:solidFill>
+                <a:latin typeface="+mn-lt"/>
+                <a:ea typeface="+mn-ea"/>
+                <a:cs typeface="+mn-cs"/>
+              </a:defRPr>
+            </a:lvl6pPr>
+            <a:lvl7pPr marL="2971681" indent="-228591" algn="l" defTabSz="914363" rtl="0" eaLnBrk="1" latinLnBrk="0" hangingPunct="1">
+              <a:spcBef>
+                <a:spcPct val="20000"/>
+              </a:spcBef>
+              <a:buFont typeface="Arial" pitchFamily="34" charset="0"/>
+              <a:buChar char="•"/>
+              <a:defRPr sz="2000" kern="1200">
+                <a:solidFill>
+                  <a:schemeClr val="tx1"/>
+                </a:solidFill>
+                <a:latin typeface="+mn-lt"/>
+                <a:ea typeface="+mn-ea"/>
+                <a:cs typeface="+mn-cs"/>
+              </a:defRPr>
+            </a:lvl7pPr>
+            <a:lvl8pPr marL="3428863" indent="-228591" algn="l" defTabSz="914363" rtl="0" eaLnBrk="1" latinLnBrk="0" hangingPunct="1">
+              <a:spcBef>
+                <a:spcPct val="20000"/>
+              </a:spcBef>
+              <a:buFont typeface="Arial" pitchFamily="34" charset="0"/>
+              <a:buChar char="•"/>
+              <a:defRPr sz="2000" kern="1200">
+                <a:solidFill>
+                  <a:schemeClr val="tx1"/>
+                </a:solidFill>
+                <a:latin typeface="+mn-lt"/>
+                <a:ea typeface="+mn-ea"/>
+                <a:cs typeface="+mn-cs"/>
+              </a:defRPr>
+            </a:lvl8pPr>
+            <a:lvl9pPr marL="3886045" indent="-228591" algn="l" defTabSz="914363" rtl="0" eaLnBrk="1" latinLnBrk="0" hangingPunct="1">
+              <a:spcBef>
+                <a:spcPct val="20000"/>
+              </a:spcBef>
+              <a:buFont typeface="Arial" pitchFamily="34" charset="0"/>
+              <a:buChar char="•"/>
+              <a:defRPr sz="2000" kern="1200">
+                <a:solidFill>
+                  <a:schemeClr val="tx1"/>
+                </a:solidFill>
+                <a:latin typeface="+mn-lt"/>
+                <a:ea typeface="+mn-ea"/>
+                <a:cs typeface="+mn-cs"/>
+              </a:defRPr>
+            </a:lvl9pPr>
+          </a:lstStyle>
+          <a:p>
+            <a:pPr algn="ctr"/>
+            <a:r>
+              <a:rPr lang="en-US" sz="2667" dirty="0" smtClean="0"/>
+              <a:t>Win</a:t>
+            </a:r>
+            <a:endParaRPr lang="en-US" sz="2667" dirty="0"/>
+          </a:p>
+          <a:p>
+            <a:endParaRPr lang="en-US" sz="2667" dirty="0"/>
+          </a:p>
+          <a:p>
+            <a:endParaRPr lang="en-US" sz="2667" dirty="0"/>
+          </a:p>
+          <a:p>
+            <a:endParaRPr lang="en-US" sz="4267" dirty="0"/>
+          </a:p>
+          <a:p>
+            <a:endParaRPr lang="en-US" sz="4267" dirty="0"/>
           </a:p>
         </p:txBody>
       </p:sp>
     </p:spTree>
     <p:extLst>
       <p:ext uri="{BB962C8B-B14F-4D97-AF65-F5344CB8AC3E}">
-        <p14:creationId xmlns:p14="http://schemas.microsoft.com/office/powerpoint/2010/main" val="4067554310"/>
+        <p14:creationId xmlns:p14="http://schemas.microsoft.com/office/powerpoint/2010/main" val="3213002550"/>
       </p:ext>
     </p:extLst>
   </p:cSld>
@@ -14838,6 +17154,241 @@
             <p:ph type="title"/>
           </p:nvPr>
         </p:nvSpPr>
+        <p:spPr/>
+        <p:txBody>
+          <a:bodyPr>
+            <a:normAutofit fontScale="90000"/>
+          </a:bodyPr>
+          <a:lstStyle/>
+          <a:p>
+            <a:r>
+              <a:rPr lang="en-US" sz="4800" dirty="0" smtClean="0"/>
+              <a:t>Logging into </a:t>
+            </a:r>
+            <a:r>
+              <a:rPr lang="en-US" sz="4800" dirty="0" smtClean="0"/>
+              <a:t>the </a:t>
+            </a:r>
+            <a:r>
+              <a:rPr lang="en-US" sz="4800" dirty="0" smtClean="0"/>
+              <a:t>Compliance Server and Linux Node</a:t>
+            </a:r>
+            <a:endParaRPr lang="en-US" sz="4800" dirty="0"/>
+          </a:p>
+        </p:txBody>
+      </p:sp>
+      <p:sp>
+        <p:nvSpPr>
+          <p:cNvPr id="11" name="Content Placeholder 10"/>
+          <p:cNvSpPr>
+            <a:spLocks noGrp="1"/>
+          </p:cNvSpPr>
+          <p:nvPr>
+            <p:ph sz="quarter" idx="10"/>
+          </p:nvPr>
+        </p:nvSpPr>
+        <p:spPr>
+          <a:xfrm>
+            <a:off x="1121104" y="2315962"/>
+            <a:ext cx="14423693" cy="4806733"/>
+          </a:xfrm>
+        </p:spPr>
+        <p:txBody>
+          <a:bodyPr/>
+          <a:lstStyle/>
+          <a:p>
+            <a:endParaRPr lang="en-US" dirty="0"/>
+          </a:p>
+        </p:txBody>
+      </p:sp>
+      <p:sp>
+        <p:nvSpPr>
+          <p:cNvPr id="4" name="Text Placeholder 3"/>
+          <p:cNvSpPr>
+            <a:spLocks noGrp="1"/>
+          </p:cNvSpPr>
+          <p:nvPr>
+            <p:ph type="body" sz="quarter" idx="11"/>
+          </p:nvPr>
+        </p:nvSpPr>
+        <p:spPr/>
+        <p:txBody>
+          <a:bodyPr/>
+          <a:lstStyle/>
+          <a:p>
+            <a:r>
+              <a:rPr lang="en-US" smtClean="0"/>
+              <a:t>$ ssh ADDRESS -l chef</a:t>
+            </a:r>
+            <a:endParaRPr lang="en-US" dirty="0"/>
+          </a:p>
+        </p:txBody>
+      </p:sp>
+    </p:spTree>
+    <p:extLst>
+      <p:ext uri="{BB962C8B-B14F-4D97-AF65-F5344CB8AC3E}">
+        <p14:creationId xmlns:p14="http://schemas.microsoft.com/office/powerpoint/2010/main" val="4067554310"/>
+      </p:ext>
+    </p:extLst>
+  </p:cSld>
+  <p:clrMapOvr>
+    <a:masterClrMapping/>
+  </p:clrMapOvr>
+  <mc:AlternateContent xmlns:mc="http://schemas.openxmlformats.org/markup-compatibility/2006" xmlns:p14="http://schemas.microsoft.com/office/powerpoint/2010/main">
+    <mc:Choice Requires="p14">
+      <p:transition spd="med" p14:dur="700">
+        <p:fade/>
+      </p:transition>
+    </mc:Choice>
+    <mc:Fallback xmlns="">
+      <p:transition spd="med">
+        <p:fade/>
+      </p:transition>
+    </mc:Fallback>
+  </mc:AlternateContent>
+  <p:timing>
+    <p:tnLst>
+      <p:par>
+        <p:cTn id="1" dur="indefinite" restart="never" nodeType="tmRoot"/>
+      </p:par>
+    </p:tnLst>
+  </p:timing>
+</p:sld>
+</file>
+
+<file path=ppt/slides/slide16.xml><?xml version="1.0" encoding="utf-8"?>
+<p:sld xmlns:a="http://schemas.openxmlformats.org/drawingml/2006/main" xmlns:r="http://schemas.openxmlformats.org/officeDocument/2006/relationships" xmlns:p="http://schemas.openxmlformats.org/presentationml/2006/main">
+  <p:cSld>
+    <p:spTree>
+      <p:nvGrpSpPr>
+        <p:cNvPr id="1" name=""/>
+        <p:cNvGrpSpPr/>
+        <p:nvPr/>
+      </p:nvGrpSpPr>
+      <p:grpSpPr>
+        <a:xfrm>
+          <a:off x="0" y="0"/>
+          <a:ext cx="0" cy="0"/>
+          <a:chOff x="0" y="0"/>
+          <a:chExt cx="0" cy="0"/>
+        </a:xfrm>
+      </p:grpSpPr>
+      <p:sp>
+        <p:nvSpPr>
+          <p:cNvPr id="2" name="Title 1"/>
+          <p:cNvSpPr>
+            <a:spLocks noGrp="1"/>
+          </p:cNvSpPr>
+          <p:nvPr>
+            <p:ph type="title"/>
+          </p:nvPr>
+        </p:nvSpPr>
+        <p:spPr/>
+        <p:txBody>
+          <a:bodyPr>
+            <a:normAutofit/>
+          </a:bodyPr>
+          <a:lstStyle/>
+          <a:p>
+            <a:r>
+              <a:rPr lang="en-US" dirty="0" smtClean="0"/>
+              <a:t>Logging Into </a:t>
+            </a:r>
+            <a:r>
+              <a:rPr lang="en-US" dirty="0" smtClean="0"/>
+              <a:t>the Remote </a:t>
+            </a:r>
+            <a:r>
+              <a:rPr lang="en-US" dirty="0" smtClean="0"/>
+              <a:t>Windows Node</a:t>
+            </a:r>
+            <a:endParaRPr lang="en-US" dirty="0"/>
+          </a:p>
+        </p:txBody>
+      </p:sp>
+      <p:pic>
+        <p:nvPicPr>
+          <p:cNvPr id="6" name="Picture 5"/>
+          <p:cNvPicPr>
+            <a:picLocks noChangeAspect="1"/>
+          </p:cNvPicPr>
+          <p:nvPr/>
+        </p:nvPicPr>
+        <p:blipFill>
+          <a:blip r:embed="rId3"/>
+          <a:stretch>
+            <a:fillRect/>
+          </a:stretch>
+        </p:blipFill>
+        <p:spPr>
+          <a:xfrm>
+            <a:off x="2979680" y="1323475"/>
+            <a:ext cx="10296641" cy="6476390"/>
+          </a:xfrm>
+          <a:prstGeom prst="rect">
+            <a:avLst/>
+          </a:prstGeom>
+        </p:spPr>
+      </p:pic>
+    </p:spTree>
+    <p:extLst>
+      <p:ext uri="{BB962C8B-B14F-4D97-AF65-F5344CB8AC3E}">
+        <p14:creationId xmlns:p14="http://schemas.microsoft.com/office/powerpoint/2010/main" val="2721970032"/>
+      </p:ext>
+    </p:extLst>
+  </p:cSld>
+  <p:clrMapOvr>
+    <a:masterClrMapping/>
+  </p:clrMapOvr>
+  <mc:AlternateContent xmlns:mc="http://schemas.openxmlformats.org/markup-compatibility/2006" xmlns:p14="http://schemas.microsoft.com/office/powerpoint/2010/main">
+    <mc:Choice Requires="p14">
+      <p:transition spd="med" p14:dur="700">
+        <p:fade/>
+      </p:transition>
+    </mc:Choice>
+    <mc:Fallback xmlns="">
+      <p:transition spd="med">
+        <p:fade/>
+      </p:transition>
+    </mc:Fallback>
+  </mc:AlternateContent>
+  <p:timing>
+    <p:tnLst>
+      <p:par>
+        <p:cTn id="1" dur="indefinite" restart="never" nodeType="tmRoot"/>
+      </p:par>
+    </p:tnLst>
+  </p:timing>
+</p:sld>
+</file>
+
+<file path=ppt/slides/slide17.xml><?xml version="1.0" encoding="utf-8"?>
+<p:sld xmlns:a="http://schemas.openxmlformats.org/drawingml/2006/main" xmlns:r="http://schemas.openxmlformats.org/officeDocument/2006/relationships" xmlns:p="http://schemas.openxmlformats.org/presentationml/2006/main">
+  <p:cSld>
+    <p:spTree>
+      <p:nvGrpSpPr>
+        <p:cNvPr id="1" name=""/>
+        <p:cNvGrpSpPr/>
+        <p:nvPr/>
+      </p:nvGrpSpPr>
+      <p:grpSpPr>
+        <a:xfrm>
+          <a:off x="0" y="0"/>
+          <a:ext cx="0" cy="0"/>
+          <a:chOff x="0" y="0"/>
+          <a:chExt cx="0" cy="0"/>
+        </a:xfrm>
+      </p:grpSpPr>
+      <p:sp>
+        <p:nvSpPr>
+          <p:cNvPr id="2" name="Title 1"/>
+          <p:cNvSpPr>
+            <a:spLocks noGrp="1"/>
+          </p:cNvSpPr>
+          <p:nvPr>
+            <p:ph type="title"/>
+          </p:nvPr>
+        </p:nvSpPr>
         <p:spPr>
           <a:xfrm>
             <a:off x="609599" y="304800"/>
@@ -15067,7 +17618,7 @@
 </p:sld>
 </file>
 
-<file path=ppt/slides/slide16.xml><?xml version="1.0" encoding="utf-8"?>
+<file path=ppt/slides/slide18.xml><?xml version="1.0" encoding="utf-8"?>
 <p:sld xmlns:a="http://schemas.openxmlformats.org/drawingml/2006/main" xmlns:r="http://schemas.openxmlformats.org/officeDocument/2006/relationships" xmlns:p="http://schemas.openxmlformats.org/presentationml/2006/main">
   <p:cSld>
     <p:spTree>
@@ -15534,8 +18085,13 @@
             </a:r>
             <a:r>
               <a:rPr lang="en-US" dirty="0"/>
-              <a:t>and initially configure the Chef Compliance server</a:t>
-            </a:r>
+              <a:t>and initially configure the Chef Compliance </a:t>
+            </a:r>
+            <a:r>
+              <a:rPr lang="en-US" dirty="0" smtClean="0"/>
+              <a:t>server.</a:t>
+            </a:r>
+            <a:endParaRPr lang="en-US" dirty="0"/>
           </a:p>
           <a:p>
             <a:pPr marL="457200" indent="-457200">
@@ -15548,8 +18104,13 @@
             </a:r>
             <a:r>
               <a:rPr lang="en-US" dirty="0"/>
-              <a:t>scans with Chef Compliance</a:t>
-            </a:r>
+              <a:t>scans with Chef </a:t>
+            </a:r>
+            <a:r>
+              <a:rPr lang="en-US" dirty="0" smtClean="0"/>
+              <a:t>Compliance.</a:t>
+            </a:r>
+            <a:endParaRPr lang="en-US" dirty="0"/>
           </a:p>
           <a:p>
             <a:pPr marL="457200" indent="-457200">
@@ -15558,11 +18119,11 @@
             </a:pPr>
             <a:r>
               <a:rPr lang="en-US" dirty="0" smtClean="0"/>
-              <a:t>Remediate </a:t>
+              <a:t>Remediate compliance </a:t>
             </a:r>
             <a:r>
               <a:rPr lang="en-US" dirty="0" smtClean="0"/>
-              <a:t>compliance issues</a:t>
+              <a:t>issues.</a:t>
             </a:r>
             <a:endParaRPr lang="en-US" dirty="0"/>
           </a:p>
@@ -15573,12 +18134,17 @@
             </a:pPr>
             <a:r>
               <a:rPr lang="en-US" dirty="0" smtClean="0"/>
-              <a:t>Run </a:t>
+              <a:t>Schedule and run </a:t>
             </a:r>
             <a:r>
               <a:rPr lang="en-US" dirty="0"/>
-              <a:t>Compliance Reports</a:t>
-            </a:r>
+              <a:t>c</a:t>
+            </a:r>
+            <a:r>
+              <a:rPr lang="en-US" dirty="0" smtClean="0"/>
+              <a:t>ompliance reports.</a:t>
+            </a:r>
+            <a:endParaRPr lang="en-US" dirty="0"/>
           </a:p>
           <a:p>
             <a:pPr marL="457200" indent="-457200">
@@ -15595,22 +18161,21 @@
             </a:r>
             <a:r>
               <a:rPr lang="en-US" dirty="0"/>
-              <a:t> to create and modify Chef Compliance profiles</a:t>
-            </a:r>
-          </a:p>
-          <a:p>
-            <a:pPr marL="457200" indent="-457200">
-              <a:buFont typeface="Wingdings" charset="2"/>
-              <a:buChar char="Ø"/>
-            </a:pPr>
+              <a:t> to create and </a:t>
+            </a:r>
             <a:r>
               <a:rPr lang="en-US" dirty="0" smtClean="0"/>
-              <a:t>View </a:t>
+              <a:t>modify and test </a:t>
             </a:r>
             <a:r>
               <a:rPr lang="en-US" dirty="0"/>
-              <a:t>compliance statistics for a node</a:t>
-            </a:r>
+              <a:t>Chef Compliance </a:t>
+            </a:r>
+            <a:r>
+              <a:rPr lang="en-US" dirty="0" smtClean="0"/>
+              <a:t>profiles.</a:t>
+            </a:r>
+            <a:endParaRPr lang="en-US" dirty="0"/>
           </a:p>
           <a:p>
             <a:endParaRPr lang="en-US" sz="2400" b="1" dirty="0" smtClean="0"/>
@@ -15698,11 +18263,7 @@
           <a:p>
             <a:r>
               <a:rPr lang="en-US" dirty="0" smtClean="0"/>
-              <a:t>Chef </a:t>
-            </a:r>
-            <a:r>
-              <a:rPr lang="en-US" dirty="0" smtClean="0"/>
-              <a:t>Compliance Value Proposition</a:t>
+              <a:t>Chef Compliance Value Proposition</a:t>
             </a:r>
             <a:endParaRPr lang="en-US" dirty="0"/>
           </a:p>
@@ -15730,11 +18291,7 @@
           <a:p>
             <a:r>
               <a:rPr lang="en-US" dirty="0" smtClean="0"/>
-              <a:t>You are probably aware of how Chef automates the </a:t>
-            </a:r>
-            <a:r>
-              <a:rPr lang="en-US" dirty="0" smtClean="0"/>
-              <a:t>configuration and management of your infrastructure. But what about risks and compliance?</a:t>
+              <a:t>You are probably aware of how Chef automates the configuration and management of your infrastructure. But what about risks and compliance?</a:t>
             </a:r>
           </a:p>
           <a:p>
@@ -16900,11 +19457,6 @@
               </a:rPr>
               <a:t>LAN/WAN</a:t>
             </a:r>
-            <a:endParaRPr lang="en-US" sz="2000" dirty="0" smtClean="0">
-              <a:solidFill>
-                <a:schemeClr val="tx1"/>
-              </a:solidFill>
-            </a:endParaRPr>
           </a:p>
         </p:txBody>
       </p:sp>
@@ -17271,7 +19823,11 @@
           <a:p>
             <a:r>
               <a:rPr lang="en-US" dirty="0" smtClean="0"/>
-              <a:t>Chef Compliance can run without any other Chef software installed on the Chef Compliance server machine.</a:t>
+              <a:t>Chef Compliance can run without any other Chef software </a:t>
+            </a:r>
+            <a:r>
+              <a:rPr lang="en-US" dirty="0" smtClean="0"/>
+              <a:t>installed.</a:t>
             </a:r>
           </a:p>
           <a:p>
@@ -17289,10 +19845,12 @@
           <a:p>
             <a:r>
               <a:rPr lang="en-US" dirty="0"/>
-              <a:t>However, you would need Chef software to create and implement remediation recipes if you choose to use recipes to remediate compliance issues.</a:t>
-            </a:r>
-          </a:p>
-          <a:p>
+              <a:t>However, you would need Chef software to create and implement remediation </a:t>
+            </a:r>
+            <a:r>
+              <a:rPr lang="en-US" dirty="0" smtClean="0"/>
+              <a:t>recipes.</a:t>
+            </a:r>
             <a:endParaRPr lang="en-US" dirty="0" smtClean="0"/>
           </a:p>
           <a:p>
@@ -17523,11 +20081,15 @@
           <a:p>
             <a:r>
               <a:rPr lang="en-US" dirty="0" err="1" smtClean="0"/>
-              <a:t>InsSpec</a:t>
+              <a:t>InSpec</a:t>
             </a:r>
             <a:r>
               <a:rPr lang="en-US" dirty="0" smtClean="0"/>
-              <a:t> is similar to </a:t>
+              <a:t> </a:t>
+            </a:r>
+            <a:r>
+              <a:rPr lang="en-US" dirty="0" smtClean="0"/>
+              <a:t>is similar to </a:t>
             </a:r>
             <a:r>
               <a:rPr lang="en-US" dirty="0" err="1" smtClean="0"/>
@@ -19113,6 +21675,61 @@
 </file>
 
 <file path=customXml/item1.xml><?xml version="1.0" encoding="utf-8"?>
+<?mso-contentType ?>
+<spe:Receivers xmlns:spe="http://schemas.microsoft.com/sharepoint/events">
+  <Receiver>
+    <Name>Document ID Generator</Name>
+    <Synchronization>Synchronous</Synchronization>
+    <Type>10001</Type>
+    <SequenceNumber>1000</SequenceNumber>
+    <Assembly>Microsoft.Office.DocumentManagement, Version=14.0.0.0, Culture=neutral, PublicKeyToken=71e9bce111e9429c</Assembly>
+    <Class>Microsoft.Office.DocumentManagement.Internal.DocIdHandler</Class>
+    <Data/>
+    <Filter/>
+  </Receiver>
+  <Receiver>
+    <Name>Document ID Generator</Name>
+    <Synchronization>Synchronous</Synchronization>
+    <Type>10002</Type>
+    <SequenceNumber>1001</SequenceNumber>
+    <Assembly>Microsoft.Office.DocumentManagement, Version=14.0.0.0, Culture=neutral, PublicKeyToken=71e9bce111e9429c</Assembly>
+    <Class>Microsoft.Office.DocumentManagement.Internal.DocIdHandler</Class>
+    <Data/>
+    <Filter/>
+  </Receiver>
+  <Receiver>
+    <Name>Document ID Generator</Name>
+    <Synchronization>Synchronous</Synchronization>
+    <Type>10004</Type>
+    <SequenceNumber>1002</SequenceNumber>
+    <Assembly>Microsoft.Office.DocumentManagement, Version=14.0.0.0, Culture=neutral, PublicKeyToken=71e9bce111e9429c</Assembly>
+    <Class>Microsoft.Office.DocumentManagement.Internal.DocIdHandler</Class>
+    <Data/>
+    <Filter/>
+  </Receiver>
+  <Receiver>
+    <Name>Document ID Generator</Name>
+    <Synchronization>Synchronous</Synchronization>
+    <Type>10006</Type>
+    <SequenceNumber>1003</SequenceNumber>
+    <Assembly>Microsoft.Office.DocumentManagement, Version=14.0.0.0, Culture=neutral, PublicKeyToken=71e9bce111e9429c</Assembly>
+    <Class>Microsoft.Office.DocumentManagement.Internal.DocIdHandler</Class>
+    <Data/>
+    <Filter/>
+  </Receiver>
+</spe:Receivers>
+</file>
+
+<file path=customXml/item2.xml><?xml version="1.0" encoding="utf-8"?>
+<?mso-contentType ?>
+<FormTemplates xmlns="http://schemas.microsoft.com/sharepoint/v3/contenttype/forms">
+  <Display>DocumentLibraryForm</Display>
+  <Edit>DocumentLibraryForm</Edit>
+  <New>DocumentLibraryForm</New>
+</FormTemplates>
+</file>
+
+<file path=customXml/item3.xml><?xml version="1.0" encoding="utf-8"?>
 <p:properties xmlns:p="http://schemas.microsoft.com/office/2006/metadata/properties" xmlns:xsi="http://www.w3.org/2001/XMLSchema-instance" xmlns:pc="http://schemas.microsoft.com/office/infopath/2007/PartnerControls">
   <documentManagement>
     <_dlc_DocId xmlns="7bb5d761-a2ea-4873-95f7-7a6658fb3ef0">M4CWTKMW727E-592-73</_dlc_DocId>
@@ -19124,7 +21741,7 @@
 </p:properties>
 </file>
 
-<file path=customXml/item2.xml><?xml version="1.0" encoding="utf-8"?>
+<file path=customXml/item4.xml><?xml version="1.0" encoding="utf-8"?>
 <ct:contentTypeSchema xmlns:ct="http://schemas.microsoft.com/office/2006/metadata/contentType" xmlns:ma="http://schemas.microsoft.com/office/2006/metadata/properties/metaAttributes" ct:_="" ma:_="" ma:contentTypeName="Document" ma:contentTypeID="0x0101000812F700BE7F874999720E88173FE491" ma:contentTypeVersion="0" ma:contentTypeDescription="Create a new document." ma:contentTypeScope="" ma:versionID="3f79f408e2ca720b7aba6e0e32464d0c">
   <xsd:schema xmlns:xsd="http://www.w3.org/2001/XMLSchema" xmlns:xs="http://www.w3.org/2001/XMLSchema" xmlns:p="http://schemas.microsoft.com/office/2006/metadata/properties" xmlns:ns2="7bb5d761-a2ea-4873-95f7-7a6658fb3ef0" targetNamespace="http://schemas.microsoft.com/office/2006/metadata/properties" ma:root="true" ma:fieldsID="1e062cd38ba31e406bfc4340fbc7f87a" ns2:_="">
     <xsd:import namespace="7bb5d761-a2ea-4873-95f7-7a6658fb3ef0"/>
@@ -19269,62 +21886,23 @@
 </ct:contentTypeSchema>
 </file>
 
-<file path=customXml/item3.xml><?xml version="1.0" encoding="utf-8"?>
-<?mso-contentType ?>
-<spe:Receivers xmlns:spe="http://schemas.microsoft.com/sharepoint/events">
-  <Receiver>
-    <Name>Document ID Generator</Name>
-    <Synchronization>Synchronous</Synchronization>
-    <Type>10001</Type>
-    <SequenceNumber>1000</SequenceNumber>
-    <Assembly>Microsoft.Office.DocumentManagement, Version=14.0.0.0, Culture=neutral, PublicKeyToken=71e9bce111e9429c</Assembly>
-    <Class>Microsoft.Office.DocumentManagement.Internal.DocIdHandler</Class>
-    <Data/>
-    <Filter/>
-  </Receiver>
-  <Receiver>
-    <Name>Document ID Generator</Name>
-    <Synchronization>Synchronous</Synchronization>
-    <Type>10002</Type>
-    <SequenceNumber>1001</SequenceNumber>
-    <Assembly>Microsoft.Office.DocumentManagement, Version=14.0.0.0, Culture=neutral, PublicKeyToken=71e9bce111e9429c</Assembly>
-    <Class>Microsoft.Office.DocumentManagement.Internal.DocIdHandler</Class>
-    <Data/>
-    <Filter/>
-  </Receiver>
-  <Receiver>
-    <Name>Document ID Generator</Name>
-    <Synchronization>Synchronous</Synchronization>
-    <Type>10004</Type>
-    <SequenceNumber>1002</SequenceNumber>
-    <Assembly>Microsoft.Office.DocumentManagement, Version=14.0.0.0, Culture=neutral, PublicKeyToken=71e9bce111e9429c</Assembly>
-    <Class>Microsoft.Office.DocumentManagement.Internal.DocIdHandler</Class>
-    <Data/>
-    <Filter/>
-  </Receiver>
-  <Receiver>
-    <Name>Document ID Generator</Name>
-    <Synchronization>Synchronous</Synchronization>
-    <Type>10006</Type>
-    <SequenceNumber>1003</SequenceNumber>
-    <Assembly>Microsoft.Office.DocumentManagement, Version=14.0.0.0, Culture=neutral, PublicKeyToken=71e9bce111e9429c</Assembly>
-    <Class>Microsoft.Office.DocumentManagement.Internal.DocIdHandler</Class>
-    <Data/>
-    <Filter/>
-  </Receiver>
-</spe:Receivers>
+<file path=customXml/itemProps1.xml><?xml version="1.0" encoding="utf-8"?>
+<ds:datastoreItem xmlns:ds="http://schemas.openxmlformats.org/officeDocument/2006/customXml" ds:itemID="{B13EBC30-FE27-4C6A-B723-23FC2188F7DC}">
+  <ds:schemaRefs>
+    <ds:schemaRef ds:uri="http://schemas.microsoft.com/sharepoint/events"/>
+  </ds:schemaRefs>
+</ds:datastoreItem>
 </file>
 
-<file path=customXml/item4.xml><?xml version="1.0" encoding="utf-8"?>
-<?mso-contentType ?>
-<FormTemplates xmlns="http://schemas.microsoft.com/sharepoint/v3/contenttype/forms">
-  <Display>DocumentLibraryForm</Display>
-  <Edit>DocumentLibraryForm</Edit>
-  <New>DocumentLibraryForm</New>
-</FormTemplates>
+<file path=customXml/itemProps2.xml><?xml version="1.0" encoding="utf-8"?>
+<ds:datastoreItem xmlns:ds="http://schemas.openxmlformats.org/officeDocument/2006/customXml" ds:itemID="{5CDEB364-43EC-4510-9881-539C2A3FCE9E}">
+  <ds:schemaRefs>
+    <ds:schemaRef ds:uri="http://schemas.microsoft.com/sharepoint/v3/contenttype/forms"/>
+  </ds:schemaRefs>
+</ds:datastoreItem>
 </file>
 
-<file path=customXml/itemProps1.xml><?xml version="1.0" encoding="utf-8"?>
+<file path=customXml/itemProps3.xml><?xml version="1.0" encoding="utf-8"?>
 <ds:datastoreItem xmlns:ds="http://schemas.openxmlformats.org/officeDocument/2006/customXml" ds:itemID="{6921749B-AEB7-461B-845F-603CABD25259}">
   <ds:schemaRefs>
     <ds:schemaRef ds:uri="http://purl.org/dc/elements/1.1/"/>
@@ -19340,7 +21918,7 @@
 </ds:datastoreItem>
 </file>
 
-<file path=customXml/itemProps2.xml><?xml version="1.0" encoding="utf-8"?>
+<file path=customXml/itemProps4.xml><?xml version="1.0" encoding="utf-8"?>
 <ds:datastoreItem xmlns:ds="http://schemas.openxmlformats.org/officeDocument/2006/customXml" ds:itemID="{164479E5-0B02-49AC-B79E-EC1D6164DDD3}">
   <ds:schemaRefs>
     <ds:schemaRef ds:uri="http://schemas.microsoft.com/office/2006/metadata/contentType"/>
@@ -19356,20 +21934,4 @@
     <ds:schemaRef ds:uri="http://schemas.microsoft.com/internal/obd"/>
   </ds:schemaRefs>
 </ds:datastoreItem>
-</file>
-
-<file path=customXml/itemProps3.xml><?xml version="1.0" encoding="utf-8"?>
-<ds:datastoreItem xmlns:ds="http://schemas.openxmlformats.org/officeDocument/2006/customXml" ds:itemID="{B13EBC30-FE27-4C6A-B723-23FC2188F7DC}">
-  <ds:schemaRefs>
-    <ds:schemaRef ds:uri="http://schemas.microsoft.com/sharepoint/events"/>
-  </ds:schemaRefs>
-</ds:datastoreItem>
-</file>
-
-<file path=customXml/itemProps4.xml><?xml version="1.0" encoding="utf-8"?>
-<ds:datastoreItem xmlns:ds="http://schemas.openxmlformats.org/officeDocument/2006/customXml" ds:itemID="{5CDEB364-43EC-4510-9881-539C2A3FCE9E}">
-  <ds:schemaRefs>
-    <ds:schemaRef ds:uri="http://schemas.microsoft.com/sharepoint/v3/contenttype/forms"/>
-  </ds:schemaRefs>
-</ds:datastoreItem>
 </file>
</xml_diff>

<commit_message>
Some modifications to the intro section
* Add another objective to the course, participants will be able to describe the capabilities of Chef Compliance.
* Do not mention Serverspec.  It should be in the instructor notes and the instructor should be ready to answer questions about it.  Learners who have no experience with Serverspec may be confused by the reference.
* Show some sample InSpec when describing it.
</commit_message>
<xml_diff>
--- a/01-Intro.pptx
+++ b/01-Intro.pptx
@@ -160,7 +160,7 @@
   </p:defaultTextStyle>
   <p:extLst>
     <p:ext uri="{EFAFB233-063F-42B5-8137-9DF3F51BA10A}">
-      <p15:sldGuideLst xmlns:p15="http://schemas.microsoft.com/office/powerpoint/2012/main">
+      <p15:sldGuideLst xmlns:p15="http://schemas.microsoft.com/office/powerpoint/2012/main" xmlns="">
         <p15:guide id="1" orient="horz" pos="894">
           <p15:clr>
             <a:srgbClr val="A4A3A4"/>
@@ -174,7 +174,7 @@
       </p15:sldGuideLst>
     </p:ext>
     <p:ext uri="{2D200454-40CA-4A62-9FC3-DE9A4176ACB9}">
-      <p15:notesGuideLst xmlns:p15="http://schemas.microsoft.com/office/powerpoint/2012/main"/>
+      <p15:notesGuideLst xmlns:p15="http://schemas.microsoft.com/office/powerpoint/2012/main" xmlns=""/>
     </p:ext>
   </p:extLst>
 </p:presentation>
@@ -291,7 +291,7 @@
               <a:pPr>
                 <a:defRPr/>
               </a:pPr>
-              <a:t>2016-01-14</a:t>
+              <a:t>1/19/16</a:t>
             </a:fld>
             <a:endParaRPr lang="en-US" dirty="0"/>
           </a:p>
@@ -474,7 +474,7 @@
               <a:pPr>
                 <a:defRPr/>
               </a:pPr>
-              <a:t>2016-01-14</a:t>
+              <a:t>1/19/16</a:t>
             </a:fld>
             <a:endParaRPr lang="en-US" dirty="0"/>
           </a:p>
@@ -1988,11 +1988,7 @@
             </a:r>
             <a:r>
               <a:rPr lang="en-US" baseline="0" dirty="0" smtClean="0"/>
-              <a:t> that we use for Chef training. They have ChefDK installed on </a:t>
-            </a:r>
-            <a:r>
-              <a:rPr lang="en-US" baseline="0" dirty="0" smtClean="0"/>
-              <a:t>them although Chef does not actually need to be installed on these instances in order to run scans.</a:t>
+              <a:t> that we use for Chef training. They have ChefDK installed on them although Chef does not actually need to be installed on these instances in order to run scans.</a:t>
             </a:r>
           </a:p>
           <a:p>
@@ -2035,15 +2031,7 @@
             </a:pPr>
             <a:r>
               <a:rPr lang="en-US" baseline="0" dirty="0" smtClean="0"/>
-              <a:t>Instructor Note: Now would be a good time to distribute the hostnames of the </a:t>
-            </a:r>
-            <a:r>
-              <a:rPr lang="en-US" baseline="0" dirty="0" smtClean="0"/>
-              <a:t>three nodes </a:t>
-            </a:r>
-            <a:r>
-              <a:rPr lang="en-US" baseline="0" dirty="0" smtClean="0"/>
-              <a:t>you will assign to each student.</a:t>
+              <a:t>Instructor Note: Now would be a good time to distribute the hostnames of the three nodes you will assign to each student.</a:t>
             </a:r>
             <a:r>
               <a:rPr lang="en-US" baseline="0" dirty="0"/>
@@ -2051,23 +2039,7 @@
             </a:r>
             <a:r>
               <a:rPr lang="en-US" baseline="0" dirty="0" smtClean="0"/>
-              <a:t>You should ask the students to note which one they will use as their Compliance Server and which </a:t>
-            </a:r>
-            <a:r>
-              <a:rPr lang="en-US" baseline="0" dirty="0" smtClean="0"/>
-              <a:t>ones </a:t>
-            </a:r>
-            <a:r>
-              <a:rPr lang="en-US" baseline="0" dirty="0" smtClean="0"/>
-              <a:t>they will use as the target </a:t>
-            </a:r>
-            <a:r>
-              <a:rPr lang="en-US" baseline="0" dirty="0" smtClean="0"/>
-              <a:t>nodes </a:t>
-            </a:r>
-            <a:r>
-              <a:rPr lang="en-US" baseline="0" dirty="0" smtClean="0"/>
-              <a:t>for scans.</a:t>
+              <a:t>You should ask the students to note which one they will use as their Compliance Server and which ones they will use as the target nodes for scans.</a:t>
             </a:r>
           </a:p>
           <a:p>
@@ -2136,43 +2108,7 @@
                 <a:ea typeface="ＭＳ Ｐゴシック" charset="0"/>
                 <a:cs typeface="+mn-cs"/>
               </a:rPr>
-              <a:t>ec2-54-164-54-218.compute-1.amazonaws.com = </a:t>
-            </a:r>
-            <a:r>
-              <a:rPr lang="en-US" sz="1200" kern="1200" dirty="0" smtClean="0">
-                <a:solidFill>
-                  <a:schemeClr val="tx1"/>
-                </a:solidFill>
-                <a:effectLst/>
-                <a:latin typeface="Arial" panose="020B0604020202020204" pitchFamily="34" charset="0"/>
-                <a:ea typeface="ＭＳ Ｐゴシック" charset="0"/>
-                <a:cs typeface="+mn-cs"/>
-              </a:rPr>
-              <a:t>Linux Target </a:t>
-            </a:r>
-            <a:r>
-              <a:rPr lang="en-US" sz="1200" kern="1200" dirty="0" smtClean="0">
-                <a:solidFill>
-                  <a:schemeClr val="tx1"/>
-                </a:solidFill>
-                <a:effectLst/>
-                <a:latin typeface="Arial" panose="020B0604020202020204" pitchFamily="34" charset="0"/>
-                <a:ea typeface="ＭＳ Ｐゴシック" charset="0"/>
-                <a:cs typeface="+mn-cs"/>
-              </a:rPr>
-              <a:t>node</a:t>
-            </a:r>
-            <a:r>
-              <a:rPr lang="en-US" sz="1200" kern="1200" dirty="0" smtClean="0">
-                <a:solidFill>
-                  <a:schemeClr val="tx1"/>
-                </a:solidFill>
-                <a:effectLst/>
-                <a:latin typeface="Arial" panose="020B0604020202020204" pitchFamily="34" charset="0"/>
-                <a:ea typeface="ＭＳ Ｐゴシック" charset="0"/>
-                <a:cs typeface="+mn-cs"/>
-              </a:rPr>
-              <a:t>.</a:t>
+              <a:t>ec2-54-164-54-218.compute-1.amazonaws.com = Linux Target node.</a:t>
             </a:r>
           </a:p>
           <a:p>
@@ -2254,19 +2190,7 @@
             </a:pPr>
             <a:r>
               <a:rPr lang="en-US" baseline="0" dirty="0" smtClean="0"/>
-              <a:t>The login credentials for </a:t>
-            </a:r>
-            <a:r>
-              <a:rPr lang="en-US" baseline="0" dirty="0" smtClean="0"/>
-              <a:t>the Linux nodes </a:t>
-            </a:r>
-            <a:r>
-              <a:rPr lang="en-US" baseline="0" dirty="0" smtClean="0"/>
-              <a:t>is </a:t>
-            </a:r>
-            <a:r>
-              <a:rPr lang="en-US" baseline="0" dirty="0" smtClean="0"/>
-              <a:t>chef/TBD. </a:t>
+              <a:t>The login credentials for the Linux nodes is chef/TBD. </a:t>
             </a:r>
           </a:p>
           <a:p>
@@ -2503,7 +2427,6 @@
               <a:rPr lang="en-US" baseline="0" dirty="0" smtClean="0"/>
               <a:t>But all scans will only be run via the Compliance server as indicated in the previous slide.</a:t>
             </a:r>
-            <a:endParaRPr lang="en-US" baseline="0" dirty="0" smtClean="0"/>
           </a:p>
         </p:txBody>
       </p:sp>
@@ -2588,11 +2511,7 @@
           <a:p>
             <a:r>
               <a:rPr lang="en-US" dirty="0" smtClean="0"/>
-              <a:t>You </a:t>
-            </a:r>
-            <a:r>
-              <a:rPr lang="en-US" dirty="0" smtClean="0"/>
-              <a:t>should use an ssh client like </a:t>
+              <a:t>You should use an ssh client like </a:t>
             </a:r>
             <a:r>
               <a:rPr lang="en-US" dirty="0" err="1" smtClean="0"/>
@@ -2790,7 +2709,6 @@
               <a:rPr lang="en-US" baseline="0" dirty="0" smtClean="0"/>
               <a:t>You should have installed on your laptop a Windows Remote Desktop Connection which you'll only use to write remediation later in this course.</a:t>
             </a:r>
-            <a:endParaRPr lang="en-US" baseline="0" dirty="0" smtClean="0"/>
           </a:p>
           <a:p>
             <a:endParaRPr lang="en-US" baseline="0" dirty="0" smtClean="0"/>
@@ -3759,19 +3677,7 @@
                 <a:ea typeface="ＭＳ Ｐゴシック" charset="0"/>
                 <a:cs typeface="Arial" panose="020B0604020202020204" pitchFamily="34" charset="0"/>
               </a:rPr>
-              <a:t> </a:t>
-            </a:r>
-            <a:r>
-              <a:rPr lang="en-US" sz="1200" b="0" i="0" kern="1200" dirty="0" smtClean="0">
-                <a:solidFill>
-                  <a:schemeClr val="tx1"/>
-                </a:solidFill>
-                <a:effectLst/>
-                <a:latin typeface="Arial" panose="020B0604020202020204" pitchFamily="34" charset="0"/>
-                <a:ea typeface="ＭＳ Ｐゴシック" charset="0"/>
-                <a:cs typeface="Arial" panose="020B0604020202020204" pitchFamily="34" charset="0"/>
-              </a:rPr>
-              <a:t>is an open-source run-time framework and rule language used to specify compliance, security, and policy requirements for testing any node in your infrastructure. The </a:t>
+              <a:t> is an open-source run-time framework and rule language used to specify compliance, security, and policy requirements for testing any node in your infrastructure. The </a:t>
             </a:r>
             <a:r>
               <a:rPr lang="en-US" sz="1200" b="0" i="0" kern="1200" dirty="0" err="1" smtClean="0">
@@ -3906,19 +3812,7 @@
                 <a:ea typeface="ＭＳ Ｐゴシック" charset="0"/>
                 <a:cs typeface="Arial" panose="020B0604020202020204" pitchFamily="34" charset="0"/>
               </a:rPr>
-              <a:t>Any detected security, compliance, or policy issues are </a:t>
-            </a:r>
-            <a:r>
-              <a:rPr lang="en-US" sz="1200" b="0" i="0" kern="1200" dirty="0" smtClean="0">
-                <a:solidFill>
-                  <a:schemeClr val="tx1"/>
-                </a:solidFill>
-                <a:effectLst/>
-                <a:latin typeface="Arial" panose="020B0604020202020204" pitchFamily="34" charset="0"/>
-                <a:ea typeface="ＭＳ Ｐゴシック" charset="0"/>
-                <a:cs typeface="Arial" panose="020B0604020202020204" pitchFamily="34" charset="0"/>
-              </a:rPr>
-              <a:t>flagged in a log</a:t>
+              <a:t>Any detected security, compliance, or policy issues are flagged in a log</a:t>
             </a:r>
             <a:r>
               <a:rPr lang="en-US" sz="1200" b="0" i="0" kern="1200" baseline="0" dirty="0" smtClean="0">
@@ -4509,7 +4403,7 @@
   <p:clrMapOvr>
     <a:masterClrMapping/>
   </p:clrMapOvr>
-  <p:transition spd="med">
+  <p:transition xmlns:p14="http://schemas.microsoft.com/office/powerpoint/2010/main" spd="med">
     <p:fade/>
   </p:transition>
 </p:sldLayout>
@@ -4804,7 +4698,7 @@
   <p:clrMapOvr>
     <a:overrideClrMapping bg1="lt1" tx1="dk1" bg2="lt2" tx2="dk2" accent1="accent1" accent2="accent2" accent3="accent3" accent4="accent4" accent5="accent5" accent6="accent6" hlink="hlink" folHlink="folHlink"/>
   </p:clrMapOvr>
-  <p:transition spd="med">
+  <p:transition xmlns:p14="http://schemas.microsoft.com/office/powerpoint/2010/main" spd="med">
     <p:fade/>
   </p:transition>
 </p:sldLayout>
@@ -4937,14 +4831,14 @@
           </a:ln>
           <a:extLst>
             <a:ext uri="{909E8E84-426E-40dd-AFC4-6F175D3DCCD1}">
-              <a14:hiddenFill xmlns="" xmlns:a14="http://schemas.microsoft.com/office/drawing/2010/main">
+              <a14:hiddenFill xmlns:a14="http://schemas.microsoft.com/office/drawing/2010/main">
                 <a:solidFill>
                   <a:srgbClr val="FFFFFF"/>
                 </a:solidFill>
               </a14:hiddenFill>
             </a:ext>
             <a:ext uri="{91240B29-F687-4f45-9708-019B960494DF}">
-              <a14:hiddenLine xmlns="" xmlns:a14="http://schemas.microsoft.com/office/drawing/2010/main" w="9525">
+              <a14:hiddenLine xmlns:a14="http://schemas.microsoft.com/office/drawing/2010/main" w="9525">
                 <a:solidFill>
                   <a:srgbClr val="000000"/>
                 </a:solidFill>
@@ -5092,14 +4986,14 @@
           </a:ln>
           <a:extLst>
             <a:ext uri="{909E8E84-426E-40dd-AFC4-6F175D3DCCD1}">
-              <a14:hiddenFill xmlns="" xmlns:a14="http://schemas.microsoft.com/office/drawing/2010/main">
+              <a14:hiddenFill xmlns:a14="http://schemas.microsoft.com/office/drawing/2010/main">
                 <a:solidFill>
                   <a:srgbClr val="FFFFFF"/>
                 </a:solidFill>
               </a14:hiddenFill>
             </a:ext>
             <a:ext uri="{91240B29-F687-4f45-9708-019B960494DF}">
-              <a14:hiddenLine xmlns="" xmlns:a14="http://schemas.microsoft.com/office/drawing/2010/main" w="9525">
+              <a14:hiddenLine xmlns:a14="http://schemas.microsoft.com/office/drawing/2010/main" w="9525">
                 <a:solidFill>
                   <a:srgbClr val="000000"/>
                 </a:solidFill>
@@ -5497,7 +5391,7 @@
   <p:clrMapOvr>
     <a:overrideClrMapping bg1="lt1" tx1="dk1" bg2="lt2" tx2="dk2" accent1="accent1" accent2="accent2" accent3="accent3" accent4="accent4" accent5="accent5" accent6="accent6" hlink="hlink" folHlink="folHlink"/>
   </p:clrMapOvr>
-  <p:transition spd="med">
+  <p:transition xmlns:p14="http://schemas.microsoft.com/office/powerpoint/2010/main" spd="med">
     <p:fade/>
   </p:transition>
 </p:sldLayout>
@@ -5590,14 +5484,14 @@
           </a:ln>
           <a:extLst>
             <a:ext uri="{909E8E84-426E-40dd-AFC4-6F175D3DCCD1}">
-              <a14:hiddenFill xmlns="" xmlns:a14="http://schemas.microsoft.com/office/drawing/2010/main">
+              <a14:hiddenFill xmlns:a14="http://schemas.microsoft.com/office/drawing/2010/main">
                 <a:solidFill>
                   <a:srgbClr val="FFFFFF"/>
                 </a:solidFill>
               </a14:hiddenFill>
             </a:ext>
             <a:ext uri="{91240B29-F687-4f45-9708-019B960494DF}">
-              <a14:hiddenLine xmlns="" xmlns:a14="http://schemas.microsoft.com/office/drawing/2010/main" w="9525">
+              <a14:hiddenLine xmlns:a14="http://schemas.microsoft.com/office/drawing/2010/main" w="9525">
                 <a:solidFill>
                   <a:srgbClr val="000000"/>
                 </a:solidFill>
@@ -5619,7 +5513,7 @@
   <p:clrMapOvr>
     <a:masterClrMapping/>
   </p:clrMapOvr>
-  <p:transition spd="med">
+  <p:transition xmlns:p14="http://schemas.microsoft.com/office/powerpoint/2010/main" spd="med">
     <p:fade/>
   </p:transition>
 </p:sldLayout>
@@ -5906,7 +5800,7 @@
   <p:clrMapOvr>
     <a:masterClrMapping/>
   </p:clrMapOvr>
-  <p:transition spd="med">
+  <p:transition xmlns:p14="http://schemas.microsoft.com/office/powerpoint/2010/main" spd="med">
     <p:fade/>
   </p:transition>
 </p:sldLayout>
@@ -6399,7 +6293,7 @@
   <p:timing>
     <p:tnLst>
       <p:par>
-        <p:cTn id="1" dur="indefinite" restart="never" nodeType="tmRoot"/>
+        <p:cTn xmlns:p14="http://schemas.microsoft.com/office/powerpoint/2010/main" id="1" dur="indefinite" restart="never" nodeType="tmRoot"/>
       </p:par>
     </p:tnLst>
   </p:timing>
@@ -6801,7 +6695,7 @@
   <p:timing>
     <p:tnLst>
       <p:par>
-        <p:cTn id="1" dur="indefinite" restart="never" nodeType="tmRoot"/>
+        <p:cTn xmlns:p14="http://schemas.microsoft.com/office/powerpoint/2010/main" id="1" dur="indefinite" restart="never" nodeType="tmRoot"/>
       </p:par>
     </p:tnLst>
   </p:timing>
@@ -7089,7 +6983,7 @@
   <p:clrMapOvr>
     <a:masterClrMapping/>
   </p:clrMapOvr>
-  <p:transition spd="med">
+  <p:transition xmlns:p14="http://schemas.microsoft.com/office/powerpoint/2010/main" spd="med">
     <p:fade/>
   </p:transition>
 </p:sldLayout>
@@ -7376,7 +7270,7 @@
   <p:clrMapOvr>
     <a:masterClrMapping/>
   </p:clrMapOvr>
-  <p:transition spd="med">
+  <p:transition xmlns:p14="http://schemas.microsoft.com/office/powerpoint/2010/main" spd="med">
     <p:fade/>
   </p:transition>
 </p:sldLayout>
@@ -7725,7 +7619,7 @@
   <p:clrMapOvr>
     <a:masterClrMapping/>
   </p:clrMapOvr>
-  <p:transition spd="med">
+  <p:transition xmlns:p14="http://schemas.microsoft.com/office/powerpoint/2010/main" spd="med">
     <p:fade/>
   </p:transition>
 </p:sldLayout>
@@ -8012,7 +7906,7 @@
   <p:clrMapOvr>
     <a:masterClrMapping/>
   </p:clrMapOvr>
-  <p:transition spd="med">
+  <p:transition xmlns:p14="http://schemas.microsoft.com/office/powerpoint/2010/main" spd="med">
     <p:fade/>
   </p:transition>
 </p:sldLayout>
@@ -8189,7 +8083,7 @@
   <p:clrMapOvr>
     <a:masterClrMapping/>
   </p:clrMapOvr>
-  <p:transition spd="med">
+  <p:transition xmlns:p14="http://schemas.microsoft.com/office/powerpoint/2010/main" spd="med">
     <p:fade/>
   </p:transition>
 </p:sldLayout>
@@ -8406,14 +8300,14 @@
           </a:ln>
           <a:extLst>
             <a:ext uri="{909E8E84-426E-40dd-AFC4-6F175D3DCCD1}">
-              <a14:hiddenFill xmlns="" xmlns:a14="http://schemas.microsoft.com/office/drawing/2010/main">
+              <a14:hiddenFill xmlns:a14="http://schemas.microsoft.com/office/drawing/2010/main">
                 <a:solidFill>
                   <a:srgbClr val="FFFFFF"/>
                 </a:solidFill>
               </a14:hiddenFill>
             </a:ext>
             <a:ext uri="{91240B29-F687-4f45-9708-019B960494DF}">
-              <a14:hiddenLine xmlns="" xmlns:a14="http://schemas.microsoft.com/office/drawing/2010/main" w="9525">
+              <a14:hiddenLine xmlns:a14="http://schemas.microsoft.com/office/drawing/2010/main" w="9525">
                 <a:solidFill>
                   <a:srgbClr val="000000"/>
                 </a:solidFill>
@@ -8610,7 +8504,7 @@
   <p:clrMapOvr>
     <a:masterClrMapping/>
   </p:clrMapOvr>
-  <p:transition spd="med">
+  <p:transition xmlns:p14="http://schemas.microsoft.com/office/powerpoint/2010/main" spd="med">
     <p:fade/>
   </p:transition>
 </p:sldLayout>
@@ -8898,7 +8792,7 @@
   <p:clrMapOvr>
     <a:masterClrMapping/>
   </p:clrMapOvr>
-  <p:transition spd="med">
+  <p:transition xmlns:p14="http://schemas.microsoft.com/office/powerpoint/2010/main" spd="med">
     <p:fade/>
   </p:transition>
 </p:sldLayout>
@@ -9210,7 +9104,7 @@
   <p:clrMapOvr>
     <a:masterClrMapping/>
   </p:clrMapOvr>
-  <p:transition spd="med">
+  <p:transition xmlns:p14="http://schemas.microsoft.com/office/powerpoint/2010/main" spd="med">
     <p:fade/>
   </p:transition>
 </p:sldLayout>
@@ -9514,7 +9408,7 @@
   <p:clrMapOvr>
     <a:masterClrMapping/>
   </p:clrMapOvr>
-  <p:transition spd="med">
+  <p:transition xmlns:p14="http://schemas.microsoft.com/office/powerpoint/2010/main" spd="med">
     <p:fade/>
   </p:transition>
 </p:sldLayout>
@@ -9694,7 +9588,7 @@
   <p:clrMapOvr>
     <a:masterClrMapping/>
   </p:clrMapOvr>
-  <p:transition spd="med">
+  <p:transition xmlns:p14="http://schemas.microsoft.com/office/powerpoint/2010/main" spd="med">
     <p:fade/>
   </p:transition>
 </p:sldLayout>
@@ -9770,14 +9664,14 @@
           </a:ln>
           <a:extLst>
             <a:ext uri="{909E8E84-426E-40dd-AFC4-6F175D3DCCD1}">
-              <a14:hiddenFill xmlns="" xmlns:a14="http://schemas.microsoft.com/office/drawing/2010/main">
+              <a14:hiddenFill xmlns:a14="http://schemas.microsoft.com/office/drawing/2010/main">
                 <a:solidFill>
                   <a:srgbClr val="FFFFFF"/>
                 </a:solidFill>
               </a14:hiddenFill>
             </a:ext>
             <a:ext uri="{91240B29-F687-4f45-9708-019B960494DF}">
-              <a14:hiddenLine xmlns="" xmlns:a14="http://schemas.microsoft.com/office/drawing/2010/main" w="9525">
+              <a14:hiddenLine xmlns:a14="http://schemas.microsoft.com/office/drawing/2010/main" w="9525">
                 <a:solidFill>
                   <a:srgbClr val="000000"/>
                 </a:solidFill>
@@ -10053,7 +9947,7 @@
   <p:clrMapOvr>
     <a:overrideClrMapping bg1="lt1" tx1="dk1" bg2="lt2" tx2="dk2" accent1="accent1" accent2="accent2" accent3="accent3" accent4="accent4" accent5="accent5" accent6="accent6" hlink="hlink" folHlink="folHlink"/>
   </p:clrMapOvr>
-  <p:transition spd="med">
+  <p:transition xmlns:p14="http://schemas.microsoft.com/office/powerpoint/2010/main" spd="med">
     <p:fade/>
   </p:transition>
 </p:sldLayout>
@@ -10259,7 +10153,7 @@
   <p:clrMapOvr>
     <a:overrideClrMapping bg1="lt1" tx1="dk1" bg2="lt2" tx2="dk2" accent1="accent1" accent2="accent2" accent3="accent3" accent4="accent4" accent5="accent5" accent6="accent6" hlink="hlink" folHlink="folHlink"/>
   </p:clrMapOvr>
-  <p:transition spd="med">
+  <p:transition xmlns:p14="http://schemas.microsoft.com/office/powerpoint/2010/main" spd="med">
     <p:fade/>
   </p:transition>
 </p:sldLayout>
@@ -10335,14 +10229,14 @@
           </a:ln>
           <a:extLst>
             <a:ext uri="{909E8E84-426E-40dd-AFC4-6F175D3DCCD1}">
-              <a14:hiddenFill xmlns="" xmlns:a14="http://schemas.microsoft.com/office/drawing/2010/main">
+              <a14:hiddenFill xmlns:a14="http://schemas.microsoft.com/office/drawing/2010/main">
                 <a:solidFill>
                   <a:srgbClr val="FFFFFF"/>
                 </a:solidFill>
               </a14:hiddenFill>
             </a:ext>
             <a:ext uri="{91240B29-F687-4f45-9708-019B960494DF}">
-              <a14:hiddenLine xmlns="" xmlns:a14="http://schemas.microsoft.com/office/drawing/2010/main" w="9525">
+              <a14:hiddenLine xmlns:a14="http://schemas.microsoft.com/office/drawing/2010/main" w="9525">
                 <a:solidFill>
                   <a:srgbClr val="000000"/>
                 </a:solidFill>
@@ -10625,7 +10519,7 @@
   <p:clrMapOvr>
     <a:overrideClrMapping bg1="lt1" tx1="dk1" bg2="lt2" tx2="dk2" accent1="accent1" accent2="accent2" accent3="accent3" accent4="accent4" accent5="accent5" accent6="accent6" hlink="hlink" folHlink="folHlink"/>
   </p:clrMapOvr>
-  <p:transition spd="med">
+  <p:transition xmlns:p14="http://schemas.microsoft.com/office/powerpoint/2010/main" spd="med">
     <p:fade/>
   </p:transition>
 </p:sldLayout>
@@ -10833,7 +10727,7 @@
   <p:clrMapOvr>
     <a:overrideClrMapping bg1="lt1" tx1="dk1" bg2="lt2" tx2="dk2" accent1="accent1" accent2="accent2" accent3="accent3" accent4="accent4" accent5="accent5" accent6="accent6" hlink="hlink" folHlink="folHlink"/>
   </p:clrMapOvr>
-  <p:transition spd="med">
+  <p:transition xmlns:p14="http://schemas.microsoft.com/office/powerpoint/2010/main" spd="med">
     <p:fade/>
   </p:transition>
 </p:sldLayout>
@@ -10909,14 +10803,14 @@
           </a:ln>
           <a:extLst>
             <a:ext uri="{909E8E84-426E-40dd-AFC4-6F175D3DCCD1}">
-              <a14:hiddenFill xmlns="" xmlns:a14="http://schemas.microsoft.com/office/drawing/2010/main">
+              <a14:hiddenFill xmlns:a14="http://schemas.microsoft.com/office/drawing/2010/main">
                 <a:solidFill>
                   <a:srgbClr val="FFFFFF"/>
                 </a:solidFill>
               </a14:hiddenFill>
             </a:ext>
             <a:ext uri="{91240B29-F687-4f45-9708-019B960494DF}">
-              <a14:hiddenLine xmlns="" xmlns:a14="http://schemas.microsoft.com/office/drawing/2010/main" w="9525">
+              <a14:hiddenLine xmlns:a14="http://schemas.microsoft.com/office/drawing/2010/main" w="9525">
                 <a:solidFill>
                   <a:srgbClr val="000000"/>
                 </a:solidFill>
@@ -11184,7 +11078,7 @@
   <p:clrMapOvr>
     <a:overrideClrMapping bg1="lt1" tx1="dk1" bg2="lt2" tx2="dk2" accent1="accent1" accent2="accent2" accent3="accent3" accent4="accent4" accent5="accent5" accent6="accent6" hlink="hlink" folHlink="folHlink"/>
   </p:clrMapOvr>
-  <p:transition spd="med">
+  <p:transition xmlns:p14="http://schemas.microsoft.com/office/powerpoint/2010/main" spd="med">
     <p:fade/>
   </p:transition>
 </p:sldLayout>
@@ -11412,7 +11306,7 @@
   <p:clrMapOvr>
     <a:overrideClrMapping bg1="lt1" tx1="dk1" bg2="lt2" tx2="dk2" accent1="accent1" accent2="accent2" accent3="accent3" accent4="accent4" accent5="accent5" accent6="accent6" hlink="hlink" folHlink="folHlink"/>
   </p:clrMapOvr>
-  <p:transition spd="med">
+  <p:transition xmlns:p14="http://schemas.microsoft.com/office/powerpoint/2010/main" spd="med">
     <p:fade/>
   </p:transition>
 </p:sldLayout>
@@ -11700,7 +11594,7 @@
   <p:clrMapOvr>
     <a:overrideClrMapping bg1="lt1" tx1="dk1" bg2="lt2" tx2="dk2" accent1="accent1" accent2="accent2" accent3="accent3" accent4="accent4" accent5="accent5" accent6="accent6" hlink="hlink" folHlink="folHlink"/>
   </p:clrMapOvr>
-  <p:transition spd="med">
+  <p:transition xmlns:p14="http://schemas.microsoft.com/office/powerpoint/2010/main" spd="med">
     <p:fade/>
   </p:transition>
 </p:sldLayout>
@@ -11856,14 +11750,14 @@
           </a:ln>
           <a:extLst>
             <a:ext uri="{909E8E84-426E-40dd-AFC4-6F175D3DCCD1}">
-              <a14:hiddenFill xmlns="" xmlns:a14="http://schemas.microsoft.com/office/drawing/2010/main">
+              <a14:hiddenFill xmlns:a14="http://schemas.microsoft.com/office/drawing/2010/main">
                 <a:solidFill>
                   <a:srgbClr val="FFFFFF"/>
                 </a:solidFill>
               </a14:hiddenFill>
             </a:ext>
             <a:ext uri="{91240B29-F687-4f45-9708-019B960494DF}">
-              <a14:hiddenLine xmlns="" xmlns:a14="http://schemas.microsoft.com/office/drawing/2010/main" w="9525">
+              <a14:hiddenLine xmlns:a14="http://schemas.microsoft.com/office/drawing/2010/main" w="9525">
                 <a:solidFill>
                   <a:srgbClr val="000000"/>
                 </a:solidFill>
@@ -12083,13 +11977,13 @@
     <p:sldLayoutId id="2147483869" r:id="rId14"/>
     <p:sldLayoutId id="2147483870" r:id="rId15"/>
   </p:sldLayoutIdLst>
-  <p:transition spd="med">
+  <p:transition xmlns:p14="http://schemas.microsoft.com/office/powerpoint/2010/main" spd="med">
     <p:fade/>
   </p:transition>
   <p:timing>
     <p:tnLst>
       <p:par>
-        <p:cTn id="1" dur="indefinite" restart="never" nodeType="tmRoot"/>
+        <p:cTn xmlns:p14="http://schemas.microsoft.com/office/powerpoint/2010/main" id="1" dur="indefinite" restart="never" nodeType="tmRoot"/>
       </p:par>
     </p:tnLst>
   </p:timing>
@@ -12617,14 +12511,14 @@
           </a:ln>
           <a:extLst>
             <a:ext uri="{909E8E84-426E-40dd-AFC4-6F175D3DCCD1}">
-              <a14:hiddenFill xmlns="" xmlns:a14="http://schemas.microsoft.com/office/drawing/2010/main">
+              <a14:hiddenFill xmlns:a14="http://schemas.microsoft.com/office/drawing/2010/main">
                 <a:solidFill>
                   <a:srgbClr val="FFFFFF"/>
                 </a:solidFill>
               </a14:hiddenFill>
             </a:ext>
             <a:ext uri="{91240B29-F687-4f45-9708-019B960494DF}">
-              <a14:hiddenLine xmlns="" xmlns:a14="http://schemas.microsoft.com/office/drawing/2010/main" w="9525">
+              <a14:hiddenLine xmlns:a14="http://schemas.microsoft.com/office/drawing/2010/main" w="9525">
                 <a:solidFill>
                   <a:srgbClr val="000000"/>
                 </a:solidFill>
@@ -12913,13 +12807,13 @@
     <p:sldLayoutId id="2147483866" r:id="rId8"/>
     <p:sldLayoutId id="2147483868" r:id="rId9"/>
   </p:sldLayoutIdLst>
-  <p:transition spd="med">
+  <p:transition xmlns:p14="http://schemas.microsoft.com/office/powerpoint/2010/main" spd="med">
     <p:fade/>
   </p:transition>
   <p:timing>
     <p:tnLst>
       <p:par>
-        <p:cTn id="1" dur="indefinite" restart="never" nodeType="tmRoot"/>
+        <p:cTn xmlns:p14="http://schemas.microsoft.com/office/powerpoint/2010/main" id="1" dur="indefinite" restart="never" nodeType="tmRoot"/>
       </p:par>
     </p:tnLst>
   </p:timing>
@@ -13441,13 +13335,13 @@
   <p:clrMapOvr>
     <a:masterClrMapping/>
   </p:clrMapOvr>
-  <p:transition spd="med">
+  <p:transition xmlns:p14="http://schemas.microsoft.com/office/powerpoint/2010/main" spd="med">
     <p:fade/>
   </p:transition>
   <p:timing>
     <p:tnLst>
       <p:par>
-        <p:cTn id="1" dur="indefinite" restart="never" nodeType="tmRoot"/>
+        <p:cTn xmlns:p14="http://schemas.microsoft.com/office/powerpoint/2010/main" id="1" dur="indefinite" restart="never" nodeType="tmRoot"/>
       </p:par>
     </p:tnLst>
   </p:timing>
@@ -13556,6 +13450,391 @@
           </a:p>
         </p:txBody>
       </p:sp>
+      <p:sp>
+        <p:nvSpPr>
+          <p:cNvPr id="4" name="TextBox 3"/>
+          <p:cNvSpPr txBox="1"/>
+          <p:nvPr/>
+        </p:nvSpPr>
+        <p:spPr bwMode="white">
+          <a:xfrm>
+            <a:off x="4044155" y="4845610"/>
+            <a:ext cx="8155156" cy="3141292"/>
+          </a:xfrm>
+          <a:prstGeom prst="rect">
+            <a:avLst/>
+          </a:prstGeom>
+          <a:ln>
+            <a:solidFill>
+              <a:schemeClr val="tx1"/>
+            </a:solidFill>
+            <a:prstDash val="dash"/>
+          </a:ln>
+        </p:spPr>
+        <p:txBody>
+          <a:bodyPr vert="horz" wrap="none" lIns="91440" tIns="91440" rIns="91440" bIns="91440" rtlCol="0">
+            <a:noAutofit/>
+          </a:bodyPr>
+          <a:lstStyle/>
+          <a:p>
+            <a:r>
+              <a:rPr lang="en-US" dirty="0">
+                <a:solidFill>
+                  <a:srgbClr val="000000"/>
+                </a:solidFill>
+                <a:latin typeface="Courier New"/>
+                <a:cs typeface="Courier New"/>
+              </a:rPr>
+              <a:t>describe port</a:t>
+            </a:r>
+            <a:r>
+              <a:rPr lang="en-US" b="1" dirty="0">
+                <a:solidFill>
+                  <a:srgbClr val="000000"/>
+                </a:solidFill>
+                <a:latin typeface="Courier New"/>
+                <a:cs typeface="Courier New"/>
+              </a:rPr>
+              <a:t>(</a:t>
+            </a:r>
+            <a:r>
+              <a:rPr lang="en-US" b="1" dirty="0">
+                <a:solidFill>
+                  <a:srgbClr val="0000CF"/>
+                </a:solidFill>
+                <a:latin typeface="Courier New"/>
+                <a:cs typeface="Courier New"/>
+              </a:rPr>
+              <a:t>80</a:t>
+            </a:r>
+            <a:r>
+              <a:rPr lang="en-US" b="1" dirty="0">
+                <a:solidFill>
+                  <a:srgbClr val="000000"/>
+                </a:solidFill>
+                <a:latin typeface="Courier New"/>
+                <a:cs typeface="Courier New"/>
+              </a:rPr>
+              <a:t>) </a:t>
+            </a:r>
+            <a:r>
+              <a:rPr lang="en-US" b="1" dirty="0">
+                <a:solidFill>
+                  <a:srgbClr val="204A87"/>
+                </a:solidFill>
+                <a:latin typeface="Courier New"/>
+                <a:cs typeface="Courier New"/>
+              </a:rPr>
+              <a:t>do</a:t>
+            </a:r>
+          </a:p>
+          <a:p>
+            <a:r>
+              <a:rPr lang="en-US" dirty="0">
+                <a:latin typeface="Courier New"/>
+                <a:cs typeface="Courier New"/>
+              </a:rPr>
+              <a:t>  </a:t>
+            </a:r>
+            <a:r>
+              <a:rPr lang="en-US" dirty="0">
+                <a:solidFill>
+                  <a:srgbClr val="000000"/>
+                </a:solidFill>
+                <a:latin typeface="Courier New"/>
+                <a:cs typeface="Courier New"/>
+              </a:rPr>
+              <a:t>it </a:t>
+            </a:r>
+            <a:r>
+              <a:rPr lang="en-US" b="1" dirty="0">
+                <a:solidFill>
+                  <a:srgbClr val="000000"/>
+                </a:solidFill>
+                <a:latin typeface="Courier New"/>
+                <a:cs typeface="Courier New"/>
+              </a:rPr>
+              <a:t>{ </a:t>
+            </a:r>
+            <a:r>
+              <a:rPr lang="en-US" b="1" dirty="0" err="1">
+                <a:solidFill>
+                  <a:srgbClr val="000000"/>
+                </a:solidFill>
+                <a:latin typeface="Courier New"/>
+                <a:cs typeface="Courier New"/>
+              </a:rPr>
+              <a:t>should_not</a:t>
+            </a:r>
+            <a:r>
+              <a:rPr lang="en-US" b="1" dirty="0">
+                <a:solidFill>
+                  <a:srgbClr val="000000"/>
+                </a:solidFill>
+                <a:latin typeface="Courier New"/>
+                <a:cs typeface="Courier New"/>
+              </a:rPr>
+              <a:t> </a:t>
+            </a:r>
+            <a:r>
+              <a:rPr lang="en-US" b="1" dirty="0" err="1">
+                <a:solidFill>
+                  <a:srgbClr val="000000"/>
+                </a:solidFill>
+                <a:latin typeface="Courier New"/>
+                <a:cs typeface="Courier New"/>
+              </a:rPr>
+              <a:t>be_listening</a:t>
+            </a:r>
+            <a:r>
+              <a:rPr lang="en-US" b="1" dirty="0">
+                <a:solidFill>
+                  <a:srgbClr val="000000"/>
+                </a:solidFill>
+                <a:latin typeface="Courier New"/>
+                <a:cs typeface="Courier New"/>
+              </a:rPr>
+              <a:t> }</a:t>
+            </a:r>
+          </a:p>
+          <a:p>
+            <a:r>
+              <a:rPr lang="en-US" b="1" dirty="0">
+                <a:solidFill>
+                  <a:srgbClr val="204A87"/>
+                </a:solidFill>
+                <a:latin typeface="Courier New"/>
+                <a:cs typeface="Courier New"/>
+              </a:rPr>
+              <a:t>end</a:t>
+            </a:r>
+          </a:p>
+          <a:p>
+            <a:endParaRPr lang="en-US" dirty="0">
+              <a:latin typeface="Courier New"/>
+              <a:cs typeface="Courier New"/>
+            </a:endParaRPr>
+          </a:p>
+          <a:p>
+            <a:r>
+              <a:rPr lang="en-US" dirty="0">
+                <a:solidFill>
+                  <a:srgbClr val="000000"/>
+                </a:solidFill>
+                <a:latin typeface="Courier New"/>
+                <a:cs typeface="Courier New"/>
+              </a:rPr>
+              <a:t>describe port</a:t>
+            </a:r>
+            <a:r>
+              <a:rPr lang="en-US" b="1" dirty="0">
+                <a:solidFill>
+                  <a:srgbClr val="000000"/>
+                </a:solidFill>
+                <a:latin typeface="Courier New"/>
+                <a:cs typeface="Courier New"/>
+              </a:rPr>
+              <a:t>(</a:t>
+            </a:r>
+            <a:r>
+              <a:rPr lang="en-US" b="1" dirty="0">
+                <a:solidFill>
+                  <a:srgbClr val="0000CF"/>
+                </a:solidFill>
+                <a:latin typeface="Courier New"/>
+                <a:cs typeface="Courier New"/>
+              </a:rPr>
+              <a:t>443</a:t>
+            </a:r>
+            <a:r>
+              <a:rPr lang="en-US" b="1" dirty="0">
+                <a:solidFill>
+                  <a:srgbClr val="000000"/>
+                </a:solidFill>
+                <a:latin typeface="Courier New"/>
+                <a:cs typeface="Courier New"/>
+              </a:rPr>
+              <a:t>) </a:t>
+            </a:r>
+            <a:r>
+              <a:rPr lang="en-US" b="1" dirty="0">
+                <a:solidFill>
+                  <a:srgbClr val="204A87"/>
+                </a:solidFill>
+                <a:latin typeface="Courier New"/>
+                <a:cs typeface="Courier New"/>
+              </a:rPr>
+              <a:t>do</a:t>
+            </a:r>
+          </a:p>
+          <a:p>
+            <a:r>
+              <a:rPr lang="en-US" dirty="0">
+                <a:latin typeface="Courier New"/>
+                <a:cs typeface="Courier New"/>
+              </a:rPr>
+              <a:t>  </a:t>
+            </a:r>
+            <a:r>
+              <a:rPr lang="en-US" dirty="0">
+                <a:solidFill>
+                  <a:srgbClr val="000000"/>
+                </a:solidFill>
+                <a:latin typeface="Courier New"/>
+                <a:cs typeface="Courier New"/>
+              </a:rPr>
+              <a:t>it </a:t>
+            </a:r>
+            <a:r>
+              <a:rPr lang="en-US" b="1" dirty="0">
+                <a:solidFill>
+                  <a:srgbClr val="000000"/>
+                </a:solidFill>
+                <a:latin typeface="Courier New"/>
+                <a:cs typeface="Courier New"/>
+              </a:rPr>
+              <a:t>{ should </a:t>
+            </a:r>
+            <a:r>
+              <a:rPr lang="en-US" b="1" dirty="0" err="1">
+                <a:solidFill>
+                  <a:srgbClr val="000000"/>
+                </a:solidFill>
+                <a:latin typeface="Courier New"/>
+                <a:cs typeface="Courier New"/>
+              </a:rPr>
+              <a:t>be_listening</a:t>
+            </a:r>
+            <a:r>
+              <a:rPr lang="en-US" b="1" dirty="0">
+                <a:solidFill>
+                  <a:srgbClr val="000000"/>
+                </a:solidFill>
+                <a:latin typeface="Courier New"/>
+                <a:cs typeface="Courier New"/>
+              </a:rPr>
+              <a:t> }</a:t>
+            </a:r>
+          </a:p>
+          <a:p>
+            <a:r>
+              <a:rPr lang="en-US" dirty="0">
+                <a:latin typeface="Courier New"/>
+                <a:cs typeface="Courier New"/>
+              </a:rPr>
+              <a:t>  </a:t>
+            </a:r>
+            <a:r>
+              <a:rPr lang="en-US" dirty="0">
+                <a:solidFill>
+                  <a:srgbClr val="000000"/>
+                </a:solidFill>
+                <a:latin typeface="Courier New"/>
+                <a:cs typeface="Courier New"/>
+              </a:rPr>
+              <a:t>its</a:t>
+            </a:r>
+            <a:r>
+              <a:rPr lang="en-US" b="1" dirty="0">
+                <a:solidFill>
+                  <a:srgbClr val="000000"/>
+                </a:solidFill>
+                <a:latin typeface="Courier New"/>
+                <a:cs typeface="Courier New"/>
+              </a:rPr>
+              <a:t>(</a:t>
+            </a:r>
+            <a:r>
+              <a:rPr lang="en-US" b="1" dirty="0">
+                <a:solidFill>
+                  <a:srgbClr val="4E9A06"/>
+                </a:solidFill>
+                <a:latin typeface="Courier New"/>
+                <a:cs typeface="Courier New"/>
+              </a:rPr>
+              <a:t>'protocols'</a:t>
+            </a:r>
+            <a:r>
+              <a:rPr lang="en-US" b="1" dirty="0">
+                <a:solidFill>
+                  <a:srgbClr val="000000"/>
+                </a:solidFill>
+                <a:latin typeface="Courier New"/>
+                <a:cs typeface="Courier New"/>
+              </a:rPr>
+              <a:t>) {should </a:t>
+            </a:r>
+            <a:r>
+              <a:rPr lang="en-US" b="1" dirty="0">
+                <a:solidFill>
+                  <a:srgbClr val="204A87"/>
+                </a:solidFill>
+                <a:latin typeface="Courier New"/>
+                <a:cs typeface="Courier New"/>
+              </a:rPr>
+              <a:t>include </a:t>
+            </a:r>
+            <a:r>
+              <a:rPr lang="en-US" b="1" dirty="0">
+                <a:solidFill>
+                  <a:srgbClr val="4E9A06"/>
+                </a:solidFill>
+                <a:latin typeface="Courier New"/>
+                <a:cs typeface="Courier New"/>
+              </a:rPr>
+              <a:t>'</a:t>
+            </a:r>
+            <a:r>
+              <a:rPr lang="en-US" b="1" dirty="0" err="1">
+                <a:solidFill>
+                  <a:srgbClr val="4E9A06"/>
+                </a:solidFill>
+                <a:latin typeface="Courier New"/>
+                <a:cs typeface="Courier New"/>
+              </a:rPr>
+              <a:t>tcp</a:t>
+            </a:r>
+            <a:r>
+              <a:rPr lang="en-US" b="1" dirty="0">
+                <a:solidFill>
+                  <a:srgbClr val="4E9A06"/>
+                </a:solidFill>
+                <a:latin typeface="Courier New"/>
+                <a:cs typeface="Courier New"/>
+              </a:rPr>
+              <a:t>'</a:t>
+            </a:r>
+            <a:r>
+              <a:rPr lang="en-US" b="1" dirty="0">
+                <a:solidFill>
+                  <a:srgbClr val="000000"/>
+                </a:solidFill>
+                <a:latin typeface="Courier New"/>
+                <a:cs typeface="Courier New"/>
+              </a:rPr>
+              <a:t>}</a:t>
+            </a:r>
+          </a:p>
+          <a:p>
+            <a:r>
+              <a:rPr lang="en-US" b="1" dirty="0">
+                <a:solidFill>
+                  <a:srgbClr val="204A87"/>
+                </a:solidFill>
+                <a:latin typeface="Courier New"/>
+                <a:cs typeface="Courier New"/>
+              </a:rPr>
+              <a:t>end</a:t>
+            </a:r>
+          </a:p>
+          <a:p>
+            <a:endParaRPr lang="en-US" dirty="0" smtClean="0">
+              <a:latin typeface="Courier New"/>
+              <a:cs typeface="Courier New"/>
+            </a:endParaRPr>
+          </a:p>
+        </p:txBody>
+      </p:sp>
     </p:spTree>
     <p:extLst>
       <p:ext uri="{BB962C8B-B14F-4D97-AF65-F5344CB8AC3E}">
@@ -13566,13 +13845,13 @@
   <p:clrMapOvr>
     <a:masterClrMapping/>
   </p:clrMapOvr>
-  <p:transition spd="med">
+  <p:transition xmlns:p14="http://schemas.microsoft.com/office/powerpoint/2010/main" spd="med">
     <p:fade/>
   </p:transition>
   <p:timing>
     <p:tnLst>
       <p:par>
-        <p:cTn id="1" dur="indefinite" restart="never" nodeType="tmRoot"/>
+        <p:cTn xmlns:p14="http://schemas.microsoft.com/office/powerpoint/2010/main" id="1" dur="indefinite" restart="never" nodeType="tmRoot"/>
       </p:par>
     </p:tnLst>
   </p:timing>
@@ -13767,13 +14046,13 @@
   <p:clrMapOvr>
     <a:masterClrMapping/>
   </p:clrMapOvr>
-  <p:transition spd="med">
+  <p:transition xmlns:p14="http://schemas.microsoft.com/office/powerpoint/2010/main" spd="med">
     <p:fade/>
   </p:transition>
   <p:timing>
     <p:tnLst>
       <p:par>
-        <p:cTn id="1" dur="indefinite" restart="never" nodeType="tmRoot"/>
+        <p:cTn xmlns:p14="http://schemas.microsoft.com/office/powerpoint/2010/main" id="1" dur="indefinite" restart="never" nodeType="tmRoot"/>
       </p:par>
     </p:tnLst>
   </p:timing>
@@ -13871,15 +14150,7 @@
           <a:p>
             <a:r>
               <a:rPr lang="en-US" dirty="0" smtClean="0"/>
-              <a:t>You </a:t>
-            </a:r>
-            <a:r>
-              <a:rPr lang="en-US" dirty="0" smtClean="0"/>
-              <a:t>execute </a:t>
-            </a:r>
-            <a:r>
-              <a:rPr lang="en-US" dirty="0" smtClean="0"/>
-              <a:t>scans </a:t>
+              <a:t>You execute scans </a:t>
             </a:r>
             <a:r>
               <a:rPr lang="en-US" dirty="0"/>
@@ -13939,13 +14210,13 @@
   <p:clrMapOvr>
     <a:masterClrMapping/>
   </p:clrMapOvr>
-  <p:transition spd="med">
+  <p:transition xmlns:p14="http://schemas.microsoft.com/office/powerpoint/2010/main" spd="med">
     <p:fade/>
   </p:transition>
   <p:timing>
     <p:tnLst>
       <p:par>
-        <p:cTn id="1" dur="indefinite" restart="never" nodeType="tmRoot"/>
+        <p:cTn xmlns:p14="http://schemas.microsoft.com/office/powerpoint/2010/main" id="1" dur="indefinite" restart="never" nodeType="tmRoot"/>
       </p:par>
     </p:tnLst>
   </p:timing>
@@ -14832,15 +15103,7 @@
             </a:pPr>
             <a:r>
               <a:rPr lang="en-US" dirty="0" smtClean="0"/>
-              <a:t>One Windows node and one Linux node to perform Chef Compliance </a:t>
-            </a:r>
-            <a:r>
-              <a:rPr lang="en-US" dirty="0" smtClean="0"/>
-              <a:t>scans against</a:t>
-            </a:r>
-            <a:r>
-              <a:rPr lang="en-US" dirty="0" smtClean="0"/>
-              <a:t>.</a:t>
+              <a:t>One Windows node and one Linux node to perform Chef Compliance scans against.</a:t>
             </a:r>
           </a:p>
           <a:p>
@@ -15327,7 +15590,7 @@
   <p:timing>
     <p:tnLst>
       <p:par>
-        <p:cTn id="1" dur="indefinite" restart="never" nodeType="tmRoot"/>
+        <p:cTn xmlns:p14="http://schemas.microsoft.com/office/powerpoint/2010/main" id="1" dur="indefinite" restart="never" nodeType="tmRoot"/>
       </p:par>
     </p:tnLst>
   </p:timing>
@@ -16083,11 +16346,7 @@
             <a:pPr algn="ctr"/>
             <a:r>
               <a:rPr lang="en-US" sz="2667" dirty="0" smtClean="0"/>
-              <a:t>Nodes to run Compliance tests </a:t>
-            </a:r>
-            <a:r>
-              <a:rPr lang="en-US" sz="2667" dirty="0" smtClean="0"/>
-              <a:t>against AND use as workstations for writing remediation</a:t>
+              <a:t>Nodes to run Compliance tests against AND use as workstations for writing remediation</a:t>
             </a:r>
             <a:endParaRPr lang="en-US" sz="2667" dirty="0"/>
           </a:p>
@@ -16142,7 +16401,6 @@
               <a:rPr lang="en-US" dirty="0" smtClean="0"/>
               <a:t>This is so you can use those nodes as virtual workstations while writing remediation.</a:t>
             </a:r>
-            <a:endParaRPr lang="en-US" dirty="0" smtClean="0"/>
           </a:p>
           <a:p>
             <a:endParaRPr lang="en-US" dirty="0"/>
@@ -17120,7 +17378,7 @@
   <p:timing>
     <p:tnLst>
       <p:par>
-        <p:cTn id="1" dur="indefinite" restart="never" nodeType="tmRoot"/>
+        <p:cTn xmlns:p14="http://schemas.microsoft.com/office/powerpoint/2010/main" id="1" dur="indefinite" restart="never" nodeType="tmRoot"/>
       </p:par>
     </p:tnLst>
   </p:timing>
@@ -17163,15 +17421,7 @@
           <a:p>
             <a:r>
               <a:rPr lang="en-US" sz="4800" dirty="0" smtClean="0"/>
-              <a:t>Logging into </a:t>
-            </a:r>
-            <a:r>
-              <a:rPr lang="en-US" sz="4800" dirty="0" smtClean="0"/>
-              <a:t>the </a:t>
-            </a:r>
-            <a:r>
-              <a:rPr lang="en-US" sz="4800" dirty="0" smtClean="0"/>
-              <a:t>Compliance Server and Linux Node</a:t>
+              <a:t>Logging into the Compliance Server and Linux Node</a:t>
             </a:r>
             <a:endParaRPr lang="en-US" sz="4800" dirty="0"/>
           </a:p>
@@ -17249,7 +17499,7 @@
   <p:timing>
     <p:tnLst>
       <p:par>
-        <p:cTn id="1" dur="indefinite" restart="never" nodeType="tmRoot"/>
+        <p:cTn xmlns:p14="http://schemas.microsoft.com/office/powerpoint/2010/main" id="1" dur="indefinite" restart="never" nodeType="tmRoot"/>
       </p:par>
     </p:tnLst>
   </p:timing>
@@ -17292,15 +17542,7 @@
           <a:p>
             <a:r>
               <a:rPr lang="en-US" dirty="0" smtClean="0"/>
-              <a:t>Logging Into </a:t>
-            </a:r>
-            <a:r>
-              <a:rPr lang="en-US" dirty="0" smtClean="0"/>
-              <a:t>the Remote </a:t>
-            </a:r>
-            <a:r>
-              <a:rPr lang="en-US" dirty="0" smtClean="0"/>
-              <a:t>Windows Node</a:t>
+              <a:t>Logging Into the Remote Windows Node</a:t>
             </a:r>
             <a:endParaRPr lang="en-US" dirty="0"/>
           </a:p>
@@ -17355,7 +17597,7 @@
   <p:timing>
     <p:tnLst>
       <p:par>
-        <p:cTn id="1" dur="indefinite" restart="never" nodeType="tmRoot"/>
+        <p:cTn xmlns:p14="http://schemas.microsoft.com/office/powerpoint/2010/main" id="1" dur="indefinite" restart="never" nodeType="tmRoot"/>
       </p:par>
     </p:tnLst>
   </p:timing>
@@ -17605,13 +17847,13 @@
   <p:clrMapOvr>
     <a:masterClrMapping/>
   </p:clrMapOvr>
-  <p:transition spd="med">
+  <p:transition xmlns:p14="http://schemas.microsoft.com/office/powerpoint/2010/main" spd="med">
     <p:fade/>
   </p:transition>
   <p:timing>
     <p:tnLst>
       <p:par>
-        <p:cTn id="1" dur="indefinite" restart="never" nodeType="tmRoot"/>
+        <p:cTn xmlns:p14="http://schemas.microsoft.com/office/powerpoint/2010/main" id="1" dur="indefinite" restart="never" nodeType="tmRoot"/>
       </p:par>
     </p:tnLst>
   </p:timing>
@@ -17806,7 +18048,7 @@
   <p:clrMapOvr>
     <a:masterClrMapping/>
   </p:clrMapOvr>
-  <p:transition spd="med">
+  <p:transition xmlns:p14="http://schemas.microsoft.com/office/powerpoint/2010/main" spd="med">
     <p:fade/>
   </p:transition>
 </p:sld>
@@ -17983,7 +18225,7 @@
   <p:timing>
     <p:tnLst>
       <p:par>
-        <p:cTn id="1" dur="indefinite" restart="never" nodeType="tmRoot"/>
+        <p:cTn xmlns:p14="http://schemas.microsoft.com/office/powerpoint/2010/main" id="1" dur="indefinite" restart="never" nodeType="tmRoot"/>
       </p:par>
     </p:tnLst>
   </p:timing>
@@ -18080,18 +18322,14 @@
               <a:buChar char="Ø"/>
             </a:pPr>
             <a:r>
+              <a:rPr lang="en-US" dirty="0"/>
+              <a:t>Describe the capabilities of Chef Compliance</a:t>
+            </a:r>
+            <a:r>
               <a:rPr lang="en-US" dirty="0" smtClean="0"/>
-              <a:t>Install </a:t>
-            </a:r>
-            <a:r>
-              <a:rPr lang="en-US" dirty="0"/>
-              <a:t>and initially configure the Chef Compliance </a:t>
-            </a:r>
-            <a:r>
-              <a:rPr lang="en-US" dirty="0" smtClean="0"/>
-              <a:t>server.</a:t>
-            </a:r>
-            <a:endParaRPr lang="en-US" dirty="0"/>
+              <a:t>.</a:t>
+            </a:r>
+            <a:endParaRPr lang="en-US" dirty="0" smtClean="0"/>
           </a:p>
           <a:p>
             <a:pPr marL="457200" indent="-457200">
@@ -18100,15 +18338,15 @@
             </a:pPr>
             <a:r>
               <a:rPr lang="en-US" dirty="0" smtClean="0"/>
-              <a:t>Perform </a:t>
+              <a:t>Install </a:t>
             </a:r>
             <a:r>
               <a:rPr lang="en-US" dirty="0"/>
-              <a:t>scans with Chef </a:t>
+              <a:t>and initially configure the Chef Compliance </a:t>
             </a:r>
             <a:r>
               <a:rPr lang="en-US" dirty="0" smtClean="0"/>
-              <a:t>Compliance.</a:t>
+              <a:t>server.</a:t>
             </a:r>
             <a:endParaRPr lang="en-US" dirty="0"/>
           </a:p>
@@ -18119,11 +18357,26 @@
             </a:pPr>
             <a:r>
               <a:rPr lang="en-US" dirty="0" smtClean="0"/>
-              <a:t>Remediate compliance </a:t>
+              <a:t>Perform </a:t>
+            </a:r>
+            <a:r>
+              <a:rPr lang="en-US" dirty="0"/>
+              <a:t>scans with Chef </a:t>
             </a:r>
             <a:r>
               <a:rPr lang="en-US" dirty="0" smtClean="0"/>
-              <a:t>issues.</a:t>
+              <a:t>Compliance.</a:t>
+            </a:r>
+            <a:endParaRPr lang="en-US" dirty="0"/>
+          </a:p>
+          <a:p>
+            <a:pPr marL="457200" indent="-457200">
+              <a:buFont typeface="Wingdings" charset="2"/>
+              <a:buChar char="Ø"/>
+            </a:pPr>
+            <a:r>
+              <a:rPr lang="en-US" dirty="0" smtClean="0"/>
+              <a:t>Remediate compliance issues.</a:t>
             </a:r>
             <a:endParaRPr lang="en-US" dirty="0"/>
           </a:p>
@@ -18209,13 +18462,13 @@
   <p:clrMapOvr>
     <a:masterClrMapping/>
   </p:clrMapOvr>
-  <p:transition spd="med">
+  <p:transition xmlns:p14="http://schemas.microsoft.com/office/powerpoint/2010/main" spd="med">
     <p:fade/>
   </p:transition>
   <p:timing>
     <p:tnLst>
       <p:par>
-        <p:cTn id="1" dur="indefinite" restart="never" nodeType="tmRoot"/>
+        <p:cTn xmlns:p14="http://schemas.microsoft.com/office/powerpoint/2010/main" id="1" dur="indefinite" restart="never" nodeType="tmRoot"/>
       </p:par>
     </p:tnLst>
   </p:timing>
@@ -18331,13 +18584,13 @@
   <p:clrMapOvr>
     <a:masterClrMapping/>
   </p:clrMapOvr>
-  <p:transition spd="med">
+  <p:transition xmlns:p14="http://schemas.microsoft.com/office/powerpoint/2010/main" spd="med">
     <p:fade/>
   </p:transition>
   <p:timing>
     <p:tnLst>
       <p:par>
-        <p:cTn id="1" dur="indefinite" restart="never" nodeType="tmRoot"/>
+        <p:cTn xmlns:p14="http://schemas.microsoft.com/office/powerpoint/2010/main" id="1" dur="indefinite" restart="never" nodeType="tmRoot"/>
       </p:par>
     </p:tnLst>
   </p:timing>
@@ -18921,7 +19174,7 @@
             <a:noFill/>
             <a:extLst>
               <a:ext uri="{909E8E84-426E-40dd-AFC4-6F175D3DCCD1}">
-                <a14:hiddenFill xmlns="" xmlns:a14="http://schemas.microsoft.com/office/drawing/2010/main">
+                <a14:hiddenFill xmlns:a14="http://schemas.microsoft.com/office/drawing/2010/main">
                   <a:solidFill>
                     <a:srgbClr val="FFFFFF"/>
                   </a:solidFill>
@@ -18962,7 +19215,7 @@
             <a:noFill/>
             <a:extLst>
               <a:ext uri="{909E8E84-426E-40dd-AFC4-6F175D3DCCD1}">
-                <a14:hiddenFill xmlns="" xmlns:a14="http://schemas.microsoft.com/office/drawing/2010/main">
+                <a14:hiddenFill xmlns:a14="http://schemas.microsoft.com/office/drawing/2010/main">
                   <a:solidFill>
                     <a:srgbClr val="FFFFFF"/>
                   </a:solidFill>
@@ -19003,7 +19256,7 @@
             <a:noFill/>
             <a:extLst>
               <a:ext uri="{909E8E84-426E-40dd-AFC4-6F175D3DCCD1}">
-                <a14:hiddenFill xmlns="" xmlns:a14="http://schemas.microsoft.com/office/drawing/2010/main">
+                <a14:hiddenFill xmlns:a14="http://schemas.microsoft.com/office/drawing/2010/main">
                   <a:solidFill>
                     <a:srgbClr val="FFFFFF"/>
                   </a:solidFill>
@@ -19059,7 +19312,7 @@
             <a:noFill/>
             <a:extLst>
               <a:ext uri="{909E8E84-426E-40dd-AFC4-6F175D3DCCD1}">
-                <a14:hiddenFill xmlns="" xmlns:a14="http://schemas.microsoft.com/office/drawing/2010/main">
+                <a14:hiddenFill xmlns:a14="http://schemas.microsoft.com/office/drawing/2010/main">
                   <a:solidFill>
                     <a:srgbClr val="FFFFFF"/>
                   </a:solidFill>
@@ -19100,7 +19353,7 @@
             <a:noFill/>
             <a:extLst>
               <a:ext uri="{909E8E84-426E-40dd-AFC4-6F175D3DCCD1}">
-                <a14:hiddenFill xmlns="" xmlns:a14="http://schemas.microsoft.com/office/drawing/2010/main">
+                <a14:hiddenFill xmlns:a14="http://schemas.microsoft.com/office/drawing/2010/main">
                   <a:solidFill>
                     <a:srgbClr val="FFFFFF"/>
                   </a:solidFill>
@@ -19141,7 +19394,7 @@
             <a:noFill/>
             <a:extLst>
               <a:ext uri="{909E8E84-426E-40dd-AFC4-6F175D3DCCD1}">
-                <a14:hiddenFill xmlns="" xmlns:a14="http://schemas.microsoft.com/office/drawing/2010/main">
+                <a14:hiddenFill xmlns:a14="http://schemas.microsoft.com/office/drawing/2010/main">
                   <a:solidFill>
                     <a:srgbClr val="FFFFFF"/>
                   </a:solidFill>
@@ -19197,7 +19450,7 @@
             <a:noFill/>
             <a:extLst>
               <a:ext uri="{909E8E84-426E-40dd-AFC4-6F175D3DCCD1}">
-                <a14:hiddenFill xmlns="" xmlns:a14="http://schemas.microsoft.com/office/drawing/2010/main">
+                <a14:hiddenFill xmlns:a14="http://schemas.microsoft.com/office/drawing/2010/main">
                   <a:solidFill>
                     <a:srgbClr val="FFFFFF"/>
                   </a:solidFill>
@@ -19238,7 +19491,7 @@
             <a:noFill/>
             <a:extLst>
               <a:ext uri="{909E8E84-426E-40dd-AFC4-6F175D3DCCD1}">
-                <a14:hiddenFill xmlns="" xmlns:a14="http://schemas.microsoft.com/office/drawing/2010/main">
+                <a14:hiddenFill xmlns:a14="http://schemas.microsoft.com/office/drawing/2010/main">
                   <a:solidFill>
                     <a:srgbClr val="FFFFFF"/>
                   </a:solidFill>
@@ -19279,7 +19532,7 @@
             <a:noFill/>
             <a:extLst>
               <a:ext uri="{909E8E84-426E-40dd-AFC4-6F175D3DCCD1}">
-                <a14:hiddenFill xmlns="" xmlns:a14="http://schemas.microsoft.com/office/drawing/2010/main">
+                <a14:hiddenFill xmlns:a14="http://schemas.microsoft.com/office/drawing/2010/main">
                   <a:solidFill>
                     <a:srgbClr val="FFFFFF"/>
                   </a:solidFill>
@@ -19506,7 +19759,7 @@
             <a:noFill/>
             <a:extLst>
               <a:ext uri="{909E8E84-426E-40dd-AFC4-6F175D3DCCD1}">
-                <a14:hiddenFill xmlns="" xmlns:a14="http://schemas.microsoft.com/office/drawing/2010/main">
+                <a14:hiddenFill xmlns:a14="http://schemas.microsoft.com/office/drawing/2010/main">
                   <a:solidFill>
                     <a:srgbClr val="FFFFFF"/>
                   </a:solidFill>
@@ -19547,7 +19800,7 @@
             <a:noFill/>
             <a:extLst>
               <a:ext uri="{909E8E84-426E-40dd-AFC4-6F175D3DCCD1}">
-                <a14:hiddenFill xmlns="" xmlns:a14="http://schemas.microsoft.com/office/drawing/2010/main">
+                <a14:hiddenFill xmlns:a14="http://schemas.microsoft.com/office/drawing/2010/main">
                   <a:solidFill>
                     <a:srgbClr val="FFFFFF"/>
                   </a:solidFill>
@@ -19588,7 +19841,7 @@
             <a:noFill/>
             <a:extLst>
               <a:ext uri="{909E8E84-426E-40dd-AFC4-6F175D3DCCD1}">
-                <a14:hiddenFill xmlns="" xmlns:a14="http://schemas.microsoft.com/office/drawing/2010/main">
+                <a14:hiddenFill xmlns:a14="http://schemas.microsoft.com/office/drawing/2010/main">
                   <a:solidFill>
                     <a:srgbClr val="FFFFFF"/>
                   </a:solidFill>
@@ -19644,7 +19897,7 @@
             <a:noFill/>
             <a:extLst>
               <a:ext uri="{909E8E84-426E-40dd-AFC4-6F175D3DCCD1}">
-                <a14:hiddenFill xmlns="" xmlns:a14="http://schemas.microsoft.com/office/drawing/2010/main">
+                <a14:hiddenFill xmlns:a14="http://schemas.microsoft.com/office/drawing/2010/main">
                   <a:solidFill>
                     <a:srgbClr val="FFFFFF"/>
                   </a:solidFill>
@@ -19685,7 +19938,7 @@
             <a:noFill/>
             <a:extLst>
               <a:ext uri="{909E8E84-426E-40dd-AFC4-6F175D3DCCD1}">
-                <a14:hiddenFill xmlns="" xmlns:a14="http://schemas.microsoft.com/office/drawing/2010/main">
+                <a14:hiddenFill xmlns:a14="http://schemas.microsoft.com/office/drawing/2010/main">
                   <a:solidFill>
                     <a:srgbClr val="FFFFFF"/>
                   </a:solidFill>
@@ -19726,7 +19979,7 @@
             <a:noFill/>
             <a:extLst>
               <a:ext uri="{909E8E84-426E-40dd-AFC4-6F175D3DCCD1}">
-                <a14:hiddenFill xmlns="" xmlns:a14="http://schemas.microsoft.com/office/drawing/2010/main">
+                <a14:hiddenFill xmlns:a14="http://schemas.microsoft.com/office/drawing/2010/main">
                   <a:solidFill>
                     <a:srgbClr val="FFFFFF"/>
                   </a:solidFill>
@@ -19746,13 +19999,13 @@
   <p:clrMapOvr>
     <a:masterClrMapping/>
   </p:clrMapOvr>
-  <p:transition spd="med">
+  <p:transition xmlns:p14="http://schemas.microsoft.com/office/powerpoint/2010/main" spd="med">
     <p:fade/>
   </p:transition>
   <p:timing>
     <p:tnLst>
       <p:par>
-        <p:cTn id="1" dur="indefinite" restart="never" nodeType="tmRoot"/>
+        <p:cTn xmlns:p14="http://schemas.microsoft.com/office/powerpoint/2010/main" id="1" dur="indefinite" restart="never" nodeType="tmRoot"/>
       </p:par>
     </p:tnLst>
   </p:timing>
@@ -19823,11 +20076,7 @@
           <a:p>
             <a:r>
               <a:rPr lang="en-US" dirty="0" smtClean="0"/>
-              <a:t>Chef Compliance can run without any other Chef software </a:t>
-            </a:r>
-            <a:r>
-              <a:rPr lang="en-US" dirty="0" smtClean="0"/>
-              <a:t>installed.</a:t>
+              <a:t>Chef Compliance can run without any other Chef software installed.</a:t>
             </a:r>
           </a:p>
           <a:p>
@@ -19851,7 +20100,6 @@
               <a:rPr lang="en-US" dirty="0" smtClean="0"/>
               <a:t>recipes.</a:t>
             </a:r>
-            <a:endParaRPr lang="en-US" dirty="0" smtClean="0"/>
           </a:p>
           <a:p>
             <a:endParaRPr lang="en-US" dirty="0"/>
@@ -19868,13 +20116,13 @@
   <p:clrMapOvr>
     <a:masterClrMapping/>
   </p:clrMapOvr>
-  <p:transition spd="med">
+  <p:transition xmlns:p14="http://schemas.microsoft.com/office/powerpoint/2010/main" spd="med">
     <p:fade/>
   </p:transition>
   <p:timing>
     <p:tnLst>
       <p:par>
-        <p:cTn id="1" dur="indefinite" restart="never" nodeType="tmRoot"/>
+        <p:cTn xmlns:p14="http://schemas.microsoft.com/office/powerpoint/2010/main" id="1" dur="indefinite" restart="never" nodeType="tmRoot"/>
       </p:par>
     </p:tnLst>
   </p:timing>
@@ -19999,13 +20247,13 @@
   <p:clrMapOvr>
     <a:masterClrMapping/>
   </p:clrMapOvr>
-  <p:transition spd="med">
+  <p:transition xmlns:p14="http://schemas.microsoft.com/office/powerpoint/2010/main" spd="med">
     <p:fade/>
   </p:transition>
   <p:timing>
     <p:tnLst>
       <p:par>
-        <p:cTn id="1" dur="indefinite" restart="never" nodeType="tmRoot"/>
+        <p:cTn xmlns:p14="http://schemas.microsoft.com/office/powerpoint/2010/main" id="1" dur="indefinite" restart="never" nodeType="tmRoot"/>
       </p:par>
     </p:tnLst>
   </p:timing>
@@ -20079,26 +20327,6 @@
             </a:r>
           </a:p>
           <a:p>
-            <a:r>
-              <a:rPr lang="en-US" dirty="0" err="1" smtClean="0"/>
-              <a:t>InSpec</a:t>
-            </a:r>
-            <a:r>
-              <a:rPr lang="en-US" dirty="0" smtClean="0"/>
-              <a:t> </a:t>
-            </a:r>
-            <a:r>
-              <a:rPr lang="en-US" dirty="0" smtClean="0"/>
-              <a:t>is similar to </a:t>
-            </a:r>
-            <a:r>
-              <a:rPr lang="en-US" dirty="0" err="1" smtClean="0"/>
-              <a:t>ServerSpec</a:t>
-            </a:r>
-            <a:r>
-              <a:rPr lang="en-US" dirty="0"/>
-              <a:t>.</a:t>
-            </a:r>
             <a:endParaRPr lang="en-US" dirty="0" smtClean="0"/>
           </a:p>
           <a:p>
@@ -20192,13 +20420,13 @@
   <p:clrMapOvr>
     <a:masterClrMapping/>
   </p:clrMapOvr>
-  <p:transition spd="med">
+  <p:transition xmlns:p14="http://schemas.microsoft.com/office/powerpoint/2010/main" spd="med">
     <p:fade/>
   </p:transition>
   <p:timing>
     <p:tnLst>
       <p:par>
-        <p:cTn id="1" dur="indefinite" restart="never" nodeType="tmRoot"/>
+        <p:cTn xmlns:p14="http://schemas.microsoft.com/office/powerpoint/2010/main" id="1" dur="indefinite" restart="never" nodeType="tmRoot"/>
       </p:par>
     </p:tnLst>
   </p:timing>
@@ -20321,6 +20549,391 @@
           </a:p>
         </p:txBody>
       </p:sp>
+      <p:sp>
+        <p:nvSpPr>
+          <p:cNvPr id="4" name="TextBox 3"/>
+          <p:cNvSpPr txBox="1"/>
+          <p:nvPr/>
+        </p:nvSpPr>
+        <p:spPr bwMode="white">
+          <a:xfrm>
+            <a:off x="4044155" y="4845610"/>
+            <a:ext cx="8155156" cy="3141292"/>
+          </a:xfrm>
+          <a:prstGeom prst="rect">
+            <a:avLst/>
+          </a:prstGeom>
+          <a:ln>
+            <a:solidFill>
+              <a:schemeClr val="tx1"/>
+            </a:solidFill>
+            <a:prstDash val="dash"/>
+          </a:ln>
+        </p:spPr>
+        <p:txBody>
+          <a:bodyPr vert="horz" wrap="none" lIns="91440" tIns="91440" rIns="91440" bIns="91440" rtlCol="0">
+            <a:noAutofit/>
+          </a:bodyPr>
+          <a:lstStyle/>
+          <a:p>
+            <a:r>
+              <a:rPr lang="en-US" dirty="0">
+                <a:solidFill>
+                  <a:srgbClr val="000000"/>
+                </a:solidFill>
+                <a:latin typeface="Courier New"/>
+                <a:cs typeface="Courier New"/>
+              </a:rPr>
+              <a:t>describe port</a:t>
+            </a:r>
+            <a:r>
+              <a:rPr lang="en-US" b="1" dirty="0">
+                <a:solidFill>
+                  <a:srgbClr val="000000"/>
+                </a:solidFill>
+                <a:latin typeface="Courier New"/>
+                <a:cs typeface="Courier New"/>
+              </a:rPr>
+              <a:t>(</a:t>
+            </a:r>
+            <a:r>
+              <a:rPr lang="en-US" b="1" dirty="0">
+                <a:solidFill>
+                  <a:srgbClr val="0000CF"/>
+                </a:solidFill>
+                <a:latin typeface="Courier New"/>
+                <a:cs typeface="Courier New"/>
+              </a:rPr>
+              <a:t>80</a:t>
+            </a:r>
+            <a:r>
+              <a:rPr lang="en-US" b="1" dirty="0">
+                <a:solidFill>
+                  <a:srgbClr val="000000"/>
+                </a:solidFill>
+                <a:latin typeface="Courier New"/>
+                <a:cs typeface="Courier New"/>
+              </a:rPr>
+              <a:t>) </a:t>
+            </a:r>
+            <a:r>
+              <a:rPr lang="en-US" b="1" dirty="0">
+                <a:solidFill>
+                  <a:srgbClr val="204A87"/>
+                </a:solidFill>
+                <a:latin typeface="Courier New"/>
+                <a:cs typeface="Courier New"/>
+              </a:rPr>
+              <a:t>do</a:t>
+            </a:r>
+          </a:p>
+          <a:p>
+            <a:r>
+              <a:rPr lang="en-US" dirty="0">
+                <a:latin typeface="Courier New"/>
+                <a:cs typeface="Courier New"/>
+              </a:rPr>
+              <a:t>  </a:t>
+            </a:r>
+            <a:r>
+              <a:rPr lang="en-US" dirty="0">
+                <a:solidFill>
+                  <a:srgbClr val="000000"/>
+                </a:solidFill>
+                <a:latin typeface="Courier New"/>
+                <a:cs typeface="Courier New"/>
+              </a:rPr>
+              <a:t>it </a:t>
+            </a:r>
+            <a:r>
+              <a:rPr lang="en-US" b="1" dirty="0">
+                <a:solidFill>
+                  <a:srgbClr val="000000"/>
+                </a:solidFill>
+                <a:latin typeface="Courier New"/>
+                <a:cs typeface="Courier New"/>
+              </a:rPr>
+              <a:t>{ </a:t>
+            </a:r>
+            <a:r>
+              <a:rPr lang="en-US" b="1" dirty="0" err="1">
+                <a:solidFill>
+                  <a:srgbClr val="000000"/>
+                </a:solidFill>
+                <a:latin typeface="Courier New"/>
+                <a:cs typeface="Courier New"/>
+              </a:rPr>
+              <a:t>should_not</a:t>
+            </a:r>
+            <a:r>
+              <a:rPr lang="en-US" b="1" dirty="0">
+                <a:solidFill>
+                  <a:srgbClr val="000000"/>
+                </a:solidFill>
+                <a:latin typeface="Courier New"/>
+                <a:cs typeface="Courier New"/>
+              </a:rPr>
+              <a:t> </a:t>
+            </a:r>
+            <a:r>
+              <a:rPr lang="en-US" b="1" dirty="0" err="1">
+                <a:solidFill>
+                  <a:srgbClr val="000000"/>
+                </a:solidFill>
+                <a:latin typeface="Courier New"/>
+                <a:cs typeface="Courier New"/>
+              </a:rPr>
+              <a:t>be_listening</a:t>
+            </a:r>
+            <a:r>
+              <a:rPr lang="en-US" b="1" dirty="0">
+                <a:solidFill>
+                  <a:srgbClr val="000000"/>
+                </a:solidFill>
+                <a:latin typeface="Courier New"/>
+                <a:cs typeface="Courier New"/>
+              </a:rPr>
+              <a:t> }</a:t>
+            </a:r>
+          </a:p>
+          <a:p>
+            <a:r>
+              <a:rPr lang="en-US" b="1" dirty="0">
+                <a:solidFill>
+                  <a:srgbClr val="204A87"/>
+                </a:solidFill>
+                <a:latin typeface="Courier New"/>
+                <a:cs typeface="Courier New"/>
+              </a:rPr>
+              <a:t>end</a:t>
+            </a:r>
+          </a:p>
+          <a:p>
+            <a:endParaRPr lang="en-US" dirty="0">
+              <a:latin typeface="Courier New"/>
+              <a:cs typeface="Courier New"/>
+            </a:endParaRPr>
+          </a:p>
+          <a:p>
+            <a:r>
+              <a:rPr lang="en-US" dirty="0">
+                <a:solidFill>
+                  <a:srgbClr val="000000"/>
+                </a:solidFill>
+                <a:latin typeface="Courier New"/>
+                <a:cs typeface="Courier New"/>
+              </a:rPr>
+              <a:t>describe port</a:t>
+            </a:r>
+            <a:r>
+              <a:rPr lang="en-US" b="1" dirty="0">
+                <a:solidFill>
+                  <a:srgbClr val="000000"/>
+                </a:solidFill>
+                <a:latin typeface="Courier New"/>
+                <a:cs typeface="Courier New"/>
+              </a:rPr>
+              <a:t>(</a:t>
+            </a:r>
+            <a:r>
+              <a:rPr lang="en-US" b="1" dirty="0">
+                <a:solidFill>
+                  <a:srgbClr val="0000CF"/>
+                </a:solidFill>
+                <a:latin typeface="Courier New"/>
+                <a:cs typeface="Courier New"/>
+              </a:rPr>
+              <a:t>443</a:t>
+            </a:r>
+            <a:r>
+              <a:rPr lang="en-US" b="1" dirty="0">
+                <a:solidFill>
+                  <a:srgbClr val="000000"/>
+                </a:solidFill>
+                <a:latin typeface="Courier New"/>
+                <a:cs typeface="Courier New"/>
+              </a:rPr>
+              <a:t>) </a:t>
+            </a:r>
+            <a:r>
+              <a:rPr lang="en-US" b="1" dirty="0">
+                <a:solidFill>
+                  <a:srgbClr val="204A87"/>
+                </a:solidFill>
+                <a:latin typeface="Courier New"/>
+                <a:cs typeface="Courier New"/>
+              </a:rPr>
+              <a:t>do</a:t>
+            </a:r>
+          </a:p>
+          <a:p>
+            <a:r>
+              <a:rPr lang="en-US" dirty="0">
+                <a:latin typeface="Courier New"/>
+                <a:cs typeface="Courier New"/>
+              </a:rPr>
+              <a:t>  </a:t>
+            </a:r>
+            <a:r>
+              <a:rPr lang="en-US" dirty="0">
+                <a:solidFill>
+                  <a:srgbClr val="000000"/>
+                </a:solidFill>
+                <a:latin typeface="Courier New"/>
+                <a:cs typeface="Courier New"/>
+              </a:rPr>
+              <a:t>it </a:t>
+            </a:r>
+            <a:r>
+              <a:rPr lang="en-US" b="1" dirty="0">
+                <a:solidFill>
+                  <a:srgbClr val="000000"/>
+                </a:solidFill>
+                <a:latin typeface="Courier New"/>
+                <a:cs typeface="Courier New"/>
+              </a:rPr>
+              <a:t>{ should </a:t>
+            </a:r>
+            <a:r>
+              <a:rPr lang="en-US" b="1" dirty="0" err="1">
+                <a:solidFill>
+                  <a:srgbClr val="000000"/>
+                </a:solidFill>
+                <a:latin typeface="Courier New"/>
+                <a:cs typeface="Courier New"/>
+              </a:rPr>
+              <a:t>be_listening</a:t>
+            </a:r>
+            <a:r>
+              <a:rPr lang="en-US" b="1" dirty="0">
+                <a:solidFill>
+                  <a:srgbClr val="000000"/>
+                </a:solidFill>
+                <a:latin typeface="Courier New"/>
+                <a:cs typeface="Courier New"/>
+              </a:rPr>
+              <a:t> }</a:t>
+            </a:r>
+          </a:p>
+          <a:p>
+            <a:r>
+              <a:rPr lang="en-US" dirty="0">
+                <a:latin typeface="Courier New"/>
+                <a:cs typeface="Courier New"/>
+              </a:rPr>
+              <a:t>  </a:t>
+            </a:r>
+            <a:r>
+              <a:rPr lang="en-US" dirty="0">
+                <a:solidFill>
+                  <a:srgbClr val="000000"/>
+                </a:solidFill>
+                <a:latin typeface="Courier New"/>
+                <a:cs typeface="Courier New"/>
+              </a:rPr>
+              <a:t>its</a:t>
+            </a:r>
+            <a:r>
+              <a:rPr lang="en-US" b="1" dirty="0">
+                <a:solidFill>
+                  <a:srgbClr val="000000"/>
+                </a:solidFill>
+                <a:latin typeface="Courier New"/>
+                <a:cs typeface="Courier New"/>
+              </a:rPr>
+              <a:t>(</a:t>
+            </a:r>
+            <a:r>
+              <a:rPr lang="en-US" b="1" dirty="0">
+                <a:solidFill>
+                  <a:srgbClr val="4E9A06"/>
+                </a:solidFill>
+                <a:latin typeface="Courier New"/>
+                <a:cs typeface="Courier New"/>
+              </a:rPr>
+              <a:t>'protocols'</a:t>
+            </a:r>
+            <a:r>
+              <a:rPr lang="en-US" b="1" dirty="0">
+                <a:solidFill>
+                  <a:srgbClr val="000000"/>
+                </a:solidFill>
+                <a:latin typeface="Courier New"/>
+                <a:cs typeface="Courier New"/>
+              </a:rPr>
+              <a:t>) {should </a:t>
+            </a:r>
+            <a:r>
+              <a:rPr lang="en-US" b="1" dirty="0">
+                <a:solidFill>
+                  <a:srgbClr val="204A87"/>
+                </a:solidFill>
+                <a:latin typeface="Courier New"/>
+                <a:cs typeface="Courier New"/>
+              </a:rPr>
+              <a:t>include </a:t>
+            </a:r>
+            <a:r>
+              <a:rPr lang="en-US" b="1" dirty="0">
+                <a:solidFill>
+                  <a:srgbClr val="4E9A06"/>
+                </a:solidFill>
+                <a:latin typeface="Courier New"/>
+                <a:cs typeface="Courier New"/>
+              </a:rPr>
+              <a:t>'</a:t>
+            </a:r>
+            <a:r>
+              <a:rPr lang="en-US" b="1" dirty="0" err="1">
+                <a:solidFill>
+                  <a:srgbClr val="4E9A06"/>
+                </a:solidFill>
+                <a:latin typeface="Courier New"/>
+                <a:cs typeface="Courier New"/>
+              </a:rPr>
+              <a:t>tcp</a:t>
+            </a:r>
+            <a:r>
+              <a:rPr lang="en-US" b="1" dirty="0">
+                <a:solidFill>
+                  <a:srgbClr val="4E9A06"/>
+                </a:solidFill>
+                <a:latin typeface="Courier New"/>
+                <a:cs typeface="Courier New"/>
+              </a:rPr>
+              <a:t>'</a:t>
+            </a:r>
+            <a:r>
+              <a:rPr lang="en-US" b="1" dirty="0">
+                <a:solidFill>
+                  <a:srgbClr val="000000"/>
+                </a:solidFill>
+                <a:latin typeface="Courier New"/>
+                <a:cs typeface="Courier New"/>
+              </a:rPr>
+              <a:t>}</a:t>
+            </a:r>
+          </a:p>
+          <a:p>
+            <a:r>
+              <a:rPr lang="en-US" b="1" dirty="0">
+                <a:solidFill>
+                  <a:srgbClr val="204A87"/>
+                </a:solidFill>
+                <a:latin typeface="Courier New"/>
+                <a:cs typeface="Courier New"/>
+              </a:rPr>
+              <a:t>end</a:t>
+            </a:r>
+          </a:p>
+          <a:p>
+            <a:endParaRPr lang="en-US" dirty="0" smtClean="0">
+              <a:latin typeface="Courier New"/>
+              <a:cs typeface="Courier New"/>
+            </a:endParaRPr>
+          </a:p>
+        </p:txBody>
+      </p:sp>
     </p:spTree>
     <p:extLst>
       <p:ext uri="{BB962C8B-B14F-4D97-AF65-F5344CB8AC3E}">
@@ -20331,13 +20944,13 @@
   <p:clrMapOvr>
     <a:masterClrMapping/>
   </p:clrMapOvr>
-  <p:transition spd="med">
+  <p:transition xmlns:p14="http://schemas.microsoft.com/office/powerpoint/2010/main" spd="med">
     <p:fade/>
   </p:transition>
   <p:timing>
     <p:tnLst>
       <p:par>
-        <p:cTn id="1" dur="indefinite" restart="never" nodeType="tmRoot"/>
+        <p:cTn xmlns:p14="http://schemas.microsoft.com/office/powerpoint/2010/main" id="1" dur="indefinite" restart="never" nodeType="tmRoot"/>
       </p:par>
     </p:tnLst>
   </p:timing>
@@ -20720,7 +21333,7 @@
   <a:extraClrSchemeLst/>
   <a:extLst>
     <a:ext uri="{05A4C25C-085E-4340-85A3-A5531E510DB2}">
-      <thm15:themeFamily xmlns:thm15="http://schemas.microsoft.com/office/thememl/2012/main" name="Chef-TemplateComps_v09-16x9-Light.potx" id="{078CEFDB-FA7A-4E36-9964-13EF367585CB}" vid="{8B87B0F3-7308-43D5-8388-E1B49EA02652}"/>
+      <thm15:themeFamily xmlns:thm15="http://schemas.microsoft.com/office/thememl/2012/main" xmlns="" name="Chef-TemplateComps_v09-16x9-Light.potx" id="{078CEFDB-FA7A-4E36-9964-13EF367585CB}" vid="{8B87B0F3-7308-43D5-8388-E1B49EA02652}"/>
     </a:ext>
   </a:extLst>
 </a:theme>
@@ -21102,7 +21715,7 @@
   <a:extraClrSchemeLst/>
   <a:extLst>
     <a:ext uri="{05A4C25C-085E-4340-85A3-A5531E510DB2}">
-      <thm15:themeFamily xmlns:thm15="http://schemas.microsoft.com/office/thememl/2012/main" name="Chef-TemplateComps_v09-16x9-Light.potx" id="{078CEFDB-FA7A-4E36-9964-13EF367585CB}" vid="{8B87B0F3-7308-43D5-8388-E1B49EA02652}"/>
+      <thm15:themeFamily xmlns:thm15="http://schemas.microsoft.com/office/thememl/2012/main" xmlns="" name="Chef-TemplateComps_v09-16x9-Light.potx" id="{078CEFDB-FA7A-4E36-9964-13EF367585CB}" vid="{8B87B0F3-7308-43D5-8388-E1B49EA02652}"/>
     </a:ext>
   </a:extLst>
 </a:theme>

</xml_diff>

<commit_message>
List '...create, modify, and test...'
without an extra 'and'
</commit_message>
<xml_diff>
--- a/01-Intro.pptx
+++ b/01-Intro.pptx
@@ -160,7 +160,7 @@
   </p:defaultTextStyle>
   <p:extLst>
     <p:ext uri="{EFAFB233-063F-42B5-8137-9DF3F51BA10A}">
-      <p15:sldGuideLst xmlns:p15="http://schemas.microsoft.com/office/powerpoint/2012/main" xmlns="">
+      <p15:sldGuideLst xmlns="" xmlns:p15="http://schemas.microsoft.com/office/powerpoint/2012/main">
         <p15:guide id="1" orient="horz" pos="894">
           <p15:clr>
             <a:srgbClr val="A4A3A4"/>
@@ -174,7 +174,7 @@
       </p15:sldGuideLst>
     </p:ext>
     <p:ext uri="{2D200454-40CA-4A62-9FC3-DE9A4176ACB9}">
-      <p15:notesGuideLst xmlns:p15="http://schemas.microsoft.com/office/powerpoint/2012/main" xmlns=""/>
+      <p15:notesGuideLst xmlns="" xmlns:p15="http://schemas.microsoft.com/office/powerpoint/2012/main"/>
     </p:ext>
   </p:extLst>
 </p:presentation>
@@ -291,7 +291,7 @@
               <a:pPr>
                 <a:defRPr/>
               </a:pPr>
-              <a:t>1/19/16</a:t>
+              <a:t>1/20/16</a:t>
             </a:fld>
             <a:endParaRPr lang="en-US" dirty="0"/>
           </a:p>
@@ -474,7 +474,7 @@
               <a:pPr>
                 <a:defRPr/>
               </a:pPr>
-              <a:t>1/19/16</a:t>
+              <a:t>1/20/16</a:t>
             </a:fld>
             <a:endParaRPr lang="en-US" dirty="0"/>
           </a:p>
@@ -18329,7 +18329,6 @@
               <a:rPr lang="en-US" dirty="0" smtClean="0"/>
               <a:t>.</a:t>
             </a:r>
-            <a:endParaRPr lang="en-US" dirty="0" smtClean="0"/>
           </a:p>
           <a:p>
             <a:pPr marL="457200" indent="-457200">
@@ -18414,11 +18413,19 @@
             </a:r>
             <a:r>
               <a:rPr lang="en-US" dirty="0"/>
-              <a:t> to create and </a:t>
+              <a:t> to </a:t>
             </a:r>
             <a:r>
               <a:rPr lang="en-US" dirty="0" smtClean="0"/>
-              <a:t>modify and test </a:t>
+              <a:t>create, </a:t>
+            </a:r>
+            <a:r>
+              <a:rPr lang="en-US" smtClean="0"/>
+              <a:t>modify, and </a:t>
+            </a:r>
+            <a:r>
+              <a:rPr lang="en-US" dirty="0" smtClean="0"/>
+              <a:t>test </a:t>
             </a:r>
             <a:r>
               <a:rPr lang="en-US" dirty="0"/>
@@ -21333,7 +21340,7 @@
   <a:extraClrSchemeLst/>
   <a:extLst>
     <a:ext uri="{05A4C25C-085E-4340-85A3-A5531E510DB2}">
-      <thm15:themeFamily xmlns:thm15="http://schemas.microsoft.com/office/thememl/2012/main" xmlns="" name="Chef-TemplateComps_v09-16x9-Light.potx" id="{078CEFDB-FA7A-4E36-9964-13EF367585CB}" vid="{8B87B0F3-7308-43D5-8388-E1B49EA02652}"/>
+      <thm15:themeFamily xmlns="" xmlns:thm15="http://schemas.microsoft.com/office/thememl/2012/main" name="Chef-TemplateComps_v09-16x9-Light.potx" id="{078CEFDB-FA7A-4E36-9964-13EF367585CB}" vid="{8B87B0F3-7308-43D5-8388-E1B49EA02652}"/>
     </a:ext>
   </a:extLst>
 </a:theme>
@@ -21715,7 +21722,7 @@
   <a:extraClrSchemeLst/>
   <a:extLst>
     <a:ext uri="{05A4C25C-085E-4340-85A3-A5531E510DB2}">
-      <thm15:themeFamily xmlns:thm15="http://schemas.microsoft.com/office/thememl/2012/main" xmlns="" name="Chef-TemplateComps_v09-16x9-Light.potx" id="{078CEFDB-FA7A-4E36-9964-13EF367585CB}" vid="{8B87B0F3-7308-43D5-8388-E1B49EA02652}"/>
+      <thm15:themeFamily xmlns="" xmlns:thm15="http://schemas.microsoft.com/office/thememl/2012/main" name="Chef-TemplateComps_v09-16x9-Light.potx" id="{078CEFDB-FA7A-4E36-9964-13EF367585CB}" vid="{8B87B0F3-7308-43D5-8388-E1B49EA02652}"/>
     </a:ext>
   </a:extLst>
 </a:theme>

</xml_diff>

<commit_message>
Oxford comma for pre-built profiles
</commit_message>
<xml_diff>
--- a/01-Intro.pptx
+++ b/01-Intro.pptx
@@ -18417,11 +18417,7 @@
             </a:r>
             <a:r>
               <a:rPr lang="en-US" dirty="0" smtClean="0"/>
-              <a:t>create, </a:t>
-            </a:r>
-            <a:r>
-              <a:rPr lang="en-US" smtClean="0"/>
-              <a:t>modify, and </a:t>
+              <a:t>create, modify, and </a:t>
             </a:r>
             <a:r>
               <a:rPr lang="en-US" dirty="0" smtClean="0"/>
@@ -20229,7 +20225,15 @@
             </a:r>
             <a:r>
               <a:rPr lang="en-US" dirty="0"/>
-              <a:t>started quickly with pre-built profiles for CIS, Linux </a:t>
+              <a:t>started quickly with pre-built profiles for CIS</a:t>
+            </a:r>
+            <a:r>
+              <a:rPr lang="en-US"/>
+              <a:t>, </a:t>
+            </a:r>
+            <a:r>
+              <a:rPr lang="en-US" smtClean="0"/>
+              <a:t>Linux, </a:t>
             </a:r>
             <a:r>
               <a:rPr lang="en-US" dirty="0" smtClean="0"/>

</xml_diff>

<commit_message>
Minor changes after Nathans edits Change GE to GL
</commit_message>
<xml_diff>
--- a/01-Intro.pptx
+++ b/01-Intro.pptx
@@ -160,7 +160,7 @@
   </p:defaultTextStyle>
   <p:extLst>
     <p:ext uri="{EFAFB233-063F-42B5-8137-9DF3F51BA10A}">
-      <p15:sldGuideLst xmlns="" xmlns:p15="http://schemas.microsoft.com/office/powerpoint/2012/main">
+      <p15:sldGuideLst xmlns:p15="http://schemas.microsoft.com/office/powerpoint/2012/main">
         <p15:guide id="1" orient="horz" pos="894">
           <p15:clr>
             <a:srgbClr val="A4A3A4"/>
@@ -174,7 +174,7 @@
       </p15:sldGuideLst>
     </p:ext>
     <p:ext uri="{2D200454-40CA-4A62-9FC3-DE9A4176ACB9}">
-      <p15:notesGuideLst xmlns="" xmlns:p15="http://schemas.microsoft.com/office/powerpoint/2012/main"/>
+      <p15:notesGuideLst xmlns:p15="http://schemas.microsoft.com/office/powerpoint/2012/main"/>
     </p:ext>
   </p:extLst>
 </p:presentation>
@@ -291,7 +291,7 @@
               <a:pPr>
                 <a:defRPr/>
               </a:pPr>
-              <a:t>1/20/16</a:t>
+              <a:t>2016-01-21</a:t>
             </a:fld>
             <a:endParaRPr lang="en-US" dirty="0"/>
           </a:p>
@@ -474,7 +474,7 @@
               <a:pPr>
                 <a:defRPr/>
               </a:pPr>
-              <a:t>1/20/16</a:t>
+              <a:t>2016-01-21</a:t>
             </a:fld>
             <a:endParaRPr lang="en-US" dirty="0"/>
           </a:p>
@@ -3601,7 +3601,7 @@
         <p:spPr/>
         <p:txBody>
           <a:bodyPr>
-            <a:normAutofit fontScale="92500"/>
+            <a:normAutofit lnSpcReduction="10000"/>
           </a:bodyPr>
           <a:lstStyle/>
           <a:p>
@@ -3627,20 +3627,64 @@
           </a:p>
           <a:p>
             <a:r>
-              <a:rPr lang="en-US" dirty="0" err="1" smtClean="0"/>
+              <a:rPr lang="en-US" sz="1200" b="0" i="0" kern="1200" dirty="0" err="1" smtClean="0">
+                <a:solidFill>
+                  <a:schemeClr val="tx1"/>
+                </a:solidFill>
+                <a:effectLst/>
+                <a:latin typeface="Arial" panose="020B0604020202020204" pitchFamily="34" charset="0"/>
+                <a:ea typeface="ＭＳ Ｐゴシック" charset="0"/>
+                <a:cs typeface="Arial" panose="020B0604020202020204" pitchFamily="34" charset="0"/>
+              </a:rPr>
               <a:t>InSpec</a:t>
             </a:r>
             <a:r>
-              <a:rPr lang="en-US" dirty="0" smtClean="0"/>
-              <a:t> is similar to </a:t>
-            </a:r>
-            <a:r>
-              <a:rPr lang="en-US" dirty="0" err="1" smtClean="0"/>
-              <a:t>ServerSpec</a:t>
-            </a:r>
-            <a:r>
-              <a:rPr lang="en-US" dirty="0" smtClean="0"/>
-              <a:t>.</a:t>
+              <a:rPr lang="en-US" sz="1200" b="0" i="0" kern="1200" dirty="0" smtClean="0">
+                <a:solidFill>
+                  <a:schemeClr val="tx1"/>
+                </a:solidFill>
+                <a:effectLst/>
+                <a:latin typeface="Arial" panose="020B0604020202020204" pitchFamily="34" charset="0"/>
+                <a:ea typeface="ＭＳ Ｐゴシック" charset="0"/>
+                <a:cs typeface="Arial" panose="020B0604020202020204" pitchFamily="34" charset="0"/>
+              </a:rPr>
+              <a:t> </a:t>
+            </a:r>
+            <a:r>
+              <a:rPr lang="en-US" sz="1200" b="0" i="0" kern="1200" dirty="0" smtClean="0">
+                <a:solidFill>
+                  <a:schemeClr val="tx1"/>
+                </a:solidFill>
+                <a:effectLst/>
+                <a:latin typeface="Arial" panose="020B0604020202020204" pitchFamily="34" charset="0"/>
+                <a:ea typeface="ＭＳ Ｐゴシック" charset="0"/>
+                <a:cs typeface="Arial" panose="020B0604020202020204" pitchFamily="34" charset="0"/>
+              </a:rPr>
+              <a:t>is an open-source run-time framework and rule language used to specify compliance, security, and policy requirements for testing any node in your infrastructure. The </a:t>
+            </a:r>
+            <a:r>
+              <a:rPr lang="en-US" sz="1200" b="0" i="0" kern="1200" dirty="0" err="1" smtClean="0">
+                <a:solidFill>
+                  <a:schemeClr val="tx1"/>
+                </a:solidFill>
+                <a:effectLst/>
+                <a:latin typeface="Arial" panose="020B0604020202020204" pitchFamily="34" charset="0"/>
+                <a:ea typeface="ＭＳ Ｐゴシック" charset="0"/>
+                <a:cs typeface="Arial" panose="020B0604020202020204" pitchFamily="34" charset="0"/>
+              </a:rPr>
+              <a:t>InSpec</a:t>
+            </a:r>
+            <a:r>
+              <a:rPr lang="en-US" sz="1200" b="0" i="0" kern="1200" dirty="0" smtClean="0">
+                <a:solidFill>
+                  <a:schemeClr val="tx1"/>
+                </a:solidFill>
+                <a:effectLst/>
+                <a:latin typeface="Arial" panose="020B0604020202020204" pitchFamily="34" charset="0"/>
+                <a:ea typeface="ＭＳ Ｐゴシック" charset="0"/>
+                <a:cs typeface="Arial" panose="020B0604020202020204" pitchFamily="34" charset="0"/>
+              </a:rPr>
+              <a:t> name refers to “infrastructure specification</a:t>
             </a:r>
           </a:p>
           <a:p>
@@ -3677,31 +3721,7 @@
                 <a:ea typeface="ＭＳ Ｐゴシック" charset="0"/>
                 <a:cs typeface="Arial" panose="020B0604020202020204" pitchFamily="34" charset="0"/>
               </a:rPr>
-              <a:t> is an open-source run-time framework and rule language used to specify compliance, security, and policy requirements for testing any node in your infrastructure. The </a:t>
-            </a:r>
-            <a:r>
-              <a:rPr lang="en-US" sz="1200" b="0" i="0" kern="1200" dirty="0" err="1" smtClean="0">
-                <a:solidFill>
-                  <a:schemeClr val="tx1"/>
-                </a:solidFill>
-                <a:effectLst/>
-                <a:latin typeface="Arial" panose="020B0604020202020204" pitchFamily="34" charset="0"/>
-                <a:ea typeface="ＭＳ Ｐゴシック" charset="0"/>
-                <a:cs typeface="Arial" panose="020B0604020202020204" pitchFamily="34" charset="0"/>
-              </a:rPr>
-              <a:t>InSpec</a:t>
-            </a:r>
-            <a:r>
-              <a:rPr lang="en-US" sz="1200" b="0" i="0" kern="1200" dirty="0" smtClean="0">
-                <a:solidFill>
-                  <a:schemeClr val="tx1"/>
-                </a:solidFill>
-                <a:effectLst/>
-                <a:latin typeface="Arial" panose="020B0604020202020204" pitchFamily="34" charset="0"/>
-                <a:ea typeface="ＭＳ Ｐゴシック" charset="0"/>
-                <a:cs typeface="Arial" panose="020B0604020202020204" pitchFamily="34" charset="0"/>
-              </a:rPr>
-              <a:t> name refers to “infrastructure specification</a:t>
+              <a:t> includes a collection of resources to help you write auditing rules quickly and easily using the Compliance DSL.</a:t>
             </a:r>
           </a:p>
           <a:p>
@@ -3717,6 +3737,18 @@
           </a:p>
           <a:p>
             <a:r>
+              <a:rPr lang="en-US" sz="1200" b="0" i="0" kern="1200" dirty="0" smtClean="0">
+                <a:solidFill>
+                  <a:schemeClr val="tx1"/>
+                </a:solidFill>
+                <a:effectLst/>
+                <a:latin typeface="Arial" panose="020B0604020202020204" pitchFamily="34" charset="0"/>
+                <a:ea typeface="ＭＳ Ｐゴシック" charset="0"/>
+                <a:cs typeface="Arial" panose="020B0604020202020204" pitchFamily="34" charset="0"/>
+              </a:rPr>
+              <a:t>Use </a:t>
+            </a:r>
+            <a:r>
               <a:rPr lang="en-US" sz="1200" b="0" i="0" kern="1200" dirty="0" err="1" smtClean="0">
                 <a:solidFill>
                   <a:schemeClr val="tx1"/>
@@ -3738,7 +3770,7 @@
                 <a:ea typeface="ＭＳ Ｐゴシック" charset="0"/>
                 <a:cs typeface="Arial" panose="020B0604020202020204" pitchFamily="34" charset="0"/>
               </a:rPr>
-              <a:t> includes a collection of resources to help you write auditing rules quickly and easily using the Compliance DSL.</a:t>
+              <a:t> to examine any node in your infrastructure; run the tests locally or remotely.</a:t>
             </a:r>
           </a:p>
           <a:p>
@@ -3763,10 +3795,10 @@
                 <a:ea typeface="ＭＳ Ｐゴシック" charset="0"/>
                 <a:cs typeface="Arial" panose="020B0604020202020204" pitchFamily="34" charset="0"/>
               </a:rPr>
-              <a:t>Use </a:t>
-            </a:r>
-            <a:r>
-              <a:rPr lang="en-US" sz="1200" b="0" i="0" kern="1200" dirty="0" err="1" smtClean="0">
+              <a:t>Any detected security, compliance, or policy issues are flagged in a log</a:t>
+            </a:r>
+            <a:r>
+              <a:rPr lang="en-US" sz="1200" b="0" i="0" kern="1200" baseline="0" dirty="0" smtClean="0">
                 <a:solidFill>
                   <a:schemeClr val="tx1"/>
                 </a:solidFill>
@@ -3775,22 +3807,8 @@
                 <a:ea typeface="ＭＳ Ｐゴシック" charset="0"/>
                 <a:cs typeface="Arial" panose="020B0604020202020204" pitchFamily="34" charset="0"/>
               </a:rPr>
-              <a:t>InSpec</a:t>
-            </a:r>
-            <a:r>
-              <a:rPr lang="en-US" sz="1200" b="0" i="0" kern="1200" dirty="0" smtClean="0">
-                <a:solidFill>
-                  <a:schemeClr val="tx1"/>
-                </a:solidFill>
-                <a:effectLst/>
-                <a:latin typeface="Arial" panose="020B0604020202020204" pitchFamily="34" charset="0"/>
-                <a:ea typeface="ＭＳ Ｐゴシック" charset="0"/>
-                <a:cs typeface="Arial" panose="020B0604020202020204" pitchFamily="34" charset="0"/>
-              </a:rPr>
-              <a:t> to examine any node in your infrastructure; run the tests locally or remotely.</a:t>
-            </a:r>
-          </a:p>
-          <a:p>
+              <a:t> and displayed in reports.</a:t>
+            </a:r>
             <a:endParaRPr lang="en-US" sz="1200" b="0" i="0" kern="1200" dirty="0" smtClean="0">
               <a:solidFill>
                 <a:schemeClr val="tx1"/>
@@ -3802,30 +3820,6 @@
             </a:endParaRPr>
           </a:p>
           <a:p>
-            <a:r>
-              <a:rPr lang="en-US" sz="1200" b="0" i="0" kern="1200" dirty="0" smtClean="0">
-                <a:solidFill>
-                  <a:schemeClr val="tx1"/>
-                </a:solidFill>
-                <a:effectLst/>
-                <a:latin typeface="Arial" panose="020B0604020202020204" pitchFamily="34" charset="0"/>
-                <a:ea typeface="ＭＳ Ｐゴシック" charset="0"/>
-                <a:cs typeface="Arial" panose="020B0604020202020204" pitchFamily="34" charset="0"/>
-              </a:rPr>
-              <a:t>Any detected security, compliance, or policy issues are flagged in a log</a:t>
-            </a:r>
-            <a:r>
-              <a:rPr lang="en-US" sz="1200" b="0" i="0" kern="1200" baseline="0" dirty="0" smtClean="0">
-                <a:solidFill>
-                  <a:schemeClr val="tx1"/>
-                </a:solidFill>
-                <a:effectLst/>
-                <a:latin typeface="Arial" panose="020B0604020202020204" pitchFamily="34" charset="0"/>
-                <a:ea typeface="ＭＳ Ｐゴシック" charset="0"/>
-                <a:cs typeface="Arial" panose="020B0604020202020204" pitchFamily="34" charset="0"/>
-              </a:rPr>
-              <a:t> and displayed in reports.</a:t>
-            </a:r>
             <a:endParaRPr lang="en-US" sz="1200" b="0" i="0" kern="1200" dirty="0" smtClean="0">
               <a:solidFill>
                 <a:schemeClr val="tx1"/>
@@ -3837,6 +3831,56 @@
             </a:endParaRPr>
           </a:p>
           <a:p>
+            <a:r>
+              <a:rPr lang="en-US" sz="1200" b="0" i="0" kern="1200" dirty="0" smtClean="0">
+                <a:solidFill>
+                  <a:schemeClr val="tx1"/>
+                </a:solidFill>
+                <a:effectLst/>
+                <a:latin typeface="Arial" panose="020B0604020202020204" pitchFamily="34" charset="0"/>
+                <a:ea typeface="ＭＳ Ｐゴシック" charset="0"/>
+                <a:cs typeface="Arial" panose="020B0604020202020204" pitchFamily="34" charset="0"/>
+              </a:rPr>
+              <a:t>The </a:t>
+            </a:r>
+            <a:r>
+              <a:rPr lang="en-US" sz="1200" b="0" i="0" kern="1200" dirty="0" err="1" smtClean="0">
+                <a:solidFill>
+                  <a:schemeClr val="tx1"/>
+                </a:solidFill>
+                <a:effectLst/>
+                <a:latin typeface="Arial" panose="020B0604020202020204" pitchFamily="34" charset="0"/>
+                <a:ea typeface="ＭＳ Ｐゴシック" charset="0"/>
+                <a:cs typeface="Arial" panose="020B0604020202020204" pitchFamily="34" charset="0"/>
+              </a:rPr>
+              <a:t>InSpec</a:t>
+            </a:r>
+            <a:r>
+              <a:rPr lang="en-US" sz="1200" b="0" i="0" kern="1200" dirty="0" smtClean="0">
+                <a:solidFill>
+                  <a:schemeClr val="tx1"/>
+                </a:solidFill>
+                <a:effectLst/>
+                <a:latin typeface="Arial" panose="020B0604020202020204" pitchFamily="34" charset="0"/>
+                <a:ea typeface="ＭＳ Ｐゴシック" charset="0"/>
+                <a:cs typeface="Arial" panose="020B0604020202020204" pitchFamily="34" charset="0"/>
+              </a:rPr>
+              <a:t> audit resource framework is fully compatible with Chef Compliance</a:t>
+            </a:r>
+            <a:r>
+              <a:rPr lang="en-US" sz="1200" b="0" i="0" kern="1200" dirty="0" smtClean="0">
+                <a:solidFill>
+                  <a:schemeClr val="tx1"/>
+                </a:solidFill>
+                <a:effectLst/>
+                <a:latin typeface="Arial" panose="020B0604020202020204" pitchFamily="34" charset="0"/>
+                <a:ea typeface="ＭＳ Ｐゴシック" charset="0"/>
+                <a:cs typeface="Arial" panose="020B0604020202020204" pitchFamily="34" charset="0"/>
+              </a:rPr>
+              <a:t>.</a:t>
+            </a:r>
+          </a:p>
+          <a:p>
             <a:endParaRPr lang="en-US" sz="1200" b="0" i="0" kern="1200" dirty="0" smtClean="0">
               <a:solidFill>
                 <a:schemeClr val="tx1"/>
@@ -3848,6 +3892,23 @@
             </a:endParaRPr>
           </a:p>
           <a:p>
+            <a:pPr marL="0" marR="0" indent="0" algn="l" defTabSz="1217613" rtl="0" eaLnBrk="1" fontAlgn="base" latinLnBrk="0" hangingPunct="1">
+              <a:lnSpc>
+                <a:spcPct val="90000"/>
+              </a:lnSpc>
+              <a:spcBef>
+                <a:spcPct val="30000"/>
+              </a:spcBef>
+              <a:spcAft>
+                <a:spcPts val="450"/>
+              </a:spcAft>
+              <a:buClrTx/>
+              <a:buSzTx/>
+              <a:buFontTx/>
+              <a:buNone/>
+              <a:tabLst/>
+              <a:defRPr/>
+            </a:pPr>
             <a:r>
               <a:rPr lang="en-US" sz="1200" b="0" i="0" kern="1200" dirty="0" smtClean="0">
                 <a:solidFill>
@@ -3858,32 +3919,48 @@
                 <a:ea typeface="ＭＳ Ｐゴシック" charset="0"/>
                 <a:cs typeface="Arial" panose="020B0604020202020204" pitchFamily="34" charset="0"/>
               </a:rPr>
-              <a:t>The </a:t>
-            </a:r>
-            <a:r>
-              <a:rPr lang="en-US" sz="1200" b="0" i="0" kern="1200" dirty="0" err="1" smtClean="0">
-                <a:solidFill>
-                  <a:schemeClr val="tx1"/>
-                </a:solidFill>
-                <a:effectLst/>
-                <a:latin typeface="Arial" panose="020B0604020202020204" pitchFamily="34" charset="0"/>
-                <a:ea typeface="ＭＳ Ｐゴシック" charset="0"/>
-                <a:cs typeface="Arial" panose="020B0604020202020204" pitchFamily="34" charset="0"/>
-              </a:rPr>
+              <a:t>Instructor note: </a:t>
+            </a:r>
+            <a:r>
+              <a:rPr lang="en-US" dirty="0" err="1" smtClean="0"/>
               <a:t>InSpec</a:t>
             </a:r>
             <a:r>
-              <a:rPr lang="en-US" sz="1200" b="0" i="0" kern="1200" dirty="0" smtClean="0">
-                <a:solidFill>
-                  <a:schemeClr val="tx1"/>
-                </a:solidFill>
-                <a:effectLst/>
-                <a:latin typeface="Arial" panose="020B0604020202020204" pitchFamily="34" charset="0"/>
-                <a:ea typeface="ＭＳ Ｐゴシック" charset="0"/>
-                <a:cs typeface="Arial" panose="020B0604020202020204" pitchFamily="34" charset="0"/>
-              </a:rPr>
-              <a:t> audit resource framework is fully compatible with Chef Compliance.</a:t>
-            </a:r>
+              <a:rPr lang="en-US" dirty="0" smtClean="0"/>
+              <a:t> is similar to </a:t>
+            </a:r>
+            <a:r>
+              <a:rPr lang="en-US" dirty="0" err="1" smtClean="0"/>
+              <a:t>ServerSpec</a:t>
+            </a:r>
+            <a:r>
+              <a:rPr lang="en-US" baseline="0" dirty="0" smtClean="0"/>
+              <a:t> but l</a:t>
+            </a:r>
+            <a:r>
+              <a:rPr lang="en-US" dirty="0" smtClean="0"/>
+              <a:t>earners who have no experience with </a:t>
+            </a:r>
+            <a:r>
+              <a:rPr lang="en-US" dirty="0" err="1" smtClean="0"/>
+              <a:t>Serverspec</a:t>
+            </a:r>
+            <a:r>
+              <a:rPr lang="en-US" dirty="0" smtClean="0"/>
+              <a:t> may be confused by the reference.</a:t>
+            </a:r>
+            <a:endParaRPr lang="en-US" dirty="0" smtClean="0"/>
+          </a:p>
+          <a:p>
+            <a:endParaRPr lang="en-US" sz="1200" b="0" i="0" kern="1200" dirty="0" smtClean="0">
+              <a:solidFill>
+                <a:schemeClr val="tx1"/>
+              </a:solidFill>
+              <a:effectLst/>
+              <a:latin typeface="Arial" panose="020B0604020202020204" pitchFamily="34" charset="0"/>
+              <a:ea typeface="ＭＳ Ｐゴシック" charset="0"/>
+              <a:cs typeface="Arial" panose="020B0604020202020204" pitchFamily="34" charset="0"/>
+            </a:endParaRPr>
           </a:p>
           <a:p>
             <a:endParaRPr lang="en-US" sz="1200" b="0" i="0" kern="1200" dirty="0" smtClean="0">
@@ -4403,7 +4480,7 @@
   <p:clrMapOvr>
     <a:masterClrMapping/>
   </p:clrMapOvr>
-  <p:transition xmlns:p14="http://schemas.microsoft.com/office/powerpoint/2010/main" spd="med">
+  <p:transition spd="med">
     <p:fade/>
   </p:transition>
 </p:sldLayout>
@@ -4698,7 +4775,7 @@
   <p:clrMapOvr>
     <a:overrideClrMapping bg1="lt1" tx1="dk1" bg2="lt2" tx2="dk2" accent1="accent1" accent2="accent2" accent3="accent3" accent4="accent4" accent5="accent5" accent6="accent6" hlink="hlink" folHlink="folHlink"/>
   </p:clrMapOvr>
-  <p:transition xmlns:p14="http://schemas.microsoft.com/office/powerpoint/2010/main" spd="med">
+  <p:transition spd="med">
     <p:fade/>
   </p:transition>
 </p:sldLayout>
@@ -4831,14 +4908,14 @@
           </a:ln>
           <a:extLst>
             <a:ext uri="{909E8E84-426E-40dd-AFC4-6F175D3DCCD1}">
-              <a14:hiddenFill xmlns:a14="http://schemas.microsoft.com/office/drawing/2010/main">
+              <a14:hiddenFill xmlns:a14="http://schemas.microsoft.com/office/drawing/2010/main" xmlns="">
                 <a:solidFill>
                   <a:srgbClr val="FFFFFF"/>
                 </a:solidFill>
               </a14:hiddenFill>
             </a:ext>
             <a:ext uri="{91240B29-F687-4f45-9708-019B960494DF}">
-              <a14:hiddenLine xmlns:a14="http://schemas.microsoft.com/office/drawing/2010/main" w="9525">
+              <a14:hiddenLine xmlns:a14="http://schemas.microsoft.com/office/drawing/2010/main" xmlns="" w="9525">
                 <a:solidFill>
                   <a:srgbClr val="000000"/>
                 </a:solidFill>
@@ -4986,14 +5063,14 @@
           </a:ln>
           <a:extLst>
             <a:ext uri="{909E8E84-426E-40dd-AFC4-6F175D3DCCD1}">
-              <a14:hiddenFill xmlns:a14="http://schemas.microsoft.com/office/drawing/2010/main">
+              <a14:hiddenFill xmlns:a14="http://schemas.microsoft.com/office/drawing/2010/main" xmlns="">
                 <a:solidFill>
                   <a:srgbClr val="FFFFFF"/>
                 </a:solidFill>
               </a14:hiddenFill>
             </a:ext>
             <a:ext uri="{91240B29-F687-4f45-9708-019B960494DF}">
-              <a14:hiddenLine xmlns:a14="http://schemas.microsoft.com/office/drawing/2010/main" w="9525">
+              <a14:hiddenLine xmlns:a14="http://schemas.microsoft.com/office/drawing/2010/main" xmlns="" w="9525">
                 <a:solidFill>
                   <a:srgbClr val="000000"/>
                 </a:solidFill>
@@ -5391,7 +5468,7 @@
   <p:clrMapOvr>
     <a:overrideClrMapping bg1="lt1" tx1="dk1" bg2="lt2" tx2="dk2" accent1="accent1" accent2="accent2" accent3="accent3" accent4="accent4" accent5="accent5" accent6="accent6" hlink="hlink" folHlink="folHlink"/>
   </p:clrMapOvr>
-  <p:transition xmlns:p14="http://schemas.microsoft.com/office/powerpoint/2010/main" spd="med">
+  <p:transition spd="med">
     <p:fade/>
   </p:transition>
 </p:sldLayout>
@@ -5484,14 +5561,14 @@
           </a:ln>
           <a:extLst>
             <a:ext uri="{909E8E84-426E-40dd-AFC4-6F175D3DCCD1}">
-              <a14:hiddenFill xmlns:a14="http://schemas.microsoft.com/office/drawing/2010/main">
+              <a14:hiddenFill xmlns:a14="http://schemas.microsoft.com/office/drawing/2010/main" xmlns="">
                 <a:solidFill>
                   <a:srgbClr val="FFFFFF"/>
                 </a:solidFill>
               </a14:hiddenFill>
             </a:ext>
             <a:ext uri="{91240B29-F687-4f45-9708-019B960494DF}">
-              <a14:hiddenLine xmlns:a14="http://schemas.microsoft.com/office/drawing/2010/main" w="9525">
+              <a14:hiddenLine xmlns:a14="http://schemas.microsoft.com/office/drawing/2010/main" xmlns="" w="9525">
                 <a:solidFill>
                   <a:srgbClr val="000000"/>
                 </a:solidFill>
@@ -5513,7 +5590,7 @@
   <p:clrMapOvr>
     <a:masterClrMapping/>
   </p:clrMapOvr>
-  <p:transition xmlns:p14="http://schemas.microsoft.com/office/powerpoint/2010/main" spd="med">
+  <p:transition spd="med">
     <p:fade/>
   </p:transition>
 </p:sldLayout>
@@ -5800,7 +5877,7 @@
   <p:clrMapOvr>
     <a:masterClrMapping/>
   </p:clrMapOvr>
-  <p:transition xmlns:p14="http://schemas.microsoft.com/office/powerpoint/2010/main" spd="med">
+  <p:transition spd="med">
     <p:fade/>
   </p:transition>
 </p:sldLayout>
@@ -6293,7 +6370,7 @@
   <p:timing>
     <p:tnLst>
       <p:par>
-        <p:cTn xmlns:p14="http://schemas.microsoft.com/office/powerpoint/2010/main" id="1" dur="indefinite" restart="never" nodeType="tmRoot"/>
+        <p:cTn id="1" dur="indefinite" restart="never" nodeType="tmRoot"/>
       </p:par>
     </p:tnLst>
   </p:timing>
@@ -6695,7 +6772,7 @@
   <p:timing>
     <p:tnLst>
       <p:par>
-        <p:cTn xmlns:p14="http://schemas.microsoft.com/office/powerpoint/2010/main" id="1" dur="indefinite" restart="never" nodeType="tmRoot"/>
+        <p:cTn id="1" dur="indefinite" restart="never" nodeType="tmRoot"/>
       </p:par>
     </p:tnLst>
   </p:timing>
@@ -6983,7 +7060,7 @@
   <p:clrMapOvr>
     <a:masterClrMapping/>
   </p:clrMapOvr>
-  <p:transition xmlns:p14="http://schemas.microsoft.com/office/powerpoint/2010/main" spd="med">
+  <p:transition spd="med">
     <p:fade/>
   </p:transition>
 </p:sldLayout>
@@ -7270,7 +7347,7 @@
   <p:clrMapOvr>
     <a:masterClrMapping/>
   </p:clrMapOvr>
-  <p:transition xmlns:p14="http://schemas.microsoft.com/office/powerpoint/2010/main" spd="med">
+  <p:transition spd="med">
     <p:fade/>
   </p:transition>
 </p:sldLayout>
@@ -7619,7 +7696,7 @@
   <p:clrMapOvr>
     <a:masterClrMapping/>
   </p:clrMapOvr>
-  <p:transition xmlns:p14="http://schemas.microsoft.com/office/powerpoint/2010/main" spd="med">
+  <p:transition spd="med">
     <p:fade/>
   </p:transition>
 </p:sldLayout>
@@ -7906,7 +7983,7 @@
   <p:clrMapOvr>
     <a:masterClrMapping/>
   </p:clrMapOvr>
-  <p:transition xmlns:p14="http://schemas.microsoft.com/office/powerpoint/2010/main" spd="med">
+  <p:transition spd="med">
     <p:fade/>
   </p:transition>
 </p:sldLayout>
@@ -8083,7 +8160,7 @@
   <p:clrMapOvr>
     <a:masterClrMapping/>
   </p:clrMapOvr>
-  <p:transition xmlns:p14="http://schemas.microsoft.com/office/powerpoint/2010/main" spd="med">
+  <p:transition spd="med">
     <p:fade/>
   </p:transition>
 </p:sldLayout>
@@ -8300,14 +8377,14 @@
           </a:ln>
           <a:extLst>
             <a:ext uri="{909E8E84-426E-40dd-AFC4-6F175D3DCCD1}">
-              <a14:hiddenFill xmlns:a14="http://schemas.microsoft.com/office/drawing/2010/main">
+              <a14:hiddenFill xmlns:a14="http://schemas.microsoft.com/office/drawing/2010/main" xmlns="">
                 <a:solidFill>
                   <a:srgbClr val="FFFFFF"/>
                 </a:solidFill>
               </a14:hiddenFill>
             </a:ext>
             <a:ext uri="{91240B29-F687-4f45-9708-019B960494DF}">
-              <a14:hiddenLine xmlns:a14="http://schemas.microsoft.com/office/drawing/2010/main" w="9525">
+              <a14:hiddenLine xmlns:a14="http://schemas.microsoft.com/office/drawing/2010/main" xmlns="" w="9525">
                 <a:solidFill>
                   <a:srgbClr val="000000"/>
                 </a:solidFill>
@@ -8504,7 +8581,7 @@
   <p:clrMapOvr>
     <a:masterClrMapping/>
   </p:clrMapOvr>
-  <p:transition xmlns:p14="http://schemas.microsoft.com/office/powerpoint/2010/main" spd="med">
+  <p:transition spd="med">
     <p:fade/>
   </p:transition>
 </p:sldLayout>
@@ -8792,7 +8869,7 @@
   <p:clrMapOvr>
     <a:masterClrMapping/>
   </p:clrMapOvr>
-  <p:transition xmlns:p14="http://schemas.microsoft.com/office/powerpoint/2010/main" spd="med">
+  <p:transition spd="med">
     <p:fade/>
   </p:transition>
 </p:sldLayout>
@@ -9104,7 +9181,7 @@
   <p:clrMapOvr>
     <a:masterClrMapping/>
   </p:clrMapOvr>
-  <p:transition xmlns:p14="http://schemas.microsoft.com/office/powerpoint/2010/main" spd="med">
+  <p:transition spd="med">
     <p:fade/>
   </p:transition>
 </p:sldLayout>
@@ -9408,7 +9485,7 @@
   <p:clrMapOvr>
     <a:masterClrMapping/>
   </p:clrMapOvr>
-  <p:transition xmlns:p14="http://schemas.microsoft.com/office/powerpoint/2010/main" spd="med">
+  <p:transition spd="med">
     <p:fade/>
   </p:transition>
 </p:sldLayout>
@@ -9588,7 +9665,7 @@
   <p:clrMapOvr>
     <a:masterClrMapping/>
   </p:clrMapOvr>
-  <p:transition xmlns:p14="http://schemas.microsoft.com/office/powerpoint/2010/main" spd="med">
+  <p:transition spd="med">
     <p:fade/>
   </p:transition>
 </p:sldLayout>
@@ -9664,14 +9741,14 @@
           </a:ln>
           <a:extLst>
             <a:ext uri="{909E8E84-426E-40dd-AFC4-6F175D3DCCD1}">
-              <a14:hiddenFill xmlns:a14="http://schemas.microsoft.com/office/drawing/2010/main">
+              <a14:hiddenFill xmlns:a14="http://schemas.microsoft.com/office/drawing/2010/main" xmlns="">
                 <a:solidFill>
                   <a:srgbClr val="FFFFFF"/>
                 </a:solidFill>
               </a14:hiddenFill>
             </a:ext>
             <a:ext uri="{91240B29-F687-4f45-9708-019B960494DF}">
-              <a14:hiddenLine xmlns:a14="http://schemas.microsoft.com/office/drawing/2010/main" w="9525">
+              <a14:hiddenLine xmlns:a14="http://schemas.microsoft.com/office/drawing/2010/main" xmlns="" w="9525">
                 <a:solidFill>
                   <a:srgbClr val="000000"/>
                 </a:solidFill>
@@ -9947,7 +10024,7 @@
   <p:clrMapOvr>
     <a:overrideClrMapping bg1="lt1" tx1="dk1" bg2="lt2" tx2="dk2" accent1="accent1" accent2="accent2" accent3="accent3" accent4="accent4" accent5="accent5" accent6="accent6" hlink="hlink" folHlink="folHlink"/>
   </p:clrMapOvr>
-  <p:transition xmlns:p14="http://schemas.microsoft.com/office/powerpoint/2010/main" spd="med">
+  <p:transition spd="med">
     <p:fade/>
   </p:transition>
 </p:sldLayout>
@@ -10153,7 +10230,7 @@
   <p:clrMapOvr>
     <a:overrideClrMapping bg1="lt1" tx1="dk1" bg2="lt2" tx2="dk2" accent1="accent1" accent2="accent2" accent3="accent3" accent4="accent4" accent5="accent5" accent6="accent6" hlink="hlink" folHlink="folHlink"/>
   </p:clrMapOvr>
-  <p:transition xmlns:p14="http://schemas.microsoft.com/office/powerpoint/2010/main" spd="med">
+  <p:transition spd="med">
     <p:fade/>
   </p:transition>
 </p:sldLayout>
@@ -10229,14 +10306,14 @@
           </a:ln>
           <a:extLst>
             <a:ext uri="{909E8E84-426E-40dd-AFC4-6F175D3DCCD1}">
-              <a14:hiddenFill xmlns:a14="http://schemas.microsoft.com/office/drawing/2010/main">
+              <a14:hiddenFill xmlns:a14="http://schemas.microsoft.com/office/drawing/2010/main" xmlns="">
                 <a:solidFill>
                   <a:srgbClr val="FFFFFF"/>
                 </a:solidFill>
               </a14:hiddenFill>
             </a:ext>
             <a:ext uri="{91240B29-F687-4f45-9708-019B960494DF}">
-              <a14:hiddenLine xmlns:a14="http://schemas.microsoft.com/office/drawing/2010/main" w="9525">
+              <a14:hiddenLine xmlns:a14="http://schemas.microsoft.com/office/drawing/2010/main" xmlns="" w="9525">
                 <a:solidFill>
                   <a:srgbClr val="000000"/>
                 </a:solidFill>
@@ -10519,7 +10596,7 @@
   <p:clrMapOvr>
     <a:overrideClrMapping bg1="lt1" tx1="dk1" bg2="lt2" tx2="dk2" accent1="accent1" accent2="accent2" accent3="accent3" accent4="accent4" accent5="accent5" accent6="accent6" hlink="hlink" folHlink="folHlink"/>
   </p:clrMapOvr>
-  <p:transition xmlns:p14="http://schemas.microsoft.com/office/powerpoint/2010/main" spd="med">
+  <p:transition spd="med">
     <p:fade/>
   </p:transition>
 </p:sldLayout>
@@ -10727,7 +10804,7 @@
   <p:clrMapOvr>
     <a:overrideClrMapping bg1="lt1" tx1="dk1" bg2="lt2" tx2="dk2" accent1="accent1" accent2="accent2" accent3="accent3" accent4="accent4" accent5="accent5" accent6="accent6" hlink="hlink" folHlink="folHlink"/>
   </p:clrMapOvr>
-  <p:transition xmlns:p14="http://schemas.microsoft.com/office/powerpoint/2010/main" spd="med">
+  <p:transition spd="med">
     <p:fade/>
   </p:transition>
 </p:sldLayout>
@@ -10803,14 +10880,14 @@
           </a:ln>
           <a:extLst>
             <a:ext uri="{909E8E84-426E-40dd-AFC4-6F175D3DCCD1}">
-              <a14:hiddenFill xmlns:a14="http://schemas.microsoft.com/office/drawing/2010/main">
+              <a14:hiddenFill xmlns:a14="http://schemas.microsoft.com/office/drawing/2010/main" xmlns="">
                 <a:solidFill>
                   <a:srgbClr val="FFFFFF"/>
                 </a:solidFill>
               </a14:hiddenFill>
             </a:ext>
             <a:ext uri="{91240B29-F687-4f45-9708-019B960494DF}">
-              <a14:hiddenLine xmlns:a14="http://schemas.microsoft.com/office/drawing/2010/main" w="9525">
+              <a14:hiddenLine xmlns:a14="http://schemas.microsoft.com/office/drawing/2010/main" xmlns="" w="9525">
                 <a:solidFill>
                   <a:srgbClr val="000000"/>
                 </a:solidFill>
@@ -11078,7 +11155,7 @@
   <p:clrMapOvr>
     <a:overrideClrMapping bg1="lt1" tx1="dk1" bg2="lt2" tx2="dk2" accent1="accent1" accent2="accent2" accent3="accent3" accent4="accent4" accent5="accent5" accent6="accent6" hlink="hlink" folHlink="folHlink"/>
   </p:clrMapOvr>
-  <p:transition xmlns:p14="http://schemas.microsoft.com/office/powerpoint/2010/main" spd="med">
+  <p:transition spd="med">
     <p:fade/>
   </p:transition>
 </p:sldLayout>
@@ -11306,7 +11383,7 @@
   <p:clrMapOvr>
     <a:overrideClrMapping bg1="lt1" tx1="dk1" bg2="lt2" tx2="dk2" accent1="accent1" accent2="accent2" accent3="accent3" accent4="accent4" accent5="accent5" accent6="accent6" hlink="hlink" folHlink="folHlink"/>
   </p:clrMapOvr>
-  <p:transition xmlns:p14="http://schemas.microsoft.com/office/powerpoint/2010/main" spd="med">
+  <p:transition spd="med">
     <p:fade/>
   </p:transition>
 </p:sldLayout>
@@ -11594,7 +11671,7 @@
   <p:clrMapOvr>
     <a:overrideClrMapping bg1="lt1" tx1="dk1" bg2="lt2" tx2="dk2" accent1="accent1" accent2="accent2" accent3="accent3" accent4="accent4" accent5="accent5" accent6="accent6" hlink="hlink" folHlink="folHlink"/>
   </p:clrMapOvr>
-  <p:transition xmlns:p14="http://schemas.microsoft.com/office/powerpoint/2010/main" spd="med">
+  <p:transition spd="med">
     <p:fade/>
   </p:transition>
 </p:sldLayout>
@@ -11750,14 +11827,14 @@
           </a:ln>
           <a:extLst>
             <a:ext uri="{909E8E84-426E-40dd-AFC4-6F175D3DCCD1}">
-              <a14:hiddenFill xmlns:a14="http://schemas.microsoft.com/office/drawing/2010/main">
+              <a14:hiddenFill xmlns:a14="http://schemas.microsoft.com/office/drawing/2010/main" xmlns="">
                 <a:solidFill>
                   <a:srgbClr val="FFFFFF"/>
                 </a:solidFill>
               </a14:hiddenFill>
             </a:ext>
             <a:ext uri="{91240B29-F687-4f45-9708-019B960494DF}">
-              <a14:hiddenLine xmlns:a14="http://schemas.microsoft.com/office/drawing/2010/main" w="9525">
+              <a14:hiddenLine xmlns:a14="http://schemas.microsoft.com/office/drawing/2010/main" xmlns="" w="9525">
                 <a:solidFill>
                   <a:srgbClr val="000000"/>
                 </a:solidFill>
@@ -11977,13 +12054,13 @@
     <p:sldLayoutId id="2147483869" r:id="rId14"/>
     <p:sldLayoutId id="2147483870" r:id="rId15"/>
   </p:sldLayoutIdLst>
-  <p:transition xmlns:p14="http://schemas.microsoft.com/office/powerpoint/2010/main" spd="med">
+  <p:transition spd="med">
     <p:fade/>
   </p:transition>
   <p:timing>
     <p:tnLst>
       <p:par>
-        <p:cTn xmlns:p14="http://schemas.microsoft.com/office/powerpoint/2010/main" id="1" dur="indefinite" restart="never" nodeType="tmRoot"/>
+        <p:cTn id="1" dur="indefinite" restart="never" nodeType="tmRoot"/>
       </p:par>
     </p:tnLst>
   </p:timing>
@@ -12511,14 +12588,14 @@
           </a:ln>
           <a:extLst>
             <a:ext uri="{909E8E84-426E-40dd-AFC4-6F175D3DCCD1}">
-              <a14:hiddenFill xmlns:a14="http://schemas.microsoft.com/office/drawing/2010/main">
+              <a14:hiddenFill xmlns:a14="http://schemas.microsoft.com/office/drawing/2010/main" xmlns="">
                 <a:solidFill>
                   <a:srgbClr val="FFFFFF"/>
                 </a:solidFill>
               </a14:hiddenFill>
             </a:ext>
             <a:ext uri="{91240B29-F687-4f45-9708-019B960494DF}">
-              <a14:hiddenLine xmlns:a14="http://schemas.microsoft.com/office/drawing/2010/main" w="9525">
+              <a14:hiddenLine xmlns:a14="http://schemas.microsoft.com/office/drawing/2010/main" xmlns="" w="9525">
                 <a:solidFill>
                   <a:srgbClr val="000000"/>
                 </a:solidFill>
@@ -12807,13 +12884,13 @@
     <p:sldLayoutId id="2147483866" r:id="rId8"/>
     <p:sldLayoutId id="2147483868" r:id="rId9"/>
   </p:sldLayoutIdLst>
-  <p:transition xmlns:p14="http://schemas.microsoft.com/office/powerpoint/2010/main" spd="med">
+  <p:transition spd="med">
     <p:fade/>
   </p:transition>
   <p:timing>
     <p:tnLst>
       <p:par>
-        <p:cTn xmlns:p14="http://schemas.microsoft.com/office/powerpoint/2010/main" id="1" dur="indefinite" restart="never" nodeType="tmRoot"/>
+        <p:cTn id="1" dur="indefinite" restart="never" nodeType="tmRoot"/>
       </p:par>
     </p:tnLst>
   </p:timing>
@@ -13335,13 +13412,13 @@
   <p:clrMapOvr>
     <a:masterClrMapping/>
   </p:clrMapOvr>
-  <p:transition xmlns:p14="http://schemas.microsoft.com/office/powerpoint/2010/main" spd="med">
+  <p:transition spd="med">
     <p:fade/>
   </p:transition>
   <p:timing>
     <p:tnLst>
       <p:par>
-        <p:cTn xmlns:p14="http://schemas.microsoft.com/office/powerpoint/2010/main" id="1" dur="indefinite" restart="never" nodeType="tmRoot"/>
+        <p:cTn id="1" dur="indefinite" restart="never" nodeType="tmRoot"/>
       </p:par>
     </p:tnLst>
   </p:timing>
@@ -13452,13 +13529,13 @@
       </p:sp>
       <p:sp>
         <p:nvSpPr>
-          <p:cNvPr id="4" name="TextBox 3"/>
+          <p:cNvPr id="5" name="TextBox 4"/>
           <p:cNvSpPr txBox="1"/>
           <p:nvPr/>
         </p:nvSpPr>
         <p:spPr bwMode="white">
           <a:xfrm>
-            <a:off x="4044155" y="4845610"/>
+            <a:off x="4044155" y="4912516"/>
             <a:ext cx="8155156" cy="3141292"/>
           </a:xfrm>
           <a:prstGeom prst="rect">
@@ -13845,13 +13922,13 @@
   <p:clrMapOvr>
     <a:masterClrMapping/>
   </p:clrMapOvr>
-  <p:transition xmlns:p14="http://schemas.microsoft.com/office/powerpoint/2010/main" spd="med">
+  <p:transition spd="med">
     <p:fade/>
   </p:transition>
   <p:timing>
     <p:tnLst>
       <p:par>
-        <p:cTn xmlns:p14="http://schemas.microsoft.com/office/powerpoint/2010/main" id="1" dur="indefinite" restart="never" nodeType="tmRoot"/>
+        <p:cTn id="1" dur="indefinite" restart="never" nodeType="tmRoot"/>
       </p:par>
     </p:tnLst>
   </p:timing>
@@ -14046,13 +14123,13 @@
   <p:clrMapOvr>
     <a:masterClrMapping/>
   </p:clrMapOvr>
-  <p:transition xmlns:p14="http://schemas.microsoft.com/office/powerpoint/2010/main" spd="med">
+  <p:transition spd="med">
     <p:fade/>
   </p:transition>
   <p:timing>
     <p:tnLst>
       <p:par>
-        <p:cTn xmlns:p14="http://schemas.microsoft.com/office/powerpoint/2010/main" id="1" dur="indefinite" restart="never" nodeType="tmRoot"/>
+        <p:cTn id="1" dur="indefinite" restart="never" nodeType="tmRoot"/>
       </p:par>
     </p:tnLst>
   </p:timing>
@@ -14210,13 +14287,13 @@
   <p:clrMapOvr>
     <a:masterClrMapping/>
   </p:clrMapOvr>
-  <p:transition xmlns:p14="http://schemas.microsoft.com/office/powerpoint/2010/main" spd="med">
+  <p:transition spd="med">
     <p:fade/>
   </p:transition>
   <p:timing>
     <p:tnLst>
       <p:par>
-        <p:cTn xmlns:p14="http://schemas.microsoft.com/office/powerpoint/2010/main" id="1" dur="indefinite" restart="never" nodeType="tmRoot"/>
+        <p:cTn id="1" dur="indefinite" restart="never" nodeType="tmRoot"/>
       </p:par>
     </p:tnLst>
   </p:timing>
@@ -15590,7 +15667,7 @@
   <p:timing>
     <p:tnLst>
       <p:par>
-        <p:cTn xmlns:p14="http://schemas.microsoft.com/office/powerpoint/2010/main" id="1" dur="indefinite" restart="never" nodeType="tmRoot"/>
+        <p:cTn id="1" dur="indefinite" restart="never" nodeType="tmRoot"/>
       </p:par>
     </p:tnLst>
   </p:timing>
@@ -17378,7 +17455,7 @@
   <p:timing>
     <p:tnLst>
       <p:par>
-        <p:cTn xmlns:p14="http://schemas.microsoft.com/office/powerpoint/2010/main" id="1" dur="indefinite" restart="never" nodeType="tmRoot"/>
+        <p:cTn id="1" dur="indefinite" restart="never" nodeType="tmRoot"/>
       </p:par>
     </p:tnLst>
   </p:timing>
@@ -17499,7 +17576,7 @@
   <p:timing>
     <p:tnLst>
       <p:par>
-        <p:cTn xmlns:p14="http://schemas.microsoft.com/office/powerpoint/2010/main" id="1" dur="indefinite" restart="never" nodeType="tmRoot"/>
+        <p:cTn id="1" dur="indefinite" restart="never" nodeType="tmRoot"/>
       </p:par>
     </p:tnLst>
   </p:timing>
@@ -17597,7 +17674,7 @@
   <p:timing>
     <p:tnLst>
       <p:par>
-        <p:cTn xmlns:p14="http://schemas.microsoft.com/office/powerpoint/2010/main" id="1" dur="indefinite" restart="never" nodeType="tmRoot"/>
+        <p:cTn id="1" dur="indefinite" restart="never" nodeType="tmRoot"/>
       </p:par>
     </p:tnLst>
   </p:timing>
@@ -17726,11 +17803,15 @@
                   <a:schemeClr val="accent1"/>
                 </a:solidFill>
               </a:rPr>
-              <a:t>GE</a:t>
+              <a:t>GL</a:t>
             </a:r>
             <a:r>
               <a:rPr lang="en-US" sz="3733" dirty="0" smtClean="0"/>
-              <a:t> or </a:t>
+              <a:t> </a:t>
+            </a:r>
+            <a:r>
+              <a:rPr lang="en-US" sz="3733" dirty="0" smtClean="0"/>
+              <a:t>or </a:t>
             </a:r>
             <a:r>
               <a:rPr lang="en-US" sz="3733" b="1" dirty="0" smtClean="0">
@@ -17738,11 +17819,23 @@
                   <a:schemeClr val="accent1"/>
                 </a:solidFill>
               </a:rPr>
-              <a:t>Group Exercise</a:t>
+              <a:t>Group </a:t>
+            </a:r>
+            <a:r>
+              <a:rPr lang="en-US" sz="3733" b="1" dirty="0" smtClean="0">
+                <a:solidFill>
+                  <a:schemeClr val="accent1"/>
+                </a:solidFill>
+              </a:rPr>
+              <a:t>Lab</a:t>
             </a:r>
             <a:r>
               <a:rPr lang="en-US" sz="3733" dirty="0" smtClean="0"/>
-              <a:t>: All participants and the instructor do this task together with the instructor often leading the way</a:t>
+              <a:t>: </a:t>
+            </a:r>
+            <a:r>
+              <a:rPr lang="en-US" sz="3733" dirty="0" smtClean="0"/>
+              <a:t>All participants and the instructor do this task together with the instructor often leading the way</a:t>
             </a:r>
             <a:r>
               <a:rPr lang="en-US" sz="3733" dirty="0"/>
@@ -17847,13 +17940,13 @@
   <p:clrMapOvr>
     <a:masterClrMapping/>
   </p:clrMapOvr>
-  <p:transition xmlns:p14="http://schemas.microsoft.com/office/powerpoint/2010/main" spd="med">
+  <p:transition spd="med">
     <p:fade/>
   </p:transition>
   <p:timing>
     <p:tnLst>
       <p:par>
-        <p:cTn xmlns:p14="http://schemas.microsoft.com/office/powerpoint/2010/main" id="1" dur="indefinite" restart="never" nodeType="tmRoot"/>
+        <p:cTn id="1" dur="indefinite" restart="never" nodeType="tmRoot"/>
       </p:par>
     </p:tnLst>
   </p:timing>
@@ -18048,7 +18141,7 @@
   <p:clrMapOvr>
     <a:masterClrMapping/>
   </p:clrMapOvr>
-  <p:transition xmlns:p14="http://schemas.microsoft.com/office/powerpoint/2010/main" spd="med">
+  <p:transition spd="med">
     <p:fade/>
   </p:transition>
 </p:sld>
@@ -18225,7 +18318,7 @@
   <p:timing>
     <p:tnLst>
       <p:par>
-        <p:cTn xmlns:p14="http://schemas.microsoft.com/office/powerpoint/2010/main" id="1" dur="indefinite" restart="never" nodeType="tmRoot"/>
+        <p:cTn id="1" dur="indefinite" restart="never" nodeType="tmRoot"/>
       </p:par>
     </p:tnLst>
   </p:timing>
@@ -18417,11 +18510,7 @@
             </a:r>
             <a:r>
               <a:rPr lang="en-US" dirty="0" smtClean="0"/>
-              <a:t>create, modify, and </a:t>
-            </a:r>
-            <a:r>
-              <a:rPr lang="en-US" dirty="0" smtClean="0"/>
-              <a:t>test </a:t>
+              <a:t>create, modify, and test </a:t>
             </a:r>
             <a:r>
               <a:rPr lang="en-US" dirty="0"/>
@@ -18465,13 +18554,13 @@
   <p:clrMapOvr>
     <a:masterClrMapping/>
   </p:clrMapOvr>
-  <p:transition xmlns:p14="http://schemas.microsoft.com/office/powerpoint/2010/main" spd="med">
+  <p:transition spd="med">
     <p:fade/>
   </p:transition>
   <p:timing>
     <p:tnLst>
       <p:par>
-        <p:cTn xmlns:p14="http://schemas.microsoft.com/office/powerpoint/2010/main" id="1" dur="indefinite" restart="never" nodeType="tmRoot"/>
+        <p:cTn id="1" dur="indefinite" restart="never" nodeType="tmRoot"/>
       </p:par>
     </p:tnLst>
   </p:timing>
@@ -18587,13 +18676,13 @@
   <p:clrMapOvr>
     <a:masterClrMapping/>
   </p:clrMapOvr>
-  <p:transition xmlns:p14="http://schemas.microsoft.com/office/powerpoint/2010/main" spd="med">
+  <p:transition spd="med">
     <p:fade/>
   </p:transition>
   <p:timing>
     <p:tnLst>
       <p:par>
-        <p:cTn xmlns:p14="http://schemas.microsoft.com/office/powerpoint/2010/main" id="1" dur="indefinite" restart="never" nodeType="tmRoot"/>
+        <p:cTn id="1" dur="indefinite" restart="never" nodeType="tmRoot"/>
       </p:par>
     </p:tnLst>
   </p:timing>
@@ -19177,7 +19266,7 @@
             <a:noFill/>
             <a:extLst>
               <a:ext uri="{909E8E84-426E-40dd-AFC4-6F175D3DCCD1}">
-                <a14:hiddenFill xmlns:a14="http://schemas.microsoft.com/office/drawing/2010/main">
+                <a14:hiddenFill xmlns:a14="http://schemas.microsoft.com/office/drawing/2010/main" xmlns="">
                   <a:solidFill>
                     <a:srgbClr val="FFFFFF"/>
                   </a:solidFill>
@@ -19218,7 +19307,7 @@
             <a:noFill/>
             <a:extLst>
               <a:ext uri="{909E8E84-426E-40dd-AFC4-6F175D3DCCD1}">
-                <a14:hiddenFill xmlns:a14="http://schemas.microsoft.com/office/drawing/2010/main">
+                <a14:hiddenFill xmlns:a14="http://schemas.microsoft.com/office/drawing/2010/main" xmlns="">
                   <a:solidFill>
                     <a:srgbClr val="FFFFFF"/>
                   </a:solidFill>
@@ -19259,7 +19348,7 @@
             <a:noFill/>
             <a:extLst>
               <a:ext uri="{909E8E84-426E-40dd-AFC4-6F175D3DCCD1}">
-                <a14:hiddenFill xmlns:a14="http://schemas.microsoft.com/office/drawing/2010/main">
+                <a14:hiddenFill xmlns:a14="http://schemas.microsoft.com/office/drawing/2010/main" xmlns="">
                   <a:solidFill>
                     <a:srgbClr val="FFFFFF"/>
                   </a:solidFill>
@@ -19315,7 +19404,7 @@
             <a:noFill/>
             <a:extLst>
               <a:ext uri="{909E8E84-426E-40dd-AFC4-6F175D3DCCD1}">
-                <a14:hiddenFill xmlns:a14="http://schemas.microsoft.com/office/drawing/2010/main">
+                <a14:hiddenFill xmlns:a14="http://schemas.microsoft.com/office/drawing/2010/main" xmlns="">
                   <a:solidFill>
                     <a:srgbClr val="FFFFFF"/>
                   </a:solidFill>
@@ -19356,7 +19445,7 @@
             <a:noFill/>
             <a:extLst>
               <a:ext uri="{909E8E84-426E-40dd-AFC4-6F175D3DCCD1}">
-                <a14:hiddenFill xmlns:a14="http://schemas.microsoft.com/office/drawing/2010/main">
+                <a14:hiddenFill xmlns:a14="http://schemas.microsoft.com/office/drawing/2010/main" xmlns="">
                   <a:solidFill>
                     <a:srgbClr val="FFFFFF"/>
                   </a:solidFill>
@@ -19397,7 +19486,7 @@
             <a:noFill/>
             <a:extLst>
               <a:ext uri="{909E8E84-426E-40dd-AFC4-6F175D3DCCD1}">
-                <a14:hiddenFill xmlns:a14="http://schemas.microsoft.com/office/drawing/2010/main">
+                <a14:hiddenFill xmlns:a14="http://schemas.microsoft.com/office/drawing/2010/main" xmlns="">
                   <a:solidFill>
                     <a:srgbClr val="FFFFFF"/>
                   </a:solidFill>
@@ -19453,7 +19542,7 @@
             <a:noFill/>
             <a:extLst>
               <a:ext uri="{909E8E84-426E-40dd-AFC4-6F175D3DCCD1}">
-                <a14:hiddenFill xmlns:a14="http://schemas.microsoft.com/office/drawing/2010/main">
+                <a14:hiddenFill xmlns:a14="http://schemas.microsoft.com/office/drawing/2010/main" xmlns="">
                   <a:solidFill>
                     <a:srgbClr val="FFFFFF"/>
                   </a:solidFill>
@@ -19494,7 +19583,7 @@
             <a:noFill/>
             <a:extLst>
               <a:ext uri="{909E8E84-426E-40dd-AFC4-6F175D3DCCD1}">
-                <a14:hiddenFill xmlns:a14="http://schemas.microsoft.com/office/drawing/2010/main">
+                <a14:hiddenFill xmlns:a14="http://schemas.microsoft.com/office/drawing/2010/main" xmlns="">
                   <a:solidFill>
                     <a:srgbClr val="FFFFFF"/>
                   </a:solidFill>
@@ -19535,7 +19624,7 @@
             <a:noFill/>
             <a:extLst>
               <a:ext uri="{909E8E84-426E-40dd-AFC4-6F175D3DCCD1}">
-                <a14:hiddenFill xmlns:a14="http://schemas.microsoft.com/office/drawing/2010/main">
+                <a14:hiddenFill xmlns:a14="http://schemas.microsoft.com/office/drawing/2010/main" xmlns="">
                   <a:solidFill>
                     <a:srgbClr val="FFFFFF"/>
                   </a:solidFill>
@@ -19762,7 +19851,7 @@
             <a:noFill/>
             <a:extLst>
               <a:ext uri="{909E8E84-426E-40dd-AFC4-6F175D3DCCD1}">
-                <a14:hiddenFill xmlns:a14="http://schemas.microsoft.com/office/drawing/2010/main">
+                <a14:hiddenFill xmlns:a14="http://schemas.microsoft.com/office/drawing/2010/main" xmlns="">
                   <a:solidFill>
                     <a:srgbClr val="FFFFFF"/>
                   </a:solidFill>
@@ -19803,7 +19892,7 @@
             <a:noFill/>
             <a:extLst>
               <a:ext uri="{909E8E84-426E-40dd-AFC4-6F175D3DCCD1}">
-                <a14:hiddenFill xmlns:a14="http://schemas.microsoft.com/office/drawing/2010/main">
+                <a14:hiddenFill xmlns:a14="http://schemas.microsoft.com/office/drawing/2010/main" xmlns="">
                   <a:solidFill>
                     <a:srgbClr val="FFFFFF"/>
                   </a:solidFill>
@@ -19844,7 +19933,7 @@
             <a:noFill/>
             <a:extLst>
               <a:ext uri="{909E8E84-426E-40dd-AFC4-6F175D3DCCD1}">
-                <a14:hiddenFill xmlns:a14="http://schemas.microsoft.com/office/drawing/2010/main">
+                <a14:hiddenFill xmlns:a14="http://schemas.microsoft.com/office/drawing/2010/main" xmlns="">
                   <a:solidFill>
                     <a:srgbClr val="FFFFFF"/>
                   </a:solidFill>
@@ -19900,7 +19989,7 @@
             <a:noFill/>
             <a:extLst>
               <a:ext uri="{909E8E84-426E-40dd-AFC4-6F175D3DCCD1}">
-                <a14:hiddenFill xmlns:a14="http://schemas.microsoft.com/office/drawing/2010/main">
+                <a14:hiddenFill xmlns:a14="http://schemas.microsoft.com/office/drawing/2010/main" xmlns="">
                   <a:solidFill>
                     <a:srgbClr val="FFFFFF"/>
                   </a:solidFill>
@@ -19941,7 +20030,7 @@
             <a:noFill/>
             <a:extLst>
               <a:ext uri="{909E8E84-426E-40dd-AFC4-6F175D3DCCD1}">
-                <a14:hiddenFill xmlns:a14="http://schemas.microsoft.com/office/drawing/2010/main">
+                <a14:hiddenFill xmlns:a14="http://schemas.microsoft.com/office/drawing/2010/main" xmlns="">
                   <a:solidFill>
                     <a:srgbClr val="FFFFFF"/>
                   </a:solidFill>
@@ -19982,7 +20071,7 @@
             <a:noFill/>
             <a:extLst>
               <a:ext uri="{909E8E84-426E-40dd-AFC4-6F175D3DCCD1}">
-                <a14:hiddenFill xmlns:a14="http://schemas.microsoft.com/office/drawing/2010/main">
+                <a14:hiddenFill xmlns:a14="http://schemas.microsoft.com/office/drawing/2010/main" xmlns="">
                   <a:solidFill>
                     <a:srgbClr val="FFFFFF"/>
                   </a:solidFill>
@@ -20002,13 +20091,13 @@
   <p:clrMapOvr>
     <a:masterClrMapping/>
   </p:clrMapOvr>
-  <p:transition xmlns:p14="http://schemas.microsoft.com/office/powerpoint/2010/main" spd="med">
+  <p:transition spd="med">
     <p:fade/>
   </p:transition>
   <p:timing>
     <p:tnLst>
       <p:par>
-        <p:cTn xmlns:p14="http://schemas.microsoft.com/office/powerpoint/2010/main" id="1" dur="indefinite" restart="never" nodeType="tmRoot"/>
+        <p:cTn id="1" dur="indefinite" restart="never" nodeType="tmRoot"/>
       </p:par>
     </p:tnLst>
   </p:timing>
@@ -20119,13 +20208,13 @@
   <p:clrMapOvr>
     <a:masterClrMapping/>
   </p:clrMapOvr>
-  <p:transition xmlns:p14="http://schemas.microsoft.com/office/powerpoint/2010/main" spd="med">
+  <p:transition spd="med">
     <p:fade/>
   </p:transition>
   <p:timing>
     <p:tnLst>
       <p:par>
-        <p:cTn xmlns:p14="http://schemas.microsoft.com/office/powerpoint/2010/main" id="1" dur="indefinite" restart="never" nodeType="tmRoot"/>
+        <p:cTn id="1" dur="indefinite" restart="never" nodeType="tmRoot"/>
       </p:par>
     </p:tnLst>
   </p:timing>
@@ -20258,13 +20347,13 @@
   <p:clrMapOvr>
     <a:masterClrMapping/>
   </p:clrMapOvr>
-  <p:transition xmlns:p14="http://schemas.microsoft.com/office/powerpoint/2010/main" spd="med">
+  <p:transition spd="med">
     <p:fade/>
   </p:transition>
   <p:timing>
     <p:tnLst>
       <p:par>
-        <p:cTn xmlns:p14="http://schemas.microsoft.com/office/powerpoint/2010/main" id="1" dur="indefinite" restart="never" nodeType="tmRoot"/>
+        <p:cTn id="1" dur="indefinite" restart="never" nodeType="tmRoot"/>
       </p:par>
     </p:tnLst>
   </p:timing>
@@ -20431,13 +20520,13 @@
   <p:clrMapOvr>
     <a:masterClrMapping/>
   </p:clrMapOvr>
-  <p:transition xmlns:p14="http://schemas.microsoft.com/office/powerpoint/2010/main" spd="med">
+  <p:transition spd="med">
     <p:fade/>
   </p:transition>
   <p:timing>
     <p:tnLst>
       <p:par>
-        <p:cTn xmlns:p14="http://schemas.microsoft.com/office/powerpoint/2010/main" id="1" dur="indefinite" restart="never" nodeType="tmRoot"/>
+        <p:cTn id="1" dur="indefinite" restart="never" nodeType="tmRoot"/>
       </p:par>
     </p:tnLst>
   </p:timing>
@@ -20568,7 +20657,7 @@
         </p:nvSpPr>
         <p:spPr bwMode="white">
           <a:xfrm>
-            <a:off x="4044155" y="4845610"/>
+            <a:off x="4044155" y="4912516"/>
             <a:ext cx="8155156" cy="3141292"/>
           </a:xfrm>
           <a:prstGeom prst="rect">
@@ -20955,13 +21044,13 @@
   <p:clrMapOvr>
     <a:masterClrMapping/>
   </p:clrMapOvr>
-  <p:transition xmlns:p14="http://schemas.microsoft.com/office/powerpoint/2010/main" spd="med">
+  <p:transition spd="med">
     <p:fade/>
   </p:transition>
   <p:timing>
     <p:tnLst>
       <p:par>
-        <p:cTn xmlns:p14="http://schemas.microsoft.com/office/powerpoint/2010/main" id="1" dur="indefinite" restart="never" nodeType="tmRoot"/>
+        <p:cTn id="1" dur="indefinite" restart="never" nodeType="tmRoot"/>
       </p:par>
     </p:tnLst>
   </p:timing>
@@ -21344,7 +21433,7 @@
   <a:extraClrSchemeLst/>
   <a:extLst>
     <a:ext uri="{05A4C25C-085E-4340-85A3-A5531E510DB2}">
-      <thm15:themeFamily xmlns="" xmlns:thm15="http://schemas.microsoft.com/office/thememl/2012/main" name="Chef-TemplateComps_v09-16x9-Light.potx" id="{078CEFDB-FA7A-4E36-9964-13EF367585CB}" vid="{8B87B0F3-7308-43D5-8388-E1B49EA02652}"/>
+      <thm15:themeFamily xmlns:thm15="http://schemas.microsoft.com/office/thememl/2012/main" name="Chef-TemplateComps_v09-16x9-Light.potx" id="{078CEFDB-FA7A-4E36-9964-13EF367585CB}" vid="{8B87B0F3-7308-43D5-8388-E1B49EA02652}"/>
     </a:ext>
   </a:extLst>
 </a:theme>
@@ -21726,7 +21815,7 @@
   <a:extraClrSchemeLst/>
   <a:extLst>
     <a:ext uri="{05A4C25C-085E-4340-85A3-A5531E510DB2}">
-      <thm15:themeFamily xmlns="" xmlns:thm15="http://schemas.microsoft.com/office/thememl/2012/main" name="Chef-TemplateComps_v09-16x9-Light.potx" id="{078CEFDB-FA7A-4E36-9964-13EF367585CB}" vid="{8B87B0F3-7308-43D5-8388-E1B49EA02652}"/>
+      <thm15:themeFamily xmlns:thm15="http://schemas.microsoft.com/office/thememl/2012/main" name="Chef-TemplateComps_v09-16x9-Light.potx" id="{078CEFDB-FA7A-4E36-9964-13EF367585CB}" vid="{8B87B0F3-7308-43D5-8388-E1B49EA02652}"/>
     </a:ext>
   </a:extLst>
 </a:theme>
@@ -22299,6 +22388,27 @@
 </file>
 
 <file path=customXml/item1.xml><?xml version="1.0" encoding="utf-8"?>
+<p:properties xmlns:p="http://schemas.microsoft.com/office/2006/metadata/properties" xmlns:xsi="http://www.w3.org/2001/XMLSchema-instance" xmlns:pc="http://schemas.microsoft.com/office/infopath/2007/PartnerControls">
+  <documentManagement>
+    <_dlc_DocId xmlns="7bb5d761-a2ea-4873-95f7-7a6658fb3ef0">M4CWTKMW727E-592-73</_dlc_DocId>
+    <_dlc_DocIdUrl xmlns="7bb5d761-a2ea-4873-95f7-7a6658fb3ef0">
+      <Url>https://kms.vci.local/marketing/team/_layouts/DocIdRedir.aspx?ID=M4CWTKMW727E-592-73</Url>
+      <Description>M4CWTKMW727E-592-73</Description>
+    </_dlc_DocIdUrl>
+  </documentManagement>
+</p:properties>
+</file>
+
+<file path=customXml/item2.xml><?xml version="1.0" encoding="utf-8"?>
+<?mso-contentType ?>
+<FormTemplates xmlns="http://schemas.microsoft.com/sharepoint/v3/contenttype/forms">
+  <Display>DocumentLibraryForm</Display>
+  <Edit>DocumentLibraryForm</Edit>
+  <New>DocumentLibraryForm</New>
+</FormTemplates>
+</file>
+
+<file path=customXml/item3.xml><?xml version="1.0" encoding="utf-8"?>
 <?mso-contentType ?>
 <spe:Receivers xmlns:spe="http://schemas.microsoft.com/sharepoint/events">
   <Receiver>
@@ -22342,27 +22452,6 @@
     <Filter/>
   </Receiver>
 </spe:Receivers>
-</file>
-
-<file path=customXml/item2.xml><?xml version="1.0" encoding="utf-8"?>
-<?mso-contentType ?>
-<FormTemplates xmlns="http://schemas.microsoft.com/sharepoint/v3/contenttype/forms">
-  <Display>DocumentLibraryForm</Display>
-  <Edit>DocumentLibraryForm</Edit>
-  <New>DocumentLibraryForm</New>
-</FormTemplates>
-</file>
-
-<file path=customXml/item3.xml><?xml version="1.0" encoding="utf-8"?>
-<p:properties xmlns:p="http://schemas.microsoft.com/office/2006/metadata/properties" xmlns:xsi="http://www.w3.org/2001/XMLSchema-instance" xmlns:pc="http://schemas.microsoft.com/office/infopath/2007/PartnerControls">
-  <documentManagement>
-    <_dlc_DocId xmlns="7bb5d761-a2ea-4873-95f7-7a6658fb3ef0">M4CWTKMW727E-592-73</_dlc_DocId>
-    <_dlc_DocIdUrl xmlns="7bb5d761-a2ea-4873-95f7-7a6658fb3ef0">
-      <Url>https://kms.vci.local/marketing/team/_layouts/DocIdRedir.aspx?ID=M4CWTKMW727E-592-73</Url>
-      <Description>M4CWTKMW727E-592-73</Description>
-    </_dlc_DocIdUrl>
-  </documentManagement>
-</p:properties>
 </file>
 
 <file path=customXml/item4.xml><?xml version="1.0" encoding="utf-8"?>
@@ -22511,9 +22600,17 @@
 </file>
 
 <file path=customXml/itemProps1.xml><?xml version="1.0" encoding="utf-8"?>
-<ds:datastoreItem xmlns:ds="http://schemas.openxmlformats.org/officeDocument/2006/customXml" ds:itemID="{B13EBC30-FE27-4C6A-B723-23FC2188F7DC}">
+<ds:datastoreItem xmlns:ds="http://schemas.openxmlformats.org/officeDocument/2006/customXml" ds:itemID="{6921749B-AEB7-461B-845F-603CABD25259}">
   <ds:schemaRefs>
-    <ds:schemaRef ds:uri="http://schemas.microsoft.com/sharepoint/events"/>
+    <ds:schemaRef ds:uri="http://purl.org/dc/elements/1.1/"/>
+    <ds:schemaRef ds:uri="http://schemas.microsoft.com/office/2006/metadata/properties"/>
+    <ds:schemaRef ds:uri="7bb5d761-a2ea-4873-95f7-7a6658fb3ef0"/>
+    <ds:schemaRef ds:uri="http://purl.org/dc/terms/"/>
+    <ds:schemaRef ds:uri="http://schemas.openxmlformats.org/package/2006/metadata/core-properties"/>
+    <ds:schemaRef ds:uri="http://schemas.microsoft.com/office/2006/documentManagement/types"/>
+    <ds:schemaRef ds:uri="http://schemas.microsoft.com/office/infopath/2007/PartnerControls"/>
+    <ds:schemaRef ds:uri="http://www.w3.org/XML/1998/namespace"/>
+    <ds:schemaRef ds:uri="http://purl.org/dc/dcmitype/"/>
   </ds:schemaRefs>
 </ds:datastoreItem>
 </file>
@@ -22527,17 +22624,9 @@
 </file>
 
 <file path=customXml/itemProps3.xml><?xml version="1.0" encoding="utf-8"?>
-<ds:datastoreItem xmlns:ds="http://schemas.openxmlformats.org/officeDocument/2006/customXml" ds:itemID="{6921749B-AEB7-461B-845F-603CABD25259}">
+<ds:datastoreItem xmlns:ds="http://schemas.openxmlformats.org/officeDocument/2006/customXml" ds:itemID="{B13EBC30-FE27-4C6A-B723-23FC2188F7DC}">
   <ds:schemaRefs>
-    <ds:schemaRef ds:uri="http://purl.org/dc/elements/1.1/"/>
-    <ds:schemaRef ds:uri="http://schemas.microsoft.com/office/2006/metadata/properties"/>
-    <ds:schemaRef ds:uri="7bb5d761-a2ea-4873-95f7-7a6658fb3ef0"/>
-    <ds:schemaRef ds:uri="http://purl.org/dc/terms/"/>
-    <ds:schemaRef ds:uri="http://schemas.openxmlformats.org/package/2006/metadata/core-properties"/>
-    <ds:schemaRef ds:uri="http://schemas.microsoft.com/office/2006/documentManagement/types"/>
-    <ds:schemaRef ds:uri="http://schemas.microsoft.com/office/infopath/2007/PartnerControls"/>
-    <ds:schemaRef ds:uri="http://www.w3.org/XML/1998/namespace"/>
-    <ds:schemaRef ds:uri="http://purl.org/dc/dcmitype/"/>
+    <ds:schemaRef ds:uri="http://schemas.microsoft.com/sharepoint/events"/>
   </ds:schemaRefs>
 </ds:datastoreItem>
 </file>

</xml_diff>

<commit_message>
made  consistent throughout course
</commit_message>
<xml_diff>
--- a/01-Intro.pptx
+++ b/01-Intro.pptx
@@ -291,7 +291,7 @@
               <a:pPr>
                 <a:defRPr/>
               </a:pPr>
-              <a:t>2016-01-21</a:t>
+              <a:t>2016-01-27</a:t>
             </a:fld>
             <a:endParaRPr lang="en-US" dirty="0"/>
           </a:p>
@@ -474,7 +474,7 @@
               <a:pPr>
                 <a:defRPr/>
               </a:pPr>
-              <a:t>2016-01-21</a:t>
+              <a:t>2016-01-27</a:t>
             </a:fld>
             <a:endParaRPr lang="en-US" dirty="0"/>
           </a:p>
@@ -1078,7 +1078,31 @@
                 <a:ea typeface="ＭＳ Ｐゴシック" charset="0"/>
                 <a:cs typeface="Arial" panose="020B0604020202020204" pitchFamily="34" charset="0"/>
               </a:rPr>
-              <a:t> into the AMI images.</a:t>
+              <a:t> </a:t>
+            </a:r>
+            <a:r>
+              <a:rPr lang="en-US" sz="1200" b="0" i="0" kern="1200" dirty="0" smtClean="0">
+                <a:solidFill>
+                  <a:schemeClr val="tx1"/>
+                </a:solidFill>
+                <a:effectLst/>
+                <a:latin typeface="Arial" panose="020B0604020202020204" pitchFamily="34" charset="0"/>
+                <a:ea typeface="ＭＳ Ｐゴシック" charset="0"/>
+                <a:cs typeface="Arial" panose="020B0604020202020204" pitchFamily="34" charset="0"/>
+              </a:rPr>
+              <a:t>in to </a:t>
+            </a:r>
+            <a:r>
+              <a:rPr lang="en-US" sz="1200" b="0" i="0" kern="1200" dirty="0" smtClean="0">
+                <a:solidFill>
+                  <a:schemeClr val="tx1"/>
+                </a:solidFill>
+                <a:effectLst/>
+                <a:latin typeface="Arial" panose="020B0604020202020204" pitchFamily="34" charset="0"/>
+                <a:ea typeface="ＭＳ Ｐゴシック" charset="0"/>
+                <a:cs typeface="Arial" panose="020B0604020202020204" pitchFamily="34" charset="0"/>
+              </a:rPr>
+              <a:t>the AMI images.</a:t>
             </a:r>
           </a:p>
           <a:p>
@@ -2501,7 +2525,15 @@
             </a:r>
             <a:r>
               <a:rPr lang="en-US" baseline="0" dirty="0" smtClean="0"/>
-              <a:t> explanation. You don't need to log into these machines at this time.</a:t>
+              <a:t> explanation. You don't need to log </a:t>
+            </a:r>
+            <a:r>
+              <a:rPr lang="en-US" baseline="0" dirty="0" smtClean="0"/>
+              <a:t>in to </a:t>
+            </a:r>
+            <a:r>
+              <a:rPr lang="en-US" baseline="0" dirty="0" smtClean="0"/>
+              <a:t>these machines at this time.</a:t>
             </a:r>
             <a:endParaRPr lang="en-US" dirty="0" smtClean="0"/>
           </a:p>
@@ -2697,7 +2729,15 @@
             </a:r>
             <a:r>
               <a:rPr lang="en-US" baseline="0" dirty="0" smtClean="0"/>
-              <a:t> explanation. You don't need to log into these machines at this time.</a:t>
+              <a:t> explanation. You don't need to log </a:t>
+            </a:r>
+            <a:r>
+              <a:rPr lang="en-US" baseline="0" dirty="0" smtClean="0"/>
+              <a:t>in to </a:t>
+            </a:r>
+            <a:r>
+              <a:rPr lang="en-US" baseline="0" dirty="0" smtClean="0"/>
+              <a:t>these machines at this time.</a:t>
             </a:r>
             <a:endParaRPr lang="en-US" dirty="0" smtClean="0"/>
           </a:p>
@@ -3601,7 +3641,7 @@
         <p:spPr/>
         <p:txBody>
           <a:bodyPr>
-            <a:normAutofit lnSpcReduction="10000"/>
+            <a:normAutofit fontScale="92500" lnSpcReduction="10000"/>
           </a:bodyPr>
           <a:lstStyle/>
           <a:p>
@@ -3648,19 +3688,7 @@
                 <a:ea typeface="ＭＳ Ｐゴシック" charset="0"/>
                 <a:cs typeface="Arial" panose="020B0604020202020204" pitchFamily="34" charset="0"/>
               </a:rPr>
-              <a:t> </a:t>
-            </a:r>
-            <a:r>
-              <a:rPr lang="en-US" sz="1200" b="0" i="0" kern="1200" dirty="0" smtClean="0">
-                <a:solidFill>
-                  <a:schemeClr val="tx1"/>
-                </a:solidFill>
-                <a:effectLst/>
-                <a:latin typeface="Arial" panose="020B0604020202020204" pitchFamily="34" charset="0"/>
-                <a:ea typeface="ＭＳ Ｐゴシック" charset="0"/>
-                <a:cs typeface="Arial" panose="020B0604020202020204" pitchFamily="34" charset="0"/>
-              </a:rPr>
-              <a:t>is an open-source run-time framework and rule language used to specify compliance, security, and policy requirements for testing any node in your infrastructure. The </a:t>
+              <a:t> is an open-source run-time framework and rule language used to specify compliance, security, and policy requirements for testing any node in your infrastructure. The </a:t>
             </a:r>
             <a:r>
               <a:rPr lang="en-US" sz="1200" b="0" i="0" kern="1200" dirty="0" err="1" smtClean="0">
@@ -3865,19 +3893,7 @@
                 <a:ea typeface="ＭＳ Ｐゴシック" charset="0"/>
                 <a:cs typeface="Arial" panose="020B0604020202020204" pitchFamily="34" charset="0"/>
               </a:rPr>
-              <a:t> audit resource framework is fully compatible with Chef Compliance</a:t>
-            </a:r>
-            <a:r>
-              <a:rPr lang="en-US" sz="1200" b="0" i="0" kern="1200" dirty="0" smtClean="0">
-                <a:solidFill>
-                  <a:schemeClr val="tx1"/>
-                </a:solidFill>
-                <a:effectLst/>
-                <a:latin typeface="Arial" panose="020B0604020202020204" pitchFamily="34" charset="0"/>
-                <a:ea typeface="ＭＳ Ｐゴシック" charset="0"/>
-                <a:cs typeface="Arial" panose="020B0604020202020204" pitchFamily="34" charset="0"/>
-              </a:rPr>
-              <a:t>.</a:t>
+              <a:t> audit resource framework is fully compatible with Chef Compliance.</a:t>
             </a:r>
           </a:p>
           <a:p>
@@ -3949,7 +3965,6 @@
               <a:rPr lang="en-US" dirty="0" smtClean="0"/>
               <a:t> may be confused by the reference.</a:t>
             </a:r>
-            <a:endParaRPr lang="en-US" dirty="0" smtClean="0"/>
           </a:p>
           <a:p>
             <a:endParaRPr lang="en-US" sz="1200" b="0" i="0" kern="1200" dirty="0" smtClean="0">
@@ -4908,14 +4923,14 @@
           </a:ln>
           <a:extLst>
             <a:ext uri="{909E8E84-426E-40dd-AFC4-6F175D3DCCD1}">
-              <a14:hiddenFill xmlns:a14="http://schemas.microsoft.com/office/drawing/2010/main" xmlns="">
+              <a14:hiddenFill xmlns="" xmlns:a14="http://schemas.microsoft.com/office/drawing/2010/main">
                 <a:solidFill>
                   <a:srgbClr val="FFFFFF"/>
                 </a:solidFill>
               </a14:hiddenFill>
             </a:ext>
             <a:ext uri="{91240B29-F687-4f45-9708-019B960494DF}">
-              <a14:hiddenLine xmlns:a14="http://schemas.microsoft.com/office/drawing/2010/main" xmlns="" w="9525">
+              <a14:hiddenLine xmlns="" xmlns:a14="http://schemas.microsoft.com/office/drawing/2010/main" w="9525">
                 <a:solidFill>
                   <a:srgbClr val="000000"/>
                 </a:solidFill>
@@ -5063,14 +5078,14 @@
           </a:ln>
           <a:extLst>
             <a:ext uri="{909E8E84-426E-40dd-AFC4-6F175D3DCCD1}">
-              <a14:hiddenFill xmlns:a14="http://schemas.microsoft.com/office/drawing/2010/main" xmlns="">
+              <a14:hiddenFill xmlns="" xmlns:a14="http://schemas.microsoft.com/office/drawing/2010/main">
                 <a:solidFill>
                   <a:srgbClr val="FFFFFF"/>
                 </a:solidFill>
               </a14:hiddenFill>
             </a:ext>
             <a:ext uri="{91240B29-F687-4f45-9708-019B960494DF}">
-              <a14:hiddenLine xmlns:a14="http://schemas.microsoft.com/office/drawing/2010/main" xmlns="" w="9525">
+              <a14:hiddenLine xmlns="" xmlns:a14="http://schemas.microsoft.com/office/drawing/2010/main" w="9525">
                 <a:solidFill>
                   <a:srgbClr val="000000"/>
                 </a:solidFill>
@@ -5561,14 +5576,14 @@
           </a:ln>
           <a:extLst>
             <a:ext uri="{909E8E84-426E-40dd-AFC4-6F175D3DCCD1}">
-              <a14:hiddenFill xmlns:a14="http://schemas.microsoft.com/office/drawing/2010/main" xmlns="">
+              <a14:hiddenFill xmlns="" xmlns:a14="http://schemas.microsoft.com/office/drawing/2010/main">
                 <a:solidFill>
                   <a:srgbClr val="FFFFFF"/>
                 </a:solidFill>
               </a14:hiddenFill>
             </a:ext>
             <a:ext uri="{91240B29-F687-4f45-9708-019B960494DF}">
-              <a14:hiddenLine xmlns:a14="http://schemas.microsoft.com/office/drawing/2010/main" xmlns="" w="9525">
+              <a14:hiddenLine xmlns="" xmlns:a14="http://schemas.microsoft.com/office/drawing/2010/main" w="9525">
                 <a:solidFill>
                   <a:srgbClr val="000000"/>
                 </a:solidFill>
@@ -8377,14 +8392,14 @@
           </a:ln>
           <a:extLst>
             <a:ext uri="{909E8E84-426E-40dd-AFC4-6F175D3DCCD1}">
-              <a14:hiddenFill xmlns:a14="http://schemas.microsoft.com/office/drawing/2010/main" xmlns="">
+              <a14:hiddenFill xmlns="" xmlns:a14="http://schemas.microsoft.com/office/drawing/2010/main">
                 <a:solidFill>
                   <a:srgbClr val="FFFFFF"/>
                 </a:solidFill>
               </a14:hiddenFill>
             </a:ext>
             <a:ext uri="{91240B29-F687-4f45-9708-019B960494DF}">
-              <a14:hiddenLine xmlns:a14="http://schemas.microsoft.com/office/drawing/2010/main" xmlns="" w="9525">
+              <a14:hiddenLine xmlns="" xmlns:a14="http://schemas.microsoft.com/office/drawing/2010/main" w="9525">
                 <a:solidFill>
                   <a:srgbClr val="000000"/>
                 </a:solidFill>
@@ -9741,14 +9756,14 @@
           </a:ln>
           <a:extLst>
             <a:ext uri="{909E8E84-426E-40dd-AFC4-6F175D3DCCD1}">
-              <a14:hiddenFill xmlns:a14="http://schemas.microsoft.com/office/drawing/2010/main" xmlns="">
+              <a14:hiddenFill xmlns="" xmlns:a14="http://schemas.microsoft.com/office/drawing/2010/main">
                 <a:solidFill>
                   <a:srgbClr val="FFFFFF"/>
                 </a:solidFill>
               </a14:hiddenFill>
             </a:ext>
             <a:ext uri="{91240B29-F687-4f45-9708-019B960494DF}">
-              <a14:hiddenLine xmlns:a14="http://schemas.microsoft.com/office/drawing/2010/main" xmlns="" w="9525">
+              <a14:hiddenLine xmlns="" xmlns:a14="http://schemas.microsoft.com/office/drawing/2010/main" w="9525">
                 <a:solidFill>
                   <a:srgbClr val="000000"/>
                 </a:solidFill>
@@ -10306,14 +10321,14 @@
           </a:ln>
           <a:extLst>
             <a:ext uri="{909E8E84-426E-40dd-AFC4-6F175D3DCCD1}">
-              <a14:hiddenFill xmlns:a14="http://schemas.microsoft.com/office/drawing/2010/main" xmlns="">
+              <a14:hiddenFill xmlns="" xmlns:a14="http://schemas.microsoft.com/office/drawing/2010/main">
                 <a:solidFill>
                   <a:srgbClr val="FFFFFF"/>
                 </a:solidFill>
               </a14:hiddenFill>
             </a:ext>
             <a:ext uri="{91240B29-F687-4f45-9708-019B960494DF}">
-              <a14:hiddenLine xmlns:a14="http://schemas.microsoft.com/office/drawing/2010/main" xmlns="" w="9525">
+              <a14:hiddenLine xmlns="" xmlns:a14="http://schemas.microsoft.com/office/drawing/2010/main" w="9525">
                 <a:solidFill>
                   <a:srgbClr val="000000"/>
                 </a:solidFill>
@@ -10880,14 +10895,14 @@
           </a:ln>
           <a:extLst>
             <a:ext uri="{909E8E84-426E-40dd-AFC4-6F175D3DCCD1}">
-              <a14:hiddenFill xmlns:a14="http://schemas.microsoft.com/office/drawing/2010/main" xmlns="">
+              <a14:hiddenFill xmlns="" xmlns:a14="http://schemas.microsoft.com/office/drawing/2010/main">
                 <a:solidFill>
                   <a:srgbClr val="FFFFFF"/>
                 </a:solidFill>
               </a14:hiddenFill>
             </a:ext>
             <a:ext uri="{91240B29-F687-4f45-9708-019B960494DF}">
-              <a14:hiddenLine xmlns:a14="http://schemas.microsoft.com/office/drawing/2010/main" xmlns="" w="9525">
+              <a14:hiddenLine xmlns="" xmlns:a14="http://schemas.microsoft.com/office/drawing/2010/main" w="9525">
                 <a:solidFill>
                   <a:srgbClr val="000000"/>
                 </a:solidFill>
@@ -11827,14 +11842,14 @@
           </a:ln>
           <a:extLst>
             <a:ext uri="{909E8E84-426E-40dd-AFC4-6F175D3DCCD1}">
-              <a14:hiddenFill xmlns:a14="http://schemas.microsoft.com/office/drawing/2010/main" xmlns="">
+              <a14:hiddenFill xmlns="" xmlns:a14="http://schemas.microsoft.com/office/drawing/2010/main">
                 <a:solidFill>
                   <a:srgbClr val="FFFFFF"/>
                 </a:solidFill>
               </a14:hiddenFill>
             </a:ext>
             <a:ext uri="{91240B29-F687-4f45-9708-019B960494DF}">
-              <a14:hiddenLine xmlns:a14="http://schemas.microsoft.com/office/drawing/2010/main" xmlns="" w="9525">
+              <a14:hiddenLine xmlns="" xmlns:a14="http://schemas.microsoft.com/office/drawing/2010/main" w="9525">
                 <a:solidFill>
                   <a:srgbClr val="000000"/>
                 </a:solidFill>
@@ -12588,14 +12603,14 @@
           </a:ln>
           <a:extLst>
             <a:ext uri="{909E8E84-426E-40dd-AFC4-6F175D3DCCD1}">
-              <a14:hiddenFill xmlns:a14="http://schemas.microsoft.com/office/drawing/2010/main" xmlns="">
+              <a14:hiddenFill xmlns="" xmlns:a14="http://schemas.microsoft.com/office/drawing/2010/main">
                 <a:solidFill>
                   <a:srgbClr val="FFFFFF"/>
                 </a:solidFill>
               </a14:hiddenFill>
             </a:ext>
             <a:ext uri="{91240B29-F687-4f45-9708-019B960494DF}">
-              <a14:hiddenLine xmlns:a14="http://schemas.microsoft.com/office/drawing/2010/main" xmlns="" w="9525">
+              <a14:hiddenLine xmlns="" xmlns:a14="http://schemas.microsoft.com/office/drawing/2010/main" w="9525">
                 <a:solidFill>
                   <a:srgbClr val="000000"/>
                 </a:solidFill>
@@ -16467,7 +16482,15 @@
             </a:r>
             <a:r>
               <a:rPr lang="en-US" dirty="0" smtClean="0"/>
-              <a:t>ou will also log into your Windows and Linux nodes in order to write remediation and run chef-client in local mode.</a:t>
+              <a:t>ou will also log </a:t>
+            </a:r>
+            <a:r>
+              <a:rPr lang="en-US" dirty="0" smtClean="0"/>
+              <a:t>in to </a:t>
+            </a:r>
+            <a:r>
+              <a:rPr lang="en-US" dirty="0" smtClean="0"/>
+              <a:t>your Windows and Linux nodes in order to write remediation and run chef-client in local mode.</a:t>
             </a:r>
           </a:p>
           <a:p>
@@ -17498,7 +17521,15 @@
           <a:p>
             <a:r>
               <a:rPr lang="en-US" sz="4800" dirty="0" smtClean="0"/>
-              <a:t>Logging into the Compliance Server and Linux Node</a:t>
+              <a:t>Logging </a:t>
+            </a:r>
+            <a:r>
+              <a:rPr lang="en-US" sz="4800" dirty="0" smtClean="0"/>
+              <a:t>in to </a:t>
+            </a:r>
+            <a:r>
+              <a:rPr lang="en-US" sz="4800" dirty="0" smtClean="0"/>
+              <a:t>the Compliance Server and Linux Node</a:t>
             </a:r>
             <a:endParaRPr lang="en-US" sz="4800" dirty="0"/>
           </a:p>
@@ -17619,7 +17650,19 @@
           <a:p>
             <a:r>
               <a:rPr lang="en-US" dirty="0" smtClean="0"/>
-              <a:t>Logging Into the Remote Windows Node</a:t>
+              <a:t>Logging </a:t>
+            </a:r>
+            <a:r>
+              <a:rPr lang="en-US" dirty="0"/>
+              <a:t>i</a:t>
+            </a:r>
+            <a:r>
+              <a:rPr lang="en-US" dirty="0" smtClean="0"/>
+              <a:t>n to </a:t>
+            </a:r>
+            <a:r>
+              <a:rPr lang="en-US" dirty="0" smtClean="0"/>
+              <a:t>the Remote Windows Node</a:t>
             </a:r>
             <a:endParaRPr lang="en-US" dirty="0"/>
           </a:p>
@@ -17807,35 +17850,19 @@
             </a:r>
             <a:r>
               <a:rPr lang="en-US" sz="3733" dirty="0" smtClean="0"/>
-              <a:t> </a:t>
+              <a:t> or </a:t>
+            </a:r>
+            <a:r>
+              <a:rPr lang="en-US" sz="3733" b="1" dirty="0" smtClean="0">
+                <a:solidFill>
+                  <a:schemeClr val="accent1"/>
+                </a:solidFill>
+              </a:rPr>
+              <a:t>Group Lab</a:t>
             </a:r>
             <a:r>
               <a:rPr lang="en-US" sz="3733" dirty="0" smtClean="0"/>
-              <a:t>or </a:t>
-            </a:r>
-            <a:r>
-              <a:rPr lang="en-US" sz="3733" b="1" dirty="0" smtClean="0">
-                <a:solidFill>
-                  <a:schemeClr val="accent1"/>
-                </a:solidFill>
-              </a:rPr>
-              <a:t>Group </a:t>
-            </a:r>
-            <a:r>
-              <a:rPr lang="en-US" sz="3733" b="1" dirty="0" smtClean="0">
-                <a:solidFill>
-                  <a:schemeClr val="accent1"/>
-                </a:solidFill>
-              </a:rPr>
-              <a:t>Lab</a:t>
-            </a:r>
-            <a:r>
-              <a:rPr lang="en-US" sz="3733" dirty="0" smtClean="0"/>
-              <a:t>: </a:t>
-            </a:r>
-            <a:r>
-              <a:rPr lang="en-US" sz="3733" dirty="0" smtClean="0"/>
-              <a:t>All participants and the instructor do this task together with the instructor often leading the way</a:t>
+              <a:t>: All participants and the instructor do this task together with the instructor often leading the way</a:t>
             </a:r>
             <a:r>
               <a:rPr lang="en-US" sz="3733" dirty="0"/>
@@ -19266,7 +19293,7 @@
             <a:noFill/>
             <a:extLst>
               <a:ext uri="{909E8E84-426E-40dd-AFC4-6F175D3DCCD1}">
-                <a14:hiddenFill xmlns:a14="http://schemas.microsoft.com/office/drawing/2010/main" xmlns="">
+                <a14:hiddenFill xmlns="" xmlns:a14="http://schemas.microsoft.com/office/drawing/2010/main">
                   <a:solidFill>
                     <a:srgbClr val="FFFFFF"/>
                   </a:solidFill>
@@ -19307,7 +19334,7 @@
             <a:noFill/>
             <a:extLst>
               <a:ext uri="{909E8E84-426E-40dd-AFC4-6F175D3DCCD1}">
-                <a14:hiddenFill xmlns:a14="http://schemas.microsoft.com/office/drawing/2010/main" xmlns="">
+                <a14:hiddenFill xmlns="" xmlns:a14="http://schemas.microsoft.com/office/drawing/2010/main">
                   <a:solidFill>
                     <a:srgbClr val="FFFFFF"/>
                   </a:solidFill>
@@ -19348,7 +19375,7 @@
             <a:noFill/>
             <a:extLst>
               <a:ext uri="{909E8E84-426E-40dd-AFC4-6F175D3DCCD1}">
-                <a14:hiddenFill xmlns:a14="http://schemas.microsoft.com/office/drawing/2010/main" xmlns="">
+                <a14:hiddenFill xmlns="" xmlns:a14="http://schemas.microsoft.com/office/drawing/2010/main">
                   <a:solidFill>
                     <a:srgbClr val="FFFFFF"/>
                   </a:solidFill>
@@ -19404,7 +19431,7 @@
             <a:noFill/>
             <a:extLst>
               <a:ext uri="{909E8E84-426E-40dd-AFC4-6F175D3DCCD1}">
-                <a14:hiddenFill xmlns:a14="http://schemas.microsoft.com/office/drawing/2010/main" xmlns="">
+                <a14:hiddenFill xmlns="" xmlns:a14="http://schemas.microsoft.com/office/drawing/2010/main">
                   <a:solidFill>
                     <a:srgbClr val="FFFFFF"/>
                   </a:solidFill>
@@ -19445,7 +19472,7 @@
             <a:noFill/>
             <a:extLst>
               <a:ext uri="{909E8E84-426E-40dd-AFC4-6F175D3DCCD1}">
-                <a14:hiddenFill xmlns:a14="http://schemas.microsoft.com/office/drawing/2010/main" xmlns="">
+                <a14:hiddenFill xmlns="" xmlns:a14="http://schemas.microsoft.com/office/drawing/2010/main">
                   <a:solidFill>
                     <a:srgbClr val="FFFFFF"/>
                   </a:solidFill>
@@ -19486,7 +19513,7 @@
             <a:noFill/>
             <a:extLst>
               <a:ext uri="{909E8E84-426E-40dd-AFC4-6F175D3DCCD1}">
-                <a14:hiddenFill xmlns:a14="http://schemas.microsoft.com/office/drawing/2010/main" xmlns="">
+                <a14:hiddenFill xmlns="" xmlns:a14="http://schemas.microsoft.com/office/drawing/2010/main">
                   <a:solidFill>
                     <a:srgbClr val="FFFFFF"/>
                   </a:solidFill>
@@ -19542,7 +19569,7 @@
             <a:noFill/>
             <a:extLst>
               <a:ext uri="{909E8E84-426E-40dd-AFC4-6F175D3DCCD1}">
-                <a14:hiddenFill xmlns:a14="http://schemas.microsoft.com/office/drawing/2010/main" xmlns="">
+                <a14:hiddenFill xmlns="" xmlns:a14="http://schemas.microsoft.com/office/drawing/2010/main">
                   <a:solidFill>
                     <a:srgbClr val="FFFFFF"/>
                   </a:solidFill>
@@ -19583,7 +19610,7 @@
             <a:noFill/>
             <a:extLst>
               <a:ext uri="{909E8E84-426E-40dd-AFC4-6F175D3DCCD1}">
-                <a14:hiddenFill xmlns:a14="http://schemas.microsoft.com/office/drawing/2010/main" xmlns="">
+                <a14:hiddenFill xmlns="" xmlns:a14="http://schemas.microsoft.com/office/drawing/2010/main">
                   <a:solidFill>
                     <a:srgbClr val="FFFFFF"/>
                   </a:solidFill>
@@ -19624,7 +19651,7 @@
             <a:noFill/>
             <a:extLst>
               <a:ext uri="{909E8E84-426E-40dd-AFC4-6F175D3DCCD1}">
-                <a14:hiddenFill xmlns:a14="http://schemas.microsoft.com/office/drawing/2010/main" xmlns="">
+                <a14:hiddenFill xmlns="" xmlns:a14="http://schemas.microsoft.com/office/drawing/2010/main">
                   <a:solidFill>
                     <a:srgbClr val="FFFFFF"/>
                   </a:solidFill>
@@ -19851,7 +19878,7 @@
             <a:noFill/>
             <a:extLst>
               <a:ext uri="{909E8E84-426E-40dd-AFC4-6F175D3DCCD1}">
-                <a14:hiddenFill xmlns:a14="http://schemas.microsoft.com/office/drawing/2010/main" xmlns="">
+                <a14:hiddenFill xmlns="" xmlns:a14="http://schemas.microsoft.com/office/drawing/2010/main">
                   <a:solidFill>
                     <a:srgbClr val="FFFFFF"/>
                   </a:solidFill>
@@ -19892,7 +19919,7 @@
             <a:noFill/>
             <a:extLst>
               <a:ext uri="{909E8E84-426E-40dd-AFC4-6F175D3DCCD1}">
-                <a14:hiddenFill xmlns:a14="http://schemas.microsoft.com/office/drawing/2010/main" xmlns="">
+                <a14:hiddenFill xmlns="" xmlns:a14="http://schemas.microsoft.com/office/drawing/2010/main">
                   <a:solidFill>
                     <a:srgbClr val="FFFFFF"/>
                   </a:solidFill>
@@ -19933,7 +19960,7 @@
             <a:noFill/>
             <a:extLst>
               <a:ext uri="{909E8E84-426E-40dd-AFC4-6F175D3DCCD1}">
-                <a14:hiddenFill xmlns:a14="http://schemas.microsoft.com/office/drawing/2010/main" xmlns="">
+                <a14:hiddenFill xmlns="" xmlns:a14="http://schemas.microsoft.com/office/drawing/2010/main">
                   <a:solidFill>
                     <a:srgbClr val="FFFFFF"/>
                   </a:solidFill>
@@ -19989,7 +20016,7 @@
             <a:noFill/>
             <a:extLst>
               <a:ext uri="{909E8E84-426E-40dd-AFC4-6F175D3DCCD1}">
-                <a14:hiddenFill xmlns:a14="http://schemas.microsoft.com/office/drawing/2010/main" xmlns="">
+                <a14:hiddenFill xmlns="" xmlns:a14="http://schemas.microsoft.com/office/drawing/2010/main">
                   <a:solidFill>
                     <a:srgbClr val="FFFFFF"/>
                   </a:solidFill>
@@ -20030,7 +20057,7 @@
             <a:noFill/>
             <a:extLst>
               <a:ext uri="{909E8E84-426E-40dd-AFC4-6F175D3DCCD1}">
-                <a14:hiddenFill xmlns:a14="http://schemas.microsoft.com/office/drawing/2010/main" xmlns="">
+                <a14:hiddenFill xmlns="" xmlns:a14="http://schemas.microsoft.com/office/drawing/2010/main">
                   <a:solidFill>
                     <a:srgbClr val="FFFFFF"/>
                   </a:solidFill>
@@ -20071,7 +20098,7 @@
             <a:noFill/>
             <a:extLst>
               <a:ext uri="{909E8E84-426E-40dd-AFC4-6F175D3DCCD1}">
-                <a14:hiddenFill xmlns:a14="http://schemas.microsoft.com/office/drawing/2010/main" xmlns="">
+                <a14:hiddenFill xmlns="" xmlns:a14="http://schemas.microsoft.com/office/drawing/2010/main">
                   <a:solidFill>
                     <a:srgbClr val="FFFFFF"/>
                   </a:solidFill>
@@ -22388,6 +22415,15 @@
 </file>
 
 <file path=customXml/item1.xml><?xml version="1.0" encoding="utf-8"?>
+<?mso-contentType ?>
+<FormTemplates xmlns="http://schemas.microsoft.com/sharepoint/v3/contenttype/forms">
+  <Display>DocumentLibraryForm</Display>
+  <Edit>DocumentLibraryForm</Edit>
+  <New>DocumentLibraryForm</New>
+</FormTemplates>
+</file>
+
+<file path=customXml/item2.xml><?xml version="1.0" encoding="utf-8"?>
 <p:properties xmlns:p="http://schemas.microsoft.com/office/2006/metadata/properties" xmlns:xsi="http://www.w3.org/2001/XMLSchema-instance" xmlns:pc="http://schemas.microsoft.com/office/infopath/2007/PartnerControls">
   <documentManagement>
     <_dlc_DocId xmlns="7bb5d761-a2ea-4873-95f7-7a6658fb3ef0">M4CWTKMW727E-592-73</_dlc_DocId>
@@ -22399,62 +22435,7 @@
 </p:properties>
 </file>
 
-<file path=customXml/item2.xml><?xml version="1.0" encoding="utf-8"?>
-<?mso-contentType ?>
-<FormTemplates xmlns="http://schemas.microsoft.com/sharepoint/v3/contenttype/forms">
-  <Display>DocumentLibraryForm</Display>
-  <Edit>DocumentLibraryForm</Edit>
-  <New>DocumentLibraryForm</New>
-</FormTemplates>
-</file>
-
 <file path=customXml/item3.xml><?xml version="1.0" encoding="utf-8"?>
-<?mso-contentType ?>
-<spe:Receivers xmlns:spe="http://schemas.microsoft.com/sharepoint/events">
-  <Receiver>
-    <Name>Document ID Generator</Name>
-    <Synchronization>Synchronous</Synchronization>
-    <Type>10001</Type>
-    <SequenceNumber>1000</SequenceNumber>
-    <Assembly>Microsoft.Office.DocumentManagement, Version=14.0.0.0, Culture=neutral, PublicKeyToken=71e9bce111e9429c</Assembly>
-    <Class>Microsoft.Office.DocumentManagement.Internal.DocIdHandler</Class>
-    <Data/>
-    <Filter/>
-  </Receiver>
-  <Receiver>
-    <Name>Document ID Generator</Name>
-    <Synchronization>Synchronous</Synchronization>
-    <Type>10002</Type>
-    <SequenceNumber>1001</SequenceNumber>
-    <Assembly>Microsoft.Office.DocumentManagement, Version=14.0.0.0, Culture=neutral, PublicKeyToken=71e9bce111e9429c</Assembly>
-    <Class>Microsoft.Office.DocumentManagement.Internal.DocIdHandler</Class>
-    <Data/>
-    <Filter/>
-  </Receiver>
-  <Receiver>
-    <Name>Document ID Generator</Name>
-    <Synchronization>Synchronous</Synchronization>
-    <Type>10004</Type>
-    <SequenceNumber>1002</SequenceNumber>
-    <Assembly>Microsoft.Office.DocumentManagement, Version=14.0.0.0, Culture=neutral, PublicKeyToken=71e9bce111e9429c</Assembly>
-    <Class>Microsoft.Office.DocumentManagement.Internal.DocIdHandler</Class>
-    <Data/>
-    <Filter/>
-  </Receiver>
-  <Receiver>
-    <Name>Document ID Generator</Name>
-    <Synchronization>Synchronous</Synchronization>
-    <Type>10006</Type>
-    <SequenceNumber>1003</SequenceNumber>
-    <Assembly>Microsoft.Office.DocumentManagement, Version=14.0.0.0, Culture=neutral, PublicKeyToken=71e9bce111e9429c</Assembly>
-    <Class>Microsoft.Office.DocumentManagement.Internal.DocIdHandler</Class>
-    <Data/>
-    <Filter/>
-  </Receiver>
-</spe:Receivers>
-</file>
-
-<file path=customXml/item4.xml><?xml version="1.0" encoding="utf-8"?>
 <ct:contentTypeSchema xmlns:ct="http://schemas.microsoft.com/office/2006/metadata/contentType" xmlns:ma="http://schemas.microsoft.com/office/2006/metadata/properties/metaAttributes" ct:_="" ma:_="" ma:contentTypeName="Document" ma:contentTypeID="0x0101000812F700BE7F874999720E88173FE491" ma:contentTypeVersion="0" ma:contentTypeDescription="Create a new document." ma:contentTypeScope="" ma:versionID="3f79f408e2ca720b7aba6e0e32464d0c">
   <xsd:schema xmlns:xsd="http://www.w3.org/2001/XMLSchema" xmlns:xs="http://www.w3.org/2001/XMLSchema" xmlns:p="http://schemas.microsoft.com/office/2006/metadata/properties" xmlns:ns2="7bb5d761-a2ea-4873-95f7-7a6658fb3ef0" targetNamespace="http://schemas.microsoft.com/office/2006/metadata/properties" ma:root="true" ma:fieldsID="1e062cd38ba31e406bfc4340fbc7f87a" ns2:_="">
     <xsd:import namespace="7bb5d761-a2ea-4873-95f7-7a6658fb3ef0"/>
@@ -22599,7 +22580,61 @@
 </ct:contentTypeSchema>
 </file>
 
+<file path=customXml/item4.xml><?xml version="1.0" encoding="utf-8"?>
+<?mso-contentType ?>
+<spe:Receivers xmlns:spe="http://schemas.microsoft.com/sharepoint/events">
+  <Receiver>
+    <Name>Document ID Generator</Name>
+    <Synchronization>Synchronous</Synchronization>
+    <Type>10001</Type>
+    <SequenceNumber>1000</SequenceNumber>
+    <Assembly>Microsoft.Office.DocumentManagement, Version=14.0.0.0, Culture=neutral, PublicKeyToken=71e9bce111e9429c</Assembly>
+    <Class>Microsoft.Office.DocumentManagement.Internal.DocIdHandler</Class>
+    <Data/>
+    <Filter/>
+  </Receiver>
+  <Receiver>
+    <Name>Document ID Generator</Name>
+    <Synchronization>Synchronous</Synchronization>
+    <Type>10002</Type>
+    <SequenceNumber>1001</SequenceNumber>
+    <Assembly>Microsoft.Office.DocumentManagement, Version=14.0.0.0, Culture=neutral, PublicKeyToken=71e9bce111e9429c</Assembly>
+    <Class>Microsoft.Office.DocumentManagement.Internal.DocIdHandler</Class>
+    <Data/>
+    <Filter/>
+  </Receiver>
+  <Receiver>
+    <Name>Document ID Generator</Name>
+    <Synchronization>Synchronous</Synchronization>
+    <Type>10004</Type>
+    <SequenceNumber>1002</SequenceNumber>
+    <Assembly>Microsoft.Office.DocumentManagement, Version=14.0.0.0, Culture=neutral, PublicKeyToken=71e9bce111e9429c</Assembly>
+    <Class>Microsoft.Office.DocumentManagement.Internal.DocIdHandler</Class>
+    <Data/>
+    <Filter/>
+  </Receiver>
+  <Receiver>
+    <Name>Document ID Generator</Name>
+    <Synchronization>Synchronous</Synchronization>
+    <Type>10006</Type>
+    <SequenceNumber>1003</SequenceNumber>
+    <Assembly>Microsoft.Office.DocumentManagement, Version=14.0.0.0, Culture=neutral, PublicKeyToken=71e9bce111e9429c</Assembly>
+    <Class>Microsoft.Office.DocumentManagement.Internal.DocIdHandler</Class>
+    <Data/>
+    <Filter/>
+  </Receiver>
+</spe:Receivers>
+</file>
+
 <file path=customXml/itemProps1.xml><?xml version="1.0" encoding="utf-8"?>
+<ds:datastoreItem xmlns:ds="http://schemas.openxmlformats.org/officeDocument/2006/customXml" ds:itemID="{5CDEB364-43EC-4510-9881-539C2A3FCE9E}">
+  <ds:schemaRefs>
+    <ds:schemaRef ds:uri="http://schemas.microsoft.com/sharepoint/v3/contenttype/forms"/>
+  </ds:schemaRefs>
+</ds:datastoreItem>
+</file>
+
+<file path=customXml/itemProps2.xml><?xml version="1.0" encoding="utf-8"?>
 <ds:datastoreItem xmlns:ds="http://schemas.openxmlformats.org/officeDocument/2006/customXml" ds:itemID="{6921749B-AEB7-461B-845F-603CABD25259}">
   <ds:schemaRefs>
     <ds:schemaRef ds:uri="http://purl.org/dc/elements/1.1/"/>
@@ -22615,23 +22650,7 @@
 </ds:datastoreItem>
 </file>
 
-<file path=customXml/itemProps2.xml><?xml version="1.0" encoding="utf-8"?>
-<ds:datastoreItem xmlns:ds="http://schemas.openxmlformats.org/officeDocument/2006/customXml" ds:itemID="{5CDEB364-43EC-4510-9881-539C2A3FCE9E}">
-  <ds:schemaRefs>
-    <ds:schemaRef ds:uri="http://schemas.microsoft.com/sharepoint/v3/contenttype/forms"/>
-  </ds:schemaRefs>
-</ds:datastoreItem>
-</file>
-
 <file path=customXml/itemProps3.xml><?xml version="1.0" encoding="utf-8"?>
-<ds:datastoreItem xmlns:ds="http://schemas.openxmlformats.org/officeDocument/2006/customXml" ds:itemID="{B13EBC30-FE27-4C6A-B723-23FC2188F7DC}">
-  <ds:schemaRefs>
-    <ds:schemaRef ds:uri="http://schemas.microsoft.com/sharepoint/events"/>
-  </ds:schemaRefs>
-</ds:datastoreItem>
-</file>
-
-<file path=customXml/itemProps4.xml><?xml version="1.0" encoding="utf-8"?>
 <ds:datastoreItem xmlns:ds="http://schemas.openxmlformats.org/officeDocument/2006/customXml" ds:itemID="{164479E5-0B02-49AC-B79E-EC1D6164DDD3}">
   <ds:schemaRefs>
     <ds:schemaRef ds:uri="http://schemas.microsoft.com/office/2006/metadata/contentType"/>
@@ -22647,4 +22666,12 @@
     <ds:schemaRef ds:uri="http://schemas.microsoft.com/internal/obd"/>
   </ds:schemaRefs>
 </ds:datastoreItem>
+</file>
+
+<file path=customXml/itemProps4.xml><?xml version="1.0" encoding="utf-8"?>
+<ds:datastoreItem xmlns:ds="http://schemas.openxmlformats.org/officeDocument/2006/customXml" ds:itemID="{B13EBC30-FE27-4C6A-B723-23FC2188F7DC}">
+  <ds:schemaRefs>
+    <ds:schemaRef ds:uri="http://schemas.microsoft.com/sharepoint/events"/>
+  </ds:schemaRefs>
+</ds:datastoreItem>
 </file>
</xml_diff>

<commit_message>
adjusted text spacing on Objectives slide
</commit_message>
<xml_diff>
--- a/01-Intro.pptx
+++ b/01-Intro.pptx
@@ -291,7 +291,7 @@
               <a:pPr>
                 <a:defRPr/>
               </a:pPr>
-              <a:t>2016-01-27</a:t>
+              <a:t>2016-02-03</a:t>
             </a:fld>
             <a:endParaRPr lang="en-US" dirty="0"/>
           </a:p>
@@ -474,7 +474,7 @@
               <a:pPr>
                 <a:defRPr/>
               </a:pPr>
-              <a:t>2016-01-27</a:t>
+              <a:t>2016-02-03</a:t>
             </a:fld>
             <a:endParaRPr lang="en-US" dirty="0"/>
           </a:p>
@@ -917,7 +917,7 @@
         <p:spPr/>
         <p:txBody>
           <a:bodyPr>
-            <a:normAutofit fontScale="77500" lnSpcReduction="20000"/>
+            <a:normAutofit fontScale="85000" lnSpcReduction="20000"/>
           </a:bodyPr>
           <a:lstStyle/>
           <a:p>
@@ -1294,10 +1294,20 @@
                 <a:ea typeface="ＭＳ Ｐゴシック" charset="0"/>
                 <a:cs typeface="Arial" panose="020B0604020202020204" pitchFamily="34" charset="0"/>
               </a:rPr>
-              <a:t> in the future training images.</a:t>
-            </a:r>
-          </a:p>
-          <a:p>
+              <a:t> in the future training images. We fix that in Module</a:t>
+            </a:r>
+            <a:r>
+              <a:rPr lang="en-US" sz="1200" b="0" i="0" kern="1200" baseline="0" dirty="0" smtClean="0">
+                <a:solidFill>
+                  <a:schemeClr val="tx1"/>
+                </a:solidFill>
+                <a:effectLst/>
+                <a:latin typeface="Arial" panose="020B0604020202020204" pitchFamily="34" charset="0"/>
+                <a:ea typeface="ＭＳ Ｐゴシック" charset="0"/>
+                <a:cs typeface="Arial" panose="020B0604020202020204" pitchFamily="34" charset="0"/>
+              </a:rPr>
+              <a:t> 03.</a:t>
+            </a:r>
             <a:endParaRPr lang="en-US" sz="1200" b="0" i="0" kern="1200" dirty="0" smtClean="0">
               <a:solidFill>
                 <a:schemeClr val="tx1"/>
@@ -1309,51 +1319,7 @@
             </a:endParaRPr>
           </a:p>
           <a:p>
-            <a:r>
-              <a:rPr lang="en-US" dirty="0" smtClean="0"/>
-              <a:t>my</a:t>
-            </a:r>
-            <a:r>
-              <a:rPr lang="en-US" baseline="0" dirty="0" smtClean="0"/>
-              <a:t> TEMP fix: chef@ip-172-31-7-193 run]$ sudo </a:t>
-            </a:r>
-            <a:r>
-              <a:rPr lang="en-US" baseline="0" dirty="0" err="1" smtClean="0"/>
-              <a:t>chmod</a:t>
-            </a:r>
-            <a:r>
-              <a:rPr lang="en-US" baseline="0" dirty="0" smtClean="0"/>
-              <a:t> 777 </a:t>
-            </a:r>
-            <a:r>
-              <a:rPr lang="en-US" baseline="0" dirty="0" err="1" smtClean="0"/>
-              <a:t>docker.sock</a:t>
-            </a:r>
-            <a:endParaRPr lang="en-US" baseline="0" dirty="0" smtClean="0"/>
-          </a:p>
-          <a:p>
-            <a:endParaRPr lang="en-US" baseline="0" dirty="0" smtClean="0"/>
-          </a:p>
-          <a:p>
-            <a:r>
-              <a:rPr lang="en-US" baseline="0" dirty="0" smtClean="0"/>
-              <a:t>Nathan: </a:t>
-            </a:r>
-            <a:r>
-              <a:rPr lang="en-US" sz="1200" b="0" i="0" kern="1200" dirty="0" smtClean="0">
-                <a:solidFill>
-                  <a:schemeClr val="tx1"/>
-                </a:solidFill>
-                <a:effectLst/>
-                <a:latin typeface="Arial" panose="020B0604020202020204" pitchFamily="34" charset="0"/>
-                <a:ea typeface="ＭＳ Ｐゴシック" charset="0"/>
-                <a:cs typeface="Arial" panose="020B0604020202020204" pitchFamily="34" charset="0"/>
-              </a:rPr>
-              <a:t> The images I’ve used were built with a chef provisioning script</a:t>
-            </a:r>
-          </a:p>
-          <a:p>
-            <a:endParaRPr lang="en-US" sz="1200" b="0" i="0" kern="1200" baseline="0" dirty="0" smtClean="0">
+            <a:endParaRPr lang="en-US" sz="1200" b="0" i="0" kern="1200" dirty="0" smtClean="0">
               <a:solidFill>
                 <a:schemeClr val="tx1"/>
               </a:solidFill>
@@ -1364,6 +1330,9 @@
             </a:endParaRPr>
           </a:p>
           <a:p>
+            <a:endParaRPr lang="en-US" baseline="0" dirty="0" smtClean="0"/>
+          </a:p>
+          <a:p>
             <a:r>
               <a:rPr lang="en-US" sz="1200" b="0" i="0" kern="1200" baseline="0" dirty="0" smtClean="0">
                 <a:solidFill>
@@ -1436,16 +1405,56 @@
             </a:r>
             <a:r>
               <a:rPr lang="en-US" dirty="0" smtClean="0"/>
-              <a:t>GE: Running </a:t>
-            </a:r>
-            <a:r>
-              <a:rPr lang="en-US" dirty="0" err="1" smtClean="0"/>
-              <a:t>InSpec</a:t>
-            </a:r>
+              <a:t>GE: Running InSpec from the CLI" slide and notes.</a:t>
+            </a:r>
+          </a:p>
+          <a:p>
+            <a:endParaRPr lang="en-US" baseline="0" dirty="0" smtClean="0"/>
+          </a:p>
+          <a:p>
+            <a:pPr marL="0" marR="0" indent="0" algn="l" defTabSz="1217613" rtl="0" eaLnBrk="1" fontAlgn="base" latinLnBrk="0" hangingPunct="1">
+              <a:lnSpc>
+                <a:spcPct val="90000"/>
+              </a:lnSpc>
+              <a:spcBef>
+                <a:spcPct val="30000"/>
+              </a:spcBef>
+              <a:spcAft>
+                <a:spcPts val="450"/>
+              </a:spcAft>
+              <a:buClrTx/>
+              <a:buSzTx/>
+              <a:buFontTx/>
+              <a:buNone/>
+              <a:tabLst/>
+              <a:defRPr/>
+            </a:pPr>
             <a:r>
               <a:rPr lang="en-US" dirty="0" smtClean="0"/>
-              <a:t> from the CLI" slide and notes.</a:t>
-            </a:r>
+              <a:t>Instructor Note: This course has been tested on</a:t>
+            </a:r>
+            <a:r>
+              <a:rPr lang="en-US" baseline="0" dirty="0" smtClean="0"/>
+              <a:t> </a:t>
+            </a:r>
+            <a:r>
+              <a:rPr lang="en-US" sz="1200" kern="1200" dirty="0" smtClean="0">
+                <a:solidFill>
+                  <a:schemeClr val="tx1"/>
+                </a:solidFill>
+                <a:effectLst/>
+                <a:latin typeface="Arial" panose="020B0604020202020204" pitchFamily="34" charset="0"/>
+                <a:ea typeface="ＭＳ Ｐゴシック" charset="0"/>
+                <a:cs typeface="Arial" panose="020B0604020202020204" pitchFamily="34" charset="0"/>
+              </a:rPr>
+              <a:t>Compliance Server v0.9.11.</a:t>
+            </a:r>
+            <a:endParaRPr lang="en-US" dirty="0" smtClean="0"/>
+          </a:p>
+          <a:p>
+            <a:endParaRPr lang="en-US" baseline="0" dirty="0" smtClean="0"/>
+          </a:p>
+          <a:p>
             <a:endParaRPr lang="en-US" baseline="0" dirty="0" smtClean="0"/>
           </a:p>
           <a:p>
@@ -2190,7 +2199,7 @@
             </a:pPr>
             <a:r>
               <a:rPr lang="en-US" baseline="0" dirty="0" smtClean="0"/>
-              <a:t>The login credentials for the Linux nodes is chef/TBD. </a:t>
+              <a:t>The login credentials for the Linux nodes is chef/chef. </a:t>
             </a:r>
           </a:p>
           <a:p>
@@ -2213,8 +2222,29 @@
             </a:pPr>
             <a:r>
               <a:rPr lang="en-US" baseline="0" dirty="0" smtClean="0"/>
-              <a:t>The login credentials for the Windows nodes is Administrator/TBD. </a:t>
-            </a:r>
+              <a:t>The login credentials for the Windows nodes </a:t>
+            </a:r>
+            <a:r>
+              <a:rPr lang="en-US" baseline="0" smtClean="0"/>
+              <a:t>is Administrator/</a:t>
+            </a:r>
+            <a:r>
+              <a:rPr lang="en-US" sz="1200" kern="1200" smtClean="0">
+                <a:solidFill>
+                  <a:schemeClr val="tx1"/>
+                </a:solidFill>
+                <a:effectLst/>
+                <a:latin typeface="Arial" panose="020B0604020202020204" pitchFamily="34" charset="0"/>
+                <a:ea typeface="ＭＳ Ｐゴシック" charset="0"/>
+                <a:cs typeface="+mn-cs"/>
+              </a:rPr>
+              <a:t>Cod3Can! </a:t>
+            </a:r>
+            <a:r>
+              <a:rPr lang="en-US" baseline="0" smtClean="0"/>
+              <a:t> </a:t>
+            </a:r>
+            <a:endParaRPr lang="en-US" baseline="0" dirty="0" smtClean="0"/>
           </a:p>
           <a:p>
             <a:pPr marL="0" marR="0" lvl="2" indent="0" algn="l" defTabSz="914363" rtl="0" eaLnBrk="1" fontAlgn="auto" latinLnBrk="0" hangingPunct="1">
@@ -4349,47 +4379,6 @@
       </p:grpSpPr>
       <p:sp>
         <p:nvSpPr>
-          <p:cNvPr id="4" name="Title 1"/>
-          <p:cNvSpPr>
-            <a:spLocks noGrp="1"/>
-          </p:cNvSpPr>
-          <p:nvPr>
-            <p:ph type="ctrTitle"/>
-          </p:nvPr>
-        </p:nvSpPr>
-        <p:spPr bwMode="white">
-          <a:xfrm>
-            <a:off x="3013752" y="2496326"/>
-            <a:ext cx="10972800" cy="1337551"/>
-          </a:xfrm>
-        </p:spPr>
-        <p:txBody>
-          <a:bodyPr lIns="91440" tIns="91440" rIns="91440" bIns="91440" anchor="ctr">
-            <a:noAutofit/>
-          </a:bodyPr>
-          <a:lstStyle>
-            <a:lvl1pPr>
-              <a:lnSpc>
-                <a:spcPct val="90000"/>
-              </a:lnSpc>
-              <a:defRPr sz="4800" b="1" spc="0" baseline="0">
-                <a:solidFill>
-                  <a:schemeClr val="accent1"/>
-                </a:solidFill>
-              </a:defRPr>
-            </a:lvl1pPr>
-          </a:lstStyle>
-          <a:p>
-            <a:r>
-              <a:rPr lang="en-US" smtClean="0"/>
-              <a:t>Click to edit Master title style</a:t>
-            </a:r>
-            <a:endParaRPr lang="en-US" dirty="0"/>
-          </a:p>
-        </p:txBody>
-      </p:sp>
-      <p:sp>
-        <p:nvSpPr>
           <p:cNvPr id="9" name="Text Placeholder 7"/>
           <p:cNvSpPr>
             <a:spLocks noGrp="1"/>
@@ -4445,6 +4434,29 @@
           </a:p>
         </p:txBody>
       </p:sp>
+      <p:sp>
+        <p:nvSpPr>
+          <p:cNvPr id="2" name="Title 1"/>
+          <p:cNvSpPr>
+            <a:spLocks noGrp="1"/>
+          </p:cNvSpPr>
+          <p:nvPr>
+            <p:ph type="title"/>
+          </p:nvPr>
+        </p:nvSpPr>
+        <p:spPr/>
+        <p:txBody>
+          <a:bodyPr/>
+          <a:lstStyle/>
+          <a:p>
+            <a:r>
+              <a:rPr lang="en-US" smtClean="0"/>
+              <a:t>Click to edit Master title style</a:t>
+            </a:r>
+            <a:endParaRPr lang="en-US"/>
+          </a:p>
+        </p:txBody>
+      </p:sp>
     </p:spTree>
     <p:extLst>
       <p:ext uri="{BB962C8B-B14F-4D97-AF65-F5344CB8AC3E}">
@@ -4458,6 +4470,13 @@
   <p:transition spd="med">
     <p:fade/>
   </p:transition>
+  <p:timing>
+    <p:tnLst>
+      <p:par>
+        <p:cTn id="1" dur="indefinite" restart="never" nodeType="tmRoot"/>
+      </p:par>
+    </p:tnLst>
+  </p:timing>
 </p:sldLayout>
 </file>
 
@@ -13324,7 +13343,9 @@
           </a:xfrm>
         </p:spPr>
         <p:txBody>
-          <a:bodyPr/>
+          <a:bodyPr>
+            <a:normAutofit fontScale="90000"/>
+          </a:bodyPr>
           <a:lstStyle/>
           <a:p>
             <a:r>
@@ -13374,6 +13395,204 @@
               <a:t>Introduction</a:t>
             </a:r>
             <a:endParaRPr lang="en-US" sz="2800" dirty="0"/>
+          </a:p>
+        </p:txBody>
+      </p:sp>
+      <p:sp>
+        <p:nvSpPr>
+          <p:cNvPr id="4" name="Footer Placeholder 2"/>
+          <p:cNvSpPr txBox="1">
+            <a:spLocks/>
+          </p:cNvSpPr>
+          <p:nvPr/>
+        </p:nvSpPr>
+        <p:spPr bwMode="white">
+          <a:xfrm>
+            <a:off x="11802843" y="8529789"/>
+            <a:ext cx="3693831" cy="430887"/>
+          </a:xfrm>
+          <a:prstGeom prst="rect">
+            <a:avLst/>
+          </a:prstGeom>
+        </p:spPr>
+        <p:txBody>
+          <a:bodyPr vert="horz" wrap="square" lIns="91440" tIns="91440" rIns="91440" bIns="91440" rtlCol="0">
+            <a:spAutoFit/>
+          </a:bodyPr>
+          <a:lstStyle>
+            <a:lvl1pPr marL="0" indent="0" algn="l" defTabSz="1217613" rtl="0" eaLnBrk="1" fontAlgn="base" hangingPunct="1">
+              <a:spcBef>
+                <a:spcPts val="800"/>
+              </a:spcBef>
+              <a:spcAft>
+                <a:spcPct val="0"/>
+              </a:spcAft>
+              <a:buSzPct val="90000"/>
+              <a:buFont typeface="Arial" charset="0"/>
+              <a:buNone/>
+              <a:defRPr sz="2133" b="0" kern="1200" baseline="0">
+                <a:solidFill>
+                  <a:schemeClr val="accent3">
+                    <a:lumMod val="50000"/>
+                  </a:schemeClr>
+                </a:solidFill>
+                <a:latin typeface="+mn-lt"/>
+                <a:ea typeface="ＭＳ Ｐゴシック" charset="0"/>
+                <a:cs typeface="ＭＳ Ｐゴシック" charset="0"/>
+              </a:defRPr>
+            </a:lvl1pPr>
+            <a:lvl2pPr marL="309026" indent="0" algn="l" defTabSz="1217613" rtl="0" eaLnBrk="1" fontAlgn="base" hangingPunct="1">
+              <a:spcBef>
+                <a:spcPts val="800"/>
+              </a:spcBef>
+              <a:spcAft>
+                <a:spcPct val="0"/>
+              </a:spcAft>
+              <a:buSzPct val="90000"/>
+              <a:buFont typeface="Arial" charset="0"/>
+              <a:buNone/>
+              <a:defRPr sz="2133" b="1" kern="1200">
+                <a:solidFill>
+                  <a:srgbClr val="3E4346"/>
+                </a:solidFill>
+                <a:latin typeface="+mn-lt"/>
+                <a:ea typeface="ＭＳ Ｐゴシック" charset="0"/>
+                <a:cs typeface="+mn-cs"/>
+              </a:defRPr>
+            </a:lvl2pPr>
+            <a:lvl3pPr marL="609585" indent="0" algn="l" defTabSz="1217613" rtl="0" eaLnBrk="1" fontAlgn="base" hangingPunct="1">
+              <a:spcBef>
+                <a:spcPts val="800"/>
+              </a:spcBef>
+              <a:spcAft>
+                <a:spcPct val="0"/>
+              </a:spcAft>
+              <a:buSzPct val="90000"/>
+              <a:buFont typeface="Arial" charset="0"/>
+              <a:buNone/>
+              <a:defRPr sz="2133" b="1" kern="1200">
+                <a:solidFill>
+                  <a:srgbClr val="3E4346"/>
+                </a:solidFill>
+                <a:latin typeface="+mn-lt"/>
+                <a:ea typeface="ＭＳ Ｐゴシック" charset="0"/>
+                <a:cs typeface="+mn-cs"/>
+              </a:defRPr>
+            </a:lvl3pPr>
+            <a:lvl4pPr marL="840296" indent="0" algn="l" defTabSz="1217613" rtl="0" eaLnBrk="1" fontAlgn="base" hangingPunct="1">
+              <a:spcBef>
+                <a:spcPts val="800"/>
+              </a:spcBef>
+              <a:spcAft>
+                <a:spcPct val="0"/>
+              </a:spcAft>
+              <a:buSzPct val="90000"/>
+              <a:buFont typeface="Arial" charset="0"/>
+              <a:buNone/>
+              <a:defRPr sz="2133" b="1" kern="1200">
+                <a:solidFill>
+                  <a:srgbClr val="3E4346"/>
+                </a:solidFill>
+                <a:latin typeface="+mn-lt"/>
+                <a:ea typeface="ＭＳ Ｐゴシック" charset="0"/>
+                <a:cs typeface="+mn-cs"/>
+              </a:defRPr>
+            </a:lvl4pPr>
+            <a:lvl5pPr marL="1068889" indent="0" algn="l" defTabSz="1217613" rtl="0" eaLnBrk="1" fontAlgn="base" hangingPunct="1">
+              <a:spcBef>
+                <a:spcPts val="800"/>
+              </a:spcBef>
+              <a:spcAft>
+                <a:spcPct val="0"/>
+              </a:spcAft>
+              <a:buSzPct val="90000"/>
+              <a:buFont typeface="Arial" charset="0"/>
+              <a:buNone/>
+              <a:defRPr sz="2133" b="1" kern="1200">
+                <a:solidFill>
+                  <a:srgbClr val="3E4346"/>
+                </a:solidFill>
+                <a:latin typeface="+mn-lt"/>
+                <a:ea typeface="ＭＳ Ｐゴシック" charset="0"/>
+                <a:cs typeface="+mn-cs"/>
+              </a:defRPr>
+            </a:lvl5pPr>
+            <a:lvl6pPr marL="3352582" indent="-304780" algn="l" defTabSz="1219120" rtl="0" eaLnBrk="1" latinLnBrk="0" hangingPunct="1">
+              <a:spcBef>
+                <a:spcPct val="20000"/>
+              </a:spcBef>
+              <a:buFont typeface="Arial" pitchFamily="34" charset="0"/>
+              <a:buChar char="•"/>
+              <a:defRPr sz="2667" kern="1200">
+                <a:solidFill>
+                  <a:schemeClr val="tx1"/>
+                </a:solidFill>
+                <a:latin typeface="+mn-lt"/>
+                <a:ea typeface="+mn-ea"/>
+                <a:cs typeface="+mn-cs"/>
+              </a:defRPr>
+            </a:lvl6pPr>
+            <a:lvl7pPr marL="3962142" indent="-304780" algn="l" defTabSz="1219120" rtl="0" eaLnBrk="1" latinLnBrk="0" hangingPunct="1">
+              <a:spcBef>
+                <a:spcPct val="20000"/>
+              </a:spcBef>
+              <a:buFont typeface="Arial" pitchFamily="34" charset="0"/>
+              <a:buChar char="•"/>
+              <a:defRPr sz="2667" kern="1200">
+                <a:solidFill>
+                  <a:schemeClr val="tx1"/>
+                </a:solidFill>
+                <a:latin typeface="+mn-lt"/>
+                <a:ea typeface="+mn-ea"/>
+                <a:cs typeface="+mn-cs"/>
+              </a:defRPr>
+            </a:lvl7pPr>
+            <a:lvl8pPr marL="4571703" indent="-304780" algn="l" defTabSz="1219120" rtl="0" eaLnBrk="1" latinLnBrk="0" hangingPunct="1">
+              <a:spcBef>
+                <a:spcPct val="20000"/>
+              </a:spcBef>
+              <a:buFont typeface="Arial" pitchFamily="34" charset="0"/>
+              <a:buChar char="•"/>
+              <a:defRPr sz="2667" kern="1200">
+                <a:solidFill>
+                  <a:schemeClr val="tx1"/>
+                </a:solidFill>
+                <a:latin typeface="+mn-lt"/>
+                <a:ea typeface="+mn-ea"/>
+                <a:cs typeface="+mn-cs"/>
+              </a:defRPr>
+            </a:lvl8pPr>
+            <a:lvl9pPr marL="5181264" indent="-304780" algn="l" defTabSz="1219120" rtl="0" eaLnBrk="1" latinLnBrk="0" hangingPunct="1">
+              <a:spcBef>
+                <a:spcPct val="20000"/>
+              </a:spcBef>
+              <a:buFont typeface="Arial" pitchFamily="34" charset="0"/>
+              <a:buChar char="•"/>
+              <a:defRPr sz="2667" kern="1200">
+                <a:solidFill>
+                  <a:schemeClr val="tx1"/>
+                </a:solidFill>
+                <a:latin typeface="+mn-lt"/>
+                <a:ea typeface="+mn-ea"/>
+                <a:cs typeface="+mn-cs"/>
+              </a:defRPr>
+            </a:lvl9pPr>
+          </a:lstStyle>
+          <a:p>
+            <a:pPr algn="ctr"/>
+            <a:r>
+              <a:rPr lang="en-US" sz="1600" dirty="0" smtClean="0">
+                <a:solidFill>
+                  <a:srgbClr val="7D868C"/>
+                </a:solidFill>
+              </a:rPr>
+              <a:t>Course v1.0.0</a:t>
+            </a:r>
+            <a:endParaRPr lang="en-US" sz="1600" dirty="0">
+              <a:solidFill>
+                <a:srgbClr val="7D868C"/>
+              </a:solidFill>
+            </a:endParaRPr>
           </a:p>
         </p:txBody>
       </p:sp>
@@ -18370,10 +18589,12 @@
           <a:p>
             <a:r>
               <a:rPr lang="en-US" dirty="0" smtClean="0"/>
-              <a:t>After completing this course, you should be able to:</a:t>
-            </a:r>
-          </a:p>
-          <a:p>
+              <a:t>After completing this course, you should be able to</a:t>
+            </a:r>
+            <a:r>
+              <a:rPr lang="en-US" dirty="0" smtClean="0"/>
+              <a:t>:</a:t>
+            </a:r>
             <a:endParaRPr lang="en-US" dirty="0" smtClean="0"/>
           </a:p>
           <a:p>
@@ -18485,11 +18706,7 @@
             </a:r>
             <a:r>
               <a:rPr lang="en-US" dirty="0" smtClean="0"/>
-              <a:t>profiles</a:t>
-            </a:r>
-            <a:r>
-              <a:rPr lang="en-US" dirty="0" smtClean="0"/>
-              <a:t>.</a:t>
+              <a:t>profiles.</a:t>
             </a:r>
           </a:p>
           <a:p>
@@ -18518,13 +18735,16 @@
               <a:t>teams </a:t>
             </a:r>
             <a:r>
-              <a:rPr lang="en-US"/>
+              <a:rPr lang="en-US" dirty="0"/>
               <a:t>and </a:t>
             </a:r>
             <a:r>
-              <a:rPr lang="en-US" smtClean="0"/>
+              <a:rPr lang="en-US" dirty="0" smtClean="0"/>
               <a:t>permissions</a:t>
             </a:r>
+            <a:endParaRPr lang="en-US" sz="2400" b="1" dirty="0" smtClean="0"/>
+          </a:p>
+          <a:p>
             <a:endParaRPr lang="en-US" sz="2400" b="1" dirty="0" smtClean="0"/>
           </a:p>
           <a:p>
@@ -22390,61 +22610,6 @@
 </file>
 
 <file path=customXml/item1.xml><?xml version="1.0" encoding="utf-8"?>
-<?mso-contentType ?>
-<FormTemplates xmlns="http://schemas.microsoft.com/sharepoint/v3/contenttype/forms">
-  <Display>DocumentLibraryForm</Display>
-  <Edit>DocumentLibraryForm</Edit>
-  <New>DocumentLibraryForm</New>
-</FormTemplates>
-</file>
-
-<file path=customXml/item2.xml><?xml version="1.0" encoding="utf-8"?>
-<?mso-contentType ?>
-<spe:Receivers xmlns:spe="http://schemas.microsoft.com/sharepoint/events">
-  <Receiver>
-    <Name>Document ID Generator</Name>
-    <Synchronization>Synchronous</Synchronization>
-    <Type>10001</Type>
-    <SequenceNumber>1000</SequenceNumber>
-    <Assembly>Microsoft.Office.DocumentManagement, Version=14.0.0.0, Culture=neutral, PublicKeyToken=71e9bce111e9429c</Assembly>
-    <Class>Microsoft.Office.DocumentManagement.Internal.DocIdHandler</Class>
-    <Data/>
-    <Filter/>
-  </Receiver>
-  <Receiver>
-    <Name>Document ID Generator</Name>
-    <Synchronization>Synchronous</Synchronization>
-    <Type>10002</Type>
-    <SequenceNumber>1001</SequenceNumber>
-    <Assembly>Microsoft.Office.DocumentManagement, Version=14.0.0.0, Culture=neutral, PublicKeyToken=71e9bce111e9429c</Assembly>
-    <Class>Microsoft.Office.DocumentManagement.Internal.DocIdHandler</Class>
-    <Data/>
-    <Filter/>
-  </Receiver>
-  <Receiver>
-    <Name>Document ID Generator</Name>
-    <Synchronization>Synchronous</Synchronization>
-    <Type>10004</Type>
-    <SequenceNumber>1002</SequenceNumber>
-    <Assembly>Microsoft.Office.DocumentManagement, Version=14.0.0.0, Culture=neutral, PublicKeyToken=71e9bce111e9429c</Assembly>
-    <Class>Microsoft.Office.DocumentManagement.Internal.DocIdHandler</Class>
-    <Data/>
-    <Filter/>
-  </Receiver>
-  <Receiver>
-    <Name>Document ID Generator</Name>
-    <Synchronization>Synchronous</Synchronization>
-    <Type>10006</Type>
-    <SequenceNumber>1003</SequenceNumber>
-    <Assembly>Microsoft.Office.DocumentManagement, Version=14.0.0.0, Culture=neutral, PublicKeyToken=71e9bce111e9429c</Assembly>
-    <Class>Microsoft.Office.DocumentManagement.Internal.DocIdHandler</Class>
-    <Data/>
-    <Filter/>
-  </Receiver>
-</spe:Receivers>
-</file>
-
-<file path=customXml/item3.xml><?xml version="1.0" encoding="utf-8"?>
 <ct:contentTypeSchema xmlns:ct="http://schemas.microsoft.com/office/2006/metadata/contentType" xmlns:ma="http://schemas.microsoft.com/office/2006/metadata/properties/metaAttributes" ct:_="" ma:_="" ma:contentTypeName="Document" ma:contentTypeID="0x0101000812F700BE7F874999720E88173FE491" ma:contentTypeVersion="0" ma:contentTypeDescription="Create a new document." ma:contentTypeScope="" ma:versionID="3f79f408e2ca720b7aba6e0e32464d0c">
   <xsd:schema xmlns:xsd="http://www.w3.org/2001/XMLSchema" xmlns:xs="http://www.w3.org/2001/XMLSchema" xmlns:p="http://schemas.microsoft.com/office/2006/metadata/properties" xmlns:ns2="7bb5d761-a2ea-4873-95f7-7a6658fb3ef0" targetNamespace="http://schemas.microsoft.com/office/2006/metadata/properties" ma:root="true" ma:fieldsID="1e062cd38ba31e406bfc4340fbc7f87a" ns2:_="">
     <xsd:import namespace="7bb5d761-a2ea-4873-95f7-7a6658fb3ef0"/>
@@ -22589,7 +22754,7 @@
 </ct:contentTypeSchema>
 </file>
 
-<file path=customXml/item4.xml><?xml version="1.0" encoding="utf-8"?>
+<file path=customXml/item2.xml><?xml version="1.0" encoding="utf-8"?>
 <p:properties xmlns:p="http://schemas.microsoft.com/office/2006/metadata/properties" xmlns:xsi="http://www.w3.org/2001/XMLSchema-instance" xmlns:pc="http://schemas.microsoft.com/office/infopath/2007/PartnerControls">
   <documentManagement>
     <_dlc_DocId xmlns="7bb5d761-a2ea-4873-95f7-7a6658fb3ef0">M4CWTKMW727E-592-73</_dlc_DocId>
@@ -22601,23 +22766,62 @@
 </p:properties>
 </file>
 
-<file path=customXml/itemProps1.xml><?xml version="1.0" encoding="utf-8"?>
-<ds:datastoreItem xmlns:ds="http://schemas.openxmlformats.org/officeDocument/2006/customXml" ds:itemID="{5CDEB364-43EC-4510-9881-539C2A3FCE9E}">
-  <ds:schemaRefs>
-    <ds:schemaRef ds:uri="http://schemas.microsoft.com/sharepoint/v3/contenttype/forms"/>
-  </ds:schemaRefs>
-</ds:datastoreItem>
+<file path=customXml/item3.xml><?xml version="1.0" encoding="utf-8"?>
+<?mso-contentType ?>
+<FormTemplates xmlns="http://schemas.microsoft.com/sharepoint/v3/contenttype/forms">
+  <Display>DocumentLibraryForm</Display>
+  <Edit>DocumentLibraryForm</Edit>
+  <New>DocumentLibraryForm</New>
+</FormTemplates>
 </file>
 
-<file path=customXml/itemProps2.xml><?xml version="1.0" encoding="utf-8"?>
-<ds:datastoreItem xmlns:ds="http://schemas.openxmlformats.org/officeDocument/2006/customXml" ds:itemID="{B13EBC30-FE27-4C6A-B723-23FC2188F7DC}">
-  <ds:schemaRefs>
-    <ds:schemaRef ds:uri="http://schemas.microsoft.com/sharepoint/events"/>
-  </ds:schemaRefs>
-</ds:datastoreItem>
+<file path=customXml/item4.xml><?xml version="1.0" encoding="utf-8"?>
+<?mso-contentType ?>
+<spe:Receivers xmlns:spe="http://schemas.microsoft.com/sharepoint/events">
+  <Receiver>
+    <Name>Document ID Generator</Name>
+    <Synchronization>Synchronous</Synchronization>
+    <Type>10001</Type>
+    <SequenceNumber>1000</SequenceNumber>
+    <Assembly>Microsoft.Office.DocumentManagement, Version=14.0.0.0, Culture=neutral, PublicKeyToken=71e9bce111e9429c</Assembly>
+    <Class>Microsoft.Office.DocumentManagement.Internal.DocIdHandler</Class>
+    <Data/>
+    <Filter/>
+  </Receiver>
+  <Receiver>
+    <Name>Document ID Generator</Name>
+    <Synchronization>Synchronous</Synchronization>
+    <Type>10002</Type>
+    <SequenceNumber>1001</SequenceNumber>
+    <Assembly>Microsoft.Office.DocumentManagement, Version=14.0.0.0, Culture=neutral, PublicKeyToken=71e9bce111e9429c</Assembly>
+    <Class>Microsoft.Office.DocumentManagement.Internal.DocIdHandler</Class>
+    <Data/>
+    <Filter/>
+  </Receiver>
+  <Receiver>
+    <Name>Document ID Generator</Name>
+    <Synchronization>Synchronous</Synchronization>
+    <Type>10004</Type>
+    <SequenceNumber>1002</SequenceNumber>
+    <Assembly>Microsoft.Office.DocumentManagement, Version=14.0.0.0, Culture=neutral, PublicKeyToken=71e9bce111e9429c</Assembly>
+    <Class>Microsoft.Office.DocumentManagement.Internal.DocIdHandler</Class>
+    <Data/>
+    <Filter/>
+  </Receiver>
+  <Receiver>
+    <Name>Document ID Generator</Name>
+    <Synchronization>Synchronous</Synchronization>
+    <Type>10006</Type>
+    <SequenceNumber>1003</SequenceNumber>
+    <Assembly>Microsoft.Office.DocumentManagement, Version=14.0.0.0, Culture=neutral, PublicKeyToken=71e9bce111e9429c</Assembly>
+    <Class>Microsoft.Office.DocumentManagement.Internal.DocIdHandler</Class>
+    <Data/>
+    <Filter/>
+  </Receiver>
+</spe:Receivers>
 </file>
 
-<file path=customXml/itemProps3.xml><?xml version="1.0" encoding="utf-8"?>
+<file path=customXml/itemProps1.xml><?xml version="1.0" encoding="utf-8"?>
 <ds:datastoreItem xmlns:ds="http://schemas.openxmlformats.org/officeDocument/2006/customXml" ds:itemID="{164479E5-0B02-49AC-B79E-EC1D6164DDD3}">
   <ds:schemaRefs>
     <ds:schemaRef ds:uri="http://schemas.microsoft.com/office/2006/metadata/contentType"/>
@@ -22635,18 +22839,34 @@
 </ds:datastoreItem>
 </file>
 
-<file path=customXml/itemProps4.xml><?xml version="1.0" encoding="utf-8"?>
+<file path=customXml/itemProps2.xml><?xml version="1.0" encoding="utf-8"?>
 <ds:datastoreItem xmlns:ds="http://schemas.openxmlformats.org/officeDocument/2006/customXml" ds:itemID="{6921749B-AEB7-461B-845F-603CABD25259}">
   <ds:schemaRefs>
+    <ds:schemaRef ds:uri="http://schemas.microsoft.com/office/2006/documentManagement/types"/>
+    <ds:schemaRef ds:uri="http://schemas.microsoft.com/office/infopath/2007/PartnerControls"/>
     <ds:schemaRef ds:uri="http://purl.org/dc/elements/1.1/"/>
     <ds:schemaRef ds:uri="http://schemas.microsoft.com/office/2006/metadata/properties"/>
     <ds:schemaRef ds:uri="7bb5d761-a2ea-4873-95f7-7a6658fb3ef0"/>
     <ds:schemaRef ds:uri="http://purl.org/dc/terms/"/>
     <ds:schemaRef ds:uri="http://schemas.openxmlformats.org/package/2006/metadata/core-properties"/>
-    <ds:schemaRef ds:uri="http://schemas.microsoft.com/office/2006/documentManagement/types"/>
-    <ds:schemaRef ds:uri="http://schemas.microsoft.com/office/infopath/2007/PartnerControls"/>
     <ds:schemaRef ds:uri="http://www.w3.org/XML/1998/namespace"/>
     <ds:schemaRef ds:uri="http://purl.org/dc/dcmitype/"/>
   </ds:schemaRefs>
 </ds:datastoreItem>
+</file>
+
+<file path=customXml/itemProps3.xml><?xml version="1.0" encoding="utf-8"?>
+<ds:datastoreItem xmlns:ds="http://schemas.openxmlformats.org/officeDocument/2006/customXml" ds:itemID="{5CDEB364-43EC-4510-9881-539C2A3FCE9E}">
+  <ds:schemaRefs>
+    <ds:schemaRef ds:uri="http://schemas.microsoft.com/sharepoint/v3/contenttype/forms"/>
+  </ds:schemaRefs>
+</ds:datastoreItem>
+</file>
+
+<file path=customXml/itemProps4.xml><?xml version="1.0" encoding="utf-8"?>
+<ds:datastoreItem xmlns:ds="http://schemas.openxmlformats.org/officeDocument/2006/customXml" ds:itemID="{B13EBC30-FE27-4C6A-B723-23FC2188F7DC}">
+  <ds:schemaRefs>
+    <ds:schemaRef ds:uri="http://schemas.microsoft.com/sharepoint/events"/>
+  </ds:schemaRefs>
+</ds:datastoreItem>
 </file>
</xml_diff>

<commit_message>
01-Intro.pptx removed unneccesary notes on slide 1-1
</commit_message>
<xml_diff>
--- a/01-Intro.pptx
+++ b/01-Intro.pptx
@@ -291,7 +291,7 @@
               <a:pPr>
                 <a:defRPr/>
               </a:pPr>
-              <a:t>2016-02-03</a:t>
+              <a:t>2016-02-04</a:t>
             </a:fld>
             <a:endParaRPr lang="en-US" dirty="0"/>
           </a:p>
@@ -474,7 +474,7 @@
               <a:pPr>
                 <a:defRPr/>
               </a:pPr>
-              <a:t>2016-02-03</a:t>
+              <a:t>2016-02-04</a:t>
             </a:fld>
             <a:endParaRPr lang="en-US" dirty="0"/>
           </a:p>
@@ -917,7 +917,7 @@
         <p:spPr/>
         <p:txBody>
           <a:bodyPr>
-            <a:normAutofit fontScale="85000" lnSpcReduction="20000"/>
+            <a:normAutofit/>
           </a:bodyPr>
           <a:lstStyle/>
           <a:p>
@@ -1016,402 +1016,6 @@
             </a:endParaRPr>
           </a:p>
           <a:p>
-            <a:r>
-              <a:rPr lang="en-US" dirty="0" smtClean="0"/>
-              <a:t>TBD IMPORTANT: We need to build </a:t>
-            </a:r>
-            <a:r>
-              <a:rPr lang="en-US" sz="1200" b="0" i="0" kern="1200" dirty="0" smtClean="0">
-                <a:solidFill>
-                  <a:schemeClr val="tx1"/>
-                </a:solidFill>
-                <a:effectLst/>
-                <a:latin typeface="Arial" panose="020B0604020202020204" pitchFamily="34" charset="0"/>
-                <a:ea typeface="ＭＳ Ｐゴシック" charset="0"/>
-                <a:cs typeface="Arial" panose="020B0604020202020204" pitchFamily="34" charset="0"/>
-              </a:rPr>
-              <a:t>the shell </a:t>
-            </a:r>
-            <a:r>
-              <a:rPr lang="en-US" sz="1200" b="0" i="0" kern="1200" dirty="0" err="1" smtClean="0">
-                <a:solidFill>
-                  <a:schemeClr val="tx1"/>
-                </a:solidFill>
-                <a:effectLst/>
-                <a:latin typeface="Arial" panose="020B0604020202020204" pitchFamily="34" charset="0"/>
-                <a:ea typeface="ＭＳ Ｐゴシック" charset="0"/>
-                <a:cs typeface="Arial" panose="020B0604020202020204" pitchFamily="34" charset="0"/>
-              </a:rPr>
-              <a:t>init</a:t>
-            </a:r>
-            <a:r>
-              <a:rPr lang="en-US" sz="1200" b="0" i="0" kern="1200" dirty="0" smtClean="0">
-                <a:solidFill>
-                  <a:schemeClr val="tx1"/>
-                </a:solidFill>
-                <a:effectLst/>
-                <a:latin typeface="Arial" panose="020B0604020202020204" pitchFamily="34" charset="0"/>
-                <a:ea typeface="ＭＳ Ｐゴシック" charset="0"/>
-                <a:cs typeface="Arial" panose="020B0604020202020204" pitchFamily="34" charset="0"/>
-              </a:rPr>
-              <a:t> stuff for chef </a:t>
-            </a:r>
-            <a:r>
-              <a:rPr lang="en-US" sz="1200" b="0" i="0" kern="1200" dirty="0" err="1" smtClean="0">
-                <a:solidFill>
-                  <a:schemeClr val="tx1"/>
-                </a:solidFill>
-                <a:effectLst/>
-                <a:latin typeface="Arial" panose="020B0604020202020204" pitchFamily="34" charset="0"/>
-                <a:ea typeface="ＭＳ Ｐゴシック" charset="0"/>
-                <a:cs typeface="Arial" panose="020B0604020202020204" pitchFamily="34" charset="0"/>
-              </a:rPr>
-              <a:t>dk</a:t>
-            </a:r>
-            <a:r>
-              <a:rPr lang="en-US" sz="1200" b="0" i="0" kern="1200" dirty="0" smtClean="0">
-                <a:solidFill>
-                  <a:schemeClr val="tx1"/>
-                </a:solidFill>
-                <a:effectLst/>
-                <a:latin typeface="Arial" panose="020B0604020202020204" pitchFamily="34" charset="0"/>
-                <a:ea typeface="ＭＳ Ｐゴシック" charset="0"/>
-                <a:cs typeface="Arial" panose="020B0604020202020204" pitchFamily="34" charset="0"/>
-              </a:rPr>
-              <a:t> in to the AMI images.</a:t>
-            </a:r>
-          </a:p>
-          <a:p>
-            <a:endParaRPr lang="en-US" sz="1200" b="0" i="0" kern="1200" dirty="0" smtClean="0">
-              <a:solidFill>
-                <a:schemeClr val="tx1"/>
-              </a:solidFill>
-              <a:effectLst/>
-              <a:latin typeface="Arial" panose="020B0604020202020204" pitchFamily="34" charset="0"/>
-              <a:ea typeface="ＭＳ Ｐゴシック" charset="0"/>
-              <a:cs typeface="Arial" panose="020B0604020202020204" pitchFamily="34" charset="0"/>
-            </a:endParaRPr>
-          </a:p>
-          <a:p>
-            <a:r>
-              <a:rPr lang="en-US" sz="1200" kern="1200" dirty="0" smtClean="0">
-                <a:solidFill>
-                  <a:schemeClr val="tx1"/>
-                </a:solidFill>
-                <a:effectLst/>
-                <a:latin typeface="Arial" panose="020B0604020202020204" pitchFamily="34" charset="0"/>
-                <a:ea typeface="ＭＳ Ｐゴシック" charset="0"/>
-                <a:cs typeface="Arial" panose="020B0604020202020204" pitchFamily="34" charset="0"/>
-              </a:rPr>
-              <a:t>echo</a:t>
-            </a:r>
-            <a:r>
-              <a:rPr lang="en-US" dirty="0" smtClean="0"/>
-              <a:t> </a:t>
-            </a:r>
-            <a:r>
-              <a:rPr lang="en-US" sz="1200" kern="1200" dirty="0" smtClean="0">
-                <a:solidFill>
-                  <a:schemeClr val="tx1"/>
-                </a:solidFill>
-                <a:effectLst/>
-                <a:latin typeface="Arial" panose="020B0604020202020204" pitchFamily="34" charset="0"/>
-                <a:ea typeface="ＭＳ Ｐゴシック" charset="0"/>
-                <a:cs typeface="Arial" panose="020B0604020202020204" pitchFamily="34" charset="0"/>
-              </a:rPr>
-              <a:t>'</a:t>
-            </a:r>
-            <a:r>
-              <a:rPr lang="en-US" sz="1200" kern="1200" dirty="0" err="1" smtClean="0">
-                <a:solidFill>
-                  <a:schemeClr val="tx1"/>
-                </a:solidFill>
-                <a:effectLst/>
-                <a:latin typeface="Arial" panose="020B0604020202020204" pitchFamily="34" charset="0"/>
-                <a:ea typeface="ＭＳ Ｐゴシック" charset="0"/>
-                <a:cs typeface="Arial" panose="020B0604020202020204" pitchFamily="34" charset="0"/>
-              </a:rPr>
-              <a:t>eval</a:t>
-            </a:r>
-            <a:r>
-              <a:rPr lang="en-US" sz="1200" kern="1200" dirty="0" smtClean="0">
-                <a:solidFill>
-                  <a:schemeClr val="tx1"/>
-                </a:solidFill>
-                <a:effectLst/>
-                <a:latin typeface="Arial" panose="020B0604020202020204" pitchFamily="34" charset="0"/>
-                <a:ea typeface="ＭＳ Ｐゴシック" charset="0"/>
-                <a:cs typeface="Arial" panose="020B0604020202020204" pitchFamily="34" charset="0"/>
-              </a:rPr>
-              <a:t> "$(chef shell-</a:t>
-            </a:r>
-            <a:r>
-              <a:rPr lang="en-US" sz="1200" kern="1200" dirty="0" err="1" smtClean="0">
-                <a:solidFill>
-                  <a:schemeClr val="tx1"/>
-                </a:solidFill>
-                <a:effectLst/>
-                <a:latin typeface="Arial" panose="020B0604020202020204" pitchFamily="34" charset="0"/>
-                <a:ea typeface="ＭＳ Ｐゴシック" charset="0"/>
-                <a:cs typeface="Arial" panose="020B0604020202020204" pitchFamily="34" charset="0"/>
-              </a:rPr>
-              <a:t>init</a:t>
-            </a:r>
-            <a:r>
-              <a:rPr lang="en-US" sz="1200" kern="1200" dirty="0" smtClean="0">
-                <a:solidFill>
-                  <a:schemeClr val="tx1"/>
-                </a:solidFill>
-                <a:effectLst/>
-                <a:latin typeface="Arial" panose="020B0604020202020204" pitchFamily="34" charset="0"/>
-                <a:ea typeface="ＭＳ Ｐゴシック" charset="0"/>
-                <a:cs typeface="Arial" panose="020B0604020202020204" pitchFamily="34" charset="0"/>
-              </a:rPr>
-              <a:t> bash)"'</a:t>
-            </a:r>
-            <a:r>
-              <a:rPr lang="en-US" dirty="0" smtClean="0"/>
-              <a:t> &gt;&gt; ~/.</a:t>
-            </a:r>
-            <a:r>
-              <a:rPr lang="en-US" dirty="0" err="1" smtClean="0"/>
-              <a:t>bash_profile</a:t>
-            </a:r>
-            <a:r>
-              <a:rPr lang="en-US" dirty="0" smtClean="0"/>
-              <a:t>    then log out and in.</a:t>
-            </a:r>
-            <a:endParaRPr lang="en-US" sz="1200" b="0" i="0" kern="1200" dirty="0" smtClean="0">
-              <a:solidFill>
-                <a:schemeClr val="tx1"/>
-              </a:solidFill>
-              <a:effectLst/>
-              <a:latin typeface="Arial" panose="020B0604020202020204" pitchFamily="34" charset="0"/>
-              <a:ea typeface="ＭＳ Ｐゴシック" charset="0"/>
-              <a:cs typeface="Arial" panose="020B0604020202020204" pitchFamily="34" charset="0"/>
-            </a:endParaRPr>
-          </a:p>
-          <a:p>
-            <a:endParaRPr lang="en-US" sz="1200" b="0" i="0" kern="1200" dirty="0" smtClean="0">
-              <a:solidFill>
-                <a:schemeClr val="tx1"/>
-              </a:solidFill>
-              <a:effectLst/>
-              <a:latin typeface="Arial" panose="020B0604020202020204" pitchFamily="34" charset="0"/>
-              <a:ea typeface="ＭＳ Ｐゴシック" charset="0"/>
-              <a:cs typeface="Arial" panose="020B0604020202020204" pitchFamily="34" charset="0"/>
-            </a:endParaRPr>
-          </a:p>
-          <a:p>
-            <a:r>
-              <a:rPr lang="en-US" dirty="0" smtClean="0"/>
-              <a:t>https://docs.chef.io/install_dk.html</a:t>
-            </a:r>
-          </a:p>
-          <a:p>
-            <a:endParaRPr lang="en-US" dirty="0" smtClean="0"/>
-          </a:p>
-          <a:p>
-            <a:r>
-              <a:rPr lang="en-US" sz="1200" b="0" i="0" kern="1200" dirty="0" smtClean="0">
-                <a:solidFill>
-                  <a:schemeClr val="tx1"/>
-                </a:solidFill>
-                <a:effectLst/>
-                <a:latin typeface="Arial" panose="020B0604020202020204" pitchFamily="34" charset="0"/>
-                <a:ea typeface="ＭＳ Ｐゴシック" charset="0"/>
-                <a:cs typeface="Arial" panose="020B0604020202020204" pitchFamily="34" charset="0"/>
-              </a:rPr>
-              <a:t>Kennon thinks we need to put the chef user in the </a:t>
-            </a:r>
-            <a:r>
-              <a:rPr lang="en-US" sz="1200" b="0" i="0" kern="1200" dirty="0" err="1" smtClean="0">
-                <a:solidFill>
-                  <a:schemeClr val="tx1"/>
-                </a:solidFill>
-                <a:effectLst/>
-                <a:latin typeface="Arial" panose="020B0604020202020204" pitchFamily="34" charset="0"/>
-                <a:ea typeface="ＭＳ Ｐゴシック" charset="0"/>
-                <a:cs typeface="Arial" panose="020B0604020202020204" pitchFamily="34" charset="0"/>
-              </a:rPr>
-              <a:t>dockerroot</a:t>
-            </a:r>
-            <a:r>
-              <a:rPr lang="en-US" sz="1200" b="0" i="0" kern="1200" dirty="0" smtClean="0">
-                <a:solidFill>
-                  <a:schemeClr val="tx1"/>
-                </a:solidFill>
-                <a:effectLst/>
-                <a:latin typeface="Arial" panose="020B0604020202020204" pitchFamily="34" charset="0"/>
-                <a:ea typeface="ＭＳ Ｐゴシック" charset="0"/>
-                <a:cs typeface="Arial" panose="020B0604020202020204" pitchFamily="34" charset="0"/>
-              </a:rPr>
-              <a:t> group and make /var/run/</a:t>
-            </a:r>
-            <a:r>
-              <a:rPr lang="en-US" sz="1200" b="0" i="0" kern="1200" dirty="0" err="1" smtClean="0">
-                <a:solidFill>
-                  <a:schemeClr val="tx1"/>
-                </a:solidFill>
-                <a:effectLst/>
-                <a:latin typeface="Arial" panose="020B0604020202020204" pitchFamily="34" charset="0"/>
-                <a:ea typeface="ＭＳ Ｐゴシック" charset="0"/>
-                <a:cs typeface="Arial" panose="020B0604020202020204" pitchFamily="34" charset="0"/>
-              </a:rPr>
-              <a:t>docker.sock's</a:t>
-            </a:r>
-            <a:r>
-              <a:rPr lang="en-US" sz="1200" b="0" i="0" kern="1200" dirty="0" smtClean="0">
-                <a:solidFill>
-                  <a:schemeClr val="tx1"/>
-                </a:solidFill>
-                <a:effectLst/>
-                <a:latin typeface="Arial" panose="020B0604020202020204" pitchFamily="34" charset="0"/>
-                <a:ea typeface="ＭＳ Ｐゴシック" charset="0"/>
-                <a:cs typeface="Arial" panose="020B0604020202020204" pitchFamily="34" charset="0"/>
-              </a:rPr>
-              <a:t> group </a:t>
-            </a:r>
-            <a:r>
-              <a:rPr lang="en-US" sz="1200" b="0" i="0" kern="1200" dirty="0" err="1" smtClean="0">
-                <a:solidFill>
-                  <a:schemeClr val="tx1"/>
-                </a:solidFill>
-                <a:effectLst/>
-                <a:latin typeface="Arial" panose="020B0604020202020204" pitchFamily="34" charset="0"/>
-                <a:ea typeface="ＭＳ Ｐゴシック" charset="0"/>
-                <a:cs typeface="Arial" panose="020B0604020202020204" pitchFamily="34" charset="0"/>
-              </a:rPr>
-              <a:t>dockerroot</a:t>
-            </a:r>
-            <a:r>
-              <a:rPr lang="en-US" sz="1200" b="0" i="0" kern="1200" dirty="0" smtClean="0">
-                <a:solidFill>
-                  <a:schemeClr val="tx1"/>
-                </a:solidFill>
-                <a:effectLst/>
-                <a:latin typeface="Arial" panose="020B0604020202020204" pitchFamily="34" charset="0"/>
-                <a:ea typeface="ＭＳ Ｐゴシック" charset="0"/>
-                <a:cs typeface="Arial" panose="020B0604020202020204" pitchFamily="34" charset="0"/>
-              </a:rPr>
-              <a:t> in the future training images. We fix that in Module</a:t>
-            </a:r>
-            <a:r>
-              <a:rPr lang="en-US" sz="1200" b="0" i="0" kern="1200" baseline="0" dirty="0" smtClean="0">
-                <a:solidFill>
-                  <a:schemeClr val="tx1"/>
-                </a:solidFill>
-                <a:effectLst/>
-                <a:latin typeface="Arial" panose="020B0604020202020204" pitchFamily="34" charset="0"/>
-                <a:ea typeface="ＭＳ Ｐゴシック" charset="0"/>
-                <a:cs typeface="Arial" panose="020B0604020202020204" pitchFamily="34" charset="0"/>
-              </a:rPr>
-              <a:t> 03.</a:t>
-            </a:r>
-            <a:endParaRPr lang="en-US" sz="1200" b="0" i="0" kern="1200" dirty="0" smtClean="0">
-              <a:solidFill>
-                <a:schemeClr val="tx1"/>
-              </a:solidFill>
-              <a:effectLst/>
-              <a:latin typeface="Arial" panose="020B0604020202020204" pitchFamily="34" charset="0"/>
-              <a:ea typeface="ＭＳ Ｐゴシック" charset="0"/>
-              <a:cs typeface="Arial" panose="020B0604020202020204" pitchFamily="34" charset="0"/>
-            </a:endParaRPr>
-          </a:p>
-          <a:p>
-            <a:endParaRPr lang="en-US" sz="1200" b="0" i="0" kern="1200" dirty="0" smtClean="0">
-              <a:solidFill>
-                <a:schemeClr val="tx1"/>
-              </a:solidFill>
-              <a:effectLst/>
-              <a:latin typeface="Arial" panose="020B0604020202020204" pitchFamily="34" charset="0"/>
-              <a:ea typeface="ＭＳ Ｐゴシック" charset="0"/>
-              <a:cs typeface="Arial" panose="020B0604020202020204" pitchFamily="34" charset="0"/>
-            </a:endParaRPr>
-          </a:p>
-          <a:p>
-            <a:endParaRPr lang="en-US" baseline="0" dirty="0" smtClean="0"/>
-          </a:p>
-          <a:p>
-            <a:r>
-              <a:rPr lang="en-US" sz="1200" b="0" i="0" kern="1200" baseline="0" dirty="0" smtClean="0">
-                <a:solidFill>
-                  <a:schemeClr val="tx1"/>
-                </a:solidFill>
-                <a:effectLst/>
-                <a:latin typeface="Arial" panose="020B0604020202020204" pitchFamily="34" charset="0"/>
-                <a:ea typeface="ＭＳ Ｐゴシック" charset="0"/>
-                <a:cs typeface="Arial" panose="020B0604020202020204" pitchFamily="34" charset="0"/>
-              </a:rPr>
-              <a:t>The issue is this:  </a:t>
-            </a:r>
-            <a:r>
-              <a:rPr lang="en-US" dirty="0" err="1" smtClean="0"/>
-              <a:t>inspec</a:t>
-            </a:r>
-            <a:r>
-              <a:rPr lang="en-US" dirty="0" smtClean="0"/>
-              <a:t> exec ~/cookbooks/ssh/test/integration/client/</a:t>
-            </a:r>
-            <a:r>
-              <a:rPr lang="en-US" dirty="0" err="1" smtClean="0"/>
-              <a:t>inspec</a:t>
-            </a:r>
-            <a:r>
-              <a:rPr lang="en-US" dirty="0" smtClean="0"/>
-              <a:t>/</a:t>
-            </a:r>
-            <a:r>
-              <a:rPr lang="en-US" dirty="0" err="1" smtClean="0"/>
-              <a:t>client_spec.rb</a:t>
-            </a:r>
-            <a:r>
-              <a:rPr lang="en-US" dirty="0" smtClean="0"/>
-              <a:t> -t docker://CONTAINER_ID wont run </a:t>
-            </a:r>
-            <a:r>
-              <a:rPr lang="en-US" dirty="0" err="1" smtClean="0"/>
-              <a:t>witrhout</a:t>
-            </a:r>
-            <a:r>
-              <a:rPr lang="en-US" dirty="0" smtClean="0"/>
-              <a:t> permissions error nor </a:t>
-            </a:r>
-            <a:r>
-              <a:rPr lang="en-US" dirty="0" err="1" smtClean="0"/>
-              <a:t>ps</a:t>
-            </a:r>
-            <a:r>
-              <a:rPr lang="en-US" dirty="0" smtClean="0"/>
-              <a:t> </a:t>
-            </a:r>
-            <a:r>
-              <a:rPr lang="en-US" dirty="0" err="1" smtClean="0"/>
-              <a:t>docker</a:t>
-            </a:r>
-            <a:r>
-              <a:rPr lang="en-US" dirty="0" smtClean="0"/>
-              <a:t> without sudo.</a:t>
-            </a:r>
-            <a:endParaRPr lang="en-US" baseline="0" dirty="0" smtClean="0"/>
-          </a:p>
-          <a:p>
-            <a:endParaRPr lang="en-US" baseline="0" dirty="0" smtClean="0"/>
-          </a:p>
-          <a:p>
-            <a:r>
-              <a:rPr lang="en-US" baseline="0" dirty="0" smtClean="0"/>
-              <a:t>See module 3 "</a:t>
-            </a:r>
-            <a:r>
-              <a:rPr lang="en-US" dirty="0" smtClean="0"/>
-              <a:t>GE: Running InSpec from the CLI" slide and notes.</a:t>
-            </a:r>
-          </a:p>
-          <a:p>
-            <a:endParaRPr lang="en-US" baseline="0" dirty="0" smtClean="0"/>
-          </a:p>
-          <a:p>
             <a:pPr marL="0" marR="0" indent="0" algn="l" defTabSz="1217613" rtl="0" eaLnBrk="1" fontAlgn="base" latinLnBrk="0" hangingPunct="1">
               <a:lnSpc>
                 <a:spcPct val="90000"/>
@@ -1431,7 +1035,11 @@
             </a:pPr>
             <a:r>
               <a:rPr lang="en-US" dirty="0" smtClean="0"/>
-              <a:t>Instructor Note: This course has been tested on</a:t>
+              <a:t>Instructor </a:t>
+            </a:r>
+            <a:r>
+              <a:rPr lang="en-US" dirty="0" smtClean="0"/>
+              <a:t>Note: This course has been tested on</a:t>
             </a:r>
             <a:r>
               <a:rPr lang="en-US" baseline="0" dirty="0" smtClean="0"/>
@@ -3017,9 +2625,25 @@
           <a:bodyPr/>
           <a:lstStyle/>
           <a:p>
+            <a:endParaRPr lang="en-US" dirty="0" smtClean="0"/>
+          </a:p>
+          <a:p>
+            <a:endParaRPr lang="en-US" dirty="0" smtClean="0"/>
+          </a:p>
+          <a:p>
+            <a:endParaRPr lang="en-US" dirty="0" smtClean="0"/>
+          </a:p>
+          <a:p>
+            <a:endParaRPr lang="en-US" dirty="0" smtClean="0"/>
+          </a:p>
+          <a:p>
             <a:r>
               <a:rPr lang="en-US" dirty="0" smtClean="0"/>
-              <a:t>Instructor Note: You can tell the students that this course covers scanning and remediating both Linux and Windows nodes.</a:t>
+              <a:t>Instructor </a:t>
+            </a:r>
+            <a:r>
+              <a:rPr lang="en-US" dirty="0" smtClean="0"/>
+              <a:t>Note: You can tell the students that this course covers scanning and remediating both Linux and Windows nodes.</a:t>
             </a:r>
             <a:r>
               <a:rPr lang="en-US" baseline="0" dirty="0" smtClean="0"/>
@@ -4902,14 +4526,14 @@
           </a:ln>
           <a:extLst>
             <a:ext uri="{909E8E84-426E-40dd-AFC4-6F175D3DCCD1}">
-              <a14:hiddenFill xmlns="" xmlns:a14="http://schemas.microsoft.com/office/drawing/2010/main">
+              <a14:hiddenFill xmlns:a14="http://schemas.microsoft.com/office/drawing/2010/main" xmlns="">
                 <a:solidFill>
                   <a:srgbClr val="FFFFFF"/>
                 </a:solidFill>
               </a14:hiddenFill>
             </a:ext>
             <a:ext uri="{91240B29-F687-4f45-9708-019B960494DF}">
-              <a14:hiddenLine xmlns="" xmlns:a14="http://schemas.microsoft.com/office/drawing/2010/main" w="9525">
+              <a14:hiddenLine xmlns:a14="http://schemas.microsoft.com/office/drawing/2010/main" xmlns="" w="9525">
                 <a:solidFill>
                   <a:srgbClr val="000000"/>
                 </a:solidFill>
@@ -5057,14 +4681,14 @@
           </a:ln>
           <a:extLst>
             <a:ext uri="{909E8E84-426E-40dd-AFC4-6F175D3DCCD1}">
-              <a14:hiddenFill xmlns="" xmlns:a14="http://schemas.microsoft.com/office/drawing/2010/main">
+              <a14:hiddenFill xmlns:a14="http://schemas.microsoft.com/office/drawing/2010/main" xmlns="">
                 <a:solidFill>
                   <a:srgbClr val="FFFFFF"/>
                 </a:solidFill>
               </a14:hiddenFill>
             </a:ext>
             <a:ext uri="{91240B29-F687-4f45-9708-019B960494DF}">
-              <a14:hiddenLine xmlns="" xmlns:a14="http://schemas.microsoft.com/office/drawing/2010/main" w="9525">
+              <a14:hiddenLine xmlns:a14="http://schemas.microsoft.com/office/drawing/2010/main" xmlns="" w="9525">
                 <a:solidFill>
                   <a:srgbClr val="000000"/>
                 </a:solidFill>
@@ -5555,14 +5179,14 @@
           </a:ln>
           <a:extLst>
             <a:ext uri="{909E8E84-426E-40dd-AFC4-6F175D3DCCD1}">
-              <a14:hiddenFill xmlns="" xmlns:a14="http://schemas.microsoft.com/office/drawing/2010/main">
+              <a14:hiddenFill xmlns:a14="http://schemas.microsoft.com/office/drawing/2010/main" xmlns="">
                 <a:solidFill>
                   <a:srgbClr val="FFFFFF"/>
                 </a:solidFill>
               </a14:hiddenFill>
             </a:ext>
             <a:ext uri="{91240B29-F687-4f45-9708-019B960494DF}">
-              <a14:hiddenLine xmlns="" xmlns:a14="http://schemas.microsoft.com/office/drawing/2010/main" w="9525">
+              <a14:hiddenLine xmlns:a14="http://schemas.microsoft.com/office/drawing/2010/main" xmlns="" w="9525">
                 <a:solidFill>
                   <a:srgbClr val="000000"/>
                 </a:solidFill>
@@ -8371,14 +7995,14 @@
           </a:ln>
           <a:extLst>
             <a:ext uri="{909E8E84-426E-40dd-AFC4-6F175D3DCCD1}">
-              <a14:hiddenFill xmlns="" xmlns:a14="http://schemas.microsoft.com/office/drawing/2010/main">
+              <a14:hiddenFill xmlns:a14="http://schemas.microsoft.com/office/drawing/2010/main" xmlns="">
                 <a:solidFill>
                   <a:srgbClr val="FFFFFF"/>
                 </a:solidFill>
               </a14:hiddenFill>
             </a:ext>
             <a:ext uri="{91240B29-F687-4f45-9708-019B960494DF}">
-              <a14:hiddenLine xmlns="" xmlns:a14="http://schemas.microsoft.com/office/drawing/2010/main" w="9525">
+              <a14:hiddenLine xmlns:a14="http://schemas.microsoft.com/office/drawing/2010/main" xmlns="" w="9525">
                 <a:solidFill>
                   <a:srgbClr val="000000"/>
                 </a:solidFill>
@@ -9735,14 +9359,14 @@
           </a:ln>
           <a:extLst>
             <a:ext uri="{909E8E84-426E-40dd-AFC4-6F175D3DCCD1}">
-              <a14:hiddenFill xmlns="" xmlns:a14="http://schemas.microsoft.com/office/drawing/2010/main">
+              <a14:hiddenFill xmlns:a14="http://schemas.microsoft.com/office/drawing/2010/main" xmlns="">
                 <a:solidFill>
                   <a:srgbClr val="FFFFFF"/>
                 </a:solidFill>
               </a14:hiddenFill>
             </a:ext>
             <a:ext uri="{91240B29-F687-4f45-9708-019B960494DF}">
-              <a14:hiddenLine xmlns="" xmlns:a14="http://schemas.microsoft.com/office/drawing/2010/main" w="9525">
+              <a14:hiddenLine xmlns:a14="http://schemas.microsoft.com/office/drawing/2010/main" xmlns="" w="9525">
                 <a:solidFill>
                   <a:srgbClr val="000000"/>
                 </a:solidFill>
@@ -10300,14 +9924,14 @@
           </a:ln>
           <a:extLst>
             <a:ext uri="{909E8E84-426E-40dd-AFC4-6F175D3DCCD1}">
-              <a14:hiddenFill xmlns="" xmlns:a14="http://schemas.microsoft.com/office/drawing/2010/main">
+              <a14:hiddenFill xmlns:a14="http://schemas.microsoft.com/office/drawing/2010/main" xmlns="">
                 <a:solidFill>
                   <a:srgbClr val="FFFFFF"/>
                 </a:solidFill>
               </a14:hiddenFill>
             </a:ext>
             <a:ext uri="{91240B29-F687-4f45-9708-019B960494DF}">
-              <a14:hiddenLine xmlns="" xmlns:a14="http://schemas.microsoft.com/office/drawing/2010/main" w="9525">
+              <a14:hiddenLine xmlns:a14="http://schemas.microsoft.com/office/drawing/2010/main" xmlns="" w="9525">
                 <a:solidFill>
                   <a:srgbClr val="000000"/>
                 </a:solidFill>
@@ -10874,14 +10498,14 @@
           </a:ln>
           <a:extLst>
             <a:ext uri="{909E8E84-426E-40dd-AFC4-6F175D3DCCD1}">
-              <a14:hiddenFill xmlns="" xmlns:a14="http://schemas.microsoft.com/office/drawing/2010/main">
+              <a14:hiddenFill xmlns:a14="http://schemas.microsoft.com/office/drawing/2010/main" xmlns="">
                 <a:solidFill>
                   <a:srgbClr val="FFFFFF"/>
                 </a:solidFill>
               </a14:hiddenFill>
             </a:ext>
             <a:ext uri="{91240B29-F687-4f45-9708-019B960494DF}">
-              <a14:hiddenLine xmlns="" xmlns:a14="http://schemas.microsoft.com/office/drawing/2010/main" w="9525">
+              <a14:hiddenLine xmlns:a14="http://schemas.microsoft.com/office/drawing/2010/main" xmlns="" w="9525">
                 <a:solidFill>
                   <a:srgbClr val="000000"/>
                 </a:solidFill>
@@ -11821,14 +11445,14 @@
           </a:ln>
           <a:extLst>
             <a:ext uri="{909E8E84-426E-40dd-AFC4-6F175D3DCCD1}">
-              <a14:hiddenFill xmlns="" xmlns:a14="http://schemas.microsoft.com/office/drawing/2010/main">
+              <a14:hiddenFill xmlns:a14="http://schemas.microsoft.com/office/drawing/2010/main" xmlns="">
                 <a:solidFill>
                   <a:srgbClr val="FFFFFF"/>
                 </a:solidFill>
               </a14:hiddenFill>
             </a:ext>
             <a:ext uri="{91240B29-F687-4f45-9708-019B960494DF}">
-              <a14:hiddenLine xmlns="" xmlns:a14="http://schemas.microsoft.com/office/drawing/2010/main" w="9525">
+              <a14:hiddenLine xmlns:a14="http://schemas.microsoft.com/office/drawing/2010/main" xmlns="" w="9525">
                 <a:solidFill>
                   <a:srgbClr val="000000"/>
                 </a:solidFill>
@@ -12582,14 +12206,14 @@
           </a:ln>
           <a:extLst>
             <a:ext uri="{909E8E84-426E-40dd-AFC4-6F175D3DCCD1}">
-              <a14:hiddenFill xmlns="" xmlns:a14="http://schemas.microsoft.com/office/drawing/2010/main">
+              <a14:hiddenFill xmlns:a14="http://schemas.microsoft.com/office/drawing/2010/main" xmlns="">
                 <a:solidFill>
                   <a:srgbClr val="FFFFFF"/>
                 </a:solidFill>
               </a14:hiddenFill>
             </a:ext>
             <a:ext uri="{91240B29-F687-4f45-9708-019B960494DF}">
-              <a14:hiddenLine xmlns="" xmlns:a14="http://schemas.microsoft.com/office/drawing/2010/main" w="9525">
+              <a14:hiddenLine xmlns:a14="http://schemas.microsoft.com/office/drawing/2010/main" xmlns="" w="9525">
                 <a:solidFill>
                   <a:srgbClr val="000000"/>
                 </a:solidFill>
@@ -18695,11 +18319,7 @@
             </a:pPr>
             <a:r>
               <a:rPr lang="en-US" dirty="0" smtClean="0"/>
-              <a:t>Manage </a:t>
-            </a:r>
-            <a:r>
-              <a:rPr lang="en-US" dirty="0" smtClean="0"/>
-              <a:t>users</a:t>
+              <a:t>Manage users</a:t>
             </a:r>
             <a:r>
               <a:rPr lang="en-US" dirty="0"/>
@@ -19471,7 +19091,7 @@
             <a:noFill/>
             <a:extLst>
               <a:ext uri="{909E8E84-426E-40dd-AFC4-6F175D3DCCD1}">
-                <a14:hiddenFill xmlns="" xmlns:a14="http://schemas.microsoft.com/office/drawing/2010/main">
+                <a14:hiddenFill xmlns:a14="http://schemas.microsoft.com/office/drawing/2010/main" xmlns="">
                   <a:solidFill>
                     <a:srgbClr val="FFFFFF"/>
                   </a:solidFill>
@@ -19512,7 +19132,7 @@
             <a:noFill/>
             <a:extLst>
               <a:ext uri="{909E8E84-426E-40dd-AFC4-6F175D3DCCD1}">
-                <a14:hiddenFill xmlns="" xmlns:a14="http://schemas.microsoft.com/office/drawing/2010/main">
+                <a14:hiddenFill xmlns:a14="http://schemas.microsoft.com/office/drawing/2010/main" xmlns="">
                   <a:solidFill>
                     <a:srgbClr val="FFFFFF"/>
                   </a:solidFill>
@@ -19553,7 +19173,7 @@
             <a:noFill/>
             <a:extLst>
               <a:ext uri="{909E8E84-426E-40dd-AFC4-6F175D3DCCD1}">
-                <a14:hiddenFill xmlns="" xmlns:a14="http://schemas.microsoft.com/office/drawing/2010/main">
+                <a14:hiddenFill xmlns:a14="http://schemas.microsoft.com/office/drawing/2010/main" xmlns="">
                   <a:solidFill>
                     <a:srgbClr val="FFFFFF"/>
                   </a:solidFill>
@@ -19609,7 +19229,7 @@
             <a:noFill/>
             <a:extLst>
               <a:ext uri="{909E8E84-426E-40dd-AFC4-6F175D3DCCD1}">
-                <a14:hiddenFill xmlns="" xmlns:a14="http://schemas.microsoft.com/office/drawing/2010/main">
+                <a14:hiddenFill xmlns:a14="http://schemas.microsoft.com/office/drawing/2010/main" xmlns="">
                   <a:solidFill>
                     <a:srgbClr val="FFFFFF"/>
                   </a:solidFill>
@@ -19650,7 +19270,7 @@
             <a:noFill/>
             <a:extLst>
               <a:ext uri="{909E8E84-426E-40dd-AFC4-6F175D3DCCD1}">
-                <a14:hiddenFill xmlns="" xmlns:a14="http://schemas.microsoft.com/office/drawing/2010/main">
+                <a14:hiddenFill xmlns:a14="http://schemas.microsoft.com/office/drawing/2010/main" xmlns="">
                   <a:solidFill>
                     <a:srgbClr val="FFFFFF"/>
                   </a:solidFill>
@@ -19691,7 +19311,7 @@
             <a:noFill/>
             <a:extLst>
               <a:ext uri="{909E8E84-426E-40dd-AFC4-6F175D3DCCD1}">
-                <a14:hiddenFill xmlns="" xmlns:a14="http://schemas.microsoft.com/office/drawing/2010/main">
+                <a14:hiddenFill xmlns:a14="http://schemas.microsoft.com/office/drawing/2010/main" xmlns="">
                   <a:solidFill>
                     <a:srgbClr val="FFFFFF"/>
                   </a:solidFill>
@@ -19747,7 +19367,7 @@
             <a:noFill/>
             <a:extLst>
               <a:ext uri="{909E8E84-426E-40dd-AFC4-6F175D3DCCD1}">
-                <a14:hiddenFill xmlns="" xmlns:a14="http://schemas.microsoft.com/office/drawing/2010/main">
+                <a14:hiddenFill xmlns:a14="http://schemas.microsoft.com/office/drawing/2010/main" xmlns="">
                   <a:solidFill>
                     <a:srgbClr val="FFFFFF"/>
                   </a:solidFill>
@@ -19788,7 +19408,7 @@
             <a:noFill/>
             <a:extLst>
               <a:ext uri="{909E8E84-426E-40dd-AFC4-6F175D3DCCD1}">
-                <a14:hiddenFill xmlns="" xmlns:a14="http://schemas.microsoft.com/office/drawing/2010/main">
+                <a14:hiddenFill xmlns:a14="http://schemas.microsoft.com/office/drawing/2010/main" xmlns="">
                   <a:solidFill>
                     <a:srgbClr val="FFFFFF"/>
                   </a:solidFill>
@@ -19829,7 +19449,7 @@
             <a:noFill/>
             <a:extLst>
               <a:ext uri="{909E8E84-426E-40dd-AFC4-6F175D3DCCD1}">
-                <a14:hiddenFill xmlns="" xmlns:a14="http://schemas.microsoft.com/office/drawing/2010/main">
+                <a14:hiddenFill xmlns:a14="http://schemas.microsoft.com/office/drawing/2010/main" xmlns="">
                   <a:solidFill>
                     <a:srgbClr val="FFFFFF"/>
                   </a:solidFill>
@@ -20056,7 +19676,7 @@
             <a:noFill/>
             <a:extLst>
               <a:ext uri="{909E8E84-426E-40dd-AFC4-6F175D3DCCD1}">
-                <a14:hiddenFill xmlns="" xmlns:a14="http://schemas.microsoft.com/office/drawing/2010/main">
+                <a14:hiddenFill xmlns:a14="http://schemas.microsoft.com/office/drawing/2010/main" xmlns="">
                   <a:solidFill>
                     <a:srgbClr val="FFFFFF"/>
                   </a:solidFill>
@@ -20097,7 +19717,7 @@
             <a:noFill/>
             <a:extLst>
               <a:ext uri="{909E8E84-426E-40dd-AFC4-6F175D3DCCD1}">
-                <a14:hiddenFill xmlns="" xmlns:a14="http://schemas.microsoft.com/office/drawing/2010/main">
+                <a14:hiddenFill xmlns:a14="http://schemas.microsoft.com/office/drawing/2010/main" xmlns="">
                   <a:solidFill>
                     <a:srgbClr val="FFFFFF"/>
                   </a:solidFill>
@@ -20138,7 +19758,7 @@
             <a:noFill/>
             <a:extLst>
               <a:ext uri="{909E8E84-426E-40dd-AFC4-6F175D3DCCD1}">
-                <a14:hiddenFill xmlns="" xmlns:a14="http://schemas.microsoft.com/office/drawing/2010/main">
+                <a14:hiddenFill xmlns:a14="http://schemas.microsoft.com/office/drawing/2010/main" xmlns="">
                   <a:solidFill>
                     <a:srgbClr val="FFFFFF"/>
                   </a:solidFill>
@@ -20194,7 +19814,7 @@
             <a:noFill/>
             <a:extLst>
               <a:ext uri="{909E8E84-426E-40dd-AFC4-6F175D3DCCD1}">
-                <a14:hiddenFill xmlns="" xmlns:a14="http://schemas.microsoft.com/office/drawing/2010/main">
+                <a14:hiddenFill xmlns:a14="http://schemas.microsoft.com/office/drawing/2010/main" xmlns="">
                   <a:solidFill>
                     <a:srgbClr val="FFFFFF"/>
                   </a:solidFill>
@@ -20235,7 +19855,7 @@
             <a:noFill/>
             <a:extLst>
               <a:ext uri="{909E8E84-426E-40dd-AFC4-6F175D3DCCD1}">
-                <a14:hiddenFill xmlns="" xmlns:a14="http://schemas.microsoft.com/office/drawing/2010/main">
+                <a14:hiddenFill xmlns:a14="http://schemas.microsoft.com/office/drawing/2010/main" xmlns="">
                   <a:solidFill>
                     <a:srgbClr val="FFFFFF"/>
                   </a:solidFill>
@@ -20276,7 +19896,7 @@
             <a:noFill/>
             <a:extLst>
               <a:ext uri="{909E8E84-426E-40dd-AFC4-6F175D3DCCD1}">
-                <a14:hiddenFill xmlns="" xmlns:a14="http://schemas.microsoft.com/office/drawing/2010/main">
+                <a14:hiddenFill xmlns:a14="http://schemas.microsoft.com/office/drawing/2010/main" xmlns="">
                   <a:solidFill>
                     <a:srgbClr val="FFFFFF"/>
                   </a:solidFill>
@@ -22593,15 +22213,6 @@
 </file>
 
 <file path=customXml/item1.xml><?xml version="1.0" encoding="utf-8"?>
-<?mso-contentType ?>
-<FormTemplates xmlns="http://schemas.microsoft.com/sharepoint/v3/contenttype/forms">
-  <Display>DocumentLibraryForm</Display>
-  <Edit>DocumentLibraryForm</Edit>
-  <New>DocumentLibraryForm</New>
-</FormTemplates>
-</file>
-
-<file path=customXml/item2.xml><?xml version="1.0" encoding="utf-8"?>
 <p:properties xmlns:p="http://schemas.microsoft.com/office/2006/metadata/properties" xmlns:xsi="http://www.w3.org/2001/XMLSchema-instance" xmlns:pc="http://schemas.microsoft.com/office/infopath/2007/PartnerControls">
   <documentManagement>
     <_dlc_DocId xmlns="7bb5d761-a2ea-4873-95f7-7a6658fb3ef0">M4CWTKMW727E-592-73</_dlc_DocId>
@@ -22613,7 +22224,62 @@
 </p:properties>
 </file>
 
+<file path=customXml/item2.xml><?xml version="1.0" encoding="utf-8"?>
+<?mso-contentType ?>
+<FormTemplates xmlns="http://schemas.microsoft.com/sharepoint/v3/contenttype/forms">
+  <Display>DocumentLibraryForm</Display>
+  <Edit>DocumentLibraryForm</Edit>
+  <New>DocumentLibraryForm</New>
+</FormTemplates>
+</file>
+
 <file path=customXml/item3.xml><?xml version="1.0" encoding="utf-8"?>
+<?mso-contentType ?>
+<spe:Receivers xmlns:spe="http://schemas.microsoft.com/sharepoint/events">
+  <Receiver>
+    <Name>Document ID Generator</Name>
+    <Synchronization>Synchronous</Synchronization>
+    <Type>10001</Type>
+    <SequenceNumber>1000</SequenceNumber>
+    <Assembly>Microsoft.Office.DocumentManagement, Version=14.0.0.0, Culture=neutral, PublicKeyToken=71e9bce111e9429c</Assembly>
+    <Class>Microsoft.Office.DocumentManagement.Internal.DocIdHandler</Class>
+    <Data/>
+    <Filter/>
+  </Receiver>
+  <Receiver>
+    <Name>Document ID Generator</Name>
+    <Synchronization>Synchronous</Synchronization>
+    <Type>10002</Type>
+    <SequenceNumber>1001</SequenceNumber>
+    <Assembly>Microsoft.Office.DocumentManagement, Version=14.0.0.0, Culture=neutral, PublicKeyToken=71e9bce111e9429c</Assembly>
+    <Class>Microsoft.Office.DocumentManagement.Internal.DocIdHandler</Class>
+    <Data/>
+    <Filter/>
+  </Receiver>
+  <Receiver>
+    <Name>Document ID Generator</Name>
+    <Synchronization>Synchronous</Synchronization>
+    <Type>10004</Type>
+    <SequenceNumber>1002</SequenceNumber>
+    <Assembly>Microsoft.Office.DocumentManagement, Version=14.0.0.0, Culture=neutral, PublicKeyToken=71e9bce111e9429c</Assembly>
+    <Class>Microsoft.Office.DocumentManagement.Internal.DocIdHandler</Class>
+    <Data/>
+    <Filter/>
+  </Receiver>
+  <Receiver>
+    <Name>Document ID Generator</Name>
+    <Synchronization>Synchronous</Synchronization>
+    <Type>10006</Type>
+    <SequenceNumber>1003</SequenceNumber>
+    <Assembly>Microsoft.Office.DocumentManagement, Version=14.0.0.0, Culture=neutral, PublicKeyToken=71e9bce111e9429c</Assembly>
+    <Class>Microsoft.Office.DocumentManagement.Internal.DocIdHandler</Class>
+    <Data/>
+    <Filter/>
+  </Receiver>
+</spe:Receivers>
+</file>
+
+<file path=customXml/item4.xml><?xml version="1.0" encoding="utf-8"?>
 <ct:contentTypeSchema xmlns:ct="http://schemas.microsoft.com/office/2006/metadata/contentType" xmlns:ma="http://schemas.microsoft.com/office/2006/metadata/properties/metaAttributes" ct:_="" ma:_="" ma:contentTypeName="Document" ma:contentTypeID="0x0101000812F700BE7F874999720E88173FE491" ma:contentTypeVersion="0" ma:contentTypeDescription="Create a new document." ma:contentTypeScope="" ma:versionID="3f79f408e2ca720b7aba6e0e32464d0c">
   <xsd:schema xmlns:xsd="http://www.w3.org/2001/XMLSchema" xmlns:xs="http://www.w3.org/2001/XMLSchema" xmlns:p="http://schemas.microsoft.com/office/2006/metadata/properties" xmlns:ns2="7bb5d761-a2ea-4873-95f7-7a6658fb3ef0" targetNamespace="http://schemas.microsoft.com/office/2006/metadata/properties" ma:root="true" ma:fieldsID="1e062cd38ba31e406bfc4340fbc7f87a" ns2:_="">
     <xsd:import namespace="7bb5d761-a2ea-4873-95f7-7a6658fb3ef0"/>
@@ -22758,61 +22424,7 @@
 </ct:contentTypeSchema>
 </file>
 
-<file path=customXml/item4.xml><?xml version="1.0" encoding="utf-8"?>
-<?mso-contentType ?>
-<spe:Receivers xmlns:spe="http://schemas.microsoft.com/sharepoint/events">
-  <Receiver>
-    <Name>Document ID Generator</Name>
-    <Synchronization>Synchronous</Synchronization>
-    <Type>10001</Type>
-    <SequenceNumber>1000</SequenceNumber>
-    <Assembly>Microsoft.Office.DocumentManagement, Version=14.0.0.0, Culture=neutral, PublicKeyToken=71e9bce111e9429c</Assembly>
-    <Class>Microsoft.Office.DocumentManagement.Internal.DocIdHandler</Class>
-    <Data/>
-    <Filter/>
-  </Receiver>
-  <Receiver>
-    <Name>Document ID Generator</Name>
-    <Synchronization>Synchronous</Synchronization>
-    <Type>10002</Type>
-    <SequenceNumber>1001</SequenceNumber>
-    <Assembly>Microsoft.Office.DocumentManagement, Version=14.0.0.0, Culture=neutral, PublicKeyToken=71e9bce111e9429c</Assembly>
-    <Class>Microsoft.Office.DocumentManagement.Internal.DocIdHandler</Class>
-    <Data/>
-    <Filter/>
-  </Receiver>
-  <Receiver>
-    <Name>Document ID Generator</Name>
-    <Synchronization>Synchronous</Synchronization>
-    <Type>10004</Type>
-    <SequenceNumber>1002</SequenceNumber>
-    <Assembly>Microsoft.Office.DocumentManagement, Version=14.0.0.0, Culture=neutral, PublicKeyToken=71e9bce111e9429c</Assembly>
-    <Class>Microsoft.Office.DocumentManagement.Internal.DocIdHandler</Class>
-    <Data/>
-    <Filter/>
-  </Receiver>
-  <Receiver>
-    <Name>Document ID Generator</Name>
-    <Synchronization>Synchronous</Synchronization>
-    <Type>10006</Type>
-    <SequenceNumber>1003</SequenceNumber>
-    <Assembly>Microsoft.Office.DocumentManagement, Version=14.0.0.0, Culture=neutral, PublicKeyToken=71e9bce111e9429c</Assembly>
-    <Class>Microsoft.Office.DocumentManagement.Internal.DocIdHandler</Class>
-    <Data/>
-    <Filter/>
-  </Receiver>
-</spe:Receivers>
-</file>
-
 <file path=customXml/itemProps1.xml><?xml version="1.0" encoding="utf-8"?>
-<ds:datastoreItem xmlns:ds="http://schemas.openxmlformats.org/officeDocument/2006/customXml" ds:itemID="{5CDEB364-43EC-4510-9881-539C2A3FCE9E}">
-  <ds:schemaRefs>
-    <ds:schemaRef ds:uri="http://schemas.microsoft.com/sharepoint/v3/contenttype/forms"/>
-  </ds:schemaRefs>
-</ds:datastoreItem>
-</file>
-
-<file path=customXml/itemProps2.xml><?xml version="1.0" encoding="utf-8"?>
 <ds:datastoreItem xmlns:ds="http://schemas.openxmlformats.org/officeDocument/2006/customXml" ds:itemID="{6921749B-AEB7-461B-845F-603CABD25259}">
   <ds:schemaRefs>
     <ds:schemaRef ds:uri="http://schemas.microsoft.com/office/2006/documentManagement/types"/>
@@ -22828,7 +22440,23 @@
 </ds:datastoreItem>
 </file>
 
+<file path=customXml/itemProps2.xml><?xml version="1.0" encoding="utf-8"?>
+<ds:datastoreItem xmlns:ds="http://schemas.openxmlformats.org/officeDocument/2006/customXml" ds:itemID="{5CDEB364-43EC-4510-9881-539C2A3FCE9E}">
+  <ds:schemaRefs>
+    <ds:schemaRef ds:uri="http://schemas.microsoft.com/sharepoint/v3/contenttype/forms"/>
+  </ds:schemaRefs>
+</ds:datastoreItem>
+</file>
+
 <file path=customXml/itemProps3.xml><?xml version="1.0" encoding="utf-8"?>
+<ds:datastoreItem xmlns:ds="http://schemas.openxmlformats.org/officeDocument/2006/customXml" ds:itemID="{B13EBC30-FE27-4C6A-B723-23FC2188F7DC}">
+  <ds:schemaRefs>
+    <ds:schemaRef ds:uri="http://schemas.microsoft.com/sharepoint/events"/>
+  </ds:schemaRefs>
+</ds:datastoreItem>
+</file>
+
+<file path=customXml/itemProps4.xml><?xml version="1.0" encoding="utf-8"?>
 <ds:datastoreItem xmlns:ds="http://schemas.openxmlformats.org/officeDocument/2006/customXml" ds:itemID="{164479E5-0B02-49AC-B79E-EC1D6164DDD3}">
   <ds:schemaRefs>
     <ds:schemaRef ds:uri="http://schemas.microsoft.com/office/2006/metadata/contentType"/>
@@ -22844,12 +22472,4 @@
     <ds:schemaRef ds:uri="http://schemas.microsoft.com/internal/obd"/>
   </ds:schemaRefs>
 </ds:datastoreItem>
-</file>
-
-<file path=customXml/itemProps4.xml><?xml version="1.0" encoding="utf-8"?>
-<ds:datastoreItem xmlns:ds="http://schemas.openxmlformats.org/officeDocument/2006/customXml" ds:itemID="{B13EBC30-FE27-4C6A-B723-23FC2188F7DC}">
-  <ds:schemaRefs>
-    <ds:schemaRef ds:uri="http://schemas.microsoft.com/sharepoint/events"/>
-  </ds:schemaRefs>
-</ds:datastoreItem>
 </file>
</xml_diff>

<commit_message>
01-Intro.pptx modified pre-built Compliance profiles note on slide 1-7
</commit_message>
<xml_diff>
--- a/01-Intro.pptx
+++ b/01-Intro.pptx
@@ -1035,11 +1035,7 @@
             </a:pPr>
             <a:r>
               <a:rPr lang="en-US" dirty="0" smtClean="0"/>
-              <a:t>Instructor </a:t>
-            </a:r>
-            <a:r>
-              <a:rPr lang="en-US" dirty="0" smtClean="0"/>
-              <a:t>Note: This course has been tested on</a:t>
+              <a:t>Instructor Note: This course has been tested on</a:t>
             </a:r>
             <a:r>
               <a:rPr lang="en-US" baseline="0" dirty="0" smtClean="0"/>
@@ -2639,11 +2635,7 @@
           <a:p>
             <a:r>
               <a:rPr lang="en-US" dirty="0" smtClean="0"/>
-              <a:t>Instructor </a:t>
-            </a:r>
-            <a:r>
-              <a:rPr lang="en-US" dirty="0" smtClean="0"/>
-              <a:t>Note: You can tell the students that this course covers scanning and remediating both Linux and Windows nodes.</a:t>
+              <a:t>Instructor Note: You can tell the students that this course covers scanning and remediating both Linux and Windows nodes.</a:t>
             </a:r>
             <a:r>
               <a:rPr lang="en-US" baseline="0" dirty="0" smtClean="0"/>
@@ -4526,14 +4518,14 @@
           </a:ln>
           <a:extLst>
             <a:ext uri="{909E8E84-426E-40dd-AFC4-6F175D3DCCD1}">
-              <a14:hiddenFill xmlns:a14="http://schemas.microsoft.com/office/drawing/2010/main" xmlns="">
+              <a14:hiddenFill xmlns="" xmlns:a14="http://schemas.microsoft.com/office/drawing/2010/main">
                 <a:solidFill>
                   <a:srgbClr val="FFFFFF"/>
                 </a:solidFill>
               </a14:hiddenFill>
             </a:ext>
             <a:ext uri="{91240B29-F687-4f45-9708-019B960494DF}">
-              <a14:hiddenLine xmlns:a14="http://schemas.microsoft.com/office/drawing/2010/main" xmlns="" w="9525">
+              <a14:hiddenLine xmlns="" xmlns:a14="http://schemas.microsoft.com/office/drawing/2010/main" w="9525">
                 <a:solidFill>
                   <a:srgbClr val="000000"/>
                 </a:solidFill>
@@ -4681,14 +4673,14 @@
           </a:ln>
           <a:extLst>
             <a:ext uri="{909E8E84-426E-40dd-AFC4-6F175D3DCCD1}">
-              <a14:hiddenFill xmlns:a14="http://schemas.microsoft.com/office/drawing/2010/main" xmlns="">
+              <a14:hiddenFill xmlns="" xmlns:a14="http://schemas.microsoft.com/office/drawing/2010/main">
                 <a:solidFill>
                   <a:srgbClr val="FFFFFF"/>
                 </a:solidFill>
               </a14:hiddenFill>
             </a:ext>
             <a:ext uri="{91240B29-F687-4f45-9708-019B960494DF}">
-              <a14:hiddenLine xmlns:a14="http://schemas.microsoft.com/office/drawing/2010/main" xmlns="" w="9525">
+              <a14:hiddenLine xmlns="" xmlns:a14="http://schemas.microsoft.com/office/drawing/2010/main" w="9525">
                 <a:solidFill>
                   <a:srgbClr val="000000"/>
                 </a:solidFill>
@@ -5179,14 +5171,14 @@
           </a:ln>
           <a:extLst>
             <a:ext uri="{909E8E84-426E-40dd-AFC4-6F175D3DCCD1}">
-              <a14:hiddenFill xmlns:a14="http://schemas.microsoft.com/office/drawing/2010/main" xmlns="">
+              <a14:hiddenFill xmlns="" xmlns:a14="http://schemas.microsoft.com/office/drawing/2010/main">
                 <a:solidFill>
                   <a:srgbClr val="FFFFFF"/>
                 </a:solidFill>
               </a14:hiddenFill>
             </a:ext>
             <a:ext uri="{91240B29-F687-4f45-9708-019B960494DF}">
-              <a14:hiddenLine xmlns:a14="http://schemas.microsoft.com/office/drawing/2010/main" xmlns="" w="9525">
+              <a14:hiddenLine xmlns="" xmlns:a14="http://schemas.microsoft.com/office/drawing/2010/main" w="9525">
                 <a:solidFill>
                   <a:srgbClr val="000000"/>
                 </a:solidFill>
@@ -7995,14 +7987,14 @@
           </a:ln>
           <a:extLst>
             <a:ext uri="{909E8E84-426E-40dd-AFC4-6F175D3DCCD1}">
-              <a14:hiddenFill xmlns:a14="http://schemas.microsoft.com/office/drawing/2010/main" xmlns="">
+              <a14:hiddenFill xmlns="" xmlns:a14="http://schemas.microsoft.com/office/drawing/2010/main">
                 <a:solidFill>
                   <a:srgbClr val="FFFFFF"/>
                 </a:solidFill>
               </a14:hiddenFill>
             </a:ext>
             <a:ext uri="{91240B29-F687-4f45-9708-019B960494DF}">
-              <a14:hiddenLine xmlns:a14="http://schemas.microsoft.com/office/drawing/2010/main" xmlns="" w="9525">
+              <a14:hiddenLine xmlns="" xmlns:a14="http://schemas.microsoft.com/office/drawing/2010/main" w="9525">
                 <a:solidFill>
                   <a:srgbClr val="000000"/>
                 </a:solidFill>
@@ -9359,14 +9351,14 @@
           </a:ln>
           <a:extLst>
             <a:ext uri="{909E8E84-426E-40dd-AFC4-6F175D3DCCD1}">
-              <a14:hiddenFill xmlns:a14="http://schemas.microsoft.com/office/drawing/2010/main" xmlns="">
+              <a14:hiddenFill xmlns="" xmlns:a14="http://schemas.microsoft.com/office/drawing/2010/main">
                 <a:solidFill>
                   <a:srgbClr val="FFFFFF"/>
                 </a:solidFill>
               </a14:hiddenFill>
             </a:ext>
             <a:ext uri="{91240B29-F687-4f45-9708-019B960494DF}">
-              <a14:hiddenLine xmlns:a14="http://schemas.microsoft.com/office/drawing/2010/main" xmlns="" w="9525">
+              <a14:hiddenLine xmlns="" xmlns:a14="http://schemas.microsoft.com/office/drawing/2010/main" w="9525">
                 <a:solidFill>
                   <a:srgbClr val="000000"/>
                 </a:solidFill>
@@ -9924,14 +9916,14 @@
           </a:ln>
           <a:extLst>
             <a:ext uri="{909E8E84-426E-40dd-AFC4-6F175D3DCCD1}">
-              <a14:hiddenFill xmlns:a14="http://schemas.microsoft.com/office/drawing/2010/main" xmlns="">
+              <a14:hiddenFill xmlns="" xmlns:a14="http://schemas.microsoft.com/office/drawing/2010/main">
                 <a:solidFill>
                   <a:srgbClr val="FFFFFF"/>
                 </a:solidFill>
               </a14:hiddenFill>
             </a:ext>
             <a:ext uri="{91240B29-F687-4f45-9708-019B960494DF}">
-              <a14:hiddenLine xmlns:a14="http://schemas.microsoft.com/office/drawing/2010/main" xmlns="" w="9525">
+              <a14:hiddenLine xmlns="" xmlns:a14="http://schemas.microsoft.com/office/drawing/2010/main" w="9525">
                 <a:solidFill>
                   <a:srgbClr val="000000"/>
                 </a:solidFill>
@@ -10498,14 +10490,14 @@
           </a:ln>
           <a:extLst>
             <a:ext uri="{909E8E84-426E-40dd-AFC4-6F175D3DCCD1}">
-              <a14:hiddenFill xmlns:a14="http://schemas.microsoft.com/office/drawing/2010/main" xmlns="">
+              <a14:hiddenFill xmlns="" xmlns:a14="http://schemas.microsoft.com/office/drawing/2010/main">
                 <a:solidFill>
                   <a:srgbClr val="FFFFFF"/>
                 </a:solidFill>
               </a14:hiddenFill>
             </a:ext>
             <a:ext uri="{91240B29-F687-4f45-9708-019B960494DF}">
-              <a14:hiddenLine xmlns:a14="http://schemas.microsoft.com/office/drawing/2010/main" xmlns="" w="9525">
+              <a14:hiddenLine xmlns="" xmlns:a14="http://schemas.microsoft.com/office/drawing/2010/main" w="9525">
                 <a:solidFill>
                   <a:srgbClr val="000000"/>
                 </a:solidFill>
@@ -11445,14 +11437,14 @@
           </a:ln>
           <a:extLst>
             <a:ext uri="{909E8E84-426E-40dd-AFC4-6F175D3DCCD1}">
-              <a14:hiddenFill xmlns:a14="http://schemas.microsoft.com/office/drawing/2010/main" xmlns="">
+              <a14:hiddenFill xmlns="" xmlns:a14="http://schemas.microsoft.com/office/drawing/2010/main">
                 <a:solidFill>
                   <a:srgbClr val="FFFFFF"/>
                 </a:solidFill>
               </a14:hiddenFill>
             </a:ext>
             <a:ext uri="{91240B29-F687-4f45-9708-019B960494DF}">
-              <a14:hiddenLine xmlns:a14="http://schemas.microsoft.com/office/drawing/2010/main" xmlns="" w="9525">
+              <a14:hiddenLine xmlns="" xmlns:a14="http://schemas.microsoft.com/office/drawing/2010/main" w="9525">
                 <a:solidFill>
                   <a:srgbClr val="000000"/>
                 </a:solidFill>
@@ -12206,14 +12198,14 @@
           </a:ln>
           <a:extLst>
             <a:ext uri="{909E8E84-426E-40dd-AFC4-6F175D3DCCD1}">
-              <a14:hiddenFill xmlns:a14="http://schemas.microsoft.com/office/drawing/2010/main" xmlns="">
+              <a14:hiddenFill xmlns="" xmlns:a14="http://schemas.microsoft.com/office/drawing/2010/main">
                 <a:solidFill>
                   <a:srgbClr val="FFFFFF"/>
                 </a:solidFill>
               </a14:hiddenFill>
             </a:ext>
             <a:ext uri="{91240B29-F687-4f45-9708-019B960494DF}">
-              <a14:hiddenLine xmlns:a14="http://schemas.microsoft.com/office/drawing/2010/main" xmlns="" w="9525">
+              <a14:hiddenLine xmlns="" xmlns:a14="http://schemas.microsoft.com/office/drawing/2010/main" w="9525">
                 <a:solidFill>
                   <a:srgbClr val="000000"/>
                 </a:solidFill>
@@ -19091,7 +19083,7 @@
             <a:noFill/>
             <a:extLst>
               <a:ext uri="{909E8E84-426E-40dd-AFC4-6F175D3DCCD1}">
-                <a14:hiddenFill xmlns:a14="http://schemas.microsoft.com/office/drawing/2010/main" xmlns="">
+                <a14:hiddenFill xmlns="" xmlns:a14="http://schemas.microsoft.com/office/drawing/2010/main">
                   <a:solidFill>
                     <a:srgbClr val="FFFFFF"/>
                   </a:solidFill>
@@ -19132,7 +19124,7 @@
             <a:noFill/>
             <a:extLst>
               <a:ext uri="{909E8E84-426E-40dd-AFC4-6F175D3DCCD1}">
-                <a14:hiddenFill xmlns:a14="http://schemas.microsoft.com/office/drawing/2010/main" xmlns="">
+                <a14:hiddenFill xmlns="" xmlns:a14="http://schemas.microsoft.com/office/drawing/2010/main">
                   <a:solidFill>
                     <a:srgbClr val="FFFFFF"/>
                   </a:solidFill>
@@ -19173,7 +19165,7 @@
             <a:noFill/>
             <a:extLst>
               <a:ext uri="{909E8E84-426E-40dd-AFC4-6F175D3DCCD1}">
-                <a14:hiddenFill xmlns:a14="http://schemas.microsoft.com/office/drawing/2010/main" xmlns="">
+                <a14:hiddenFill xmlns="" xmlns:a14="http://schemas.microsoft.com/office/drawing/2010/main">
                   <a:solidFill>
                     <a:srgbClr val="FFFFFF"/>
                   </a:solidFill>
@@ -19229,7 +19221,7 @@
             <a:noFill/>
             <a:extLst>
               <a:ext uri="{909E8E84-426E-40dd-AFC4-6F175D3DCCD1}">
-                <a14:hiddenFill xmlns:a14="http://schemas.microsoft.com/office/drawing/2010/main" xmlns="">
+                <a14:hiddenFill xmlns="" xmlns:a14="http://schemas.microsoft.com/office/drawing/2010/main">
                   <a:solidFill>
                     <a:srgbClr val="FFFFFF"/>
                   </a:solidFill>
@@ -19270,7 +19262,7 @@
             <a:noFill/>
             <a:extLst>
               <a:ext uri="{909E8E84-426E-40dd-AFC4-6F175D3DCCD1}">
-                <a14:hiddenFill xmlns:a14="http://schemas.microsoft.com/office/drawing/2010/main" xmlns="">
+                <a14:hiddenFill xmlns="" xmlns:a14="http://schemas.microsoft.com/office/drawing/2010/main">
                   <a:solidFill>
                     <a:srgbClr val="FFFFFF"/>
                   </a:solidFill>
@@ -19311,7 +19303,7 @@
             <a:noFill/>
             <a:extLst>
               <a:ext uri="{909E8E84-426E-40dd-AFC4-6F175D3DCCD1}">
-                <a14:hiddenFill xmlns:a14="http://schemas.microsoft.com/office/drawing/2010/main" xmlns="">
+                <a14:hiddenFill xmlns="" xmlns:a14="http://schemas.microsoft.com/office/drawing/2010/main">
                   <a:solidFill>
                     <a:srgbClr val="FFFFFF"/>
                   </a:solidFill>
@@ -19367,7 +19359,7 @@
             <a:noFill/>
             <a:extLst>
               <a:ext uri="{909E8E84-426E-40dd-AFC4-6F175D3DCCD1}">
-                <a14:hiddenFill xmlns:a14="http://schemas.microsoft.com/office/drawing/2010/main" xmlns="">
+                <a14:hiddenFill xmlns="" xmlns:a14="http://schemas.microsoft.com/office/drawing/2010/main">
                   <a:solidFill>
                     <a:srgbClr val="FFFFFF"/>
                   </a:solidFill>
@@ -19408,7 +19400,7 @@
             <a:noFill/>
             <a:extLst>
               <a:ext uri="{909E8E84-426E-40dd-AFC4-6F175D3DCCD1}">
-                <a14:hiddenFill xmlns:a14="http://schemas.microsoft.com/office/drawing/2010/main" xmlns="">
+                <a14:hiddenFill xmlns="" xmlns:a14="http://schemas.microsoft.com/office/drawing/2010/main">
                   <a:solidFill>
                     <a:srgbClr val="FFFFFF"/>
                   </a:solidFill>
@@ -19449,7 +19441,7 @@
             <a:noFill/>
             <a:extLst>
               <a:ext uri="{909E8E84-426E-40dd-AFC4-6F175D3DCCD1}">
-                <a14:hiddenFill xmlns:a14="http://schemas.microsoft.com/office/drawing/2010/main" xmlns="">
+                <a14:hiddenFill xmlns="" xmlns:a14="http://schemas.microsoft.com/office/drawing/2010/main">
                   <a:solidFill>
                     <a:srgbClr val="FFFFFF"/>
                   </a:solidFill>
@@ -19676,7 +19668,7 @@
             <a:noFill/>
             <a:extLst>
               <a:ext uri="{909E8E84-426E-40dd-AFC4-6F175D3DCCD1}">
-                <a14:hiddenFill xmlns:a14="http://schemas.microsoft.com/office/drawing/2010/main" xmlns="">
+                <a14:hiddenFill xmlns="" xmlns:a14="http://schemas.microsoft.com/office/drawing/2010/main">
                   <a:solidFill>
                     <a:srgbClr val="FFFFFF"/>
                   </a:solidFill>
@@ -19717,7 +19709,7 @@
             <a:noFill/>
             <a:extLst>
               <a:ext uri="{909E8E84-426E-40dd-AFC4-6F175D3DCCD1}">
-                <a14:hiddenFill xmlns:a14="http://schemas.microsoft.com/office/drawing/2010/main" xmlns="">
+                <a14:hiddenFill xmlns="" xmlns:a14="http://schemas.microsoft.com/office/drawing/2010/main">
                   <a:solidFill>
                     <a:srgbClr val="FFFFFF"/>
                   </a:solidFill>
@@ -19758,7 +19750,7 @@
             <a:noFill/>
             <a:extLst>
               <a:ext uri="{909E8E84-426E-40dd-AFC4-6F175D3DCCD1}">
-                <a14:hiddenFill xmlns:a14="http://schemas.microsoft.com/office/drawing/2010/main" xmlns="">
+                <a14:hiddenFill xmlns="" xmlns:a14="http://schemas.microsoft.com/office/drawing/2010/main">
                   <a:solidFill>
                     <a:srgbClr val="FFFFFF"/>
                   </a:solidFill>
@@ -19814,7 +19806,7 @@
             <a:noFill/>
             <a:extLst>
               <a:ext uri="{909E8E84-426E-40dd-AFC4-6F175D3DCCD1}">
-                <a14:hiddenFill xmlns:a14="http://schemas.microsoft.com/office/drawing/2010/main" xmlns="">
+                <a14:hiddenFill xmlns="" xmlns:a14="http://schemas.microsoft.com/office/drawing/2010/main">
                   <a:solidFill>
                     <a:srgbClr val="FFFFFF"/>
                   </a:solidFill>
@@ -19855,7 +19847,7 @@
             <a:noFill/>
             <a:extLst>
               <a:ext uri="{909E8E84-426E-40dd-AFC4-6F175D3DCCD1}">
-                <a14:hiddenFill xmlns:a14="http://schemas.microsoft.com/office/drawing/2010/main" xmlns="">
+                <a14:hiddenFill xmlns="" xmlns:a14="http://schemas.microsoft.com/office/drawing/2010/main">
                   <a:solidFill>
                     <a:srgbClr val="FFFFFF"/>
                   </a:solidFill>
@@ -19896,7 +19888,7 @@
             <a:noFill/>
             <a:extLst>
               <a:ext uri="{909E8E84-426E-40dd-AFC4-6F175D3DCCD1}">
-                <a14:hiddenFill xmlns:a14="http://schemas.microsoft.com/office/drawing/2010/main" xmlns="">
+                <a14:hiddenFill xmlns="" xmlns:a14="http://schemas.microsoft.com/office/drawing/2010/main">
                   <a:solidFill>
                     <a:srgbClr val="FFFFFF"/>
                   </a:solidFill>
@@ -20139,20 +20131,21 @@
             </a:r>
             <a:r>
               <a:rPr lang="en-US" dirty="0"/>
-              <a:t>started quickly with pre-built profiles for CIS</a:t>
-            </a:r>
-            <a:r>
-              <a:rPr lang="en-US"/>
-              <a:t>, </a:t>
-            </a:r>
-            <a:r>
-              <a:rPr lang="en-US" smtClean="0"/>
-              <a:t>Linux, </a:t>
+              <a:t>started quickly with pre-built </a:t>
             </a:r>
             <a:r>
               <a:rPr lang="en-US" dirty="0" smtClean="0"/>
-              <a:t>and Windows.</a:t>
-            </a:r>
+              <a:t>Compliance profiles for scanning Linux </a:t>
+            </a:r>
+            <a:r>
+              <a:rPr lang="en-US" dirty="0" smtClean="0"/>
+              <a:t>and </a:t>
+            </a:r>
+            <a:r>
+              <a:rPr lang="en-US" dirty="0" smtClean="0"/>
+              <a:t>Windows nodes.</a:t>
+            </a:r>
+            <a:endParaRPr lang="en-US" dirty="0" smtClean="0"/>
           </a:p>
           <a:p>
             <a:endParaRPr lang="en-US" dirty="0" smtClean="0"/>
@@ -22213,6 +22206,15 @@
 </file>
 
 <file path=customXml/item1.xml><?xml version="1.0" encoding="utf-8"?>
+<?mso-contentType ?>
+<FormTemplates xmlns="http://schemas.microsoft.com/sharepoint/v3/contenttype/forms">
+  <Display>DocumentLibraryForm</Display>
+  <Edit>DocumentLibraryForm</Edit>
+  <New>DocumentLibraryForm</New>
+</FormTemplates>
+</file>
+
+<file path=customXml/item2.xml><?xml version="1.0" encoding="utf-8"?>
 <p:properties xmlns:p="http://schemas.microsoft.com/office/2006/metadata/properties" xmlns:xsi="http://www.w3.org/2001/XMLSchema-instance" xmlns:pc="http://schemas.microsoft.com/office/infopath/2007/PartnerControls">
   <documentManagement>
     <_dlc_DocId xmlns="7bb5d761-a2ea-4873-95f7-7a6658fb3ef0">M4CWTKMW727E-592-73</_dlc_DocId>
@@ -22224,62 +22226,7 @@
 </p:properties>
 </file>
 
-<file path=customXml/item2.xml><?xml version="1.0" encoding="utf-8"?>
-<?mso-contentType ?>
-<FormTemplates xmlns="http://schemas.microsoft.com/sharepoint/v3/contenttype/forms">
-  <Display>DocumentLibraryForm</Display>
-  <Edit>DocumentLibraryForm</Edit>
-  <New>DocumentLibraryForm</New>
-</FormTemplates>
-</file>
-
 <file path=customXml/item3.xml><?xml version="1.0" encoding="utf-8"?>
-<?mso-contentType ?>
-<spe:Receivers xmlns:spe="http://schemas.microsoft.com/sharepoint/events">
-  <Receiver>
-    <Name>Document ID Generator</Name>
-    <Synchronization>Synchronous</Synchronization>
-    <Type>10001</Type>
-    <SequenceNumber>1000</SequenceNumber>
-    <Assembly>Microsoft.Office.DocumentManagement, Version=14.0.0.0, Culture=neutral, PublicKeyToken=71e9bce111e9429c</Assembly>
-    <Class>Microsoft.Office.DocumentManagement.Internal.DocIdHandler</Class>
-    <Data/>
-    <Filter/>
-  </Receiver>
-  <Receiver>
-    <Name>Document ID Generator</Name>
-    <Synchronization>Synchronous</Synchronization>
-    <Type>10002</Type>
-    <SequenceNumber>1001</SequenceNumber>
-    <Assembly>Microsoft.Office.DocumentManagement, Version=14.0.0.0, Culture=neutral, PublicKeyToken=71e9bce111e9429c</Assembly>
-    <Class>Microsoft.Office.DocumentManagement.Internal.DocIdHandler</Class>
-    <Data/>
-    <Filter/>
-  </Receiver>
-  <Receiver>
-    <Name>Document ID Generator</Name>
-    <Synchronization>Synchronous</Synchronization>
-    <Type>10004</Type>
-    <SequenceNumber>1002</SequenceNumber>
-    <Assembly>Microsoft.Office.DocumentManagement, Version=14.0.0.0, Culture=neutral, PublicKeyToken=71e9bce111e9429c</Assembly>
-    <Class>Microsoft.Office.DocumentManagement.Internal.DocIdHandler</Class>
-    <Data/>
-    <Filter/>
-  </Receiver>
-  <Receiver>
-    <Name>Document ID Generator</Name>
-    <Synchronization>Synchronous</Synchronization>
-    <Type>10006</Type>
-    <SequenceNumber>1003</SequenceNumber>
-    <Assembly>Microsoft.Office.DocumentManagement, Version=14.0.0.0, Culture=neutral, PublicKeyToken=71e9bce111e9429c</Assembly>
-    <Class>Microsoft.Office.DocumentManagement.Internal.DocIdHandler</Class>
-    <Data/>
-    <Filter/>
-  </Receiver>
-</spe:Receivers>
-</file>
-
-<file path=customXml/item4.xml><?xml version="1.0" encoding="utf-8"?>
 <ct:contentTypeSchema xmlns:ct="http://schemas.microsoft.com/office/2006/metadata/contentType" xmlns:ma="http://schemas.microsoft.com/office/2006/metadata/properties/metaAttributes" ct:_="" ma:_="" ma:contentTypeName="Document" ma:contentTypeID="0x0101000812F700BE7F874999720E88173FE491" ma:contentTypeVersion="0" ma:contentTypeDescription="Create a new document." ma:contentTypeScope="" ma:versionID="3f79f408e2ca720b7aba6e0e32464d0c">
   <xsd:schema xmlns:xsd="http://www.w3.org/2001/XMLSchema" xmlns:xs="http://www.w3.org/2001/XMLSchema" xmlns:p="http://schemas.microsoft.com/office/2006/metadata/properties" xmlns:ns2="7bb5d761-a2ea-4873-95f7-7a6658fb3ef0" targetNamespace="http://schemas.microsoft.com/office/2006/metadata/properties" ma:root="true" ma:fieldsID="1e062cd38ba31e406bfc4340fbc7f87a" ns2:_="">
     <xsd:import namespace="7bb5d761-a2ea-4873-95f7-7a6658fb3ef0"/>
@@ -22424,7 +22371,61 @@
 </ct:contentTypeSchema>
 </file>
 
+<file path=customXml/item4.xml><?xml version="1.0" encoding="utf-8"?>
+<?mso-contentType ?>
+<spe:Receivers xmlns:spe="http://schemas.microsoft.com/sharepoint/events">
+  <Receiver>
+    <Name>Document ID Generator</Name>
+    <Synchronization>Synchronous</Synchronization>
+    <Type>10001</Type>
+    <SequenceNumber>1000</SequenceNumber>
+    <Assembly>Microsoft.Office.DocumentManagement, Version=14.0.0.0, Culture=neutral, PublicKeyToken=71e9bce111e9429c</Assembly>
+    <Class>Microsoft.Office.DocumentManagement.Internal.DocIdHandler</Class>
+    <Data/>
+    <Filter/>
+  </Receiver>
+  <Receiver>
+    <Name>Document ID Generator</Name>
+    <Synchronization>Synchronous</Synchronization>
+    <Type>10002</Type>
+    <SequenceNumber>1001</SequenceNumber>
+    <Assembly>Microsoft.Office.DocumentManagement, Version=14.0.0.0, Culture=neutral, PublicKeyToken=71e9bce111e9429c</Assembly>
+    <Class>Microsoft.Office.DocumentManagement.Internal.DocIdHandler</Class>
+    <Data/>
+    <Filter/>
+  </Receiver>
+  <Receiver>
+    <Name>Document ID Generator</Name>
+    <Synchronization>Synchronous</Synchronization>
+    <Type>10004</Type>
+    <SequenceNumber>1002</SequenceNumber>
+    <Assembly>Microsoft.Office.DocumentManagement, Version=14.0.0.0, Culture=neutral, PublicKeyToken=71e9bce111e9429c</Assembly>
+    <Class>Microsoft.Office.DocumentManagement.Internal.DocIdHandler</Class>
+    <Data/>
+    <Filter/>
+  </Receiver>
+  <Receiver>
+    <Name>Document ID Generator</Name>
+    <Synchronization>Synchronous</Synchronization>
+    <Type>10006</Type>
+    <SequenceNumber>1003</SequenceNumber>
+    <Assembly>Microsoft.Office.DocumentManagement, Version=14.0.0.0, Culture=neutral, PublicKeyToken=71e9bce111e9429c</Assembly>
+    <Class>Microsoft.Office.DocumentManagement.Internal.DocIdHandler</Class>
+    <Data/>
+    <Filter/>
+  </Receiver>
+</spe:Receivers>
+</file>
+
 <file path=customXml/itemProps1.xml><?xml version="1.0" encoding="utf-8"?>
+<ds:datastoreItem xmlns:ds="http://schemas.openxmlformats.org/officeDocument/2006/customXml" ds:itemID="{5CDEB364-43EC-4510-9881-539C2A3FCE9E}">
+  <ds:schemaRefs>
+    <ds:schemaRef ds:uri="http://schemas.microsoft.com/sharepoint/v3/contenttype/forms"/>
+  </ds:schemaRefs>
+</ds:datastoreItem>
+</file>
+
+<file path=customXml/itemProps2.xml><?xml version="1.0" encoding="utf-8"?>
 <ds:datastoreItem xmlns:ds="http://schemas.openxmlformats.org/officeDocument/2006/customXml" ds:itemID="{6921749B-AEB7-461B-845F-603CABD25259}">
   <ds:schemaRefs>
     <ds:schemaRef ds:uri="http://schemas.microsoft.com/office/2006/documentManagement/types"/>
@@ -22440,23 +22441,7 @@
 </ds:datastoreItem>
 </file>
 
-<file path=customXml/itemProps2.xml><?xml version="1.0" encoding="utf-8"?>
-<ds:datastoreItem xmlns:ds="http://schemas.openxmlformats.org/officeDocument/2006/customXml" ds:itemID="{5CDEB364-43EC-4510-9881-539C2A3FCE9E}">
-  <ds:schemaRefs>
-    <ds:schemaRef ds:uri="http://schemas.microsoft.com/sharepoint/v3/contenttype/forms"/>
-  </ds:schemaRefs>
-</ds:datastoreItem>
-</file>
-
 <file path=customXml/itemProps3.xml><?xml version="1.0" encoding="utf-8"?>
-<ds:datastoreItem xmlns:ds="http://schemas.openxmlformats.org/officeDocument/2006/customXml" ds:itemID="{B13EBC30-FE27-4C6A-B723-23FC2188F7DC}">
-  <ds:schemaRefs>
-    <ds:schemaRef ds:uri="http://schemas.microsoft.com/sharepoint/events"/>
-  </ds:schemaRefs>
-</ds:datastoreItem>
-</file>
-
-<file path=customXml/itemProps4.xml><?xml version="1.0" encoding="utf-8"?>
 <ds:datastoreItem xmlns:ds="http://schemas.openxmlformats.org/officeDocument/2006/customXml" ds:itemID="{164479E5-0B02-49AC-B79E-EC1D6164DDD3}">
   <ds:schemaRefs>
     <ds:schemaRef ds:uri="http://schemas.microsoft.com/office/2006/metadata/contentType"/>
@@ -22472,4 +22457,12 @@
     <ds:schemaRef ds:uri="http://schemas.microsoft.com/internal/obd"/>
   </ds:schemaRefs>
 </ds:datastoreItem>
+</file>
+
+<file path=customXml/itemProps4.xml><?xml version="1.0" encoding="utf-8"?>
+<ds:datastoreItem xmlns:ds="http://schemas.openxmlformats.org/officeDocument/2006/customXml" ds:itemID="{B13EBC30-FE27-4C6A-B723-23FC2188F7DC}">
+  <ds:schemaRefs>
+    <ds:schemaRef ds:uri="http://schemas.microsoft.com/sharepoint/events"/>
+  </ds:schemaRefs>
+</ds:datastoreItem>
 </file>
</xml_diff>

<commit_message>
01-Intro replaced graphics on 1-8 and 1-12
</commit_message>
<xml_diff>
--- a/01-Intro.pptx
+++ b/01-Intro.pptx
@@ -291,7 +291,7 @@
               <a:pPr>
                 <a:defRPr/>
               </a:pPr>
-              <a:t>2016-02-04</a:t>
+              <a:t>2016-02-09</a:t>
             </a:fld>
             <a:endParaRPr lang="en-US" dirty="0"/>
           </a:p>
@@ -474,7 +474,7 @@
               <a:pPr>
                 <a:defRPr/>
               </a:pPr>
-              <a:t>2016-02-04</a:t>
+              <a:t>2016-02-09</a:t>
             </a:fld>
             <a:endParaRPr lang="en-US" dirty="0"/>
           </a:p>
@@ -3740,6 +3740,18 @@
           <a:bodyPr/>
           <a:lstStyle/>
           <a:p>
+            <a:r>
+              <a:rPr lang="en-US" dirty="0" smtClean="0"/>
+              <a:t>TBD: Check this </a:t>
+            </a:r>
+            <a:r>
+              <a:rPr lang="en-US" smtClean="0"/>
+              <a:t>and previous </a:t>
+            </a:r>
+            <a:r>
+              <a:rPr lang="en-US" dirty="0" smtClean="0"/>
+              <a:t>images.</a:t>
+            </a:r>
             <a:endParaRPr lang="en-US" dirty="0"/>
           </a:p>
         </p:txBody>
@@ -14022,7 +14034,7 @@
         <p:spPr>
           <a:xfrm>
             <a:off x="243840" y="2039078"/>
-            <a:ext cx="3630328" cy="5345953"/>
+            <a:ext cx="3630328" cy="5818253"/>
           </a:xfrm>
         </p:spPr>
         <p:txBody>
@@ -14053,14 +14065,23 @@
             </a:r>
             <a:r>
               <a:rPr lang="en-US" dirty="0" smtClean="0"/>
-              <a:t>UI. </a:t>
-            </a:r>
+              <a:t>UI</a:t>
+            </a:r>
+            <a:r>
+              <a:rPr lang="en-US" dirty="0"/>
+              <a:t> </a:t>
+            </a:r>
+            <a:r>
+              <a:rPr lang="en-US" dirty="0" smtClean="0"/>
+              <a:t>as well.</a:t>
+            </a:r>
+            <a:endParaRPr lang="en-US" dirty="0" smtClean="0"/>
           </a:p>
         </p:txBody>
       </p:sp>
       <p:pic>
         <p:nvPicPr>
-          <p:cNvPr id="4" name="Picture 3"/>
+          <p:cNvPr id="5" name="Picture 4"/>
           <p:cNvPicPr>
             <a:picLocks noChangeAspect="1"/>
           </p:cNvPicPr>
@@ -14074,8 +14095,8 @@
         </p:blipFill>
         <p:spPr>
           <a:xfrm>
-            <a:off x="4344721" y="708660"/>
-            <a:ext cx="11865559" cy="7065645"/>
+            <a:off x="4953000" y="503237"/>
+            <a:ext cx="10363200" cy="7354094"/>
           </a:xfrm>
           <a:prstGeom prst="rect">
             <a:avLst/>
@@ -20135,17 +20156,8 @@
             </a:r>
             <a:r>
               <a:rPr lang="en-US" dirty="0" smtClean="0"/>
-              <a:t>Compliance profiles for scanning Linux </a:t>
-            </a:r>
-            <a:r>
-              <a:rPr lang="en-US" dirty="0" smtClean="0"/>
-              <a:t>and </a:t>
-            </a:r>
-            <a:r>
-              <a:rPr lang="en-US" dirty="0" smtClean="0"/>
-              <a:t>Windows nodes.</a:t>
-            </a:r>
-            <a:endParaRPr lang="en-US" dirty="0" smtClean="0"/>
+              <a:t>Compliance profiles for scanning Linux and Windows nodes.</a:t>
+            </a:r>
           </a:p>
           <a:p>
             <a:endParaRPr lang="en-US" dirty="0" smtClean="0"/>
@@ -20298,36 +20310,304 @@
           </a:p>
         </p:txBody>
       </p:sp>
-      <p:pic>
-        <p:nvPicPr>
-          <p:cNvPr id="7" name="Picture 6"/>
-          <p:cNvPicPr>
-            <a:picLocks noChangeAspect="1"/>
-          </p:cNvPicPr>
+      <p:sp>
+        <p:nvSpPr>
+          <p:cNvPr id="5" name="Text Placeholder 2"/>
+          <p:cNvSpPr txBox="1">
+            <a:spLocks/>
+          </p:cNvSpPr>
           <p:nvPr/>
-        </p:nvPicPr>
-        <p:blipFill>
-          <a:blip r:embed="rId3">
-            <a:extLst>
-              <a:ext uri="{28A0092B-C50C-407E-A947-70E740481C1C}">
-                <a14:useLocalDpi xmlns:a14="http://schemas.microsoft.com/office/drawing/2010/main" val="0"/>
-              </a:ext>
-            </a:extLst>
-          </a:blip>
-          <a:stretch>
-            <a:fillRect/>
-          </a:stretch>
-        </p:blipFill>
-        <p:spPr>
+        </p:nvSpPr>
+        <p:spPr bwMode="white">
           <a:xfrm>
-            <a:off x="5982090" y="48126"/>
-            <a:ext cx="9939157" cy="8085221"/>
+            <a:off x="8935744" y="1610056"/>
+            <a:ext cx="5920596" cy="5774975"/>
           </a:xfrm>
           <a:prstGeom prst="rect">
             <a:avLst/>
           </a:prstGeom>
+          <a:ln>
+            <a:solidFill>
+              <a:schemeClr val="accent1"/>
+            </a:solidFill>
+          </a:ln>
         </p:spPr>
-      </p:pic>
+        <p:txBody>
+          <a:bodyPr vert="horz" wrap="square" lIns="0" tIns="0" rIns="0" bIns="0" rtlCol="0">
+            <a:noAutofit/>
+          </a:bodyPr>
+          <a:lstStyle>
+            <a:lvl1pPr algn="l" defTabSz="1217613" rtl="0" eaLnBrk="1" fontAlgn="base" hangingPunct="1">
+              <a:spcBef>
+                <a:spcPts val="800"/>
+              </a:spcBef>
+              <a:spcAft>
+                <a:spcPts val="800"/>
+              </a:spcAft>
+              <a:buSzPct val="90000"/>
+              <a:buFont typeface="Arial" charset="0"/>
+              <a:defRPr sz="3200" kern="1200" baseline="0">
+                <a:solidFill>
+                  <a:schemeClr val="accent3">
+                    <a:lumMod val="50000"/>
+                  </a:schemeClr>
+                </a:solidFill>
+                <a:latin typeface="+mn-lt"/>
+                <a:ea typeface="ＭＳ Ｐゴシック" charset="0"/>
+                <a:cs typeface="ＭＳ Ｐゴシック" charset="0"/>
+              </a:defRPr>
+            </a:lvl1pPr>
+            <a:lvl2pPr marL="307975" algn="l" defTabSz="1217613" rtl="0" eaLnBrk="1" fontAlgn="base" hangingPunct="1">
+              <a:spcBef>
+                <a:spcPts val="800"/>
+              </a:spcBef>
+              <a:spcAft>
+                <a:spcPts val="800"/>
+              </a:spcAft>
+              <a:buSzPct val="90000"/>
+              <a:buFont typeface="Arial" charset="0"/>
+              <a:defRPr sz="2800" kern="1200" baseline="0">
+                <a:solidFill>
+                  <a:schemeClr val="accent3">
+                    <a:lumMod val="50000"/>
+                  </a:schemeClr>
+                </a:solidFill>
+                <a:latin typeface="+mn-lt"/>
+                <a:ea typeface="ＭＳ Ｐゴシック" charset="0"/>
+                <a:cs typeface="+mn-cs"/>
+              </a:defRPr>
+            </a:lvl2pPr>
+            <a:lvl3pPr marL="608013" algn="l" defTabSz="1217613" rtl="0" eaLnBrk="1" fontAlgn="base" hangingPunct="1">
+              <a:spcBef>
+                <a:spcPts val="800"/>
+              </a:spcBef>
+              <a:spcAft>
+                <a:spcPts val="800"/>
+              </a:spcAft>
+              <a:buSzPct val="90000"/>
+              <a:buFont typeface="Arial" charset="0"/>
+              <a:defRPr sz="2400" kern="1200" baseline="0">
+                <a:solidFill>
+                  <a:schemeClr val="accent3">
+                    <a:lumMod val="50000"/>
+                  </a:schemeClr>
+                </a:solidFill>
+                <a:latin typeface="+mn-lt"/>
+                <a:ea typeface="ＭＳ Ｐゴシック" charset="0"/>
+                <a:cs typeface="+mn-cs"/>
+              </a:defRPr>
+            </a:lvl3pPr>
+            <a:lvl4pPr marL="839788" algn="l" defTabSz="1217613" rtl="0" eaLnBrk="1" fontAlgn="base" hangingPunct="1">
+              <a:spcBef>
+                <a:spcPts val="800"/>
+              </a:spcBef>
+              <a:spcAft>
+                <a:spcPts val="800"/>
+              </a:spcAft>
+              <a:buSzPct val="90000"/>
+              <a:buFont typeface="Arial" charset="0"/>
+              <a:defRPr sz="2400" kern="1200" baseline="0">
+                <a:solidFill>
+                  <a:schemeClr val="accent3">
+                    <a:lumMod val="50000"/>
+                  </a:schemeClr>
+                </a:solidFill>
+                <a:latin typeface="+mn-lt"/>
+                <a:ea typeface="ＭＳ Ｐゴシック" charset="0"/>
+                <a:cs typeface="+mn-cs"/>
+              </a:defRPr>
+            </a:lvl4pPr>
+            <a:lvl5pPr marL="1068388" algn="l" defTabSz="1217613" rtl="0" eaLnBrk="1" fontAlgn="base" hangingPunct="1">
+              <a:spcBef>
+                <a:spcPts val="800"/>
+              </a:spcBef>
+              <a:spcAft>
+                <a:spcPts val="800"/>
+              </a:spcAft>
+              <a:buSzPct val="90000"/>
+              <a:buFont typeface="Arial" charset="0"/>
+              <a:defRPr sz="2000" kern="1200" baseline="0">
+                <a:solidFill>
+                  <a:schemeClr val="accent3">
+                    <a:lumMod val="50000"/>
+                  </a:schemeClr>
+                </a:solidFill>
+                <a:latin typeface="+mn-lt"/>
+                <a:ea typeface="ＭＳ Ｐゴシック" charset="0"/>
+                <a:cs typeface="+mn-cs"/>
+              </a:defRPr>
+            </a:lvl5pPr>
+            <a:lvl6pPr marL="3352582" indent="-304780" algn="l" defTabSz="1219120" rtl="0" eaLnBrk="1" latinLnBrk="0" hangingPunct="1">
+              <a:spcBef>
+                <a:spcPct val="20000"/>
+              </a:spcBef>
+              <a:buFont typeface="Arial" pitchFamily="34" charset="0"/>
+              <a:buChar char="•"/>
+              <a:defRPr sz="2667" kern="1200">
+                <a:solidFill>
+                  <a:schemeClr val="tx1"/>
+                </a:solidFill>
+                <a:latin typeface="+mn-lt"/>
+                <a:ea typeface="+mn-ea"/>
+                <a:cs typeface="+mn-cs"/>
+              </a:defRPr>
+            </a:lvl6pPr>
+            <a:lvl7pPr marL="3962142" indent="-304780" algn="l" defTabSz="1219120" rtl="0" eaLnBrk="1" latinLnBrk="0" hangingPunct="1">
+              <a:spcBef>
+                <a:spcPct val="20000"/>
+              </a:spcBef>
+              <a:buFont typeface="Arial" pitchFamily="34" charset="0"/>
+              <a:buChar char="•"/>
+              <a:defRPr sz="2667" kern="1200">
+                <a:solidFill>
+                  <a:schemeClr val="tx1"/>
+                </a:solidFill>
+                <a:latin typeface="+mn-lt"/>
+                <a:ea typeface="+mn-ea"/>
+                <a:cs typeface="+mn-cs"/>
+              </a:defRPr>
+            </a:lvl7pPr>
+            <a:lvl8pPr marL="4571703" indent="-304780" algn="l" defTabSz="1219120" rtl="0" eaLnBrk="1" latinLnBrk="0" hangingPunct="1">
+              <a:spcBef>
+                <a:spcPct val="20000"/>
+              </a:spcBef>
+              <a:buFont typeface="Arial" pitchFamily="34" charset="0"/>
+              <a:buChar char="•"/>
+              <a:defRPr sz="2667" kern="1200">
+                <a:solidFill>
+                  <a:schemeClr val="tx1"/>
+                </a:solidFill>
+                <a:latin typeface="+mn-lt"/>
+                <a:ea typeface="+mn-ea"/>
+                <a:cs typeface="+mn-cs"/>
+              </a:defRPr>
+            </a:lvl8pPr>
+            <a:lvl9pPr marL="5181264" indent="-304780" algn="l" defTabSz="1219120" rtl="0" eaLnBrk="1" latinLnBrk="0" hangingPunct="1">
+              <a:spcBef>
+                <a:spcPct val="20000"/>
+              </a:spcBef>
+              <a:buFont typeface="Arial" pitchFamily="34" charset="0"/>
+              <a:buChar char="•"/>
+              <a:defRPr sz="2667" kern="1200">
+                <a:solidFill>
+                  <a:schemeClr val="tx1"/>
+                </a:solidFill>
+                <a:latin typeface="+mn-lt"/>
+                <a:ea typeface="+mn-ea"/>
+                <a:cs typeface="+mn-cs"/>
+              </a:defRPr>
+            </a:lvl9pPr>
+          </a:lstStyle>
+          <a:p>
+            <a:r>
+              <a:rPr lang="en-US" sz="2000" b="1" dirty="0" smtClean="0"/>
+              <a:t>control 'cis-3.1' do</a:t>
+            </a:r>
+          </a:p>
+          <a:p>
+            <a:r>
+              <a:rPr lang="en-US" sz="2000" b="1" dirty="0" smtClean="0"/>
+              <a:t>  impact 0.7</a:t>
+            </a:r>
+          </a:p>
+          <a:p>
+            <a:r>
+              <a:rPr lang="en-US" sz="2000" b="1" dirty="0" smtClean="0"/>
+              <a:t>  title 'Set Daemon </a:t>
+            </a:r>
+            <a:r>
+              <a:rPr lang="en-US" sz="2000" b="1" dirty="0" err="1" smtClean="0"/>
+              <a:t>umask</a:t>
+            </a:r>
+            <a:r>
+              <a:rPr lang="en-US" sz="2000" b="1" dirty="0" smtClean="0"/>
+              <a:t>'</a:t>
+            </a:r>
+          </a:p>
+          <a:p>
+            <a:r>
+              <a:rPr lang="en-US" sz="2000" b="1" dirty="0"/>
+              <a:t>desc '</a:t>
+            </a:r>
+          </a:p>
+          <a:p>
+            <a:r>
+              <a:rPr lang="en-US" sz="2000" b="1" dirty="0"/>
+              <a:t>    Set the default </a:t>
+            </a:r>
+            <a:r>
+              <a:rPr lang="en-US" sz="2000" b="1" dirty="0" err="1"/>
+              <a:t>umask</a:t>
+            </a:r>
+            <a:r>
+              <a:rPr lang="en-US" sz="2000" b="1" dirty="0"/>
+              <a:t> for all processes started at boot time</a:t>
+            </a:r>
+            <a:r>
+              <a:rPr lang="en-US" sz="2000" b="1" dirty="0" smtClean="0"/>
+              <a:t>.</a:t>
+            </a:r>
+          </a:p>
+          <a:p>
+            <a:r>
+              <a:rPr lang="en-US" sz="2000" b="1" dirty="0" smtClean="0"/>
+              <a:t>  </a:t>
+            </a:r>
+            <a:r>
+              <a:rPr lang="en-US" sz="2000" b="1" dirty="0"/>
+              <a:t>'</a:t>
+            </a:r>
+          </a:p>
+          <a:p>
+            <a:r>
+              <a:rPr lang="en-US" sz="2000" b="1" dirty="0" smtClean="0"/>
+              <a:t>describe file('/etc/</a:t>
+            </a:r>
+            <a:r>
+              <a:rPr lang="en-US" sz="2000" b="1" dirty="0" err="1" smtClean="0"/>
+              <a:t>sysconfig</a:t>
+            </a:r>
+            <a:r>
+              <a:rPr lang="en-US" sz="2000" b="1" dirty="0" smtClean="0"/>
+              <a:t>/</a:t>
+            </a:r>
+            <a:r>
+              <a:rPr lang="en-US" sz="2000" b="1" dirty="0" err="1" smtClean="0"/>
+              <a:t>init</a:t>
+            </a:r>
+            <a:r>
+              <a:rPr lang="en-US" sz="2000" b="1" dirty="0" smtClean="0"/>
+              <a:t>') do</a:t>
+            </a:r>
+          </a:p>
+          <a:p>
+            <a:r>
+              <a:rPr lang="en-US" sz="2000" b="1" dirty="0" smtClean="0"/>
+              <a:t>      its('content') {should match '</a:t>
+            </a:r>
+            <a:r>
+              <a:rPr lang="en-US" sz="2000" b="1" dirty="0" err="1" smtClean="0"/>
+              <a:t>umask</a:t>
+            </a:r>
+            <a:r>
+              <a:rPr lang="en-US" sz="2000" b="1" dirty="0" smtClean="0"/>
+              <a:t> 027'}</a:t>
+            </a:r>
+          </a:p>
+          <a:p>
+            <a:r>
+              <a:rPr lang="en-US" sz="2000" b="1" dirty="0" smtClean="0"/>
+              <a:t>    end</a:t>
+            </a:r>
+          </a:p>
+          <a:p>
+            <a:r>
+              <a:rPr lang="en-US" sz="2000" b="1" dirty="0" smtClean="0"/>
+              <a:t>end</a:t>
+            </a:r>
+          </a:p>
+        </p:txBody>
+      </p:sp>
     </p:spTree>
     <p:extLst>
       <p:ext uri="{BB962C8B-B14F-4D97-AF65-F5344CB8AC3E}">
@@ -22206,15 +22486,6 @@
 </file>
 
 <file path=customXml/item1.xml><?xml version="1.0" encoding="utf-8"?>
-<?mso-contentType ?>
-<FormTemplates xmlns="http://schemas.microsoft.com/sharepoint/v3/contenttype/forms">
-  <Display>DocumentLibraryForm</Display>
-  <Edit>DocumentLibraryForm</Edit>
-  <New>DocumentLibraryForm</New>
-</FormTemplates>
-</file>
-
-<file path=customXml/item2.xml><?xml version="1.0" encoding="utf-8"?>
 <p:properties xmlns:p="http://schemas.microsoft.com/office/2006/metadata/properties" xmlns:xsi="http://www.w3.org/2001/XMLSchema-instance" xmlns:pc="http://schemas.microsoft.com/office/infopath/2007/PartnerControls">
   <documentManagement>
     <_dlc_DocId xmlns="7bb5d761-a2ea-4873-95f7-7a6658fb3ef0">M4CWTKMW727E-592-73</_dlc_DocId>
@@ -22226,7 +22497,7 @@
 </p:properties>
 </file>
 
-<file path=customXml/item3.xml><?xml version="1.0" encoding="utf-8"?>
+<file path=customXml/item2.xml><?xml version="1.0" encoding="utf-8"?>
 <ct:contentTypeSchema xmlns:ct="http://schemas.microsoft.com/office/2006/metadata/contentType" xmlns:ma="http://schemas.microsoft.com/office/2006/metadata/properties/metaAttributes" ct:_="" ma:_="" ma:contentTypeName="Document" ma:contentTypeID="0x0101000812F700BE7F874999720E88173FE491" ma:contentTypeVersion="0" ma:contentTypeDescription="Create a new document." ma:contentTypeScope="" ma:versionID="3f79f408e2ca720b7aba6e0e32464d0c">
   <xsd:schema xmlns:xsd="http://www.w3.org/2001/XMLSchema" xmlns:xs="http://www.w3.org/2001/XMLSchema" xmlns:p="http://schemas.microsoft.com/office/2006/metadata/properties" xmlns:ns2="7bb5d761-a2ea-4873-95f7-7a6658fb3ef0" targetNamespace="http://schemas.microsoft.com/office/2006/metadata/properties" ma:root="true" ma:fieldsID="1e062cd38ba31e406bfc4340fbc7f87a" ns2:_="">
     <xsd:import namespace="7bb5d761-a2ea-4873-95f7-7a6658fb3ef0"/>
@@ -22371,7 +22642,7 @@
 </ct:contentTypeSchema>
 </file>
 
-<file path=customXml/item4.xml><?xml version="1.0" encoding="utf-8"?>
+<file path=customXml/item3.xml><?xml version="1.0" encoding="utf-8"?>
 <?mso-contentType ?>
 <spe:Receivers xmlns:spe="http://schemas.microsoft.com/sharepoint/events">
   <Receiver>
@@ -22417,15 +22688,16 @@
 </spe:Receivers>
 </file>
 
-<file path=customXml/itemProps1.xml><?xml version="1.0" encoding="utf-8"?>
-<ds:datastoreItem xmlns:ds="http://schemas.openxmlformats.org/officeDocument/2006/customXml" ds:itemID="{5CDEB364-43EC-4510-9881-539C2A3FCE9E}">
-  <ds:schemaRefs>
-    <ds:schemaRef ds:uri="http://schemas.microsoft.com/sharepoint/v3/contenttype/forms"/>
-  </ds:schemaRefs>
-</ds:datastoreItem>
+<file path=customXml/item4.xml><?xml version="1.0" encoding="utf-8"?>
+<?mso-contentType ?>
+<FormTemplates xmlns="http://schemas.microsoft.com/sharepoint/v3/contenttype/forms">
+  <Display>DocumentLibraryForm</Display>
+  <Edit>DocumentLibraryForm</Edit>
+  <New>DocumentLibraryForm</New>
+</FormTemplates>
 </file>
 
-<file path=customXml/itemProps2.xml><?xml version="1.0" encoding="utf-8"?>
+<file path=customXml/itemProps1.xml><?xml version="1.0" encoding="utf-8"?>
 <ds:datastoreItem xmlns:ds="http://schemas.openxmlformats.org/officeDocument/2006/customXml" ds:itemID="{6921749B-AEB7-461B-845F-603CABD25259}">
   <ds:schemaRefs>
     <ds:schemaRef ds:uri="http://schemas.microsoft.com/office/2006/documentManagement/types"/>
@@ -22441,7 +22713,7 @@
 </ds:datastoreItem>
 </file>
 
-<file path=customXml/itemProps3.xml><?xml version="1.0" encoding="utf-8"?>
+<file path=customXml/itemProps2.xml><?xml version="1.0" encoding="utf-8"?>
 <ds:datastoreItem xmlns:ds="http://schemas.openxmlformats.org/officeDocument/2006/customXml" ds:itemID="{164479E5-0B02-49AC-B79E-EC1D6164DDD3}">
   <ds:schemaRefs>
     <ds:schemaRef ds:uri="http://schemas.microsoft.com/office/2006/metadata/contentType"/>
@@ -22459,10 +22731,18 @@
 </ds:datastoreItem>
 </file>
 
-<file path=customXml/itemProps4.xml><?xml version="1.0" encoding="utf-8"?>
+<file path=customXml/itemProps3.xml><?xml version="1.0" encoding="utf-8"?>
 <ds:datastoreItem xmlns:ds="http://schemas.openxmlformats.org/officeDocument/2006/customXml" ds:itemID="{B13EBC30-FE27-4C6A-B723-23FC2188F7DC}">
   <ds:schemaRefs>
     <ds:schemaRef ds:uri="http://schemas.microsoft.com/sharepoint/events"/>
   </ds:schemaRefs>
 </ds:datastoreItem>
+</file>
+
+<file path=customXml/itemProps4.xml><?xml version="1.0" encoding="utf-8"?>
+<ds:datastoreItem xmlns:ds="http://schemas.openxmlformats.org/officeDocument/2006/customXml" ds:itemID="{5CDEB364-43EC-4510-9881-539C2A3FCE9E}">
+  <ds:schemaRefs>
+    <ds:schemaRef ds:uri="http://schemas.microsoft.com/sharepoint/v3/contenttype/forms"/>
+  </ds:schemaRefs>
+</ds:datastoreItem>
 </file>
</xml_diff>

<commit_message>
fixed server icon label on 1-14 and a couple typos
</commit_message>
<xml_diff>
--- a/01-Intro.pptx
+++ b/01-Intro.pptx
@@ -291,7 +291,7 @@
               <a:pPr>
                 <a:defRPr/>
               </a:pPr>
-              <a:t>2016-02-11</a:t>
+              <a:t>2016-02-12</a:t>
             </a:fld>
             <a:endParaRPr lang="en-US" dirty="0"/>
           </a:p>
@@ -474,7 +474,7 @@
               <a:pPr>
                 <a:defRPr/>
               </a:pPr>
-              <a:t>2016-02-11</a:t>
+              <a:t>2016-02-12</a:t>
             </a:fld>
             <a:endParaRPr lang="en-US" dirty="0"/>
           </a:p>
@@ -917,7 +917,7 @@
         <p:spPr/>
         <p:txBody>
           <a:bodyPr>
-            <a:normAutofit lnSpcReduction="10000"/>
+            <a:normAutofit/>
           </a:bodyPr>
           <a:lstStyle/>
           <a:p>
@@ -967,7 +967,7 @@
               <a:t>install and initially configure the Chef Compliance server, perform compliance scans against Windows and Linux nodes, </a:t>
             </a:r>
             <a:r>
-              <a:rPr lang="en-US" sz="1200" kern="1200" dirty="0" err="1" smtClean="0">
+              <a:rPr lang="en-US" sz="1200" kern="1200" dirty="0" smtClean="0">
                 <a:solidFill>
                   <a:schemeClr val="tx1"/>
                 </a:solidFill>
@@ -976,7 +976,7 @@
                 <a:ea typeface="ＭＳ Ｐゴシック" charset="0"/>
                 <a:cs typeface="Arial" panose="020B0604020202020204" pitchFamily="34" charset="0"/>
               </a:rPr>
-              <a:t>abd</a:t>
+              <a:t>and </a:t>
             </a:r>
             <a:r>
               <a:rPr lang="en-US" sz="1200" kern="1200" dirty="0" smtClean="0">
@@ -988,7 +988,7 @@
                 <a:ea typeface="ＭＳ Ｐゴシック" charset="0"/>
                 <a:cs typeface="Arial" panose="020B0604020202020204" pitchFamily="34" charset="0"/>
               </a:rPr>
-              <a:t> remediate compliance issues with Chef, and run Compliance reports. </a:t>
+              <a:t>remediate compliance issues with Chef, and run Compliance reports. </a:t>
             </a:r>
           </a:p>
           <a:p>
@@ -1093,19 +1093,7 @@
                 <a:ea typeface="ＭＳ Ｐゴシック" charset="0"/>
                 <a:cs typeface="Arial" panose="020B0604020202020204" pitchFamily="34" charset="0"/>
               </a:rPr>
-              <a:t>Instructor </a:t>
-            </a:r>
-            <a:r>
-              <a:rPr lang="en-US" sz="1200" kern="1200" dirty="0" smtClean="0">
-                <a:solidFill>
-                  <a:schemeClr val="tx1"/>
-                </a:solidFill>
-                <a:effectLst/>
-                <a:latin typeface="Arial" panose="020B0604020202020204" pitchFamily="34" charset="0"/>
-                <a:ea typeface="ＭＳ Ｐゴシック" charset="0"/>
-                <a:cs typeface="Arial" panose="020B0604020202020204" pitchFamily="34" charset="0"/>
-              </a:rPr>
-              <a:t>Note: </a:t>
+              <a:t>Instructor Note: </a:t>
             </a:r>
             <a:r>
               <a:rPr lang="en-US" sz="1200" b="1" kern="1200" dirty="0" smtClean="0">
@@ -2465,15 +2453,7 @@
           <a:p>
             <a:r>
               <a:rPr lang="en-US" baseline="0" dirty="0" smtClean="0"/>
-              <a:t>You should have installed on your laptop a Windows Remote Desktop Connection which you'll only use to write </a:t>
-            </a:r>
-            <a:r>
-              <a:rPr lang="en-US" baseline="0" dirty="0" smtClean="0"/>
-              <a:t>Windows remediation </a:t>
-            </a:r>
-            <a:r>
-              <a:rPr lang="en-US" baseline="0" dirty="0" smtClean="0"/>
-              <a:t>later in this course.</a:t>
+              <a:t>You should have installed on your laptop a Windows Remote Desktop Connection which you'll only use to write Windows remediation later in this course.</a:t>
             </a:r>
           </a:p>
           <a:p>
@@ -3222,15 +3202,7 @@
           <a:p>
             <a:r>
               <a:rPr lang="en-US" dirty="0" smtClean="0"/>
-              <a:t>The nodes you scan don't even need Chef software on them if you are </a:t>
-            </a:r>
-            <a:r>
-              <a:rPr lang="en-US" dirty="0" smtClean="0"/>
-              <a:t>scanning </a:t>
-            </a:r>
-            <a:r>
-              <a:rPr lang="en-US" dirty="0" smtClean="0"/>
-              <a:t>them for compliance.</a:t>
+              <a:t>The nodes you scan don't even need Chef software on them if you are scanning them for compliance.</a:t>
             </a:r>
           </a:p>
           <a:p>
@@ -4646,14 +4618,14 @@
           </a:ln>
           <a:extLst>
             <a:ext uri="{909E8E84-426E-40dd-AFC4-6F175D3DCCD1}">
-              <a14:hiddenFill xmlns="" xmlns:a14="http://schemas.microsoft.com/office/drawing/2010/main">
+              <a14:hiddenFill xmlns:a14="http://schemas.microsoft.com/office/drawing/2010/main" xmlns="">
                 <a:solidFill>
                   <a:srgbClr val="FFFFFF"/>
                 </a:solidFill>
               </a14:hiddenFill>
             </a:ext>
             <a:ext uri="{91240B29-F687-4f45-9708-019B960494DF}">
-              <a14:hiddenLine xmlns="" xmlns:a14="http://schemas.microsoft.com/office/drawing/2010/main" w="9525">
+              <a14:hiddenLine xmlns:a14="http://schemas.microsoft.com/office/drawing/2010/main" xmlns="" w="9525">
                 <a:solidFill>
                   <a:srgbClr val="000000"/>
                 </a:solidFill>
@@ -4801,14 +4773,14 @@
           </a:ln>
           <a:extLst>
             <a:ext uri="{909E8E84-426E-40dd-AFC4-6F175D3DCCD1}">
-              <a14:hiddenFill xmlns="" xmlns:a14="http://schemas.microsoft.com/office/drawing/2010/main">
+              <a14:hiddenFill xmlns:a14="http://schemas.microsoft.com/office/drawing/2010/main" xmlns="">
                 <a:solidFill>
                   <a:srgbClr val="FFFFFF"/>
                 </a:solidFill>
               </a14:hiddenFill>
             </a:ext>
             <a:ext uri="{91240B29-F687-4f45-9708-019B960494DF}">
-              <a14:hiddenLine xmlns="" xmlns:a14="http://schemas.microsoft.com/office/drawing/2010/main" w="9525">
+              <a14:hiddenLine xmlns:a14="http://schemas.microsoft.com/office/drawing/2010/main" xmlns="" w="9525">
                 <a:solidFill>
                   <a:srgbClr val="000000"/>
                 </a:solidFill>
@@ -5299,14 +5271,14 @@
           </a:ln>
           <a:extLst>
             <a:ext uri="{909E8E84-426E-40dd-AFC4-6F175D3DCCD1}">
-              <a14:hiddenFill xmlns="" xmlns:a14="http://schemas.microsoft.com/office/drawing/2010/main">
+              <a14:hiddenFill xmlns:a14="http://schemas.microsoft.com/office/drawing/2010/main" xmlns="">
                 <a:solidFill>
                   <a:srgbClr val="FFFFFF"/>
                 </a:solidFill>
               </a14:hiddenFill>
             </a:ext>
             <a:ext uri="{91240B29-F687-4f45-9708-019B960494DF}">
-              <a14:hiddenLine xmlns="" xmlns:a14="http://schemas.microsoft.com/office/drawing/2010/main" w="9525">
+              <a14:hiddenLine xmlns:a14="http://schemas.microsoft.com/office/drawing/2010/main" xmlns="" w="9525">
                 <a:solidFill>
                   <a:srgbClr val="000000"/>
                 </a:solidFill>
@@ -8115,14 +8087,14 @@
           </a:ln>
           <a:extLst>
             <a:ext uri="{909E8E84-426E-40dd-AFC4-6F175D3DCCD1}">
-              <a14:hiddenFill xmlns="" xmlns:a14="http://schemas.microsoft.com/office/drawing/2010/main">
+              <a14:hiddenFill xmlns:a14="http://schemas.microsoft.com/office/drawing/2010/main" xmlns="">
                 <a:solidFill>
                   <a:srgbClr val="FFFFFF"/>
                 </a:solidFill>
               </a14:hiddenFill>
             </a:ext>
             <a:ext uri="{91240B29-F687-4f45-9708-019B960494DF}">
-              <a14:hiddenLine xmlns="" xmlns:a14="http://schemas.microsoft.com/office/drawing/2010/main" w="9525">
+              <a14:hiddenLine xmlns:a14="http://schemas.microsoft.com/office/drawing/2010/main" xmlns="" w="9525">
                 <a:solidFill>
                   <a:srgbClr val="000000"/>
                 </a:solidFill>
@@ -9479,14 +9451,14 @@
           </a:ln>
           <a:extLst>
             <a:ext uri="{909E8E84-426E-40dd-AFC4-6F175D3DCCD1}">
-              <a14:hiddenFill xmlns="" xmlns:a14="http://schemas.microsoft.com/office/drawing/2010/main">
+              <a14:hiddenFill xmlns:a14="http://schemas.microsoft.com/office/drawing/2010/main" xmlns="">
                 <a:solidFill>
                   <a:srgbClr val="FFFFFF"/>
                 </a:solidFill>
               </a14:hiddenFill>
             </a:ext>
             <a:ext uri="{91240B29-F687-4f45-9708-019B960494DF}">
-              <a14:hiddenLine xmlns="" xmlns:a14="http://schemas.microsoft.com/office/drawing/2010/main" w="9525">
+              <a14:hiddenLine xmlns:a14="http://schemas.microsoft.com/office/drawing/2010/main" xmlns="" w="9525">
                 <a:solidFill>
                   <a:srgbClr val="000000"/>
                 </a:solidFill>
@@ -10044,14 +10016,14 @@
           </a:ln>
           <a:extLst>
             <a:ext uri="{909E8E84-426E-40dd-AFC4-6F175D3DCCD1}">
-              <a14:hiddenFill xmlns="" xmlns:a14="http://schemas.microsoft.com/office/drawing/2010/main">
+              <a14:hiddenFill xmlns:a14="http://schemas.microsoft.com/office/drawing/2010/main" xmlns="">
                 <a:solidFill>
                   <a:srgbClr val="FFFFFF"/>
                 </a:solidFill>
               </a14:hiddenFill>
             </a:ext>
             <a:ext uri="{91240B29-F687-4f45-9708-019B960494DF}">
-              <a14:hiddenLine xmlns="" xmlns:a14="http://schemas.microsoft.com/office/drawing/2010/main" w="9525">
+              <a14:hiddenLine xmlns:a14="http://schemas.microsoft.com/office/drawing/2010/main" xmlns="" w="9525">
                 <a:solidFill>
                   <a:srgbClr val="000000"/>
                 </a:solidFill>
@@ -10618,14 +10590,14 @@
           </a:ln>
           <a:extLst>
             <a:ext uri="{909E8E84-426E-40dd-AFC4-6F175D3DCCD1}">
-              <a14:hiddenFill xmlns="" xmlns:a14="http://schemas.microsoft.com/office/drawing/2010/main">
+              <a14:hiddenFill xmlns:a14="http://schemas.microsoft.com/office/drawing/2010/main" xmlns="">
                 <a:solidFill>
                   <a:srgbClr val="FFFFFF"/>
                 </a:solidFill>
               </a14:hiddenFill>
             </a:ext>
             <a:ext uri="{91240B29-F687-4f45-9708-019B960494DF}">
-              <a14:hiddenLine xmlns="" xmlns:a14="http://schemas.microsoft.com/office/drawing/2010/main" w="9525">
+              <a14:hiddenLine xmlns:a14="http://schemas.microsoft.com/office/drawing/2010/main" xmlns="" w="9525">
                 <a:solidFill>
                   <a:srgbClr val="000000"/>
                 </a:solidFill>
@@ -11565,14 +11537,14 @@
           </a:ln>
           <a:extLst>
             <a:ext uri="{909E8E84-426E-40dd-AFC4-6F175D3DCCD1}">
-              <a14:hiddenFill xmlns="" xmlns:a14="http://schemas.microsoft.com/office/drawing/2010/main">
+              <a14:hiddenFill xmlns:a14="http://schemas.microsoft.com/office/drawing/2010/main" xmlns="">
                 <a:solidFill>
                   <a:srgbClr val="FFFFFF"/>
                 </a:solidFill>
               </a14:hiddenFill>
             </a:ext>
             <a:ext uri="{91240B29-F687-4f45-9708-019B960494DF}">
-              <a14:hiddenLine xmlns="" xmlns:a14="http://schemas.microsoft.com/office/drawing/2010/main" w="9525">
+              <a14:hiddenLine xmlns:a14="http://schemas.microsoft.com/office/drawing/2010/main" xmlns="" w="9525">
                 <a:solidFill>
                   <a:srgbClr val="000000"/>
                 </a:solidFill>
@@ -12326,14 +12298,14 @@
           </a:ln>
           <a:extLst>
             <a:ext uri="{909E8E84-426E-40dd-AFC4-6F175D3DCCD1}">
-              <a14:hiddenFill xmlns="" xmlns:a14="http://schemas.microsoft.com/office/drawing/2010/main">
+              <a14:hiddenFill xmlns:a14="http://schemas.microsoft.com/office/drawing/2010/main" xmlns="">
                 <a:solidFill>
                   <a:srgbClr val="FFFFFF"/>
                 </a:solidFill>
               </a14:hiddenFill>
             </a:ext>
             <a:ext uri="{91240B29-F687-4f45-9708-019B960494DF}">
-              <a14:hiddenLine xmlns="" xmlns:a14="http://schemas.microsoft.com/office/drawing/2010/main" w="9525">
+              <a14:hiddenLine xmlns:a14="http://schemas.microsoft.com/office/drawing/2010/main" xmlns="" w="9525">
                 <a:solidFill>
                   <a:srgbClr val="000000"/>
                 </a:solidFill>
@@ -15880,8 +15852,8 @@
         </p:nvSpPr>
         <p:spPr bwMode="white">
           <a:xfrm>
-            <a:off x="8508328" y="1016593"/>
-            <a:ext cx="3230631" cy="1842629"/>
+            <a:off x="8508328" y="1219794"/>
+            <a:ext cx="3230631" cy="1057062"/>
           </a:xfrm>
           <a:prstGeom prst="rect">
             <a:avLst/>
@@ -19226,7 +19198,7 @@
             <a:noFill/>
             <a:extLst>
               <a:ext uri="{909E8E84-426E-40dd-AFC4-6F175D3DCCD1}">
-                <a14:hiddenFill xmlns="" xmlns:a14="http://schemas.microsoft.com/office/drawing/2010/main">
+                <a14:hiddenFill xmlns:a14="http://schemas.microsoft.com/office/drawing/2010/main" xmlns="">
                   <a:solidFill>
                     <a:srgbClr val="FFFFFF"/>
                   </a:solidFill>
@@ -19267,7 +19239,7 @@
             <a:noFill/>
             <a:extLst>
               <a:ext uri="{909E8E84-426E-40dd-AFC4-6F175D3DCCD1}">
-                <a14:hiddenFill xmlns="" xmlns:a14="http://schemas.microsoft.com/office/drawing/2010/main">
+                <a14:hiddenFill xmlns:a14="http://schemas.microsoft.com/office/drawing/2010/main" xmlns="">
                   <a:solidFill>
                     <a:srgbClr val="FFFFFF"/>
                   </a:solidFill>
@@ -19308,7 +19280,7 @@
             <a:noFill/>
             <a:extLst>
               <a:ext uri="{909E8E84-426E-40dd-AFC4-6F175D3DCCD1}">
-                <a14:hiddenFill xmlns="" xmlns:a14="http://schemas.microsoft.com/office/drawing/2010/main">
+                <a14:hiddenFill xmlns:a14="http://schemas.microsoft.com/office/drawing/2010/main" xmlns="">
                   <a:solidFill>
                     <a:srgbClr val="FFFFFF"/>
                   </a:solidFill>
@@ -19364,7 +19336,7 @@
             <a:noFill/>
             <a:extLst>
               <a:ext uri="{909E8E84-426E-40dd-AFC4-6F175D3DCCD1}">
-                <a14:hiddenFill xmlns="" xmlns:a14="http://schemas.microsoft.com/office/drawing/2010/main">
+                <a14:hiddenFill xmlns:a14="http://schemas.microsoft.com/office/drawing/2010/main" xmlns="">
                   <a:solidFill>
                     <a:srgbClr val="FFFFFF"/>
                   </a:solidFill>
@@ -19405,7 +19377,7 @@
             <a:noFill/>
             <a:extLst>
               <a:ext uri="{909E8E84-426E-40dd-AFC4-6F175D3DCCD1}">
-                <a14:hiddenFill xmlns="" xmlns:a14="http://schemas.microsoft.com/office/drawing/2010/main">
+                <a14:hiddenFill xmlns:a14="http://schemas.microsoft.com/office/drawing/2010/main" xmlns="">
                   <a:solidFill>
                     <a:srgbClr val="FFFFFF"/>
                   </a:solidFill>
@@ -19446,7 +19418,7 @@
             <a:noFill/>
             <a:extLst>
               <a:ext uri="{909E8E84-426E-40dd-AFC4-6F175D3DCCD1}">
-                <a14:hiddenFill xmlns="" xmlns:a14="http://schemas.microsoft.com/office/drawing/2010/main">
+                <a14:hiddenFill xmlns:a14="http://schemas.microsoft.com/office/drawing/2010/main" xmlns="">
                   <a:solidFill>
                     <a:srgbClr val="FFFFFF"/>
                   </a:solidFill>
@@ -19502,7 +19474,7 @@
             <a:noFill/>
             <a:extLst>
               <a:ext uri="{909E8E84-426E-40dd-AFC4-6F175D3DCCD1}">
-                <a14:hiddenFill xmlns="" xmlns:a14="http://schemas.microsoft.com/office/drawing/2010/main">
+                <a14:hiddenFill xmlns:a14="http://schemas.microsoft.com/office/drawing/2010/main" xmlns="">
                   <a:solidFill>
                     <a:srgbClr val="FFFFFF"/>
                   </a:solidFill>
@@ -19543,7 +19515,7 @@
             <a:noFill/>
             <a:extLst>
               <a:ext uri="{909E8E84-426E-40dd-AFC4-6F175D3DCCD1}">
-                <a14:hiddenFill xmlns="" xmlns:a14="http://schemas.microsoft.com/office/drawing/2010/main">
+                <a14:hiddenFill xmlns:a14="http://schemas.microsoft.com/office/drawing/2010/main" xmlns="">
                   <a:solidFill>
                     <a:srgbClr val="FFFFFF"/>
                   </a:solidFill>
@@ -19584,7 +19556,7 @@
             <a:noFill/>
             <a:extLst>
               <a:ext uri="{909E8E84-426E-40dd-AFC4-6F175D3DCCD1}">
-                <a14:hiddenFill xmlns="" xmlns:a14="http://schemas.microsoft.com/office/drawing/2010/main">
+                <a14:hiddenFill xmlns:a14="http://schemas.microsoft.com/office/drawing/2010/main" xmlns="">
                   <a:solidFill>
                     <a:srgbClr val="FFFFFF"/>
                   </a:solidFill>
@@ -19811,7 +19783,7 @@
             <a:noFill/>
             <a:extLst>
               <a:ext uri="{909E8E84-426E-40dd-AFC4-6F175D3DCCD1}">
-                <a14:hiddenFill xmlns="" xmlns:a14="http://schemas.microsoft.com/office/drawing/2010/main">
+                <a14:hiddenFill xmlns:a14="http://schemas.microsoft.com/office/drawing/2010/main" xmlns="">
                   <a:solidFill>
                     <a:srgbClr val="FFFFFF"/>
                   </a:solidFill>
@@ -19852,7 +19824,7 @@
             <a:noFill/>
             <a:extLst>
               <a:ext uri="{909E8E84-426E-40dd-AFC4-6F175D3DCCD1}">
-                <a14:hiddenFill xmlns="" xmlns:a14="http://schemas.microsoft.com/office/drawing/2010/main">
+                <a14:hiddenFill xmlns:a14="http://schemas.microsoft.com/office/drawing/2010/main" xmlns="">
                   <a:solidFill>
                     <a:srgbClr val="FFFFFF"/>
                   </a:solidFill>
@@ -19893,7 +19865,7 @@
             <a:noFill/>
             <a:extLst>
               <a:ext uri="{909E8E84-426E-40dd-AFC4-6F175D3DCCD1}">
-                <a14:hiddenFill xmlns="" xmlns:a14="http://schemas.microsoft.com/office/drawing/2010/main">
+                <a14:hiddenFill xmlns:a14="http://schemas.microsoft.com/office/drawing/2010/main" xmlns="">
                   <a:solidFill>
                     <a:srgbClr val="FFFFFF"/>
                   </a:solidFill>
@@ -19949,7 +19921,7 @@
             <a:noFill/>
             <a:extLst>
               <a:ext uri="{909E8E84-426E-40dd-AFC4-6F175D3DCCD1}">
-                <a14:hiddenFill xmlns="" xmlns:a14="http://schemas.microsoft.com/office/drawing/2010/main">
+                <a14:hiddenFill xmlns:a14="http://schemas.microsoft.com/office/drawing/2010/main" xmlns="">
                   <a:solidFill>
                     <a:srgbClr val="FFFFFF"/>
                   </a:solidFill>
@@ -19990,7 +19962,7 @@
             <a:noFill/>
             <a:extLst>
               <a:ext uri="{909E8E84-426E-40dd-AFC4-6F175D3DCCD1}">
-                <a14:hiddenFill xmlns="" xmlns:a14="http://schemas.microsoft.com/office/drawing/2010/main">
+                <a14:hiddenFill xmlns:a14="http://schemas.microsoft.com/office/drawing/2010/main" xmlns="">
                   <a:solidFill>
                     <a:srgbClr val="FFFFFF"/>
                   </a:solidFill>
@@ -20031,7 +20003,7 @@
             <a:noFill/>
             <a:extLst>
               <a:ext uri="{909E8E84-426E-40dd-AFC4-6F175D3DCCD1}">
-                <a14:hiddenFill xmlns="" xmlns:a14="http://schemas.microsoft.com/office/drawing/2010/main">
+                <a14:hiddenFill xmlns:a14="http://schemas.microsoft.com/office/drawing/2010/main" xmlns="">
                   <a:solidFill>
                     <a:srgbClr val="FFFFFF"/>
                   </a:solidFill>
@@ -20137,15 +20109,7 @@
           <a:p>
             <a:r>
               <a:rPr lang="en-US" dirty="0" smtClean="0"/>
-              <a:t>The nodes you scan don't even need Chef software on them if you </a:t>
-            </a:r>
-            <a:r>
-              <a:rPr lang="en-US" dirty="0" smtClean="0"/>
-              <a:t>are scanning </a:t>
-            </a:r>
-            <a:r>
-              <a:rPr lang="en-US" dirty="0" smtClean="0"/>
-              <a:t>them for compliance.</a:t>
+              <a:t>The nodes you scan don't even need Chef software on them if you are scanning them for compliance.</a:t>
             </a:r>
           </a:p>
           <a:p>
@@ -22616,18 +22580,6 @@
 </file>
 
 <file path=customXml/item1.xml><?xml version="1.0" encoding="utf-8"?>
-<p:properties xmlns:p="http://schemas.microsoft.com/office/2006/metadata/properties" xmlns:xsi="http://www.w3.org/2001/XMLSchema-instance" xmlns:pc="http://schemas.microsoft.com/office/infopath/2007/PartnerControls">
-  <documentManagement>
-    <_dlc_DocId xmlns="7bb5d761-a2ea-4873-95f7-7a6658fb3ef0">M4CWTKMW727E-592-73</_dlc_DocId>
-    <_dlc_DocIdUrl xmlns="7bb5d761-a2ea-4873-95f7-7a6658fb3ef0">
-      <Url>https://kms.vci.local/marketing/team/_layouts/DocIdRedir.aspx?ID=M4CWTKMW727E-592-73</Url>
-      <Description>M4CWTKMW727E-592-73</Description>
-    </_dlc_DocIdUrl>
-  </documentManagement>
-</p:properties>
-</file>
-
-<file path=customXml/item2.xml><?xml version="1.0" encoding="utf-8"?>
 <ct:contentTypeSchema xmlns:ct="http://schemas.microsoft.com/office/2006/metadata/contentType" xmlns:ma="http://schemas.microsoft.com/office/2006/metadata/properties/metaAttributes" ct:_="" ma:_="" ma:contentTypeName="Document" ma:contentTypeID="0x0101000812F700BE7F874999720E88173FE491" ma:contentTypeVersion="0" ma:contentTypeDescription="Create a new document." ma:contentTypeScope="" ma:versionID="3f79f408e2ca720b7aba6e0e32464d0c">
   <xsd:schema xmlns:xsd="http://www.w3.org/2001/XMLSchema" xmlns:xs="http://www.w3.org/2001/XMLSchema" xmlns:p="http://schemas.microsoft.com/office/2006/metadata/properties" xmlns:ns2="7bb5d761-a2ea-4873-95f7-7a6658fb3ef0" targetNamespace="http://schemas.microsoft.com/office/2006/metadata/properties" ma:root="true" ma:fieldsID="1e062cd38ba31e406bfc4340fbc7f87a" ns2:_="">
     <xsd:import namespace="7bb5d761-a2ea-4873-95f7-7a6658fb3ef0"/>
@@ -22772,7 +22724,28 @@
 </ct:contentTypeSchema>
 </file>
 
+<file path=customXml/item2.xml><?xml version="1.0" encoding="utf-8"?>
+<p:properties xmlns:p="http://schemas.microsoft.com/office/2006/metadata/properties" xmlns:xsi="http://www.w3.org/2001/XMLSchema-instance" xmlns:pc="http://schemas.microsoft.com/office/infopath/2007/PartnerControls">
+  <documentManagement>
+    <_dlc_DocId xmlns="7bb5d761-a2ea-4873-95f7-7a6658fb3ef0">M4CWTKMW727E-592-73</_dlc_DocId>
+    <_dlc_DocIdUrl xmlns="7bb5d761-a2ea-4873-95f7-7a6658fb3ef0">
+      <Url>https://kms.vci.local/marketing/team/_layouts/DocIdRedir.aspx?ID=M4CWTKMW727E-592-73</Url>
+      <Description>M4CWTKMW727E-592-73</Description>
+    </_dlc_DocIdUrl>
+  </documentManagement>
+</p:properties>
+</file>
+
 <file path=customXml/item3.xml><?xml version="1.0" encoding="utf-8"?>
+<?mso-contentType ?>
+<FormTemplates xmlns="http://schemas.microsoft.com/sharepoint/v3/contenttype/forms">
+  <Display>DocumentLibraryForm</Display>
+  <Edit>DocumentLibraryForm</Edit>
+  <New>DocumentLibraryForm</New>
+</FormTemplates>
+</file>
+
+<file path=customXml/item4.xml><?xml version="1.0" encoding="utf-8"?>
 <?mso-contentType ?>
 <spe:Receivers xmlns:spe="http://schemas.microsoft.com/sharepoint/events">
   <Receiver>
@@ -22818,32 +22791,7 @@
 </spe:Receivers>
 </file>
 
-<file path=customXml/item4.xml><?xml version="1.0" encoding="utf-8"?>
-<?mso-contentType ?>
-<FormTemplates xmlns="http://schemas.microsoft.com/sharepoint/v3/contenttype/forms">
-  <Display>DocumentLibraryForm</Display>
-  <Edit>DocumentLibraryForm</Edit>
-  <New>DocumentLibraryForm</New>
-</FormTemplates>
-</file>
-
 <file path=customXml/itemProps1.xml><?xml version="1.0" encoding="utf-8"?>
-<ds:datastoreItem xmlns:ds="http://schemas.openxmlformats.org/officeDocument/2006/customXml" ds:itemID="{6921749B-AEB7-461B-845F-603CABD25259}">
-  <ds:schemaRefs>
-    <ds:schemaRef ds:uri="http://schemas.microsoft.com/office/2006/documentManagement/types"/>
-    <ds:schemaRef ds:uri="http://schemas.microsoft.com/office/infopath/2007/PartnerControls"/>
-    <ds:schemaRef ds:uri="http://purl.org/dc/elements/1.1/"/>
-    <ds:schemaRef ds:uri="http://schemas.microsoft.com/office/2006/metadata/properties"/>
-    <ds:schemaRef ds:uri="7bb5d761-a2ea-4873-95f7-7a6658fb3ef0"/>
-    <ds:schemaRef ds:uri="http://purl.org/dc/terms/"/>
-    <ds:schemaRef ds:uri="http://schemas.openxmlformats.org/package/2006/metadata/core-properties"/>
-    <ds:schemaRef ds:uri="http://www.w3.org/XML/1998/namespace"/>
-    <ds:schemaRef ds:uri="http://purl.org/dc/dcmitype/"/>
-  </ds:schemaRefs>
-</ds:datastoreItem>
-</file>
-
-<file path=customXml/itemProps2.xml><?xml version="1.0" encoding="utf-8"?>
 <ds:datastoreItem xmlns:ds="http://schemas.openxmlformats.org/officeDocument/2006/customXml" ds:itemID="{164479E5-0B02-49AC-B79E-EC1D6164DDD3}">
   <ds:schemaRefs>
     <ds:schemaRef ds:uri="http://schemas.microsoft.com/office/2006/metadata/contentType"/>
@@ -22861,18 +22809,34 @@
 </ds:datastoreItem>
 </file>
 
+<file path=customXml/itemProps2.xml><?xml version="1.0" encoding="utf-8"?>
+<ds:datastoreItem xmlns:ds="http://schemas.openxmlformats.org/officeDocument/2006/customXml" ds:itemID="{6921749B-AEB7-461B-845F-603CABD25259}">
+  <ds:schemaRefs>
+    <ds:schemaRef ds:uri="http://schemas.microsoft.com/office/2006/documentManagement/types"/>
+    <ds:schemaRef ds:uri="http://schemas.microsoft.com/office/infopath/2007/PartnerControls"/>
+    <ds:schemaRef ds:uri="http://purl.org/dc/elements/1.1/"/>
+    <ds:schemaRef ds:uri="http://schemas.microsoft.com/office/2006/metadata/properties"/>
+    <ds:schemaRef ds:uri="7bb5d761-a2ea-4873-95f7-7a6658fb3ef0"/>
+    <ds:schemaRef ds:uri="http://purl.org/dc/terms/"/>
+    <ds:schemaRef ds:uri="http://schemas.openxmlformats.org/package/2006/metadata/core-properties"/>
+    <ds:schemaRef ds:uri="http://www.w3.org/XML/1998/namespace"/>
+    <ds:schemaRef ds:uri="http://purl.org/dc/dcmitype/"/>
+  </ds:schemaRefs>
+</ds:datastoreItem>
+</file>
+
 <file path=customXml/itemProps3.xml><?xml version="1.0" encoding="utf-8"?>
+<ds:datastoreItem xmlns:ds="http://schemas.openxmlformats.org/officeDocument/2006/customXml" ds:itemID="{5CDEB364-43EC-4510-9881-539C2A3FCE9E}">
+  <ds:schemaRefs>
+    <ds:schemaRef ds:uri="http://schemas.microsoft.com/sharepoint/v3/contenttype/forms"/>
+  </ds:schemaRefs>
+</ds:datastoreItem>
+</file>
+
+<file path=customXml/itemProps4.xml><?xml version="1.0" encoding="utf-8"?>
 <ds:datastoreItem xmlns:ds="http://schemas.openxmlformats.org/officeDocument/2006/customXml" ds:itemID="{B13EBC30-FE27-4C6A-B723-23FC2188F7DC}">
   <ds:schemaRefs>
     <ds:schemaRef ds:uri="http://schemas.microsoft.com/sharepoint/events"/>
   </ds:schemaRefs>
 </ds:datastoreItem>
-</file>
-
-<file path=customXml/itemProps4.xml><?xml version="1.0" encoding="utf-8"?>
-<ds:datastoreItem xmlns:ds="http://schemas.openxmlformats.org/officeDocument/2006/customXml" ds:itemID="{5CDEB364-43EC-4510-9881-539C2A3FCE9E}">
-  <ds:schemaRefs>
-    <ds:schemaRef ds:uri="http://schemas.microsoft.com/sharepoint/v3/contenttype/forms"/>
-  </ds:schemaRefs>
-</ds:datastoreItem>
 </file>
</xml_diff>

<commit_message>
added instructor note to slide 1-1 that reads This course has been tested on Compliance Server v0.14.5. The labs have been tested against target Linux and Windows nodes that have ChefDK 0.11.0 with inspec 0.11.0.
</commit_message>
<xml_diff>
--- a/01-Intro.pptx
+++ b/01-Intro.pptx
@@ -291,7 +291,7 @@
               <a:pPr>
                 <a:defRPr/>
               </a:pPr>
-              <a:t>2016-02-12</a:t>
+              <a:t>2016-02-23</a:t>
             </a:fld>
             <a:endParaRPr lang="en-US" dirty="0"/>
           </a:p>
@@ -474,7 +474,7 @@
               <a:pPr>
                 <a:defRPr/>
               </a:pPr>
-              <a:t>2016-02-12</a:t>
+              <a:t>2016-02-23</a:t>
             </a:fld>
             <a:endParaRPr lang="en-US" dirty="0"/>
           </a:p>
@@ -964,31 +964,7 @@
                 <a:ea typeface="ＭＳ Ｐゴシック" charset="0"/>
                 <a:cs typeface="Arial" panose="020B0604020202020204" pitchFamily="34" charset="0"/>
               </a:rPr>
-              <a:t>install and initially configure the Chef Compliance server, perform compliance scans against Windows and Linux nodes, </a:t>
-            </a:r>
-            <a:r>
-              <a:rPr lang="en-US" sz="1200" kern="1200" dirty="0" smtClean="0">
-                <a:solidFill>
-                  <a:schemeClr val="tx1"/>
-                </a:solidFill>
-                <a:effectLst/>
-                <a:latin typeface="Arial" panose="020B0604020202020204" pitchFamily="34" charset="0"/>
-                <a:ea typeface="ＭＳ Ｐゴシック" charset="0"/>
-                <a:cs typeface="Arial" panose="020B0604020202020204" pitchFamily="34" charset="0"/>
-              </a:rPr>
-              <a:t>and </a:t>
-            </a:r>
-            <a:r>
-              <a:rPr lang="en-US" sz="1200" kern="1200" dirty="0" smtClean="0">
-                <a:solidFill>
-                  <a:schemeClr val="tx1"/>
-                </a:solidFill>
-                <a:effectLst/>
-                <a:latin typeface="Arial" panose="020B0604020202020204" pitchFamily="34" charset="0"/>
-                <a:ea typeface="ＭＳ Ｐゴシック" charset="0"/>
-                <a:cs typeface="Arial" panose="020B0604020202020204" pitchFamily="34" charset="0"/>
-              </a:rPr>
-              <a:t>remediate compliance issues with Chef, and run Compliance reports. </a:t>
+              <a:t>install and initially configure the Chef Compliance server, perform compliance scans against Windows and Linux nodes, and remediate compliance issues with Chef, and run Compliance reports. </a:t>
             </a:r>
           </a:p>
           <a:p>
@@ -1129,7 +1105,31 @@
                 <a:ea typeface="ＭＳ Ｐゴシック" charset="0"/>
                 <a:cs typeface="Arial" panose="020B0604020202020204" pitchFamily="34" charset="0"/>
               </a:rPr>
-              <a:t> ChefDK 0.10.0 on or higher on the AMIs. </a:t>
+              <a:t> ChefDK 0.10.0 on or higher on the </a:t>
+            </a:r>
+            <a:r>
+              <a:rPr lang="en-US" sz="1200" kern="1200" baseline="0" dirty="0" smtClean="0">
+                <a:solidFill>
+                  <a:schemeClr val="tx1"/>
+                </a:solidFill>
+                <a:effectLst/>
+                <a:latin typeface="Arial" panose="020B0604020202020204" pitchFamily="34" charset="0"/>
+                <a:ea typeface="ＭＳ Ｐゴシック" charset="0"/>
+                <a:cs typeface="Arial" panose="020B0604020202020204" pitchFamily="34" charset="0"/>
+              </a:rPr>
+              <a:t>target node AMIs</a:t>
+            </a:r>
+            <a:r>
+              <a:rPr lang="en-US" sz="1200" kern="1200" baseline="0" dirty="0" smtClean="0">
+                <a:solidFill>
+                  <a:schemeClr val="tx1"/>
+                </a:solidFill>
+                <a:effectLst/>
+                <a:latin typeface="Arial" panose="020B0604020202020204" pitchFamily="34" charset="0"/>
+                <a:ea typeface="ＭＳ Ｐゴシック" charset="0"/>
+                <a:cs typeface="Arial" panose="020B0604020202020204" pitchFamily="34" charset="0"/>
+              </a:rPr>
+              <a:t>. </a:t>
             </a:r>
           </a:p>
           <a:p>
@@ -1168,7 +1168,79 @@
                 <a:ea typeface="ＭＳ Ｐゴシック" charset="0"/>
                 <a:cs typeface="Arial" panose="020B0604020202020204" pitchFamily="34" charset="0"/>
               </a:rPr>
-              <a:t>Compliance Server v0.9.11.</a:t>
+              <a:t>Compliance Server </a:t>
+            </a:r>
+            <a:r>
+              <a:rPr lang="en-US" sz="1200" kern="1200" dirty="0" smtClean="0">
+                <a:solidFill>
+                  <a:schemeClr val="tx1"/>
+                </a:solidFill>
+                <a:effectLst/>
+                <a:latin typeface="Arial" panose="020B0604020202020204" pitchFamily="34" charset="0"/>
+                <a:ea typeface="ＭＳ Ｐゴシック" charset="0"/>
+                <a:cs typeface="Arial" panose="020B0604020202020204" pitchFamily="34" charset="0"/>
+              </a:rPr>
+              <a:t>v</a:t>
+            </a:r>
+            <a:r>
+              <a:rPr lang="en-US" sz="1200" b="0" i="0" kern="1200" dirty="0" smtClean="0">
+                <a:solidFill>
+                  <a:schemeClr val="tx1"/>
+                </a:solidFill>
+                <a:effectLst/>
+                <a:latin typeface="Arial" panose="020B0604020202020204" pitchFamily="34" charset="0"/>
+                <a:ea typeface="ＭＳ Ｐゴシック" charset="0"/>
+                <a:cs typeface="Arial" panose="020B0604020202020204" pitchFamily="34" charset="0"/>
+              </a:rPr>
+              <a:t>0.14.5</a:t>
+            </a:r>
+            <a:r>
+              <a:rPr lang="en-US" sz="1200" kern="1200" dirty="0" smtClean="0">
+                <a:solidFill>
+                  <a:schemeClr val="tx1"/>
+                </a:solidFill>
+                <a:effectLst/>
+                <a:latin typeface="Arial" panose="020B0604020202020204" pitchFamily="34" charset="0"/>
+                <a:ea typeface="ＭＳ Ｐゴシック" charset="0"/>
+                <a:cs typeface="Arial" panose="020B0604020202020204" pitchFamily="34" charset="0"/>
+              </a:rPr>
+              <a:t>.</a:t>
+            </a:r>
+            <a:r>
+              <a:rPr lang="en-US" sz="1200" kern="1200" baseline="0" dirty="0" smtClean="0">
+                <a:solidFill>
+                  <a:schemeClr val="tx1"/>
+                </a:solidFill>
+                <a:effectLst/>
+                <a:latin typeface="Arial" panose="020B0604020202020204" pitchFamily="34" charset="0"/>
+                <a:ea typeface="ＭＳ Ｐゴシック" charset="0"/>
+                <a:cs typeface="Arial" panose="020B0604020202020204" pitchFamily="34" charset="0"/>
+              </a:rPr>
+              <a:t> The labs have been tested against target Linux and Windows nodes that have ChefDK 0.11.0 with </a:t>
+            </a:r>
+            <a:r>
+              <a:rPr lang="en-US" sz="1200" kern="1200" baseline="0" dirty="0" err="1" smtClean="0">
+                <a:solidFill>
+                  <a:schemeClr val="tx1"/>
+                </a:solidFill>
+                <a:effectLst/>
+                <a:latin typeface="Arial" panose="020B0604020202020204" pitchFamily="34" charset="0"/>
+                <a:ea typeface="ＭＳ Ｐゴシック" charset="0"/>
+                <a:cs typeface="Arial" panose="020B0604020202020204" pitchFamily="34" charset="0"/>
+              </a:rPr>
+              <a:t>inspec</a:t>
+            </a:r>
+            <a:r>
+              <a:rPr lang="en-US" sz="1200" kern="1200" baseline="0" dirty="0" smtClean="0">
+                <a:solidFill>
+                  <a:schemeClr val="tx1"/>
+                </a:solidFill>
+                <a:effectLst/>
+                <a:latin typeface="Arial" panose="020B0604020202020204" pitchFamily="34" charset="0"/>
+                <a:ea typeface="ＭＳ Ｐゴシック" charset="0"/>
+                <a:cs typeface="Arial" panose="020B0604020202020204" pitchFamily="34" charset="0"/>
+              </a:rPr>
+              <a:t> 0.11.0.</a:t>
             </a:r>
             <a:endParaRPr lang="en-US" dirty="0" smtClean="0"/>
           </a:p>
@@ -4618,14 +4690,14 @@
           </a:ln>
           <a:extLst>
             <a:ext uri="{909E8E84-426E-40dd-AFC4-6F175D3DCCD1}">
-              <a14:hiddenFill xmlns:a14="http://schemas.microsoft.com/office/drawing/2010/main" xmlns="">
+              <a14:hiddenFill xmlns="" xmlns:a14="http://schemas.microsoft.com/office/drawing/2010/main">
                 <a:solidFill>
                   <a:srgbClr val="FFFFFF"/>
                 </a:solidFill>
               </a14:hiddenFill>
             </a:ext>
             <a:ext uri="{91240B29-F687-4f45-9708-019B960494DF}">
-              <a14:hiddenLine xmlns:a14="http://schemas.microsoft.com/office/drawing/2010/main" xmlns="" w="9525">
+              <a14:hiddenLine xmlns="" xmlns:a14="http://schemas.microsoft.com/office/drawing/2010/main" w="9525">
                 <a:solidFill>
                   <a:srgbClr val="000000"/>
                 </a:solidFill>
@@ -4773,14 +4845,14 @@
           </a:ln>
           <a:extLst>
             <a:ext uri="{909E8E84-426E-40dd-AFC4-6F175D3DCCD1}">
-              <a14:hiddenFill xmlns:a14="http://schemas.microsoft.com/office/drawing/2010/main" xmlns="">
+              <a14:hiddenFill xmlns="" xmlns:a14="http://schemas.microsoft.com/office/drawing/2010/main">
                 <a:solidFill>
                   <a:srgbClr val="FFFFFF"/>
                 </a:solidFill>
               </a14:hiddenFill>
             </a:ext>
             <a:ext uri="{91240B29-F687-4f45-9708-019B960494DF}">
-              <a14:hiddenLine xmlns:a14="http://schemas.microsoft.com/office/drawing/2010/main" xmlns="" w="9525">
+              <a14:hiddenLine xmlns="" xmlns:a14="http://schemas.microsoft.com/office/drawing/2010/main" w="9525">
                 <a:solidFill>
                   <a:srgbClr val="000000"/>
                 </a:solidFill>
@@ -5271,14 +5343,14 @@
           </a:ln>
           <a:extLst>
             <a:ext uri="{909E8E84-426E-40dd-AFC4-6F175D3DCCD1}">
-              <a14:hiddenFill xmlns:a14="http://schemas.microsoft.com/office/drawing/2010/main" xmlns="">
+              <a14:hiddenFill xmlns="" xmlns:a14="http://schemas.microsoft.com/office/drawing/2010/main">
                 <a:solidFill>
                   <a:srgbClr val="FFFFFF"/>
                 </a:solidFill>
               </a14:hiddenFill>
             </a:ext>
             <a:ext uri="{91240B29-F687-4f45-9708-019B960494DF}">
-              <a14:hiddenLine xmlns:a14="http://schemas.microsoft.com/office/drawing/2010/main" xmlns="" w="9525">
+              <a14:hiddenLine xmlns="" xmlns:a14="http://schemas.microsoft.com/office/drawing/2010/main" w="9525">
                 <a:solidFill>
                   <a:srgbClr val="000000"/>
                 </a:solidFill>
@@ -8087,14 +8159,14 @@
           </a:ln>
           <a:extLst>
             <a:ext uri="{909E8E84-426E-40dd-AFC4-6F175D3DCCD1}">
-              <a14:hiddenFill xmlns:a14="http://schemas.microsoft.com/office/drawing/2010/main" xmlns="">
+              <a14:hiddenFill xmlns="" xmlns:a14="http://schemas.microsoft.com/office/drawing/2010/main">
                 <a:solidFill>
                   <a:srgbClr val="FFFFFF"/>
                 </a:solidFill>
               </a14:hiddenFill>
             </a:ext>
             <a:ext uri="{91240B29-F687-4f45-9708-019B960494DF}">
-              <a14:hiddenLine xmlns:a14="http://schemas.microsoft.com/office/drawing/2010/main" xmlns="" w="9525">
+              <a14:hiddenLine xmlns="" xmlns:a14="http://schemas.microsoft.com/office/drawing/2010/main" w="9525">
                 <a:solidFill>
                   <a:srgbClr val="000000"/>
                 </a:solidFill>
@@ -9451,14 +9523,14 @@
           </a:ln>
           <a:extLst>
             <a:ext uri="{909E8E84-426E-40dd-AFC4-6F175D3DCCD1}">
-              <a14:hiddenFill xmlns:a14="http://schemas.microsoft.com/office/drawing/2010/main" xmlns="">
+              <a14:hiddenFill xmlns="" xmlns:a14="http://schemas.microsoft.com/office/drawing/2010/main">
                 <a:solidFill>
                   <a:srgbClr val="FFFFFF"/>
                 </a:solidFill>
               </a14:hiddenFill>
             </a:ext>
             <a:ext uri="{91240B29-F687-4f45-9708-019B960494DF}">
-              <a14:hiddenLine xmlns:a14="http://schemas.microsoft.com/office/drawing/2010/main" xmlns="" w="9525">
+              <a14:hiddenLine xmlns="" xmlns:a14="http://schemas.microsoft.com/office/drawing/2010/main" w="9525">
                 <a:solidFill>
                   <a:srgbClr val="000000"/>
                 </a:solidFill>
@@ -10016,14 +10088,14 @@
           </a:ln>
           <a:extLst>
             <a:ext uri="{909E8E84-426E-40dd-AFC4-6F175D3DCCD1}">
-              <a14:hiddenFill xmlns:a14="http://schemas.microsoft.com/office/drawing/2010/main" xmlns="">
+              <a14:hiddenFill xmlns="" xmlns:a14="http://schemas.microsoft.com/office/drawing/2010/main">
                 <a:solidFill>
                   <a:srgbClr val="FFFFFF"/>
                 </a:solidFill>
               </a14:hiddenFill>
             </a:ext>
             <a:ext uri="{91240B29-F687-4f45-9708-019B960494DF}">
-              <a14:hiddenLine xmlns:a14="http://schemas.microsoft.com/office/drawing/2010/main" xmlns="" w="9525">
+              <a14:hiddenLine xmlns="" xmlns:a14="http://schemas.microsoft.com/office/drawing/2010/main" w="9525">
                 <a:solidFill>
                   <a:srgbClr val="000000"/>
                 </a:solidFill>
@@ -10590,14 +10662,14 @@
           </a:ln>
           <a:extLst>
             <a:ext uri="{909E8E84-426E-40dd-AFC4-6F175D3DCCD1}">
-              <a14:hiddenFill xmlns:a14="http://schemas.microsoft.com/office/drawing/2010/main" xmlns="">
+              <a14:hiddenFill xmlns="" xmlns:a14="http://schemas.microsoft.com/office/drawing/2010/main">
                 <a:solidFill>
                   <a:srgbClr val="FFFFFF"/>
                 </a:solidFill>
               </a14:hiddenFill>
             </a:ext>
             <a:ext uri="{91240B29-F687-4f45-9708-019B960494DF}">
-              <a14:hiddenLine xmlns:a14="http://schemas.microsoft.com/office/drawing/2010/main" xmlns="" w="9525">
+              <a14:hiddenLine xmlns="" xmlns:a14="http://schemas.microsoft.com/office/drawing/2010/main" w="9525">
                 <a:solidFill>
                   <a:srgbClr val="000000"/>
                 </a:solidFill>
@@ -11537,14 +11609,14 @@
           </a:ln>
           <a:extLst>
             <a:ext uri="{909E8E84-426E-40dd-AFC4-6F175D3DCCD1}">
-              <a14:hiddenFill xmlns:a14="http://schemas.microsoft.com/office/drawing/2010/main" xmlns="">
+              <a14:hiddenFill xmlns="" xmlns:a14="http://schemas.microsoft.com/office/drawing/2010/main">
                 <a:solidFill>
                   <a:srgbClr val="FFFFFF"/>
                 </a:solidFill>
               </a14:hiddenFill>
             </a:ext>
             <a:ext uri="{91240B29-F687-4f45-9708-019B960494DF}">
-              <a14:hiddenLine xmlns:a14="http://schemas.microsoft.com/office/drawing/2010/main" xmlns="" w="9525">
+              <a14:hiddenLine xmlns="" xmlns:a14="http://schemas.microsoft.com/office/drawing/2010/main" w="9525">
                 <a:solidFill>
                   <a:srgbClr val="000000"/>
                 </a:solidFill>
@@ -12298,14 +12370,14 @@
           </a:ln>
           <a:extLst>
             <a:ext uri="{909E8E84-426E-40dd-AFC4-6F175D3DCCD1}">
-              <a14:hiddenFill xmlns:a14="http://schemas.microsoft.com/office/drawing/2010/main" xmlns="">
+              <a14:hiddenFill xmlns="" xmlns:a14="http://schemas.microsoft.com/office/drawing/2010/main">
                 <a:solidFill>
                   <a:srgbClr val="FFFFFF"/>
                 </a:solidFill>
               </a14:hiddenFill>
             </a:ext>
             <a:ext uri="{91240B29-F687-4f45-9708-019B960494DF}">
-              <a14:hiddenLine xmlns:a14="http://schemas.microsoft.com/office/drawing/2010/main" xmlns="" w="9525">
+              <a14:hiddenLine xmlns="" xmlns:a14="http://schemas.microsoft.com/office/drawing/2010/main" w="9525">
                 <a:solidFill>
                   <a:srgbClr val="000000"/>
                 </a:solidFill>
@@ -19198,7 +19270,7 @@
             <a:noFill/>
             <a:extLst>
               <a:ext uri="{909E8E84-426E-40dd-AFC4-6F175D3DCCD1}">
-                <a14:hiddenFill xmlns:a14="http://schemas.microsoft.com/office/drawing/2010/main" xmlns="">
+                <a14:hiddenFill xmlns="" xmlns:a14="http://schemas.microsoft.com/office/drawing/2010/main">
                   <a:solidFill>
                     <a:srgbClr val="FFFFFF"/>
                   </a:solidFill>
@@ -19239,7 +19311,7 @@
             <a:noFill/>
             <a:extLst>
               <a:ext uri="{909E8E84-426E-40dd-AFC4-6F175D3DCCD1}">
-                <a14:hiddenFill xmlns:a14="http://schemas.microsoft.com/office/drawing/2010/main" xmlns="">
+                <a14:hiddenFill xmlns="" xmlns:a14="http://schemas.microsoft.com/office/drawing/2010/main">
                   <a:solidFill>
                     <a:srgbClr val="FFFFFF"/>
                   </a:solidFill>
@@ -19280,7 +19352,7 @@
             <a:noFill/>
             <a:extLst>
               <a:ext uri="{909E8E84-426E-40dd-AFC4-6F175D3DCCD1}">
-                <a14:hiddenFill xmlns:a14="http://schemas.microsoft.com/office/drawing/2010/main" xmlns="">
+                <a14:hiddenFill xmlns="" xmlns:a14="http://schemas.microsoft.com/office/drawing/2010/main">
                   <a:solidFill>
                     <a:srgbClr val="FFFFFF"/>
                   </a:solidFill>
@@ -19336,7 +19408,7 @@
             <a:noFill/>
             <a:extLst>
               <a:ext uri="{909E8E84-426E-40dd-AFC4-6F175D3DCCD1}">
-                <a14:hiddenFill xmlns:a14="http://schemas.microsoft.com/office/drawing/2010/main" xmlns="">
+                <a14:hiddenFill xmlns="" xmlns:a14="http://schemas.microsoft.com/office/drawing/2010/main">
                   <a:solidFill>
                     <a:srgbClr val="FFFFFF"/>
                   </a:solidFill>
@@ -19377,7 +19449,7 @@
             <a:noFill/>
             <a:extLst>
               <a:ext uri="{909E8E84-426E-40dd-AFC4-6F175D3DCCD1}">
-                <a14:hiddenFill xmlns:a14="http://schemas.microsoft.com/office/drawing/2010/main" xmlns="">
+                <a14:hiddenFill xmlns="" xmlns:a14="http://schemas.microsoft.com/office/drawing/2010/main">
                   <a:solidFill>
                     <a:srgbClr val="FFFFFF"/>
                   </a:solidFill>
@@ -19418,7 +19490,7 @@
             <a:noFill/>
             <a:extLst>
               <a:ext uri="{909E8E84-426E-40dd-AFC4-6F175D3DCCD1}">
-                <a14:hiddenFill xmlns:a14="http://schemas.microsoft.com/office/drawing/2010/main" xmlns="">
+                <a14:hiddenFill xmlns="" xmlns:a14="http://schemas.microsoft.com/office/drawing/2010/main">
                   <a:solidFill>
                     <a:srgbClr val="FFFFFF"/>
                   </a:solidFill>
@@ -19474,7 +19546,7 @@
             <a:noFill/>
             <a:extLst>
               <a:ext uri="{909E8E84-426E-40dd-AFC4-6F175D3DCCD1}">
-                <a14:hiddenFill xmlns:a14="http://schemas.microsoft.com/office/drawing/2010/main" xmlns="">
+                <a14:hiddenFill xmlns="" xmlns:a14="http://schemas.microsoft.com/office/drawing/2010/main">
                   <a:solidFill>
                     <a:srgbClr val="FFFFFF"/>
                   </a:solidFill>
@@ -19515,7 +19587,7 @@
             <a:noFill/>
             <a:extLst>
               <a:ext uri="{909E8E84-426E-40dd-AFC4-6F175D3DCCD1}">
-                <a14:hiddenFill xmlns:a14="http://schemas.microsoft.com/office/drawing/2010/main" xmlns="">
+                <a14:hiddenFill xmlns="" xmlns:a14="http://schemas.microsoft.com/office/drawing/2010/main">
                   <a:solidFill>
                     <a:srgbClr val="FFFFFF"/>
                   </a:solidFill>
@@ -19556,7 +19628,7 @@
             <a:noFill/>
             <a:extLst>
               <a:ext uri="{909E8E84-426E-40dd-AFC4-6F175D3DCCD1}">
-                <a14:hiddenFill xmlns:a14="http://schemas.microsoft.com/office/drawing/2010/main" xmlns="">
+                <a14:hiddenFill xmlns="" xmlns:a14="http://schemas.microsoft.com/office/drawing/2010/main">
                   <a:solidFill>
                     <a:srgbClr val="FFFFFF"/>
                   </a:solidFill>
@@ -19783,7 +19855,7 @@
             <a:noFill/>
             <a:extLst>
               <a:ext uri="{909E8E84-426E-40dd-AFC4-6F175D3DCCD1}">
-                <a14:hiddenFill xmlns:a14="http://schemas.microsoft.com/office/drawing/2010/main" xmlns="">
+                <a14:hiddenFill xmlns="" xmlns:a14="http://schemas.microsoft.com/office/drawing/2010/main">
                   <a:solidFill>
                     <a:srgbClr val="FFFFFF"/>
                   </a:solidFill>
@@ -19824,7 +19896,7 @@
             <a:noFill/>
             <a:extLst>
               <a:ext uri="{909E8E84-426E-40dd-AFC4-6F175D3DCCD1}">
-                <a14:hiddenFill xmlns:a14="http://schemas.microsoft.com/office/drawing/2010/main" xmlns="">
+                <a14:hiddenFill xmlns="" xmlns:a14="http://schemas.microsoft.com/office/drawing/2010/main">
                   <a:solidFill>
                     <a:srgbClr val="FFFFFF"/>
                   </a:solidFill>
@@ -19865,7 +19937,7 @@
             <a:noFill/>
             <a:extLst>
               <a:ext uri="{909E8E84-426E-40dd-AFC4-6F175D3DCCD1}">
-                <a14:hiddenFill xmlns:a14="http://schemas.microsoft.com/office/drawing/2010/main" xmlns="">
+                <a14:hiddenFill xmlns="" xmlns:a14="http://schemas.microsoft.com/office/drawing/2010/main">
                   <a:solidFill>
                     <a:srgbClr val="FFFFFF"/>
                   </a:solidFill>
@@ -19921,7 +19993,7 @@
             <a:noFill/>
             <a:extLst>
               <a:ext uri="{909E8E84-426E-40dd-AFC4-6F175D3DCCD1}">
-                <a14:hiddenFill xmlns:a14="http://schemas.microsoft.com/office/drawing/2010/main" xmlns="">
+                <a14:hiddenFill xmlns="" xmlns:a14="http://schemas.microsoft.com/office/drawing/2010/main">
                   <a:solidFill>
                     <a:srgbClr val="FFFFFF"/>
                   </a:solidFill>
@@ -19962,7 +20034,7 @@
             <a:noFill/>
             <a:extLst>
               <a:ext uri="{909E8E84-426E-40dd-AFC4-6F175D3DCCD1}">
-                <a14:hiddenFill xmlns:a14="http://schemas.microsoft.com/office/drawing/2010/main" xmlns="">
+                <a14:hiddenFill xmlns="" xmlns:a14="http://schemas.microsoft.com/office/drawing/2010/main">
                   <a:solidFill>
                     <a:srgbClr val="FFFFFF"/>
                   </a:solidFill>
@@ -20003,7 +20075,7 @@
             <a:noFill/>
             <a:extLst>
               <a:ext uri="{909E8E84-426E-40dd-AFC4-6F175D3DCCD1}">
-                <a14:hiddenFill xmlns:a14="http://schemas.microsoft.com/office/drawing/2010/main" xmlns="">
+                <a14:hiddenFill xmlns="" xmlns:a14="http://schemas.microsoft.com/office/drawing/2010/main">
                   <a:solidFill>
                     <a:srgbClr val="FFFFFF"/>
                   </a:solidFill>
@@ -22725,27 +22797,6 @@
 </file>
 
 <file path=customXml/item2.xml><?xml version="1.0" encoding="utf-8"?>
-<p:properties xmlns:p="http://schemas.microsoft.com/office/2006/metadata/properties" xmlns:xsi="http://www.w3.org/2001/XMLSchema-instance" xmlns:pc="http://schemas.microsoft.com/office/infopath/2007/PartnerControls">
-  <documentManagement>
-    <_dlc_DocId xmlns="7bb5d761-a2ea-4873-95f7-7a6658fb3ef0">M4CWTKMW727E-592-73</_dlc_DocId>
-    <_dlc_DocIdUrl xmlns="7bb5d761-a2ea-4873-95f7-7a6658fb3ef0">
-      <Url>https://kms.vci.local/marketing/team/_layouts/DocIdRedir.aspx?ID=M4CWTKMW727E-592-73</Url>
-      <Description>M4CWTKMW727E-592-73</Description>
-    </_dlc_DocIdUrl>
-  </documentManagement>
-</p:properties>
-</file>
-
-<file path=customXml/item3.xml><?xml version="1.0" encoding="utf-8"?>
-<?mso-contentType ?>
-<FormTemplates xmlns="http://schemas.microsoft.com/sharepoint/v3/contenttype/forms">
-  <Display>DocumentLibraryForm</Display>
-  <Edit>DocumentLibraryForm</Edit>
-  <New>DocumentLibraryForm</New>
-</FormTemplates>
-</file>
-
-<file path=customXml/item4.xml><?xml version="1.0" encoding="utf-8"?>
 <?mso-contentType ?>
 <spe:Receivers xmlns:spe="http://schemas.microsoft.com/sharepoint/events">
   <Receiver>
@@ -22791,6 +22842,27 @@
 </spe:Receivers>
 </file>
 
+<file path=customXml/item3.xml><?xml version="1.0" encoding="utf-8"?>
+<?mso-contentType ?>
+<FormTemplates xmlns="http://schemas.microsoft.com/sharepoint/v3/contenttype/forms">
+  <Display>DocumentLibraryForm</Display>
+  <Edit>DocumentLibraryForm</Edit>
+  <New>DocumentLibraryForm</New>
+</FormTemplates>
+</file>
+
+<file path=customXml/item4.xml><?xml version="1.0" encoding="utf-8"?>
+<p:properties xmlns:p="http://schemas.microsoft.com/office/2006/metadata/properties" xmlns:xsi="http://www.w3.org/2001/XMLSchema-instance" xmlns:pc="http://schemas.microsoft.com/office/infopath/2007/PartnerControls">
+  <documentManagement>
+    <_dlc_DocId xmlns="7bb5d761-a2ea-4873-95f7-7a6658fb3ef0">M4CWTKMW727E-592-73</_dlc_DocId>
+    <_dlc_DocIdUrl xmlns="7bb5d761-a2ea-4873-95f7-7a6658fb3ef0">
+      <Url>https://kms.vci.local/marketing/team/_layouts/DocIdRedir.aspx?ID=M4CWTKMW727E-592-73</Url>
+      <Description>M4CWTKMW727E-592-73</Description>
+    </_dlc_DocIdUrl>
+  </documentManagement>
+</p:properties>
+</file>
+
 <file path=customXml/itemProps1.xml><?xml version="1.0" encoding="utf-8"?>
 <ds:datastoreItem xmlns:ds="http://schemas.openxmlformats.org/officeDocument/2006/customXml" ds:itemID="{164479E5-0B02-49AC-B79E-EC1D6164DDD3}">
   <ds:schemaRefs>
@@ -22810,6 +22882,22 @@
 </file>
 
 <file path=customXml/itemProps2.xml><?xml version="1.0" encoding="utf-8"?>
+<ds:datastoreItem xmlns:ds="http://schemas.openxmlformats.org/officeDocument/2006/customXml" ds:itemID="{B13EBC30-FE27-4C6A-B723-23FC2188F7DC}">
+  <ds:schemaRefs>
+    <ds:schemaRef ds:uri="http://schemas.microsoft.com/sharepoint/events"/>
+  </ds:schemaRefs>
+</ds:datastoreItem>
+</file>
+
+<file path=customXml/itemProps3.xml><?xml version="1.0" encoding="utf-8"?>
+<ds:datastoreItem xmlns:ds="http://schemas.openxmlformats.org/officeDocument/2006/customXml" ds:itemID="{5CDEB364-43EC-4510-9881-539C2A3FCE9E}">
+  <ds:schemaRefs>
+    <ds:schemaRef ds:uri="http://schemas.microsoft.com/sharepoint/v3/contenttype/forms"/>
+  </ds:schemaRefs>
+</ds:datastoreItem>
+</file>
+
+<file path=customXml/itemProps4.xml><?xml version="1.0" encoding="utf-8"?>
 <ds:datastoreItem xmlns:ds="http://schemas.openxmlformats.org/officeDocument/2006/customXml" ds:itemID="{6921749B-AEB7-461B-845F-603CABD25259}">
   <ds:schemaRefs>
     <ds:schemaRef ds:uri="http://schemas.microsoft.com/office/2006/documentManagement/types"/>
@@ -22823,20 +22911,4 @@
     <ds:schemaRef ds:uri="http://purl.org/dc/dcmitype/"/>
   </ds:schemaRefs>
 </ds:datastoreItem>
-</file>
-
-<file path=customXml/itemProps3.xml><?xml version="1.0" encoding="utf-8"?>
-<ds:datastoreItem xmlns:ds="http://schemas.openxmlformats.org/officeDocument/2006/customXml" ds:itemID="{5CDEB364-43EC-4510-9881-539C2A3FCE9E}">
-  <ds:schemaRefs>
-    <ds:schemaRef ds:uri="http://schemas.microsoft.com/sharepoint/v3/contenttype/forms"/>
-  </ds:schemaRefs>
-</ds:datastoreItem>
-</file>
-
-<file path=customXml/itemProps4.xml><?xml version="1.0" encoding="utf-8"?>
-<ds:datastoreItem xmlns:ds="http://schemas.openxmlformats.org/officeDocument/2006/customXml" ds:itemID="{B13EBC30-FE27-4C6A-B723-23FC2188F7DC}">
-  <ds:schemaRefs>
-    <ds:schemaRef ds:uri="http://schemas.microsoft.com/sharepoint/events"/>
-  </ds:schemaRefs>
-</ds:datastoreItem>
 </file>
</xml_diff>

<commit_message>
Modified slie 1-1 to state Module 5 labs are failing while using inspec 0.11.0. Investingating
</commit_message>
<xml_diff>
--- a/01-Intro.pptx
+++ b/01-Intro.pptx
@@ -1105,31 +1105,7 @@
                 <a:ea typeface="ＭＳ Ｐゴシック" charset="0"/>
                 <a:cs typeface="Arial" panose="020B0604020202020204" pitchFamily="34" charset="0"/>
               </a:rPr>
-              <a:t> ChefDK 0.10.0 on or higher on the </a:t>
-            </a:r>
-            <a:r>
-              <a:rPr lang="en-US" sz="1200" kern="1200" baseline="0" dirty="0" smtClean="0">
-                <a:solidFill>
-                  <a:schemeClr val="tx1"/>
-                </a:solidFill>
-                <a:effectLst/>
-                <a:latin typeface="Arial" panose="020B0604020202020204" pitchFamily="34" charset="0"/>
-                <a:ea typeface="ＭＳ Ｐゴシック" charset="0"/>
-                <a:cs typeface="Arial" panose="020B0604020202020204" pitchFamily="34" charset="0"/>
-              </a:rPr>
-              <a:t>target node AMIs</a:t>
-            </a:r>
-            <a:r>
-              <a:rPr lang="en-US" sz="1200" kern="1200" baseline="0" dirty="0" smtClean="0">
-                <a:solidFill>
-                  <a:schemeClr val="tx1"/>
-                </a:solidFill>
-                <a:effectLst/>
-                <a:latin typeface="Arial" panose="020B0604020202020204" pitchFamily="34" charset="0"/>
-                <a:ea typeface="ＭＳ Ｐゴシック" charset="0"/>
-                <a:cs typeface="Arial" panose="020B0604020202020204" pitchFamily="34" charset="0"/>
-              </a:rPr>
-              <a:t>. </a:t>
+              <a:t> ChefDK 0.10.0 on or higher on the target node AMIs. </a:t>
             </a:r>
           </a:p>
           <a:p>
@@ -1151,15 +1127,15 @@
               <a:defRPr/>
             </a:pPr>
             <a:r>
-              <a:rPr lang="en-US" dirty="0" smtClean="0"/>
+              <a:rPr lang="en-US" strike="sngStrike" dirty="0" smtClean="0"/>
               <a:t>Instructor Note: This course has been tested on</a:t>
             </a:r>
             <a:r>
-              <a:rPr lang="en-US" baseline="0" dirty="0" smtClean="0"/>
+              <a:rPr lang="en-US" strike="sngStrike" baseline="0" dirty="0" smtClean="0"/>
               <a:t> </a:t>
             </a:r>
             <a:r>
-              <a:rPr lang="en-US" sz="1200" kern="1200" dirty="0" smtClean="0">
+              <a:rPr lang="en-US" sz="1200" strike="sngStrike" kern="1200" dirty="0" smtClean="0">
                 <a:solidFill>
                   <a:schemeClr val="tx1"/>
                 </a:solidFill>
@@ -1168,22 +1144,10 @@
                 <a:ea typeface="ＭＳ Ｐゴシック" charset="0"/>
                 <a:cs typeface="Arial" panose="020B0604020202020204" pitchFamily="34" charset="0"/>
               </a:rPr>
-              <a:t>Compliance Server </a:t>
-            </a:r>
-            <a:r>
-              <a:rPr lang="en-US" sz="1200" kern="1200" dirty="0" smtClean="0">
-                <a:solidFill>
-                  <a:schemeClr val="tx1"/>
-                </a:solidFill>
-                <a:effectLst/>
-                <a:latin typeface="Arial" panose="020B0604020202020204" pitchFamily="34" charset="0"/>
-                <a:ea typeface="ＭＳ Ｐゴシック" charset="0"/>
-                <a:cs typeface="Arial" panose="020B0604020202020204" pitchFamily="34" charset="0"/>
-              </a:rPr>
-              <a:t>v</a:t>
-            </a:r>
-            <a:r>
-              <a:rPr lang="en-US" sz="1200" b="0" i="0" kern="1200" dirty="0" smtClean="0">
+              <a:t>Compliance Server v</a:t>
+            </a:r>
+            <a:r>
+              <a:rPr lang="en-US" sz="1200" b="0" i="0" strike="sngStrike" kern="1200" dirty="0" smtClean="0">
                 <a:solidFill>
                   <a:schemeClr val="tx1"/>
                 </a:solidFill>
@@ -1195,7 +1159,7 @@
               <a:t>0.14.5</a:t>
             </a:r>
             <a:r>
-              <a:rPr lang="en-US" sz="1200" kern="1200" dirty="0" smtClean="0">
+              <a:rPr lang="en-US" sz="1200" strike="sngStrike" kern="1200" dirty="0" smtClean="0">
                 <a:solidFill>
                   <a:schemeClr val="tx1"/>
                 </a:solidFill>
@@ -1207,7 +1171,7 @@
               <a:t>.</a:t>
             </a:r>
             <a:r>
-              <a:rPr lang="en-US" sz="1200" kern="1200" baseline="0" dirty="0" smtClean="0">
+              <a:rPr lang="en-US" sz="1200" strike="sngStrike" kern="1200" baseline="0" dirty="0" smtClean="0">
                 <a:solidFill>
                   <a:schemeClr val="tx1"/>
                 </a:solidFill>
@@ -1219,7 +1183,7 @@
               <a:t> The labs have been tested against target Linux and Windows nodes that have ChefDK 0.11.0 with </a:t>
             </a:r>
             <a:r>
-              <a:rPr lang="en-US" sz="1200" kern="1200" baseline="0" dirty="0" err="1" smtClean="0">
+              <a:rPr lang="en-US" sz="1200" strike="sngStrike" kern="1200" baseline="0" dirty="0" err="1" smtClean="0">
                 <a:solidFill>
                   <a:schemeClr val="tx1"/>
                 </a:solidFill>
@@ -1231,7 +1195,7 @@
               <a:t>inspec</a:t>
             </a:r>
             <a:r>
-              <a:rPr lang="en-US" sz="1200" kern="1200" baseline="0" dirty="0" smtClean="0">
+              <a:rPr lang="en-US" sz="1200" strike="sngStrike" kern="1200" baseline="0" dirty="0" smtClean="0">
                 <a:solidFill>
                   <a:schemeClr val="tx1"/>
                 </a:solidFill>
@@ -1240,9 +1204,81 @@
                 <a:ea typeface="ＭＳ Ｐゴシック" charset="0"/>
                 <a:cs typeface="Arial" panose="020B0604020202020204" pitchFamily="34" charset="0"/>
               </a:rPr>
-              <a:t> 0.11.0.</a:t>
-            </a:r>
-            <a:endParaRPr lang="en-US" dirty="0" smtClean="0"/>
+              <a:t> 0.11.0</a:t>
+            </a:r>
+            <a:r>
+              <a:rPr lang="en-US" sz="1200" strike="sngStrike" kern="1200" baseline="0" dirty="0" smtClean="0">
+                <a:solidFill>
+                  <a:schemeClr val="tx1"/>
+                </a:solidFill>
+                <a:effectLst/>
+                <a:latin typeface="Arial" panose="020B0604020202020204" pitchFamily="34" charset="0"/>
+                <a:ea typeface="ＭＳ Ｐゴシック" charset="0"/>
+                <a:cs typeface="Arial" panose="020B0604020202020204" pitchFamily="34" charset="0"/>
+              </a:rPr>
+              <a:t>.  </a:t>
+            </a:r>
+            <a:r>
+              <a:rPr lang="en-US" sz="1200" strike="noStrike" kern="1200" baseline="0" dirty="0" smtClean="0">
+                <a:solidFill>
+                  <a:schemeClr val="tx1"/>
+                </a:solidFill>
+                <a:effectLst/>
+                <a:latin typeface="Arial" panose="020B0604020202020204" pitchFamily="34" charset="0"/>
+                <a:ea typeface="ＭＳ Ｐゴシック" charset="0"/>
+                <a:cs typeface="Arial" panose="020B0604020202020204" pitchFamily="34" charset="0"/>
+              </a:rPr>
+              <a:t>2-23-16 Module 5 labs are failing while using </a:t>
+            </a:r>
+            <a:r>
+              <a:rPr lang="en-US" sz="1200" strike="noStrike" kern="1200" baseline="0" dirty="0" err="1" smtClean="0">
+                <a:solidFill>
+                  <a:schemeClr val="tx1"/>
+                </a:solidFill>
+                <a:effectLst/>
+                <a:latin typeface="Arial" panose="020B0604020202020204" pitchFamily="34" charset="0"/>
+                <a:ea typeface="ＭＳ Ｐゴシック" charset="0"/>
+                <a:cs typeface="Arial" panose="020B0604020202020204" pitchFamily="34" charset="0"/>
+              </a:rPr>
+              <a:t>inspec</a:t>
+            </a:r>
+            <a:r>
+              <a:rPr lang="en-US" sz="1200" strike="noStrike" kern="1200" baseline="0" dirty="0" smtClean="0">
+                <a:solidFill>
+                  <a:schemeClr val="tx1"/>
+                </a:solidFill>
+                <a:effectLst/>
+                <a:latin typeface="Arial" panose="020B0604020202020204" pitchFamily="34" charset="0"/>
+                <a:ea typeface="ＭＳ Ｐゴシック" charset="0"/>
+                <a:cs typeface="Arial" panose="020B0604020202020204" pitchFamily="34" charset="0"/>
+              </a:rPr>
+              <a:t> 0.11.0. </a:t>
+            </a:r>
+            <a:r>
+              <a:rPr lang="en-US" sz="1200" strike="noStrike" kern="1200" baseline="0" smtClean="0">
+                <a:solidFill>
+                  <a:schemeClr val="tx1"/>
+                </a:solidFill>
+                <a:effectLst/>
+                <a:latin typeface="Arial" panose="020B0604020202020204" pitchFamily="34" charset="0"/>
+                <a:ea typeface="ＭＳ Ｐゴシック" charset="0"/>
+                <a:cs typeface="Arial" panose="020B0604020202020204" pitchFamily="34" charset="0"/>
+              </a:rPr>
+              <a:t>Investigating</a:t>
+            </a:r>
+            <a:r>
+              <a:rPr lang="en-US" sz="1200" strike="noStrike" kern="1200" baseline="0" dirty="0" smtClean="0">
+                <a:solidFill>
+                  <a:schemeClr val="tx1"/>
+                </a:solidFill>
+                <a:effectLst/>
+                <a:latin typeface="Arial" panose="020B0604020202020204" pitchFamily="34" charset="0"/>
+                <a:ea typeface="ＭＳ Ｐゴシック" charset="0"/>
+                <a:cs typeface="Arial" panose="020B0604020202020204" pitchFamily="34" charset="0"/>
+              </a:rPr>
+              <a:t>.</a:t>
+            </a:r>
+            <a:endParaRPr lang="en-US" strike="sngStrike" dirty="0" smtClean="0"/>
           </a:p>
           <a:p>
             <a:endParaRPr lang="en-US" baseline="0" dirty="0" smtClean="0"/>
@@ -4690,14 +4726,14 @@
           </a:ln>
           <a:extLst>
             <a:ext uri="{909E8E84-426E-40dd-AFC4-6F175D3DCCD1}">
-              <a14:hiddenFill xmlns="" xmlns:a14="http://schemas.microsoft.com/office/drawing/2010/main">
+              <a14:hiddenFill xmlns:a14="http://schemas.microsoft.com/office/drawing/2010/main" xmlns="">
                 <a:solidFill>
                   <a:srgbClr val="FFFFFF"/>
                 </a:solidFill>
               </a14:hiddenFill>
             </a:ext>
             <a:ext uri="{91240B29-F687-4f45-9708-019B960494DF}">
-              <a14:hiddenLine xmlns="" xmlns:a14="http://schemas.microsoft.com/office/drawing/2010/main" w="9525">
+              <a14:hiddenLine xmlns:a14="http://schemas.microsoft.com/office/drawing/2010/main" xmlns="" w="9525">
                 <a:solidFill>
                   <a:srgbClr val="000000"/>
                 </a:solidFill>
@@ -4845,14 +4881,14 @@
           </a:ln>
           <a:extLst>
             <a:ext uri="{909E8E84-426E-40dd-AFC4-6F175D3DCCD1}">
-              <a14:hiddenFill xmlns="" xmlns:a14="http://schemas.microsoft.com/office/drawing/2010/main">
+              <a14:hiddenFill xmlns:a14="http://schemas.microsoft.com/office/drawing/2010/main" xmlns="">
                 <a:solidFill>
                   <a:srgbClr val="FFFFFF"/>
                 </a:solidFill>
               </a14:hiddenFill>
             </a:ext>
             <a:ext uri="{91240B29-F687-4f45-9708-019B960494DF}">
-              <a14:hiddenLine xmlns="" xmlns:a14="http://schemas.microsoft.com/office/drawing/2010/main" w="9525">
+              <a14:hiddenLine xmlns:a14="http://schemas.microsoft.com/office/drawing/2010/main" xmlns="" w="9525">
                 <a:solidFill>
                   <a:srgbClr val="000000"/>
                 </a:solidFill>
@@ -5343,14 +5379,14 @@
           </a:ln>
           <a:extLst>
             <a:ext uri="{909E8E84-426E-40dd-AFC4-6F175D3DCCD1}">
-              <a14:hiddenFill xmlns="" xmlns:a14="http://schemas.microsoft.com/office/drawing/2010/main">
+              <a14:hiddenFill xmlns:a14="http://schemas.microsoft.com/office/drawing/2010/main" xmlns="">
                 <a:solidFill>
                   <a:srgbClr val="FFFFFF"/>
                 </a:solidFill>
               </a14:hiddenFill>
             </a:ext>
             <a:ext uri="{91240B29-F687-4f45-9708-019B960494DF}">
-              <a14:hiddenLine xmlns="" xmlns:a14="http://schemas.microsoft.com/office/drawing/2010/main" w="9525">
+              <a14:hiddenLine xmlns:a14="http://schemas.microsoft.com/office/drawing/2010/main" xmlns="" w="9525">
                 <a:solidFill>
                   <a:srgbClr val="000000"/>
                 </a:solidFill>
@@ -8159,14 +8195,14 @@
           </a:ln>
           <a:extLst>
             <a:ext uri="{909E8E84-426E-40dd-AFC4-6F175D3DCCD1}">
-              <a14:hiddenFill xmlns="" xmlns:a14="http://schemas.microsoft.com/office/drawing/2010/main">
+              <a14:hiddenFill xmlns:a14="http://schemas.microsoft.com/office/drawing/2010/main" xmlns="">
                 <a:solidFill>
                   <a:srgbClr val="FFFFFF"/>
                 </a:solidFill>
               </a14:hiddenFill>
             </a:ext>
             <a:ext uri="{91240B29-F687-4f45-9708-019B960494DF}">
-              <a14:hiddenLine xmlns="" xmlns:a14="http://schemas.microsoft.com/office/drawing/2010/main" w="9525">
+              <a14:hiddenLine xmlns:a14="http://schemas.microsoft.com/office/drawing/2010/main" xmlns="" w="9525">
                 <a:solidFill>
                   <a:srgbClr val="000000"/>
                 </a:solidFill>
@@ -9523,14 +9559,14 @@
           </a:ln>
           <a:extLst>
             <a:ext uri="{909E8E84-426E-40dd-AFC4-6F175D3DCCD1}">
-              <a14:hiddenFill xmlns="" xmlns:a14="http://schemas.microsoft.com/office/drawing/2010/main">
+              <a14:hiddenFill xmlns:a14="http://schemas.microsoft.com/office/drawing/2010/main" xmlns="">
                 <a:solidFill>
                   <a:srgbClr val="FFFFFF"/>
                 </a:solidFill>
               </a14:hiddenFill>
             </a:ext>
             <a:ext uri="{91240B29-F687-4f45-9708-019B960494DF}">
-              <a14:hiddenLine xmlns="" xmlns:a14="http://schemas.microsoft.com/office/drawing/2010/main" w="9525">
+              <a14:hiddenLine xmlns:a14="http://schemas.microsoft.com/office/drawing/2010/main" xmlns="" w="9525">
                 <a:solidFill>
                   <a:srgbClr val="000000"/>
                 </a:solidFill>
@@ -10088,14 +10124,14 @@
           </a:ln>
           <a:extLst>
             <a:ext uri="{909E8E84-426E-40dd-AFC4-6F175D3DCCD1}">
-              <a14:hiddenFill xmlns="" xmlns:a14="http://schemas.microsoft.com/office/drawing/2010/main">
+              <a14:hiddenFill xmlns:a14="http://schemas.microsoft.com/office/drawing/2010/main" xmlns="">
                 <a:solidFill>
                   <a:srgbClr val="FFFFFF"/>
                 </a:solidFill>
               </a14:hiddenFill>
             </a:ext>
             <a:ext uri="{91240B29-F687-4f45-9708-019B960494DF}">
-              <a14:hiddenLine xmlns="" xmlns:a14="http://schemas.microsoft.com/office/drawing/2010/main" w="9525">
+              <a14:hiddenLine xmlns:a14="http://schemas.microsoft.com/office/drawing/2010/main" xmlns="" w="9525">
                 <a:solidFill>
                   <a:srgbClr val="000000"/>
                 </a:solidFill>
@@ -10662,14 +10698,14 @@
           </a:ln>
           <a:extLst>
             <a:ext uri="{909E8E84-426E-40dd-AFC4-6F175D3DCCD1}">
-              <a14:hiddenFill xmlns="" xmlns:a14="http://schemas.microsoft.com/office/drawing/2010/main">
+              <a14:hiddenFill xmlns:a14="http://schemas.microsoft.com/office/drawing/2010/main" xmlns="">
                 <a:solidFill>
                   <a:srgbClr val="FFFFFF"/>
                 </a:solidFill>
               </a14:hiddenFill>
             </a:ext>
             <a:ext uri="{91240B29-F687-4f45-9708-019B960494DF}">
-              <a14:hiddenLine xmlns="" xmlns:a14="http://schemas.microsoft.com/office/drawing/2010/main" w="9525">
+              <a14:hiddenLine xmlns:a14="http://schemas.microsoft.com/office/drawing/2010/main" xmlns="" w="9525">
                 <a:solidFill>
                   <a:srgbClr val="000000"/>
                 </a:solidFill>
@@ -11609,14 +11645,14 @@
           </a:ln>
           <a:extLst>
             <a:ext uri="{909E8E84-426E-40dd-AFC4-6F175D3DCCD1}">
-              <a14:hiddenFill xmlns="" xmlns:a14="http://schemas.microsoft.com/office/drawing/2010/main">
+              <a14:hiddenFill xmlns:a14="http://schemas.microsoft.com/office/drawing/2010/main" xmlns="">
                 <a:solidFill>
                   <a:srgbClr val="FFFFFF"/>
                 </a:solidFill>
               </a14:hiddenFill>
             </a:ext>
             <a:ext uri="{91240B29-F687-4f45-9708-019B960494DF}">
-              <a14:hiddenLine xmlns="" xmlns:a14="http://schemas.microsoft.com/office/drawing/2010/main" w="9525">
+              <a14:hiddenLine xmlns:a14="http://schemas.microsoft.com/office/drawing/2010/main" xmlns="" w="9525">
                 <a:solidFill>
                   <a:srgbClr val="000000"/>
                 </a:solidFill>
@@ -12370,14 +12406,14 @@
           </a:ln>
           <a:extLst>
             <a:ext uri="{909E8E84-426E-40dd-AFC4-6F175D3DCCD1}">
-              <a14:hiddenFill xmlns="" xmlns:a14="http://schemas.microsoft.com/office/drawing/2010/main">
+              <a14:hiddenFill xmlns:a14="http://schemas.microsoft.com/office/drawing/2010/main" xmlns="">
                 <a:solidFill>
                   <a:srgbClr val="FFFFFF"/>
                 </a:solidFill>
               </a14:hiddenFill>
             </a:ext>
             <a:ext uri="{91240B29-F687-4f45-9708-019B960494DF}">
-              <a14:hiddenLine xmlns="" xmlns:a14="http://schemas.microsoft.com/office/drawing/2010/main" w="9525">
+              <a14:hiddenLine xmlns:a14="http://schemas.microsoft.com/office/drawing/2010/main" xmlns="" w="9525">
                 <a:solidFill>
                   <a:srgbClr val="000000"/>
                 </a:solidFill>
@@ -19270,7 +19306,7 @@
             <a:noFill/>
             <a:extLst>
               <a:ext uri="{909E8E84-426E-40dd-AFC4-6F175D3DCCD1}">
-                <a14:hiddenFill xmlns="" xmlns:a14="http://schemas.microsoft.com/office/drawing/2010/main">
+                <a14:hiddenFill xmlns:a14="http://schemas.microsoft.com/office/drawing/2010/main" xmlns="">
                   <a:solidFill>
                     <a:srgbClr val="FFFFFF"/>
                   </a:solidFill>
@@ -19311,7 +19347,7 @@
             <a:noFill/>
             <a:extLst>
               <a:ext uri="{909E8E84-426E-40dd-AFC4-6F175D3DCCD1}">
-                <a14:hiddenFill xmlns="" xmlns:a14="http://schemas.microsoft.com/office/drawing/2010/main">
+                <a14:hiddenFill xmlns:a14="http://schemas.microsoft.com/office/drawing/2010/main" xmlns="">
                   <a:solidFill>
                     <a:srgbClr val="FFFFFF"/>
                   </a:solidFill>
@@ -19352,7 +19388,7 @@
             <a:noFill/>
             <a:extLst>
               <a:ext uri="{909E8E84-426E-40dd-AFC4-6F175D3DCCD1}">
-                <a14:hiddenFill xmlns="" xmlns:a14="http://schemas.microsoft.com/office/drawing/2010/main">
+                <a14:hiddenFill xmlns:a14="http://schemas.microsoft.com/office/drawing/2010/main" xmlns="">
                   <a:solidFill>
                     <a:srgbClr val="FFFFFF"/>
                   </a:solidFill>
@@ -19408,7 +19444,7 @@
             <a:noFill/>
             <a:extLst>
               <a:ext uri="{909E8E84-426E-40dd-AFC4-6F175D3DCCD1}">
-                <a14:hiddenFill xmlns="" xmlns:a14="http://schemas.microsoft.com/office/drawing/2010/main">
+                <a14:hiddenFill xmlns:a14="http://schemas.microsoft.com/office/drawing/2010/main" xmlns="">
                   <a:solidFill>
                     <a:srgbClr val="FFFFFF"/>
                   </a:solidFill>
@@ -19449,7 +19485,7 @@
             <a:noFill/>
             <a:extLst>
               <a:ext uri="{909E8E84-426E-40dd-AFC4-6F175D3DCCD1}">
-                <a14:hiddenFill xmlns="" xmlns:a14="http://schemas.microsoft.com/office/drawing/2010/main">
+                <a14:hiddenFill xmlns:a14="http://schemas.microsoft.com/office/drawing/2010/main" xmlns="">
                   <a:solidFill>
                     <a:srgbClr val="FFFFFF"/>
                   </a:solidFill>
@@ -19490,7 +19526,7 @@
             <a:noFill/>
             <a:extLst>
               <a:ext uri="{909E8E84-426E-40dd-AFC4-6F175D3DCCD1}">
-                <a14:hiddenFill xmlns="" xmlns:a14="http://schemas.microsoft.com/office/drawing/2010/main">
+                <a14:hiddenFill xmlns:a14="http://schemas.microsoft.com/office/drawing/2010/main" xmlns="">
                   <a:solidFill>
                     <a:srgbClr val="FFFFFF"/>
                   </a:solidFill>
@@ -19546,7 +19582,7 @@
             <a:noFill/>
             <a:extLst>
               <a:ext uri="{909E8E84-426E-40dd-AFC4-6F175D3DCCD1}">
-                <a14:hiddenFill xmlns="" xmlns:a14="http://schemas.microsoft.com/office/drawing/2010/main">
+                <a14:hiddenFill xmlns:a14="http://schemas.microsoft.com/office/drawing/2010/main" xmlns="">
                   <a:solidFill>
                     <a:srgbClr val="FFFFFF"/>
                   </a:solidFill>
@@ -19587,7 +19623,7 @@
             <a:noFill/>
             <a:extLst>
               <a:ext uri="{909E8E84-426E-40dd-AFC4-6F175D3DCCD1}">
-                <a14:hiddenFill xmlns="" xmlns:a14="http://schemas.microsoft.com/office/drawing/2010/main">
+                <a14:hiddenFill xmlns:a14="http://schemas.microsoft.com/office/drawing/2010/main" xmlns="">
                   <a:solidFill>
                     <a:srgbClr val="FFFFFF"/>
                   </a:solidFill>
@@ -19628,7 +19664,7 @@
             <a:noFill/>
             <a:extLst>
               <a:ext uri="{909E8E84-426E-40dd-AFC4-6F175D3DCCD1}">
-                <a14:hiddenFill xmlns="" xmlns:a14="http://schemas.microsoft.com/office/drawing/2010/main">
+                <a14:hiddenFill xmlns:a14="http://schemas.microsoft.com/office/drawing/2010/main" xmlns="">
                   <a:solidFill>
                     <a:srgbClr val="FFFFFF"/>
                   </a:solidFill>
@@ -19855,7 +19891,7 @@
             <a:noFill/>
             <a:extLst>
               <a:ext uri="{909E8E84-426E-40dd-AFC4-6F175D3DCCD1}">
-                <a14:hiddenFill xmlns="" xmlns:a14="http://schemas.microsoft.com/office/drawing/2010/main">
+                <a14:hiddenFill xmlns:a14="http://schemas.microsoft.com/office/drawing/2010/main" xmlns="">
                   <a:solidFill>
                     <a:srgbClr val="FFFFFF"/>
                   </a:solidFill>
@@ -19896,7 +19932,7 @@
             <a:noFill/>
             <a:extLst>
               <a:ext uri="{909E8E84-426E-40dd-AFC4-6F175D3DCCD1}">
-                <a14:hiddenFill xmlns="" xmlns:a14="http://schemas.microsoft.com/office/drawing/2010/main">
+                <a14:hiddenFill xmlns:a14="http://schemas.microsoft.com/office/drawing/2010/main" xmlns="">
                   <a:solidFill>
                     <a:srgbClr val="FFFFFF"/>
                   </a:solidFill>
@@ -19937,7 +19973,7 @@
             <a:noFill/>
             <a:extLst>
               <a:ext uri="{909E8E84-426E-40dd-AFC4-6F175D3DCCD1}">
-                <a14:hiddenFill xmlns="" xmlns:a14="http://schemas.microsoft.com/office/drawing/2010/main">
+                <a14:hiddenFill xmlns:a14="http://schemas.microsoft.com/office/drawing/2010/main" xmlns="">
                   <a:solidFill>
                     <a:srgbClr val="FFFFFF"/>
                   </a:solidFill>
@@ -19993,7 +20029,7 @@
             <a:noFill/>
             <a:extLst>
               <a:ext uri="{909E8E84-426E-40dd-AFC4-6F175D3DCCD1}">
-                <a14:hiddenFill xmlns="" xmlns:a14="http://schemas.microsoft.com/office/drawing/2010/main">
+                <a14:hiddenFill xmlns:a14="http://schemas.microsoft.com/office/drawing/2010/main" xmlns="">
                   <a:solidFill>
                     <a:srgbClr val="FFFFFF"/>
                   </a:solidFill>
@@ -20034,7 +20070,7 @@
             <a:noFill/>
             <a:extLst>
               <a:ext uri="{909E8E84-426E-40dd-AFC4-6F175D3DCCD1}">
-                <a14:hiddenFill xmlns="" xmlns:a14="http://schemas.microsoft.com/office/drawing/2010/main">
+                <a14:hiddenFill xmlns:a14="http://schemas.microsoft.com/office/drawing/2010/main" xmlns="">
                   <a:solidFill>
                     <a:srgbClr val="FFFFFF"/>
                   </a:solidFill>
@@ -20075,7 +20111,7 @@
             <a:noFill/>
             <a:extLst>
               <a:ext uri="{909E8E84-426E-40dd-AFC4-6F175D3DCCD1}">
-                <a14:hiddenFill xmlns="" xmlns:a14="http://schemas.microsoft.com/office/drawing/2010/main">
+                <a14:hiddenFill xmlns:a14="http://schemas.microsoft.com/office/drawing/2010/main" xmlns="">
                   <a:solidFill>
                     <a:srgbClr val="FFFFFF"/>
                   </a:solidFill>
@@ -22652,6 +22688,52 @@
 </file>
 
 <file path=customXml/item1.xml><?xml version="1.0" encoding="utf-8"?>
+<?mso-contentType ?>
+<spe:Receivers xmlns:spe="http://schemas.microsoft.com/sharepoint/events">
+  <Receiver>
+    <Name>Document ID Generator</Name>
+    <Synchronization>Synchronous</Synchronization>
+    <Type>10001</Type>
+    <SequenceNumber>1000</SequenceNumber>
+    <Assembly>Microsoft.Office.DocumentManagement, Version=14.0.0.0, Culture=neutral, PublicKeyToken=71e9bce111e9429c</Assembly>
+    <Class>Microsoft.Office.DocumentManagement.Internal.DocIdHandler</Class>
+    <Data/>
+    <Filter/>
+  </Receiver>
+  <Receiver>
+    <Name>Document ID Generator</Name>
+    <Synchronization>Synchronous</Synchronization>
+    <Type>10002</Type>
+    <SequenceNumber>1001</SequenceNumber>
+    <Assembly>Microsoft.Office.DocumentManagement, Version=14.0.0.0, Culture=neutral, PublicKeyToken=71e9bce111e9429c</Assembly>
+    <Class>Microsoft.Office.DocumentManagement.Internal.DocIdHandler</Class>
+    <Data/>
+    <Filter/>
+  </Receiver>
+  <Receiver>
+    <Name>Document ID Generator</Name>
+    <Synchronization>Synchronous</Synchronization>
+    <Type>10004</Type>
+    <SequenceNumber>1002</SequenceNumber>
+    <Assembly>Microsoft.Office.DocumentManagement, Version=14.0.0.0, Culture=neutral, PublicKeyToken=71e9bce111e9429c</Assembly>
+    <Class>Microsoft.Office.DocumentManagement.Internal.DocIdHandler</Class>
+    <Data/>
+    <Filter/>
+  </Receiver>
+  <Receiver>
+    <Name>Document ID Generator</Name>
+    <Synchronization>Synchronous</Synchronization>
+    <Type>10006</Type>
+    <SequenceNumber>1003</SequenceNumber>
+    <Assembly>Microsoft.Office.DocumentManagement, Version=14.0.0.0, Culture=neutral, PublicKeyToken=71e9bce111e9429c</Assembly>
+    <Class>Microsoft.Office.DocumentManagement.Internal.DocIdHandler</Class>
+    <Data/>
+    <Filter/>
+  </Receiver>
+</spe:Receivers>
+</file>
+
+<file path=customXml/item2.xml><?xml version="1.0" encoding="utf-8"?>
 <ct:contentTypeSchema xmlns:ct="http://schemas.microsoft.com/office/2006/metadata/contentType" xmlns:ma="http://schemas.microsoft.com/office/2006/metadata/properties/metaAttributes" ct:_="" ma:_="" ma:contentTypeName="Document" ma:contentTypeID="0x0101000812F700BE7F874999720E88173FE491" ma:contentTypeVersion="0" ma:contentTypeDescription="Create a new document." ma:contentTypeScope="" ma:versionID="3f79f408e2ca720b7aba6e0e32464d0c">
   <xsd:schema xmlns:xsd="http://www.w3.org/2001/XMLSchema" xmlns:xs="http://www.w3.org/2001/XMLSchema" xmlns:p="http://schemas.microsoft.com/office/2006/metadata/properties" xmlns:ns2="7bb5d761-a2ea-4873-95f7-7a6658fb3ef0" targetNamespace="http://schemas.microsoft.com/office/2006/metadata/properties" ma:root="true" ma:fieldsID="1e062cd38ba31e406bfc4340fbc7f87a" ns2:_="">
     <xsd:import namespace="7bb5d761-a2ea-4873-95f7-7a6658fb3ef0"/>
@@ -22796,62 +22878,7 @@
 </ct:contentTypeSchema>
 </file>
 
-<file path=customXml/item2.xml><?xml version="1.0" encoding="utf-8"?>
-<?mso-contentType ?>
-<spe:Receivers xmlns:spe="http://schemas.microsoft.com/sharepoint/events">
-  <Receiver>
-    <Name>Document ID Generator</Name>
-    <Synchronization>Synchronous</Synchronization>
-    <Type>10001</Type>
-    <SequenceNumber>1000</SequenceNumber>
-    <Assembly>Microsoft.Office.DocumentManagement, Version=14.0.0.0, Culture=neutral, PublicKeyToken=71e9bce111e9429c</Assembly>
-    <Class>Microsoft.Office.DocumentManagement.Internal.DocIdHandler</Class>
-    <Data/>
-    <Filter/>
-  </Receiver>
-  <Receiver>
-    <Name>Document ID Generator</Name>
-    <Synchronization>Synchronous</Synchronization>
-    <Type>10002</Type>
-    <SequenceNumber>1001</SequenceNumber>
-    <Assembly>Microsoft.Office.DocumentManagement, Version=14.0.0.0, Culture=neutral, PublicKeyToken=71e9bce111e9429c</Assembly>
-    <Class>Microsoft.Office.DocumentManagement.Internal.DocIdHandler</Class>
-    <Data/>
-    <Filter/>
-  </Receiver>
-  <Receiver>
-    <Name>Document ID Generator</Name>
-    <Synchronization>Synchronous</Synchronization>
-    <Type>10004</Type>
-    <SequenceNumber>1002</SequenceNumber>
-    <Assembly>Microsoft.Office.DocumentManagement, Version=14.0.0.0, Culture=neutral, PublicKeyToken=71e9bce111e9429c</Assembly>
-    <Class>Microsoft.Office.DocumentManagement.Internal.DocIdHandler</Class>
-    <Data/>
-    <Filter/>
-  </Receiver>
-  <Receiver>
-    <Name>Document ID Generator</Name>
-    <Synchronization>Synchronous</Synchronization>
-    <Type>10006</Type>
-    <SequenceNumber>1003</SequenceNumber>
-    <Assembly>Microsoft.Office.DocumentManagement, Version=14.0.0.0, Culture=neutral, PublicKeyToken=71e9bce111e9429c</Assembly>
-    <Class>Microsoft.Office.DocumentManagement.Internal.DocIdHandler</Class>
-    <Data/>
-    <Filter/>
-  </Receiver>
-</spe:Receivers>
-</file>
-
 <file path=customXml/item3.xml><?xml version="1.0" encoding="utf-8"?>
-<?mso-contentType ?>
-<FormTemplates xmlns="http://schemas.microsoft.com/sharepoint/v3/contenttype/forms">
-  <Display>DocumentLibraryForm</Display>
-  <Edit>DocumentLibraryForm</Edit>
-  <New>DocumentLibraryForm</New>
-</FormTemplates>
-</file>
-
-<file path=customXml/item4.xml><?xml version="1.0" encoding="utf-8"?>
 <p:properties xmlns:p="http://schemas.microsoft.com/office/2006/metadata/properties" xmlns:xsi="http://www.w3.org/2001/XMLSchema-instance" xmlns:pc="http://schemas.microsoft.com/office/infopath/2007/PartnerControls">
   <documentManagement>
     <_dlc_DocId xmlns="7bb5d761-a2ea-4873-95f7-7a6658fb3ef0">M4CWTKMW727E-592-73</_dlc_DocId>
@@ -22863,7 +22890,24 @@
 </p:properties>
 </file>
 
+<file path=customXml/item4.xml><?xml version="1.0" encoding="utf-8"?>
+<?mso-contentType ?>
+<FormTemplates xmlns="http://schemas.microsoft.com/sharepoint/v3/contenttype/forms">
+  <Display>DocumentLibraryForm</Display>
+  <Edit>DocumentLibraryForm</Edit>
+  <New>DocumentLibraryForm</New>
+</FormTemplates>
+</file>
+
 <file path=customXml/itemProps1.xml><?xml version="1.0" encoding="utf-8"?>
+<ds:datastoreItem xmlns:ds="http://schemas.openxmlformats.org/officeDocument/2006/customXml" ds:itemID="{B13EBC30-FE27-4C6A-B723-23FC2188F7DC}">
+  <ds:schemaRefs>
+    <ds:schemaRef ds:uri="http://schemas.microsoft.com/sharepoint/events"/>
+  </ds:schemaRefs>
+</ds:datastoreItem>
+</file>
+
+<file path=customXml/itemProps2.xml><?xml version="1.0" encoding="utf-8"?>
 <ds:datastoreItem xmlns:ds="http://schemas.openxmlformats.org/officeDocument/2006/customXml" ds:itemID="{164479E5-0B02-49AC-B79E-EC1D6164DDD3}">
   <ds:schemaRefs>
     <ds:schemaRef ds:uri="http://schemas.microsoft.com/office/2006/metadata/contentType"/>
@@ -22881,23 +22925,7 @@
 </ds:datastoreItem>
 </file>
 
-<file path=customXml/itemProps2.xml><?xml version="1.0" encoding="utf-8"?>
-<ds:datastoreItem xmlns:ds="http://schemas.openxmlformats.org/officeDocument/2006/customXml" ds:itemID="{B13EBC30-FE27-4C6A-B723-23FC2188F7DC}">
-  <ds:schemaRefs>
-    <ds:schemaRef ds:uri="http://schemas.microsoft.com/sharepoint/events"/>
-  </ds:schemaRefs>
-</ds:datastoreItem>
-</file>
-
 <file path=customXml/itemProps3.xml><?xml version="1.0" encoding="utf-8"?>
-<ds:datastoreItem xmlns:ds="http://schemas.openxmlformats.org/officeDocument/2006/customXml" ds:itemID="{5CDEB364-43EC-4510-9881-539C2A3FCE9E}">
-  <ds:schemaRefs>
-    <ds:schemaRef ds:uri="http://schemas.microsoft.com/sharepoint/v3/contenttype/forms"/>
-  </ds:schemaRefs>
-</ds:datastoreItem>
-</file>
-
-<file path=customXml/itemProps4.xml><?xml version="1.0" encoding="utf-8"?>
 <ds:datastoreItem xmlns:ds="http://schemas.openxmlformats.org/officeDocument/2006/customXml" ds:itemID="{6921749B-AEB7-461B-845F-603CABD25259}">
   <ds:schemaRefs>
     <ds:schemaRef ds:uri="http://schemas.microsoft.com/office/2006/documentManagement/types"/>
@@ -22911,4 +22939,12 @@
     <ds:schemaRef ds:uri="http://purl.org/dc/dcmitype/"/>
   </ds:schemaRefs>
 </ds:datastoreItem>
+</file>
+
+<file path=customXml/itemProps4.xml><?xml version="1.0" encoding="utf-8"?>
+<ds:datastoreItem xmlns:ds="http://schemas.openxmlformats.org/officeDocument/2006/customXml" ds:itemID="{5CDEB364-43EC-4510-9881-539C2A3FCE9E}">
+  <ds:schemaRefs>
+    <ds:schemaRef ds:uri="http://schemas.microsoft.com/sharepoint/v3/contenttype/forms"/>
+  </ds:schemaRefs>
+</ds:datastoreItem>
 </file>
</xml_diff>

<commit_message>
edited 01-Intro first slide instructor notes to indicate state of module 05 that is under construction
</commit_message>
<xml_diff>
--- a/01-Intro.pptx
+++ b/01-Intro.pptx
@@ -291,7 +291,7 @@
               <a:pPr>
                 <a:defRPr/>
               </a:pPr>
-              <a:t>2016-02-23</a:t>
+              <a:t>2016-02-26</a:t>
             </a:fld>
             <a:endParaRPr lang="en-US" dirty="0"/>
           </a:p>
@@ -474,7 +474,7 @@
               <a:pPr>
                 <a:defRPr/>
               </a:pPr>
-              <a:t>2016-02-23</a:t>
+              <a:t>2016-02-26</a:t>
             </a:fld>
             <a:endParaRPr lang="en-US" dirty="0"/>
           </a:p>
@@ -1093,10 +1093,10 @@
                 <a:ea typeface="ＭＳ Ｐゴシック" charset="0"/>
                 <a:cs typeface="Arial" panose="020B0604020202020204" pitchFamily="34" charset="0"/>
               </a:rPr>
-              <a:t> for training lab set up notes and additional instructor notes. This course requires</a:t>
-            </a:r>
-            <a:r>
-              <a:rPr lang="en-US" sz="1200" kern="1200" baseline="0" dirty="0" smtClean="0">
+              <a:t> for training lab set up notes and additional instructor notes.</a:t>
+            </a:r>
+            <a:br>
+              <a:rPr lang="en-US" sz="1200" kern="1200" dirty="0" smtClean="0">
                 <a:solidFill>
                   <a:schemeClr val="tx1"/>
                 </a:solidFill>
@@ -1105,8 +1105,144 @@
                 <a:ea typeface="ＭＳ Ｐゴシック" charset="0"/>
                 <a:cs typeface="Arial" panose="020B0604020202020204" pitchFamily="34" charset="0"/>
               </a:rPr>
-              <a:t> ChefDK 0.10.0 on or higher on the target node AMIs. </a:t>
-            </a:r>
+            </a:br>
+            <a:r>
+              <a:rPr lang="en-US" strike="noStrike" dirty="0" smtClean="0"/>
+              <a:t>Instructor Note: This course has been tested on</a:t>
+            </a:r>
+            <a:r>
+              <a:rPr lang="en-US" strike="noStrike" baseline="0" dirty="0" smtClean="0"/>
+              <a:t> </a:t>
+            </a:r>
+            <a:r>
+              <a:rPr lang="en-US" sz="1200" strike="noStrike" kern="1200" dirty="0" smtClean="0">
+                <a:solidFill>
+                  <a:schemeClr val="tx1"/>
+                </a:solidFill>
+                <a:effectLst/>
+                <a:latin typeface="Arial" panose="020B0604020202020204" pitchFamily="34" charset="0"/>
+                <a:ea typeface="ＭＳ Ｐゴシック" charset="0"/>
+                <a:cs typeface="Arial" panose="020B0604020202020204" pitchFamily="34" charset="0"/>
+              </a:rPr>
+              <a:t>Compliance Server v</a:t>
+            </a:r>
+            <a:r>
+              <a:rPr lang="en-US" sz="1200" b="0" i="0" strike="noStrike" kern="1200" dirty="0" smtClean="0">
+                <a:solidFill>
+                  <a:schemeClr val="tx1"/>
+                </a:solidFill>
+                <a:effectLst/>
+                <a:latin typeface="Arial" panose="020B0604020202020204" pitchFamily="34" charset="0"/>
+                <a:ea typeface="ＭＳ Ｐゴシック" charset="0"/>
+                <a:cs typeface="Arial" panose="020B0604020202020204" pitchFamily="34" charset="0"/>
+              </a:rPr>
+              <a:t>0.14.5</a:t>
+            </a:r>
+            <a:r>
+              <a:rPr lang="en-US" sz="1200" strike="noStrike" kern="1200" dirty="0" smtClean="0">
+                <a:solidFill>
+                  <a:schemeClr val="tx1"/>
+                </a:solidFill>
+                <a:effectLst/>
+                <a:latin typeface="Arial" panose="020B0604020202020204" pitchFamily="34" charset="0"/>
+                <a:ea typeface="ＭＳ Ｐゴシック" charset="0"/>
+                <a:cs typeface="Arial" panose="020B0604020202020204" pitchFamily="34" charset="0"/>
+              </a:rPr>
+              <a:t>.</a:t>
+            </a:r>
+            <a:r>
+              <a:rPr lang="en-US" sz="1200" strike="noStrike" kern="1200" baseline="0" dirty="0" smtClean="0">
+                <a:solidFill>
+                  <a:schemeClr val="tx1"/>
+                </a:solidFill>
+                <a:effectLst/>
+                <a:latin typeface="Arial" panose="020B0604020202020204" pitchFamily="34" charset="0"/>
+                <a:ea typeface="ＭＳ Ｐゴシック" charset="0"/>
+                <a:cs typeface="Arial" panose="020B0604020202020204" pitchFamily="34" charset="0"/>
+              </a:rPr>
+              <a:t> The labs have been tested against target Linux and Windows nodes that have ChefDK  0.11.2 that includes </a:t>
+            </a:r>
+            <a:r>
+              <a:rPr lang="en-US" sz="1200" strike="noStrike" kern="1200" baseline="0" dirty="0" err="1" smtClean="0">
+                <a:solidFill>
+                  <a:schemeClr val="tx1"/>
+                </a:solidFill>
+                <a:effectLst/>
+                <a:latin typeface="Arial" panose="020B0604020202020204" pitchFamily="34" charset="0"/>
+                <a:ea typeface="ＭＳ Ｐゴシック" charset="0"/>
+                <a:cs typeface="Arial" panose="020B0604020202020204" pitchFamily="34" charset="0"/>
+              </a:rPr>
+              <a:t>inspec</a:t>
+            </a:r>
+            <a:r>
+              <a:rPr lang="en-US" sz="1200" strike="noStrike" kern="1200" baseline="0" dirty="0" smtClean="0">
+                <a:solidFill>
+                  <a:schemeClr val="tx1"/>
+                </a:solidFill>
+                <a:effectLst/>
+                <a:latin typeface="Arial" panose="020B0604020202020204" pitchFamily="34" charset="0"/>
+                <a:ea typeface="ＭＳ Ｐゴシック" charset="0"/>
+                <a:cs typeface="Arial" panose="020B0604020202020204" pitchFamily="34" charset="0"/>
+              </a:rPr>
+              <a:t> 0.14.2. </a:t>
+            </a:r>
+            <a:r>
+              <a:rPr lang="en-US" sz="1200" strike="noStrike" kern="1200" baseline="0" dirty="0" smtClean="0">
+                <a:solidFill>
+                  <a:schemeClr val="tx1"/>
+                </a:solidFill>
+                <a:effectLst/>
+                <a:latin typeface="Arial" panose="020B0604020202020204" pitchFamily="34" charset="0"/>
+                <a:ea typeface="ＭＳ Ｐゴシック" charset="0"/>
+                <a:cs typeface="Arial" panose="020B0604020202020204" pitchFamily="34" charset="0"/>
+              </a:rPr>
+              <a:t>2/26/16 </a:t>
+            </a:r>
+            <a:r>
+              <a:rPr lang="en-US" sz="1200" strike="noStrike" kern="1200" baseline="0" smtClean="0">
+                <a:solidFill>
+                  <a:schemeClr val="tx1"/>
+                </a:solidFill>
+                <a:effectLst/>
+                <a:latin typeface="Arial" panose="020B0604020202020204" pitchFamily="34" charset="0"/>
+                <a:ea typeface="ＭＳ Ｐゴシック" charset="0"/>
+                <a:cs typeface="Arial" panose="020B0604020202020204" pitchFamily="34" charset="0"/>
+              </a:rPr>
+              <a:t>Module 05 </a:t>
+            </a:r>
+            <a:r>
+              <a:rPr lang="en-US" sz="1200" strike="noStrike" kern="1200" baseline="0" dirty="0" smtClean="0">
+                <a:solidFill>
+                  <a:schemeClr val="tx1"/>
+                </a:solidFill>
+                <a:effectLst/>
+                <a:latin typeface="Arial" panose="020B0604020202020204" pitchFamily="34" charset="0"/>
+                <a:ea typeface="ＭＳ Ｐゴシック" charset="0"/>
+                <a:cs typeface="Arial" panose="020B0604020202020204" pitchFamily="34" charset="0"/>
+              </a:rPr>
+              <a:t>is </a:t>
+            </a:r>
+            <a:r>
+              <a:rPr lang="en-US" sz="1200" strike="noStrike" kern="1200" baseline="0" smtClean="0">
+                <a:solidFill>
+                  <a:schemeClr val="tx1"/>
+                </a:solidFill>
+                <a:effectLst/>
+                <a:latin typeface="Arial" panose="020B0604020202020204" pitchFamily="34" charset="0"/>
+                <a:ea typeface="ＭＳ Ｐゴシック" charset="0"/>
+                <a:cs typeface="Arial" panose="020B0604020202020204" pitchFamily="34" charset="0"/>
+              </a:rPr>
+              <a:t>under reconstruction.</a:t>
+            </a:r>
+            <a:endParaRPr lang="en-US" sz="1200" strike="noStrike" kern="1200" baseline="0" dirty="0" smtClean="0">
+              <a:solidFill>
+                <a:schemeClr val="tx1"/>
+              </a:solidFill>
+              <a:effectLst/>
+              <a:latin typeface="Arial" panose="020B0604020202020204" pitchFamily="34" charset="0"/>
+              <a:ea typeface="ＭＳ Ｐゴシック" charset="0"/>
+              <a:cs typeface="Arial" panose="020B0604020202020204" pitchFamily="34" charset="0"/>
+            </a:endParaRPr>
           </a:p>
           <a:p>
             <a:pPr marL="0" marR="0" indent="0" algn="l" defTabSz="1217613" rtl="0" eaLnBrk="1" fontAlgn="base" latinLnBrk="0" hangingPunct="1">
@@ -1126,162 +1262,15 @@
               <a:tabLst/>
               <a:defRPr/>
             </a:pPr>
-            <a:r>
-              <a:rPr lang="en-US" strike="sngStrike" dirty="0" smtClean="0"/>
-              <a:t>Instructor Note: This course has been tested on</a:t>
-            </a:r>
-            <a:r>
-              <a:rPr lang="en-US" strike="sngStrike" baseline="0" dirty="0" smtClean="0"/>
-              <a:t> </a:t>
-            </a:r>
-            <a:r>
-              <a:rPr lang="en-US" sz="1200" strike="sngStrike" kern="1200" dirty="0" smtClean="0">
-                <a:solidFill>
-                  <a:schemeClr val="tx1"/>
-                </a:solidFill>
-                <a:effectLst/>
-                <a:latin typeface="Arial" panose="020B0604020202020204" pitchFamily="34" charset="0"/>
-                <a:ea typeface="ＭＳ Ｐゴシック" charset="0"/>
-                <a:cs typeface="Arial" panose="020B0604020202020204" pitchFamily="34" charset="0"/>
-              </a:rPr>
-              <a:t>Compliance Server v</a:t>
-            </a:r>
-            <a:r>
-              <a:rPr lang="en-US" sz="1200" b="0" i="0" strike="sngStrike" kern="1200" dirty="0" smtClean="0">
-                <a:solidFill>
-                  <a:schemeClr val="tx1"/>
-                </a:solidFill>
-                <a:effectLst/>
-                <a:latin typeface="Arial" panose="020B0604020202020204" pitchFamily="34" charset="0"/>
-                <a:ea typeface="ＭＳ Ｐゴシック" charset="0"/>
-                <a:cs typeface="Arial" panose="020B0604020202020204" pitchFamily="34" charset="0"/>
-              </a:rPr>
-              <a:t>0.14.5</a:t>
-            </a:r>
-            <a:r>
-              <a:rPr lang="en-US" sz="1200" strike="sngStrike" kern="1200" dirty="0" smtClean="0">
-                <a:solidFill>
-                  <a:schemeClr val="tx1"/>
-                </a:solidFill>
-                <a:effectLst/>
-                <a:latin typeface="Arial" panose="020B0604020202020204" pitchFamily="34" charset="0"/>
-                <a:ea typeface="ＭＳ Ｐゴシック" charset="0"/>
-                <a:cs typeface="Arial" panose="020B0604020202020204" pitchFamily="34" charset="0"/>
-              </a:rPr>
-              <a:t>.</a:t>
-            </a:r>
-            <a:r>
-              <a:rPr lang="en-US" sz="1200" strike="sngStrike" kern="1200" baseline="0" dirty="0" smtClean="0">
-                <a:solidFill>
-                  <a:schemeClr val="tx1"/>
-                </a:solidFill>
-                <a:effectLst/>
-                <a:latin typeface="Arial" panose="020B0604020202020204" pitchFamily="34" charset="0"/>
-                <a:ea typeface="ＭＳ Ｐゴシック" charset="0"/>
-                <a:cs typeface="Arial" panose="020B0604020202020204" pitchFamily="34" charset="0"/>
-              </a:rPr>
-              <a:t> The labs have been tested against target Linux and Windows nodes that have ChefDK 0.11.0 with </a:t>
-            </a:r>
-            <a:r>
-              <a:rPr lang="en-US" sz="1200" strike="sngStrike" kern="1200" baseline="0" dirty="0" err="1" smtClean="0">
-                <a:solidFill>
-                  <a:schemeClr val="tx1"/>
-                </a:solidFill>
-                <a:effectLst/>
-                <a:latin typeface="Arial" panose="020B0604020202020204" pitchFamily="34" charset="0"/>
-                <a:ea typeface="ＭＳ Ｐゴシック" charset="0"/>
-                <a:cs typeface="Arial" panose="020B0604020202020204" pitchFamily="34" charset="0"/>
-              </a:rPr>
-              <a:t>inspec</a:t>
-            </a:r>
-            <a:r>
-              <a:rPr lang="en-US" sz="1200" strike="sngStrike" kern="1200" baseline="0" dirty="0" smtClean="0">
-                <a:solidFill>
-                  <a:schemeClr val="tx1"/>
-                </a:solidFill>
-                <a:effectLst/>
-                <a:latin typeface="Arial" panose="020B0604020202020204" pitchFamily="34" charset="0"/>
-                <a:ea typeface="ＭＳ Ｐゴシック" charset="0"/>
-                <a:cs typeface="Arial" panose="020B0604020202020204" pitchFamily="34" charset="0"/>
-              </a:rPr>
-              <a:t> 0.11.0</a:t>
-            </a:r>
-            <a:r>
-              <a:rPr lang="en-US" sz="1200" strike="sngStrike" kern="1200" baseline="0" dirty="0" smtClean="0">
-                <a:solidFill>
-                  <a:schemeClr val="tx1"/>
-                </a:solidFill>
-                <a:effectLst/>
-                <a:latin typeface="Arial" panose="020B0604020202020204" pitchFamily="34" charset="0"/>
-                <a:ea typeface="ＭＳ Ｐゴシック" charset="0"/>
-                <a:cs typeface="Arial" panose="020B0604020202020204" pitchFamily="34" charset="0"/>
-              </a:rPr>
-              <a:t>.  </a:t>
-            </a:r>
-            <a:r>
-              <a:rPr lang="en-US" sz="1200" strike="noStrike" kern="1200" baseline="0" dirty="0" smtClean="0">
-                <a:solidFill>
-                  <a:schemeClr val="tx1"/>
-                </a:solidFill>
-                <a:effectLst/>
-                <a:latin typeface="Arial" panose="020B0604020202020204" pitchFamily="34" charset="0"/>
-                <a:ea typeface="ＭＳ Ｐゴシック" charset="0"/>
-                <a:cs typeface="Arial" panose="020B0604020202020204" pitchFamily="34" charset="0"/>
-              </a:rPr>
-              <a:t>2-23-16 Module 5 labs are failing while using </a:t>
-            </a:r>
-            <a:r>
-              <a:rPr lang="en-US" sz="1200" strike="noStrike" kern="1200" baseline="0" dirty="0" err="1" smtClean="0">
-                <a:solidFill>
-                  <a:schemeClr val="tx1"/>
-                </a:solidFill>
-                <a:effectLst/>
-                <a:latin typeface="Arial" panose="020B0604020202020204" pitchFamily="34" charset="0"/>
-                <a:ea typeface="ＭＳ Ｐゴシック" charset="0"/>
-                <a:cs typeface="Arial" panose="020B0604020202020204" pitchFamily="34" charset="0"/>
-              </a:rPr>
-              <a:t>inspec</a:t>
-            </a:r>
-            <a:r>
-              <a:rPr lang="en-US" sz="1200" strike="noStrike" kern="1200" baseline="0" dirty="0" smtClean="0">
-                <a:solidFill>
-                  <a:schemeClr val="tx1"/>
-                </a:solidFill>
-                <a:effectLst/>
-                <a:latin typeface="Arial" panose="020B0604020202020204" pitchFamily="34" charset="0"/>
-                <a:ea typeface="ＭＳ Ｐゴシック" charset="0"/>
-                <a:cs typeface="Arial" panose="020B0604020202020204" pitchFamily="34" charset="0"/>
-              </a:rPr>
-              <a:t> 0.11.0. </a:t>
-            </a:r>
-            <a:r>
-              <a:rPr lang="en-US" sz="1200" strike="noStrike" kern="1200" baseline="0" smtClean="0">
-                <a:solidFill>
-                  <a:schemeClr val="tx1"/>
-                </a:solidFill>
-                <a:effectLst/>
-                <a:latin typeface="Arial" panose="020B0604020202020204" pitchFamily="34" charset="0"/>
-                <a:ea typeface="ＭＳ Ｐゴシック" charset="0"/>
-                <a:cs typeface="Arial" panose="020B0604020202020204" pitchFamily="34" charset="0"/>
-              </a:rPr>
-              <a:t>Investigating</a:t>
-            </a:r>
-            <a:r>
-              <a:rPr lang="en-US" sz="1200" strike="noStrike" kern="1200" baseline="0" dirty="0" smtClean="0">
-                <a:solidFill>
-                  <a:schemeClr val="tx1"/>
-                </a:solidFill>
-                <a:effectLst/>
-                <a:latin typeface="Arial" panose="020B0604020202020204" pitchFamily="34" charset="0"/>
-                <a:ea typeface="ＭＳ Ｐゴシック" charset="0"/>
-                <a:cs typeface="Arial" panose="020B0604020202020204" pitchFamily="34" charset="0"/>
-              </a:rPr>
-              <a:t>.</a:t>
-            </a:r>
-            <a:endParaRPr lang="en-US" strike="sngStrike" dirty="0" smtClean="0"/>
-          </a:p>
-          <a:p>
-            <a:endParaRPr lang="en-US" baseline="0" dirty="0" smtClean="0"/>
+            <a:endParaRPr lang="en-US" sz="1200" strike="noStrike" kern="1200" baseline="0" dirty="0" smtClean="0">
+              <a:solidFill>
+                <a:schemeClr val="tx1"/>
+              </a:solidFill>
+              <a:effectLst/>
+              <a:latin typeface="Arial" panose="020B0604020202020204" pitchFamily="34" charset="0"/>
+              <a:ea typeface="ＭＳ Ｐゴシック" charset="0"/>
+              <a:cs typeface="Arial" panose="020B0604020202020204" pitchFamily="34" charset="0"/>
+            </a:endParaRPr>
           </a:p>
           <a:p>
             <a:endParaRPr lang="en-US" baseline="0" dirty="0" smtClean="0"/>

</xml_diff>

<commit_message>
edited 01-Intro instructor notes to require inspec 0.14.7. on target nodes
</commit_message>
<xml_diff>
--- a/01-Intro.pptx
+++ b/01-Intro.pptx
@@ -291,7 +291,7 @@
               <a:pPr>
                 <a:defRPr/>
               </a:pPr>
-              <a:t>2016-02-26</a:t>
+              <a:t>2016-03-02</a:t>
             </a:fld>
             <a:endParaRPr lang="en-US" dirty="0"/>
           </a:p>
@@ -474,7 +474,7 @@
               <a:pPr>
                 <a:defRPr/>
               </a:pPr>
-              <a:t>2016-02-26</a:t>
+              <a:t>2016-03-02</a:t>
             </a:fld>
             <a:endParaRPr lang="en-US" dirty="0"/>
           </a:p>
@@ -1160,7 +1160,19 @@
                 <a:ea typeface="ＭＳ Ｐゴシック" charset="0"/>
                 <a:cs typeface="Arial" panose="020B0604020202020204" pitchFamily="34" charset="0"/>
               </a:rPr>
-              <a:t> The labs have been tested against target Linux and Windows nodes that have ChefDK  0.11.2 that includes </a:t>
+              <a:t> The labs have been tested against target Linux and Windows nodes that have ChefDK  </a:t>
+            </a:r>
+            <a:r>
+              <a:rPr lang="en-US" sz="1200" strike="noStrike" kern="1200" baseline="0" dirty="0" smtClean="0">
+                <a:solidFill>
+                  <a:schemeClr val="tx1"/>
+                </a:solidFill>
+                <a:effectLst/>
+                <a:latin typeface="Arial" panose="020B0604020202020204" pitchFamily="34" charset="0"/>
+                <a:ea typeface="ＭＳ Ｐゴシック" charset="0"/>
+                <a:cs typeface="Arial" panose="020B0604020202020204" pitchFamily="34" charset="0"/>
+              </a:rPr>
+              <a:t>0.11.2 and </a:t>
             </a:r>
             <a:r>
               <a:rPr lang="en-US" sz="1200" strike="noStrike" kern="1200" baseline="0" dirty="0" err="1" smtClean="0">
@@ -1184,10 +1196,10 @@
                 <a:ea typeface="ＭＳ Ｐゴシック" charset="0"/>
                 <a:cs typeface="Arial" panose="020B0604020202020204" pitchFamily="34" charset="0"/>
               </a:rPr>
-              <a:t> 0.14.2. </a:t>
-            </a:r>
-            <a:r>
-              <a:rPr lang="en-US" sz="1200" strike="noStrike" kern="1200" baseline="0" dirty="0" smtClean="0">
+              <a:t> 0.14.7.  You must use at least </a:t>
+            </a:r>
+            <a:r>
+              <a:rPr lang="en-US" sz="1200" strike="noStrike" kern="1200" baseline="0" dirty="0" err="1" smtClean="0">
                 <a:solidFill>
                   <a:schemeClr val="tx1"/>
                 </a:solidFill>
@@ -1196,10 +1208,10 @@
                 <a:ea typeface="ＭＳ Ｐゴシック" charset="0"/>
                 <a:cs typeface="Arial" panose="020B0604020202020204" pitchFamily="34" charset="0"/>
               </a:rPr>
-              <a:t>2/26/16 </a:t>
-            </a:r>
-            <a:r>
-              <a:rPr lang="en-US" sz="1200" strike="noStrike" kern="1200" baseline="0" smtClean="0">
+              <a:t>inspec</a:t>
+            </a:r>
+            <a:r>
+              <a:rPr lang="en-US" sz="1200" strike="noStrike" kern="1200" baseline="0" dirty="0" smtClean="0">
                 <a:solidFill>
                   <a:schemeClr val="tx1"/>
                 </a:solidFill>
@@ -1208,10 +1220,10 @@
                 <a:ea typeface="ＭＳ Ｐゴシック" charset="0"/>
                 <a:cs typeface="Arial" panose="020B0604020202020204" pitchFamily="34" charset="0"/>
               </a:rPr>
-              <a:t>Module 05 </a:t>
-            </a:r>
-            <a:r>
-              <a:rPr lang="en-US" sz="1200" strike="noStrike" kern="1200" baseline="0" dirty="0" smtClean="0">
+              <a:t> 0.14.7 on the target nodes in order for these labs </a:t>
+            </a:r>
+            <a:r>
+              <a:rPr lang="en-US" sz="1200" strike="noStrike" kern="1200" baseline="0" smtClean="0">
                 <a:solidFill>
                   <a:schemeClr val="tx1"/>
                 </a:solidFill>
@@ -1220,48 +1232,8 @@
                 <a:ea typeface="ＭＳ Ｐゴシック" charset="0"/>
                 <a:cs typeface="Arial" panose="020B0604020202020204" pitchFamily="34" charset="0"/>
               </a:rPr>
-              <a:t>is </a:t>
-            </a:r>
-            <a:r>
-              <a:rPr lang="en-US" sz="1200" strike="noStrike" kern="1200" baseline="0" smtClean="0">
-                <a:solidFill>
-                  <a:schemeClr val="tx1"/>
-                </a:solidFill>
-                <a:effectLst/>
-                <a:latin typeface="Arial" panose="020B0604020202020204" pitchFamily="34" charset="0"/>
-                <a:ea typeface="ＭＳ Ｐゴシック" charset="0"/>
-                <a:cs typeface="Arial" panose="020B0604020202020204" pitchFamily="34" charset="0"/>
-              </a:rPr>
-              <a:t>under reconstruction.</a:t>
-            </a:r>
-            <a:endParaRPr lang="en-US" sz="1200" strike="noStrike" kern="1200" baseline="0" dirty="0" smtClean="0">
-              <a:solidFill>
-                <a:schemeClr val="tx1"/>
-              </a:solidFill>
-              <a:effectLst/>
-              <a:latin typeface="Arial" panose="020B0604020202020204" pitchFamily="34" charset="0"/>
-              <a:ea typeface="ＭＳ Ｐゴシック" charset="0"/>
-              <a:cs typeface="Arial" panose="020B0604020202020204" pitchFamily="34" charset="0"/>
-            </a:endParaRPr>
-          </a:p>
-          <a:p>
-            <a:pPr marL="0" marR="0" indent="0" algn="l" defTabSz="1217613" rtl="0" eaLnBrk="1" fontAlgn="base" latinLnBrk="0" hangingPunct="1">
-              <a:lnSpc>
-                <a:spcPct val="90000"/>
-              </a:lnSpc>
-              <a:spcBef>
-                <a:spcPct val="30000"/>
-              </a:spcBef>
-              <a:spcAft>
-                <a:spcPts val="450"/>
-              </a:spcAft>
-              <a:buClrTx/>
-              <a:buSzTx/>
-              <a:buFontTx/>
-              <a:buNone/>
-              <a:tabLst/>
-              <a:defRPr/>
-            </a:pPr>
+              <a:t>to work. </a:t>
+            </a:r>
             <a:endParaRPr lang="en-US" sz="1200" strike="noStrike" kern="1200" baseline="0" dirty="0" smtClean="0">
               <a:solidFill>
                 <a:schemeClr val="tx1"/>
@@ -22678,6 +22650,15 @@
 
 <file path=customXml/item1.xml><?xml version="1.0" encoding="utf-8"?>
 <?mso-contentType ?>
+<FormTemplates xmlns="http://schemas.microsoft.com/sharepoint/v3/contenttype/forms">
+  <Display>DocumentLibraryForm</Display>
+  <Edit>DocumentLibraryForm</Edit>
+  <New>DocumentLibraryForm</New>
+</FormTemplates>
+</file>
+
+<file path=customXml/item2.xml><?xml version="1.0" encoding="utf-8"?>
+<?mso-contentType ?>
 <spe:Receivers xmlns:spe="http://schemas.microsoft.com/sharepoint/events">
   <Receiver>
     <Name>Document ID Generator</Name>
@@ -22722,7 +22703,7 @@
 </spe:Receivers>
 </file>
 
-<file path=customXml/item2.xml><?xml version="1.0" encoding="utf-8"?>
+<file path=customXml/item3.xml><?xml version="1.0" encoding="utf-8"?>
 <ct:contentTypeSchema xmlns:ct="http://schemas.microsoft.com/office/2006/metadata/contentType" xmlns:ma="http://schemas.microsoft.com/office/2006/metadata/properties/metaAttributes" ct:_="" ma:_="" ma:contentTypeName="Document" ma:contentTypeID="0x0101000812F700BE7F874999720E88173FE491" ma:contentTypeVersion="0" ma:contentTypeDescription="Create a new document." ma:contentTypeScope="" ma:versionID="3f79f408e2ca720b7aba6e0e32464d0c">
   <xsd:schema xmlns:xsd="http://www.w3.org/2001/XMLSchema" xmlns:xs="http://www.w3.org/2001/XMLSchema" xmlns:p="http://schemas.microsoft.com/office/2006/metadata/properties" xmlns:ns2="7bb5d761-a2ea-4873-95f7-7a6658fb3ef0" targetNamespace="http://schemas.microsoft.com/office/2006/metadata/properties" ma:root="true" ma:fieldsID="1e062cd38ba31e406bfc4340fbc7f87a" ns2:_="">
     <xsd:import namespace="7bb5d761-a2ea-4873-95f7-7a6658fb3ef0"/>
@@ -22867,7 +22848,7 @@
 </ct:contentTypeSchema>
 </file>
 
-<file path=customXml/item3.xml><?xml version="1.0" encoding="utf-8"?>
+<file path=customXml/item4.xml><?xml version="1.0" encoding="utf-8"?>
 <p:properties xmlns:p="http://schemas.microsoft.com/office/2006/metadata/properties" xmlns:xsi="http://www.w3.org/2001/XMLSchema-instance" xmlns:pc="http://schemas.microsoft.com/office/infopath/2007/PartnerControls">
   <documentManagement>
     <_dlc_DocId xmlns="7bb5d761-a2ea-4873-95f7-7a6658fb3ef0">M4CWTKMW727E-592-73</_dlc_DocId>
@@ -22879,16 +22860,15 @@
 </p:properties>
 </file>
 
-<file path=customXml/item4.xml><?xml version="1.0" encoding="utf-8"?>
-<?mso-contentType ?>
-<FormTemplates xmlns="http://schemas.microsoft.com/sharepoint/v3/contenttype/forms">
-  <Display>DocumentLibraryForm</Display>
-  <Edit>DocumentLibraryForm</Edit>
-  <New>DocumentLibraryForm</New>
-</FormTemplates>
+<file path=customXml/itemProps1.xml><?xml version="1.0" encoding="utf-8"?>
+<ds:datastoreItem xmlns:ds="http://schemas.openxmlformats.org/officeDocument/2006/customXml" ds:itemID="{5CDEB364-43EC-4510-9881-539C2A3FCE9E}">
+  <ds:schemaRefs>
+    <ds:schemaRef ds:uri="http://schemas.microsoft.com/sharepoint/v3/contenttype/forms"/>
+  </ds:schemaRefs>
+</ds:datastoreItem>
 </file>
 
-<file path=customXml/itemProps1.xml><?xml version="1.0" encoding="utf-8"?>
+<file path=customXml/itemProps2.xml><?xml version="1.0" encoding="utf-8"?>
 <ds:datastoreItem xmlns:ds="http://schemas.openxmlformats.org/officeDocument/2006/customXml" ds:itemID="{B13EBC30-FE27-4C6A-B723-23FC2188F7DC}">
   <ds:schemaRefs>
     <ds:schemaRef ds:uri="http://schemas.microsoft.com/sharepoint/events"/>
@@ -22896,7 +22876,7 @@
 </ds:datastoreItem>
 </file>
 
-<file path=customXml/itemProps2.xml><?xml version="1.0" encoding="utf-8"?>
+<file path=customXml/itemProps3.xml><?xml version="1.0" encoding="utf-8"?>
 <ds:datastoreItem xmlns:ds="http://schemas.openxmlformats.org/officeDocument/2006/customXml" ds:itemID="{164479E5-0B02-49AC-B79E-EC1D6164DDD3}">
   <ds:schemaRefs>
     <ds:schemaRef ds:uri="http://schemas.microsoft.com/office/2006/metadata/contentType"/>
@@ -22914,7 +22894,7 @@
 </ds:datastoreItem>
 </file>
 
-<file path=customXml/itemProps3.xml><?xml version="1.0" encoding="utf-8"?>
+<file path=customXml/itemProps4.xml><?xml version="1.0" encoding="utf-8"?>
 <ds:datastoreItem xmlns:ds="http://schemas.openxmlformats.org/officeDocument/2006/customXml" ds:itemID="{6921749B-AEB7-461B-845F-603CABD25259}">
   <ds:schemaRefs>
     <ds:schemaRef ds:uri="http://schemas.microsoft.com/office/2006/documentManagement/types"/>
@@ -22928,12 +22908,4 @@
     <ds:schemaRef ds:uri="http://purl.org/dc/dcmitype/"/>
   </ds:schemaRefs>
 </ds:datastoreItem>
-</file>
-
-<file path=customXml/itemProps4.xml><?xml version="1.0" encoding="utf-8"?>
-<ds:datastoreItem xmlns:ds="http://schemas.openxmlformats.org/officeDocument/2006/customXml" ds:itemID="{5CDEB364-43EC-4510-9881-539C2A3FCE9E}">
-  <ds:schemaRefs>
-    <ds:schemaRef ds:uri="http://schemas.microsoft.com/sharepoint/v3/contenttype/forms"/>
-  </ds:schemaRefs>
-</ds:datastoreItem>
 </file>
</xml_diff>